<commit_message>
Added the roles' responsibilities
</commit_message>
<xml_diff>
--- a/project/rumble/etsa02_figures.pptx
+++ b/project/rumble/etsa02_figures.pptx
@@ -10,6 +10,7 @@
     <p:sldId id="259" r:id="rId4"/>
     <p:sldId id="260" r:id="rId5"/>
     <p:sldId id="261" r:id="rId6"/>
+    <p:sldId id="262" r:id="rId7"/>
   </p:sldIdLst>
   <p:sldSz cx="12192000" cy="6858000"/>
   <p:notesSz cx="6858000" cy="9144000"/>
@@ -35785,6 +35786,423 @@
 </p:sld>
 </file>
 
+<file path=ppt/slides/slide6.xml><?xml version="1.0" encoding="utf-8"?>
+<p:sld xmlns:a="http://schemas.openxmlformats.org/drawingml/2006/main" xmlns:r="http://schemas.openxmlformats.org/officeDocument/2006/relationships" xmlns:p="http://schemas.openxmlformats.org/presentationml/2006/main">
+  <p:cSld>
+    <p:spTree>
+      <p:nvGrpSpPr>
+        <p:cNvPr id="1" name=""/>
+        <p:cNvGrpSpPr/>
+        <p:nvPr/>
+      </p:nvGrpSpPr>
+      <p:grpSpPr>
+        <a:xfrm>
+          <a:off x="0" y="0"/>
+          <a:ext cx="0" cy="0"/>
+          <a:chOff x="0" y="0"/>
+          <a:chExt cx="0" cy="0"/>
+        </a:xfrm>
+      </p:grpSpPr>
+      <p:sp>
+        <p:nvSpPr>
+          <p:cNvPr id="2" name="Title 1"/>
+          <p:cNvSpPr>
+            <a:spLocks noGrp="1"/>
+          </p:cNvSpPr>
+          <p:nvPr>
+            <p:ph type="title"/>
+          </p:nvPr>
+        </p:nvSpPr>
+        <p:spPr>
+          <a:xfrm>
+            <a:off x="457200" y="365125"/>
+            <a:ext cx="11277600" cy="1325563"/>
+          </a:xfrm>
+        </p:spPr>
+        <p:txBody>
+          <a:bodyPr/>
+          <a:lstStyle/>
+          <a:p>
+            <a:pPr>
+              <a:tabLst>
+                <a:tab pos="6186488" algn="l"/>
+                <a:tab pos="6369050" algn="l"/>
+              </a:tabLst>
+            </a:pPr>
+            <a:r>
+              <a:rPr lang="sv-SE" dirty="0" smtClean="0"/>
+              <a:t>Responsiblities	Deliverables</a:t>
+            </a:r>
+            <a:endParaRPr lang="sv-SE" dirty="0"/>
+          </a:p>
+        </p:txBody>
+      </p:sp>
+      <p:sp>
+        <p:nvSpPr>
+          <p:cNvPr id="3" name="Content Placeholder 2"/>
+          <p:cNvSpPr>
+            <a:spLocks noGrp="1"/>
+          </p:cNvSpPr>
+          <p:nvPr>
+            <p:ph idx="1"/>
+          </p:nvPr>
+        </p:nvSpPr>
+        <p:spPr>
+          <a:xfrm>
+            <a:off x="228600" y="1825625"/>
+            <a:ext cx="11734800" cy="4351338"/>
+          </a:xfrm>
+        </p:spPr>
+        <p:txBody>
+          <a:bodyPr>
+            <a:normAutofit fontScale="92500" lnSpcReduction="10000"/>
+          </a:bodyPr>
+          <a:lstStyle/>
+          <a:p>
+            <a:pPr lvl="0"/>
+            <a:r>
+              <a:rPr lang="sv-SE" dirty="0" smtClean="0">
+                <a:solidFill>
+                  <a:prstClr val="black"/>
+                </a:solidFill>
+              </a:rPr>
+              <a:t>Development lead</a:t>
+            </a:r>
+            <a:endParaRPr lang="sv-SE" dirty="0">
+              <a:solidFill>
+                <a:prstClr val="black"/>
+              </a:solidFill>
+            </a:endParaRPr>
+          </a:p>
+          <a:p>
+            <a:pPr marL="0" lvl="0" indent="269875">
+              <a:buNone/>
+            </a:pPr>
+            <a:r>
+              <a:rPr lang="sv-SE" sz="1400" dirty="0" smtClean="0">
+                <a:solidFill>
+                  <a:prstClr val="black"/>
+                </a:solidFill>
+              </a:rPr>
+              <a:t>Design, implementation, source code quality			</a:t>
+            </a:r>
+            <a:r>
+              <a:rPr lang="sv-SE" sz="1400" dirty="0">
+                <a:solidFill>
+                  <a:prstClr val="black"/>
+                </a:solidFill>
+              </a:rPr>
+              <a:t>	</a:t>
+            </a:r>
+            <a:r>
+              <a:rPr lang="sv-SE" sz="1400" dirty="0" smtClean="0">
+                <a:solidFill>
+                  <a:prstClr val="black"/>
+                </a:solidFill>
+              </a:rPr>
+              <a:t>jar_v0.5, jar_v0.9, jar_v1.0</a:t>
+            </a:r>
+            <a:endParaRPr lang="sv-SE" sz="1400" dirty="0">
+              <a:solidFill>
+                <a:prstClr val="black"/>
+              </a:solidFill>
+            </a:endParaRPr>
+          </a:p>
+          <a:p>
+            <a:pPr lvl="0"/>
+            <a:r>
+              <a:rPr lang="sv-SE" dirty="0" smtClean="0">
+                <a:solidFill>
+                  <a:prstClr val="black"/>
+                </a:solidFill>
+              </a:rPr>
+              <a:t>Requirements lead</a:t>
+            </a:r>
+            <a:endParaRPr lang="sv-SE" dirty="0">
+              <a:solidFill>
+                <a:prstClr val="black"/>
+              </a:solidFill>
+            </a:endParaRPr>
+          </a:p>
+          <a:p>
+            <a:pPr marL="0" lvl="0" indent="269875">
+              <a:buNone/>
+            </a:pPr>
+            <a:r>
+              <a:rPr lang="sv-SE" sz="1400" dirty="0" smtClean="0">
+                <a:solidFill>
+                  <a:prstClr val="black"/>
+                </a:solidFill>
+              </a:rPr>
+              <a:t>End-user perspective, feature scoping, detailed requirements	</a:t>
+            </a:r>
+            <a:r>
+              <a:rPr lang="sv-SE" sz="1400" dirty="0">
+                <a:solidFill>
+                  <a:prstClr val="black"/>
+                </a:solidFill>
+              </a:rPr>
+              <a:t>		</a:t>
+            </a:r>
+            <a:r>
+              <a:rPr lang="sv-SE" sz="1400" dirty="0" smtClean="0">
+                <a:solidFill>
+                  <a:prstClr val="black"/>
+                </a:solidFill>
+              </a:rPr>
+              <a:t>SRS v0.5, SRS v0.9, SRS v1.0</a:t>
+            </a:r>
+            <a:endParaRPr lang="sv-SE" sz="1400" dirty="0">
+              <a:solidFill>
+                <a:prstClr val="black"/>
+              </a:solidFill>
+            </a:endParaRPr>
+          </a:p>
+          <a:p>
+            <a:pPr lvl="0"/>
+            <a:r>
+              <a:rPr lang="sv-SE" dirty="0" smtClean="0">
+                <a:solidFill>
+                  <a:prstClr val="black"/>
+                </a:solidFill>
+              </a:rPr>
+              <a:t>Test lead</a:t>
+            </a:r>
+            <a:endParaRPr lang="sv-SE" dirty="0">
+              <a:solidFill>
+                <a:prstClr val="black"/>
+              </a:solidFill>
+            </a:endParaRPr>
+          </a:p>
+          <a:p>
+            <a:pPr marL="0" lvl="0" indent="269875">
+              <a:buNone/>
+            </a:pPr>
+            <a:r>
+              <a:rPr lang="sv-SE" sz="1400" dirty="0" smtClean="0">
+                <a:solidFill>
+                  <a:prstClr val="black"/>
+                </a:solidFill>
+              </a:rPr>
+              <a:t>Unit testing, system testing			</a:t>
+            </a:r>
+            <a:r>
+              <a:rPr lang="sv-SE" sz="1400" dirty="0">
+                <a:solidFill>
+                  <a:prstClr val="black"/>
+                </a:solidFill>
+              </a:rPr>
+              <a:t>		</a:t>
+            </a:r>
+            <a:r>
+              <a:rPr lang="sv-SE" sz="1400" dirty="0" smtClean="0">
+                <a:solidFill>
+                  <a:prstClr val="black"/>
+                </a:solidFill>
+              </a:rPr>
+              <a:t>Unit tests, Test spec v1.0 (incl. test code</a:t>
+            </a:r>
+            <a:r>
+              <a:rPr lang="sv-SE" sz="1400" smtClean="0">
+                <a:solidFill>
+                  <a:prstClr val="black"/>
+                </a:solidFill>
+              </a:rPr>
+              <a:t>), test </a:t>
+            </a:r>
+            <a:r>
+              <a:rPr lang="sv-SE" sz="1400" dirty="0" smtClean="0">
+                <a:solidFill>
+                  <a:prstClr val="black"/>
+                </a:solidFill>
+              </a:rPr>
+              <a:t>results</a:t>
+            </a:r>
+            <a:endParaRPr lang="sv-SE" sz="1400" dirty="0">
+              <a:solidFill>
+                <a:prstClr val="black"/>
+              </a:solidFill>
+            </a:endParaRPr>
+          </a:p>
+          <a:p>
+            <a:pPr lvl="0"/>
+            <a:r>
+              <a:rPr lang="sv-SE" dirty="0" smtClean="0">
+                <a:solidFill>
+                  <a:prstClr val="black"/>
+                </a:solidFill>
+              </a:rPr>
+              <a:t>Sales engineer</a:t>
+            </a:r>
+            <a:endParaRPr lang="sv-SE" dirty="0">
+              <a:solidFill>
+                <a:prstClr val="black"/>
+              </a:solidFill>
+            </a:endParaRPr>
+          </a:p>
+          <a:p>
+            <a:pPr marL="0" lvl="0" indent="269875">
+              <a:buNone/>
+            </a:pPr>
+            <a:r>
+              <a:rPr lang="sv-SE" sz="1400" dirty="0" smtClean="0">
+                <a:solidFill>
+                  <a:prstClr val="black"/>
+                </a:solidFill>
+              </a:rPr>
+              <a:t>Marketing, customer communication, negotitations	</a:t>
+            </a:r>
+            <a:r>
+              <a:rPr lang="sv-SE" sz="1400" dirty="0">
+                <a:solidFill>
+                  <a:prstClr val="black"/>
+                </a:solidFill>
+              </a:rPr>
+              <a:t>		</a:t>
+            </a:r>
+            <a:r>
+              <a:rPr lang="sv-SE" sz="1400" dirty="0" smtClean="0">
+                <a:solidFill>
+                  <a:prstClr val="black"/>
+                </a:solidFill>
+              </a:rPr>
+              <a:t>Marketing concept, signed contract (as supplier)</a:t>
+            </a:r>
+            <a:endParaRPr lang="sv-SE" sz="1400" dirty="0">
+              <a:solidFill>
+                <a:prstClr val="black"/>
+              </a:solidFill>
+            </a:endParaRPr>
+          </a:p>
+          <a:p>
+            <a:pPr lvl="0"/>
+            <a:r>
+              <a:rPr lang="sv-SE" dirty="0" smtClean="0">
+                <a:solidFill>
+                  <a:prstClr val="black"/>
+                </a:solidFill>
+              </a:rPr>
+              <a:t>Domain expert</a:t>
+            </a:r>
+            <a:endParaRPr lang="sv-SE" dirty="0">
+              <a:solidFill>
+                <a:prstClr val="black"/>
+              </a:solidFill>
+            </a:endParaRPr>
+          </a:p>
+          <a:p>
+            <a:pPr marL="0" lvl="0" indent="269875">
+              <a:buNone/>
+            </a:pPr>
+            <a:r>
+              <a:rPr lang="sv-SE" sz="1400" dirty="0" smtClean="0">
+                <a:solidFill>
+                  <a:prstClr val="black"/>
+                </a:solidFill>
+              </a:rPr>
+              <a:t>Learning Robocode, composing team, supplier communication, negotiations	</a:t>
+            </a:r>
+            <a:r>
+              <a:rPr lang="sv-SE" sz="1400" dirty="0">
+                <a:solidFill>
+                  <a:prstClr val="black"/>
+                </a:solidFill>
+              </a:rPr>
+              <a:t>	</a:t>
+            </a:r>
+            <a:r>
+              <a:rPr lang="sv-SE" sz="1400" dirty="0" smtClean="0">
+                <a:solidFill>
+                  <a:prstClr val="black"/>
+                </a:solidFill>
+              </a:rPr>
+              <a:t>Signed contract (as customer), acceptance test report, team jar-file</a:t>
+            </a:r>
+          </a:p>
+          <a:p>
+            <a:pPr lvl="0"/>
+            <a:r>
+              <a:rPr lang="sv-SE" sz="2600" dirty="0">
+                <a:solidFill>
+                  <a:prstClr val="black"/>
+                </a:solidFill>
+              </a:rPr>
+              <a:t>Project manager</a:t>
+            </a:r>
+          </a:p>
+          <a:p>
+            <a:pPr marL="0" lvl="0" indent="269875">
+              <a:buNone/>
+            </a:pPr>
+            <a:r>
+              <a:rPr lang="sv-SE" sz="1300" dirty="0">
+                <a:solidFill>
+                  <a:prstClr val="black"/>
+                </a:solidFill>
+              </a:rPr>
+              <a:t>Coordination, time reporting, communication with regulatory body		</a:t>
+            </a:r>
+            <a:r>
+              <a:rPr lang="sv-SE" sz="1300" dirty="0" smtClean="0">
+                <a:solidFill>
+                  <a:prstClr val="black"/>
+                </a:solidFill>
+              </a:rPr>
+              <a:t>	Weekly </a:t>
+            </a:r>
+            <a:r>
+              <a:rPr lang="sv-SE" sz="1300" dirty="0">
+                <a:solidFill>
+                  <a:prstClr val="black"/>
+                </a:solidFill>
+              </a:rPr>
+              <a:t>time reports, formal </a:t>
+            </a:r>
+            <a:r>
+              <a:rPr lang="sv-SE" sz="1300" dirty="0" smtClean="0">
+                <a:solidFill>
+                  <a:prstClr val="black"/>
+                </a:solidFill>
+              </a:rPr>
+              <a:t>claims (based on failed acceptance test)</a:t>
+            </a:r>
+            <a:endParaRPr lang="sv-SE" sz="1300" dirty="0">
+              <a:solidFill>
+                <a:prstClr val="black"/>
+              </a:solidFill>
+            </a:endParaRPr>
+          </a:p>
+          <a:p>
+            <a:pPr marL="0" lvl="0" indent="269875">
+              <a:buNone/>
+            </a:pPr>
+            <a:endParaRPr lang="sv-SE" sz="1400" dirty="0" smtClean="0">
+              <a:solidFill>
+                <a:prstClr val="black"/>
+              </a:solidFill>
+            </a:endParaRPr>
+          </a:p>
+          <a:p>
+            <a:pPr marL="0" indent="269875">
+              <a:buNone/>
+            </a:pPr>
+            <a:endParaRPr lang="sv-SE" dirty="0"/>
+          </a:p>
+        </p:txBody>
+      </p:sp>
+    </p:spTree>
+    <p:extLst>
+      <p:ext uri="{BB962C8B-B14F-4D97-AF65-F5344CB8AC3E}">
+        <p14:creationId xmlns:p14="http://schemas.microsoft.com/office/powerpoint/2010/main" val="4243476286"/>
+      </p:ext>
+    </p:extLst>
+  </p:cSld>
+  <p:clrMapOvr>
+    <a:masterClrMapping/>
+  </p:clrMapOvr>
+</p:sld>
+</file>
+
 <file path=ppt/theme/theme1.xml><?xml version="1.0" encoding="utf-8"?>
 <a:theme xmlns:a="http://schemas.openxmlformats.org/drawingml/2006/main" name="Office Theme">
   <a:themeElements>

</xml_diff>

<commit_message>
Added the project overview
</commit_message>
<xml_diff>
--- a/project/rumble/etsa02_figures.pptx
+++ b/project/rumble/etsa02_figures.pptx
@@ -18280,7 +18280,7 @@
           <a:p>
             <a:fld id="{CACABD52-BF91-4CCE-9EEC-6A02225A646E}" type="datetimeFigureOut">
               <a:rPr lang="en-US" smtClean="0"/>
-              <a:t>2017-12-20</a:t>
+              <a:t>2017-12-23</a:t>
             </a:fld>
             <a:endParaRPr lang="en-US"/>
           </a:p>
@@ -18478,7 +18478,7 @@
           <a:p>
             <a:fld id="{CACABD52-BF91-4CCE-9EEC-6A02225A646E}" type="datetimeFigureOut">
               <a:rPr lang="en-US" smtClean="0"/>
-              <a:t>2017-12-20</a:t>
+              <a:t>2017-12-23</a:t>
             </a:fld>
             <a:endParaRPr lang="en-US"/>
           </a:p>
@@ -18686,7 +18686,7 @@
           <a:p>
             <a:fld id="{CACABD52-BF91-4CCE-9EEC-6A02225A646E}" type="datetimeFigureOut">
               <a:rPr lang="en-US" smtClean="0"/>
-              <a:t>2017-12-20</a:t>
+              <a:t>2017-12-23</a:t>
             </a:fld>
             <a:endParaRPr lang="en-US"/>
           </a:p>
@@ -18884,7 +18884,7 @@
           <a:p>
             <a:fld id="{CACABD52-BF91-4CCE-9EEC-6A02225A646E}" type="datetimeFigureOut">
               <a:rPr lang="en-US" smtClean="0"/>
-              <a:t>2017-12-20</a:t>
+              <a:t>2017-12-23</a:t>
             </a:fld>
             <a:endParaRPr lang="en-US"/>
           </a:p>
@@ -19159,7 +19159,7 @@
           <a:p>
             <a:fld id="{CACABD52-BF91-4CCE-9EEC-6A02225A646E}" type="datetimeFigureOut">
               <a:rPr lang="en-US" smtClean="0"/>
-              <a:t>2017-12-20</a:t>
+              <a:t>2017-12-23</a:t>
             </a:fld>
             <a:endParaRPr lang="en-US"/>
           </a:p>
@@ -19424,7 +19424,7 @@
           <a:p>
             <a:fld id="{CACABD52-BF91-4CCE-9EEC-6A02225A646E}" type="datetimeFigureOut">
               <a:rPr lang="en-US" smtClean="0"/>
-              <a:t>2017-12-20</a:t>
+              <a:t>2017-12-23</a:t>
             </a:fld>
             <a:endParaRPr lang="en-US"/>
           </a:p>
@@ -19836,7 +19836,7 @@
           <a:p>
             <a:fld id="{CACABD52-BF91-4CCE-9EEC-6A02225A646E}" type="datetimeFigureOut">
               <a:rPr lang="en-US" smtClean="0"/>
-              <a:t>2017-12-20</a:t>
+              <a:t>2017-12-23</a:t>
             </a:fld>
             <a:endParaRPr lang="en-US"/>
           </a:p>
@@ -19977,7 +19977,7 @@
           <a:p>
             <a:fld id="{CACABD52-BF91-4CCE-9EEC-6A02225A646E}" type="datetimeFigureOut">
               <a:rPr lang="en-US" smtClean="0"/>
-              <a:t>2017-12-20</a:t>
+              <a:t>2017-12-23</a:t>
             </a:fld>
             <a:endParaRPr lang="en-US"/>
           </a:p>
@@ -20090,7 +20090,7 @@
           <a:p>
             <a:fld id="{CACABD52-BF91-4CCE-9EEC-6A02225A646E}" type="datetimeFigureOut">
               <a:rPr lang="en-US" smtClean="0"/>
-              <a:t>2017-12-20</a:t>
+              <a:t>2017-12-23</a:t>
             </a:fld>
             <a:endParaRPr lang="en-US"/>
           </a:p>
@@ -20401,7 +20401,7 @@
           <a:p>
             <a:fld id="{CACABD52-BF91-4CCE-9EEC-6A02225A646E}" type="datetimeFigureOut">
               <a:rPr lang="en-US" smtClean="0"/>
-              <a:t>2017-12-20</a:t>
+              <a:t>2017-12-23</a:t>
             </a:fld>
             <a:endParaRPr lang="en-US"/>
           </a:p>
@@ -20689,7 +20689,7 @@
           <a:p>
             <a:fld id="{CACABD52-BF91-4CCE-9EEC-6A02225A646E}" type="datetimeFigureOut">
               <a:rPr lang="en-US" smtClean="0"/>
-              <a:t>2017-12-20</a:t>
+              <a:t>2017-12-23</a:t>
             </a:fld>
             <a:endParaRPr lang="en-US"/>
           </a:p>
@@ -20930,7 +20930,7 @@
           <a:p>
             <a:fld id="{CACABD52-BF91-4CCE-9EEC-6A02225A646E}" type="datetimeFigureOut">
               <a:rPr lang="en-US" smtClean="0"/>
-              <a:t>2017-12-20</a:t>
+              <a:t>2017-12-23</a:t>
             </a:fld>
             <a:endParaRPr lang="en-US"/>
           </a:p>
@@ -26927,8 +26927,8 @@
         </p:nvSpPr>
         <p:spPr>
           <a:xfrm>
-            <a:off x="2416127" y="2015346"/>
-            <a:ext cx="2582758" cy="923330"/>
+            <a:off x="2313536" y="2015346"/>
+            <a:ext cx="2787943" cy="923330"/>
           </a:xfrm>
           <a:prstGeom prst="rect">
             <a:avLst/>
@@ -26946,7 +26946,21 @@
                 <a:latin typeface="Arial" panose="020B0604020202020204" pitchFamily="34" charset="0"/>
                 <a:cs typeface="Arial" panose="020B0604020202020204" pitchFamily="34" charset="0"/>
               </a:rPr>
-              <a:t>Engineering, business, </a:t>
+              <a:t>Engineering, </a:t>
+            </a:r>
+            <a:r>
+              <a:rPr lang="sv-SE" dirty="0" err="1">
+                <a:latin typeface="Arial" panose="020B0604020202020204" pitchFamily="34" charset="0"/>
+                <a:cs typeface="Arial" panose="020B0604020202020204" pitchFamily="34" charset="0"/>
+              </a:rPr>
+              <a:t>monetizing</a:t>
+            </a:r>
+            <a:r>
+              <a:rPr lang="sv-SE" dirty="0">
+                <a:latin typeface="Arial" panose="020B0604020202020204" pitchFamily="34" charset="0"/>
+                <a:cs typeface="Arial" panose="020B0604020202020204" pitchFamily="34" charset="0"/>
+              </a:rPr>
+              <a:t>, </a:t>
             </a:r>
           </a:p>
           <a:p>

</xml_diff>

<commit_message>
Full draft of monetizing
</commit_message>
<xml_diff>
--- a/project/rumble/etsa02_figures.pptx
+++ b/project/rumble/etsa02_figures.pptx
@@ -7,11 +7,12 @@
   <p:sldIdLst>
     <p:sldId id="256" r:id="rId2"/>
     <p:sldId id="258" r:id="rId3"/>
-    <p:sldId id="263" r:id="rId4"/>
-    <p:sldId id="259" r:id="rId5"/>
-    <p:sldId id="260" r:id="rId6"/>
-    <p:sldId id="261" r:id="rId7"/>
-    <p:sldId id="262" r:id="rId8"/>
+    <p:sldId id="264" r:id="rId4"/>
+    <p:sldId id="263" r:id="rId5"/>
+    <p:sldId id="259" r:id="rId6"/>
+    <p:sldId id="260" r:id="rId7"/>
+    <p:sldId id="261" r:id="rId8"/>
+    <p:sldId id="262" r:id="rId9"/>
   </p:sldIdLst>
   <p:sldSz cx="12192000" cy="6858000"/>
   <p:notesSz cx="6858000" cy="9144000"/>
@@ -111,6 +112,22 @@
     </a:lvl9pPr>
   </p:defaultTextStyle>
   <p:extLst>
+    <p:ext uri="{521415D9-36F7-43E2-AB2F-B90AF26B5E84}">
+      <p14:sectionLst xmlns:p14="http://schemas.microsoft.com/office/powerpoint/2010/main">
+        <p14:section name="Default Section" id="{EE9485A2-E525-44C9-9B7A-FBB86BFD9B54}">
+          <p14:sldIdLst>
+            <p14:sldId id="256"/>
+            <p14:sldId id="258"/>
+            <p14:sldId id="264"/>
+            <p14:sldId id="263"/>
+            <p14:sldId id="259"/>
+            <p14:sldId id="260"/>
+            <p14:sldId id="261"/>
+            <p14:sldId id="262"/>
+          </p14:sldIdLst>
+        </p14:section>
+      </p14:sectionLst>
+    </p:ext>
     <p:ext uri="{EFAFB233-063F-42B5-8137-9DF3F51BA10A}">
       <p15:sldGuideLst xmlns:p15="http://schemas.microsoft.com/office/powerpoint/2012/main">
         <p15:guide id="1" orient="horz" pos="2160" userDrawn="1">
@@ -18280,7 +18297,7 @@
           <a:p>
             <a:fld id="{CACABD52-BF91-4CCE-9EEC-6A02225A646E}" type="datetimeFigureOut">
               <a:rPr lang="en-US" smtClean="0"/>
-              <a:t>2017-12-23</a:t>
+              <a:t>2017-12-27</a:t>
             </a:fld>
             <a:endParaRPr lang="en-US"/>
           </a:p>
@@ -18478,7 +18495,7 @@
           <a:p>
             <a:fld id="{CACABD52-BF91-4CCE-9EEC-6A02225A646E}" type="datetimeFigureOut">
               <a:rPr lang="en-US" smtClean="0"/>
-              <a:t>2017-12-23</a:t>
+              <a:t>2017-12-27</a:t>
             </a:fld>
             <a:endParaRPr lang="en-US"/>
           </a:p>
@@ -18686,7 +18703,7 @@
           <a:p>
             <a:fld id="{CACABD52-BF91-4CCE-9EEC-6A02225A646E}" type="datetimeFigureOut">
               <a:rPr lang="en-US" smtClean="0"/>
-              <a:t>2017-12-23</a:t>
+              <a:t>2017-12-27</a:t>
             </a:fld>
             <a:endParaRPr lang="en-US"/>
           </a:p>
@@ -18884,7 +18901,7 @@
           <a:p>
             <a:fld id="{CACABD52-BF91-4CCE-9EEC-6A02225A646E}" type="datetimeFigureOut">
               <a:rPr lang="en-US" smtClean="0"/>
-              <a:t>2017-12-23</a:t>
+              <a:t>2017-12-27</a:t>
             </a:fld>
             <a:endParaRPr lang="en-US"/>
           </a:p>
@@ -19159,7 +19176,7 @@
           <a:p>
             <a:fld id="{CACABD52-BF91-4CCE-9EEC-6A02225A646E}" type="datetimeFigureOut">
               <a:rPr lang="en-US" smtClean="0"/>
-              <a:t>2017-12-23</a:t>
+              <a:t>2017-12-27</a:t>
             </a:fld>
             <a:endParaRPr lang="en-US"/>
           </a:p>
@@ -19424,7 +19441,7 @@
           <a:p>
             <a:fld id="{CACABD52-BF91-4CCE-9EEC-6A02225A646E}" type="datetimeFigureOut">
               <a:rPr lang="en-US" smtClean="0"/>
-              <a:t>2017-12-23</a:t>
+              <a:t>2017-12-27</a:t>
             </a:fld>
             <a:endParaRPr lang="en-US"/>
           </a:p>
@@ -19836,7 +19853,7 @@
           <a:p>
             <a:fld id="{CACABD52-BF91-4CCE-9EEC-6A02225A646E}" type="datetimeFigureOut">
               <a:rPr lang="en-US" smtClean="0"/>
-              <a:t>2017-12-23</a:t>
+              <a:t>2017-12-27</a:t>
             </a:fld>
             <a:endParaRPr lang="en-US"/>
           </a:p>
@@ -19977,7 +19994,7 @@
           <a:p>
             <a:fld id="{CACABD52-BF91-4CCE-9EEC-6A02225A646E}" type="datetimeFigureOut">
               <a:rPr lang="en-US" smtClean="0"/>
-              <a:t>2017-12-23</a:t>
+              <a:t>2017-12-27</a:t>
             </a:fld>
             <a:endParaRPr lang="en-US"/>
           </a:p>
@@ -20090,7 +20107,7 @@
           <a:p>
             <a:fld id="{CACABD52-BF91-4CCE-9EEC-6A02225A646E}" type="datetimeFigureOut">
               <a:rPr lang="en-US" smtClean="0"/>
-              <a:t>2017-12-23</a:t>
+              <a:t>2017-12-27</a:t>
             </a:fld>
             <a:endParaRPr lang="en-US"/>
           </a:p>
@@ -20401,7 +20418,7 @@
           <a:p>
             <a:fld id="{CACABD52-BF91-4CCE-9EEC-6A02225A646E}" type="datetimeFigureOut">
               <a:rPr lang="en-US" smtClean="0"/>
-              <a:t>2017-12-23</a:t>
+              <a:t>2017-12-27</a:t>
             </a:fld>
             <a:endParaRPr lang="en-US"/>
           </a:p>
@@ -20689,7 +20706,7 @@
           <a:p>
             <a:fld id="{CACABD52-BF91-4CCE-9EEC-6A02225A646E}" type="datetimeFigureOut">
               <a:rPr lang="en-US" smtClean="0"/>
-              <a:t>2017-12-23</a:t>
+              <a:t>2017-12-27</a:t>
             </a:fld>
             <a:endParaRPr lang="en-US"/>
           </a:p>
@@ -20930,7 +20947,7 @@
           <a:p>
             <a:fld id="{CACABD52-BF91-4CCE-9EEC-6A02225A646E}" type="datetimeFigureOut">
               <a:rPr lang="en-US" smtClean="0"/>
-              <a:t>2017-12-23</a:t>
+              <a:t>2017-12-27</a:t>
             </a:fld>
             <a:endParaRPr lang="en-US"/>
           </a:p>
@@ -27860,6 +27877,2356 @@
       </p:grpSpPr>
       <p:sp>
         <p:nvSpPr>
+          <p:cNvPr id="4" name="Cloud 3">
+            <a:extLst>
+              <a:ext uri="{FF2B5EF4-FFF2-40B4-BE49-F238E27FC236}">
+                <a16:creationId xmlns:a16="http://schemas.microsoft.com/office/drawing/2014/main" id="{3141B1FA-0C65-4790-B026-C4DF262B0BD7}"/>
+              </a:ext>
+            </a:extLst>
+          </p:cNvPr>
+          <p:cNvSpPr/>
+          <p:nvPr/>
+        </p:nvSpPr>
+        <p:spPr>
+          <a:xfrm>
+            <a:off x="78658" y="285137"/>
+            <a:ext cx="9910916" cy="4119716"/>
+          </a:xfrm>
+          <a:prstGeom prst="cloud">
+            <a:avLst/>
+          </a:prstGeom>
+          <a:noFill/>
+          <a:ln>
+            <a:solidFill>
+              <a:schemeClr val="tx1"/>
+            </a:solidFill>
+          </a:ln>
+        </p:spPr>
+        <p:style>
+          <a:lnRef idx="2">
+            <a:schemeClr val="accent1">
+              <a:shade val="50000"/>
+            </a:schemeClr>
+          </a:lnRef>
+          <a:fillRef idx="1">
+            <a:schemeClr val="accent1"/>
+          </a:fillRef>
+          <a:effectRef idx="0">
+            <a:schemeClr val="accent1"/>
+          </a:effectRef>
+          <a:fontRef idx="minor">
+            <a:schemeClr val="lt1"/>
+          </a:fontRef>
+        </p:style>
+        <p:txBody>
+          <a:bodyPr rtlCol="0" anchor="ctr"/>
+          <a:lstStyle/>
+          <a:p>
+            <a:pPr algn="ctr"/>
+            <a:r>
+              <a:rPr lang="sv-SE" sz="2800" dirty="0">
+                <a:solidFill>
+                  <a:schemeClr val="tx1"/>
+                </a:solidFill>
+                <a:latin typeface="Arial" panose="020B0604020202020204" pitchFamily="34" charset="0"/>
+                <a:cs typeface="Arial" panose="020B0604020202020204" pitchFamily="34" charset="0"/>
+              </a:rPr>
+              <a:t>Robot Market</a:t>
+            </a:r>
+          </a:p>
+          <a:p>
+            <a:pPr algn="ctr"/>
+            <a:endParaRPr lang="sv-SE" sz="2800" dirty="0">
+              <a:solidFill>
+                <a:schemeClr val="tx1"/>
+              </a:solidFill>
+              <a:latin typeface="Arial" panose="020B0604020202020204" pitchFamily="34" charset="0"/>
+              <a:cs typeface="Arial" panose="020B0604020202020204" pitchFamily="34" charset="0"/>
+            </a:endParaRPr>
+          </a:p>
+          <a:p>
+            <a:pPr algn="ctr"/>
+            <a:endParaRPr lang="sv-SE" sz="2800" dirty="0">
+              <a:solidFill>
+                <a:schemeClr val="tx1"/>
+              </a:solidFill>
+              <a:latin typeface="Arial" panose="020B0604020202020204" pitchFamily="34" charset="0"/>
+              <a:cs typeface="Arial" panose="020B0604020202020204" pitchFamily="34" charset="0"/>
+            </a:endParaRPr>
+          </a:p>
+          <a:p>
+            <a:pPr algn="ctr"/>
+            <a:endParaRPr lang="sv-SE" sz="2800" dirty="0">
+              <a:solidFill>
+                <a:schemeClr val="tx1"/>
+              </a:solidFill>
+              <a:latin typeface="Arial" panose="020B0604020202020204" pitchFamily="34" charset="0"/>
+              <a:cs typeface="Arial" panose="020B0604020202020204" pitchFamily="34" charset="0"/>
+            </a:endParaRPr>
+          </a:p>
+          <a:p>
+            <a:pPr algn="ctr"/>
+            <a:endParaRPr lang="sv-SE" sz="2800" dirty="0">
+              <a:solidFill>
+                <a:schemeClr val="tx1"/>
+              </a:solidFill>
+              <a:latin typeface="Arial" panose="020B0604020202020204" pitchFamily="34" charset="0"/>
+              <a:cs typeface="Arial" panose="020B0604020202020204" pitchFamily="34" charset="0"/>
+            </a:endParaRPr>
+          </a:p>
+          <a:p>
+            <a:pPr algn="ctr"/>
+            <a:endParaRPr lang="en-US" sz="2800" dirty="0">
+              <a:solidFill>
+                <a:schemeClr val="tx1"/>
+              </a:solidFill>
+              <a:latin typeface="Arial" panose="020B0604020202020204" pitchFamily="34" charset="0"/>
+              <a:cs typeface="Arial" panose="020B0604020202020204" pitchFamily="34" charset="0"/>
+            </a:endParaRPr>
+          </a:p>
+        </p:txBody>
+      </p:sp>
+      <p:sp>
+        <p:nvSpPr>
+          <p:cNvPr id="12" name="Rectangle 11">
+            <a:extLst>
+              <a:ext uri="{FF2B5EF4-FFF2-40B4-BE49-F238E27FC236}">
+                <a16:creationId xmlns:a16="http://schemas.microsoft.com/office/drawing/2014/main" id="{1F37C778-DFF2-4C39-9755-E6BF0C148F35}"/>
+              </a:ext>
+            </a:extLst>
+          </p:cNvPr>
+          <p:cNvSpPr/>
+          <p:nvPr/>
+        </p:nvSpPr>
+        <p:spPr>
+          <a:xfrm>
+            <a:off x="1100336" y="2821837"/>
+            <a:ext cx="1005468" cy="369332"/>
+          </a:xfrm>
+          <a:prstGeom prst="rect">
+            <a:avLst/>
+          </a:prstGeom>
+        </p:spPr>
+        <p:txBody>
+          <a:bodyPr wrap="none">
+            <a:spAutoFit/>
+          </a:bodyPr>
+          <a:lstStyle/>
+          <a:p>
+            <a:r>
+              <a:rPr lang="sv-SE" dirty="0">
+                <a:latin typeface="Arial" panose="020B0604020202020204" pitchFamily="34" charset="0"/>
+                <a:cs typeface="Arial" panose="020B0604020202020204" pitchFamily="34" charset="0"/>
+              </a:rPr>
+              <a:t>Robot A</a:t>
+            </a:r>
+            <a:endParaRPr lang="en-US" dirty="0"/>
+          </a:p>
+        </p:txBody>
+      </p:sp>
+      <p:sp>
+        <p:nvSpPr>
+          <p:cNvPr id="13" name="Rectangle 12">
+            <a:extLst>
+              <a:ext uri="{FF2B5EF4-FFF2-40B4-BE49-F238E27FC236}">
+                <a16:creationId xmlns:a16="http://schemas.microsoft.com/office/drawing/2014/main" id="{AD3DE133-097E-4D53-90A0-BDE00462AE50}"/>
+              </a:ext>
+            </a:extLst>
+          </p:cNvPr>
+          <p:cNvSpPr/>
+          <p:nvPr/>
+        </p:nvSpPr>
+        <p:spPr>
+          <a:xfrm>
+            <a:off x="2131268" y="3302104"/>
+            <a:ext cx="1018227" cy="369332"/>
+          </a:xfrm>
+          <a:prstGeom prst="rect">
+            <a:avLst/>
+          </a:prstGeom>
+        </p:spPr>
+        <p:txBody>
+          <a:bodyPr wrap="none">
+            <a:spAutoFit/>
+          </a:bodyPr>
+          <a:lstStyle/>
+          <a:p>
+            <a:r>
+              <a:rPr lang="sv-SE" dirty="0">
+                <a:latin typeface="Arial" panose="020B0604020202020204" pitchFamily="34" charset="0"/>
+                <a:cs typeface="Arial" panose="020B0604020202020204" pitchFamily="34" charset="0"/>
+              </a:rPr>
+              <a:t>Robot B</a:t>
+            </a:r>
+            <a:endParaRPr lang="en-US" dirty="0"/>
+          </a:p>
+        </p:txBody>
+      </p:sp>
+      <p:sp>
+        <p:nvSpPr>
+          <p:cNvPr id="14" name="Rectangle 13">
+            <a:extLst>
+              <a:ext uri="{FF2B5EF4-FFF2-40B4-BE49-F238E27FC236}">
+                <a16:creationId xmlns:a16="http://schemas.microsoft.com/office/drawing/2014/main" id="{92D4F564-9B8A-41F2-8344-AD34196FAFEF}"/>
+              </a:ext>
+            </a:extLst>
+          </p:cNvPr>
+          <p:cNvSpPr/>
+          <p:nvPr/>
+        </p:nvSpPr>
+        <p:spPr>
+          <a:xfrm>
+            <a:off x="3322308" y="2748535"/>
+            <a:ext cx="1031051" cy="369332"/>
+          </a:xfrm>
+          <a:prstGeom prst="rect">
+            <a:avLst/>
+          </a:prstGeom>
+        </p:spPr>
+        <p:txBody>
+          <a:bodyPr wrap="none">
+            <a:spAutoFit/>
+          </a:bodyPr>
+          <a:lstStyle/>
+          <a:p>
+            <a:r>
+              <a:rPr lang="sv-SE" dirty="0">
+                <a:latin typeface="Arial" panose="020B0604020202020204" pitchFamily="34" charset="0"/>
+                <a:cs typeface="Arial" panose="020B0604020202020204" pitchFamily="34" charset="0"/>
+              </a:rPr>
+              <a:t>Robot C</a:t>
+            </a:r>
+            <a:endParaRPr lang="en-US" dirty="0"/>
+          </a:p>
+        </p:txBody>
+      </p:sp>
+      <p:sp>
+        <p:nvSpPr>
+          <p:cNvPr id="15" name="Rectangle 14">
+            <a:extLst>
+              <a:ext uri="{FF2B5EF4-FFF2-40B4-BE49-F238E27FC236}">
+                <a16:creationId xmlns:a16="http://schemas.microsoft.com/office/drawing/2014/main" id="{1116CA10-F054-4AF7-812F-2E14C3DB92A8}"/>
+              </a:ext>
+            </a:extLst>
+          </p:cNvPr>
+          <p:cNvSpPr/>
+          <p:nvPr/>
+        </p:nvSpPr>
+        <p:spPr>
+          <a:xfrm>
+            <a:off x="4581462" y="2724948"/>
+            <a:ext cx="1031051" cy="369332"/>
+          </a:xfrm>
+          <a:prstGeom prst="rect">
+            <a:avLst/>
+          </a:prstGeom>
+        </p:spPr>
+        <p:txBody>
+          <a:bodyPr wrap="none">
+            <a:spAutoFit/>
+          </a:bodyPr>
+          <a:lstStyle/>
+          <a:p>
+            <a:r>
+              <a:rPr lang="sv-SE" dirty="0">
+                <a:latin typeface="Arial" panose="020B0604020202020204" pitchFamily="34" charset="0"/>
+                <a:cs typeface="Arial" panose="020B0604020202020204" pitchFamily="34" charset="0"/>
+              </a:rPr>
+              <a:t>Robot D</a:t>
+            </a:r>
+            <a:endParaRPr lang="en-US" dirty="0"/>
+          </a:p>
+        </p:txBody>
+      </p:sp>
+      <p:sp>
+        <p:nvSpPr>
+          <p:cNvPr id="16" name="Rectangle 15">
+            <a:extLst>
+              <a:ext uri="{FF2B5EF4-FFF2-40B4-BE49-F238E27FC236}">
+                <a16:creationId xmlns:a16="http://schemas.microsoft.com/office/drawing/2014/main" id="{63714086-3485-4087-A683-F1C203CF3F3A}"/>
+              </a:ext>
+            </a:extLst>
+          </p:cNvPr>
+          <p:cNvSpPr/>
+          <p:nvPr/>
+        </p:nvSpPr>
+        <p:spPr>
+          <a:xfrm>
+            <a:off x="1301325" y="1834009"/>
+            <a:ext cx="569387" cy="369332"/>
+          </a:xfrm>
+          <a:prstGeom prst="rect">
+            <a:avLst/>
+          </a:prstGeom>
+        </p:spPr>
+        <p:txBody>
+          <a:bodyPr wrap="none">
+            <a:spAutoFit/>
+          </a:bodyPr>
+          <a:lstStyle/>
+          <a:p>
+            <a:r>
+              <a:rPr lang="sv-SE" dirty="0">
+                <a:latin typeface="Arial" panose="020B0604020202020204" pitchFamily="34" charset="0"/>
+                <a:cs typeface="Arial" panose="020B0604020202020204" pitchFamily="34" charset="0"/>
+              </a:rPr>
+              <a:t>€40</a:t>
+            </a:r>
+            <a:endParaRPr lang="en-US" dirty="0"/>
+          </a:p>
+        </p:txBody>
+      </p:sp>
+      <p:sp>
+        <p:nvSpPr>
+          <p:cNvPr id="17" name="Rectangle 16">
+            <a:extLst>
+              <a:ext uri="{FF2B5EF4-FFF2-40B4-BE49-F238E27FC236}">
+                <a16:creationId xmlns:a16="http://schemas.microsoft.com/office/drawing/2014/main" id="{A871A22D-3138-4F20-953F-81B2D34BC353}"/>
+              </a:ext>
+            </a:extLst>
+          </p:cNvPr>
+          <p:cNvSpPr/>
+          <p:nvPr/>
+        </p:nvSpPr>
+        <p:spPr>
+          <a:xfrm>
+            <a:off x="2357738" y="2238312"/>
+            <a:ext cx="569387" cy="369332"/>
+          </a:xfrm>
+          <a:prstGeom prst="rect">
+            <a:avLst/>
+          </a:prstGeom>
+        </p:spPr>
+        <p:txBody>
+          <a:bodyPr wrap="none">
+            <a:spAutoFit/>
+          </a:bodyPr>
+          <a:lstStyle/>
+          <a:p>
+            <a:r>
+              <a:rPr lang="sv-SE" dirty="0">
+                <a:latin typeface="Arial" panose="020B0604020202020204" pitchFamily="34" charset="0"/>
+                <a:cs typeface="Arial" panose="020B0604020202020204" pitchFamily="34" charset="0"/>
+              </a:rPr>
+              <a:t>€20</a:t>
+            </a:r>
+            <a:endParaRPr lang="en-US" dirty="0"/>
+          </a:p>
+        </p:txBody>
+      </p:sp>
+      <p:sp>
+        <p:nvSpPr>
+          <p:cNvPr id="18" name="Rectangle 17">
+            <a:extLst>
+              <a:ext uri="{FF2B5EF4-FFF2-40B4-BE49-F238E27FC236}">
+                <a16:creationId xmlns:a16="http://schemas.microsoft.com/office/drawing/2014/main" id="{35D06240-088C-41F7-9749-83216E384825}"/>
+              </a:ext>
+            </a:extLst>
+          </p:cNvPr>
+          <p:cNvSpPr/>
+          <p:nvPr/>
+        </p:nvSpPr>
+        <p:spPr>
+          <a:xfrm>
+            <a:off x="3549744" y="1795901"/>
+            <a:ext cx="569387" cy="369332"/>
+          </a:xfrm>
+          <a:prstGeom prst="rect">
+            <a:avLst/>
+          </a:prstGeom>
+        </p:spPr>
+        <p:txBody>
+          <a:bodyPr wrap="none">
+            <a:spAutoFit/>
+          </a:bodyPr>
+          <a:lstStyle/>
+          <a:p>
+            <a:r>
+              <a:rPr lang="sv-SE" dirty="0">
+                <a:latin typeface="Arial" panose="020B0604020202020204" pitchFamily="34" charset="0"/>
+                <a:cs typeface="Arial" panose="020B0604020202020204" pitchFamily="34" charset="0"/>
+              </a:rPr>
+              <a:t>€55</a:t>
+            </a:r>
+            <a:endParaRPr lang="en-US" dirty="0"/>
+          </a:p>
+        </p:txBody>
+      </p:sp>
+      <p:sp>
+        <p:nvSpPr>
+          <p:cNvPr id="19" name="Rectangle 18">
+            <a:extLst>
+              <a:ext uri="{FF2B5EF4-FFF2-40B4-BE49-F238E27FC236}">
+                <a16:creationId xmlns:a16="http://schemas.microsoft.com/office/drawing/2014/main" id="{507C15F6-17F8-4344-860D-324D4C1B2851}"/>
+              </a:ext>
+            </a:extLst>
+          </p:cNvPr>
+          <p:cNvSpPr/>
+          <p:nvPr/>
+        </p:nvSpPr>
+        <p:spPr>
+          <a:xfrm>
+            <a:off x="4812293" y="1769119"/>
+            <a:ext cx="569387" cy="369332"/>
+          </a:xfrm>
+          <a:prstGeom prst="rect">
+            <a:avLst/>
+          </a:prstGeom>
+        </p:spPr>
+        <p:txBody>
+          <a:bodyPr wrap="none">
+            <a:spAutoFit/>
+          </a:bodyPr>
+          <a:lstStyle/>
+          <a:p>
+            <a:r>
+              <a:rPr lang="sv-SE" dirty="0">
+                <a:latin typeface="Arial" panose="020B0604020202020204" pitchFamily="34" charset="0"/>
+                <a:cs typeface="Arial" panose="020B0604020202020204" pitchFamily="34" charset="0"/>
+              </a:rPr>
+              <a:t>€30</a:t>
+            </a:r>
+            <a:endParaRPr lang="en-US" dirty="0"/>
+          </a:p>
+        </p:txBody>
+      </p:sp>
+      <p:sp>
+        <p:nvSpPr>
+          <p:cNvPr id="20" name="Rectangle 19">
+            <a:extLst>
+              <a:ext uri="{FF2B5EF4-FFF2-40B4-BE49-F238E27FC236}">
+                <a16:creationId xmlns:a16="http://schemas.microsoft.com/office/drawing/2014/main" id="{C08A1ED6-5BE5-4CF2-BA4F-0BF592BA9433}"/>
+              </a:ext>
+            </a:extLst>
+          </p:cNvPr>
+          <p:cNvSpPr/>
+          <p:nvPr/>
+        </p:nvSpPr>
+        <p:spPr>
+          <a:xfrm>
+            <a:off x="4317861" y="4988154"/>
+            <a:ext cx="1031116" cy="369332"/>
+          </a:xfrm>
+          <a:prstGeom prst="rect">
+            <a:avLst/>
+          </a:prstGeom>
+        </p:spPr>
+        <p:txBody>
+          <a:bodyPr wrap="none">
+            <a:spAutoFit/>
+          </a:bodyPr>
+          <a:lstStyle/>
+          <a:p>
+            <a:r>
+              <a:rPr lang="sv-SE" u="sng" dirty="0">
+                <a:latin typeface="Arial" panose="020B0604020202020204" pitchFamily="34" charset="0"/>
+                <a:cs typeface="Arial" panose="020B0604020202020204" pitchFamily="34" charset="0"/>
+              </a:rPr>
+              <a:t>Group A</a:t>
+            </a:r>
+            <a:endParaRPr lang="en-US" u="sng" dirty="0"/>
+          </a:p>
+        </p:txBody>
+      </p:sp>
+      <p:sp>
+        <p:nvSpPr>
+          <p:cNvPr id="21" name="Rectangle 20">
+            <a:extLst>
+              <a:ext uri="{FF2B5EF4-FFF2-40B4-BE49-F238E27FC236}">
+                <a16:creationId xmlns:a16="http://schemas.microsoft.com/office/drawing/2014/main" id="{2CB84429-4C8B-4D28-B92A-683A872D3EF0}"/>
+              </a:ext>
+            </a:extLst>
+          </p:cNvPr>
+          <p:cNvSpPr/>
+          <p:nvPr/>
+        </p:nvSpPr>
+        <p:spPr>
+          <a:xfrm>
+            <a:off x="6099994" y="4552218"/>
+            <a:ext cx="1043876" cy="369332"/>
+          </a:xfrm>
+          <a:prstGeom prst="rect">
+            <a:avLst/>
+          </a:prstGeom>
+        </p:spPr>
+        <p:txBody>
+          <a:bodyPr wrap="none">
+            <a:spAutoFit/>
+          </a:bodyPr>
+          <a:lstStyle/>
+          <a:p>
+            <a:r>
+              <a:rPr lang="sv-SE" u="sng" dirty="0">
+                <a:latin typeface="Arial" panose="020B0604020202020204" pitchFamily="34" charset="0"/>
+                <a:cs typeface="Arial" panose="020B0604020202020204" pitchFamily="34" charset="0"/>
+              </a:rPr>
+              <a:t>Group B</a:t>
+            </a:r>
+            <a:endParaRPr lang="en-US" u="sng" dirty="0"/>
+          </a:p>
+        </p:txBody>
+      </p:sp>
+      <p:cxnSp>
+        <p:nvCxnSpPr>
+          <p:cNvPr id="23" name="Straight Arrow Connector 22">
+            <a:extLst>
+              <a:ext uri="{FF2B5EF4-FFF2-40B4-BE49-F238E27FC236}">
+                <a16:creationId xmlns:a16="http://schemas.microsoft.com/office/drawing/2014/main" id="{CF5BE959-978C-48AF-8508-DE76B7326356}"/>
+              </a:ext>
+            </a:extLst>
+          </p:cNvPr>
+          <p:cNvCxnSpPr>
+            <a:cxnSpLocks/>
+            <a:stCxn id="20" idx="0"/>
+            <a:endCxn id="13" idx="2"/>
+          </p:cNvCxnSpPr>
+          <p:nvPr/>
+        </p:nvCxnSpPr>
+        <p:spPr>
+          <a:xfrm flipH="1" flipV="1">
+            <a:off x="2640382" y="3671436"/>
+            <a:ext cx="2193037" cy="1316718"/>
+          </a:xfrm>
+          <a:prstGeom prst="straightConnector1">
+            <a:avLst/>
+          </a:prstGeom>
+          <a:ln w="38100">
+            <a:solidFill>
+              <a:schemeClr val="tx1"/>
+            </a:solidFill>
+            <a:prstDash val="dash"/>
+            <a:tailEnd type="triangle"/>
+          </a:ln>
+        </p:spPr>
+        <p:style>
+          <a:lnRef idx="1">
+            <a:schemeClr val="accent1"/>
+          </a:lnRef>
+          <a:fillRef idx="0">
+            <a:schemeClr val="accent1"/>
+          </a:fillRef>
+          <a:effectRef idx="0">
+            <a:schemeClr val="accent1"/>
+          </a:effectRef>
+          <a:fontRef idx="minor">
+            <a:schemeClr val="tx1"/>
+          </a:fontRef>
+        </p:style>
+      </p:cxnSp>
+      <p:cxnSp>
+        <p:nvCxnSpPr>
+          <p:cNvPr id="24" name="Straight Arrow Connector 23">
+            <a:extLst>
+              <a:ext uri="{FF2B5EF4-FFF2-40B4-BE49-F238E27FC236}">
+                <a16:creationId xmlns:a16="http://schemas.microsoft.com/office/drawing/2014/main" id="{EA94AA31-2348-488D-AF95-C5BD4CD8C3FC}"/>
+              </a:ext>
+            </a:extLst>
+          </p:cNvPr>
+          <p:cNvCxnSpPr>
+            <a:cxnSpLocks/>
+          </p:cNvCxnSpPr>
+          <p:nvPr/>
+        </p:nvCxnSpPr>
+        <p:spPr>
+          <a:xfrm flipH="1" flipV="1">
+            <a:off x="3920340" y="3094280"/>
+            <a:ext cx="1044946" cy="1893874"/>
+          </a:xfrm>
+          <a:prstGeom prst="straightConnector1">
+            <a:avLst/>
+          </a:prstGeom>
+          <a:ln w="38100">
+            <a:solidFill>
+              <a:schemeClr val="tx1"/>
+            </a:solidFill>
+            <a:tailEnd type="triangle"/>
+          </a:ln>
+        </p:spPr>
+        <p:style>
+          <a:lnRef idx="1">
+            <a:schemeClr val="accent1"/>
+          </a:lnRef>
+          <a:fillRef idx="0">
+            <a:schemeClr val="accent1"/>
+          </a:fillRef>
+          <a:effectRef idx="0">
+            <a:schemeClr val="accent1"/>
+          </a:effectRef>
+          <a:fontRef idx="minor">
+            <a:schemeClr val="tx1"/>
+          </a:fontRef>
+        </p:style>
+      </p:cxnSp>
+      <p:sp>
+        <p:nvSpPr>
+          <p:cNvPr id="28" name="Rectangle 27">
+            <a:extLst>
+              <a:ext uri="{FF2B5EF4-FFF2-40B4-BE49-F238E27FC236}">
+                <a16:creationId xmlns:a16="http://schemas.microsoft.com/office/drawing/2014/main" id="{FF0E0202-04C0-41BA-AD7D-C64268A08F36}"/>
+              </a:ext>
+            </a:extLst>
+          </p:cNvPr>
+          <p:cNvSpPr/>
+          <p:nvPr/>
+        </p:nvSpPr>
+        <p:spPr>
+          <a:xfrm>
+            <a:off x="3483983" y="4367552"/>
+            <a:ext cx="428322" cy="369332"/>
+          </a:xfrm>
+          <a:prstGeom prst="rect">
+            <a:avLst/>
+          </a:prstGeom>
+        </p:spPr>
+        <p:txBody>
+          <a:bodyPr wrap="none">
+            <a:spAutoFit/>
+          </a:bodyPr>
+          <a:lstStyle/>
+          <a:p>
+            <a:r>
+              <a:rPr lang="sv-SE" dirty="0">
+                <a:latin typeface="Arial" panose="020B0604020202020204" pitchFamily="34" charset="0"/>
+                <a:cs typeface="Arial" panose="020B0604020202020204" pitchFamily="34" charset="0"/>
+              </a:rPr>
+              <a:t>2x</a:t>
+            </a:r>
+            <a:endParaRPr lang="en-US" dirty="0"/>
+          </a:p>
+        </p:txBody>
+      </p:sp>
+      <p:cxnSp>
+        <p:nvCxnSpPr>
+          <p:cNvPr id="29" name="Straight Arrow Connector 28">
+            <a:extLst>
+              <a:ext uri="{FF2B5EF4-FFF2-40B4-BE49-F238E27FC236}">
+                <a16:creationId xmlns:a16="http://schemas.microsoft.com/office/drawing/2014/main" id="{AE1D563C-18F7-40C4-8C12-89E6F334705F}"/>
+              </a:ext>
+            </a:extLst>
+          </p:cNvPr>
+          <p:cNvCxnSpPr>
+            <a:cxnSpLocks/>
+          </p:cNvCxnSpPr>
+          <p:nvPr/>
+        </p:nvCxnSpPr>
+        <p:spPr>
+          <a:xfrm flipH="1" flipV="1">
+            <a:off x="3149495" y="3151369"/>
+            <a:ext cx="3455078" cy="1415561"/>
+          </a:xfrm>
+          <a:prstGeom prst="straightConnector1">
+            <a:avLst/>
+          </a:prstGeom>
+          <a:ln w="38100">
+            <a:solidFill>
+              <a:schemeClr val="tx1"/>
+            </a:solidFill>
+            <a:prstDash val="dash"/>
+            <a:tailEnd type="triangle"/>
+          </a:ln>
+        </p:spPr>
+        <p:style>
+          <a:lnRef idx="1">
+            <a:schemeClr val="accent1"/>
+          </a:lnRef>
+          <a:fillRef idx="0">
+            <a:schemeClr val="accent1"/>
+          </a:fillRef>
+          <a:effectRef idx="0">
+            <a:schemeClr val="accent1"/>
+          </a:effectRef>
+          <a:fontRef idx="minor">
+            <a:schemeClr val="tx1"/>
+          </a:fontRef>
+        </p:style>
+      </p:cxnSp>
+      <p:sp>
+        <p:nvSpPr>
+          <p:cNvPr id="30" name="Rectangle 29">
+            <a:extLst>
+              <a:ext uri="{FF2B5EF4-FFF2-40B4-BE49-F238E27FC236}">
+                <a16:creationId xmlns:a16="http://schemas.microsoft.com/office/drawing/2014/main" id="{2AB490D3-2200-47DD-88EE-2B6DB3DFE0E5}"/>
+              </a:ext>
+            </a:extLst>
+          </p:cNvPr>
+          <p:cNvSpPr/>
+          <p:nvPr/>
+        </p:nvSpPr>
+        <p:spPr>
+          <a:xfrm>
+            <a:off x="3537308" y="2200270"/>
+            <a:ext cx="589707" cy="548265"/>
+          </a:xfrm>
+          <a:prstGeom prst="rect">
+            <a:avLst/>
+          </a:prstGeom>
+          <a:noFill/>
+          <a:ln>
+            <a:solidFill>
+              <a:schemeClr val="tx1"/>
+            </a:solidFill>
+          </a:ln>
+        </p:spPr>
+        <p:style>
+          <a:lnRef idx="2">
+            <a:schemeClr val="accent1">
+              <a:shade val="50000"/>
+            </a:schemeClr>
+          </a:lnRef>
+          <a:fillRef idx="1">
+            <a:schemeClr val="accent1"/>
+          </a:fillRef>
+          <a:effectRef idx="0">
+            <a:schemeClr val="accent1"/>
+          </a:effectRef>
+          <a:fontRef idx="minor">
+            <a:schemeClr val="lt1"/>
+          </a:fontRef>
+        </p:style>
+        <p:txBody>
+          <a:bodyPr rtlCol="0" anchor="ctr"/>
+          <a:lstStyle/>
+          <a:p>
+            <a:pPr algn="ctr"/>
+            <a:endParaRPr lang="en-US"/>
+          </a:p>
+        </p:txBody>
+      </p:sp>
+      <p:sp>
+        <p:nvSpPr>
+          <p:cNvPr id="31" name="Rectangle 30">
+            <a:extLst>
+              <a:ext uri="{FF2B5EF4-FFF2-40B4-BE49-F238E27FC236}">
+                <a16:creationId xmlns:a16="http://schemas.microsoft.com/office/drawing/2014/main" id="{A5AC5AEE-9CA9-4FBA-ABF1-040C70742F85}"/>
+              </a:ext>
+            </a:extLst>
+          </p:cNvPr>
+          <p:cNvSpPr/>
+          <p:nvPr/>
+        </p:nvSpPr>
+        <p:spPr>
+          <a:xfrm>
+            <a:off x="1272965" y="2207848"/>
+            <a:ext cx="589707" cy="548265"/>
+          </a:xfrm>
+          <a:prstGeom prst="rect">
+            <a:avLst/>
+          </a:prstGeom>
+          <a:noFill/>
+          <a:ln>
+            <a:solidFill>
+              <a:schemeClr val="tx1"/>
+            </a:solidFill>
+          </a:ln>
+        </p:spPr>
+        <p:style>
+          <a:lnRef idx="2">
+            <a:schemeClr val="accent1">
+              <a:shade val="50000"/>
+            </a:schemeClr>
+          </a:lnRef>
+          <a:fillRef idx="1">
+            <a:schemeClr val="accent1"/>
+          </a:fillRef>
+          <a:effectRef idx="0">
+            <a:schemeClr val="accent1"/>
+          </a:effectRef>
+          <a:fontRef idx="minor">
+            <a:schemeClr val="lt1"/>
+          </a:fontRef>
+        </p:style>
+        <p:txBody>
+          <a:bodyPr rtlCol="0" anchor="ctr"/>
+          <a:lstStyle/>
+          <a:p>
+            <a:pPr algn="ctr"/>
+            <a:endParaRPr lang="en-US"/>
+          </a:p>
+        </p:txBody>
+      </p:sp>
+      <p:sp>
+        <p:nvSpPr>
+          <p:cNvPr id="32" name="Oval 31">
+            <a:extLst>
+              <a:ext uri="{FF2B5EF4-FFF2-40B4-BE49-F238E27FC236}">
+                <a16:creationId xmlns:a16="http://schemas.microsoft.com/office/drawing/2014/main" id="{E3D788FF-545E-49BE-812A-B835E474F58E}"/>
+              </a:ext>
+            </a:extLst>
+          </p:cNvPr>
+          <p:cNvSpPr/>
+          <p:nvPr/>
+        </p:nvSpPr>
+        <p:spPr>
+          <a:xfrm>
+            <a:off x="4782447" y="2128967"/>
+            <a:ext cx="608889" cy="595981"/>
+          </a:xfrm>
+          <a:prstGeom prst="ellipse">
+            <a:avLst/>
+          </a:prstGeom>
+          <a:noFill/>
+          <a:ln>
+            <a:solidFill>
+              <a:schemeClr val="tx1"/>
+            </a:solidFill>
+          </a:ln>
+        </p:spPr>
+        <p:style>
+          <a:lnRef idx="2">
+            <a:schemeClr val="accent1">
+              <a:shade val="50000"/>
+            </a:schemeClr>
+          </a:lnRef>
+          <a:fillRef idx="1">
+            <a:schemeClr val="accent1"/>
+          </a:fillRef>
+          <a:effectRef idx="0">
+            <a:schemeClr val="accent1"/>
+          </a:effectRef>
+          <a:fontRef idx="minor">
+            <a:schemeClr val="lt1"/>
+          </a:fontRef>
+        </p:style>
+        <p:txBody>
+          <a:bodyPr rtlCol="0" anchor="ctr"/>
+          <a:lstStyle/>
+          <a:p>
+            <a:pPr algn="ctr"/>
+            <a:endParaRPr lang="en-US"/>
+          </a:p>
+        </p:txBody>
+      </p:sp>
+      <p:sp>
+        <p:nvSpPr>
+          <p:cNvPr id="33" name="Isosceles Triangle 32">
+            <a:extLst>
+              <a:ext uri="{FF2B5EF4-FFF2-40B4-BE49-F238E27FC236}">
+                <a16:creationId xmlns:a16="http://schemas.microsoft.com/office/drawing/2014/main" id="{3293596F-27FE-47F0-B885-CC2AE68D7DCA}"/>
+              </a:ext>
+            </a:extLst>
+          </p:cNvPr>
+          <p:cNvSpPr/>
+          <p:nvPr/>
+        </p:nvSpPr>
+        <p:spPr>
+          <a:xfrm>
+            <a:off x="2315070" y="2640380"/>
+            <a:ext cx="660938" cy="584783"/>
+          </a:xfrm>
+          <a:prstGeom prst="triangle">
+            <a:avLst/>
+          </a:prstGeom>
+          <a:noFill/>
+          <a:ln>
+            <a:solidFill>
+              <a:schemeClr val="tx1"/>
+            </a:solidFill>
+          </a:ln>
+        </p:spPr>
+        <p:style>
+          <a:lnRef idx="2">
+            <a:schemeClr val="accent1">
+              <a:shade val="50000"/>
+            </a:schemeClr>
+          </a:lnRef>
+          <a:fillRef idx="1">
+            <a:schemeClr val="accent1"/>
+          </a:fillRef>
+          <a:effectRef idx="0">
+            <a:schemeClr val="accent1"/>
+          </a:effectRef>
+          <a:fontRef idx="minor">
+            <a:schemeClr val="lt1"/>
+          </a:fontRef>
+        </p:style>
+        <p:txBody>
+          <a:bodyPr rtlCol="0" anchor="ctr"/>
+          <a:lstStyle/>
+          <a:p>
+            <a:pPr algn="ctr"/>
+            <a:endParaRPr lang="en-US"/>
+          </a:p>
+        </p:txBody>
+      </p:sp>
+      <p:grpSp>
+        <p:nvGrpSpPr>
+          <p:cNvPr id="56" name="Group 55">
+            <a:extLst>
+              <a:ext uri="{FF2B5EF4-FFF2-40B4-BE49-F238E27FC236}">
+                <a16:creationId xmlns:a16="http://schemas.microsoft.com/office/drawing/2014/main" id="{375610F4-3FA6-4104-882D-717313BF7701}"/>
+              </a:ext>
+            </a:extLst>
+          </p:cNvPr>
+          <p:cNvGrpSpPr/>
+          <p:nvPr/>
+        </p:nvGrpSpPr>
+        <p:grpSpPr>
+          <a:xfrm>
+            <a:off x="6053620" y="1061760"/>
+            <a:ext cx="3088962" cy="1784050"/>
+            <a:chOff x="5986212" y="1270508"/>
+            <a:chExt cx="3088962" cy="1784050"/>
+          </a:xfrm>
+        </p:grpSpPr>
+        <p:sp>
+          <p:nvSpPr>
+            <p:cNvPr id="35" name="Rectangle 34">
+              <a:extLst>
+                <a:ext uri="{FF2B5EF4-FFF2-40B4-BE49-F238E27FC236}">
+                  <a16:creationId xmlns:a16="http://schemas.microsoft.com/office/drawing/2014/main" id="{879F8447-5CD1-4C24-A2B0-C99C2D7F227E}"/>
+                </a:ext>
+              </a:extLst>
+            </p:cNvPr>
+            <p:cNvSpPr/>
+            <p:nvPr/>
+          </p:nvSpPr>
+          <p:spPr>
+            <a:xfrm>
+              <a:off x="6004340" y="1270508"/>
+              <a:ext cx="3070834" cy="1784050"/>
+            </a:xfrm>
+            <a:prstGeom prst="rect">
+              <a:avLst/>
+            </a:prstGeom>
+            <a:solidFill>
+              <a:schemeClr val="bg1">
+                <a:lumMod val="85000"/>
+              </a:schemeClr>
+            </a:solidFill>
+            <a:ln>
+              <a:noFill/>
+            </a:ln>
+          </p:spPr>
+          <p:style>
+            <a:lnRef idx="2">
+              <a:schemeClr val="accent1">
+                <a:shade val="50000"/>
+              </a:schemeClr>
+            </a:lnRef>
+            <a:fillRef idx="1">
+              <a:schemeClr val="accent1"/>
+            </a:fillRef>
+            <a:effectRef idx="0">
+              <a:schemeClr val="accent1"/>
+            </a:effectRef>
+            <a:fontRef idx="minor">
+              <a:schemeClr val="lt1"/>
+            </a:fontRef>
+          </p:style>
+          <p:txBody>
+            <a:bodyPr rtlCol="0" anchor="ctr"/>
+            <a:lstStyle/>
+            <a:p>
+              <a:pPr algn="ctr"/>
+              <a:endParaRPr lang="en-US"/>
+            </a:p>
+          </p:txBody>
+        </p:sp>
+        <p:sp>
+          <p:nvSpPr>
+            <p:cNvPr id="36" name="Rectangle 35">
+              <a:extLst>
+                <a:ext uri="{FF2B5EF4-FFF2-40B4-BE49-F238E27FC236}">
+                  <a16:creationId xmlns:a16="http://schemas.microsoft.com/office/drawing/2014/main" id="{5F4A4132-62A0-4359-A556-90169DF61140}"/>
+                </a:ext>
+              </a:extLst>
+            </p:cNvPr>
+            <p:cNvSpPr/>
+            <p:nvPr/>
+          </p:nvSpPr>
+          <p:spPr>
+            <a:xfrm>
+              <a:off x="6345810" y="1729262"/>
+              <a:ext cx="589707" cy="548265"/>
+            </a:xfrm>
+            <a:prstGeom prst="rect">
+              <a:avLst/>
+            </a:prstGeom>
+            <a:noFill/>
+            <a:ln>
+              <a:solidFill>
+                <a:schemeClr val="tx1"/>
+              </a:solidFill>
+            </a:ln>
+          </p:spPr>
+          <p:style>
+            <a:lnRef idx="2">
+              <a:schemeClr val="accent1">
+                <a:shade val="50000"/>
+              </a:schemeClr>
+            </a:lnRef>
+            <a:fillRef idx="1">
+              <a:schemeClr val="accent1"/>
+            </a:fillRef>
+            <a:effectRef idx="0">
+              <a:schemeClr val="accent1"/>
+            </a:effectRef>
+            <a:fontRef idx="minor">
+              <a:schemeClr val="lt1"/>
+            </a:fontRef>
+          </p:style>
+          <p:txBody>
+            <a:bodyPr rtlCol="0" anchor="ctr"/>
+            <a:lstStyle/>
+            <a:p>
+              <a:pPr algn="ctr"/>
+              <a:endParaRPr lang="en-US"/>
+            </a:p>
+          </p:txBody>
+        </p:sp>
+        <p:sp>
+          <p:nvSpPr>
+            <p:cNvPr id="37" name="Rectangle 36">
+              <a:extLst>
+                <a:ext uri="{FF2B5EF4-FFF2-40B4-BE49-F238E27FC236}">
+                  <a16:creationId xmlns:a16="http://schemas.microsoft.com/office/drawing/2014/main" id="{4B101870-D617-4B38-8C70-2394252B3323}"/>
+                </a:ext>
+              </a:extLst>
+            </p:cNvPr>
+            <p:cNvSpPr/>
+            <p:nvPr/>
+          </p:nvSpPr>
+          <p:spPr>
+            <a:xfrm>
+              <a:off x="5986212" y="2284478"/>
+              <a:ext cx="1313180" cy="646331"/>
+            </a:xfrm>
+            <a:prstGeom prst="rect">
+              <a:avLst/>
+            </a:prstGeom>
+          </p:spPr>
+          <p:txBody>
+            <a:bodyPr wrap="none">
+              <a:spAutoFit/>
+            </a:bodyPr>
+            <a:lstStyle/>
+            <a:p>
+              <a:pPr algn="ctr"/>
+              <a:r>
+                <a:rPr lang="sv-SE" dirty="0">
+                  <a:latin typeface="Arial" panose="020B0604020202020204" pitchFamily="34" charset="0"/>
+                  <a:cs typeface="Arial" panose="020B0604020202020204" pitchFamily="34" charset="0"/>
+                </a:rPr>
+                <a:t>Basic</a:t>
+              </a:r>
+            </a:p>
+            <a:p>
+              <a:pPr algn="ctr"/>
+              <a:r>
+                <a:rPr lang="sv-SE" dirty="0" err="1">
+                  <a:latin typeface="Arial" panose="020B0604020202020204" pitchFamily="34" charset="0"/>
+                  <a:cs typeface="Arial" panose="020B0604020202020204" pitchFamily="34" charset="0"/>
+                </a:rPr>
+                <a:t>Leader</a:t>
+              </a:r>
+              <a:r>
+                <a:rPr lang="sv-SE" dirty="0">
+                  <a:latin typeface="Arial" panose="020B0604020202020204" pitchFamily="34" charset="0"/>
+                  <a:cs typeface="Arial" panose="020B0604020202020204" pitchFamily="34" charset="0"/>
+                </a:rPr>
+                <a:t> Bot</a:t>
+              </a:r>
+              <a:endParaRPr lang="en-US" dirty="0"/>
+            </a:p>
+          </p:txBody>
+        </p:sp>
+        <p:sp>
+          <p:nvSpPr>
+            <p:cNvPr id="38" name="Rectangle 37">
+              <a:extLst>
+                <a:ext uri="{FF2B5EF4-FFF2-40B4-BE49-F238E27FC236}">
+                  <a16:creationId xmlns:a16="http://schemas.microsoft.com/office/drawing/2014/main" id="{C917C82C-58B7-4AA7-A94D-98D12F824498}"/>
+                </a:ext>
+              </a:extLst>
+            </p:cNvPr>
+            <p:cNvSpPr/>
+            <p:nvPr/>
+          </p:nvSpPr>
+          <p:spPr>
+            <a:xfrm>
+              <a:off x="6354582" y="1368036"/>
+              <a:ext cx="569387" cy="369332"/>
+            </a:xfrm>
+            <a:prstGeom prst="rect">
+              <a:avLst/>
+            </a:prstGeom>
+          </p:spPr>
+          <p:txBody>
+            <a:bodyPr wrap="none">
+              <a:spAutoFit/>
+            </a:bodyPr>
+            <a:lstStyle/>
+            <a:p>
+              <a:r>
+                <a:rPr lang="sv-SE" dirty="0">
+                  <a:latin typeface="Arial" panose="020B0604020202020204" pitchFamily="34" charset="0"/>
+                  <a:cs typeface="Arial" panose="020B0604020202020204" pitchFamily="34" charset="0"/>
+                </a:rPr>
+                <a:t>€20</a:t>
+              </a:r>
+              <a:endParaRPr lang="en-US" dirty="0"/>
+            </a:p>
+          </p:txBody>
+        </p:sp>
+        <p:sp>
+          <p:nvSpPr>
+            <p:cNvPr id="41" name="Rectangle 40">
+              <a:extLst>
+                <a:ext uri="{FF2B5EF4-FFF2-40B4-BE49-F238E27FC236}">
+                  <a16:creationId xmlns:a16="http://schemas.microsoft.com/office/drawing/2014/main" id="{C96D5A3A-401E-4360-A926-9ADE459BBEF2}"/>
+                </a:ext>
+              </a:extLst>
+            </p:cNvPr>
+            <p:cNvSpPr/>
+            <p:nvPr/>
+          </p:nvSpPr>
+          <p:spPr>
+            <a:xfrm>
+              <a:off x="7314746" y="2284478"/>
+              <a:ext cx="748923" cy="646331"/>
+            </a:xfrm>
+            <a:prstGeom prst="rect">
+              <a:avLst/>
+            </a:prstGeom>
+          </p:spPr>
+          <p:txBody>
+            <a:bodyPr wrap="none">
+              <a:spAutoFit/>
+            </a:bodyPr>
+            <a:lstStyle/>
+            <a:p>
+              <a:pPr algn="ctr"/>
+              <a:r>
+                <a:rPr lang="sv-SE" dirty="0">
+                  <a:latin typeface="Arial" panose="020B0604020202020204" pitchFamily="34" charset="0"/>
+                  <a:cs typeface="Arial" panose="020B0604020202020204" pitchFamily="34" charset="0"/>
+                </a:rPr>
+                <a:t>Basic</a:t>
+              </a:r>
+            </a:p>
+            <a:p>
+              <a:pPr algn="ctr"/>
+              <a:r>
+                <a:rPr lang="sv-SE" dirty="0">
+                  <a:latin typeface="Arial" panose="020B0604020202020204" pitchFamily="34" charset="0"/>
+                  <a:cs typeface="Arial" panose="020B0604020202020204" pitchFamily="34" charset="0"/>
+                </a:rPr>
+                <a:t>Bot</a:t>
+              </a:r>
+              <a:endParaRPr lang="en-US" dirty="0"/>
+            </a:p>
+          </p:txBody>
+        </p:sp>
+        <p:sp>
+          <p:nvSpPr>
+            <p:cNvPr id="42" name="Rectangle 41">
+              <a:extLst>
+                <a:ext uri="{FF2B5EF4-FFF2-40B4-BE49-F238E27FC236}">
+                  <a16:creationId xmlns:a16="http://schemas.microsoft.com/office/drawing/2014/main" id="{2190B5B3-6D2B-4506-B8FE-FD7E6CB3E43D}"/>
+                </a:ext>
+              </a:extLst>
+            </p:cNvPr>
+            <p:cNvSpPr/>
+            <p:nvPr/>
+          </p:nvSpPr>
+          <p:spPr>
+            <a:xfrm>
+              <a:off x="7400988" y="1368036"/>
+              <a:ext cx="569387" cy="369332"/>
+            </a:xfrm>
+            <a:prstGeom prst="rect">
+              <a:avLst/>
+            </a:prstGeom>
+          </p:spPr>
+          <p:txBody>
+            <a:bodyPr wrap="none">
+              <a:spAutoFit/>
+            </a:bodyPr>
+            <a:lstStyle/>
+            <a:p>
+              <a:r>
+                <a:rPr lang="sv-SE" dirty="0">
+                  <a:latin typeface="Arial" panose="020B0604020202020204" pitchFamily="34" charset="0"/>
+                  <a:cs typeface="Arial" panose="020B0604020202020204" pitchFamily="34" charset="0"/>
+                </a:rPr>
+                <a:t>€15</a:t>
+              </a:r>
+              <a:endParaRPr lang="en-US" dirty="0"/>
+            </a:p>
+          </p:txBody>
+        </p:sp>
+        <p:sp>
+          <p:nvSpPr>
+            <p:cNvPr id="43" name="Oval 42">
+              <a:extLst>
+                <a:ext uri="{FF2B5EF4-FFF2-40B4-BE49-F238E27FC236}">
+                  <a16:creationId xmlns:a16="http://schemas.microsoft.com/office/drawing/2014/main" id="{4D266B7E-018C-46ED-8D35-52F9E5B7E141}"/>
+                </a:ext>
+              </a:extLst>
+            </p:cNvPr>
+            <p:cNvSpPr/>
+            <p:nvPr/>
+          </p:nvSpPr>
+          <p:spPr>
+            <a:xfrm>
+              <a:off x="7381236" y="1723337"/>
+              <a:ext cx="608889" cy="595981"/>
+            </a:xfrm>
+            <a:prstGeom prst="ellipse">
+              <a:avLst/>
+            </a:prstGeom>
+            <a:noFill/>
+            <a:ln>
+              <a:solidFill>
+                <a:schemeClr val="tx1"/>
+              </a:solidFill>
+            </a:ln>
+          </p:spPr>
+          <p:style>
+            <a:lnRef idx="2">
+              <a:schemeClr val="accent1">
+                <a:shade val="50000"/>
+              </a:schemeClr>
+            </a:lnRef>
+            <a:fillRef idx="1">
+              <a:schemeClr val="accent1"/>
+            </a:fillRef>
+            <a:effectRef idx="0">
+              <a:schemeClr val="accent1"/>
+            </a:effectRef>
+            <a:fontRef idx="minor">
+              <a:schemeClr val="lt1"/>
+            </a:fontRef>
+          </p:style>
+          <p:txBody>
+            <a:bodyPr rtlCol="0" anchor="ctr"/>
+            <a:lstStyle/>
+            <a:p>
+              <a:pPr algn="ctr"/>
+              <a:endParaRPr lang="en-US"/>
+            </a:p>
+          </p:txBody>
+        </p:sp>
+        <p:sp>
+          <p:nvSpPr>
+            <p:cNvPr id="44" name="Rectangle 43">
+              <a:extLst>
+                <a:ext uri="{FF2B5EF4-FFF2-40B4-BE49-F238E27FC236}">
+                  <a16:creationId xmlns:a16="http://schemas.microsoft.com/office/drawing/2014/main" id="{7EE4F98B-E7AC-475C-9644-7DFFA759FB0B}"/>
+                </a:ext>
+              </a:extLst>
+            </p:cNvPr>
+            <p:cNvSpPr/>
+            <p:nvPr/>
+          </p:nvSpPr>
+          <p:spPr>
+            <a:xfrm>
+              <a:off x="8214104" y="2292906"/>
+              <a:ext cx="748923" cy="646331"/>
+            </a:xfrm>
+            <a:prstGeom prst="rect">
+              <a:avLst/>
+            </a:prstGeom>
+          </p:spPr>
+          <p:txBody>
+            <a:bodyPr wrap="none">
+              <a:spAutoFit/>
+            </a:bodyPr>
+            <a:lstStyle/>
+            <a:p>
+              <a:pPr algn="ctr"/>
+              <a:r>
+                <a:rPr lang="sv-SE" dirty="0">
+                  <a:latin typeface="Arial" panose="020B0604020202020204" pitchFamily="34" charset="0"/>
+                  <a:cs typeface="Arial" panose="020B0604020202020204" pitchFamily="34" charset="0"/>
+                </a:rPr>
+                <a:t>Basic</a:t>
+              </a:r>
+            </a:p>
+            <a:p>
+              <a:pPr algn="ctr"/>
+              <a:r>
+                <a:rPr lang="sv-SE" dirty="0">
+                  <a:latin typeface="Arial" panose="020B0604020202020204" pitchFamily="34" charset="0"/>
+                  <a:cs typeface="Arial" panose="020B0604020202020204" pitchFamily="34" charset="0"/>
+                </a:rPr>
+                <a:t>Bot</a:t>
+              </a:r>
+              <a:endParaRPr lang="en-US" dirty="0"/>
+            </a:p>
+          </p:txBody>
+        </p:sp>
+        <p:sp>
+          <p:nvSpPr>
+            <p:cNvPr id="45" name="Rectangle 44">
+              <a:extLst>
+                <a:ext uri="{FF2B5EF4-FFF2-40B4-BE49-F238E27FC236}">
+                  <a16:creationId xmlns:a16="http://schemas.microsoft.com/office/drawing/2014/main" id="{3317DF71-E5C0-4D1B-9FF7-14D271D9E7DA}"/>
+                </a:ext>
+              </a:extLst>
+            </p:cNvPr>
+            <p:cNvSpPr/>
+            <p:nvPr/>
+          </p:nvSpPr>
+          <p:spPr>
+            <a:xfrm>
+              <a:off x="8300346" y="1376464"/>
+              <a:ext cx="569387" cy="369332"/>
+            </a:xfrm>
+            <a:prstGeom prst="rect">
+              <a:avLst/>
+            </a:prstGeom>
+          </p:spPr>
+          <p:txBody>
+            <a:bodyPr wrap="none">
+              <a:spAutoFit/>
+            </a:bodyPr>
+            <a:lstStyle/>
+            <a:p>
+              <a:r>
+                <a:rPr lang="sv-SE" dirty="0">
+                  <a:latin typeface="Arial" panose="020B0604020202020204" pitchFamily="34" charset="0"/>
+                  <a:cs typeface="Arial" panose="020B0604020202020204" pitchFamily="34" charset="0"/>
+                </a:rPr>
+                <a:t>€10</a:t>
+              </a:r>
+              <a:endParaRPr lang="en-US" dirty="0"/>
+            </a:p>
+          </p:txBody>
+        </p:sp>
+        <p:sp>
+          <p:nvSpPr>
+            <p:cNvPr id="47" name="Isosceles Triangle 46">
+              <a:extLst>
+                <a:ext uri="{FF2B5EF4-FFF2-40B4-BE49-F238E27FC236}">
+                  <a16:creationId xmlns:a16="http://schemas.microsoft.com/office/drawing/2014/main" id="{365D57FF-0831-4183-8DC8-946B7A8F2BC8}"/>
+                </a:ext>
+              </a:extLst>
+            </p:cNvPr>
+            <p:cNvSpPr/>
+            <p:nvPr/>
+          </p:nvSpPr>
+          <p:spPr>
+            <a:xfrm>
+              <a:off x="8272660" y="1728935"/>
+              <a:ext cx="660938" cy="584783"/>
+            </a:xfrm>
+            <a:prstGeom prst="triangle">
+              <a:avLst/>
+            </a:prstGeom>
+            <a:noFill/>
+            <a:ln>
+              <a:solidFill>
+                <a:schemeClr val="tx1"/>
+              </a:solidFill>
+            </a:ln>
+          </p:spPr>
+          <p:style>
+            <a:lnRef idx="2">
+              <a:schemeClr val="accent1">
+                <a:shade val="50000"/>
+              </a:schemeClr>
+            </a:lnRef>
+            <a:fillRef idx="1">
+              <a:schemeClr val="accent1"/>
+            </a:fillRef>
+            <a:effectRef idx="0">
+              <a:schemeClr val="accent1"/>
+            </a:effectRef>
+            <a:fontRef idx="minor">
+              <a:schemeClr val="lt1"/>
+            </a:fontRef>
+          </p:style>
+          <p:txBody>
+            <a:bodyPr rtlCol="0" anchor="ctr"/>
+            <a:lstStyle/>
+            <a:p>
+              <a:pPr algn="ctr"/>
+              <a:endParaRPr lang="en-US"/>
+            </a:p>
+          </p:txBody>
+        </p:sp>
+      </p:grpSp>
+      <p:sp>
+        <p:nvSpPr>
+          <p:cNvPr id="48" name="Rectangle 47">
+            <a:extLst>
+              <a:ext uri="{FF2B5EF4-FFF2-40B4-BE49-F238E27FC236}">
+                <a16:creationId xmlns:a16="http://schemas.microsoft.com/office/drawing/2014/main" id="{F5359955-D619-4358-950D-11FFC7F3CF9F}"/>
+              </a:ext>
+            </a:extLst>
+          </p:cNvPr>
+          <p:cNvSpPr/>
+          <p:nvPr/>
+        </p:nvSpPr>
+        <p:spPr>
+          <a:xfrm>
+            <a:off x="8469079" y="4150535"/>
+            <a:ext cx="589707" cy="548265"/>
+          </a:xfrm>
+          <a:prstGeom prst="rect">
+            <a:avLst/>
+          </a:prstGeom>
+          <a:noFill/>
+          <a:ln>
+            <a:solidFill>
+              <a:schemeClr val="tx1"/>
+            </a:solidFill>
+          </a:ln>
+        </p:spPr>
+        <p:style>
+          <a:lnRef idx="2">
+            <a:schemeClr val="accent1">
+              <a:shade val="50000"/>
+            </a:schemeClr>
+          </a:lnRef>
+          <a:fillRef idx="1">
+            <a:schemeClr val="accent1"/>
+          </a:fillRef>
+          <a:effectRef idx="0">
+            <a:schemeClr val="accent1"/>
+          </a:effectRef>
+          <a:fontRef idx="minor">
+            <a:schemeClr val="lt1"/>
+          </a:fontRef>
+        </p:style>
+        <p:txBody>
+          <a:bodyPr rtlCol="0" anchor="ctr"/>
+          <a:lstStyle/>
+          <a:p>
+            <a:pPr algn="ctr"/>
+            <a:endParaRPr lang="en-US"/>
+          </a:p>
+        </p:txBody>
+      </p:sp>
+      <p:sp>
+        <p:nvSpPr>
+          <p:cNvPr id="49" name="Oval 48">
+            <a:extLst>
+              <a:ext uri="{FF2B5EF4-FFF2-40B4-BE49-F238E27FC236}">
+                <a16:creationId xmlns:a16="http://schemas.microsoft.com/office/drawing/2014/main" id="{C897382F-DB40-4D09-A46F-D78D8100EC22}"/>
+              </a:ext>
+            </a:extLst>
+          </p:cNvPr>
+          <p:cNvSpPr/>
+          <p:nvPr/>
+        </p:nvSpPr>
+        <p:spPr>
+          <a:xfrm>
+            <a:off x="8459487" y="4890689"/>
+            <a:ext cx="608889" cy="595981"/>
+          </a:xfrm>
+          <a:prstGeom prst="ellipse">
+            <a:avLst/>
+          </a:prstGeom>
+          <a:noFill/>
+          <a:ln>
+            <a:solidFill>
+              <a:schemeClr val="tx1"/>
+            </a:solidFill>
+          </a:ln>
+        </p:spPr>
+        <p:style>
+          <a:lnRef idx="2">
+            <a:schemeClr val="accent1">
+              <a:shade val="50000"/>
+            </a:schemeClr>
+          </a:lnRef>
+          <a:fillRef idx="1">
+            <a:schemeClr val="accent1"/>
+          </a:fillRef>
+          <a:effectRef idx="0">
+            <a:schemeClr val="accent1"/>
+          </a:effectRef>
+          <a:fontRef idx="minor">
+            <a:schemeClr val="lt1"/>
+          </a:fontRef>
+        </p:style>
+        <p:txBody>
+          <a:bodyPr rtlCol="0" anchor="ctr"/>
+          <a:lstStyle/>
+          <a:p>
+            <a:pPr algn="ctr"/>
+            <a:endParaRPr lang="en-US"/>
+          </a:p>
+        </p:txBody>
+      </p:sp>
+      <p:sp>
+        <p:nvSpPr>
+          <p:cNvPr id="50" name="Isosceles Triangle 49">
+            <a:extLst>
+              <a:ext uri="{FF2B5EF4-FFF2-40B4-BE49-F238E27FC236}">
+                <a16:creationId xmlns:a16="http://schemas.microsoft.com/office/drawing/2014/main" id="{A701C5C9-AEA9-4193-9E85-0AB493C0BE10}"/>
+              </a:ext>
+            </a:extLst>
+          </p:cNvPr>
+          <p:cNvSpPr/>
+          <p:nvPr/>
+        </p:nvSpPr>
+        <p:spPr>
+          <a:xfrm>
+            <a:off x="8433424" y="5678559"/>
+            <a:ext cx="660938" cy="584783"/>
+          </a:xfrm>
+          <a:prstGeom prst="triangle">
+            <a:avLst/>
+          </a:prstGeom>
+          <a:noFill/>
+          <a:ln>
+            <a:solidFill>
+              <a:schemeClr val="tx1"/>
+            </a:solidFill>
+          </a:ln>
+        </p:spPr>
+        <p:style>
+          <a:lnRef idx="2">
+            <a:schemeClr val="accent1">
+              <a:shade val="50000"/>
+            </a:schemeClr>
+          </a:lnRef>
+          <a:fillRef idx="1">
+            <a:schemeClr val="accent1"/>
+          </a:fillRef>
+          <a:effectRef idx="0">
+            <a:schemeClr val="accent1"/>
+          </a:effectRef>
+          <a:fontRef idx="minor">
+            <a:schemeClr val="lt1"/>
+          </a:fontRef>
+        </p:style>
+        <p:txBody>
+          <a:bodyPr rtlCol="0" anchor="ctr"/>
+          <a:lstStyle/>
+          <a:p>
+            <a:pPr algn="ctr"/>
+            <a:endParaRPr lang="en-US"/>
+          </a:p>
+        </p:txBody>
+      </p:sp>
+      <p:sp>
+        <p:nvSpPr>
+          <p:cNvPr id="51" name="Rectangle 50">
+            <a:extLst>
+              <a:ext uri="{FF2B5EF4-FFF2-40B4-BE49-F238E27FC236}">
+                <a16:creationId xmlns:a16="http://schemas.microsoft.com/office/drawing/2014/main" id="{0E76F026-2452-4896-A572-F7CE53C174A2}"/>
+              </a:ext>
+            </a:extLst>
+          </p:cNvPr>
+          <p:cNvSpPr/>
+          <p:nvPr/>
+        </p:nvSpPr>
+        <p:spPr>
+          <a:xfrm>
+            <a:off x="9148720" y="4236196"/>
+            <a:ext cx="1492716" cy="369332"/>
+          </a:xfrm>
+          <a:prstGeom prst="rect">
+            <a:avLst/>
+          </a:prstGeom>
+        </p:spPr>
+        <p:txBody>
+          <a:bodyPr wrap="none">
+            <a:spAutoFit/>
+          </a:bodyPr>
+          <a:lstStyle/>
+          <a:p>
+            <a:r>
+              <a:rPr lang="sv-SE" dirty="0" err="1">
+                <a:latin typeface="Arial" panose="020B0604020202020204" pitchFamily="34" charset="0"/>
+                <a:cs typeface="Arial" panose="020B0604020202020204" pitchFamily="34" charset="0"/>
+              </a:rPr>
+              <a:t>Leader</a:t>
+            </a:r>
+            <a:r>
+              <a:rPr lang="sv-SE" dirty="0">
+                <a:latin typeface="Arial" panose="020B0604020202020204" pitchFamily="34" charset="0"/>
+                <a:cs typeface="Arial" panose="020B0604020202020204" pitchFamily="34" charset="0"/>
+              </a:rPr>
+              <a:t> robot</a:t>
+            </a:r>
+            <a:endParaRPr lang="en-US" dirty="0"/>
+          </a:p>
+        </p:txBody>
+      </p:sp>
+      <p:sp>
+        <p:nvSpPr>
+          <p:cNvPr id="53" name="Rectangle 52">
+            <a:extLst>
+              <a:ext uri="{FF2B5EF4-FFF2-40B4-BE49-F238E27FC236}">
+                <a16:creationId xmlns:a16="http://schemas.microsoft.com/office/drawing/2014/main" id="{D5448F18-C362-4F8D-BDE9-67585A9F1232}"/>
+              </a:ext>
+            </a:extLst>
+          </p:cNvPr>
+          <p:cNvSpPr/>
+          <p:nvPr/>
+        </p:nvSpPr>
+        <p:spPr>
+          <a:xfrm>
+            <a:off x="9149184" y="5004013"/>
+            <a:ext cx="1518364" cy="369332"/>
+          </a:xfrm>
+          <a:prstGeom prst="rect">
+            <a:avLst/>
+          </a:prstGeom>
+        </p:spPr>
+        <p:txBody>
+          <a:bodyPr wrap="none">
+            <a:spAutoFit/>
+          </a:bodyPr>
+          <a:lstStyle/>
+          <a:p>
+            <a:r>
+              <a:rPr lang="sv-SE" dirty="0">
+                <a:latin typeface="Arial" panose="020B0604020202020204" pitchFamily="34" charset="0"/>
+                <a:cs typeface="Arial" panose="020B0604020202020204" pitchFamily="34" charset="0"/>
+              </a:rPr>
+              <a:t>Normal robot</a:t>
+            </a:r>
+            <a:endParaRPr lang="en-US" dirty="0"/>
+          </a:p>
+        </p:txBody>
+      </p:sp>
+      <p:sp>
+        <p:nvSpPr>
+          <p:cNvPr id="54" name="Rectangle 53">
+            <a:extLst>
+              <a:ext uri="{FF2B5EF4-FFF2-40B4-BE49-F238E27FC236}">
+                <a16:creationId xmlns:a16="http://schemas.microsoft.com/office/drawing/2014/main" id="{CCB4F67D-B10C-40C9-BD04-30237B979029}"/>
+              </a:ext>
+            </a:extLst>
+          </p:cNvPr>
+          <p:cNvSpPr/>
+          <p:nvPr/>
+        </p:nvSpPr>
+        <p:spPr>
+          <a:xfrm>
+            <a:off x="9142524" y="5786284"/>
+            <a:ext cx="736099" cy="369332"/>
+          </a:xfrm>
+          <a:prstGeom prst="rect">
+            <a:avLst/>
+          </a:prstGeom>
+        </p:spPr>
+        <p:txBody>
+          <a:bodyPr wrap="none">
+            <a:spAutoFit/>
+          </a:bodyPr>
+          <a:lstStyle/>
+          <a:p>
+            <a:r>
+              <a:rPr lang="sv-SE" dirty="0" err="1">
+                <a:latin typeface="Arial" panose="020B0604020202020204" pitchFamily="34" charset="0"/>
+                <a:cs typeface="Arial" panose="020B0604020202020204" pitchFamily="34" charset="0"/>
+              </a:rPr>
+              <a:t>Droid</a:t>
+            </a:r>
+            <a:endParaRPr lang="en-US" dirty="0"/>
+          </a:p>
+        </p:txBody>
+      </p:sp>
+      <p:sp>
+        <p:nvSpPr>
+          <p:cNvPr id="55" name="Rectangle 54">
+            <a:extLst>
+              <a:ext uri="{FF2B5EF4-FFF2-40B4-BE49-F238E27FC236}">
+                <a16:creationId xmlns:a16="http://schemas.microsoft.com/office/drawing/2014/main" id="{9BE72583-89CE-4A5E-BE1B-80DC1EEDC4BD}"/>
+              </a:ext>
+            </a:extLst>
+          </p:cNvPr>
+          <p:cNvSpPr/>
+          <p:nvPr/>
+        </p:nvSpPr>
+        <p:spPr>
+          <a:xfrm>
+            <a:off x="8298406" y="4014138"/>
+            <a:ext cx="2369142" cy="2399071"/>
+          </a:xfrm>
+          <a:prstGeom prst="rect">
+            <a:avLst/>
+          </a:prstGeom>
+          <a:noFill/>
+          <a:ln w="38100">
+            <a:solidFill>
+              <a:schemeClr val="tx1"/>
+            </a:solidFill>
+          </a:ln>
+        </p:spPr>
+        <p:style>
+          <a:lnRef idx="2">
+            <a:schemeClr val="accent1">
+              <a:shade val="50000"/>
+            </a:schemeClr>
+          </a:lnRef>
+          <a:fillRef idx="1">
+            <a:schemeClr val="accent1"/>
+          </a:fillRef>
+          <a:effectRef idx="0">
+            <a:schemeClr val="accent1"/>
+          </a:effectRef>
+          <a:fontRef idx="minor">
+            <a:schemeClr val="lt1"/>
+          </a:fontRef>
+        </p:style>
+        <p:txBody>
+          <a:bodyPr rtlCol="0" anchor="ctr"/>
+          <a:lstStyle/>
+          <a:p>
+            <a:pPr algn="ctr"/>
+            <a:endParaRPr lang="en-US"/>
+          </a:p>
+        </p:txBody>
+      </p:sp>
+      <p:sp>
+        <p:nvSpPr>
+          <p:cNvPr id="58" name="Rectangle 57">
+            <a:extLst>
+              <a:ext uri="{FF2B5EF4-FFF2-40B4-BE49-F238E27FC236}">
+                <a16:creationId xmlns:a16="http://schemas.microsoft.com/office/drawing/2014/main" id="{008A882D-E05D-4360-9FE0-EAC6BFDC9DC1}"/>
+              </a:ext>
+            </a:extLst>
+          </p:cNvPr>
+          <p:cNvSpPr/>
+          <p:nvPr/>
+        </p:nvSpPr>
+        <p:spPr>
+          <a:xfrm>
+            <a:off x="4317861" y="5282278"/>
+            <a:ext cx="1338828" cy="923330"/>
+          </a:xfrm>
+          <a:prstGeom prst="rect">
+            <a:avLst/>
+          </a:prstGeom>
+        </p:spPr>
+        <p:txBody>
+          <a:bodyPr wrap="none">
+            <a:spAutoFit/>
+          </a:bodyPr>
+          <a:lstStyle/>
+          <a:p>
+            <a:r>
+              <a:rPr lang="sv-SE" dirty="0">
+                <a:latin typeface="Arial" panose="020B0604020202020204" pitchFamily="34" charset="0"/>
+                <a:cs typeface="Arial" panose="020B0604020202020204" pitchFamily="34" charset="0"/>
+              </a:rPr>
+              <a:t>Robot D</a:t>
+            </a:r>
+          </a:p>
+          <a:p>
+            <a:r>
+              <a:rPr lang="sv-SE" dirty="0">
+                <a:latin typeface="Arial" panose="020B0604020202020204" pitchFamily="34" charset="0"/>
+                <a:cs typeface="Arial" panose="020B0604020202020204" pitchFamily="34" charset="0"/>
+              </a:rPr>
+              <a:t>2x Robot B</a:t>
+            </a:r>
+          </a:p>
+          <a:p>
+            <a:pPr algn="r"/>
+            <a:r>
+              <a:rPr lang="sv-SE" dirty="0">
+                <a:latin typeface="Arial" panose="020B0604020202020204" pitchFamily="34" charset="0"/>
+                <a:cs typeface="Arial" panose="020B0604020202020204" pitchFamily="34" charset="0"/>
+              </a:rPr>
+              <a:t>= €95</a:t>
+            </a:r>
+            <a:endParaRPr lang="en-US" dirty="0"/>
+          </a:p>
+        </p:txBody>
+      </p:sp>
+      <p:sp>
+        <p:nvSpPr>
+          <p:cNvPr id="59" name="Rectangle 58">
+            <a:extLst>
+              <a:ext uri="{FF2B5EF4-FFF2-40B4-BE49-F238E27FC236}">
+                <a16:creationId xmlns:a16="http://schemas.microsoft.com/office/drawing/2014/main" id="{056EDE35-63CE-478C-8ED2-7E7F75128045}"/>
+              </a:ext>
+            </a:extLst>
+          </p:cNvPr>
+          <p:cNvSpPr/>
+          <p:nvPr/>
+        </p:nvSpPr>
+        <p:spPr>
+          <a:xfrm>
+            <a:off x="6119822" y="4831274"/>
+            <a:ext cx="1959191" cy="1200329"/>
+          </a:xfrm>
+          <a:prstGeom prst="rect">
+            <a:avLst/>
+          </a:prstGeom>
+        </p:spPr>
+        <p:txBody>
+          <a:bodyPr wrap="none">
+            <a:spAutoFit/>
+          </a:bodyPr>
+          <a:lstStyle/>
+          <a:p>
+            <a:r>
+              <a:rPr lang="sv-SE" dirty="0">
+                <a:latin typeface="Arial" panose="020B0604020202020204" pitchFamily="34" charset="0"/>
+                <a:cs typeface="Arial" panose="020B0604020202020204" pitchFamily="34" charset="0"/>
+              </a:rPr>
+              <a:t>Basic </a:t>
+            </a:r>
+            <a:r>
+              <a:rPr lang="sv-SE" dirty="0" err="1">
+                <a:latin typeface="Arial" panose="020B0604020202020204" pitchFamily="34" charset="0"/>
+                <a:cs typeface="Arial" panose="020B0604020202020204" pitchFamily="34" charset="0"/>
+              </a:rPr>
+              <a:t>Leader</a:t>
+            </a:r>
+            <a:r>
+              <a:rPr lang="sv-SE" dirty="0">
+                <a:latin typeface="Arial" panose="020B0604020202020204" pitchFamily="34" charset="0"/>
+                <a:cs typeface="Arial" panose="020B0604020202020204" pitchFamily="34" charset="0"/>
+              </a:rPr>
+              <a:t> Bot</a:t>
+            </a:r>
+          </a:p>
+          <a:p>
+            <a:r>
+              <a:rPr lang="sv-SE" dirty="0">
+                <a:latin typeface="Arial" panose="020B0604020202020204" pitchFamily="34" charset="0"/>
+                <a:cs typeface="Arial" panose="020B0604020202020204" pitchFamily="34" charset="0"/>
+              </a:rPr>
+              <a:t>3x Robot B</a:t>
+            </a:r>
+          </a:p>
+          <a:p>
+            <a:r>
+              <a:rPr lang="sv-SE" dirty="0">
+                <a:latin typeface="Arial" panose="020B0604020202020204" pitchFamily="34" charset="0"/>
+                <a:cs typeface="Arial" panose="020B0604020202020204" pitchFamily="34" charset="0"/>
+              </a:rPr>
+              <a:t>Basic Bot</a:t>
+            </a:r>
+          </a:p>
+          <a:p>
+            <a:pPr algn="r"/>
+            <a:r>
+              <a:rPr lang="sv-SE" dirty="0">
+                <a:latin typeface="Arial" panose="020B0604020202020204" pitchFamily="34" charset="0"/>
+                <a:cs typeface="Arial" panose="020B0604020202020204" pitchFamily="34" charset="0"/>
+              </a:rPr>
+              <a:t>= €95</a:t>
+            </a:r>
+            <a:endParaRPr lang="en-US" dirty="0"/>
+          </a:p>
+        </p:txBody>
+      </p:sp>
+      <p:sp>
+        <p:nvSpPr>
+          <p:cNvPr id="61" name="Rectangle 60">
+            <a:extLst>
+              <a:ext uri="{FF2B5EF4-FFF2-40B4-BE49-F238E27FC236}">
+                <a16:creationId xmlns:a16="http://schemas.microsoft.com/office/drawing/2014/main" id="{2555CB7B-E89E-4FAA-90C1-77E7EDE66192}"/>
+              </a:ext>
+            </a:extLst>
+          </p:cNvPr>
+          <p:cNvSpPr/>
+          <p:nvPr/>
+        </p:nvSpPr>
+        <p:spPr>
+          <a:xfrm>
+            <a:off x="5133824" y="3671436"/>
+            <a:ext cx="428322" cy="369332"/>
+          </a:xfrm>
+          <a:prstGeom prst="rect">
+            <a:avLst/>
+          </a:prstGeom>
+        </p:spPr>
+        <p:txBody>
+          <a:bodyPr wrap="none">
+            <a:spAutoFit/>
+          </a:bodyPr>
+          <a:lstStyle/>
+          <a:p>
+            <a:r>
+              <a:rPr lang="sv-SE" dirty="0">
+                <a:latin typeface="Arial" panose="020B0604020202020204" pitchFamily="34" charset="0"/>
+                <a:cs typeface="Arial" panose="020B0604020202020204" pitchFamily="34" charset="0"/>
+              </a:rPr>
+              <a:t>2x</a:t>
+            </a:r>
+            <a:endParaRPr lang="en-US" dirty="0"/>
+          </a:p>
+        </p:txBody>
+      </p:sp>
+      <p:cxnSp>
+        <p:nvCxnSpPr>
+          <p:cNvPr id="62" name="Straight Arrow Connector 61">
+            <a:extLst>
+              <a:ext uri="{FF2B5EF4-FFF2-40B4-BE49-F238E27FC236}">
+                <a16:creationId xmlns:a16="http://schemas.microsoft.com/office/drawing/2014/main" id="{CD0D2D9E-BF44-4F05-8A34-7D366C108330}"/>
+              </a:ext>
+            </a:extLst>
+          </p:cNvPr>
+          <p:cNvCxnSpPr>
+            <a:cxnSpLocks/>
+            <a:stCxn id="21" idx="0"/>
+          </p:cNvCxnSpPr>
+          <p:nvPr/>
+        </p:nvCxnSpPr>
+        <p:spPr>
+          <a:xfrm flipV="1">
+            <a:off x="6621932" y="2736078"/>
+            <a:ext cx="151607" cy="1816140"/>
+          </a:xfrm>
+          <a:prstGeom prst="straightConnector1">
+            <a:avLst/>
+          </a:prstGeom>
+          <a:ln w="38100">
+            <a:solidFill>
+              <a:schemeClr val="tx1"/>
+            </a:solidFill>
+            <a:prstDash val="dash"/>
+            <a:tailEnd type="triangle"/>
+          </a:ln>
+        </p:spPr>
+        <p:style>
+          <a:lnRef idx="1">
+            <a:schemeClr val="accent1"/>
+          </a:lnRef>
+          <a:fillRef idx="0">
+            <a:schemeClr val="accent1"/>
+          </a:fillRef>
+          <a:effectRef idx="0">
+            <a:schemeClr val="accent1"/>
+          </a:effectRef>
+          <a:fontRef idx="minor">
+            <a:schemeClr val="tx1"/>
+          </a:fontRef>
+        </p:style>
+      </p:cxnSp>
+      <p:cxnSp>
+        <p:nvCxnSpPr>
+          <p:cNvPr id="65" name="Straight Arrow Connector 64">
+            <a:extLst>
+              <a:ext uri="{FF2B5EF4-FFF2-40B4-BE49-F238E27FC236}">
+                <a16:creationId xmlns:a16="http://schemas.microsoft.com/office/drawing/2014/main" id="{246C7C9F-0B2A-4180-BBF3-91835824417D}"/>
+              </a:ext>
+            </a:extLst>
+          </p:cNvPr>
+          <p:cNvCxnSpPr>
+            <a:cxnSpLocks/>
+          </p:cNvCxnSpPr>
+          <p:nvPr/>
+        </p:nvCxnSpPr>
+        <p:spPr>
+          <a:xfrm flipV="1">
+            <a:off x="6749323" y="2722061"/>
+            <a:ext cx="951463" cy="1780321"/>
+          </a:xfrm>
+          <a:prstGeom prst="straightConnector1">
+            <a:avLst/>
+          </a:prstGeom>
+          <a:ln w="38100">
+            <a:solidFill>
+              <a:schemeClr val="tx1"/>
+            </a:solidFill>
+            <a:prstDash val="dash"/>
+            <a:tailEnd type="triangle"/>
+          </a:ln>
+        </p:spPr>
+        <p:style>
+          <a:lnRef idx="1">
+            <a:schemeClr val="accent1"/>
+          </a:lnRef>
+          <a:fillRef idx="0">
+            <a:schemeClr val="accent1"/>
+          </a:fillRef>
+          <a:effectRef idx="0">
+            <a:schemeClr val="accent1"/>
+          </a:effectRef>
+          <a:fontRef idx="minor">
+            <a:schemeClr val="tx1"/>
+          </a:fontRef>
+        </p:style>
+      </p:cxnSp>
+      <p:sp>
+        <p:nvSpPr>
+          <p:cNvPr id="69" name="Rectangle 68">
+            <a:extLst>
+              <a:ext uri="{FF2B5EF4-FFF2-40B4-BE49-F238E27FC236}">
+                <a16:creationId xmlns:a16="http://schemas.microsoft.com/office/drawing/2014/main" id="{C83A164E-C563-4661-88E8-6ECF4A2EFD91}"/>
+              </a:ext>
+            </a:extLst>
+          </p:cNvPr>
+          <p:cNvSpPr/>
+          <p:nvPr/>
+        </p:nvSpPr>
+        <p:spPr>
+          <a:xfrm>
+            <a:off x="565666" y="5096491"/>
+            <a:ext cx="2807278" cy="1316718"/>
+          </a:xfrm>
+          <a:prstGeom prst="rect">
+            <a:avLst/>
+          </a:prstGeom>
+          <a:noFill/>
+          <a:ln w="38100">
+            <a:solidFill>
+              <a:schemeClr val="tx1"/>
+            </a:solidFill>
+          </a:ln>
+        </p:spPr>
+        <p:style>
+          <a:lnRef idx="2">
+            <a:schemeClr val="accent1">
+              <a:shade val="50000"/>
+            </a:schemeClr>
+          </a:lnRef>
+          <a:fillRef idx="1">
+            <a:schemeClr val="accent1"/>
+          </a:fillRef>
+          <a:effectRef idx="0">
+            <a:schemeClr val="accent1"/>
+          </a:effectRef>
+          <a:fontRef idx="minor">
+            <a:schemeClr val="lt1"/>
+          </a:fontRef>
+        </p:style>
+        <p:txBody>
+          <a:bodyPr rtlCol="0" anchor="ctr"/>
+          <a:lstStyle/>
+          <a:p>
+            <a:pPr algn="ctr"/>
+            <a:endParaRPr lang="en-US"/>
+          </a:p>
+        </p:txBody>
+      </p:sp>
+      <p:sp>
+        <p:nvSpPr>
+          <p:cNvPr id="70" name="Rectangle 69">
+            <a:extLst>
+              <a:ext uri="{FF2B5EF4-FFF2-40B4-BE49-F238E27FC236}">
+                <a16:creationId xmlns:a16="http://schemas.microsoft.com/office/drawing/2014/main" id="{63126789-69EB-4A05-B3F1-9FBBE1870485}"/>
+              </a:ext>
+            </a:extLst>
+          </p:cNvPr>
+          <p:cNvSpPr/>
+          <p:nvPr/>
+        </p:nvSpPr>
+        <p:spPr>
+          <a:xfrm>
+            <a:off x="8775091" y="3557278"/>
+            <a:ext cx="1415772" cy="369332"/>
+          </a:xfrm>
+          <a:prstGeom prst="rect">
+            <a:avLst/>
+          </a:prstGeom>
+        </p:spPr>
+        <p:txBody>
+          <a:bodyPr wrap="none">
+            <a:spAutoFit/>
+          </a:bodyPr>
+          <a:lstStyle/>
+          <a:p>
+            <a:pPr algn="ctr"/>
+            <a:r>
+              <a:rPr lang="sv-SE" dirty="0">
+                <a:latin typeface="Arial" panose="020B0604020202020204" pitchFamily="34" charset="0"/>
+                <a:cs typeface="Arial" panose="020B0604020202020204" pitchFamily="34" charset="0"/>
+              </a:rPr>
+              <a:t>Robot </a:t>
+            </a:r>
+            <a:r>
+              <a:rPr lang="sv-SE" dirty="0" err="1">
+                <a:latin typeface="Arial" panose="020B0604020202020204" pitchFamily="34" charset="0"/>
+                <a:cs typeface="Arial" panose="020B0604020202020204" pitchFamily="34" charset="0"/>
+              </a:rPr>
+              <a:t>types</a:t>
+            </a:r>
+            <a:endParaRPr lang="en-US" dirty="0"/>
+          </a:p>
+        </p:txBody>
+      </p:sp>
+      <p:sp>
+        <p:nvSpPr>
+          <p:cNvPr id="71" name="Rectangle 70">
+            <a:extLst>
+              <a:ext uri="{FF2B5EF4-FFF2-40B4-BE49-F238E27FC236}">
+                <a16:creationId xmlns:a16="http://schemas.microsoft.com/office/drawing/2014/main" id="{344B0749-0CB8-4421-876A-8DFE0A980333}"/>
+              </a:ext>
+            </a:extLst>
+          </p:cNvPr>
+          <p:cNvSpPr/>
+          <p:nvPr/>
+        </p:nvSpPr>
+        <p:spPr>
+          <a:xfrm>
+            <a:off x="940818" y="4665644"/>
+            <a:ext cx="2056973" cy="369332"/>
+          </a:xfrm>
+          <a:prstGeom prst="rect">
+            <a:avLst/>
+          </a:prstGeom>
+        </p:spPr>
+        <p:txBody>
+          <a:bodyPr wrap="none">
+            <a:spAutoFit/>
+          </a:bodyPr>
+          <a:lstStyle/>
+          <a:p>
+            <a:pPr algn="ctr"/>
+            <a:r>
+              <a:rPr lang="sv-SE" dirty="0">
+                <a:latin typeface="Arial" panose="020B0604020202020204" pitchFamily="34" charset="0"/>
+                <a:cs typeface="Arial" panose="020B0604020202020204" pitchFamily="34" charset="0"/>
+              </a:rPr>
+              <a:t>Business relations</a:t>
+            </a:r>
+            <a:endParaRPr lang="en-US" dirty="0"/>
+          </a:p>
+        </p:txBody>
+      </p:sp>
+      <p:cxnSp>
+        <p:nvCxnSpPr>
+          <p:cNvPr id="72" name="Straight Arrow Connector 71">
+            <a:extLst>
+              <a:ext uri="{FF2B5EF4-FFF2-40B4-BE49-F238E27FC236}">
+                <a16:creationId xmlns:a16="http://schemas.microsoft.com/office/drawing/2014/main" id="{ED92BC3B-9A65-49BB-A725-60214763FBDC}"/>
+              </a:ext>
+            </a:extLst>
+          </p:cNvPr>
+          <p:cNvCxnSpPr>
+            <a:cxnSpLocks/>
+          </p:cNvCxnSpPr>
+          <p:nvPr/>
+        </p:nvCxnSpPr>
+        <p:spPr>
+          <a:xfrm>
+            <a:off x="777313" y="5467099"/>
+            <a:ext cx="767826" cy="0"/>
+          </a:xfrm>
+          <a:prstGeom prst="straightConnector1">
+            <a:avLst/>
+          </a:prstGeom>
+          <a:ln w="38100">
+            <a:solidFill>
+              <a:schemeClr val="tx1"/>
+            </a:solidFill>
+            <a:tailEnd type="triangle"/>
+          </a:ln>
+        </p:spPr>
+        <p:style>
+          <a:lnRef idx="1">
+            <a:schemeClr val="accent1"/>
+          </a:lnRef>
+          <a:fillRef idx="0">
+            <a:schemeClr val="accent1"/>
+          </a:fillRef>
+          <a:effectRef idx="0">
+            <a:schemeClr val="accent1"/>
+          </a:effectRef>
+          <a:fontRef idx="minor">
+            <a:schemeClr val="tx1"/>
+          </a:fontRef>
+        </p:style>
+      </p:cxnSp>
+      <p:cxnSp>
+        <p:nvCxnSpPr>
+          <p:cNvPr id="75" name="Straight Arrow Connector 74">
+            <a:extLst>
+              <a:ext uri="{FF2B5EF4-FFF2-40B4-BE49-F238E27FC236}">
+                <a16:creationId xmlns:a16="http://schemas.microsoft.com/office/drawing/2014/main" id="{2077B21C-FF58-4DD2-A484-CB04AB2993AE}"/>
+              </a:ext>
+            </a:extLst>
+          </p:cNvPr>
+          <p:cNvCxnSpPr>
+            <a:cxnSpLocks/>
+          </p:cNvCxnSpPr>
+          <p:nvPr/>
+        </p:nvCxnSpPr>
+        <p:spPr>
+          <a:xfrm flipH="1" flipV="1">
+            <a:off x="3071167" y="3282847"/>
+            <a:ext cx="3195504" cy="1288394"/>
+          </a:xfrm>
+          <a:prstGeom prst="straightConnector1">
+            <a:avLst/>
+          </a:prstGeom>
+          <a:ln w="38100">
+            <a:solidFill>
+              <a:schemeClr val="tx1"/>
+            </a:solidFill>
+            <a:tailEnd type="triangle"/>
+          </a:ln>
+        </p:spPr>
+        <p:style>
+          <a:lnRef idx="1">
+            <a:schemeClr val="accent1"/>
+          </a:lnRef>
+          <a:fillRef idx="0">
+            <a:schemeClr val="accent1"/>
+          </a:fillRef>
+          <a:effectRef idx="0">
+            <a:schemeClr val="accent1"/>
+          </a:effectRef>
+          <a:fontRef idx="minor">
+            <a:schemeClr val="tx1"/>
+          </a:fontRef>
+        </p:style>
+      </p:cxnSp>
+      <p:sp>
+        <p:nvSpPr>
+          <p:cNvPr id="77" name="Rectangle 76">
+            <a:extLst>
+              <a:ext uri="{FF2B5EF4-FFF2-40B4-BE49-F238E27FC236}">
+                <a16:creationId xmlns:a16="http://schemas.microsoft.com/office/drawing/2014/main" id="{B88EADB8-1203-446F-A495-2DCA82F847EF}"/>
+              </a:ext>
+            </a:extLst>
+          </p:cNvPr>
+          <p:cNvSpPr/>
+          <p:nvPr/>
+        </p:nvSpPr>
+        <p:spPr>
+          <a:xfrm>
+            <a:off x="1626330" y="5274371"/>
+            <a:ext cx="1082348" cy="369332"/>
+          </a:xfrm>
+          <a:prstGeom prst="rect">
+            <a:avLst/>
+          </a:prstGeom>
+        </p:spPr>
+        <p:txBody>
+          <a:bodyPr wrap="none">
+            <a:spAutoFit/>
+          </a:bodyPr>
+          <a:lstStyle/>
+          <a:p>
+            <a:r>
+              <a:rPr lang="sv-SE" dirty="0" err="1">
+                <a:latin typeface="Arial" panose="020B0604020202020204" pitchFamily="34" charset="0"/>
+                <a:cs typeface="Arial" panose="020B0604020202020204" pitchFamily="34" charset="0"/>
+              </a:rPr>
+              <a:t>Bespoke</a:t>
+            </a:r>
+            <a:endParaRPr lang="en-US" dirty="0"/>
+          </a:p>
+        </p:txBody>
+      </p:sp>
+      <p:cxnSp>
+        <p:nvCxnSpPr>
+          <p:cNvPr id="78" name="Straight Arrow Connector 77">
+            <a:extLst>
+              <a:ext uri="{FF2B5EF4-FFF2-40B4-BE49-F238E27FC236}">
+                <a16:creationId xmlns:a16="http://schemas.microsoft.com/office/drawing/2014/main" id="{396437B9-EEFB-4A03-B933-1CDFB1C8BC64}"/>
+              </a:ext>
+            </a:extLst>
+          </p:cNvPr>
+          <p:cNvCxnSpPr>
+            <a:cxnSpLocks/>
+          </p:cNvCxnSpPr>
+          <p:nvPr/>
+        </p:nvCxnSpPr>
+        <p:spPr>
+          <a:xfrm>
+            <a:off x="777313" y="6031334"/>
+            <a:ext cx="767826" cy="0"/>
+          </a:xfrm>
+          <a:prstGeom prst="straightConnector1">
+            <a:avLst/>
+          </a:prstGeom>
+          <a:ln w="38100">
+            <a:solidFill>
+              <a:schemeClr val="tx1"/>
+            </a:solidFill>
+            <a:prstDash val="dash"/>
+            <a:tailEnd type="triangle"/>
+          </a:ln>
+        </p:spPr>
+        <p:style>
+          <a:lnRef idx="1">
+            <a:schemeClr val="accent1"/>
+          </a:lnRef>
+          <a:fillRef idx="0">
+            <a:schemeClr val="accent1"/>
+          </a:fillRef>
+          <a:effectRef idx="0">
+            <a:schemeClr val="accent1"/>
+          </a:effectRef>
+          <a:fontRef idx="minor">
+            <a:schemeClr val="tx1"/>
+          </a:fontRef>
+        </p:style>
+      </p:cxnSp>
+      <p:sp>
+        <p:nvSpPr>
+          <p:cNvPr id="79" name="Rectangle 78">
+            <a:extLst>
+              <a:ext uri="{FF2B5EF4-FFF2-40B4-BE49-F238E27FC236}">
+                <a16:creationId xmlns:a16="http://schemas.microsoft.com/office/drawing/2014/main" id="{48CD2476-701A-4C45-9F84-14B0B78541D7}"/>
+              </a:ext>
+            </a:extLst>
+          </p:cNvPr>
+          <p:cNvSpPr/>
+          <p:nvPr/>
+        </p:nvSpPr>
+        <p:spPr>
+          <a:xfrm>
+            <a:off x="1638459" y="5846668"/>
+            <a:ext cx="1518364" cy="369332"/>
+          </a:xfrm>
+          <a:prstGeom prst="rect">
+            <a:avLst/>
+          </a:prstGeom>
+        </p:spPr>
+        <p:txBody>
+          <a:bodyPr wrap="none">
+            <a:spAutoFit/>
+          </a:bodyPr>
+          <a:lstStyle/>
+          <a:p>
+            <a:r>
+              <a:rPr lang="sv-SE" dirty="0" err="1">
+                <a:latin typeface="Arial" panose="020B0604020202020204" pitchFamily="34" charset="0"/>
+                <a:cs typeface="Arial" panose="020B0604020202020204" pitchFamily="34" charset="0"/>
+              </a:rPr>
+              <a:t>Open</a:t>
+            </a:r>
+            <a:r>
+              <a:rPr lang="sv-SE" dirty="0">
+                <a:latin typeface="Arial" panose="020B0604020202020204" pitchFamily="34" charset="0"/>
+                <a:cs typeface="Arial" panose="020B0604020202020204" pitchFamily="34" charset="0"/>
+              </a:rPr>
+              <a:t> market</a:t>
+            </a:r>
+            <a:endParaRPr lang="en-US" dirty="0"/>
+          </a:p>
+        </p:txBody>
+      </p:sp>
+    </p:spTree>
+    <p:extLst>
+      <p:ext uri="{BB962C8B-B14F-4D97-AF65-F5344CB8AC3E}">
+        <p14:creationId xmlns:p14="http://schemas.microsoft.com/office/powerpoint/2010/main" val="1146937526"/>
+      </p:ext>
+    </p:extLst>
+  </p:cSld>
+  <p:clrMapOvr>
+    <a:masterClrMapping/>
+  </p:clrMapOvr>
+</p:sld>
+</file>
+
+<file path=ppt/slides/slide4.xml><?xml version="1.0" encoding="utf-8"?>
+<p:sld xmlns:a="http://schemas.openxmlformats.org/drawingml/2006/main" xmlns:r="http://schemas.openxmlformats.org/officeDocument/2006/relationships" xmlns:p="http://schemas.openxmlformats.org/presentationml/2006/main">
+  <p:cSld>
+    <p:spTree>
+      <p:nvGrpSpPr>
+        <p:cNvPr id="1" name=""/>
+        <p:cNvGrpSpPr/>
+        <p:nvPr/>
+      </p:nvGrpSpPr>
+      <p:grpSpPr>
+        <a:xfrm>
+          <a:off x="0" y="0"/>
+          <a:ext cx="0" cy="0"/>
+          <a:chOff x="0" y="0"/>
+          <a:chExt cx="0" cy="0"/>
+        </a:xfrm>
+      </p:grpSpPr>
+      <p:sp>
+        <p:nvSpPr>
           <p:cNvPr id="175" name="Folded Corner 14">
             <a:extLst>
               <a:ext uri="{FF2B5EF4-FFF2-40B4-BE49-F238E27FC236}">
@@ -30312,7 +32679,7 @@
 </p:sld>
 </file>
 
-<file path=ppt/slides/slide4.xml><?xml version="1.0" encoding="utf-8"?>
+<file path=ppt/slides/slide5.xml><?xml version="1.0" encoding="utf-8"?>
 <p:sld xmlns:a="http://schemas.openxmlformats.org/drawingml/2006/main" xmlns:r="http://schemas.openxmlformats.org/officeDocument/2006/relationships" xmlns:p="http://schemas.openxmlformats.org/presentationml/2006/main">
   <p:cSld>
     <p:spTree>
@@ -32803,7 +35170,7 @@
 </p:sld>
 </file>
 
-<file path=ppt/slides/slide5.xml><?xml version="1.0" encoding="utf-8"?>
+<file path=ppt/slides/slide6.xml><?xml version="1.0" encoding="utf-8"?>
 <p:sld xmlns:a="http://schemas.openxmlformats.org/drawingml/2006/main" xmlns:r="http://schemas.openxmlformats.org/officeDocument/2006/relationships" xmlns:p="http://schemas.openxmlformats.org/presentationml/2006/main">
   <p:cSld>
     <p:spTree>
@@ -35105,7 +37472,7 @@
 </p:sld>
 </file>
 
-<file path=ppt/slides/slide6.xml><?xml version="1.0" encoding="utf-8"?>
+<file path=ppt/slides/slide7.xml><?xml version="1.0" encoding="utf-8"?>
 <p:sld xmlns:a="http://schemas.openxmlformats.org/drawingml/2006/main" xmlns:r="http://schemas.openxmlformats.org/officeDocument/2006/relationships" xmlns:p="http://schemas.openxmlformats.org/presentationml/2006/main">
   <p:cSld>
     <p:spTree>
@@ -37425,7 +39792,7 @@
 </p:sld>
 </file>
 
-<file path=ppt/slides/slide7.xml><?xml version="1.0" encoding="utf-8"?>
+<file path=ppt/slides/slide8.xml><?xml version="1.0" encoding="utf-8"?>
 <p:sld xmlns:a="http://schemas.openxmlformats.org/drawingml/2006/main" xmlns:r="http://schemas.openxmlformats.org/officeDocument/2006/relationships" xmlns:p="http://schemas.openxmlformats.org/presentationml/2006/main">
   <p:cSld>
     <p:spTree>

</xml_diff>

<commit_message>
Fixed typo in fig
</commit_message>
<xml_diff>
--- a/project/rumble/etsa02_figures.pptx
+++ b/project/rumble/etsa02_figures.pptx
@@ -28343,7 +28343,7 @@
         <p:spPr>
           <a:xfrm>
             <a:off x="6099994" y="4552218"/>
-            <a:ext cx="1043876" cy="369332"/>
+            <a:ext cx="1056700" cy="369332"/>
           </a:xfrm>
           <a:prstGeom prst="rect">
             <a:avLst/>
@@ -28360,7 +28360,7 @@
                 <a:latin typeface="Arial" panose="020B0604020202020204" pitchFamily="34" charset="0"/>
                 <a:cs typeface="Arial" panose="020B0604020202020204" pitchFamily="34" charset="0"/>
               </a:rPr>
-              <a:t>Group B</a:t>
+              <a:t>Group C</a:t>
             </a:r>
             <a:endParaRPr lang="en-US" u="sng" dirty="0"/>
           </a:p>
@@ -29768,8 +29768,8 @@
         </p:nvCxnSpPr>
         <p:spPr>
           <a:xfrm flipV="1">
-            <a:off x="6621932" y="2736078"/>
-            <a:ext cx="151607" cy="1816140"/>
+            <a:off x="6628344" y="2736078"/>
+            <a:ext cx="145195" cy="1816140"/>
           </a:xfrm>
           <a:prstGeom prst="straightConnector1">
             <a:avLst/>

</xml_diff>

<commit_message>
Added a figure describing the purchase array
</commit_message>
<xml_diff>
--- a/project/rumble/etsa02_figures.pptx
+++ b/project/rumble/etsa02_figures.pptx
@@ -13,7 +13,8 @@
     <p:sldId id="260" r:id="rId7"/>
     <p:sldId id="261" r:id="rId8"/>
     <p:sldId id="265" r:id="rId9"/>
-    <p:sldId id="262" r:id="rId10"/>
+    <p:sldId id="266" r:id="rId10"/>
+    <p:sldId id="262" r:id="rId11"/>
   </p:sldIdLst>
   <p:sldSz cx="12192000" cy="6858000"/>
   <p:notesSz cx="6858000" cy="9144000"/>
@@ -125,6 +126,7 @@
             <p14:sldId id="260"/>
             <p14:sldId id="261"/>
             <p14:sldId id="265"/>
+            <p14:sldId id="266"/>
             <p14:sldId id="262"/>
           </p14:sldIdLst>
         </p14:section>
@@ -26058,6 +26060,316 @@
 </p:sld>
 </file>
 
+<file path=ppt/slides/slide10.xml><?xml version="1.0" encoding="utf-8"?>
+<p:sld xmlns:a="http://schemas.openxmlformats.org/drawingml/2006/main" xmlns:r="http://schemas.openxmlformats.org/officeDocument/2006/relationships" xmlns:p="http://schemas.openxmlformats.org/presentationml/2006/main">
+  <p:cSld>
+    <p:spTree>
+      <p:nvGrpSpPr>
+        <p:cNvPr id="1" name=""/>
+        <p:cNvGrpSpPr/>
+        <p:nvPr/>
+      </p:nvGrpSpPr>
+      <p:grpSpPr>
+        <a:xfrm>
+          <a:off x="0" y="0"/>
+          <a:ext cx="0" cy="0"/>
+          <a:chOff x="0" y="0"/>
+          <a:chExt cx="0" cy="0"/>
+        </a:xfrm>
+      </p:grpSpPr>
+      <p:sp>
+        <p:nvSpPr>
+          <p:cNvPr id="2" name="Title 1"/>
+          <p:cNvSpPr>
+            <a:spLocks noGrp="1"/>
+          </p:cNvSpPr>
+          <p:nvPr>
+            <p:ph type="title"/>
+          </p:nvPr>
+        </p:nvSpPr>
+        <p:spPr>
+          <a:xfrm>
+            <a:off x="457200" y="365125"/>
+            <a:ext cx="11277600" cy="1325563"/>
+          </a:xfrm>
+        </p:spPr>
+        <p:txBody>
+          <a:bodyPr/>
+          <a:lstStyle/>
+          <a:p>
+            <a:pPr>
+              <a:tabLst>
+                <a:tab pos="6186488" algn="l"/>
+                <a:tab pos="6369050" algn="l"/>
+              </a:tabLst>
+            </a:pPr>
+            <a:r>
+              <a:rPr lang="sv-SE" dirty="0"/>
+              <a:t>Responsiblities	Deliverables</a:t>
+            </a:r>
+          </a:p>
+        </p:txBody>
+      </p:sp>
+      <p:sp>
+        <p:nvSpPr>
+          <p:cNvPr id="3" name="Content Placeholder 2"/>
+          <p:cNvSpPr>
+            <a:spLocks noGrp="1"/>
+          </p:cNvSpPr>
+          <p:nvPr>
+            <p:ph idx="1"/>
+          </p:nvPr>
+        </p:nvSpPr>
+        <p:spPr>
+          <a:xfrm>
+            <a:off x="228600" y="1825625"/>
+            <a:ext cx="11734800" cy="4351338"/>
+          </a:xfrm>
+        </p:spPr>
+        <p:txBody>
+          <a:bodyPr>
+            <a:normAutofit fontScale="92500" lnSpcReduction="10000"/>
+          </a:bodyPr>
+          <a:lstStyle/>
+          <a:p>
+            <a:pPr lvl="0"/>
+            <a:r>
+              <a:rPr lang="sv-SE" dirty="0">
+                <a:solidFill>
+                  <a:prstClr val="black"/>
+                </a:solidFill>
+              </a:rPr>
+              <a:t>Development lead</a:t>
+            </a:r>
+          </a:p>
+          <a:p>
+            <a:pPr marL="0" lvl="0" indent="269875">
+              <a:buNone/>
+            </a:pPr>
+            <a:r>
+              <a:rPr lang="sv-SE" sz="1400" dirty="0">
+                <a:solidFill>
+                  <a:prstClr val="black"/>
+                </a:solidFill>
+              </a:rPr>
+              <a:t>Design, implementation, source code quality				jar_v0.5, jar_v0.9, jar_v1.0</a:t>
+            </a:r>
+          </a:p>
+          <a:p>
+            <a:pPr lvl="0"/>
+            <a:r>
+              <a:rPr lang="sv-SE" dirty="0">
+                <a:solidFill>
+                  <a:prstClr val="black"/>
+                </a:solidFill>
+              </a:rPr>
+              <a:t>Requirements lead</a:t>
+            </a:r>
+          </a:p>
+          <a:p>
+            <a:pPr marL="0" lvl="0" indent="269875">
+              <a:buNone/>
+            </a:pPr>
+            <a:r>
+              <a:rPr lang="sv-SE" sz="1400" dirty="0">
+                <a:solidFill>
+                  <a:prstClr val="black"/>
+                </a:solidFill>
+              </a:rPr>
+              <a:t>End-user perspective, feature scoping, detailed requirements			SRS v0.5, SRS v0.9, SRS v1.0</a:t>
+            </a:r>
+          </a:p>
+          <a:p>
+            <a:pPr lvl="0"/>
+            <a:r>
+              <a:rPr lang="sv-SE" dirty="0">
+                <a:solidFill>
+                  <a:prstClr val="black"/>
+                </a:solidFill>
+              </a:rPr>
+              <a:t>Test lead</a:t>
+            </a:r>
+          </a:p>
+          <a:p>
+            <a:pPr marL="0" lvl="0" indent="269875">
+              <a:buNone/>
+            </a:pPr>
+            <a:r>
+              <a:rPr lang="sv-SE" sz="1400" dirty="0">
+                <a:solidFill>
+                  <a:prstClr val="black"/>
+                </a:solidFill>
+              </a:rPr>
+              <a:t>Test </a:t>
+            </a:r>
+            <a:r>
+              <a:rPr lang="sv-SE" sz="1400" dirty="0" err="1">
+                <a:solidFill>
+                  <a:prstClr val="black"/>
+                </a:solidFill>
+              </a:rPr>
+              <a:t>strategy</a:t>
+            </a:r>
+            <a:r>
+              <a:rPr lang="sv-SE" sz="1400" dirty="0">
+                <a:solidFill>
+                  <a:prstClr val="black"/>
+                </a:solidFill>
+              </a:rPr>
+              <a:t>, </a:t>
+            </a:r>
+            <a:r>
+              <a:rPr lang="sv-SE" sz="1400" dirty="0" err="1">
+                <a:solidFill>
+                  <a:prstClr val="black"/>
+                </a:solidFill>
+              </a:rPr>
+              <a:t>unit</a:t>
+            </a:r>
+            <a:r>
+              <a:rPr lang="sv-SE" sz="1400" dirty="0">
+                <a:solidFill>
+                  <a:prstClr val="black"/>
+                </a:solidFill>
+              </a:rPr>
+              <a:t> testing, system </a:t>
+            </a:r>
+            <a:r>
+              <a:rPr lang="sv-SE" sz="1400" dirty="0" err="1">
+                <a:solidFill>
+                  <a:prstClr val="black"/>
+                </a:solidFill>
+              </a:rPr>
+              <a:t>testing</a:t>
+            </a:r>
+            <a:r>
+              <a:rPr lang="sv-SE" sz="1400" dirty="0">
+                <a:solidFill>
+                  <a:prstClr val="black"/>
+                </a:solidFill>
+              </a:rPr>
+              <a:t>				Unit tests, Test spec v1.0 (incl. test code), test results</a:t>
+            </a:r>
+          </a:p>
+          <a:p>
+            <a:pPr lvl="0"/>
+            <a:r>
+              <a:rPr lang="sv-SE" dirty="0">
+                <a:solidFill>
+                  <a:prstClr val="black"/>
+                </a:solidFill>
+              </a:rPr>
+              <a:t>Sales engineer</a:t>
+            </a:r>
+          </a:p>
+          <a:p>
+            <a:pPr marL="0" lvl="0" indent="269875">
+              <a:buNone/>
+            </a:pPr>
+            <a:r>
+              <a:rPr lang="sv-SE" sz="1400" dirty="0">
+                <a:solidFill>
+                  <a:prstClr val="black"/>
+                </a:solidFill>
+              </a:rPr>
+              <a:t>Marketing, customer communication, </a:t>
+            </a:r>
+            <a:r>
+              <a:rPr lang="sv-SE" sz="1400" dirty="0" err="1">
+                <a:solidFill>
+                  <a:prstClr val="black"/>
+                </a:solidFill>
+              </a:rPr>
+              <a:t>negotiations</a:t>
+            </a:r>
+            <a:r>
+              <a:rPr lang="sv-SE" sz="1400" dirty="0">
+                <a:solidFill>
+                  <a:prstClr val="black"/>
+                </a:solidFill>
+              </a:rPr>
+              <a:t> 			Marketing concept, signed contract (as supplier)</a:t>
+            </a:r>
+          </a:p>
+          <a:p>
+            <a:pPr lvl="0"/>
+            <a:r>
+              <a:rPr lang="sv-SE" dirty="0">
+                <a:solidFill>
+                  <a:prstClr val="black"/>
+                </a:solidFill>
+              </a:rPr>
+              <a:t>Domain expert</a:t>
+            </a:r>
+          </a:p>
+          <a:p>
+            <a:pPr marL="0" lvl="0" indent="269875">
+              <a:buNone/>
+            </a:pPr>
+            <a:r>
+              <a:rPr lang="sv-SE" sz="1400" dirty="0">
+                <a:solidFill>
+                  <a:prstClr val="black"/>
+                </a:solidFill>
+              </a:rPr>
+              <a:t>Learning Robocode, composing team, supplier communication, negotiations		Signed contract (as customer), acceptance test report, team jar-file</a:t>
+            </a:r>
+          </a:p>
+          <a:p>
+            <a:pPr lvl="0"/>
+            <a:r>
+              <a:rPr lang="sv-SE" sz="2600" dirty="0">
+                <a:solidFill>
+                  <a:prstClr val="black"/>
+                </a:solidFill>
+              </a:rPr>
+              <a:t>Project manager</a:t>
+            </a:r>
+          </a:p>
+          <a:p>
+            <a:pPr marL="0" lvl="0" indent="269875">
+              <a:buNone/>
+            </a:pPr>
+            <a:r>
+              <a:rPr lang="sv-SE" sz="1300" dirty="0">
+                <a:solidFill>
+                  <a:prstClr val="black"/>
+                </a:solidFill>
+              </a:rPr>
+              <a:t>Coordination, time reporting, communication with regulatory body			Weekly time reports, formal claims (based on failed acceptance test)</a:t>
+            </a:r>
+          </a:p>
+          <a:p>
+            <a:pPr marL="0" lvl="0" indent="269875">
+              <a:buNone/>
+            </a:pPr>
+            <a:endParaRPr lang="sv-SE" sz="1400" dirty="0">
+              <a:solidFill>
+                <a:prstClr val="black"/>
+              </a:solidFill>
+            </a:endParaRPr>
+          </a:p>
+          <a:p>
+            <a:pPr marL="0" indent="269875">
+              <a:buNone/>
+            </a:pPr>
+            <a:endParaRPr lang="sv-SE" dirty="0"/>
+          </a:p>
+        </p:txBody>
+      </p:sp>
+    </p:spTree>
+    <p:extLst>
+      <p:ext uri="{BB962C8B-B14F-4D97-AF65-F5344CB8AC3E}">
+        <p14:creationId xmlns:p14="http://schemas.microsoft.com/office/powerpoint/2010/main" val="4243476286"/>
+      </p:ext>
+    </p:extLst>
+  </p:cSld>
+  <p:clrMapOvr>
+    <a:masterClrMapping/>
+  </p:clrMapOvr>
+</p:sld>
+</file>
+
 <file path=ppt/slides/slide2.xml><?xml version="1.0" encoding="utf-8"?>
 <p:sld xmlns:a="http://schemas.openxmlformats.org/drawingml/2006/main" xmlns:r="http://schemas.openxmlformats.org/officeDocument/2006/relationships" xmlns:p="http://schemas.openxmlformats.org/presentationml/2006/main">
   <p:cSld>
@@ -40202,290 +40514,10 @@
           <a:chExt cx="0" cy="0"/>
         </a:xfrm>
       </p:grpSpPr>
-      <p:sp>
-        <p:nvSpPr>
-          <p:cNvPr id="2" name="Title 1"/>
-          <p:cNvSpPr>
-            <a:spLocks noGrp="1"/>
-          </p:cNvSpPr>
-          <p:nvPr>
-            <p:ph type="title"/>
-          </p:nvPr>
-        </p:nvSpPr>
-        <p:spPr>
-          <a:xfrm>
-            <a:off x="457200" y="365125"/>
-            <a:ext cx="11277600" cy="1325563"/>
-          </a:xfrm>
-        </p:spPr>
-        <p:txBody>
-          <a:bodyPr/>
-          <a:lstStyle/>
-          <a:p>
-            <a:pPr>
-              <a:tabLst>
-                <a:tab pos="6186488" algn="l"/>
-                <a:tab pos="6369050" algn="l"/>
-              </a:tabLst>
-            </a:pPr>
-            <a:r>
-              <a:rPr lang="sv-SE" dirty="0"/>
-              <a:t>Responsiblities	Deliverables</a:t>
-            </a:r>
-          </a:p>
-        </p:txBody>
-      </p:sp>
-      <p:sp>
-        <p:nvSpPr>
-          <p:cNvPr id="3" name="Content Placeholder 2"/>
-          <p:cNvSpPr>
-            <a:spLocks noGrp="1"/>
-          </p:cNvSpPr>
-          <p:nvPr>
-            <p:ph idx="1"/>
-          </p:nvPr>
-        </p:nvSpPr>
-        <p:spPr>
-          <a:xfrm>
-            <a:off x="228600" y="1825625"/>
-            <a:ext cx="11734800" cy="4351338"/>
-          </a:xfrm>
-        </p:spPr>
-        <p:txBody>
-          <a:bodyPr>
-            <a:normAutofit fontScale="92500" lnSpcReduction="10000"/>
-          </a:bodyPr>
-          <a:lstStyle/>
-          <a:p>
-            <a:pPr lvl="0"/>
-            <a:r>
-              <a:rPr lang="sv-SE" dirty="0">
-                <a:solidFill>
-                  <a:prstClr val="black"/>
-                </a:solidFill>
-              </a:rPr>
-              <a:t>Development lead</a:t>
-            </a:r>
-          </a:p>
-          <a:p>
-            <a:pPr marL="0" lvl="0" indent="269875">
-              <a:buNone/>
-            </a:pPr>
-            <a:r>
-              <a:rPr lang="sv-SE" sz="1400" dirty="0">
-                <a:solidFill>
-                  <a:prstClr val="black"/>
-                </a:solidFill>
-              </a:rPr>
-              <a:t>Design, implementation, source code quality				jar_v0.5, jar_v0.9, jar_v1.0</a:t>
-            </a:r>
-          </a:p>
-          <a:p>
-            <a:pPr lvl="0"/>
-            <a:r>
-              <a:rPr lang="sv-SE" dirty="0">
-                <a:solidFill>
-                  <a:prstClr val="black"/>
-                </a:solidFill>
-              </a:rPr>
-              <a:t>Requirements lead</a:t>
-            </a:r>
-          </a:p>
-          <a:p>
-            <a:pPr marL="0" lvl="0" indent="269875">
-              <a:buNone/>
-            </a:pPr>
-            <a:r>
-              <a:rPr lang="sv-SE" sz="1400" dirty="0">
-                <a:solidFill>
-                  <a:prstClr val="black"/>
-                </a:solidFill>
-              </a:rPr>
-              <a:t>End-user perspective, feature scoping, detailed requirements			SRS v0.5, SRS v0.9, SRS v1.0</a:t>
-            </a:r>
-          </a:p>
-          <a:p>
-            <a:pPr lvl="0"/>
-            <a:r>
-              <a:rPr lang="sv-SE" dirty="0">
-                <a:solidFill>
-                  <a:prstClr val="black"/>
-                </a:solidFill>
-              </a:rPr>
-              <a:t>Test lead</a:t>
-            </a:r>
-          </a:p>
-          <a:p>
-            <a:pPr marL="0" lvl="0" indent="269875">
-              <a:buNone/>
-            </a:pPr>
-            <a:r>
-              <a:rPr lang="sv-SE" sz="1400" dirty="0">
-                <a:solidFill>
-                  <a:prstClr val="black"/>
-                </a:solidFill>
-              </a:rPr>
-              <a:t>Test </a:t>
-            </a:r>
-            <a:r>
-              <a:rPr lang="sv-SE" sz="1400" dirty="0" err="1">
-                <a:solidFill>
-                  <a:prstClr val="black"/>
-                </a:solidFill>
-              </a:rPr>
-              <a:t>strategy</a:t>
-            </a:r>
-            <a:r>
-              <a:rPr lang="sv-SE" sz="1400" dirty="0">
-                <a:solidFill>
-                  <a:prstClr val="black"/>
-                </a:solidFill>
-              </a:rPr>
-              <a:t>, </a:t>
-            </a:r>
-            <a:r>
-              <a:rPr lang="sv-SE" sz="1400" dirty="0" err="1">
-                <a:solidFill>
-                  <a:prstClr val="black"/>
-                </a:solidFill>
-              </a:rPr>
-              <a:t>unit</a:t>
-            </a:r>
-            <a:r>
-              <a:rPr lang="sv-SE" sz="1400" dirty="0">
-                <a:solidFill>
-                  <a:prstClr val="black"/>
-                </a:solidFill>
-              </a:rPr>
-              <a:t> testing, system </a:t>
-            </a:r>
-            <a:r>
-              <a:rPr lang="sv-SE" sz="1400" dirty="0" err="1">
-                <a:solidFill>
-                  <a:prstClr val="black"/>
-                </a:solidFill>
-              </a:rPr>
-              <a:t>testing</a:t>
-            </a:r>
-            <a:r>
-              <a:rPr lang="sv-SE" sz="1400" dirty="0">
-                <a:solidFill>
-                  <a:prstClr val="black"/>
-                </a:solidFill>
-              </a:rPr>
-              <a:t>				Unit tests, Test spec v1.0 (incl. test code), test results</a:t>
-            </a:r>
-          </a:p>
-          <a:p>
-            <a:pPr lvl="0"/>
-            <a:r>
-              <a:rPr lang="sv-SE" dirty="0">
-                <a:solidFill>
-                  <a:prstClr val="black"/>
-                </a:solidFill>
-              </a:rPr>
-              <a:t>Sales engineer</a:t>
-            </a:r>
-          </a:p>
-          <a:p>
-            <a:pPr marL="0" lvl="0" indent="269875">
-              <a:buNone/>
-            </a:pPr>
-            <a:r>
-              <a:rPr lang="sv-SE" sz="1400" dirty="0">
-                <a:solidFill>
-                  <a:prstClr val="black"/>
-                </a:solidFill>
-              </a:rPr>
-              <a:t>Marketing, customer communication, </a:t>
-            </a:r>
-            <a:r>
-              <a:rPr lang="sv-SE" sz="1400" dirty="0" err="1">
-                <a:solidFill>
-                  <a:prstClr val="black"/>
-                </a:solidFill>
-              </a:rPr>
-              <a:t>negotiations</a:t>
-            </a:r>
-            <a:r>
-              <a:rPr lang="sv-SE" sz="1400" dirty="0">
-                <a:solidFill>
-                  <a:prstClr val="black"/>
-                </a:solidFill>
-              </a:rPr>
-              <a:t> 			Marketing concept, signed contract (as supplier)</a:t>
-            </a:r>
-          </a:p>
-          <a:p>
-            <a:pPr lvl="0"/>
-            <a:r>
-              <a:rPr lang="sv-SE" dirty="0">
-                <a:solidFill>
-                  <a:prstClr val="black"/>
-                </a:solidFill>
-              </a:rPr>
-              <a:t>Domain expert</a:t>
-            </a:r>
-          </a:p>
-          <a:p>
-            <a:pPr marL="0" lvl="0" indent="269875">
-              <a:buNone/>
-            </a:pPr>
-            <a:r>
-              <a:rPr lang="sv-SE" sz="1400" dirty="0">
-                <a:solidFill>
-                  <a:prstClr val="black"/>
-                </a:solidFill>
-              </a:rPr>
-              <a:t>Learning Robocode, composing team, supplier communication, negotiations		Signed contract (as customer), acceptance test report, team jar-file</a:t>
-            </a:r>
-          </a:p>
-          <a:p>
-            <a:pPr lvl="0"/>
-            <a:r>
-              <a:rPr lang="sv-SE" sz="2600" dirty="0">
-                <a:solidFill>
-                  <a:prstClr val="black"/>
-                </a:solidFill>
-              </a:rPr>
-              <a:t>Project manager</a:t>
-            </a:r>
-          </a:p>
-          <a:p>
-            <a:pPr marL="0" lvl="0" indent="269875">
-              <a:buNone/>
-            </a:pPr>
-            <a:r>
-              <a:rPr lang="sv-SE" sz="1300" dirty="0">
-                <a:solidFill>
-                  <a:prstClr val="black"/>
-                </a:solidFill>
-              </a:rPr>
-              <a:t>Coordination, time reporting, communication with regulatory body			Weekly time reports, formal claims (based on failed acceptance test)</a:t>
-            </a:r>
-          </a:p>
-          <a:p>
-            <a:pPr marL="0" lvl="0" indent="269875">
-              <a:buNone/>
-            </a:pPr>
-            <a:endParaRPr lang="sv-SE" sz="1400" dirty="0">
-              <a:solidFill>
-                <a:prstClr val="black"/>
-              </a:solidFill>
-            </a:endParaRPr>
-          </a:p>
-          <a:p>
-            <a:pPr marL="0" indent="269875">
-              <a:buNone/>
-            </a:pPr>
-            <a:endParaRPr lang="sv-SE" dirty="0"/>
-          </a:p>
-        </p:txBody>
-      </p:sp>
     </p:spTree>
     <p:extLst>
       <p:ext uri="{BB962C8B-B14F-4D97-AF65-F5344CB8AC3E}">
-        <p14:creationId xmlns:p14="http://schemas.microsoft.com/office/powerpoint/2010/main" val="4243476286"/>
+        <p14:creationId xmlns:p14="http://schemas.microsoft.com/office/powerpoint/2010/main" val="206168235"/>
       </p:ext>
     </p:extLst>
   </p:cSld>

</xml_diff>

<commit_message>
Updated figures and captions
</commit_message>
<xml_diff>
--- a/project/rumble/etsa02_figures.pptx
+++ b/project/rumble/etsa02_figures.pptx
@@ -133,7 +133,7 @@
       </p14:sectionLst>
     </p:ext>
     <p:ext uri="{EFAFB233-063F-42B5-8137-9DF3F51BA10A}">
-      <p15:sldGuideLst xmlns:p15="http://schemas.microsoft.com/office/powerpoint/2012/main">
+      <p15:sldGuideLst xmlns:p15="http://schemas.microsoft.com/office/powerpoint/2012/main" xmlns="">
         <p15:guide id="1" orient="horz" pos="2160" userDrawn="1">
           <p15:clr>
             <a:srgbClr val="A4A3A4"/>
@@ -3517,6 +3517,13 @@
         </dgm:presLayoutVars>
       </dgm:prSet>
       <dgm:spPr/>
+      <dgm:t>
+        <a:bodyPr/>
+        <a:lstStyle/>
+        <a:p>
+          <a:endParaRPr lang="sv-SE"/>
+        </a:p>
+      </dgm:t>
     </dgm:pt>
     <dgm:pt modelId="{C85ED1F6-1417-4DD8-9F0B-B522CDE30503}" type="pres">
       <dgm:prSet presAssocID="{A79E2A2D-7F2D-43CD-89C5-4F06702239C7}" presName="Accent1" presStyleCnt="0"/>
@@ -3535,6 +3542,13 @@
         </dgm:presLayoutVars>
       </dgm:prSet>
       <dgm:spPr/>
+      <dgm:t>
+        <a:bodyPr/>
+        <a:lstStyle/>
+        <a:p>
+          <a:endParaRPr lang="sv-SE"/>
+        </a:p>
+      </dgm:t>
     </dgm:pt>
     <dgm:pt modelId="{9E66601F-5507-4159-89CD-FE8318C483CA}" type="pres">
       <dgm:prSet presAssocID="{3A128CF5-9AE7-4EAC-9485-E88F8BE77004}" presName="Accent2" presStyleCnt="0"/>
@@ -3553,6 +3567,13 @@
         </dgm:presLayoutVars>
       </dgm:prSet>
       <dgm:spPr/>
+      <dgm:t>
+        <a:bodyPr/>
+        <a:lstStyle/>
+        <a:p>
+          <a:endParaRPr lang="sv-SE"/>
+        </a:p>
+      </dgm:t>
     </dgm:pt>
     <dgm:pt modelId="{2D7E4C0B-382B-42B1-A371-45C4C315ACE4}" type="pres">
       <dgm:prSet presAssocID="{3E974AE7-F6F7-44CE-AA7A-02FBDD58B1F1}" presName="Accent3" presStyleCnt="0"/>
@@ -3571,16 +3592,23 @@
         </dgm:presLayoutVars>
       </dgm:prSet>
       <dgm:spPr/>
+      <dgm:t>
+        <a:bodyPr/>
+        <a:lstStyle/>
+        <a:p>
+          <a:endParaRPr lang="sv-SE"/>
+        </a:p>
+      </dgm:t>
     </dgm:pt>
   </dgm:ptLst>
   <dgm:cxnLst>
     <dgm:cxn modelId="{DEA8841A-7F97-4B12-B19D-7DBC9CCCA6CA}" type="presOf" srcId="{A79E2A2D-7F2D-43CD-89C5-4F06702239C7}" destId="{DE40A598-37E1-4A8B-B30A-361891655E32}" srcOrd="0" destOrd="0" presId="urn:microsoft.com/office/officeart/2009/layout/CircleArrowProcess"/>
-    <dgm:cxn modelId="{D240A36B-F62A-4C70-9CAD-58226B0BD43D}" srcId="{E967B93F-BC7F-4FB4-BC87-6392A0B631BD}" destId="{3E974AE7-F6F7-44CE-AA7A-02FBDD58B1F1}" srcOrd="2" destOrd="0" parTransId="{0B1B9D87-069F-4C74-8A0B-950CD6773332}" sibTransId="{73096607-54D9-4500-9B80-0F6BD95D4725}"/>
-    <dgm:cxn modelId="{801CC257-8EC3-43DF-8DA1-6CFC36AAD2A3}" srcId="{E967B93F-BC7F-4FB4-BC87-6392A0B631BD}" destId="{3A128CF5-9AE7-4EAC-9485-E88F8BE77004}" srcOrd="1" destOrd="0" parTransId="{8B28C7C3-F1D0-4BA1-9C4B-79E975C3D84A}" sibTransId="{6842B30A-4C8A-4177-9D91-676F7D95EFE3}"/>
-    <dgm:cxn modelId="{157A1A7C-BF9C-4030-A3D2-FC015CDAB6FE}" srcId="{E967B93F-BC7F-4FB4-BC87-6392A0B631BD}" destId="{A79E2A2D-7F2D-43CD-89C5-4F06702239C7}" srcOrd="0" destOrd="0" parTransId="{80084990-0EF9-4F24-80B5-B857B4647FC3}" sibTransId="{56F09064-C6D9-41DF-9B01-CB0B167CEDEB}"/>
     <dgm:cxn modelId="{E919CC95-27B8-4C68-8343-831B7888018A}" type="presOf" srcId="{3A128CF5-9AE7-4EAC-9485-E88F8BE77004}" destId="{FF94DD58-C0AC-4F2E-B336-D810E8C84263}" srcOrd="0" destOrd="0" presId="urn:microsoft.com/office/officeart/2009/layout/CircleArrowProcess"/>
     <dgm:cxn modelId="{EAD55AA6-A136-4C50-8B79-CC6B400CC981}" type="presOf" srcId="{E967B93F-BC7F-4FB4-BC87-6392A0B631BD}" destId="{71406755-23F2-4109-BA41-146F988774CB}" srcOrd="0" destOrd="0" presId="urn:microsoft.com/office/officeart/2009/layout/CircleArrowProcess"/>
     <dgm:cxn modelId="{3F5E1DE0-0383-48CC-9203-6C9AD5C5267D}" type="presOf" srcId="{3E974AE7-F6F7-44CE-AA7A-02FBDD58B1F1}" destId="{90083342-A34C-49F2-A9E2-A7E389073F00}" srcOrd="0" destOrd="0" presId="urn:microsoft.com/office/officeart/2009/layout/CircleArrowProcess"/>
+    <dgm:cxn modelId="{157A1A7C-BF9C-4030-A3D2-FC015CDAB6FE}" srcId="{E967B93F-BC7F-4FB4-BC87-6392A0B631BD}" destId="{A79E2A2D-7F2D-43CD-89C5-4F06702239C7}" srcOrd="0" destOrd="0" parTransId="{80084990-0EF9-4F24-80B5-B857B4647FC3}" sibTransId="{56F09064-C6D9-41DF-9B01-CB0B167CEDEB}"/>
+    <dgm:cxn modelId="{D240A36B-F62A-4C70-9CAD-58226B0BD43D}" srcId="{E967B93F-BC7F-4FB4-BC87-6392A0B631BD}" destId="{3E974AE7-F6F7-44CE-AA7A-02FBDD58B1F1}" srcOrd="2" destOrd="0" parTransId="{0B1B9D87-069F-4C74-8A0B-950CD6773332}" sibTransId="{73096607-54D9-4500-9B80-0F6BD95D4725}"/>
+    <dgm:cxn modelId="{801CC257-8EC3-43DF-8DA1-6CFC36AAD2A3}" srcId="{E967B93F-BC7F-4FB4-BC87-6392A0B631BD}" destId="{3A128CF5-9AE7-4EAC-9485-E88F8BE77004}" srcOrd="1" destOrd="0" parTransId="{8B28C7C3-F1D0-4BA1-9C4B-79E975C3D84A}" sibTransId="{6842B30A-4C8A-4177-9D91-676F7D95EFE3}"/>
     <dgm:cxn modelId="{CF176182-E8A3-4225-A216-451BAF65A36F}" type="presParOf" srcId="{71406755-23F2-4109-BA41-146F988774CB}" destId="{C85ED1F6-1417-4DD8-9F0B-B522CDE30503}" srcOrd="0" destOrd="0" presId="urn:microsoft.com/office/officeart/2009/layout/CircleArrowProcess"/>
     <dgm:cxn modelId="{981AAF99-5CEA-4325-83DB-F7B976729878}" type="presParOf" srcId="{C85ED1F6-1417-4DD8-9F0B-B522CDE30503}" destId="{C215277F-04B7-4D4C-9F84-0EFFD842F138}" srcOrd="0" destOrd="0" presId="urn:microsoft.com/office/officeart/2009/layout/CircleArrowProcess"/>
     <dgm:cxn modelId="{0382EFEC-3211-418D-AAB6-6AFF1D404234}" type="presParOf" srcId="{71406755-23F2-4109-BA41-146F988774CB}" destId="{DE40A598-37E1-4A8B-B30A-361891655E32}" srcOrd="1" destOrd="0" presId="urn:microsoft.com/office/officeart/2009/layout/CircleArrowProcess"/>
@@ -3736,6 +3764,13 @@
         </dgm:presLayoutVars>
       </dgm:prSet>
       <dgm:spPr/>
+      <dgm:t>
+        <a:bodyPr/>
+        <a:lstStyle/>
+        <a:p>
+          <a:endParaRPr lang="sv-SE"/>
+        </a:p>
+      </dgm:t>
     </dgm:pt>
     <dgm:pt modelId="{C85ED1F6-1417-4DD8-9F0B-B522CDE30503}" type="pres">
       <dgm:prSet presAssocID="{A79E2A2D-7F2D-43CD-89C5-4F06702239C7}" presName="Accent1" presStyleCnt="0"/>
@@ -3754,6 +3789,13 @@
         </dgm:presLayoutVars>
       </dgm:prSet>
       <dgm:spPr/>
+      <dgm:t>
+        <a:bodyPr/>
+        <a:lstStyle/>
+        <a:p>
+          <a:endParaRPr lang="sv-SE"/>
+        </a:p>
+      </dgm:t>
     </dgm:pt>
     <dgm:pt modelId="{9E66601F-5507-4159-89CD-FE8318C483CA}" type="pres">
       <dgm:prSet presAssocID="{3A128CF5-9AE7-4EAC-9485-E88F8BE77004}" presName="Accent2" presStyleCnt="0"/>
@@ -3772,6 +3814,13 @@
         </dgm:presLayoutVars>
       </dgm:prSet>
       <dgm:spPr/>
+      <dgm:t>
+        <a:bodyPr/>
+        <a:lstStyle/>
+        <a:p>
+          <a:endParaRPr lang="sv-SE"/>
+        </a:p>
+      </dgm:t>
     </dgm:pt>
     <dgm:pt modelId="{2D7E4C0B-382B-42B1-A371-45C4C315ACE4}" type="pres">
       <dgm:prSet presAssocID="{3E974AE7-F6F7-44CE-AA7A-02FBDD58B1F1}" presName="Accent3" presStyleCnt="0"/>
@@ -3790,16 +3839,23 @@
         </dgm:presLayoutVars>
       </dgm:prSet>
       <dgm:spPr/>
+      <dgm:t>
+        <a:bodyPr/>
+        <a:lstStyle/>
+        <a:p>
+          <a:endParaRPr lang="sv-SE"/>
+        </a:p>
+      </dgm:t>
     </dgm:pt>
   </dgm:ptLst>
   <dgm:cxnLst>
     <dgm:cxn modelId="{DEA8841A-7F97-4B12-B19D-7DBC9CCCA6CA}" type="presOf" srcId="{A79E2A2D-7F2D-43CD-89C5-4F06702239C7}" destId="{DE40A598-37E1-4A8B-B30A-361891655E32}" srcOrd="0" destOrd="0" presId="urn:microsoft.com/office/officeart/2009/layout/CircleArrowProcess"/>
-    <dgm:cxn modelId="{D240A36B-F62A-4C70-9CAD-58226B0BD43D}" srcId="{E967B93F-BC7F-4FB4-BC87-6392A0B631BD}" destId="{3E974AE7-F6F7-44CE-AA7A-02FBDD58B1F1}" srcOrd="2" destOrd="0" parTransId="{0B1B9D87-069F-4C74-8A0B-950CD6773332}" sibTransId="{73096607-54D9-4500-9B80-0F6BD95D4725}"/>
-    <dgm:cxn modelId="{801CC257-8EC3-43DF-8DA1-6CFC36AAD2A3}" srcId="{E967B93F-BC7F-4FB4-BC87-6392A0B631BD}" destId="{3A128CF5-9AE7-4EAC-9485-E88F8BE77004}" srcOrd="1" destOrd="0" parTransId="{8B28C7C3-F1D0-4BA1-9C4B-79E975C3D84A}" sibTransId="{6842B30A-4C8A-4177-9D91-676F7D95EFE3}"/>
-    <dgm:cxn modelId="{157A1A7C-BF9C-4030-A3D2-FC015CDAB6FE}" srcId="{E967B93F-BC7F-4FB4-BC87-6392A0B631BD}" destId="{A79E2A2D-7F2D-43CD-89C5-4F06702239C7}" srcOrd="0" destOrd="0" parTransId="{80084990-0EF9-4F24-80B5-B857B4647FC3}" sibTransId="{56F09064-C6D9-41DF-9B01-CB0B167CEDEB}"/>
     <dgm:cxn modelId="{E919CC95-27B8-4C68-8343-831B7888018A}" type="presOf" srcId="{3A128CF5-9AE7-4EAC-9485-E88F8BE77004}" destId="{FF94DD58-C0AC-4F2E-B336-D810E8C84263}" srcOrd="0" destOrd="0" presId="urn:microsoft.com/office/officeart/2009/layout/CircleArrowProcess"/>
     <dgm:cxn modelId="{EAD55AA6-A136-4C50-8B79-CC6B400CC981}" type="presOf" srcId="{E967B93F-BC7F-4FB4-BC87-6392A0B631BD}" destId="{71406755-23F2-4109-BA41-146F988774CB}" srcOrd="0" destOrd="0" presId="urn:microsoft.com/office/officeart/2009/layout/CircleArrowProcess"/>
     <dgm:cxn modelId="{3F5E1DE0-0383-48CC-9203-6C9AD5C5267D}" type="presOf" srcId="{3E974AE7-F6F7-44CE-AA7A-02FBDD58B1F1}" destId="{90083342-A34C-49F2-A9E2-A7E389073F00}" srcOrd="0" destOrd="0" presId="urn:microsoft.com/office/officeart/2009/layout/CircleArrowProcess"/>
+    <dgm:cxn modelId="{157A1A7C-BF9C-4030-A3D2-FC015CDAB6FE}" srcId="{E967B93F-BC7F-4FB4-BC87-6392A0B631BD}" destId="{A79E2A2D-7F2D-43CD-89C5-4F06702239C7}" srcOrd="0" destOrd="0" parTransId="{80084990-0EF9-4F24-80B5-B857B4647FC3}" sibTransId="{56F09064-C6D9-41DF-9B01-CB0B167CEDEB}"/>
+    <dgm:cxn modelId="{D240A36B-F62A-4C70-9CAD-58226B0BD43D}" srcId="{E967B93F-BC7F-4FB4-BC87-6392A0B631BD}" destId="{3E974AE7-F6F7-44CE-AA7A-02FBDD58B1F1}" srcOrd="2" destOrd="0" parTransId="{0B1B9D87-069F-4C74-8A0B-950CD6773332}" sibTransId="{73096607-54D9-4500-9B80-0F6BD95D4725}"/>
+    <dgm:cxn modelId="{801CC257-8EC3-43DF-8DA1-6CFC36AAD2A3}" srcId="{E967B93F-BC7F-4FB4-BC87-6392A0B631BD}" destId="{3A128CF5-9AE7-4EAC-9485-E88F8BE77004}" srcOrd="1" destOrd="0" parTransId="{8B28C7C3-F1D0-4BA1-9C4B-79E975C3D84A}" sibTransId="{6842B30A-4C8A-4177-9D91-676F7D95EFE3}"/>
     <dgm:cxn modelId="{CF176182-E8A3-4225-A216-451BAF65A36F}" type="presParOf" srcId="{71406755-23F2-4109-BA41-146F988774CB}" destId="{C85ED1F6-1417-4DD8-9F0B-B522CDE30503}" srcOrd="0" destOrd="0" presId="urn:microsoft.com/office/officeart/2009/layout/CircleArrowProcess"/>
     <dgm:cxn modelId="{981AAF99-5CEA-4325-83DB-F7B976729878}" type="presParOf" srcId="{C85ED1F6-1417-4DD8-9F0B-B522CDE30503}" destId="{C215277F-04B7-4D4C-9F84-0EFFD842F138}" srcOrd="0" destOrd="0" presId="urn:microsoft.com/office/officeart/2009/layout/CircleArrowProcess"/>
     <dgm:cxn modelId="{0382EFEC-3211-418D-AAB6-6AFF1D404234}" type="presParOf" srcId="{71406755-23F2-4109-BA41-146F988774CB}" destId="{DE40A598-37E1-4A8B-B30A-361891655E32}" srcOrd="1" destOrd="0" presId="urn:microsoft.com/office/officeart/2009/layout/CircleArrowProcess"/>
@@ -3955,6 +4011,13 @@
         </dgm:presLayoutVars>
       </dgm:prSet>
       <dgm:spPr/>
+      <dgm:t>
+        <a:bodyPr/>
+        <a:lstStyle/>
+        <a:p>
+          <a:endParaRPr lang="sv-SE"/>
+        </a:p>
+      </dgm:t>
     </dgm:pt>
     <dgm:pt modelId="{C85ED1F6-1417-4DD8-9F0B-B522CDE30503}" type="pres">
       <dgm:prSet presAssocID="{A79E2A2D-7F2D-43CD-89C5-4F06702239C7}" presName="Accent1" presStyleCnt="0"/>
@@ -3973,6 +4036,13 @@
         </dgm:presLayoutVars>
       </dgm:prSet>
       <dgm:spPr/>
+      <dgm:t>
+        <a:bodyPr/>
+        <a:lstStyle/>
+        <a:p>
+          <a:endParaRPr lang="sv-SE"/>
+        </a:p>
+      </dgm:t>
     </dgm:pt>
     <dgm:pt modelId="{9E66601F-5507-4159-89CD-FE8318C483CA}" type="pres">
       <dgm:prSet presAssocID="{3A128CF5-9AE7-4EAC-9485-E88F8BE77004}" presName="Accent2" presStyleCnt="0"/>
@@ -3991,6 +4061,13 @@
         </dgm:presLayoutVars>
       </dgm:prSet>
       <dgm:spPr/>
+      <dgm:t>
+        <a:bodyPr/>
+        <a:lstStyle/>
+        <a:p>
+          <a:endParaRPr lang="sv-SE"/>
+        </a:p>
+      </dgm:t>
     </dgm:pt>
     <dgm:pt modelId="{2D7E4C0B-382B-42B1-A371-45C4C315ACE4}" type="pres">
       <dgm:prSet presAssocID="{3E974AE7-F6F7-44CE-AA7A-02FBDD58B1F1}" presName="Accent3" presStyleCnt="0"/>
@@ -4009,16 +4086,23 @@
         </dgm:presLayoutVars>
       </dgm:prSet>
       <dgm:spPr/>
+      <dgm:t>
+        <a:bodyPr/>
+        <a:lstStyle/>
+        <a:p>
+          <a:endParaRPr lang="sv-SE"/>
+        </a:p>
+      </dgm:t>
     </dgm:pt>
   </dgm:ptLst>
   <dgm:cxnLst>
     <dgm:cxn modelId="{103B3A60-C213-4827-853E-FA5096CF201C}" type="presOf" srcId="{3E974AE7-F6F7-44CE-AA7A-02FBDD58B1F1}" destId="{90083342-A34C-49F2-A9E2-A7E389073F00}" srcOrd="0" destOrd="0" presId="urn:microsoft.com/office/officeart/2009/layout/CircleArrowProcess"/>
+    <dgm:cxn modelId="{157A1A7C-BF9C-4030-A3D2-FC015CDAB6FE}" srcId="{E967B93F-BC7F-4FB4-BC87-6392A0B631BD}" destId="{A79E2A2D-7F2D-43CD-89C5-4F06702239C7}" srcOrd="0" destOrd="0" parTransId="{80084990-0EF9-4F24-80B5-B857B4647FC3}" sibTransId="{56F09064-C6D9-41DF-9B01-CB0B167CEDEB}"/>
+    <dgm:cxn modelId="{278F84EA-CF0B-414C-B45F-94E89A5CD16B}" type="presOf" srcId="{E967B93F-BC7F-4FB4-BC87-6392A0B631BD}" destId="{71406755-23F2-4109-BA41-146F988774CB}" srcOrd="0" destOrd="0" presId="urn:microsoft.com/office/officeart/2009/layout/CircleArrowProcess"/>
+    <dgm:cxn modelId="{2819B5DB-1C08-447F-82FA-A53AB9AA54A5}" type="presOf" srcId="{A79E2A2D-7F2D-43CD-89C5-4F06702239C7}" destId="{DE40A598-37E1-4A8B-B30A-361891655E32}" srcOrd="0" destOrd="0" presId="urn:microsoft.com/office/officeart/2009/layout/CircleArrowProcess"/>
     <dgm:cxn modelId="{3F38DC68-3BC1-4923-B0DA-6ABFD5E441E6}" type="presOf" srcId="{3A128CF5-9AE7-4EAC-9485-E88F8BE77004}" destId="{FF94DD58-C0AC-4F2E-B336-D810E8C84263}" srcOrd="0" destOrd="0" presId="urn:microsoft.com/office/officeart/2009/layout/CircleArrowProcess"/>
     <dgm:cxn modelId="{D240A36B-F62A-4C70-9CAD-58226B0BD43D}" srcId="{E967B93F-BC7F-4FB4-BC87-6392A0B631BD}" destId="{3E974AE7-F6F7-44CE-AA7A-02FBDD58B1F1}" srcOrd="2" destOrd="0" parTransId="{0B1B9D87-069F-4C74-8A0B-950CD6773332}" sibTransId="{73096607-54D9-4500-9B80-0F6BD95D4725}"/>
     <dgm:cxn modelId="{801CC257-8EC3-43DF-8DA1-6CFC36AAD2A3}" srcId="{E967B93F-BC7F-4FB4-BC87-6392A0B631BD}" destId="{3A128CF5-9AE7-4EAC-9485-E88F8BE77004}" srcOrd="1" destOrd="0" parTransId="{8B28C7C3-F1D0-4BA1-9C4B-79E975C3D84A}" sibTransId="{6842B30A-4C8A-4177-9D91-676F7D95EFE3}"/>
-    <dgm:cxn modelId="{157A1A7C-BF9C-4030-A3D2-FC015CDAB6FE}" srcId="{E967B93F-BC7F-4FB4-BC87-6392A0B631BD}" destId="{A79E2A2D-7F2D-43CD-89C5-4F06702239C7}" srcOrd="0" destOrd="0" parTransId="{80084990-0EF9-4F24-80B5-B857B4647FC3}" sibTransId="{56F09064-C6D9-41DF-9B01-CB0B167CEDEB}"/>
-    <dgm:cxn modelId="{2819B5DB-1C08-447F-82FA-A53AB9AA54A5}" type="presOf" srcId="{A79E2A2D-7F2D-43CD-89C5-4F06702239C7}" destId="{DE40A598-37E1-4A8B-B30A-361891655E32}" srcOrd="0" destOrd="0" presId="urn:microsoft.com/office/officeart/2009/layout/CircleArrowProcess"/>
-    <dgm:cxn modelId="{278F84EA-CF0B-414C-B45F-94E89A5CD16B}" type="presOf" srcId="{E967B93F-BC7F-4FB4-BC87-6392A0B631BD}" destId="{71406755-23F2-4109-BA41-146F988774CB}" srcOrd="0" destOrd="0" presId="urn:microsoft.com/office/officeart/2009/layout/CircleArrowProcess"/>
     <dgm:cxn modelId="{A8EAE903-A8CE-4773-BB2B-45A11FE2157D}" type="presParOf" srcId="{71406755-23F2-4109-BA41-146F988774CB}" destId="{C85ED1F6-1417-4DD8-9F0B-B522CDE30503}" srcOrd="0" destOrd="0" presId="urn:microsoft.com/office/officeart/2009/layout/CircleArrowProcess"/>
     <dgm:cxn modelId="{5E39C4BD-E42F-4FDB-A0E9-1E3DEDD2CB3A}" type="presParOf" srcId="{C85ED1F6-1417-4DD8-9F0B-B522CDE30503}" destId="{C215277F-04B7-4D4C-9F84-0EFFD842F138}" srcOrd="0" destOrd="0" presId="urn:microsoft.com/office/officeart/2009/layout/CircleArrowProcess"/>
     <dgm:cxn modelId="{3AD4A5DD-ADC8-48E7-BF40-3415A2B5657A}" type="presParOf" srcId="{71406755-23F2-4109-BA41-146F988774CB}" destId="{DE40A598-37E1-4A8B-B30A-361891655E32}" srcOrd="1" destOrd="0" presId="urn:microsoft.com/office/officeart/2009/layout/CircleArrowProcess"/>
@@ -4174,6 +4258,13 @@
         </dgm:presLayoutVars>
       </dgm:prSet>
       <dgm:spPr/>
+      <dgm:t>
+        <a:bodyPr/>
+        <a:lstStyle/>
+        <a:p>
+          <a:endParaRPr lang="sv-SE"/>
+        </a:p>
+      </dgm:t>
     </dgm:pt>
     <dgm:pt modelId="{C85ED1F6-1417-4DD8-9F0B-B522CDE30503}" type="pres">
       <dgm:prSet presAssocID="{A79E2A2D-7F2D-43CD-89C5-4F06702239C7}" presName="Accent1" presStyleCnt="0"/>
@@ -4192,6 +4283,13 @@
         </dgm:presLayoutVars>
       </dgm:prSet>
       <dgm:spPr/>
+      <dgm:t>
+        <a:bodyPr/>
+        <a:lstStyle/>
+        <a:p>
+          <a:endParaRPr lang="sv-SE"/>
+        </a:p>
+      </dgm:t>
     </dgm:pt>
     <dgm:pt modelId="{9E66601F-5507-4159-89CD-FE8318C483CA}" type="pres">
       <dgm:prSet presAssocID="{3A128CF5-9AE7-4EAC-9485-E88F8BE77004}" presName="Accent2" presStyleCnt="0"/>
@@ -4210,6 +4308,13 @@
         </dgm:presLayoutVars>
       </dgm:prSet>
       <dgm:spPr/>
+      <dgm:t>
+        <a:bodyPr/>
+        <a:lstStyle/>
+        <a:p>
+          <a:endParaRPr lang="sv-SE"/>
+        </a:p>
+      </dgm:t>
     </dgm:pt>
     <dgm:pt modelId="{2D7E4C0B-382B-42B1-A371-45C4C315ACE4}" type="pres">
       <dgm:prSet presAssocID="{3E974AE7-F6F7-44CE-AA7A-02FBDD58B1F1}" presName="Accent3" presStyleCnt="0"/>
@@ -4228,16 +4333,23 @@
         </dgm:presLayoutVars>
       </dgm:prSet>
       <dgm:spPr/>
+      <dgm:t>
+        <a:bodyPr/>
+        <a:lstStyle/>
+        <a:p>
+          <a:endParaRPr lang="sv-SE"/>
+        </a:p>
+      </dgm:t>
     </dgm:pt>
   </dgm:ptLst>
   <dgm:cxnLst>
+    <dgm:cxn modelId="{0CF490D5-4FC5-4FD2-80CA-22AC293CC9C5}" type="presOf" srcId="{3E974AE7-F6F7-44CE-AA7A-02FBDD58B1F1}" destId="{90083342-A34C-49F2-A9E2-A7E389073F00}" srcOrd="0" destOrd="0" presId="urn:microsoft.com/office/officeart/2009/layout/CircleArrowProcess"/>
     <dgm:cxn modelId="{DAA54803-BAA8-46A2-B693-8800EEF81E2D}" type="presOf" srcId="{3A128CF5-9AE7-4EAC-9485-E88F8BE77004}" destId="{FF94DD58-C0AC-4F2E-B336-D810E8C84263}" srcOrd="0" destOrd="0" presId="urn:microsoft.com/office/officeart/2009/layout/CircleArrowProcess"/>
+    <dgm:cxn modelId="{157A1A7C-BF9C-4030-A3D2-FC015CDAB6FE}" srcId="{E967B93F-BC7F-4FB4-BC87-6392A0B631BD}" destId="{A79E2A2D-7F2D-43CD-89C5-4F06702239C7}" srcOrd="0" destOrd="0" parTransId="{80084990-0EF9-4F24-80B5-B857B4647FC3}" sibTransId="{56F09064-C6D9-41DF-9B01-CB0B167CEDEB}"/>
+    <dgm:cxn modelId="{D240A36B-F62A-4C70-9CAD-58226B0BD43D}" srcId="{E967B93F-BC7F-4FB4-BC87-6392A0B631BD}" destId="{3E974AE7-F6F7-44CE-AA7A-02FBDD58B1F1}" srcOrd="2" destOrd="0" parTransId="{0B1B9D87-069F-4C74-8A0B-950CD6773332}" sibTransId="{73096607-54D9-4500-9B80-0F6BD95D4725}"/>
+    <dgm:cxn modelId="{F6128391-6C10-4DB8-8E61-FB636FA7803B}" type="presOf" srcId="{A79E2A2D-7F2D-43CD-89C5-4F06702239C7}" destId="{DE40A598-37E1-4A8B-B30A-361891655E32}" srcOrd="0" destOrd="0" presId="urn:microsoft.com/office/officeart/2009/layout/CircleArrowProcess"/>
     <dgm:cxn modelId="{D92D1413-62FC-4A92-B658-FA81F646084F}" type="presOf" srcId="{E967B93F-BC7F-4FB4-BC87-6392A0B631BD}" destId="{71406755-23F2-4109-BA41-146F988774CB}" srcOrd="0" destOrd="0" presId="urn:microsoft.com/office/officeart/2009/layout/CircleArrowProcess"/>
-    <dgm:cxn modelId="{D240A36B-F62A-4C70-9CAD-58226B0BD43D}" srcId="{E967B93F-BC7F-4FB4-BC87-6392A0B631BD}" destId="{3E974AE7-F6F7-44CE-AA7A-02FBDD58B1F1}" srcOrd="2" destOrd="0" parTransId="{0B1B9D87-069F-4C74-8A0B-950CD6773332}" sibTransId="{73096607-54D9-4500-9B80-0F6BD95D4725}"/>
     <dgm:cxn modelId="{801CC257-8EC3-43DF-8DA1-6CFC36AAD2A3}" srcId="{E967B93F-BC7F-4FB4-BC87-6392A0B631BD}" destId="{3A128CF5-9AE7-4EAC-9485-E88F8BE77004}" srcOrd="1" destOrd="0" parTransId="{8B28C7C3-F1D0-4BA1-9C4B-79E975C3D84A}" sibTransId="{6842B30A-4C8A-4177-9D91-676F7D95EFE3}"/>
-    <dgm:cxn modelId="{157A1A7C-BF9C-4030-A3D2-FC015CDAB6FE}" srcId="{E967B93F-BC7F-4FB4-BC87-6392A0B631BD}" destId="{A79E2A2D-7F2D-43CD-89C5-4F06702239C7}" srcOrd="0" destOrd="0" parTransId="{80084990-0EF9-4F24-80B5-B857B4647FC3}" sibTransId="{56F09064-C6D9-41DF-9B01-CB0B167CEDEB}"/>
-    <dgm:cxn modelId="{F6128391-6C10-4DB8-8E61-FB636FA7803B}" type="presOf" srcId="{A79E2A2D-7F2D-43CD-89C5-4F06702239C7}" destId="{DE40A598-37E1-4A8B-B30A-361891655E32}" srcOrd="0" destOrd="0" presId="urn:microsoft.com/office/officeart/2009/layout/CircleArrowProcess"/>
-    <dgm:cxn modelId="{0CF490D5-4FC5-4FD2-80CA-22AC293CC9C5}" type="presOf" srcId="{3E974AE7-F6F7-44CE-AA7A-02FBDD58B1F1}" destId="{90083342-A34C-49F2-A9E2-A7E389073F00}" srcOrd="0" destOrd="0" presId="urn:microsoft.com/office/officeart/2009/layout/CircleArrowProcess"/>
     <dgm:cxn modelId="{02AEF925-D09B-4AE5-AB07-5090D9B2AF66}" type="presParOf" srcId="{71406755-23F2-4109-BA41-146F988774CB}" destId="{C85ED1F6-1417-4DD8-9F0B-B522CDE30503}" srcOrd="0" destOrd="0" presId="urn:microsoft.com/office/officeart/2009/layout/CircleArrowProcess"/>
     <dgm:cxn modelId="{02284FAC-3C1A-4BBB-A07D-5028EEF9C545}" type="presParOf" srcId="{C85ED1F6-1417-4DD8-9F0B-B522CDE30503}" destId="{C215277F-04B7-4D4C-9F84-0EFFD842F138}" srcOrd="0" destOrd="0" presId="urn:microsoft.com/office/officeart/2009/layout/CircleArrowProcess"/>
     <dgm:cxn modelId="{262A2359-396F-4B4C-9A19-09B22DF2AB3F}" type="presParOf" srcId="{71406755-23F2-4109-BA41-146F988774CB}" destId="{DE40A598-37E1-4A8B-B30A-361891655E32}" srcOrd="1" destOrd="0" presId="urn:microsoft.com/office/officeart/2009/layout/CircleArrowProcess"/>
@@ -4360,7 +4472,7 @@
         </a:bodyPr>
         <a:lstStyle/>
         <a:p>
-          <a:pPr marL="0" lvl="0" indent="0" algn="ctr" defTabSz="1555750">
+          <a:pPr lvl="0" algn="ctr" defTabSz="1555750">
             <a:lnSpc>
               <a:spcPct val="90000"/>
             </a:lnSpc>
@@ -4370,7 +4482,6 @@
             <a:spcAft>
               <a:spcPct val="35000"/>
             </a:spcAft>
-            <a:buNone/>
           </a:pPr>
           <a:r>
             <a:rPr lang="sv-SE" sz="3500" kern="1200" dirty="0"/>
@@ -4478,7 +4589,7 @@
         </a:bodyPr>
         <a:lstStyle/>
         <a:p>
-          <a:pPr marL="0" lvl="0" indent="0" algn="ctr" defTabSz="1555750">
+          <a:pPr lvl="0" algn="ctr" defTabSz="1555750">
             <a:lnSpc>
               <a:spcPct val="90000"/>
             </a:lnSpc>
@@ -4488,7 +4599,6 @@
             <a:spcAft>
               <a:spcPct val="35000"/>
             </a:spcAft>
-            <a:buNone/>
           </a:pPr>
           <a:r>
             <a:rPr lang="sv-SE" sz="3500" kern="1200" dirty="0"/>
@@ -4594,7 +4704,7 @@
         </a:bodyPr>
         <a:lstStyle/>
         <a:p>
-          <a:pPr marL="0" lvl="0" indent="0" algn="ctr" defTabSz="1555750">
+          <a:pPr lvl="0" algn="ctr" defTabSz="1555750">
             <a:lnSpc>
               <a:spcPct val="90000"/>
             </a:lnSpc>
@@ -4604,7 +4714,6 @@
             <a:spcAft>
               <a:spcPct val="35000"/>
             </a:spcAft>
-            <a:buNone/>
           </a:pPr>
           <a:r>
             <a:rPr lang="sv-SE" sz="3500" kern="1200" dirty="0"/>
@@ -4724,7 +4833,7 @@
         </a:bodyPr>
         <a:lstStyle/>
         <a:p>
-          <a:pPr marL="0" lvl="0" indent="0" algn="ctr" defTabSz="1555750">
+          <a:pPr lvl="0" algn="ctr" defTabSz="1555750">
             <a:lnSpc>
               <a:spcPct val="90000"/>
             </a:lnSpc>
@@ -4734,7 +4843,6 @@
             <a:spcAft>
               <a:spcPct val="35000"/>
             </a:spcAft>
-            <a:buNone/>
           </a:pPr>
           <a:r>
             <a:rPr lang="sv-SE" sz="3500" kern="1200" dirty="0"/>
@@ -4842,7 +4950,7 @@
         </a:bodyPr>
         <a:lstStyle/>
         <a:p>
-          <a:pPr marL="0" lvl="0" indent="0" algn="ctr" defTabSz="1555750">
+          <a:pPr lvl="0" algn="ctr" defTabSz="1555750">
             <a:lnSpc>
               <a:spcPct val="90000"/>
             </a:lnSpc>
@@ -4852,7 +4960,6 @@
             <a:spcAft>
               <a:spcPct val="35000"/>
             </a:spcAft>
-            <a:buNone/>
           </a:pPr>
           <a:r>
             <a:rPr lang="sv-SE" sz="3500" kern="1200" dirty="0"/>
@@ -4958,7 +5065,7 @@
         </a:bodyPr>
         <a:lstStyle/>
         <a:p>
-          <a:pPr marL="0" lvl="0" indent="0" algn="ctr" defTabSz="1555750">
+          <a:pPr lvl="0" algn="ctr" defTabSz="1555750">
             <a:lnSpc>
               <a:spcPct val="90000"/>
             </a:lnSpc>
@@ -4968,7 +5075,6 @@
             <a:spcAft>
               <a:spcPct val="35000"/>
             </a:spcAft>
-            <a:buNone/>
           </a:pPr>
           <a:r>
             <a:rPr lang="sv-SE" sz="3500" kern="1200" dirty="0"/>
@@ -5088,7 +5194,7 @@
         </a:bodyPr>
         <a:lstStyle/>
         <a:p>
-          <a:pPr marL="0" lvl="0" indent="0" algn="ctr" defTabSz="1555750">
+          <a:pPr lvl="0" algn="ctr" defTabSz="1555750">
             <a:lnSpc>
               <a:spcPct val="90000"/>
             </a:lnSpc>
@@ -5098,7 +5204,6 @@
             <a:spcAft>
               <a:spcPct val="35000"/>
             </a:spcAft>
-            <a:buNone/>
           </a:pPr>
           <a:r>
             <a:rPr lang="sv-SE" sz="3500" kern="1200" dirty="0"/>
@@ -5206,7 +5311,7 @@
         </a:bodyPr>
         <a:lstStyle/>
         <a:p>
-          <a:pPr marL="0" lvl="0" indent="0" algn="ctr" defTabSz="1555750">
+          <a:pPr lvl="0" algn="ctr" defTabSz="1555750">
             <a:lnSpc>
               <a:spcPct val="90000"/>
             </a:lnSpc>
@@ -5216,7 +5321,6 @@
             <a:spcAft>
               <a:spcPct val="35000"/>
             </a:spcAft>
-            <a:buNone/>
           </a:pPr>
           <a:r>
             <a:rPr lang="sv-SE" sz="3500" kern="1200" dirty="0"/>
@@ -5322,7 +5426,7 @@
         </a:bodyPr>
         <a:lstStyle/>
         <a:p>
-          <a:pPr marL="0" lvl="0" indent="0" algn="ctr" defTabSz="1555750">
+          <a:pPr lvl="0" algn="ctr" defTabSz="1555750">
             <a:lnSpc>
               <a:spcPct val="90000"/>
             </a:lnSpc>
@@ -5332,7 +5436,6 @@
             <a:spcAft>
               <a:spcPct val="35000"/>
             </a:spcAft>
-            <a:buNone/>
           </a:pPr>
           <a:r>
             <a:rPr lang="sv-SE" sz="3500" kern="1200" dirty="0"/>
@@ -5452,7 +5555,7 @@
         </a:bodyPr>
         <a:lstStyle/>
         <a:p>
-          <a:pPr marL="0" lvl="0" indent="0" algn="ctr" defTabSz="1555750">
+          <a:pPr lvl="0" algn="ctr" defTabSz="1555750">
             <a:lnSpc>
               <a:spcPct val="90000"/>
             </a:lnSpc>
@@ -5462,7 +5565,6 @@
             <a:spcAft>
               <a:spcPct val="35000"/>
             </a:spcAft>
-            <a:buNone/>
           </a:pPr>
           <a:r>
             <a:rPr lang="sv-SE" sz="3500" kern="1200" dirty="0"/>
@@ -5570,7 +5672,7 @@
         </a:bodyPr>
         <a:lstStyle/>
         <a:p>
-          <a:pPr marL="0" lvl="0" indent="0" algn="ctr" defTabSz="1555750">
+          <a:pPr lvl="0" algn="ctr" defTabSz="1555750">
             <a:lnSpc>
               <a:spcPct val="90000"/>
             </a:lnSpc>
@@ -5580,7 +5682,6 @@
             <a:spcAft>
               <a:spcPct val="35000"/>
             </a:spcAft>
-            <a:buNone/>
           </a:pPr>
           <a:r>
             <a:rPr lang="sv-SE" sz="3500" kern="1200" dirty="0"/>
@@ -5686,7 +5787,7 @@
         </a:bodyPr>
         <a:lstStyle/>
         <a:p>
-          <a:pPr marL="0" lvl="0" indent="0" algn="ctr" defTabSz="1555750">
+          <a:pPr lvl="0" algn="ctr" defTabSz="1555750">
             <a:lnSpc>
               <a:spcPct val="90000"/>
             </a:lnSpc>
@@ -5696,7 +5797,6 @@
             <a:spcAft>
               <a:spcPct val="35000"/>
             </a:spcAft>
-            <a:buNone/>
           </a:pPr>
           <a:r>
             <a:rPr lang="sv-SE" sz="3500" kern="1200" dirty="0"/>
@@ -18176,7 +18276,7 @@
           <p:cNvPr id="2" name="Title 1">
             <a:extLst>
               <a:ext uri="{FF2B5EF4-FFF2-40B4-BE49-F238E27FC236}">
-                <a16:creationId xmlns:a16="http://schemas.microsoft.com/office/drawing/2014/main" id="{38809996-FD0E-4D06-9105-CA4D02CD18B8}"/>
+                <a16:creationId xmlns:a16="http://schemas.microsoft.com/office/drawing/2014/main" xmlns="" id="{38809996-FD0E-4D06-9105-CA4D02CD18B8}"/>
               </a:ext>
             </a:extLst>
           </p:cNvPr>
@@ -18213,7 +18313,7 @@
           <p:cNvPr id="3" name="Subtitle 2">
             <a:extLst>
               <a:ext uri="{FF2B5EF4-FFF2-40B4-BE49-F238E27FC236}">
-                <a16:creationId xmlns:a16="http://schemas.microsoft.com/office/drawing/2014/main" id="{F4B5C0B2-8A4C-4F8A-950C-1720ED26E84E}"/>
+                <a16:creationId xmlns:a16="http://schemas.microsoft.com/office/drawing/2014/main" xmlns="" id="{F4B5C0B2-8A4C-4F8A-950C-1720ED26E84E}"/>
               </a:ext>
             </a:extLst>
           </p:cNvPr>
@@ -18283,7 +18383,7 @@
           <p:cNvPr id="4" name="Date Placeholder 3">
             <a:extLst>
               <a:ext uri="{FF2B5EF4-FFF2-40B4-BE49-F238E27FC236}">
-                <a16:creationId xmlns:a16="http://schemas.microsoft.com/office/drawing/2014/main" id="{3F9EBE98-590E-4431-AB5E-9B0B41A8A01E}"/>
+                <a16:creationId xmlns:a16="http://schemas.microsoft.com/office/drawing/2014/main" xmlns="" id="{3F9EBE98-590E-4431-AB5E-9B0B41A8A01E}"/>
               </a:ext>
             </a:extLst>
           </p:cNvPr>
@@ -18301,7 +18401,7 @@
           <a:p>
             <a:fld id="{CACABD52-BF91-4CCE-9EEC-6A02225A646E}" type="datetimeFigureOut">
               <a:rPr lang="en-US" smtClean="0"/>
-              <a:t>2017-12-28</a:t>
+              <a:t>12/30/2017</a:t>
             </a:fld>
             <a:endParaRPr lang="en-US"/>
           </a:p>
@@ -18312,7 +18412,7 @@
           <p:cNvPr id="5" name="Footer Placeholder 4">
             <a:extLst>
               <a:ext uri="{FF2B5EF4-FFF2-40B4-BE49-F238E27FC236}">
-                <a16:creationId xmlns:a16="http://schemas.microsoft.com/office/drawing/2014/main" id="{9079E9AE-9DD9-4CDB-BB86-1AAC9BD03C3A}"/>
+                <a16:creationId xmlns:a16="http://schemas.microsoft.com/office/drawing/2014/main" xmlns="" id="{9079E9AE-9DD9-4CDB-BB86-1AAC9BD03C3A}"/>
               </a:ext>
             </a:extLst>
           </p:cNvPr>
@@ -18337,7 +18437,7 @@
           <p:cNvPr id="6" name="Slide Number Placeholder 5">
             <a:extLst>
               <a:ext uri="{FF2B5EF4-FFF2-40B4-BE49-F238E27FC236}">
-                <a16:creationId xmlns:a16="http://schemas.microsoft.com/office/drawing/2014/main" id="{FC4A9CAB-8CD4-4C79-BA87-3E9312D0C8A8}"/>
+                <a16:creationId xmlns:a16="http://schemas.microsoft.com/office/drawing/2014/main" xmlns="" id="{FC4A9CAB-8CD4-4C79-BA87-3E9312D0C8A8}"/>
               </a:ext>
             </a:extLst>
           </p:cNvPr>
@@ -18396,7 +18496,7 @@
           <p:cNvPr id="2" name="Title 1">
             <a:extLst>
               <a:ext uri="{FF2B5EF4-FFF2-40B4-BE49-F238E27FC236}">
-                <a16:creationId xmlns:a16="http://schemas.microsoft.com/office/drawing/2014/main" id="{44AAC031-47FD-42F7-98FD-EF67FAFD8504}"/>
+                <a16:creationId xmlns:a16="http://schemas.microsoft.com/office/drawing/2014/main" xmlns="" id="{44AAC031-47FD-42F7-98FD-EF67FAFD8504}"/>
               </a:ext>
             </a:extLst>
           </p:cNvPr>
@@ -18424,7 +18524,7 @@
           <p:cNvPr id="3" name="Vertical Text Placeholder 2">
             <a:extLst>
               <a:ext uri="{FF2B5EF4-FFF2-40B4-BE49-F238E27FC236}">
-                <a16:creationId xmlns:a16="http://schemas.microsoft.com/office/drawing/2014/main" id="{F940540A-38C9-42A6-88EE-93C27F9CF251}"/>
+                <a16:creationId xmlns:a16="http://schemas.microsoft.com/office/drawing/2014/main" xmlns="" id="{F940540A-38C9-42A6-88EE-93C27F9CF251}"/>
               </a:ext>
             </a:extLst>
           </p:cNvPr>
@@ -18481,7 +18581,7 @@
           <p:cNvPr id="4" name="Date Placeholder 3">
             <a:extLst>
               <a:ext uri="{FF2B5EF4-FFF2-40B4-BE49-F238E27FC236}">
-                <a16:creationId xmlns:a16="http://schemas.microsoft.com/office/drawing/2014/main" id="{7BBA4C03-528E-42F3-B006-6C00F986D9A0}"/>
+                <a16:creationId xmlns:a16="http://schemas.microsoft.com/office/drawing/2014/main" xmlns="" id="{7BBA4C03-528E-42F3-B006-6C00F986D9A0}"/>
               </a:ext>
             </a:extLst>
           </p:cNvPr>
@@ -18499,7 +18599,7 @@
           <a:p>
             <a:fld id="{CACABD52-BF91-4CCE-9EEC-6A02225A646E}" type="datetimeFigureOut">
               <a:rPr lang="en-US" smtClean="0"/>
-              <a:t>2017-12-28</a:t>
+              <a:t>12/30/2017</a:t>
             </a:fld>
             <a:endParaRPr lang="en-US"/>
           </a:p>
@@ -18510,7 +18610,7 @@
           <p:cNvPr id="5" name="Footer Placeholder 4">
             <a:extLst>
               <a:ext uri="{FF2B5EF4-FFF2-40B4-BE49-F238E27FC236}">
-                <a16:creationId xmlns:a16="http://schemas.microsoft.com/office/drawing/2014/main" id="{ED8875F2-E3C5-4AE4-A309-0392C9C665F7}"/>
+                <a16:creationId xmlns:a16="http://schemas.microsoft.com/office/drawing/2014/main" xmlns="" id="{ED8875F2-E3C5-4AE4-A309-0392C9C665F7}"/>
               </a:ext>
             </a:extLst>
           </p:cNvPr>
@@ -18535,7 +18635,7 @@
           <p:cNvPr id="6" name="Slide Number Placeholder 5">
             <a:extLst>
               <a:ext uri="{FF2B5EF4-FFF2-40B4-BE49-F238E27FC236}">
-                <a16:creationId xmlns:a16="http://schemas.microsoft.com/office/drawing/2014/main" id="{59901938-1E8B-4CBD-ADCC-73C8496F4D53}"/>
+                <a16:creationId xmlns:a16="http://schemas.microsoft.com/office/drawing/2014/main" xmlns="" id="{59901938-1E8B-4CBD-ADCC-73C8496F4D53}"/>
               </a:ext>
             </a:extLst>
           </p:cNvPr>
@@ -18594,7 +18694,7 @@
           <p:cNvPr id="2" name="Vertical Title 1">
             <a:extLst>
               <a:ext uri="{FF2B5EF4-FFF2-40B4-BE49-F238E27FC236}">
-                <a16:creationId xmlns:a16="http://schemas.microsoft.com/office/drawing/2014/main" id="{9B24AD40-9F90-441E-B3CD-06BCD4159D89}"/>
+                <a16:creationId xmlns:a16="http://schemas.microsoft.com/office/drawing/2014/main" xmlns="" id="{9B24AD40-9F90-441E-B3CD-06BCD4159D89}"/>
               </a:ext>
             </a:extLst>
           </p:cNvPr>
@@ -18627,7 +18727,7 @@
           <p:cNvPr id="3" name="Vertical Text Placeholder 2">
             <a:extLst>
               <a:ext uri="{FF2B5EF4-FFF2-40B4-BE49-F238E27FC236}">
-                <a16:creationId xmlns:a16="http://schemas.microsoft.com/office/drawing/2014/main" id="{B74361D9-50A9-49B2-AADE-3827E420C64B}"/>
+                <a16:creationId xmlns:a16="http://schemas.microsoft.com/office/drawing/2014/main" xmlns="" id="{B74361D9-50A9-49B2-AADE-3827E420C64B}"/>
               </a:ext>
             </a:extLst>
           </p:cNvPr>
@@ -18689,7 +18789,7 @@
           <p:cNvPr id="4" name="Date Placeholder 3">
             <a:extLst>
               <a:ext uri="{FF2B5EF4-FFF2-40B4-BE49-F238E27FC236}">
-                <a16:creationId xmlns:a16="http://schemas.microsoft.com/office/drawing/2014/main" id="{7F22F958-0D54-4BDA-999D-E0C058886540}"/>
+                <a16:creationId xmlns:a16="http://schemas.microsoft.com/office/drawing/2014/main" xmlns="" id="{7F22F958-0D54-4BDA-999D-E0C058886540}"/>
               </a:ext>
             </a:extLst>
           </p:cNvPr>
@@ -18707,7 +18807,7 @@
           <a:p>
             <a:fld id="{CACABD52-BF91-4CCE-9EEC-6A02225A646E}" type="datetimeFigureOut">
               <a:rPr lang="en-US" smtClean="0"/>
-              <a:t>2017-12-28</a:t>
+              <a:t>12/30/2017</a:t>
             </a:fld>
             <a:endParaRPr lang="en-US"/>
           </a:p>
@@ -18718,7 +18818,7 @@
           <p:cNvPr id="5" name="Footer Placeholder 4">
             <a:extLst>
               <a:ext uri="{FF2B5EF4-FFF2-40B4-BE49-F238E27FC236}">
-                <a16:creationId xmlns:a16="http://schemas.microsoft.com/office/drawing/2014/main" id="{D08C878B-2A4A-49CD-99FF-A2D91560EE82}"/>
+                <a16:creationId xmlns:a16="http://schemas.microsoft.com/office/drawing/2014/main" xmlns="" id="{D08C878B-2A4A-49CD-99FF-A2D91560EE82}"/>
               </a:ext>
             </a:extLst>
           </p:cNvPr>
@@ -18743,7 +18843,7 @@
           <p:cNvPr id="6" name="Slide Number Placeholder 5">
             <a:extLst>
               <a:ext uri="{FF2B5EF4-FFF2-40B4-BE49-F238E27FC236}">
-                <a16:creationId xmlns:a16="http://schemas.microsoft.com/office/drawing/2014/main" id="{7F6F18DB-03CB-4B93-A607-07373FECE861}"/>
+                <a16:creationId xmlns:a16="http://schemas.microsoft.com/office/drawing/2014/main" xmlns="" id="{7F6F18DB-03CB-4B93-A607-07373FECE861}"/>
               </a:ext>
             </a:extLst>
           </p:cNvPr>
@@ -18802,7 +18902,7 @@
           <p:cNvPr id="2" name="Title 1">
             <a:extLst>
               <a:ext uri="{FF2B5EF4-FFF2-40B4-BE49-F238E27FC236}">
-                <a16:creationId xmlns:a16="http://schemas.microsoft.com/office/drawing/2014/main" id="{8FB510DB-06DE-4AAA-BDD8-FA07F2218D44}"/>
+                <a16:creationId xmlns:a16="http://schemas.microsoft.com/office/drawing/2014/main" xmlns="" id="{8FB510DB-06DE-4AAA-BDD8-FA07F2218D44}"/>
               </a:ext>
             </a:extLst>
           </p:cNvPr>
@@ -18830,7 +18930,7 @@
           <p:cNvPr id="3" name="Content Placeholder 2">
             <a:extLst>
               <a:ext uri="{FF2B5EF4-FFF2-40B4-BE49-F238E27FC236}">
-                <a16:creationId xmlns:a16="http://schemas.microsoft.com/office/drawing/2014/main" id="{89739ADC-B421-43D0-BE43-47DFF5BFDE19}"/>
+                <a16:creationId xmlns:a16="http://schemas.microsoft.com/office/drawing/2014/main" xmlns="" id="{89739ADC-B421-43D0-BE43-47DFF5BFDE19}"/>
               </a:ext>
             </a:extLst>
           </p:cNvPr>
@@ -18887,7 +18987,7 @@
           <p:cNvPr id="4" name="Date Placeholder 3">
             <a:extLst>
               <a:ext uri="{FF2B5EF4-FFF2-40B4-BE49-F238E27FC236}">
-                <a16:creationId xmlns:a16="http://schemas.microsoft.com/office/drawing/2014/main" id="{1CB7D97A-A3BB-44A1-806C-A8AD62C7278F}"/>
+                <a16:creationId xmlns:a16="http://schemas.microsoft.com/office/drawing/2014/main" xmlns="" id="{1CB7D97A-A3BB-44A1-806C-A8AD62C7278F}"/>
               </a:ext>
             </a:extLst>
           </p:cNvPr>
@@ -18905,7 +19005,7 @@
           <a:p>
             <a:fld id="{CACABD52-BF91-4CCE-9EEC-6A02225A646E}" type="datetimeFigureOut">
               <a:rPr lang="en-US" smtClean="0"/>
-              <a:t>2017-12-28</a:t>
+              <a:t>12/30/2017</a:t>
             </a:fld>
             <a:endParaRPr lang="en-US"/>
           </a:p>
@@ -18916,7 +19016,7 @@
           <p:cNvPr id="5" name="Footer Placeholder 4">
             <a:extLst>
               <a:ext uri="{FF2B5EF4-FFF2-40B4-BE49-F238E27FC236}">
-                <a16:creationId xmlns:a16="http://schemas.microsoft.com/office/drawing/2014/main" id="{7DEAD42F-6AB4-4248-AC38-9039155A9DD0}"/>
+                <a16:creationId xmlns:a16="http://schemas.microsoft.com/office/drawing/2014/main" xmlns="" id="{7DEAD42F-6AB4-4248-AC38-9039155A9DD0}"/>
               </a:ext>
             </a:extLst>
           </p:cNvPr>
@@ -18941,7 +19041,7 @@
           <p:cNvPr id="6" name="Slide Number Placeholder 5">
             <a:extLst>
               <a:ext uri="{FF2B5EF4-FFF2-40B4-BE49-F238E27FC236}">
-                <a16:creationId xmlns:a16="http://schemas.microsoft.com/office/drawing/2014/main" id="{921A2A62-D7C3-461A-B4FA-673F07E09149}"/>
+                <a16:creationId xmlns:a16="http://schemas.microsoft.com/office/drawing/2014/main" xmlns="" id="{921A2A62-D7C3-461A-B4FA-673F07E09149}"/>
               </a:ext>
             </a:extLst>
           </p:cNvPr>
@@ -19000,7 +19100,7 @@
           <p:cNvPr id="2" name="Title 1">
             <a:extLst>
               <a:ext uri="{FF2B5EF4-FFF2-40B4-BE49-F238E27FC236}">
-                <a16:creationId xmlns:a16="http://schemas.microsoft.com/office/drawing/2014/main" id="{D3EC2B89-DE66-4A09-A1A8-0B5FBF95170B}"/>
+                <a16:creationId xmlns:a16="http://schemas.microsoft.com/office/drawing/2014/main" xmlns="" id="{D3EC2B89-DE66-4A09-A1A8-0B5FBF95170B}"/>
               </a:ext>
             </a:extLst>
           </p:cNvPr>
@@ -19037,7 +19137,7 @@
           <p:cNvPr id="3" name="Text Placeholder 2">
             <a:extLst>
               <a:ext uri="{FF2B5EF4-FFF2-40B4-BE49-F238E27FC236}">
-                <a16:creationId xmlns:a16="http://schemas.microsoft.com/office/drawing/2014/main" id="{8CED882E-A08F-4FF3-887F-2701DD1A3CEF}"/>
+                <a16:creationId xmlns:a16="http://schemas.microsoft.com/office/drawing/2014/main" xmlns="" id="{8CED882E-A08F-4FF3-887F-2701DD1A3CEF}"/>
               </a:ext>
             </a:extLst>
           </p:cNvPr>
@@ -19162,7 +19262,7 @@
           <p:cNvPr id="4" name="Date Placeholder 3">
             <a:extLst>
               <a:ext uri="{FF2B5EF4-FFF2-40B4-BE49-F238E27FC236}">
-                <a16:creationId xmlns:a16="http://schemas.microsoft.com/office/drawing/2014/main" id="{E1FD4AEF-2DAD-4E82-9A3B-1B5493C84A37}"/>
+                <a16:creationId xmlns:a16="http://schemas.microsoft.com/office/drawing/2014/main" xmlns="" id="{E1FD4AEF-2DAD-4E82-9A3B-1B5493C84A37}"/>
               </a:ext>
             </a:extLst>
           </p:cNvPr>
@@ -19180,7 +19280,7 @@
           <a:p>
             <a:fld id="{CACABD52-BF91-4CCE-9EEC-6A02225A646E}" type="datetimeFigureOut">
               <a:rPr lang="en-US" smtClean="0"/>
-              <a:t>2017-12-28</a:t>
+              <a:t>12/30/2017</a:t>
             </a:fld>
             <a:endParaRPr lang="en-US"/>
           </a:p>
@@ -19191,7 +19291,7 @@
           <p:cNvPr id="5" name="Footer Placeholder 4">
             <a:extLst>
               <a:ext uri="{FF2B5EF4-FFF2-40B4-BE49-F238E27FC236}">
-                <a16:creationId xmlns:a16="http://schemas.microsoft.com/office/drawing/2014/main" id="{F51F1357-D870-47CC-BEB9-41F9B9A25041}"/>
+                <a16:creationId xmlns:a16="http://schemas.microsoft.com/office/drawing/2014/main" xmlns="" id="{F51F1357-D870-47CC-BEB9-41F9B9A25041}"/>
               </a:ext>
             </a:extLst>
           </p:cNvPr>
@@ -19216,7 +19316,7 @@
           <p:cNvPr id="6" name="Slide Number Placeholder 5">
             <a:extLst>
               <a:ext uri="{FF2B5EF4-FFF2-40B4-BE49-F238E27FC236}">
-                <a16:creationId xmlns:a16="http://schemas.microsoft.com/office/drawing/2014/main" id="{A64956B2-B0C5-4472-92F3-5D4EECF7B18C}"/>
+                <a16:creationId xmlns:a16="http://schemas.microsoft.com/office/drawing/2014/main" xmlns="" id="{A64956B2-B0C5-4472-92F3-5D4EECF7B18C}"/>
               </a:ext>
             </a:extLst>
           </p:cNvPr>
@@ -19275,7 +19375,7 @@
           <p:cNvPr id="2" name="Title 1">
             <a:extLst>
               <a:ext uri="{FF2B5EF4-FFF2-40B4-BE49-F238E27FC236}">
-                <a16:creationId xmlns:a16="http://schemas.microsoft.com/office/drawing/2014/main" id="{EABFB98B-058E-4646-B2D2-41B744B1A0A4}"/>
+                <a16:creationId xmlns:a16="http://schemas.microsoft.com/office/drawing/2014/main" xmlns="" id="{EABFB98B-058E-4646-B2D2-41B744B1A0A4}"/>
               </a:ext>
             </a:extLst>
           </p:cNvPr>
@@ -19303,7 +19403,7 @@
           <p:cNvPr id="3" name="Content Placeholder 2">
             <a:extLst>
               <a:ext uri="{FF2B5EF4-FFF2-40B4-BE49-F238E27FC236}">
-                <a16:creationId xmlns:a16="http://schemas.microsoft.com/office/drawing/2014/main" id="{6803D61E-3276-408C-A6CF-DBCFECD13A3E}"/>
+                <a16:creationId xmlns:a16="http://schemas.microsoft.com/office/drawing/2014/main" xmlns="" id="{6803D61E-3276-408C-A6CF-DBCFECD13A3E}"/>
               </a:ext>
             </a:extLst>
           </p:cNvPr>
@@ -19365,7 +19465,7 @@
           <p:cNvPr id="4" name="Content Placeholder 3">
             <a:extLst>
               <a:ext uri="{FF2B5EF4-FFF2-40B4-BE49-F238E27FC236}">
-                <a16:creationId xmlns:a16="http://schemas.microsoft.com/office/drawing/2014/main" id="{61C32ADE-FE92-459B-9667-7D3E3CEACD34}"/>
+                <a16:creationId xmlns:a16="http://schemas.microsoft.com/office/drawing/2014/main" xmlns="" id="{61C32ADE-FE92-459B-9667-7D3E3CEACD34}"/>
               </a:ext>
             </a:extLst>
           </p:cNvPr>
@@ -19427,7 +19527,7 @@
           <p:cNvPr id="5" name="Date Placeholder 4">
             <a:extLst>
               <a:ext uri="{FF2B5EF4-FFF2-40B4-BE49-F238E27FC236}">
-                <a16:creationId xmlns:a16="http://schemas.microsoft.com/office/drawing/2014/main" id="{AA5C3425-1D21-4103-982C-CBB3F24532F8}"/>
+                <a16:creationId xmlns:a16="http://schemas.microsoft.com/office/drawing/2014/main" xmlns="" id="{AA5C3425-1D21-4103-982C-CBB3F24532F8}"/>
               </a:ext>
             </a:extLst>
           </p:cNvPr>
@@ -19445,7 +19545,7 @@
           <a:p>
             <a:fld id="{CACABD52-BF91-4CCE-9EEC-6A02225A646E}" type="datetimeFigureOut">
               <a:rPr lang="en-US" smtClean="0"/>
-              <a:t>2017-12-28</a:t>
+              <a:t>12/30/2017</a:t>
             </a:fld>
             <a:endParaRPr lang="en-US"/>
           </a:p>
@@ -19456,7 +19556,7 @@
           <p:cNvPr id="6" name="Footer Placeholder 5">
             <a:extLst>
               <a:ext uri="{FF2B5EF4-FFF2-40B4-BE49-F238E27FC236}">
-                <a16:creationId xmlns:a16="http://schemas.microsoft.com/office/drawing/2014/main" id="{8329BAC1-E5E4-4AE3-AB13-1C2026A99E43}"/>
+                <a16:creationId xmlns:a16="http://schemas.microsoft.com/office/drawing/2014/main" xmlns="" id="{8329BAC1-E5E4-4AE3-AB13-1C2026A99E43}"/>
               </a:ext>
             </a:extLst>
           </p:cNvPr>
@@ -19481,7 +19581,7 @@
           <p:cNvPr id="7" name="Slide Number Placeholder 6">
             <a:extLst>
               <a:ext uri="{FF2B5EF4-FFF2-40B4-BE49-F238E27FC236}">
-                <a16:creationId xmlns:a16="http://schemas.microsoft.com/office/drawing/2014/main" id="{6C6CF1CA-09C2-4A33-B916-07E421F331B0}"/>
+                <a16:creationId xmlns:a16="http://schemas.microsoft.com/office/drawing/2014/main" xmlns="" id="{6C6CF1CA-09C2-4A33-B916-07E421F331B0}"/>
               </a:ext>
             </a:extLst>
           </p:cNvPr>
@@ -19540,7 +19640,7 @@
           <p:cNvPr id="2" name="Title 1">
             <a:extLst>
               <a:ext uri="{FF2B5EF4-FFF2-40B4-BE49-F238E27FC236}">
-                <a16:creationId xmlns:a16="http://schemas.microsoft.com/office/drawing/2014/main" id="{A1425347-21FB-44DF-B884-E37BC9F395E5}"/>
+                <a16:creationId xmlns:a16="http://schemas.microsoft.com/office/drawing/2014/main" xmlns="" id="{A1425347-21FB-44DF-B884-E37BC9F395E5}"/>
               </a:ext>
             </a:extLst>
           </p:cNvPr>
@@ -19573,7 +19673,7 @@
           <p:cNvPr id="3" name="Text Placeholder 2">
             <a:extLst>
               <a:ext uri="{FF2B5EF4-FFF2-40B4-BE49-F238E27FC236}">
-                <a16:creationId xmlns:a16="http://schemas.microsoft.com/office/drawing/2014/main" id="{10FCB843-1A4E-484E-BFFD-E5A33AA5A1BA}"/>
+                <a16:creationId xmlns:a16="http://schemas.microsoft.com/office/drawing/2014/main" xmlns="" id="{10FCB843-1A4E-484E-BFFD-E5A33AA5A1BA}"/>
               </a:ext>
             </a:extLst>
           </p:cNvPr>
@@ -19644,7 +19744,7 @@
           <p:cNvPr id="4" name="Content Placeholder 3">
             <a:extLst>
               <a:ext uri="{FF2B5EF4-FFF2-40B4-BE49-F238E27FC236}">
-                <a16:creationId xmlns:a16="http://schemas.microsoft.com/office/drawing/2014/main" id="{A9302C9B-AE8D-4BC0-BA1A-C5E20BCD7028}"/>
+                <a16:creationId xmlns:a16="http://schemas.microsoft.com/office/drawing/2014/main" xmlns="" id="{A9302C9B-AE8D-4BC0-BA1A-C5E20BCD7028}"/>
               </a:ext>
             </a:extLst>
           </p:cNvPr>
@@ -19706,7 +19806,7 @@
           <p:cNvPr id="5" name="Text Placeholder 4">
             <a:extLst>
               <a:ext uri="{FF2B5EF4-FFF2-40B4-BE49-F238E27FC236}">
-                <a16:creationId xmlns:a16="http://schemas.microsoft.com/office/drawing/2014/main" id="{CD27FDF8-B188-4B1D-8742-7E0AA837AACF}"/>
+                <a16:creationId xmlns:a16="http://schemas.microsoft.com/office/drawing/2014/main" xmlns="" id="{CD27FDF8-B188-4B1D-8742-7E0AA837AACF}"/>
               </a:ext>
             </a:extLst>
           </p:cNvPr>
@@ -19777,7 +19877,7 @@
           <p:cNvPr id="6" name="Content Placeholder 5">
             <a:extLst>
               <a:ext uri="{FF2B5EF4-FFF2-40B4-BE49-F238E27FC236}">
-                <a16:creationId xmlns:a16="http://schemas.microsoft.com/office/drawing/2014/main" id="{E1A95380-C50D-4E52-B728-84873FB27C11}"/>
+                <a16:creationId xmlns:a16="http://schemas.microsoft.com/office/drawing/2014/main" xmlns="" id="{E1A95380-C50D-4E52-B728-84873FB27C11}"/>
               </a:ext>
             </a:extLst>
           </p:cNvPr>
@@ -19839,7 +19939,7 @@
           <p:cNvPr id="7" name="Date Placeholder 6">
             <a:extLst>
               <a:ext uri="{FF2B5EF4-FFF2-40B4-BE49-F238E27FC236}">
-                <a16:creationId xmlns:a16="http://schemas.microsoft.com/office/drawing/2014/main" id="{B4C33C57-B7A8-4001-A94F-EA1EDCAC6DDA}"/>
+                <a16:creationId xmlns:a16="http://schemas.microsoft.com/office/drawing/2014/main" xmlns="" id="{B4C33C57-B7A8-4001-A94F-EA1EDCAC6DDA}"/>
               </a:ext>
             </a:extLst>
           </p:cNvPr>
@@ -19857,7 +19957,7 @@
           <a:p>
             <a:fld id="{CACABD52-BF91-4CCE-9EEC-6A02225A646E}" type="datetimeFigureOut">
               <a:rPr lang="en-US" smtClean="0"/>
-              <a:t>2017-12-28</a:t>
+              <a:t>12/30/2017</a:t>
             </a:fld>
             <a:endParaRPr lang="en-US"/>
           </a:p>
@@ -19868,7 +19968,7 @@
           <p:cNvPr id="8" name="Footer Placeholder 7">
             <a:extLst>
               <a:ext uri="{FF2B5EF4-FFF2-40B4-BE49-F238E27FC236}">
-                <a16:creationId xmlns:a16="http://schemas.microsoft.com/office/drawing/2014/main" id="{0F445291-F30E-4913-B074-8D1F2B0BE100}"/>
+                <a16:creationId xmlns:a16="http://schemas.microsoft.com/office/drawing/2014/main" xmlns="" id="{0F445291-F30E-4913-B074-8D1F2B0BE100}"/>
               </a:ext>
             </a:extLst>
           </p:cNvPr>
@@ -19893,7 +19993,7 @@
           <p:cNvPr id="9" name="Slide Number Placeholder 8">
             <a:extLst>
               <a:ext uri="{FF2B5EF4-FFF2-40B4-BE49-F238E27FC236}">
-                <a16:creationId xmlns:a16="http://schemas.microsoft.com/office/drawing/2014/main" id="{D47A2067-EF69-45A2-897C-EC9B3020412E}"/>
+                <a16:creationId xmlns:a16="http://schemas.microsoft.com/office/drawing/2014/main" xmlns="" id="{D47A2067-EF69-45A2-897C-EC9B3020412E}"/>
               </a:ext>
             </a:extLst>
           </p:cNvPr>
@@ -19952,7 +20052,7 @@
           <p:cNvPr id="2" name="Title 1">
             <a:extLst>
               <a:ext uri="{FF2B5EF4-FFF2-40B4-BE49-F238E27FC236}">
-                <a16:creationId xmlns:a16="http://schemas.microsoft.com/office/drawing/2014/main" id="{5897FFA4-EBF8-4ED7-B54B-F14702E84B63}"/>
+                <a16:creationId xmlns:a16="http://schemas.microsoft.com/office/drawing/2014/main" xmlns="" id="{5897FFA4-EBF8-4ED7-B54B-F14702E84B63}"/>
               </a:ext>
             </a:extLst>
           </p:cNvPr>
@@ -19980,7 +20080,7 @@
           <p:cNvPr id="3" name="Date Placeholder 2">
             <a:extLst>
               <a:ext uri="{FF2B5EF4-FFF2-40B4-BE49-F238E27FC236}">
-                <a16:creationId xmlns:a16="http://schemas.microsoft.com/office/drawing/2014/main" id="{C5E02E21-09EB-46F5-9088-2AE3AC08EC9E}"/>
+                <a16:creationId xmlns:a16="http://schemas.microsoft.com/office/drawing/2014/main" xmlns="" id="{C5E02E21-09EB-46F5-9088-2AE3AC08EC9E}"/>
               </a:ext>
             </a:extLst>
           </p:cNvPr>
@@ -19998,7 +20098,7 @@
           <a:p>
             <a:fld id="{CACABD52-BF91-4CCE-9EEC-6A02225A646E}" type="datetimeFigureOut">
               <a:rPr lang="en-US" smtClean="0"/>
-              <a:t>2017-12-28</a:t>
+              <a:t>12/30/2017</a:t>
             </a:fld>
             <a:endParaRPr lang="en-US"/>
           </a:p>
@@ -20009,7 +20109,7 @@
           <p:cNvPr id="4" name="Footer Placeholder 3">
             <a:extLst>
               <a:ext uri="{FF2B5EF4-FFF2-40B4-BE49-F238E27FC236}">
-                <a16:creationId xmlns:a16="http://schemas.microsoft.com/office/drawing/2014/main" id="{EE6BC8B5-5449-4D2A-8497-FFC8B77BAF4F}"/>
+                <a16:creationId xmlns:a16="http://schemas.microsoft.com/office/drawing/2014/main" xmlns="" id="{EE6BC8B5-5449-4D2A-8497-FFC8B77BAF4F}"/>
               </a:ext>
             </a:extLst>
           </p:cNvPr>
@@ -20034,7 +20134,7 @@
           <p:cNvPr id="5" name="Slide Number Placeholder 4">
             <a:extLst>
               <a:ext uri="{FF2B5EF4-FFF2-40B4-BE49-F238E27FC236}">
-                <a16:creationId xmlns:a16="http://schemas.microsoft.com/office/drawing/2014/main" id="{7AD3CBB2-19BF-40F9-83B8-566D1EAB7777}"/>
+                <a16:creationId xmlns:a16="http://schemas.microsoft.com/office/drawing/2014/main" xmlns="" id="{7AD3CBB2-19BF-40F9-83B8-566D1EAB7777}"/>
               </a:ext>
             </a:extLst>
           </p:cNvPr>
@@ -20093,7 +20193,7 @@
           <p:cNvPr id="2" name="Date Placeholder 1">
             <a:extLst>
               <a:ext uri="{FF2B5EF4-FFF2-40B4-BE49-F238E27FC236}">
-                <a16:creationId xmlns:a16="http://schemas.microsoft.com/office/drawing/2014/main" id="{1C0D7943-B554-4E88-86D3-37CE1D6FC6D3}"/>
+                <a16:creationId xmlns:a16="http://schemas.microsoft.com/office/drawing/2014/main" xmlns="" id="{1C0D7943-B554-4E88-86D3-37CE1D6FC6D3}"/>
               </a:ext>
             </a:extLst>
           </p:cNvPr>
@@ -20111,7 +20211,7 @@
           <a:p>
             <a:fld id="{CACABD52-BF91-4CCE-9EEC-6A02225A646E}" type="datetimeFigureOut">
               <a:rPr lang="en-US" smtClean="0"/>
-              <a:t>2017-12-28</a:t>
+              <a:t>12/30/2017</a:t>
             </a:fld>
             <a:endParaRPr lang="en-US"/>
           </a:p>
@@ -20122,7 +20222,7 @@
           <p:cNvPr id="3" name="Footer Placeholder 2">
             <a:extLst>
               <a:ext uri="{FF2B5EF4-FFF2-40B4-BE49-F238E27FC236}">
-                <a16:creationId xmlns:a16="http://schemas.microsoft.com/office/drawing/2014/main" id="{6DA0A29A-95E2-4A43-9A62-DA676D2B1DD1}"/>
+                <a16:creationId xmlns:a16="http://schemas.microsoft.com/office/drawing/2014/main" xmlns="" id="{6DA0A29A-95E2-4A43-9A62-DA676D2B1DD1}"/>
               </a:ext>
             </a:extLst>
           </p:cNvPr>
@@ -20147,7 +20247,7 @@
           <p:cNvPr id="4" name="Slide Number Placeholder 3">
             <a:extLst>
               <a:ext uri="{FF2B5EF4-FFF2-40B4-BE49-F238E27FC236}">
-                <a16:creationId xmlns:a16="http://schemas.microsoft.com/office/drawing/2014/main" id="{C733AC5F-3B81-45A4-9505-752A3975B565}"/>
+                <a16:creationId xmlns:a16="http://schemas.microsoft.com/office/drawing/2014/main" xmlns="" id="{C733AC5F-3B81-45A4-9505-752A3975B565}"/>
               </a:ext>
             </a:extLst>
           </p:cNvPr>
@@ -20206,7 +20306,7 @@
           <p:cNvPr id="2" name="Title 1">
             <a:extLst>
               <a:ext uri="{FF2B5EF4-FFF2-40B4-BE49-F238E27FC236}">
-                <a16:creationId xmlns:a16="http://schemas.microsoft.com/office/drawing/2014/main" id="{429AA10F-A3F0-4FF5-86C2-B3E7658E4596}"/>
+                <a16:creationId xmlns:a16="http://schemas.microsoft.com/office/drawing/2014/main" xmlns="" id="{429AA10F-A3F0-4FF5-86C2-B3E7658E4596}"/>
               </a:ext>
             </a:extLst>
           </p:cNvPr>
@@ -20243,7 +20343,7 @@
           <p:cNvPr id="3" name="Content Placeholder 2">
             <a:extLst>
               <a:ext uri="{FF2B5EF4-FFF2-40B4-BE49-F238E27FC236}">
-                <a16:creationId xmlns:a16="http://schemas.microsoft.com/office/drawing/2014/main" id="{79CF4306-E7D1-4D7A-84BC-F0BCE1518D23}"/>
+                <a16:creationId xmlns:a16="http://schemas.microsoft.com/office/drawing/2014/main" xmlns="" id="{79CF4306-E7D1-4D7A-84BC-F0BCE1518D23}"/>
               </a:ext>
             </a:extLst>
           </p:cNvPr>
@@ -20333,7 +20433,7 @@
           <p:cNvPr id="4" name="Text Placeholder 3">
             <a:extLst>
               <a:ext uri="{FF2B5EF4-FFF2-40B4-BE49-F238E27FC236}">
-                <a16:creationId xmlns:a16="http://schemas.microsoft.com/office/drawing/2014/main" id="{4FEE7CF5-887D-49EC-9D20-69E2FB1A1A13}"/>
+                <a16:creationId xmlns:a16="http://schemas.microsoft.com/office/drawing/2014/main" xmlns="" id="{4FEE7CF5-887D-49EC-9D20-69E2FB1A1A13}"/>
               </a:ext>
             </a:extLst>
           </p:cNvPr>
@@ -20404,7 +20504,7 @@
           <p:cNvPr id="5" name="Date Placeholder 4">
             <a:extLst>
               <a:ext uri="{FF2B5EF4-FFF2-40B4-BE49-F238E27FC236}">
-                <a16:creationId xmlns:a16="http://schemas.microsoft.com/office/drawing/2014/main" id="{3ACFAEBD-A045-4A8C-878A-36EC892577BB}"/>
+                <a16:creationId xmlns:a16="http://schemas.microsoft.com/office/drawing/2014/main" xmlns="" id="{3ACFAEBD-A045-4A8C-878A-36EC892577BB}"/>
               </a:ext>
             </a:extLst>
           </p:cNvPr>
@@ -20422,7 +20522,7 @@
           <a:p>
             <a:fld id="{CACABD52-BF91-4CCE-9EEC-6A02225A646E}" type="datetimeFigureOut">
               <a:rPr lang="en-US" smtClean="0"/>
-              <a:t>2017-12-28</a:t>
+              <a:t>12/30/2017</a:t>
             </a:fld>
             <a:endParaRPr lang="en-US"/>
           </a:p>
@@ -20433,7 +20533,7 @@
           <p:cNvPr id="6" name="Footer Placeholder 5">
             <a:extLst>
               <a:ext uri="{FF2B5EF4-FFF2-40B4-BE49-F238E27FC236}">
-                <a16:creationId xmlns:a16="http://schemas.microsoft.com/office/drawing/2014/main" id="{16611E4C-81E3-45AD-8F0A-FF48107D1271}"/>
+                <a16:creationId xmlns:a16="http://schemas.microsoft.com/office/drawing/2014/main" xmlns="" id="{16611E4C-81E3-45AD-8F0A-FF48107D1271}"/>
               </a:ext>
             </a:extLst>
           </p:cNvPr>
@@ -20458,7 +20558,7 @@
           <p:cNvPr id="7" name="Slide Number Placeholder 6">
             <a:extLst>
               <a:ext uri="{FF2B5EF4-FFF2-40B4-BE49-F238E27FC236}">
-                <a16:creationId xmlns:a16="http://schemas.microsoft.com/office/drawing/2014/main" id="{9E6440E9-F4F2-4D20-A061-BB4A4DC64927}"/>
+                <a16:creationId xmlns:a16="http://schemas.microsoft.com/office/drawing/2014/main" xmlns="" id="{9E6440E9-F4F2-4D20-A061-BB4A4DC64927}"/>
               </a:ext>
             </a:extLst>
           </p:cNvPr>
@@ -20517,7 +20617,7 @@
           <p:cNvPr id="2" name="Title 1">
             <a:extLst>
               <a:ext uri="{FF2B5EF4-FFF2-40B4-BE49-F238E27FC236}">
-                <a16:creationId xmlns:a16="http://schemas.microsoft.com/office/drawing/2014/main" id="{F084EE26-126E-4E97-BF36-9F1DCD972C05}"/>
+                <a16:creationId xmlns:a16="http://schemas.microsoft.com/office/drawing/2014/main" xmlns="" id="{F084EE26-126E-4E97-BF36-9F1DCD972C05}"/>
               </a:ext>
             </a:extLst>
           </p:cNvPr>
@@ -20554,7 +20654,7 @@
           <p:cNvPr id="3" name="Picture Placeholder 2">
             <a:extLst>
               <a:ext uri="{FF2B5EF4-FFF2-40B4-BE49-F238E27FC236}">
-                <a16:creationId xmlns:a16="http://schemas.microsoft.com/office/drawing/2014/main" id="{257A8E82-AF17-438E-98D9-5C3489248FFC}"/>
+                <a16:creationId xmlns:a16="http://schemas.microsoft.com/office/drawing/2014/main" xmlns="" id="{257A8E82-AF17-438E-98D9-5C3489248FFC}"/>
               </a:ext>
             </a:extLst>
           </p:cNvPr>
@@ -20621,7 +20721,7 @@
           <p:cNvPr id="4" name="Text Placeholder 3">
             <a:extLst>
               <a:ext uri="{FF2B5EF4-FFF2-40B4-BE49-F238E27FC236}">
-                <a16:creationId xmlns:a16="http://schemas.microsoft.com/office/drawing/2014/main" id="{EA8DEB40-38F9-4310-AFB2-610843E376E6}"/>
+                <a16:creationId xmlns:a16="http://schemas.microsoft.com/office/drawing/2014/main" xmlns="" id="{EA8DEB40-38F9-4310-AFB2-610843E376E6}"/>
               </a:ext>
             </a:extLst>
           </p:cNvPr>
@@ -20692,7 +20792,7 @@
           <p:cNvPr id="5" name="Date Placeholder 4">
             <a:extLst>
               <a:ext uri="{FF2B5EF4-FFF2-40B4-BE49-F238E27FC236}">
-                <a16:creationId xmlns:a16="http://schemas.microsoft.com/office/drawing/2014/main" id="{0BC78A07-219B-4178-A5CE-EC09127A3FE2}"/>
+                <a16:creationId xmlns:a16="http://schemas.microsoft.com/office/drawing/2014/main" xmlns="" id="{0BC78A07-219B-4178-A5CE-EC09127A3FE2}"/>
               </a:ext>
             </a:extLst>
           </p:cNvPr>
@@ -20710,7 +20810,7 @@
           <a:p>
             <a:fld id="{CACABD52-BF91-4CCE-9EEC-6A02225A646E}" type="datetimeFigureOut">
               <a:rPr lang="en-US" smtClean="0"/>
-              <a:t>2017-12-28</a:t>
+              <a:t>12/30/2017</a:t>
             </a:fld>
             <a:endParaRPr lang="en-US"/>
           </a:p>
@@ -20721,7 +20821,7 @@
           <p:cNvPr id="6" name="Footer Placeholder 5">
             <a:extLst>
               <a:ext uri="{FF2B5EF4-FFF2-40B4-BE49-F238E27FC236}">
-                <a16:creationId xmlns:a16="http://schemas.microsoft.com/office/drawing/2014/main" id="{18B6F62C-9928-41E5-8044-CC305A40137C}"/>
+                <a16:creationId xmlns:a16="http://schemas.microsoft.com/office/drawing/2014/main" xmlns="" id="{18B6F62C-9928-41E5-8044-CC305A40137C}"/>
               </a:ext>
             </a:extLst>
           </p:cNvPr>
@@ -20746,7 +20846,7 @@
           <p:cNvPr id="7" name="Slide Number Placeholder 6">
             <a:extLst>
               <a:ext uri="{FF2B5EF4-FFF2-40B4-BE49-F238E27FC236}">
-                <a16:creationId xmlns:a16="http://schemas.microsoft.com/office/drawing/2014/main" id="{6267D2BB-92BB-4DDD-81C8-6617E54E1C27}"/>
+                <a16:creationId xmlns:a16="http://schemas.microsoft.com/office/drawing/2014/main" xmlns="" id="{6267D2BB-92BB-4DDD-81C8-6617E54E1C27}"/>
               </a:ext>
             </a:extLst>
           </p:cNvPr>
@@ -20810,7 +20910,7 @@
           <p:cNvPr id="2" name="Title Placeholder 1">
             <a:extLst>
               <a:ext uri="{FF2B5EF4-FFF2-40B4-BE49-F238E27FC236}">
-                <a16:creationId xmlns:a16="http://schemas.microsoft.com/office/drawing/2014/main" id="{EA7D838B-B41F-4FCE-8E52-9F72F4E6B9F7}"/>
+                <a16:creationId xmlns:a16="http://schemas.microsoft.com/office/drawing/2014/main" xmlns="" id="{EA7D838B-B41F-4FCE-8E52-9F72F4E6B9F7}"/>
               </a:ext>
             </a:extLst>
           </p:cNvPr>
@@ -20848,7 +20948,7 @@
           <p:cNvPr id="3" name="Text Placeholder 2">
             <a:extLst>
               <a:ext uri="{FF2B5EF4-FFF2-40B4-BE49-F238E27FC236}">
-                <a16:creationId xmlns:a16="http://schemas.microsoft.com/office/drawing/2014/main" id="{7FF521DE-86A0-4F35-9D33-DE3297EF3BEE}"/>
+                <a16:creationId xmlns:a16="http://schemas.microsoft.com/office/drawing/2014/main" xmlns="" id="{7FF521DE-86A0-4F35-9D33-DE3297EF3BEE}"/>
               </a:ext>
             </a:extLst>
           </p:cNvPr>
@@ -20915,7 +21015,7 @@
           <p:cNvPr id="4" name="Date Placeholder 3">
             <a:extLst>
               <a:ext uri="{FF2B5EF4-FFF2-40B4-BE49-F238E27FC236}">
-                <a16:creationId xmlns:a16="http://schemas.microsoft.com/office/drawing/2014/main" id="{0001F5AF-9B49-4031-B5E1-414FE235625E}"/>
+                <a16:creationId xmlns:a16="http://schemas.microsoft.com/office/drawing/2014/main" xmlns="" id="{0001F5AF-9B49-4031-B5E1-414FE235625E}"/>
               </a:ext>
             </a:extLst>
           </p:cNvPr>
@@ -20951,7 +21051,7 @@
           <a:p>
             <a:fld id="{CACABD52-BF91-4CCE-9EEC-6A02225A646E}" type="datetimeFigureOut">
               <a:rPr lang="en-US" smtClean="0"/>
-              <a:t>2017-12-28</a:t>
+              <a:t>12/30/2017</a:t>
             </a:fld>
             <a:endParaRPr lang="en-US"/>
           </a:p>
@@ -20962,7 +21062,7 @@
           <p:cNvPr id="5" name="Footer Placeholder 4">
             <a:extLst>
               <a:ext uri="{FF2B5EF4-FFF2-40B4-BE49-F238E27FC236}">
-                <a16:creationId xmlns:a16="http://schemas.microsoft.com/office/drawing/2014/main" id="{236B538C-FB52-488D-A23A-B0EA26045C11}"/>
+                <a16:creationId xmlns:a16="http://schemas.microsoft.com/office/drawing/2014/main" xmlns="" id="{236B538C-FB52-488D-A23A-B0EA26045C11}"/>
               </a:ext>
             </a:extLst>
           </p:cNvPr>
@@ -21005,7 +21105,7 @@
           <p:cNvPr id="6" name="Slide Number Placeholder 5">
             <a:extLst>
               <a:ext uri="{FF2B5EF4-FFF2-40B4-BE49-F238E27FC236}">
-                <a16:creationId xmlns:a16="http://schemas.microsoft.com/office/drawing/2014/main" id="{73C7A0F4-E59F-4A9A-90B5-40AD161A49F8}"/>
+                <a16:creationId xmlns:a16="http://schemas.microsoft.com/office/drawing/2014/main" xmlns="" id="{73C7A0F4-E59F-4A9A-90B5-40AD161A49F8}"/>
               </a:ext>
             </a:extLst>
           </p:cNvPr>
@@ -21373,7 +21473,7 @@
           <p:cNvPr id="14" name="Rectangle 13">
             <a:extLst>
               <a:ext uri="{FF2B5EF4-FFF2-40B4-BE49-F238E27FC236}">
-                <a16:creationId xmlns:a16="http://schemas.microsoft.com/office/drawing/2014/main" id="{8FC191C5-FA04-4B6A-890B-39B4A66DFC1D}"/>
+                <a16:creationId xmlns:a16="http://schemas.microsoft.com/office/drawing/2014/main" xmlns="" id="{8FC191C5-FA04-4B6A-890B-39B4A66DFC1D}"/>
               </a:ext>
             </a:extLst>
           </p:cNvPr>
@@ -21383,7 +21483,7 @@
         <p:spPr>
           <a:xfrm>
             <a:off x="4290882" y="6384594"/>
-            <a:ext cx="1227900" cy="369332"/>
+            <a:ext cx="1304844" cy="369332"/>
           </a:xfrm>
           <a:prstGeom prst="rect">
             <a:avLst/>
@@ -21396,16 +21496,6 @@
           <a:lstStyle/>
           <a:p>
             <a:r>
-              <a:rPr lang="sv-SE" dirty="0" err="1">
-                <a:solidFill>
-                  <a:schemeClr val="tx1"/>
-                </a:solidFill>
-                <a:latin typeface="Arial" panose="020B0604020202020204" pitchFamily="34" charset="0"/>
-                <a:cs typeface="Arial" panose="020B0604020202020204" pitchFamily="34" charset="0"/>
-              </a:rPr>
-              <a:t>Your</a:t>
-            </a:r>
-            <a:r>
               <a:rPr lang="sv-SE" dirty="0">
                 <a:solidFill>
                   <a:schemeClr val="tx1"/>
@@ -21413,7 +21503,17 @@
                 <a:latin typeface="Arial" panose="020B0604020202020204" pitchFamily="34" charset="0"/>
                 <a:cs typeface="Arial" panose="020B0604020202020204" pitchFamily="34" charset="0"/>
               </a:rPr>
-              <a:t> team</a:t>
+              <a:t>Your </a:t>
+            </a:r>
+            <a:r>
+              <a:rPr lang="sv-SE" dirty="0" smtClean="0">
+                <a:solidFill>
+                  <a:schemeClr val="tx1"/>
+                </a:solidFill>
+                <a:latin typeface="Arial" panose="020B0604020202020204" pitchFamily="34" charset="0"/>
+                <a:cs typeface="Arial" panose="020B0604020202020204" pitchFamily="34" charset="0"/>
+              </a:rPr>
+              <a:t>group</a:t>
             </a:r>
             <a:endParaRPr lang="en-US" dirty="0"/>
           </a:p>
@@ -21424,7 +21524,7 @@
           <p:cNvPr id="21" name="Rectangle 20">
             <a:extLst>
               <a:ext uri="{FF2B5EF4-FFF2-40B4-BE49-F238E27FC236}">
-                <a16:creationId xmlns:a16="http://schemas.microsoft.com/office/drawing/2014/main" id="{9F88DBF0-1CBF-432D-ABF5-C3B72583CCBD}"/>
+                <a16:creationId xmlns:a16="http://schemas.microsoft.com/office/drawing/2014/main" xmlns="" id="{9F88DBF0-1CBF-432D-ABF5-C3B72583CCBD}"/>
               </a:ext>
             </a:extLst>
           </p:cNvPr>
@@ -21480,7 +21580,7 @@
           <p:cNvPr id="22" name="Rectangle 21">
             <a:extLst>
               <a:ext uri="{FF2B5EF4-FFF2-40B4-BE49-F238E27FC236}">
-                <a16:creationId xmlns:a16="http://schemas.microsoft.com/office/drawing/2014/main" id="{21231BCA-7ABC-4F19-9161-5A02A16DD524}"/>
+                <a16:creationId xmlns:a16="http://schemas.microsoft.com/office/drawing/2014/main" xmlns="" id="{21231BCA-7ABC-4F19-9161-5A02A16DD524}"/>
               </a:ext>
             </a:extLst>
           </p:cNvPr>
@@ -21534,7 +21634,7 @@
           <p:cNvPr id="23" name="Rectangle 22">
             <a:extLst>
               <a:ext uri="{FF2B5EF4-FFF2-40B4-BE49-F238E27FC236}">
-                <a16:creationId xmlns:a16="http://schemas.microsoft.com/office/drawing/2014/main" id="{D61255F3-A5EA-4758-9469-30B2086D3E91}"/>
+                <a16:creationId xmlns:a16="http://schemas.microsoft.com/office/drawing/2014/main" xmlns="" id="{D61255F3-A5EA-4758-9469-30B2086D3E91}"/>
               </a:ext>
             </a:extLst>
           </p:cNvPr>
@@ -21588,7 +21688,7 @@
           <p:cNvPr id="7" name="Picture 9">
             <a:extLst>
               <a:ext uri="{FF2B5EF4-FFF2-40B4-BE49-F238E27FC236}">
-                <a16:creationId xmlns:a16="http://schemas.microsoft.com/office/drawing/2014/main" id="{61F991B1-26AE-44CD-BECD-7874DC212641}"/>
+                <a16:creationId xmlns:a16="http://schemas.microsoft.com/office/drawing/2014/main" xmlns="" id="{61F991B1-26AE-44CD-BECD-7874DC212641}"/>
               </a:ext>
             </a:extLst>
           </p:cNvPr>
@@ -21648,7 +21748,7 @@
           <p:cNvPr id="12" name="Picture 9">
             <a:extLst>
               <a:ext uri="{FF2B5EF4-FFF2-40B4-BE49-F238E27FC236}">
-                <a16:creationId xmlns:a16="http://schemas.microsoft.com/office/drawing/2014/main" id="{C9F0EEA1-9F31-4557-BFDA-475C767CF656}"/>
+                <a16:creationId xmlns:a16="http://schemas.microsoft.com/office/drawing/2014/main" xmlns="" id="{C9F0EEA1-9F31-4557-BFDA-475C767CF656}"/>
               </a:ext>
             </a:extLst>
           </p:cNvPr>
@@ -21708,7 +21808,7 @@
           <p:cNvPr id="24" name="Picture 9">
             <a:extLst>
               <a:ext uri="{FF2B5EF4-FFF2-40B4-BE49-F238E27FC236}">
-                <a16:creationId xmlns:a16="http://schemas.microsoft.com/office/drawing/2014/main" id="{037940A9-EC14-46F4-AEBF-4C4350B9FA9D}"/>
+                <a16:creationId xmlns:a16="http://schemas.microsoft.com/office/drawing/2014/main" xmlns="" id="{037940A9-EC14-46F4-AEBF-4C4350B9FA9D}"/>
               </a:ext>
             </a:extLst>
           </p:cNvPr>
@@ -21768,7 +21868,7 @@
           <p:cNvPr id="25" name="Picture 9">
             <a:extLst>
               <a:ext uri="{FF2B5EF4-FFF2-40B4-BE49-F238E27FC236}">
-                <a16:creationId xmlns:a16="http://schemas.microsoft.com/office/drawing/2014/main" id="{AC1FC543-EE8D-43D1-A2E2-8B7CE0EE97F9}"/>
+                <a16:creationId xmlns:a16="http://schemas.microsoft.com/office/drawing/2014/main" xmlns="" id="{AC1FC543-EE8D-43D1-A2E2-8B7CE0EE97F9}"/>
               </a:ext>
             </a:extLst>
           </p:cNvPr>
@@ -21828,7 +21928,7 @@
           <p:cNvPr id="26" name="Picture 9">
             <a:extLst>
               <a:ext uri="{FF2B5EF4-FFF2-40B4-BE49-F238E27FC236}">
-                <a16:creationId xmlns:a16="http://schemas.microsoft.com/office/drawing/2014/main" id="{6AC15EDC-F8F5-4698-B923-1EC9F1999593}"/>
+                <a16:creationId xmlns:a16="http://schemas.microsoft.com/office/drawing/2014/main" xmlns="" id="{6AC15EDC-F8F5-4698-B923-1EC9F1999593}"/>
               </a:ext>
             </a:extLst>
           </p:cNvPr>
@@ -21888,7 +21988,7 @@
           <p:cNvPr id="27" name="Picture 9">
             <a:extLst>
               <a:ext uri="{FF2B5EF4-FFF2-40B4-BE49-F238E27FC236}">
-                <a16:creationId xmlns:a16="http://schemas.microsoft.com/office/drawing/2014/main" id="{4B495DA8-87A8-41A0-A125-87A4DE3108C8}"/>
+                <a16:creationId xmlns:a16="http://schemas.microsoft.com/office/drawing/2014/main" xmlns="" id="{4B495DA8-87A8-41A0-A125-87A4DE3108C8}"/>
               </a:ext>
             </a:extLst>
           </p:cNvPr>
@@ -21948,7 +22048,7 @@
           <p:cNvPr id="28" name="Rectangle 27">
             <a:extLst>
               <a:ext uri="{FF2B5EF4-FFF2-40B4-BE49-F238E27FC236}">
-                <a16:creationId xmlns:a16="http://schemas.microsoft.com/office/drawing/2014/main" id="{3F335173-C56C-4E77-BBC0-1A5C875AEF46}"/>
+                <a16:creationId xmlns:a16="http://schemas.microsoft.com/office/drawing/2014/main" xmlns="" id="{3F335173-C56C-4E77-BBC0-1A5C875AEF46}"/>
               </a:ext>
             </a:extLst>
           </p:cNvPr>
@@ -21989,7 +22089,7 @@
           <p:cNvPr id="29" name="Rectangle 28">
             <a:extLst>
               <a:ext uri="{FF2B5EF4-FFF2-40B4-BE49-F238E27FC236}">
-                <a16:creationId xmlns:a16="http://schemas.microsoft.com/office/drawing/2014/main" id="{DA16A2E4-6CB6-42D5-82E7-2BCC5D1720B7}"/>
+                <a16:creationId xmlns:a16="http://schemas.microsoft.com/office/drawing/2014/main" xmlns="" id="{DA16A2E4-6CB6-42D5-82E7-2BCC5D1720B7}"/>
               </a:ext>
             </a:extLst>
           </p:cNvPr>
@@ -22030,7 +22130,7 @@
           <p:cNvPr id="30" name="Rectangle 29">
             <a:extLst>
               <a:ext uri="{FF2B5EF4-FFF2-40B4-BE49-F238E27FC236}">
-                <a16:creationId xmlns:a16="http://schemas.microsoft.com/office/drawing/2014/main" id="{81F02153-EB60-495D-8DAF-1949C468CB7A}"/>
+                <a16:creationId xmlns:a16="http://schemas.microsoft.com/office/drawing/2014/main" xmlns="" id="{81F02153-EB60-495D-8DAF-1949C468CB7A}"/>
               </a:ext>
             </a:extLst>
           </p:cNvPr>
@@ -22072,7 +22172,7 @@
           <p:cNvPr id="34" name="Straight Connector 33">
             <a:extLst>
               <a:ext uri="{FF2B5EF4-FFF2-40B4-BE49-F238E27FC236}">
-                <a16:creationId xmlns:a16="http://schemas.microsoft.com/office/drawing/2014/main" id="{1D15A13C-E5E4-4DE9-A9F2-058123546270}"/>
+                <a16:creationId xmlns:a16="http://schemas.microsoft.com/office/drawing/2014/main" xmlns="" id="{1D15A13C-E5E4-4DE9-A9F2-058123546270}"/>
               </a:ext>
             </a:extLst>
           </p:cNvPr>
@@ -22117,7 +22217,7 @@
           <p:cNvPr id="36" name="Straight Connector 35">
             <a:extLst>
               <a:ext uri="{FF2B5EF4-FFF2-40B4-BE49-F238E27FC236}">
-                <a16:creationId xmlns:a16="http://schemas.microsoft.com/office/drawing/2014/main" id="{4612C6FF-F6F9-45E3-A2C0-D4BA837DA5BC}"/>
+                <a16:creationId xmlns:a16="http://schemas.microsoft.com/office/drawing/2014/main" xmlns="" id="{4612C6FF-F6F9-45E3-A2C0-D4BA837DA5BC}"/>
               </a:ext>
             </a:extLst>
           </p:cNvPr>
@@ -22162,7 +22262,7 @@
           <p:cNvPr id="38" name="Straight Connector 37">
             <a:extLst>
               <a:ext uri="{FF2B5EF4-FFF2-40B4-BE49-F238E27FC236}">
-                <a16:creationId xmlns:a16="http://schemas.microsoft.com/office/drawing/2014/main" id="{10587871-2D25-46EC-B9D5-36263ECB22E7}"/>
+                <a16:creationId xmlns:a16="http://schemas.microsoft.com/office/drawing/2014/main" xmlns="" id="{10587871-2D25-46EC-B9D5-36263ECB22E7}"/>
               </a:ext>
             </a:extLst>
           </p:cNvPr>
@@ -22207,7 +22307,7 @@
           <p:cNvPr id="42" name="Straight Connector 41">
             <a:extLst>
               <a:ext uri="{FF2B5EF4-FFF2-40B4-BE49-F238E27FC236}">
-                <a16:creationId xmlns:a16="http://schemas.microsoft.com/office/drawing/2014/main" id="{26C3F60D-928C-472B-97AC-56ED78A81F28}"/>
+                <a16:creationId xmlns:a16="http://schemas.microsoft.com/office/drawing/2014/main" xmlns="" id="{26C3F60D-928C-472B-97AC-56ED78A81F28}"/>
               </a:ext>
             </a:extLst>
           </p:cNvPr>
@@ -22252,7 +22352,7 @@
           <p:cNvPr id="44" name="Straight Connector 43">
             <a:extLst>
               <a:ext uri="{FF2B5EF4-FFF2-40B4-BE49-F238E27FC236}">
-                <a16:creationId xmlns:a16="http://schemas.microsoft.com/office/drawing/2014/main" id="{2E721FDC-89A7-4988-B1BE-FF07CA41458A}"/>
+                <a16:creationId xmlns:a16="http://schemas.microsoft.com/office/drawing/2014/main" xmlns="" id="{2E721FDC-89A7-4988-B1BE-FF07CA41458A}"/>
               </a:ext>
             </a:extLst>
           </p:cNvPr>
@@ -22297,7 +22397,7 @@
           <p:cNvPr id="46" name="Rectangle 45">
             <a:extLst>
               <a:ext uri="{FF2B5EF4-FFF2-40B4-BE49-F238E27FC236}">
-                <a16:creationId xmlns:a16="http://schemas.microsoft.com/office/drawing/2014/main" id="{209F45D2-258B-45DE-87F5-944A1682AC6B}"/>
+                <a16:creationId xmlns:a16="http://schemas.microsoft.com/office/drawing/2014/main" xmlns="" id="{209F45D2-258B-45DE-87F5-944A1682AC6B}"/>
               </a:ext>
             </a:extLst>
           </p:cNvPr>
@@ -22359,7 +22459,7 @@
           <p:cNvPr id="47" name="Rectangle 46">
             <a:extLst>
               <a:ext uri="{FF2B5EF4-FFF2-40B4-BE49-F238E27FC236}">
-                <a16:creationId xmlns:a16="http://schemas.microsoft.com/office/drawing/2014/main" id="{C7C3DD58-9FD5-423D-81F0-65F260109267}"/>
+                <a16:creationId xmlns:a16="http://schemas.microsoft.com/office/drawing/2014/main" xmlns="" id="{C7C3DD58-9FD5-423D-81F0-65F260109267}"/>
               </a:ext>
             </a:extLst>
           </p:cNvPr>
@@ -22401,7 +22501,7 @@
           <p:cNvPr id="48" name="Rectangle 47">
             <a:extLst>
               <a:ext uri="{FF2B5EF4-FFF2-40B4-BE49-F238E27FC236}">
-                <a16:creationId xmlns:a16="http://schemas.microsoft.com/office/drawing/2014/main" id="{5F2B4F2F-F55B-4F17-A7B6-1A931A40CA68}"/>
+                <a16:creationId xmlns:a16="http://schemas.microsoft.com/office/drawing/2014/main" xmlns="" id="{5F2B4F2F-F55B-4F17-A7B6-1A931A40CA68}"/>
               </a:ext>
             </a:extLst>
           </p:cNvPr>
@@ -22457,7 +22557,7 @@
           <p:cNvPr id="51" name="Rectangle 50">
             <a:extLst>
               <a:ext uri="{FF2B5EF4-FFF2-40B4-BE49-F238E27FC236}">
-                <a16:creationId xmlns:a16="http://schemas.microsoft.com/office/drawing/2014/main" id="{4F5CFA18-B35B-4DA0-A1C8-D81AC1AEE2BC}"/>
+                <a16:creationId xmlns:a16="http://schemas.microsoft.com/office/drawing/2014/main" xmlns="" id="{4F5CFA18-B35B-4DA0-A1C8-D81AC1AEE2BC}"/>
               </a:ext>
             </a:extLst>
           </p:cNvPr>
@@ -22518,7 +22618,7 @@
           <p:cNvPr id="52" name="Rectangle 51">
             <a:extLst>
               <a:ext uri="{FF2B5EF4-FFF2-40B4-BE49-F238E27FC236}">
-                <a16:creationId xmlns:a16="http://schemas.microsoft.com/office/drawing/2014/main" id="{48F2455D-070C-4806-92D6-3F679E9866F1}"/>
+                <a16:creationId xmlns:a16="http://schemas.microsoft.com/office/drawing/2014/main" xmlns="" id="{48F2455D-070C-4806-92D6-3F679E9866F1}"/>
               </a:ext>
             </a:extLst>
           </p:cNvPr>
@@ -22574,7 +22674,7 @@
           <p:cNvPr id="53" name="Rectangle 52">
             <a:extLst>
               <a:ext uri="{FF2B5EF4-FFF2-40B4-BE49-F238E27FC236}">
-                <a16:creationId xmlns:a16="http://schemas.microsoft.com/office/drawing/2014/main" id="{FDAFD61E-CF23-40A2-9706-CEB024710019}"/>
+                <a16:creationId xmlns:a16="http://schemas.microsoft.com/office/drawing/2014/main" xmlns="" id="{FDAFD61E-CF23-40A2-9706-CEB024710019}"/>
               </a:ext>
             </a:extLst>
           </p:cNvPr>
@@ -22628,7 +22728,7 @@
           <p:cNvPr id="54" name="Rectangle 53">
             <a:extLst>
               <a:ext uri="{FF2B5EF4-FFF2-40B4-BE49-F238E27FC236}">
-                <a16:creationId xmlns:a16="http://schemas.microsoft.com/office/drawing/2014/main" id="{B79A9F92-DA98-4C00-8C98-D7409A63A49E}"/>
+                <a16:creationId xmlns:a16="http://schemas.microsoft.com/office/drawing/2014/main" xmlns="" id="{B79A9F92-DA98-4C00-8C98-D7409A63A49E}"/>
               </a:ext>
             </a:extLst>
           </p:cNvPr>
@@ -22682,7 +22782,7 @@
           <p:cNvPr id="55" name="Picture 9">
             <a:extLst>
               <a:ext uri="{FF2B5EF4-FFF2-40B4-BE49-F238E27FC236}">
-                <a16:creationId xmlns:a16="http://schemas.microsoft.com/office/drawing/2014/main" id="{6F38A3E1-E0DA-432B-BBFA-348F0321BCD3}"/>
+                <a16:creationId xmlns:a16="http://schemas.microsoft.com/office/drawing/2014/main" xmlns="" id="{6F38A3E1-E0DA-432B-BBFA-348F0321BCD3}"/>
               </a:ext>
             </a:extLst>
           </p:cNvPr>
@@ -22742,7 +22842,7 @@
           <p:cNvPr id="69" name="Rectangle 68">
             <a:extLst>
               <a:ext uri="{FF2B5EF4-FFF2-40B4-BE49-F238E27FC236}">
-                <a16:creationId xmlns:a16="http://schemas.microsoft.com/office/drawing/2014/main" id="{19EC4CF9-2E6B-4D8B-80AB-7CDBA38CF6D3}"/>
+                <a16:creationId xmlns:a16="http://schemas.microsoft.com/office/drawing/2014/main" xmlns="" id="{19EC4CF9-2E6B-4D8B-80AB-7CDBA38CF6D3}"/>
               </a:ext>
             </a:extLst>
           </p:cNvPr>
@@ -22804,7 +22904,7 @@
           <p:cNvPr id="72" name="Straight Connector 71">
             <a:extLst>
               <a:ext uri="{FF2B5EF4-FFF2-40B4-BE49-F238E27FC236}">
-                <a16:creationId xmlns:a16="http://schemas.microsoft.com/office/drawing/2014/main" id="{DFD04D63-40EA-4A51-A48E-8B19F6A831F1}"/>
+                <a16:creationId xmlns:a16="http://schemas.microsoft.com/office/drawing/2014/main" xmlns="" id="{DFD04D63-40EA-4A51-A48E-8B19F6A831F1}"/>
               </a:ext>
             </a:extLst>
           </p:cNvPr>
@@ -22850,7 +22950,7 @@
           <p:cNvPr id="75" name="Rectangle 74">
             <a:extLst>
               <a:ext uri="{FF2B5EF4-FFF2-40B4-BE49-F238E27FC236}">
-                <a16:creationId xmlns:a16="http://schemas.microsoft.com/office/drawing/2014/main" id="{BDB9CA6D-4FA5-4175-AAC0-17D87D1050C9}"/>
+                <a16:creationId xmlns:a16="http://schemas.microsoft.com/office/drawing/2014/main" xmlns="" id="{BDB9CA6D-4FA5-4175-AAC0-17D87D1050C9}"/>
               </a:ext>
             </a:extLst>
           </p:cNvPr>
@@ -22911,7 +23011,7 @@
           <p:cNvPr id="76" name="Rectangle 75">
             <a:extLst>
               <a:ext uri="{FF2B5EF4-FFF2-40B4-BE49-F238E27FC236}">
-                <a16:creationId xmlns:a16="http://schemas.microsoft.com/office/drawing/2014/main" id="{9A9F6FDC-0558-487A-8683-2B4AC3E3F11A}"/>
+                <a16:creationId xmlns:a16="http://schemas.microsoft.com/office/drawing/2014/main" xmlns="" id="{9A9F6FDC-0558-487A-8683-2B4AC3E3F11A}"/>
               </a:ext>
             </a:extLst>
           </p:cNvPr>
@@ -22967,7 +23067,7 @@
           <p:cNvPr id="77" name="Rectangle 76">
             <a:extLst>
               <a:ext uri="{FF2B5EF4-FFF2-40B4-BE49-F238E27FC236}">
-                <a16:creationId xmlns:a16="http://schemas.microsoft.com/office/drawing/2014/main" id="{FC12E18A-CEC6-48F5-94C8-E315D4035FF8}"/>
+                <a16:creationId xmlns:a16="http://schemas.microsoft.com/office/drawing/2014/main" xmlns="" id="{FC12E18A-CEC6-48F5-94C8-E315D4035FF8}"/>
               </a:ext>
             </a:extLst>
           </p:cNvPr>
@@ -23021,7 +23121,7 @@
           <p:cNvPr id="78" name="Rectangle 77">
             <a:extLst>
               <a:ext uri="{FF2B5EF4-FFF2-40B4-BE49-F238E27FC236}">
-                <a16:creationId xmlns:a16="http://schemas.microsoft.com/office/drawing/2014/main" id="{A92CEE74-4DA2-4F7C-8BCE-ED5BE42D301D}"/>
+                <a16:creationId xmlns:a16="http://schemas.microsoft.com/office/drawing/2014/main" xmlns="" id="{A92CEE74-4DA2-4F7C-8BCE-ED5BE42D301D}"/>
               </a:ext>
             </a:extLst>
           </p:cNvPr>
@@ -23075,7 +23175,7 @@
           <p:cNvPr id="79" name="Picture 9">
             <a:extLst>
               <a:ext uri="{FF2B5EF4-FFF2-40B4-BE49-F238E27FC236}">
-                <a16:creationId xmlns:a16="http://schemas.microsoft.com/office/drawing/2014/main" id="{3236DC49-84B5-4BA6-A0C5-B630F26A56EE}"/>
+                <a16:creationId xmlns:a16="http://schemas.microsoft.com/office/drawing/2014/main" xmlns="" id="{3236DC49-84B5-4BA6-A0C5-B630F26A56EE}"/>
               </a:ext>
             </a:extLst>
           </p:cNvPr>
@@ -23135,7 +23235,7 @@
           <p:cNvPr id="80" name="Rectangle 79">
             <a:extLst>
               <a:ext uri="{FF2B5EF4-FFF2-40B4-BE49-F238E27FC236}">
-                <a16:creationId xmlns:a16="http://schemas.microsoft.com/office/drawing/2014/main" id="{44F2AE50-EBD9-416A-9E45-2E98B87AC808}"/>
+                <a16:creationId xmlns:a16="http://schemas.microsoft.com/office/drawing/2014/main" xmlns="" id="{44F2AE50-EBD9-416A-9E45-2E98B87AC808}"/>
               </a:ext>
             </a:extLst>
           </p:cNvPr>
@@ -23194,7 +23294,7 @@
           <p:cNvPr id="82" name="Straight Connector 81">
             <a:extLst>
               <a:ext uri="{FF2B5EF4-FFF2-40B4-BE49-F238E27FC236}">
-                <a16:creationId xmlns:a16="http://schemas.microsoft.com/office/drawing/2014/main" id="{4FFA2BE3-2EDF-43CC-8FD1-826085DDAA2A}"/>
+                <a16:creationId xmlns:a16="http://schemas.microsoft.com/office/drawing/2014/main" xmlns="" id="{4FFA2BE3-2EDF-43CC-8FD1-826085DDAA2A}"/>
               </a:ext>
             </a:extLst>
           </p:cNvPr>
@@ -23240,7 +23340,7 @@
           <p:cNvPr id="83" name="Cloud 82">
             <a:extLst>
               <a:ext uri="{FF2B5EF4-FFF2-40B4-BE49-F238E27FC236}">
-                <a16:creationId xmlns:a16="http://schemas.microsoft.com/office/drawing/2014/main" id="{F1413CEC-28FE-4C2E-901A-A967D7B48E9F}"/>
+                <a16:creationId xmlns:a16="http://schemas.microsoft.com/office/drawing/2014/main" xmlns="" id="{F1413CEC-28FE-4C2E-901A-A967D7B48E9F}"/>
               </a:ext>
             </a:extLst>
           </p:cNvPr>
@@ -23311,7 +23411,7 @@
           <p:cNvPr id="86" name="Straight Connector 85">
             <a:extLst>
               <a:ext uri="{FF2B5EF4-FFF2-40B4-BE49-F238E27FC236}">
-                <a16:creationId xmlns:a16="http://schemas.microsoft.com/office/drawing/2014/main" id="{743B6992-EE85-455B-9771-636069D178E5}"/>
+                <a16:creationId xmlns:a16="http://schemas.microsoft.com/office/drawing/2014/main" xmlns="" id="{743B6992-EE85-455B-9771-636069D178E5}"/>
               </a:ext>
             </a:extLst>
           </p:cNvPr>
@@ -23357,7 +23457,7 @@
           <p:cNvPr id="88" name="Straight Connector 87">
             <a:extLst>
               <a:ext uri="{FF2B5EF4-FFF2-40B4-BE49-F238E27FC236}">
-                <a16:creationId xmlns:a16="http://schemas.microsoft.com/office/drawing/2014/main" id="{5CC1E663-D34D-46FA-9E20-A9E44AA2D51F}"/>
+                <a16:creationId xmlns:a16="http://schemas.microsoft.com/office/drawing/2014/main" xmlns="" id="{5CC1E663-D34D-46FA-9E20-A9E44AA2D51F}"/>
               </a:ext>
             </a:extLst>
           </p:cNvPr>
@@ -23403,7 +23503,7 @@
           <p:cNvPr id="92" name="Cube 91">
             <a:extLst>
               <a:ext uri="{FF2B5EF4-FFF2-40B4-BE49-F238E27FC236}">
-                <a16:creationId xmlns:a16="http://schemas.microsoft.com/office/drawing/2014/main" id="{F17CBDCB-434B-40FD-8BCE-BEE38C96FBCB}"/>
+                <a16:creationId xmlns:a16="http://schemas.microsoft.com/office/drawing/2014/main" xmlns="" id="{F17CBDCB-434B-40FD-8BCE-BEE38C96FBCB}"/>
               </a:ext>
             </a:extLst>
           </p:cNvPr>
@@ -23485,7 +23585,7 @@
           <p:cNvPr id="97" name="Straight Connector 96">
             <a:extLst>
               <a:ext uri="{FF2B5EF4-FFF2-40B4-BE49-F238E27FC236}">
-                <a16:creationId xmlns:a16="http://schemas.microsoft.com/office/drawing/2014/main" id="{D25A6F54-F129-4330-BE58-15EFA559459F}"/>
+                <a16:creationId xmlns:a16="http://schemas.microsoft.com/office/drawing/2014/main" xmlns="" id="{D25A6F54-F129-4330-BE58-15EFA559459F}"/>
               </a:ext>
             </a:extLst>
           </p:cNvPr>
@@ -23531,7 +23631,7 @@
           <p:cNvPr id="102" name="Group 101">
             <a:extLst>
               <a:ext uri="{FF2B5EF4-FFF2-40B4-BE49-F238E27FC236}">
-                <a16:creationId xmlns:a16="http://schemas.microsoft.com/office/drawing/2014/main" id="{4D5C9D6C-2BA6-4210-9BE8-391169B593BF}"/>
+                <a16:creationId xmlns:a16="http://schemas.microsoft.com/office/drawing/2014/main" xmlns="" id="{4D5C9D6C-2BA6-4210-9BE8-391169B593BF}"/>
               </a:ext>
             </a:extLst>
           </p:cNvPr>
@@ -23551,7 +23651,7 @@
             <p:cNvPr id="99" name="Rectangle 98">
               <a:extLst>
                 <a:ext uri="{FF2B5EF4-FFF2-40B4-BE49-F238E27FC236}">
-                  <a16:creationId xmlns:a16="http://schemas.microsoft.com/office/drawing/2014/main" id="{8A2A5D3B-8D5B-4534-95C5-7EDE4E4A2EE5}"/>
+                  <a16:creationId xmlns:a16="http://schemas.microsoft.com/office/drawing/2014/main" xmlns="" id="{8A2A5D3B-8D5B-4534-95C5-7EDE4E4A2EE5}"/>
                 </a:ext>
               </a:extLst>
             </p:cNvPr>
@@ -23607,7 +23707,7 @@
             <p:cNvPr id="100" name="Rectangle 99">
               <a:extLst>
                 <a:ext uri="{FF2B5EF4-FFF2-40B4-BE49-F238E27FC236}">
-                  <a16:creationId xmlns:a16="http://schemas.microsoft.com/office/drawing/2014/main" id="{9C28B60A-2088-48A0-B569-F3936386E898}"/>
+                  <a16:creationId xmlns:a16="http://schemas.microsoft.com/office/drawing/2014/main" xmlns="" id="{9C28B60A-2088-48A0-B569-F3936386E898}"/>
                 </a:ext>
               </a:extLst>
             </p:cNvPr>
@@ -23661,7 +23761,7 @@
             <p:cNvPr id="101" name="Rectangle 100">
               <a:extLst>
                 <a:ext uri="{FF2B5EF4-FFF2-40B4-BE49-F238E27FC236}">
-                  <a16:creationId xmlns:a16="http://schemas.microsoft.com/office/drawing/2014/main" id="{562E2C42-74F4-4E91-A195-585D7FB0B2BC}"/>
+                  <a16:creationId xmlns:a16="http://schemas.microsoft.com/office/drawing/2014/main" xmlns="" id="{562E2C42-74F4-4E91-A195-585D7FB0B2BC}"/>
                 </a:ext>
               </a:extLst>
             </p:cNvPr>
@@ -23716,7 +23816,7 @@
           <p:cNvPr id="103" name="Group 102">
             <a:extLst>
               <a:ext uri="{FF2B5EF4-FFF2-40B4-BE49-F238E27FC236}">
-                <a16:creationId xmlns:a16="http://schemas.microsoft.com/office/drawing/2014/main" id="{6F132A65-5FBB-4398-A7E1-2290DFCF2905}"/>
+                <a16:creationId xmlns:a16="http://schemas.microsoft.com/office/drawing/2014/main" xmlns="" id="{6F132A65-5FBB-4398-A7E1-2290DFCF2905}"/>
               </a:ext>
             </a:extLst>
           </p:cNvPr>
@@ -23736,7 +23836,7 @@
             <p:cNvPr id="104" name="Rectangle 103">
               <a:extLst>
                 <a:ext uri="{FF2B5EF4-FFF2-40B4-BE49-F238E27FC236}">
-                  <a16:creationId xmlns:a16="http://schemas.microsoft.com/office/drawing/2014/main" id="{16ABE599-3C70-4AF6-A393-239EE2B0DEA7}"/>
+                  <a16:creationId xmlns:a16="http://schemas.microsoft.com/office/drawing/2014/main" xmlns="" id="{16ABE599-3C70-4AF6-A393-239EE2B0DEA7}"/>
                 </a:ext>
               </a:extLst>
             </p:cNvPr>
@@ -23792,7 +23892,7 @@
             <p:cNvPr id="105" name="Rectangle 104">
               <a:extLst>
                 <a:ext uri="{FF2B5EF4-FFF2-40B4-BE49-F238E27FC236}">
-                  <a16:creationId xmlns:a16="http://schemas.microsoft.com/office/drawing/2014/main" id="{216B8055-F5E9-4F2E-A47F-7CAEF386110D}"/>
+                  <a16:creationId xmlns:a16="http://schemas.microsoft.com/office/drawing/2014/main" xmlns="" id="{216B8055-F5E9-4F2E-A47F-7CAEF386110D}"/>
                 </a:ext>
               </a:extLst>
             </p:cNvPr>
@@ -23846,7 +23946,7 @@
             <p:cNvPr id="106" name="Rectangle 105">
               <a:extLst>
                 <a:ext uri="{FF2B5EF4-FFF2-40B4-BE49-F238E27FC236}">
-                  <a16:creationId xmlns:a16="http://schemas.microsoft.com/office/drawing/2014/main" id="{6DB048BD-0A0D-4854-92DB-BCD958D65BEF}"/>
+                  <a16:creationId xmlns:a16="http://schemas.microsoft.com/office/drawing/2014/main" xmlns="" id="{6DB048BD-0A0D-4854-92DB-BCD958D65BEF}"/>
                 </a:ext>
               </a:extLst>
             </p:cNvPr>
@@ -23901,7 +24001,7 @@
           <p:cNvPr id="107" name="Group 106">
             <a:extLst>
               <a:ext uri="{FF2B5EF4-FFF2-40B4-BE49-F238E27FC236}">
-                <a16:creationId xmlns:a16="http://schemas.microsoft.com/office/drawing/2014/main" id="{CEEACBB4-96B5-487A-B258-27A968459662}"/>
+                <a16:creationId xmlns:a16="http://schemas.microsoft.com/office/drawing/2014/main" xmlns="" id="{CEEACBB4-96B5-487A-B258-27A968459662}"/>
               </a:ext>
             </a:extLst>
           </p:cNvPr>
@@ -23921,7 +24021,7 @@
             <p:cNvPr id="108" name="Rectangle 107">
               <a:extLst>
                 <a:ext uri="{FF2B5EF4-FFF2-40B4-BE49-F238E27FC236}">
-                  <a16:creationId xmlns:a16="http://schemas.microsoft.com/office/drawing/2014/main" id="{5995F40C-3BAE-4251-B5D3-2C3C3B7FEA16}"/>
+                  <a16:creationId xmlns:a16="http://schemas.microsoft.com/office/drawing/2014/main" xmlns="" id="{5995F40C-3BAE-4251-B5D3-2C3C3B7FEA16}"/>
                 </a:ext>
               </a:extLst>
             </p:cNvPr>
@@ -23977,7 +24077,7 @@
             <p:cNvPr id="109" name="Rectangle 108">
               <a:extLst>
                 <a:ext uri="{FF2B5EF4-FFF2-40B4-BE49-F238E27FC236}">
-                  <a16:creationId xmlns:a16="http://schemas.microsoft.com/office/drawing/2014/main" id="{B69C8503-1C90-4528-B997-40C8FBA2FC2B}"/>
+                  <a16:creationId xmlns:a16="http://schemas.microsoft.com/office/drawing/2014/main" xmlns="" id="{B69C8503-1C90-4528-B997-40C8FBA2FC2B}"/>
                 </a:ext>
               </a:extLst>
             </p:cNvPr>
@@ -24031,7 +24131,7 @@
             <p:cNvPr id="110" name="Rectangle 109">
               <a:extLst>
                 <a:ext uri="{FF2B5EF4-FFF2-40B4-BE49-F238E27FC236}">
-                  <a16:creationId xmlns:a16="http://schemas.microsoft.com/office/drawing/2014/main" id="{60BD8BEC-8D15-460D-AAC6-DDD94FD7734C}"/>
+                  <a16:creationId xmlns:a16="http://schemas.microsoft.com/office/drawing/2014/main" xmlns="" id="{60BD8BEC-8D15-460D-AAC6-DDD94FD7734C}"/>
                 </a:ext>
               </a:extLst>
             </p:cNvPr>
@@ -24086,7 +24186,7 @@
           <p:cNvPr id="111" name="Group 110">
             <a:extLst>
               <a:ext uri="{FF2B5EF4-FFF2-40B4-BE49-F238E27FC236}">
-                <a16:creationId xmlns:a16="http://schemas.microsoft.com/office/drawing/2014/main" id="{AF3A3A3E-82A2-44AB-B341-0828444899BB}"/>
+                <a16:creationId xmlns:a16="http://schemas.microsoft.com/office/drawing/2014/main" xmlns="" id="{AF3A3A3E-82A2-44AB-B341-0828444899BB}"/>
               </a:ext>
             </a:extLst>
           </p:cNvPr>
@@ -24106,7 +24206,7 @@
             <p:cNvPr id="112" name="Rectangle 111">
               <a:extLst>
                 <a:ext uri="{FF2B5EF4-FFF2-40B4-BE49-F238E27FC236}">
-                  <a16:creationId xmlns:a16="http://schemas.microsoft.com/office/drawing/2014/main" id="{CD09AB16-0F5F-4E51-A2F2-02AE1A63BAFE}"/>
+                  <a16:creationId xmlns:a16="http://schemas.microsoft.com/office/drawing/2014/main" xmlns="" id="{CD09AB16-0F5F-4E51-A2F2-02AE1A63BAFE}"/>
                 </a:ext>
               </a:extLst>
             </p:cNvPr>
@@ -24162,7 +24262,7 @@
             <p:cNvPr id="113" name="Rectangle 112">
               <a:extLst>
                 <a:ext uri="{FF2B5EF4-FFF2-40B4-BE49-F238E27FC236}">
-                  <a16:creationId xmlns:a16="http://schemas.microsoft.com/office/drawing/2014/main" id="{21C4174B-77B7-4633-AA76-4BC4A90F15F8}"/>
+                  <a16:creationId xmlns:a16="http://schemas.microsoft.com/office/drawing/2014/main" xmlns="" id="{21C4174B-77B7-4633-AA76-4BC4A90F15F8}"/>
                 </a:ext>
               </a:extLst>
             </p:cNvPr>
@@ -24216,7 +24316,7 @@
             <p:cNvPr id="114" name="Rectangle 113">
               <a:extLst>
                 <a:ext uri="{FF2B5EF4-FFF2-40B4-BE49-F238E27FC236}">
-                  <a16:creationId xmlns:a16="http://schemas.microsoft.com/office/drawing/2014/main" id="{507E7324-4559-48EF-85EE-99BE143F9800}"/>
+                  <a16:creationId xmlns:a16="http://schemas.microsoft.com/office/drawing/2014/main" xmlns="" id="{507E7324-4559-48EF-85EE-99BE143F9800}"/>
                 </a:ext>
               </a:extLst>
             </p:cNvPr>
@@ -24271,7 +24371,7 @@
           <p:cNvPr id="115" name="Group 114">
             <a:extLst>
               <a:ext uri="{FF2B5EF4-FFF2-40B4-BE49-F238E27FC236}">
-                <a16:creationId xmlns:a16="http://schemas.microsoft.com/office/drawing/2014/main" id="{BCE1673F-7C2A-44DE-8675-A371ABC0FAFF}"/>
+                <a16:creationId xmlns:a16="http://schemas.microsoft.com/office/drawing/2014/main" xmlns="" id="{BCE1673F-7C2A-44DE-8675-A371ABC0FAFF}"/>
               </a:ext>
             </a:extLst>
           </p:cNvPr>
@@ -24291,7 +24391,7 @@
             <p:cNvPr id="116" name="Rectangle 115">
               <a:extLst>
                 <a:ext uri="{FF2B5EF4-FFF2-40B4-BE49-F238E27FC236}">
-                  <a16:creationId xmlns:a16="http://schemas.microsoft.com/office/drawing/2014/main" id="{96A4D985-749B-4056-B803-480A56FB4B39}"/>
+                  <a16:creationId xmlns:a16="http://schemas.microsoft.com/office/drawing/2014/main" xmlns="" id="{96A4D985-749B-4056-B803-480A56FB4B39}"/>
                 </a:ext>
               </a:extLst>
             </p:cNvPr>
@@ -24347,7 +24447,7 @@
             <p:cNvPr id="117" name="Rectangle 116">
               <a:extLst>
                 <a:ext uri="{FF2B5EF4-FFF2-40B4-BE49-F238E27FC236}">
-                  <a16:creationId xmlns:a16="http://schemas.microsoft.com/office/drawing/2014/main" id="{1E45C74E-9151-4668-9B08-BCE77E0DEA1D}"/>
+                  <a16:creationId xmlns:a16="http://schemas.microsoft.com/office/drawing/2014/main" xmlns="" id="{1E45C74E-9151-4668-9B08-BCE77E0DEA1D}"/>
                 </a:ext>
               </a:extLst>
             </p:cNvPr>
@@ -24401,7 +24501,7 @@
             <p:cNvPr id="118" name="Rectangle 117">
               <a:extLst>
                 <a:ext uri="{FF2B5EF4-FFF2-40B4-BE49-F238E27FC236}">
-                  <a16:creationId xmlns:a16="http://schemas.microsoft.com/office/drawing/2014/main" id="{9057D8E6-5106-4AE2-B962-A8EFBD19B23B}"/>
+                  <a16:creationId xmlns:a16="http://schemas.microsoft.com/office/drawing/2014/main" xmlns="" id="{9057D8E6-5106-4AE2-B962-A8EFBD19B23B}"/>
                 </a:ext>
               </a:extLst>
             </p:cNvPr>
@@ -24456,7 +24556,7 @@
           <p:cNvPr id="119" name="Group 118">
             <a:extLst>
               <a:ext uri="{FF2B5EF4-FFF2-40B4-BE49-F238E27FC236}">
-                <a16:creationId xmlns:a16="http://schemas.microsoft.com/office/drawing/2014/main" id="{FBBCED85-9120-499D-B32D-282C614615DF}"/>
+                <a16:creationId xmlns:a16="http://schemas.microsoft.com/office/drawing/2014/main" xmlns="" id="{FBBCED85-9120-499D-B32D-282C614615DF}"/>
               </a:ext>
             </a:extLst>
           </p:cNvPr>
@@ -24476,7 +24576,7 @@
             <p:cNvPr id="120" name="Rectangle 119">
               <a:extLst>
                 <a:ext uri="{FF2B5EF4-FFF2-40B4-BE49-F238E27FC236}">
-                  <a16:creationId xmlns:a16="http://schemas.microsoft.com/office/drawing/2014/main" id="{FFDDF095-C7D2-4206-8CCB-DC1DA9F7792B}"/>
+                  <a16:creationId xmlns:a16="http://schemas.microsoft.com/office/drawing/2014/main" xmlns="" id="{FFDDF095-C7D2-4206-8CCB-DC1DA9F7792B}"/>
                 </a:ext>
               </a:extLst>
             </p:cNvPr>
@@ -24532,7 +24632,7 @@
             <p:cNvPr id="121" name="Rectangle 120">
               <a:extLst>
                 <a:ext uri="{FF2B5EF4-FFF2-40B4-BE49-F238E27FC236}">
-                  <a16:creationId xmlns:a16="http://schemas.microsoft.com/office/drawing/2014/main" id="{86FAB6CB-F868-4CB9-9C3F-CFAB78301E3D}"/>
+                  <a16:creationId xmlns:a16="http://schemas.microsoft.com/office/drawing/2014/main" xmlns="" id="{86FAB6CB-F868-4CB9-9C3F-CFAB78301E3D}"/>
                 </a:ext>
               </a:extLst>
             </p:cNvPr>
@@ -24586,7 +24686,7 @@
             <p:cNvPr id="122" name="Rectangle 121">
               <a:extLst>
                 <a:ext uri="{FF2B5EF4-FFF2-40B4-BE49-F238E27FC236}">
-                  <a16:creationId xmlns:a16="http://schemas.microsoft.com/office/drawing/2014/main" id="{4CE5F8D3-5C12-4AEC-8DA1-E89EABEFD2E0}"/>
+                  <a16:creationId xmlns:a16="http://schemas.microsoft.com/office/drawing/2014/main" xmlns="" id="{4CE5F8D3-5C12-4AEC-8DA1-E89EABEFD2E0}"/>
                 </a:ext>
               </a:extLst>
             </p:cNvPr>
@@ -24641,7 +24741,7 @@
           <p:cNvPr id="123" name="Straight Connector 122">
             <a:extLst>
               <a:ext uri="{FF2B5EF4-FFF2-40B4-BE49-F238E27FC236}">
-                <a16:creationId xmlns:a16="http://schemas.microsoft.com/office/drawing/2014/main" id="{1A0B7294-0B67-4368-9293-D9F7009B597F}"/>
+                <a16:creationId xmlns:a16="http://schemas.microsoft.com/office/drawing/2014/main" xmlns="" id="{1A0B7294-0B67-4368-9293-D9F7009B597F}"/>
               </a:ext>
             </a:extLst>
           </p:cNvPr>
@@ -24687,7 +24787,7 @@
           <p:cNvPr id="125" name="Straight Connector 124">
             <a:extLst>
               <a:ext uri="{FF2B5EF4-FFF2-40B4-BE49-F238E27FC236}">
-                <a16:creationId xmlns:a16="http://schemas.microsoft.com/office/drawing/2014/main" id="{6170125F-BC10-4487-BC0A-87812AA23F38}"/>
+                <a16:creationId xmlns:a16="http://schemas.microsoft.com/office/drawing/2014/main" xmlns="" id="{6170125F-BC10-4487-BC0A-87812AA23F38}"/>
               </a:ext>
             </a:extLst>
           </p:cNvPr>
@@ -24733,7 +24833,7 @@
           <p:cNvPr id="127" name="Straight Connector 126">
             <a:extLst>
               <a:ext uri="{FF2B5EF4-FFF2-40B4-BE49-F238E27FC236}">
-                <a16:creationId xmlns:a16="http://schemas.microsoft.com/office/drawing/2014/main" id="{DBEFB81E-C2E9-45AE-BBFF-A848F52864EF}"/>
+                <a16:creationId xmlns:a16="http://schemas.microsoft.com/office/drawing/2014/main" xmlns="" id="{DBEFB81E-C2E9-45AE-BBFF-A848F52864EF}"/>
               </a:ext>
             </a:extLst>
           </p:cNvPr>
@@ -24779,7 +24879,7 @@
           <p:cNvPr id="129" name="Straight Connector 128">
             <a:extLst>
               <a:ext uri="{FF2B5EF4-FFF2-40B4-BE49-F238E27FC236}">
-                <a16:creationId xmlns:a16="http://schemas.microsoft.com/office/drawing/2014/main" id="{3E973232-5460-4BB0-B496-1E1EFE8A7C59}"/>
+                <a16:creationId xmlns:a16="http://schemas.microsoft.com/office/drawing/2014/main" xmlns="" id="{3E973232-5460-4BB0-B496-1E1EFE8A7C59}"/>
               </a:ext>
             </a:extLst>
           </p:cNvPr>
@@ -24825,7 +24925,7 @@
           <p:cNvPr id="132" name="Straight Connector 131">
             <a:extLst>
               <a:ext uri="{FF2B5EF4-FFF2-40B4-BE49-F238E27FC236}">
-                <a16:creationId xmlns:a16="http://schemas.microsoft.com/office/drawing/2014/main" id="{620B048A-61B0-4E3A-BF1C-D0C0EBC563B5}"/>
+                <a16:creationId xmlns:a16="http://schemas.microsoft.com/office/drawing/2014/main" xmlns="" id="{620B048A-61B0-4E3A-BF1C-D0C0EBC563B5}"/>
               </a:ext>
             </a:extLst>
           </p:cNvPr>
@@ -24871,7 +24971,7 @@
           <p:cNvPr id="134" name="Straight Connector 133">
             <a:extLst>
               <a:ext uri="{FF2B5EF4-FFF2-40B4-BE49-F238E27FC236}">
-                <a16:creationId xmlns:a16="http://schemas.microsoft.com/office/drawing/2014/main" id="{FC77DA65-9C2F-4878-96CA-C4646F1EA32E}"/>
+                <a16:creationId xmlns:a16="http://schemas.microsoft.com/office/drawing/2014/main" xmlns="" id="{FC77DA65-9C2F-4878-96CA-C4646F1EA32E}"/>
               </a:ext>
             </a:extLst>
           </p:cNvPr>
@@ -24917,7 +25017,7 @@
           <p:cNvPr id="136" name="Rectangle 135">
             <a:extLst>
               <a:ext uri="{FF2B5EF4-FFF2-40B4-BE49-F238E27FC236}">
-                <a16:creationId xmlns:a16="http://schemas.microsoft.com/office/drawing/2014/main" id="{617D824C-5F23-4B55-A50E-5501A1BC9D66}"/>
+                <a16:creationId xmlns:a16="http://schemas.microsoft.com/office/drawing/2014/main" xmlns="" id="{617D824C-5F23-4B55-A50E-5501A1BC9D66}"/>
               </a:ext>
             </a:extLst>
           </p:cNvPr>
@@ -24960,7 +25060,7 @@
           <p:cNvPr id="137" name="Group 136">
             <a:extLst>
               <a:ext uri="{FF2B5EF4-FFF2-40B4-BE49-F238E27FC236}">
-                <a16:creationId xmlns:a16="http://schemas.microsoft.com/office/drawing/2014/main" id="{CF1C29A0-0434-4CCC-8A6A-AFD1A7DF29BB}"/>
+                <a16:creationId xmlns:a16="http://schemas.microsoft.com/office/drawing/2014/main" xmlns="" id="{CF1C29A0-0434-4CCC-8A6A-AFD1A7DF29BB}"/>
               </a:ext>
             </a:extLst>
           </p:cNvPr>
@@ -24980,7 +25080,7 @@
             <p:cNvPr id="138" name="Rectangle 137">
               <a:extLst>
                 <a:ext uri="{FF2B5EF4-FFF2-40B4-BE49-F238E27FC236}">
-                  <a16:creationId xmlns:a16="http://schemas.microsoft.com/office/drawing/2014/main" id="{33AAA53A-C957-4B5A-B16D-720DF9BE205C}"/>
+                  <a16:creationId xmlns:a16="http://schemas.microsoft.com/office/drawing/2014/main" xmlns="" id="{33AAA53A-C957-4B5A-B16D-720DF9BE205C}"/>
                 </a:ext>
               </a:extLst>
             </p:cNvPr>
@@ -25036,7 +25136,7 @@
             <p:cNvPr id="139" name="Rectangle 138">
               <a:extLst>
                 <a:ext uri="{FF2B5EF4-FFF2-40B4-BE49-F238E27FC236}">
-                  <a16:creationId xmlns:a16="http://schemas.microsoft.com/office/drawing/2014/main" id="{E80A1B97-6005-4140-8B50-E0E3F5F293F4}"/>
+                  <a16:creationId xmlns:a16="http://schemas.microsoft.com/office/drawing/2014/main" xmlns="" id="{E80A1B97-6005-4140-8B50-E0E3F5F293F4}"/>
                 </a:ext>
               </a:extLst>
             </p:cNvPr>
@@ -25090,7 +25190,7 @@
             <p:cNvPr id="140" name="Rectangle 139">
               <a:extLst>
                 <a:ext uri="{FF2B5EF4-FFF2-40B4-BE49-F238E27FC236}">
-                  <a16:creationId xmlns:a16="http://schemas.microsoft.com/office/drawing/2014/main" id="{A66DE1DD-10F2-4CFA-9ECD-D01722FE86F2}"/>
+                  <a16:creationId xmlns:a16="http://schemas.microsoft.com/office/drawing/2014/main" xmlns="" id="{A66DE1DD-10F2-4CFA-9ECD-D01722FE86F2}"/>
                 </a:ext>
               </a:extLst>
             </p:cNvPr>
@@ -25145,7 +25245,7 @@
           <p:cNvPr id="141" name="Group 140">
             <a:extLst>
               <a:ext uri="{FF2B5EF4-FFF2-40B4-BE49-F238E27FC236}">
-                <a16:creationId xmlns:a16="http://schemas.microsoft.com/office/drawing/2014/main" id="{967D4F39-C61F-47A4-B9DB-650E7754FA42}"/>
+                <a16:creationId xmlns:a16="http://schemas.microsoft.com/office/drawing/2014/main" xmlns="" id="{967D4F39-C61F-47A4-B9DB-650E7754FA42}"/>
               </a:ext>
             </a:extLst>
           </p:cNvPr>
@@ -25165,7 +25265,7 @@
             <p:cNvPr id="142" name="Rectangle 141">
               <a:extLst>
                 <a:ext uri="{FF2B5EF4-FFF2-40B4-BE49-F238E27FC236}">
-                  <a16:creationId xmlns:a16="http://schemas.microsoft.com/office/drawing/2014/main" id="{C05992EE-4B74-446B-8E4A-53DD1A97836E}"/>
+                  <a16:creationId xmlns:a16="http://schemas.microsoft.com/office/drawing/2014/main" xmlns="" id="{C05992EE-4B74-446B-8E4A-53DD1A97836E}"/>
                 </a:ext>
               </a:extLst>
             </p:cNvPr>
@@ -25221,7 +25321,7 @@
             <p:cNvPr id="143" name="Rectangle 142">
               <a:extLst>
                 <a:ext uri="{FF2B5EF4-FFF2-40B4-BE49-F238E27FC236}">
-                  <a16:creationId xmlns:a16="http://schemas.microsoft.com/office/drawing/2014/main" id="{F82FE5FE-0275-4AC5-83B1-3844D067251E}"/>
+                  <a16:creationId xmlns:a16="http://schemas.microsoft.com/office/drawing/2014/main" xmlns="" id="{F82FE5FE-0275-4AC5-83B1-3844D067251E}"/>
                 </a:ext>
               </a:extLst>
             </p:cNvPr>
@@ -25275,7 +25375,7 @@
             <p:cNvPr id="144" name="Rectangle 143">
               <a:extLst>
                 <a:ext uri="{FF2B5EF4-FFF2-40B4-BE49-F238E27FC236}">
-                  <a16:creationId xmlns:a16="http://schemas.microsoft.com/office/drawing/2014/main" id="{DC81E49B-3796-47D3-96B2-03FFAB1F18EE}"/>
+                  <a16:creationId xmlns:a16="http://schemas.microsoft.com/office/drawing/2014/main" xmlns="" id="{DC81E49B-3796-47D3-96B2-03FFAB1F18EE}"/>
                 </a:ext>
               </a:extLst>
             </p:cNvPr>
@@ -25330,7 +25430,7 @@
           <p:cNvPr id="145" name="Straight Connector 144">
             <a:extLst>
               <a:ext uri="{FF2B5EF4-FFF2-40B4-BE49-F238E27FC236}">
-                <a16:creationId xmlns:a16="http://schemas.microsoft.com/office/drawing/2014/main" id="{60E0FC48-CC90-4BCD-B106-6EAA449D5219}"/>
+                <a16:creationId xmlns:a16="http://schemas.microsoft.com/office/drawing/2014/main" xmlns="" id="{60E0FC48-CC90-4BCD-B106-6EAA449D5219}"/>
               </a:ext>
             </a:extLst>
           </p:cNvPr>
@@ -25376,7 +25476,7 @@
           <p:cNvPr id="147" name="Straight Connector 146">
             <a:extLst>
               <a:ext uri="{FF2B5EF4-FFF2-40B4-BE49-F238E27FC236}">
-                <a16:creationId xmlns:a16="http://schemas.microsoft.com/office/drawing/2014/main" id="{296D3F54-A6CA-4543-887C-EE0ADBBBD802}"/>
+                <a16:creationId xmlns:a16="http://schemas.microsoft.com/office/drawing/2014/main" xmlns="" id="{296D3F54-A6CA-4543-887C-EE0ADBBBD802}"/>
               </a:ext>
             </a:extLst>
           </p:cNvPr>
@@ -25422,7 +25522,7 @@
           <p:cNvPr id="150" name="Rectangle 149">
             <a:extLst>
               <a:ext uri="{FF2B5EF4-FFF2-40B4-BE49-F238E27FC236}">
-                <a16:creationId xmlns:a16="http://schemas.microsoft.com/office/drawing/2014/main" id="{8C1C3700-0CDD-4AA7-AD10-D16B0C42B27A}"/>
+                <a16:creationId xmlns:a16="http://schemas.microsoft.com/office/drawing/2014/main" xmlns="" id="{8C1C3700-0CDD-4AA7-AD10-D16B0C42B27A}"/>
               </a:ext>
             </a:extLst>
           </p:cNvPr>
@@ -25476,7 +25576,7 @@
           <p:cNvPr id="151" name="Rectangle 150">
             <a:extLst>
               <a:ext uri="{FF2B5EF4-FFF2-40B4-BE49-F238E27FC236}">
-                <a16:creationId xmlns:a16="http://schemas.microsoft.com/office/drawing/2014/main" id="{2F9971B5-F97B-48C5-A359-DE29289F3691}"/>
+                <a16:creationId xmlns:a16="http://schemas.microsoft.com/office/drawing/2014/main" xmlns="" id="{2F9971B5-F97B-48C5-A359-DE29289F3691}"/>
               </a:ext>
             </a:extLst>
           </p:cNvPr>
@@ -25514,7 +25614,7 @@
           <p:cNvPr id="153" name="Rectangle 152">
             <a:extLst>
               <a:ext uri="{FF2B5EF4-FFF2-40B4-BE49-F238E27FC236}">
-                <a16:creationId xmlns:a16="http://schemas.microsoft.com/office/drawing/2014/main" id="{C3F9E766-6B1A-461B-9524-C2CC2A772BB9}"/>
+                <a16:creationId xmlns:a16="http://schemas.microsoft.com/office/drawing/2014/main" xmlns="" id="{C3F9E766-6B1A-461B-9524-C2CC2A772BB9}"/>
               </a:ext>
             </a:extLst>
           </p:cNvPr>
@@ -25568,7 +25668,7 @@
           <p:cNvPr id="154" name="Rectangle 153">
             <a:extLst>
               <a:ext uri="{FF2B5EF4-FFF2-40B4-BE49-F238E27FC236}">
-                <a16:creationId xmlns:a16="http://schemas.microsoft.com/office/drawing/2014/main" id="{37BC63D4-5013-4717-BF24-9D22F80351B1}"/>
+                <a16:creationId xmlns:a16="http://schemas.microsoft.com/office/drawing/2014/main" xmlns="" id="{37BC63D4-5013-4717-BF24-9D22F80351B1}"/>
               </a:ext>
             </a:extLst>
           </p:cNvPr>
@@ -25606,7 +25706,7 @@
           <p:cNvPr id="155" name="Rectangle 154">
             <a:extLst>
               <a:ext uri="{FF2B5EF4-FFF2-40B4-BE49-F238E27FC236}">
-                <a16:creationId xmlns:a16="http://schemas.microsoft.com/office/drawing/2014/main" id="{5D1518F9-1B64-4B1D-AB44-4C8FB2A63992}"/>
+                <a16:creationId xmlns:a16="http://schemas.microsoft.com/office/drawing/2014/main" xmlns="" id="{5D1518F9-1B64-4B1D-AB44-4C8FB2A63992}"/>
               </a:ext>
             </a:extLst>
           </p:cNvPr>
@@ -25660,7 +25760,7 @@
           <p:cNvPr id="156" name="Rectangle 155">
             <a:extLst>
               <a:ext uri="{FF2B5EF4-FFF2-40B4-BE49-F238E27FC236}">
-                <a16:creationId xmlns:a16="http://schemas.microsoft.com/office/drawing/2014/main" id="{B5F5C08B-1AFD-4916-9AA6-3FAA2CE0B281}"/>
+                <a16:creationId xmlns:a16="http://schemas.microsoft.com/office/drawing/2014/main" xmlns="" id="{B5F5C08B-1AFD-4916-9AA6-3FAA2CE0B281}"/>
               </a:ext>
             </a:extLst>
           </p:cNvPr>
@@ -25698,7 +25798,7 @@
           <p:cNvPr id="157" name="Rectangle 156">
             <a:extLst>
               <a:ext uri="{FF2B5EF4-FFF2-40B4-BE49-F238E27FC236}">
-                <a16:creationId xmlns:a16="http://schemas.microsoft.com/office/drawing/2014/main" id="{0D9B2368-3D66-4F16-8C56-BFA12DA73810}"/>
+                <a16:creationId xmlns:a16="http://schemas.microsoft.com/office/drawing/2014/main" xmlns="" id="{0D9B2368-3D66-4F16-8C56-BFA12DA73810}"/>
               </a:ext>
             </a:extLst>
           </p:cNvPr>
@@ -25739,7 +25839,7 @@
           <p:cNvPr id="158" name="Straight Connector 157">
             <a:extLst>
               <a:ext uri="{FF2B5EF4-FFF2-40B4-BE49-F238E27FC236}">
-                <a16:creationId xmlns:a16="http://schemas.microsoft.com/office/drawing/2014/main" id="{2200D39C-0C04-4D17-BFBA-EBCD8A568A28}"/>
+                <a16:creationId xmlns:a16="http://schemas.microsoft.com/office/drawing/2014/main" xmlns="" id="{2200D39C-0C04-4D17-BFBA-EBCD8A568A28}"/>
               </a:ext>
             </a:extLst>
           </p:cNvPr>
@@ -25785,7 +25885,7 @@
           <p:cNvPr id="161" name="Rectangle 160">
             <a:extLst>
               <a:ext uri="{FF2B5EF4-FFF2-40B4-BE49-F238E27FC236}">
-                <a16:creationId xmlns:a16="http://schemas.microsoft.com/office/drawing/2014/main" id="{D54B475D-F2DF-47E0-A493-7F8E0E32B006}"/>
+                <a16:creationId xmlns:a16="http://schemas.microsoft.com/office/drawing/2014/main" xmlns="" id="{D54B475D-F2DF-47E0-A493-7F8E0E32B006}"/>
               </a:ext>
             </a:extLst>
           </p:cNvPr>
@@ -25826,7 +25926,7 @@
           <p:cNvPr id="162" name="Straight Connector 161">
             <a:extLst>
               <a:ext uri="{FF2B5EF4-FFF2-40B4-BE49-F238E27FC236}">
-                <a16:creationId xmlns:a16="http://schemas.microsoft.com/office/drawing/2014/main" id="{E66AD3B3-28EE-44F9-9E83-E3469196F970}"/>
+                <a16:creationId xmlns:a16="http://schemas.microsoft.com/office/drawing/2014/main" xmlns="" id="{E66AD3B3-28EE-44F9-9E83-E3469196F970}"/>
               </a:ext>
             </a:extLst>
           </p:cNvPr>
@@ -25872,7 +25972,7 @@
           <p:cNvPr id="166" name="Rectangle 165">
             <a:extLst>
               <a:ext uri="{FF2B5EF4-FFF2-40B4-BE49-F238E27FC236}">
-                <a16:creationId xmlns:a16="http://schemas.microsoft.com/office/drawing/2014/main" id="{0D97EAB7-B6E6-4B45-A497-FEE4EFE30294}"/>
+                <a16:creationId xmlns:a16="http://schemas.microsoft.com/office/drawing/2014/main" xmlns="" id="{0D97EAB7-B6E6-4B45-A497-FEE4EFE30294}"/>
               </a:ext>
             </a:extLst>
           </p:cNvPr>
@@ -25913,7 +26013,7 @@
           <p:cNvPr id="167" name="Straight Connector 166">
             <a:extLst>
               <a:ext uri="{FF2B5EF4-FFF2-40B4-BE49-F238E27FC236}">
-                <a16:creationId xmlns:a16="http://schemas.microsoft.com/office/drawing/2014/main" id="{3017B4EF-BEFA-4FC2-A7EE-9B908FDFB234}"/>
+                <a16:creationId xmlns:a16="http://schemas.microsoft.com/office/drawing/2014/main" xmlns="" id="{3017B4EF-BEFA-4FC2-A7EE-9B908FDFB234}"/>
               </a:ext>
             </a:extLst>
           </p:cNvPr>
@@ -25959,7 +26059,7 @@
           <p:cNvPr id="168" name="Rectangle 167">
             <a:extLst>
               <a:ext uri="{FF2B5EF4-FFF2-40B4-BE49-F238E27FC236}">
-                <a16:creationId xmlns:a16="http://schemas.microsoft.com/office/drawing/2014/main" id="{AE73D496-C1F5-477E-9F63-7BC75DCCB9E1}"/>
+                <a16:creationId xmlns:a16="http://schemas.microsoft.com/office/drawing/2014/main" xmlns="" id="{AE73D496-C1F5-477E-9F63-7BC75DCCB9E1}"/>
               </a:ext>
             </a:extLst>
           </p:cNvPr>
@@ -26011,7 +26111,7 @@
           <p:cNvPr id="169" name="Rectangle 168">
             <a:extLst>
               <a:ext uri="{FF2B5EF4-FFF2-40B4-BE49-F238E27FC236}">
-                <a16:creationId xmlns:a16="http://schemas.microsoft.com/office/drawing/2014/main" id="{9CA58566-F95C-4C13-8F09-4690FE2DC9A7}"/>
+                <a16:creationId xmlns:a16="http://schemas.microsoft.com/office/drawing/2014/main" xmlns="" id="{9CA58566-F95C-4C13-8F09-4690FE2DC9A7}"/>
               </a:ext>
             </a:extLst>
           </p:cNvPr>
@@ -26392,7 +26492,7 @@
           <p:cNvPr id="7" name="Group 6">
             <a:extLst>
               <a:ext uri="{FF2B5EF4-FFF2-40B4-BE49-F238E27FC236}">
-                <a16:creationId xmlns:a16="http://schemas.microsoft.com/office/drawing/2014/main" id="{A8561038-DE88-4359-BE6C-A8A161683EA4}"/>
+                <a16:creationId xmlns:a16="http://schemas.microsoft.com/office/drawing/2014/main" xmlns="" id="{A8561038-DE88-4359-BE6C-A8A161683EA4}"/>
               </a:ext>
             </a:extLst>
           </p:cNvPr>
@@ -26412,7 +26512,7 @@
             <p:cNvPr id="16" name="Arrow: Circular 15">
               <a:extLst>
                 <a:ext uri="{FF2B5EF4-FFF2-40B4-BE49-F238E27FC236}">
-                  <a16:creationId xmlns:a16="http://schemas.microsoft.com/office/drawing/2014/main" id="{F284D861-CC57-434F-AE13-62D12C205157}"/>
+                  <a16:creationId xmlns:a16="http://schemas.microsoft.com/office/drawing/2014/main" xmlns="" id="{F284D861-CC57-434F-AE13-62D12C205157}"/>
                 </a:ext>
               </a:extLst>
             </p:cNvPr>
@@ -26475,7 +26575,7 @@
             <p:cNvPr id="21" name="Freeform: Shape 20">
               <a:extLst>
                 <a:ext uri="{FF2B5EF4-FFF2-40B4-BE49-F238E27FC236}">
-                  <a16:creationId xmlns:a16="http://schemas.microsoft.com/office/drawing/2014/main" id="{569B1660-42B8-47F7-8895-3F50C17724C8}"/>
+                  <a16:creationId xmlns:a16="http://schemas.microsoft.com/office/drawing/2014/main" xmlns="" id="{569B1660-42B8-47F7-8895-3F50C17724C8}"/>
                 </a:ext>
               </a:extLst>
             </p:cNvPr>
@@ -26606,7 +26706,7 @@
             <p:cNvPr id="22" name="Shape 21">
               <a:extLst>
                 <a:ext uri="{FF2B5EF4-FFF2-40B4-BE49-F238E27FC236}">
-                  <a16:creationId xmlns:a16="http://schemas.microsoft.com/office/drawing/2014/main" id="{1DFD1396-D97A-4438-96C5-867C86C04866}"/>
+                  <a16:creationId xmlns:a16="http://schemas.microsoft.com/office/drawing/2014/main" xmlns="" id="{1DFD1396-D97A-4438-96C5-867C86C04866}"/>
                 </a:ext>
               </a:extLst>
             </p:cNvPr>
@@ -26669,7 +26769,7 @@
             <p:cNvPr id="23" name="Freeform: Shape 22">
               <a:extLst>
                 <a:ext uri="{FF2B5EF4-FFF2-40B4-BE49-F238E27FC236}">
-                  <a16:creationId xmlns:a16="http://schemas.microsoft.com/office/drawing/2014/main" id="{7DFE206A-E4B7-424E-B634-62CBE811CC85}"/>
+                  <a16:creationId xmlns:a16="http://schemas.microsoft.com/office/drawing/2014/main" xmlns="" id="{7DFE206A-E4B7-424E-B634-62CBE811CC85}"/>
                 </a:ext>
               </a:extLst>
             </p:cNvPr>
@@ -26800,7 +26900,7 @@
             <p:cNvPr id="24" name="Block Arc 23">
               <a:extLst>
                 <a:ext uri="{FF2B5EF4-FFF2-40B4-BE49-F238E27FC236}">
-                  <a16:creationId xmlns:a16="http://schemas.microsoft.com/office/drawing/2014/main" id="{3617736B-EF56-44F0-89DD-052CDFB8A126}"/>
+                  <a16:creationId xmlns:a16="http://schemas.microsoft.com/office/drawing/2014/main" xmlns="" id="{3617736B-EF56-44F0-89DD-052CDFB8A126}"/>
                 </a:ext>
               </a:extLst>
             </p:cNvPr>
@@ -26861,7 +26961,7 @@
             <p:cNvPr id="25" name="Freeform: Shape 24">
               <a:extLst>
                 <a:ext uri="{FF2B5EF4-FFF2-40B4-BE49-F238E27FC236}">
-                  <a16:creationId xmlns:a16="http://schemas.microsoft.com/office/drawing/2014/main" id="{5F534E20-4911-4D0C-A42B-770F92F117B5}"/>
+                  <a16:creationId xmlns:a16="http://schemas.microsoft.com/office/drawing/2014/main" xmlns="" id="{5F534E20-4911-4D0C-A42B-770F92F117B5}"/>
                 </a:ext>
               </a:extLst>
             </p:cNvPr>
@@ -26993,7 +27093,7 @@
           <p:cNvPr id="40" name="Arrow: Right 39">
             <a:extLst>
               <a:ext uri="{FF2B5EF4-FFF2-40B4-BE49-F238E27FC236}">
-                <a16:creationId xmlns:a16="http://schemas.microsoft.com/office/drawing/2014/main" id="{AB7C45BA-0078-4BA1-A2B3-BC9A66ACD955}"/>
+                <a16:creationId xmlns:a16="http://schemas.microsoft.com/office/drawing/2014/main" xmlns="" id="{AB7C45BA-0078-4BA1-A2B3-BC9A66ACD955}"/>
               </a:ext>
             </a:extLst>
           </p:cNvPr>
@@ -27045,7 +27145,7 @@
           <p:cNvPr id="12" name="Picture 11" descr="A picture containing outdoor object&#10;&#10;Description generated with high confidence">
             <a:extLst>
               <a:ext uri="{FF2B5EF4-FFF2-40B4-BE49-F238E27FC236}">
-                <a16:creationId xmlns:a16="http://schemas.microsoft.com/office/drawing/2014/main" id="{684713F9-9ECF-4663-A027-A6113FA71893}"/>
+                <a16:creationId xmlns:a16="http://schemas.microsoft.com/office/drawing/2014/main" xmlns="" id="{684713F9-9ECF-4663-A027-A6113FA71893}"/>
               </a:ext>
             </a:extLst>
           </p:cNvPr>
@@ -27081,7 +27181,7 @@
           <p:cNvPr id="26" name="Rectangle 25">
             <a:extLst>
               <a:ext uri="{FF2B5EF4-FFF2-40B4-BE49-F238E27FC236}">
-                <a16:creationId xmlns:a16="http://schemas.microsoft.com/office/drawing/2014/main" id="{BB49DDA5-5677-40D8-B6EC-AF518F4EF4C9}"/>
+                <a16:creationId xmlns:a16="http://schemas.microsoft.com/office/drawing/2014/main" xmlns="" id="{BB49DDA5-5677-40D8-B6EC-AF518F4EF4C9}"/>
               </a:ext>
             </a:extLst>
           </p:cNvPr>
@@ -27139,7 +27239,7 @@
           <p:cNvPr id="57" name="Rectangle 56">
             <a:extLst>
               <a:ext uri="{FF2B5EF4-FFF2-40B4-BE49-F238E27FC236}">
-                <a16:creationId xmlns:a16="http://schemas.microsoft.com/office/drawing/2014/main" id="{48C55BC0-B2B6-499C-829C-664985214C5E}"/>
+                <a16:creationId xmlns:a16="http://schemas.microsoft.com/office/drawing/2014/main" xmlns="" id="{48C55BC0-B2B6-499C-829C-664985214C5E}"/>
               </a:ext>
             </a:extLst>
           </p:cNvPr>
@@ -27197,7 +27297,7 @@
           <p:cNvPr id="27" name="Rectangle 26">
             <a:extLst>
               <a:ext uri="{FF2B5EF4-FFF2-40B4-BE49-F238E27FC236}">
-                <a16:creationId xmlns:a16="http://schemas.microsoft.com/office/drawing/2014/main" id="{5A55CB4F-5432-46E9-93D9-15090BEF7BC3}"/>
+                <a16:creationId xmlns:a16="http://schemas.microsoft.com/office/drawing/2014/main" xmlns="" id="{5A55CB4F-5432-46E9-93D9-15090BEF7BC3}"/>
               </a:ext>
             </a:extLst>
           </p:cNvPr>
@@ -27249,7 +27349,7 @@
           <p:cNvPr id="59" name="Rectangle 58">
             <a:extLst>
               <a:ext uri="{FF2B5EF4-FFF2-40B4-BE49-F238E27FC236}">
-                <a16:creationId xmlns:a16="http://schemas.microsoft.com/office/drawing/2014/main" id="{82A87F86-E4B1-4EDF-A870-C3D51B76494E}"/>
+                <a16:creationId xmlns:a16="http://schemas.microsoft.com/office/drawing/2014/main" xmlns="" id="{82A87F86-E4B1-4EDF-A870-C3D51B76494E}"/>
               </a:ext>
             </a:extLst>
           </p:cNvPr>
@@ -27322,7 +27422,7 @@
           <p:cNvPr id="28" name="Rectangle 27">
             <a:extLst>
               <a:ext uri="{FF2B5EF4-FFF2-40B4-BE49-F238E27FC236}">
-                <a16:creationId xmlns:a16="http://schemas.microsoft.com/office/drawing/2014/main" id="{0C902A55-E171-462C-91BF-53B8EC2B1CED}"/>
+                <a16:creationId xmlns:a16="http://schemas.microsoft.com/office/drawing/2014/main" xmlns="" id="{0C902A55-E171-462C-91BF-53B8EC2B1CED}"/>
               </a:ext>
             </a:extLst>
           </p:cNvPr>
@@ -27363,7 +27463,7 @@
           <p:cNvPr id="61" name="Picture 9">
             <a:extLst>
               <a:ext uri="{FF2B5EF4-FFF2-40B4-BE49-F238E27FC236}">
-                <a16:creationId xmlns:a16="http://schemas.microsoft.com/office/drawing/2014/main" id="{7CA4DCD7-E1D7-43ED-A034-F7B8A33E4482}"/>
+                <a16:creationId xmlns:a16="http://schemas.microsoft.com/office/drawing/2014/main" xmlns="" id="{7CA4DCD7-E1D7-43ED-A034-F7B8A33E4482}"/>
               </a:ext>
             </a:extLst>
           </p:cNvPr>
@@ -27423,7 +27523,7 @@
           <p:cNvPr id="62" name="Picture 9">
             <a:extLst>
               <a:ext uri="{FF2B5EF4-FFF2-40B4-BE49-F238E27FC236}">
-                <a16:creationId xmlns:a16="http://schemas.microsoft.com/office/drawing/2014/main" id="{3E15DB23-C9A8-4D02-AED9-52AE9E42BC6F}"/>
+                <a16:creationId xmlns:a16="http://schemas.microsoft.com/office/drawing/2014/main" xmlns="" id="{3E15DB23-C9A8-4D02-AED9-52AE9E42BC6F}"/>
               </a:ext>
             </a:extLst>
           </p:cNvPr>
@@ -27483,7 +27583,7 @@
           <p:cNvPr id="63" name="Picture 9">
             <a:extLst>
               <a:ext uri="{FF2B5EF4-FFF2-40B4-BE49-F238E27FC236}">
-                <a16:creationId xmlns:a16="http://schemas.microsoft.com/office/drawing/2014/main" id="{F13E6F69-4653-4FC6-B420-2A3711660161}"/>
+                <a16:creationId xmlns:a16="http://schemas.microsoft.com/office/drawing/2014/main" xmlns="" id="{F13E6F69-4653-4FC6-B420-2A3711660161}"/>
               </a:ext>
             </a:extLst>
           </p:cNvPr>
@@ -27543,7 +27643,7 @@
           <p:cNvPr id="64" name="Picture 9">
             <a:extLst>
               <a:ext uri="{FF2B5EF4-FFF2-40B4-BE49-F238E27FC236}">
-                <a16:creationId xmlns:a16="http://schemas.microsoft.com/office/drawing/2014/main" id="{E58CD232-697B-4057-87B5-C852ACD14980}"/>
+                <a16:creationId xmlns:a16="http://schemas.microsoft.com/office/drawing/2014/main" xmlns="" id="{E58CD232-697B-4057-87B5-C852ACD14980}"/>
               </a:ext>
             </a:extLst>
           </p:cNvPr>
@@ -27603,7 +27703,7 @@
           <p:cNvPr id="65" name="Picture 9">
             <a:extLst>
               <a:ext uri="{FF2B5EF4-FFF2-40B4-BE49-F238E27FC236}">
-                <a16:creationId xmlns:a16="http://schemas.microsoft.com/office/drawing/2014/main" id="{55FA8B74-483B-4E18-A676-08845700F1B6}"/>
+                <a16:creationId xmlns:a16="http://schemas.microsoft.com/office/drawing/2014/main" xmlns="" id="{55FA8B74-483B-4E18-A676-08845700F1B6}"/>
               </a:ext>
             </a:extLst>
           </p:cNvPr>
@@ -27663,7 +27763,7 @@
           <p:cNvPr id="66" name="Picture 9">
             <a:extLst>
               <a:ext uri="{FF2B5EF4-FFF2-40B4-BE49-F238E27FC236}">
-                <a16:creationId xmlns:a16="http://schemas.microsoft.com/office/drawing/2014/main" id="{A6A6836D-4520-4E4E-8C8D-4E2DB3C2CF9F}"/>
+                <a16:creationId xmlns:a16="http://schemas.microsoft.com/office/drawing/2014/main" xmlns="" id="{A6A6836D-4520-4E4E-8C8D-4E2DB3C2CF9F}"/>
               </a:ext>
             </a:extLst>
           </p:cNvPr>
@@ -27723,7 +27823,7 @@
           <p:cNvPr id="73" name="Arrow: Right 72">
             <a:extLst>
               <a:ext uri="{FF2B5EF4-FFF2-40B4-BE49-F238E27FC236}">
-                <a16:creationId xmlns:a16="http://schemas.microsoft.com/office/drawing/2014/main" id="{8B51D19B-ED16-4D8F-91D9-264400D26995}"/>
+                <a16:creationId xmlns:a16="http://schemas.microsoft.com/office/drawing/2014/main" xmlns="" id="{8B51D19B-ED16-4D8F-91D9-264400D26995}"/>
               </a:ext>
             </a:extLst>
           </p:cNvPr>
@@ -27775,7 +27875,7 @@
           <p:cNvPr id="74" name="Rectangle 73">
             <a:extLst>
               <a:ext uri="{FF2B5EF4-FFF2-40B4-BE49-F238E27FC236}">
-                <a16:creationId xmlns:a16="http://schemas.microsoft.com/office/drawing/2014/main" id="{8C49519C-8ED0-42A2-827B-8EFE26EFEC6C}"/>
+                <a16:creationId xmlns:a16="http://schemas.microsoft.com/office/drawing/2014/main" xmlns="" id="{8C49519C-8ED0-42A2-827B-8EFE26EFEC6C}"/>
               </a:ext>
             </a:extLst>
           </p:cNvPr>
@@ -27833,7 +27933,7 @@
           <p:cNvPr id="41" name="Picture 40" descr="A close up of a logo&#10;&#10;Description generated with high confidence">
             <a:extLst>
               <a:ext uri="{FF2B5EF4-FFF2-40B4-BE49-F238E27FC236}">
-                <a16:creationId xmlns:a16="http://schemas.microsoft.com/office/drawing/2014/main" id="{1B1A1B10-88A1-4127-BDDC-654E374590CB}"/>
+                <a16:creationId xmlns:a16="http://schemas.microsoft.com/office/drawing/2014/main" xmlns="" id="{1B1A1B10-88A1-4127-BDDC-654E374590CB}"/>
               </a:ext>
             </a:extLst>
           </p:cNvPr>
@@ -27843,13 +27943,13 @@
           <p:nvPr/>
         </p:nvPicPr>
         <p:blipFill>
-          <a:blip r:embed="rId4">
+          <a:blip r:embed="rId4" cstate="print">
             <a:extLst>
               <a:ext uri="{28A0092B-C50C-407E-A947-70E740481C1C}">
                 <a14:useLocalDpi xmlns:a14="http://schemas.microsoft.com/office/drawing/2010/main" val="0"/>
               </a:ext>
               <a:ext uri="{837473B0-CC2E-450A-ABE3-18F120FF3D39}">
-                <a1611:picAttrSrcUrl xmlns:a1611="http://schemas.microsoft.com/office/drawing/2016/11/main" r:id="rId5"/>
+                <a1611:picAttrSrcUrl xmlns:a1611="http://schemas.microsoft.com/office/drawing/2016/11/main" xmlns="" r:id="rId5"/>
               </a:ext>
             </a:extLst>
           </a:blip>
@@ -27872,7 +27972,7 @@
           <p:cNvPr id="51" name="Picture 50" descr="A close up of a logo&#10;&#10;Description generated with very high confidence">
             <a:extLst>
               <a:ext uri="{FF2B5EF4-FFF2-40B4-BE49-F238E27FC236}">
-                <a16:creationId xmlns:a16="http://schemas.microsoft.com/office/drawing/2014/main" id="{12DB071B-9FE4-47F0-9242-7CA3AD89BA45}"/>
+                <a16:creationId xmlns:a16="http://schemas.microsoft.com/office/drawing/2014/main" xmlns="" id="{12DB071B-9FE4-47F0-9242-7CA3AD89BA45}"/>
               </a:ext>
             </a:extLst>
           </p:cNvPr>
@@ -27882,13 +27982,13 @@
           <p:nvPr/>
         </p:nvPicPr>
         <p:blipFill>
-          <a:blip r:embed="rId6">
+          <a:blip r:embed="rId6" cstate="print">
             <a:extLst>
               <a:ext uri="{28A0092B-C50C-407E-A947-70E740481C1C}">
                 <a14:useLocalDpi xmlns:a14="http://schemas.microsoft.com/office/drawing/2010/main" val="0"/>
               </a:ext>
               <a:ext uri="{837473B0-CC2E-450A-ABE3-18F120FF3D39}">
-                <a1611:picAttrSrcUrl xmlns:a1611="http://schemas.microsoft.com/office/drawing/2016/11/main" r:id="rId7"/>
+                <a1611:picAttrSrcUrl xmlns:a1611="http://schemas.microsoft.com/office/drawing/2016/11/main" xmlns="" r:id="rId7"/>
               </a:ext>
             </a:extLst>
           </a:blip>
@@ -27911,7 +28011,7 @@
           <p:cNvPr id="90" name="Rectangle 89">
             <a:extLst>
               <a:ext uri="{FF2B5EF4-FFF2-40B4-BE49-F238E27FC236}">
-                <a16:creationId xmlns:a16="http://schemas.microsoft.com/office/drawing/2014/main" id="{91289779-90EE-49B2-95D6-F41058463510}"/>
+                <a16:creationId xmlns:a16="http://schemas.microsoft.com/office/drawing/2014/main" xmlns="" id="{91289779-90EE-49B2-95D6-F41058463510}"/>
               </a:ext>
             </a:extLst>
           </p:cNvPr>
@@ -27953,7 +28053,7 @@
           <p:cNvPr id="91" name="Arrow: Right 90">
             <a:extLst>
               <a:ext uri="{FF2B5EF4-FFF2-40B4-BE49-F238E27FC236}">
-                <a16:creationId xmlns:a16="http://schemas.microsoft.com/office/drawing/2014/main" id="{3DBCC447-F731-44CE-896D-3CEE37C031A1}"/>
+                <a16:creationId xmlns:a16="http://schemas.microsoft.com/office/drawing/2014/main" xmlns="" id="{3DBCC447-F731-44CE-896D-3CEE37C031A1}"/>
               </a:ext>
             </a:extLst>
           </p:cNvPr>
@@ -28005,7 +28105,7 @@
           <p:cNvPr id="92" name="Rectangle 91">
             <a:extLst>
               <a:ext uri="{FF2B5EF4-FFF2-40B4-BE49-F238E27FC236}">
-                <a16:creationId xmlns:a16="http://schemas.microsoft.com/office/drawing/2014/main" id="{B3A00306-95B5-4F99-AAEA-74434B776B12}"/>
+                <a16:creationId xmlns:a16="http://schemas.microsoft.com/office/drawing/2014/main" xmlns="" id="{B3A00306-95B5-4F99-AAEA-74434B776B12}"/>
               </a:ext>
             </a:extLst>
           </p:cNvPr>
@@ -28063,7 +28163,7 @@
           <p:cNvPr id="53" name="Rectangle 52">
             <a:extLst>
               <a:ext uri="{FF2B5EF4-FFF2-40B4-BE49-F238E27FC236}">
-                <a16:creationId xmlns:a16="http://schemas.microsoft.com/office/drawing/2014/main" id="{388E73F8-63C8-46A9-B27C-C9211C204266}"/>
+                <a16:creationId xmlns:a16="http://schemas.microsoft.com/office/drawing/2014/main" xmlns="" id="{388E73F8-63C8-46A9-B27C-C9211C204266}"/>
               </a:ext>
             </a:extLst>
           </p:cNvPr>
@@ -28112,7 +28212,7 @@
           <p:cNvPr id="2" name="Rectangle 1">
             <a:extLst>
               <a:ext uri="{FF2B5EF4-FFF2-40B4-BE49-F238E27FC236}">
-                <a16:creationId xmlns:a16="http://schemas.microsoft.com/office/drawing/2014/main" id="{35B408D3-DC8D-4EBC-B037-59C4D3CD1A67}"/>
+                <a16:creationId xmlns:a16="http://schemas.microsoft.com/office/drawing/2014/main" xmlns="" id="{35B408D3-DC8D-4EBC-B037-59C4D3CD1A67}"/>
               </a:ext>
             </a:extLst>
           </p:cNvPr>
@@ -28158,7 +28258,7 @@
           <p:cNvPr id="31" name="Rectangle 30">
             <a:extLst>
               <a:ext uri="{FF2B5EF4-FFF2-40B4-BE49-F238E27FC236}">
-                <a16:creationId xmlns:a16="http://schemas.microsoft.com/office/drawing/2014/main" id="{837668D4-746D-44E8-9D48-A4F9B365EA7E}"/>
+                <a16:creationId xmlns:a16="http://schemas.microsoft.com/office/drawing/2014/main" xmlns="" id="{837668D4-746D-44E8-9D48-A4F9B365EA7E}"/>
               </a:ext>
             </a:extLst>
           </p:cNvPr>
@@ -28214,7 +28314,7 @@
           <p:cNvPr id="32" name="Rectangle 31">
             <a:extLst>
               <a:ext uri="{FF2B5EF4-FFF2-40B4-BE49-F238E27FC236}">
-                <a16:creationId xmlns:a16="http://schemas.microsoft.com/office/drawing/2014/main" id="{75D6D87D-383C-40BE-BD42-CBCEE986D241}"/>
+                <a16:creationId xmlns:a16="http://schemas.microsoft.com/office/drawing/2014/main" xmlns="" id="{75D6D87D-383C-40BE-BD42-CBCEE986D241}"/>
               </a:ext>
             </a:extLst>
           </p:cNvPr>
@@ -28282,7 +28382,7 @@
           <p:cNvPr id="4" name="Cloud 3">
             <a:extLst>
               <a:ext uri="{FF2B5EF4-FFF2-40B4-BE49-F238E27FC236}">
-                <a16:creationId xmlns:a16="http://schemas.microsoft.com/office/drawing/2014/main" id="{3141B1FA-0C65-4790-B026-C4DF262B0BD7}"/>
+                <a16:creationId xmlns:a16="http://schemas.microsoft.com/office/drawing/2014/main" xmlns="" id="{3141B1FA-0C65-4790-B026-C4DF262B0BD7}"/>
               </a:ext>
             </a:extLst>
           </p:cNvPr>
@@ -28393,7 +28493,7 @@
           <p:cNvPr id="12" name="Rectangle 11">
             <a:extLst>
               <a:ext uri="{FF2B5EF4-FFF2-40B4-BE49-F238E27FC236}">
-                <a16:creationId xmlns:a16="http://schemas.microsoft.com/office/drawing/2014/main" id="{1F37C778-DFF2-4C39-9755-E6BF0C148F35}"/>
+                <a16:creationId xmlns:a16="http://schemas.microsoft.com/office/drawing/2014/main" xmlns="" id="{1F37C778-DFF2-4C39-9755-E6BF0C148F35}"/>
               </a:ext>
             </a:extLst>
           </p:cNvPr>
@@ -28431,7 +28531,7 @@
           <p:cNvPr id="13" name="Rectangle 12">
             <a:extLst>
               <a:ext uri="{FF2B5EF4-FFF2-40B4-BE49-F238E27FC236}">
-                <a16:creationId xmlns:a16="http://schemas.microsoft.com/office/drawing/2014/main" id="{AD3DE133-097E-4D53-90A0-BDE00462AE50}"/>
+                <a16:creationId xmlns:a16="http://schemas.microsoft.com/office/drawing/2014/main" xmlns="" id="{AD3DE133-097E-4D53-90A0-BDE00462AE50}"/>
               </a:ext>
             </a:extLst>
           </p:cNvPr>
@@ -28469,7 +28569,7 @@
           <p:cNvPr id="14" name="Rectangle 13">
             <a:extLst>
               <a:ext uri="{FF2B5EF4-FFF2-40B4-BE49-F238E27FC236}">
-                <a16:creationId xmlns:a16="http://schemas.microsoft.com/office/drawing/2014/main" id="{92D4F564-9B8A-41F2-8344-AD34196FAFEF}"/>
+                <a16:creationId xmlns:a16="http://schemas.microsoft.com/office/drawing/2014/main" xmlns="" id="{92D4F564-9B8A-41F2-8344-AD34196FAFEF}"/>
               </a:ext>
             </a:extLst>
           </p:cNvPr>
@@ -28507,7 +28607,7 @@
           <p:cNvPr id="15" name="Rectangle 14">
             <a:extLst>
               <a:ext uri="{FF2B5EF4-FFF2-40B4-BE49-F238E27FC236}">
-                <a16:creationId xmlns:a16="http://schemas.microsoft.com/office/drawing/2014/main" id="{1116CA10-F054-4AF7-812F-2E14C3DB92A8}"/>
+                <a16:creationId xmlns:a16="http://schemas.microsoft.com/office/drawing/2014/main" xmlns="" id="{1116CA10-F054-4AF7-812F-2E14C3DB92A8}"/>
               </a:ext>
             </a:extLst>
           </p:cNvPr>
@@ -28545,7 +28645,7 @@
           <p:cNvPr id="16" name="Rectangle 15">
             <a:extLst>
               <a:ext uri="{FF2B5EF4-FFF2-40B4-BE49-F238E27FC236}">
-                <a16:creationId xmlns:a16="http://schemas.microsoft.com/office/drawing/2014/main" id="{63714086-3485-4087-A683-F1C203CF3F3A}"/>
+                <a16:creationId xmlns:a16="http://schemas.microsoft.com/office/drawing/2014/main" xmlns="" id="{63714086-3485-4087-A683-F1C203CF3F3A}"/>
               </a:ext>
             </a:extLst>
           </p:cNvPr>
@@ -28583,7 +28683,7 @@
           <p:cNvPr id="17" name="Rectangle 16">
             <a:extLst>
               <a:ext uri="{FF2B5EF4-FFF2-40B4-BE49-F238E27FC236}">
-                <a16:creationId xmlns:a16="http://schemas.microsoft.com/office/drawing/2014/main" id="{A871A22D-3138-4F20-953F-81B2D34BC353}"/>
+                <a16:creationId xmlns:a16="http://schemas.microsoft.com/office/drawing/2014/main" xmlns="" id="{A871A22D-3138-4F20-953F-81B2D34BC353}"/>
               </a:ext>
             </a:extLst>
           </p:cNvPr>
@@ -28621,7 +28721,7 @@
           <p:cNvPr id="18" name="Rectangle 17">
             <a:extLst>
               <a:ext uri="{FF2B5EF4-FFF2-40B4-BE49-F238E27FC236}">
-                <a16:creationId xmlns:a16="http://schemas.microsoft.com/office/drawing/2014/main" id="{35D06240-088C-41F7-9749-83216E384825}"/>
+                <a16:creationId xmlns:a16="http://schemas.microsoft.com/office/drawing/2014/main" xmlns="" id="{35D06240-088C-41F7-9749-83216E384825}"/>
               </a:ext>
             </a:extLst>
           </p:cNvPr>
@@ -28659,7 +28759,7 @@
           <p:cNvPr id="19" name="Rectangle 18">
             <a:extLst>
               <a:ext uri="{FF2B5EF4-FFF2-40B4-BE49-F238E27FC236}">
-                <a16:creationId xmlns:a16="http://schemas.microsoft.com/office/drawing/2014/main" id="{507C15F6-17F8-4344-860D-324D4C1B2851}"/>
+                <a16:creationId xmlns:a16="http://schemas.microsoft.com/office/drawing/2014/main" xmlns="" id="{507C15F6-17F8-4344-860D-324D4C1B2851}"/>
               </a:ext>
             </a:extLst>
           </p:cNvPr>
@@ -28697,7 +28797,7 @@
           <p:cNvPr id="20" name="Rectangle 19">
             <a:extLst>
               <a:ext uri="{FF2B5EF4-FFF2-40B4-BE49-F238E27FC236}">
-                <a16:creationId xmlns:a16="http://schemas.microsoft.com/office/drawing/2014/main" id="{C08A1ED6-5BE5-4CF2-BA4F-0BF592BA9433}"/>
+                <a16:creationId xmlns:a16="http://schemas.microsoft.com/office/drawing/2014/main" xmlns="" id="{C08A1ED6-5BE5-4CF2-BA4F-0BF592BA9433}"/>
               </a:ext>
             </a:extLst>
           </p:cNvPr>
@@ -28735,7 +28835,7 @@
           <p:cNvPr id="21" name="Rectangle 20">
             <a:extLst>
               <a:ext uri="{FF2B5EF4-FFF2-40B4-BE49-F238E27FC236}">
-                <a16:creationId xmlns:a16="http://schemas.microsoft.com/office/drawing/2014/main" id="{2CB84429-4C8B-4D28-B92A-683A872D3EF0}"/>
+                <a16:creationId xmlns:a16="http://schemas.microsoft.com/office/drawing/2014/main" xmlns="" id="{2CB84429-4C8B-4D28-B92A-683A872D3EF0}"/>
               </a:ext>
             </a:extLst>
           </p:cNvPr>
@@ -28773,7 +28873,7 @@
           <p:cNvPr id="23" name="Straight Arrow Connector 22">
             <a:extLst>
               <a:ext uri="{FF2B5EF4-FFF2-40B4-BE49-F238E27FC236}">
-                <a16:creationId xmlns:a16="http://schemas.microsoft.com/office/drawing/2014/main" id="{CF5BE959-978C-48AF-8508-DE76B7326356}"/>
+                <a16:creationId xmlns:a16="http://schemas.microsoft.com/office/drawing/2014/main" xmlns="" id="{CF5BE959-978C-48AF-8508-DE76B7326356}"/>
               </a:ext>
             </a:extLst>
           </p:cNvPr>
@@ -28820,7 +28920,7 @@
           <p:cNvPr id="24" name="Straight Arrow Connector 23">
             <a:extLst>
               <a:ext uri="{FF2B5EF4-FFF2-40B4-BE49-F238E27FC236}">
-                <a16:creationId xmlns:a16="http://schemas.microsoft.com/office/drawing/2014/main" id="{EA94AA31-2348-488D-AF95-C5BD4CD8C3FC}"/>
+                <a16:creationId xmlns:a16="http://schemas.microsoft.com/office/drawing/2014/main" xmlns="" id="{EA94AA31-2348-488D-AF95-C5BD4CD8C3FC}"/>
               </a:ext>
             </a:extLst>
           </p:cNvPr>
@@ -28864,7 +28964,7 @@
           <p:cNvPr id="28" name="Rectangle 27">
             <a:extLst>
               <a:ext uri="{FF2B5EF4-FFF2-40B4-BE49-F238E27FC236}">
-                <a16:creationId xmlns:a16="http://schemas.microsoft.com/office/drawing/2014/main" id="{FF0E0202-04C0-41BA-AD7D-C64268A08F36}"/>
+                <a16:creationId xmlns:a16="http://schemas.microsoft.com/office/drawing/2014/main" xmlns="" id="{FF0E0202-04C0-41BA-AD7D-C64268A08F36}"/>
               </a:ext>
             </a:extLst>
           </p:cNvPr>
@@ -28902,7 +29002,7 @@
           <p:cNvPr id="29" name="Straight Arrow Connector 28">
             <a:extLst>
               <a:ext uri="{FF2B5EF4-FFF2-40B4-BE49-F238E27FC236}">
-                <a16:creationId xmlns:a16="http://schemas.microsoft.com/office/drawing/2014/main" id="{AE1D563C-18F7-40C4-8C12-89E6F334705F}"/>
+                <a16:creationId xmlns:a16="http://schemas.microsoft.com/office/drawing/2014/main" xmlns="" id="{AE1D563C-18F7-40C4-8C12-89E6F334705F}"/>
               </a:ext>
             </a:extLst>
           </p:cNvPr>
@@ -28947,7 +29047,7 @@
           <p:cNvPr id="30" name="Rectangle 29">
             <a:extLst>
               <a:ext uri="{FF2B5EF4-FFF2-40B4-BE49-F238E27FC236}">
-                <a16:creationId xmlns:a16="http://schemas.microsoft.com/office/drawing/2014/main" id="{2AB490D3-2200-47DD-88EE-2B6DB3DFE0E5}"/>
+                <a16:creationId xmlns:a16="http://schemas.microsoft.com/office/drawing/2014/main" xmlns="" id="{2AB490D3-2200-47DD-88EE-2B6DB3DFE0E5}"/>
               </a:ext>
             </a:extLst>
           </p:cNvPr>
@@ -28999,7 +29099,7 @@
           <p:cNvPr id="31" name="Rectangle 30">
             <a:extLst>
               <a:ext uri="{FF2B5EF4-FFF2-40B4-BE49-F238E27FC236}">
-                <a16:creationId xmlns:a16="http://schemas.microsoft.com/office/drawing/2014/main" id="{A5AC5AEE-9CA9-4FBA-ABF1-040C70742F85}"/>
+                <a16:creationId xmlns:a16="http://schemas.microsoft.com/office/drawing/2014/main" xmlns="" id="{A5AC5AEE-9CA9-4FBA-ABF1-040C70742F85}"/>
               </a:ext>
             </a:extLst>
           </p:cNvPr>
@@ -29051,7 +29151,7 @@
           <p:cNvPr id="32" name="Oval 31">
             <a:extLst>
               <a:ext uri="{FF2B5EF4-FFF2-40B4-BE49-F238E27FC236}">
-                <a16:creationId xmlns:a16="http://schemas.microsoft.com/office/drawing/2014/main" id="{E3D788FF-545E-49BE-812A-B835E474F58E}"/>
+                <a16:creationId xmlns:a16="http://schemas.microsoft.com/office/drawing/2014/main" xmlns="" id="{E3D788FF-545E-49BE-812A-B835E474F58E}"/>
               </a:ext>
             </a:extLst>
           </p:cNvPr>
@@ -29103,7 +29203,7 @@
           <p:cNvPr id="33" name="Isosceles Triangle 32">
             <a:extLst>
               <a:ext uri="{FF2B5EF4-FFF2-40B4-BE49-F238E27FC236}">
-                <a16:creationId xmlns:a16="http://schemas.microsoft.com/office/drawing/2014/main" id="{3293596F-27FE-47F0-B885-CC2AE68D7DCA}"/>
+                <a16:creationId xmlns:a16="http://schemas.microsoft.com/office/drawing/2014/main" xmlns="" id="{3293596F-27FE-47F0-B885-CC2AE68D7DCA}"/>
               </a:ext>
             </a:extLst>
           </p:cNvPr>
@@ -29155,7 +29255,7 @@
           <p:cNvPr id="56" name="Group 55">
             <a:extLst>
               <a:ext uri="{FF2B5EF4-FFF2-40B4-BE49-F238E27FC236}">
-                <a16:creationId xmlns:a16="http://schemas.microsoft.com/office/drawing/2014/main" id="{375610F4-3FA6-4104-882D-717313BF7701}"/>
+                <a16:creationId xmlns:a16="http://schemas.microsoft.com/office/drawing/2014/main" xmlns="" id="{375610F4-3FA6-4104-882D-717313BF7701}"/>
               </a:ext>
             </a:extLst>
           </p:cNvPr>
@@ -29175,7 +29275,7 @@
             <p:cNvPr id="35" name="Rectangle 34">
               <a:extLst>
                 <a:ext uri="{FF2B5EF4-FFF2-40B4-BE49-F238E27FC236}">
-                  <a16:creationId xmlns:a16="http://schemas.microsoft.com/office/drawing/2014/main" id="{879F8447-5CD1-4C24-A2B0-C99C2D7F227E}"/>
+                  <a16:creationId xmlns:a16="http://schemas.microsoft.com/office/drawing/2014/main" xmlns="" id="{879F8447-5CD1-4C24-A2B0-C99C2D7F227E}"/>
                 </a:ext>
               </a:extLst>
             </p:cNvPr>
@@ -29229,7 +29329,7 @@
             <p:cNvPr id="36" name="Rectangle 35">
               <a:extLst>
                 <a:ext uri="{FF2B5EF4-FFF2-40B4-BE49-F238E27FC236}">
-                  <a16:creationId xmlns:a16="http://schemas.microsoft.com/office/drawing/2014/main" id="{5F4A4132-62A0-4359-A556-90169DF61140}"/>
+                  <a16:creationId xmlns:a16="http://schemas.microsoft.com/office/drawing/2014/main" xmlns="" id="{5F4A4132-62A0-4359-A556-90169DF61140}"/>
                 </a:ext>
               </a:extLst>
             </p:cNvPr>
@@ -29281,7 +29381,7 @@
             <p:cNvPr id="37" name="Rectangle 36">
               <a:extLst>
                 <a:ext uri="{FF2B5EF4-FFF2-40B4-BE49-F238E27FC236}">
-                  <a16:creationId xmlns:a16="http://schemas.microsoft.com/office/drawing/2014/main" id="{4B101870-D617-4B38-8C70-2394252B3323}"/>
+                  <a16:creationId xmlns:a16="http://schemas.microsoft.com/office/drawing/2014/main" xmlns="" id="{4B101870-D617-4B38-8C70-2394252B3323}"/>
                 </a:ext>
               </a:extLst>
             </p:cNvPr>
@@ -29337,7 +29437,7 @@
             <p:cNvPr id="38" name="Rectangle 37">
               <a:extLst>
                 <a:ext uri="{FF2B5EF4-FFF2-40B4-BE49-F238E27FC236}">
-                  <a16:creationId xmlns:a16="http://schemas.microsoft.com/office/drawing/2014/main" id="{C917C82C-58B7-4AA7-A94D-98D12F824498}"/>
+                  <a16:creationId xmlns:a16="http://schemas.microsoft.com/office/drawing/2014/main" xmlns="" id="{C917C82C-58B7-4AA7-A94D-98D12F824498}"/>
                 </a:ext>
               </a:extLst>
             </p:cNvPr>
@@ -29375,7 +29475,7 @@
             <p:cNvPr id="41" name="Rectangle 40">
               <a:extLst>
                 <a:ext uri="{FF2B5EF4-FFF2-40B4-BE49-F238E27FC236}">
-                  <a16:creationId xmlns:a16="http://schemas.microsoft.com/office/drawing/2014/main" id="{C96D5A3A-401E-4360-A926-9ADE459BBEF2}"/>
+                  <a16:creationId xmlns:a16="http://schemas.microsoft.com/office/drawing/2014/main" xmlns="" id="{C96D5A3A-401E-4360-A926-9ADE459BBEF2}"/>
                 </a:ext>
               </a:extLst>
             </p:cNvPr>
@@ -29424,7 +29524,7 @@
             <p:cNvPr id="42" name="Rectangle 41">
               <a:extLst>
                 <a:ext uri="{FF2B5EF4-FFF2-40B4-BE49-F238E27FC236}">
-                  <a16:creationId xmlns:a16="http://schemas.microsoft.com/office/drawing/2014/main" id="{2190B5B3-6D2B-4506-B8FE-FD7E6CB3E43D}"/>
+                  <a16:creationId xmlns:a16="http://schemas.microsoft.com/office/drawing/2014/main" xmlns="" id="{2190B5B3-6D2B-4506-B8FE-FD7E6CB3E43D}"/>
                 </a:ext>
               </a:extLst>
             </p:cNvPr>
@@ -29462,7 +29562,7 @@
             <p:cNvPr id="43" name="Oval 42">
               <a:extLst>
                 <a:ext uri="{FF2B5EF4-FFF2-40B4-BE49-F238E27FC236}">
-                  <a16:creationId xmlns:a16="http://schemas.microsoft.com/office/drawing/2014/main" id="{4D266B7E-018C-46ED-8D35-52F9E5B7E141}"/>
+                  <a16:creationId xmlns:a16="http://schemas.microsoft.com/office/drawing/2014/main" xmlns="" id="{4D266B7E-018C-46ED-8D35-52F9E5B7E141}"/>
                 </a:ext>
               </a:extLst>
             </p:cNvPr>
@@ -29514,7 +29614,7 @@
             <p:cNvPr id="44" name="Rectangle 43">
               <a:extLst>
                 <a:ext uri="{FF2B5EF4-FFF2-40B4-BE49-F238E27FC236}">
-                  <a16:creationId xmlns:a16="http://schemas.microsoft.com/office/drawing/2014/main" id="{7EE4F98B-E7AC-475C-9644-7DFFA759FB0B}"/>
+                  <a16:creationId xmlns:a16="http://schemas.microsoft.com/office/drawing/2014/main" xmlns="" id="{7EE4F98B-E7AC-475C-9644-7DFFA759FB0B}"/>
                 </a:ext>
               </a:extLst>
             </p:cNvPr>
@@ -29563,7 +29663,7 @@
             <p:cNvPr id="45" name="Rectangle 44">
               <a:extLst>
                 <a:ext uri="{FF2B5EF4-FFF2-40B4-BE49-F238E27FC236}">
-                  <a16:creationId xmlns:a16="http://schemas.microsoft.com/office/drawing/2014/main" id="{3317DF71-E5C0-4D1B-9FF7-14D271D9E7DA}"/>
+                  <a16:creationId xmlns:a16="http://schemas.microsoft.com/office/drawing/2014/main" xmlns="" id="{3317DF71-E5C0-4D1B-9FF7-14D271D9E7DA}"/>
                 </a:ext>
               </a:extLst>
             </p:cNvPr>
@@ -29601,7 +29701,7 @@
             <p:cNvPr id="47" name="Isosceles Triangle 46">
               <a:extLst>
                 <a:ext uri="{FF2B5EF4-FFF2-40B4-BE49-F238E27FC236}">
-                  <a16:creationId xmlns:a16="http://schemas.microsoft.com/office/drawing/2014/main" id="{365D57FF-0831-4183-8DC8-946B7A8F2BC8}"/>
+                  <a16:creationId xmlns:a16="http://schemas.microsoft.com/office/drawing/2014/main" xmlns="" id="{365D57FF-0831-4183-8DC8-946B7A8F2BC8}"/>
                 </a:ext>
               </a:extLst>
             </p:cNvPr>
@@ -29654,7 +29754,7 @@
           <p:cNvPr id="48" name="Rectangle 47">
             <a:extLst>
               <a:ext uri="{FF2B5EF4-FFF2-40B4-BE49-F238E27FC236}">
-                <a16:creationId xmlns:a16="http://schemas.microsoft.com/office/drawing/2014/main" id="{F5359955-D619-4358-950D-11FFC7F3CF9F}"/>
+                <a16:creationId xmlns:a16="http://schemas.microsoft.com/office/drawing/2014/main" xmlns="" id="{F5359955-D619-4358-950D-11FFC7F3CF9F}"/>
               </a:ext>
             </a:extLst>
           </p:cNvPr>
@@ -29706,7 +29806,7 @@
           <p:cNvPr id="49" name="Oval 48">
             <a:extLst>
               <a:ext uri="{FF2B5EF4-FFF2-40B4-BE49-F238E27FC236}">
-                <a16:creationId xmlns:a16="http://schemas.microsoft.com/office/drawing/2014/main" id="{C897382F-DB40-4D09-A46F-D78D8100EC22}"/>
+                <a16:creationId xmlns:a16="http://schemas.microsoft.com/office/drawing/2014/main" xmlns="" id="{C897382F-DB40-4D09-A46F-D78D8100EC22}"/>
               </a:ext>
             </a:extLst>
           </p:cNvPr>
@@ -29758,7 +29858,7 @@
           <p:cNvPr id="50" name="Isosceles Triangle 49">
             <a:extLst>
               <a:ext uri="{FF2B5EF4-FFF2-40B4-BE49-F238E27FC236}">
-                <a16:creationId xmlns:a16="http://schemas.microsoft.com/office/drawing/2014/main" id="{A701C5C9-AEA9-4193-9E85-0AB493C0BE10}"/>
+                <a16:creationId xmlns:a16="http://schemas.microsoft.com/office/drawing/2014/main" xmlns="" id="{A701C5C9-AEA9-4193-9E85-0AB493C0BE10}"/>
               </a:ext>
             </a:extLst>
           </p:cNvPr>
@@ -29810,7 +29910,7 @@
           <p:cNvPr id="51" name="Rectangle 50">
             <a:extLst>
               <a:ext uri="{FF2B5EF4-FFF2-40B4-BE49-F238E27FC236}">
-                <a16:creationId xmlns:a16="http://schemas.microsoft.com/office/drawing/2014/main" id="{0E76F026-2452-4896-A572-F7CE53C174A2}"/>
+                <a16:creationId xmlns:a16="http://schemas.microsoft.com/office/drawing/2014/main" xmlns="" id="{0E76F026-2452-4896-A572-F7CE53C174A2}"/>
               </a:ext>
             </a:extLst>
           </p:cNvPr>
@@ -29855,7 +29955,7 @@
           <p:cNvPr id="53" name="Rectangle 52">
             <a:extLst>
               <a:ext uri="{FF2B5EF4-FFF2-40B4-BE49-F238E27FC236}">
-                <a16:creationId xmlns:a16="http://schemas.microsoft.com/office/drawing/2014/main" id="{D5448F18-C362-4F8D-BDE9-67585A9F1232}"/>
+                <a16:creationId xmlns:a16="http://schemas.microsoft.com/office/drawing/2014/main" xmlns="" id="{D5448F18-C362-4F8D-BDE9-67585A9F1232}"/>
               </a:ext>
             </a:extLst>
           </p:cNvPr>
@@ -29893,7 +29993,7 @@
           <p:cNvPr id="54" name="Rectangle 53">
             <a:extLst>
               <a:ext uri="{FF2B5EF4-FFF2-40B4-BE49-F238E27FC236}">
-                <a16:creationId xmlns:a16="http://schemas.microsoft.com/office/drawing/2014/main" id="{CCB4F67D-B10C-40C9-BD04-30237B979029}"/>
+                <a16:creationId xmlns:a16="http://schemas.microsoft.com/office/drawing/2014/main" xmlns="" id="{CCB4F67D-B10C-40C9-BD04-30237B979029}"/>
               </a:ext>
             </a:extLst>
           </p:cNvPr>
@@ -29931,7 +30031,7 @@
           <p:cNvPr id="55" name="Rectangle 54">
             <a:extLst>
               <a:ext uri="{FF2B5EF4-FFF2-40B4-BE49-F238E27FC236}">
-                <a16:creationId xmlns:a16="http://schemas.microsoft.com/office/drawing/2014/main" id="{9BE72583-89CE-4A5E-BE1B-80DC1EEDC4BD}"/>
+                <a16:creationId xmlns:a16="http://schemas.microsoft.com/office/drawing/2014/main" xmlns="" id="{9BE72583-89CE-4A5E-BE1B-80DC1EEDC4BD}"/>
               </a:ext>
             </a:extLst>
           </p:cNvPr>
@@ -29983,7 +30083,7 @@
           <p:cNvPr id="58" name="Rectangle 57">
             <a:extLst>
               <a:ext uri="{FF2B5EF4-FFF2-40B4-BE49-F238E27FC236}">
-                <a16:creationId xmlns:a16="http://schemas.microsoft.com/office/drawing/2014/main" id="{008A882D-E05D-4360-9FE0-EAC6BFDC9DC1}"/>
+                <a16:creationId xmlns:a16="http://schemas.microsoft.com/office/drawing/2014/main" xmlns="" id="{008A882D-E05D-4360-9FE0-EAC6BFDC9DC1}"/>
               </a:ext>
             </a:extLst>
           </p:cNvPr>
@@ -30040,7 +30140,7 @@
           <p:cNvPr id="59" name="Rectangle 58">
             <a:extLst>
               <a:ext uri="{FF2B5EF4-FFF2-40B4-BE49-F238E27FC236}">
-                <a16:creationId xmlns:a16="http://schemas.microsoft.com/office/drawing/2014/main" id="{056EDE35-63CE-478C-8ED2-7E7F75128045}"/>
+                <a16:creationId xmlns:a16="http://schemas.microsoft.com/office/drawing/2014/main" xmlns="" id="{056EDE35-63CE-478C-8ED2-7E7F75128045}"/>
               </a:ext>
             </a:extLst>
           </p:cNvPr>
@@ -30120,7 +30220,7 @@
           <p:cNvPr id="61" name="Rectangle 60">
             <a:extLst>
               <a:ext uri="{FF2B5EF4-FFF2-40B4-BE49-F238E27FC236}">
-                <a16:creationId xmlns:a16="http://schemas.microsoft.com/office/drawing/2014/main" id="{2555CB7B-E89E-4FAA-90C1-77E7EDE66192}"/>
+                <a16:creationId xmlns:a16="http://schemas.microsoft.com/office/drawing/2014/main" xmlns="" id="{2555CB7B-E89E-4FAA-90C1-77E7EDE66192}"/>
               </a:ext>
             </a:extLst>
           </p:cNvPr>
@@ -30158,7 +30258,7 @@
           <p:cNvPr id="62" name="Straight Arrow Connector 61">
             <a:extLst>
               <a:ext uri="{FF2B5EF4-FFF2-40B4-BE49-F238E27FC236}">
-                <a16:creationId xmlns:a16="http://schemas.microsoft.com/office/drawing/2014/main" id="{CD0D2D9E-BF44-4F05-8A34-7D366C108330}"/>
+                <a16:creationId xmlns:a16="http://schemas.microsoft.com/office/drawing/2014/main" xmlns="" id="{CD0D2D9E-BF44-4F05-8A34-7D366C108330}"/>
               </a:ext>
             </a:extLst>
           </p:cNvPr>
@@ -30204,7 +30304,7 @@
           <p:cNvPr id="65" name="Straight Arrow Connector 64">
             <a:extLst>
               <a:ext uri="{FF2B5EF4-FFF2-40B4-BE49-F238E27FC236}">
-                <a16:creationId xmlns:a16="http://schemas.microsoft.com/office/drawing/2014/main" id="{246C7C9F-0B2A-4180-BBF3-91835824417D}"/>
+                <a16:creationId xmlns:a16="http://schemas.microsoft.com/office/drawing/2014/main" xmlns="" id="{246C7C9F-0B2A-4180-BBF3-91835824417D}"/>
               </a:ext>
             </a:extLst>
           </p:cNvPr>
@@ -30249,7 +30349,7 @@
           <p:cNvPr id="69" name="Rectangle 68">
             <a:extLst>
               <a:ext uri="{FF2B5EF4-FFF2-40B4-BE49-F238E27FC236}">
-                <a16:creationId xmlns:a16="http://schemas.microsoft.com/office/drawing/2014/main" id="{C83A164E-C563-4661-88E8-6ECF4A2EFD91}"/>
+                <a16:creationId xmlns:a16="http://schemas.microsoft.com/office/drawing/2014/main" xmlns="" id="{C83A164E-C563-4661-88E8-6ECF4A2EFD91}"/>
               </a:ext>
             </a:extLst>
           </p:cNvPr>
@@ -30301,7 +30401,7 @@
           <p:cNvPr id="70" name="Rectangle 69">
             <a:extLst>
               <a:ext uri="{FF2B5EF4-FFF2-40B4-BE49-F238E27FC236}">
-                <a16:creationId xmlns:a16="http://schemas.microsoft.com/office/drawing/2014/main" id="{63126789-69EB-4A05-B3F1-9FBBE1870485}"/>
+                <a16:creationId xmlns:a16="http://schemas.microsoft.com/office/drawing/2014/main" xmlns="" id="{63126789-69EB-4A05-B3F1-9FBBE1870485}"/>
               </a:ext>
             </a:extLst>
           </p:cNvPr>
@@ -30347,7 +30447,7 @@
           <p:cNvPr id="71" name="Rectangle 70">
             <a:extLst>
               <a:ext uri="{FF2B5EF4-FFF2-40B4-BE49-F238E27FC236}">
-                <a16:creationId xmlns:a16="http://schemas.microsoft.com/office/drawing/2014/main" id="{344B0749-0CB8-4421-876A-8DFE0A980333}"/>
+                <a16:creationId xmlns:a16="http://schemas.microsoft.com/office/drawing/2014/main" xmlns="" id="{344B0749-0CB8-4421-876A-8DFE0A980333}"/>
               </a:ext>
             </a:extLst>
           </p:cNvPr>
@@ -30386,7 +30486,7 @@
           <p:cNvPr id="72" name="Straight Arrow Connector 71">
             <a:extLst>
               <a:ext uri="{FF2B5EF4-FFF2-40B4-BE49-F238E27FC236}">
-                <a16:creationId xmlns:a16="http://schemas.microsoft.com/office/drawing/2014/main" id="{ED92BC3B-9A65-49BB-A725-60214763FBDC}"/>
+                <a16:creationId xmlns:a16="http://schemas.microsoft.com/office/drawing/2014/main" xmlns="" id="{ED92BC3B-9A65-49BB-A725-60214763FBDC}"/>
               </a:ext>
             </a:extLst>
           </p:cNvPr>
@@ -30430,7 +30530,7 @@
           <p:cNvPr id="75" name="Straight Arrow Connector 74">
             <a:extLst>
               <a:ext uri="{FF2B5EF4-FFF2-40B4-BE49-F238E27FC236}">
-                <a16:creationId xmlns:a16="http://schemas.microsoft.com/office/drawing/2014/main" id="{2077B21C-FF58-4DD2-A484-CB04AB2993AE}"/>
+                <a16:creationId xmlns:a16="http://schemas.microsoft.com/office/drawing/2014/main" xmlns="" id="{2077B21C-FF58-4DD2-A484-CB04AB2993AE}"/>
               </a:ext>
             </a:extLst>
           </p:cNvPr>
@@ -30474,7 +30574,7 @@
           <p:cNvPr id="77" name="Rectangle 76">
             <a:extLst>
               <a:ext uri="{FF2B5EF4-FFF2-40B4-BE49-F238E27FC236}">
-                <a16:creationId xmlns:a16="http://schemas.microsoft.com/office/drawing/2014/main" id="{B88EADB8-1203-446F-A495-2DCA82F847EF}"/>
+                <a16:creationId xmlns:a16="http://schemas.microsoft.com/office/drawing/2014/main" xmlns="" id="{B88EADB8-1203-446F-A495-2DCA82F847EF}"/>
               </a:ext>
             </a:extLst>
           </p:cNvPr>
@@ -30512,7 +30612,7 @@
           <p:cNvPr id="78" name="Straight Arrow Connector 77">
             <a:extLst>
               <a:ext uri="{FF2B5EF4-FFF2-40B4-BE49-F238E27FC236}">
-                <a16:creationId xmlns:a16="http://schemas.microsoft.com/office/drawing/2014/main" id="{396437B9-EEFB-4A03-B933-1CDFB1C8BC64}"/>
+                <a16:creationId xmlns:a16="http://schemas.microsoft.com/office/drawing/2014/main" xmlns="" id="{396437B9-EEFB-4A03-B933-1CDFB1C8BC64}"/>
               </a:ext>
             </a:extLst>
           </p:cNvPr>
@@ -30557,7 +30657,7 @@
           <p:cNvPr id="79" name="Rectangle 78">
             <a:extLst>
               <a:ext uri="{FF2B5EF4-FFF2-40B4-BE49-F238E27FC236}">
-                <a16:creationId xmlns:a16="http://schemas.microsoft.com/office/drawing/2014/main" id="{48CD2476-701A-4C45-9F84-14B0B78541D7}"/>
+                <a16:creationId xmlns:a16="http://schemas.microsoft.com/office/drawing/2014/main" xmlns="" id="{48CD2476-701A-4C45-9F84-14B0B78541D7}"/>
               </a:ext>
             </a:extLst>
           </p:cNvPr>
@@ -30632,7 +30732,7 @@
           <p:cNvPr id="175" name="Folded Corner 14">
             <a:extLst>
               <a:ext uri="{FF2B5EF4-FFF2-40B4-BE49-F238E27FC236}">
-                <a16:creationId xmlns:a16="http://schemas.microsoft.com/office/drawing/2014/main" id="{D7925C44-E3E5-47AF-9CC8-BF6471802A70}"/>
+                <a16:creationId xmlns:a16="http://schemas.microsoft.com/office/drawing/2014/main" xmlns="" id="{D7925C44-E3E5-47AF-9CC8-BF6471802A70}"/>
               </a:ext>
             </a:extLst>
           </p:cNvPr>
@@ -30681,7 +30781,7 @@
           <p:cNvPr id="2" name="Diagram 1">
             <a:extLst>
               <a:ext uri="{FF2B5EF4-FFF2-40B4-BE49-F238E27FC236}">
-                <a16:creationId xmlns:a16="http://schemas.microsoft.com/office/drawing/2014/main" id="{214EDC3A-CB98-4BD4-86CB-C3DE5CC0A317}"/>
+                <a16:creationId xmlns:a16="http://schemas.microsoft.com/office/drawing/2014/main" xmlns="" id="{214EDC3A-CB98-4BD4-86CB-C3DE5CC0A317}"/>
               </a:ext>
             </a:extLst>
           </p:cNvPr>
@@ -30703,7 +30803,7 @@
           <p:cNvPr id="3" name="Rectangle 2">
             <a:extLst>
               <a:ext uri="{FF2B5EF4-FFF2-40B4-BE49-F238E27FC236}">
-                <a16:creationId xmlns:a16="http://schemas.microsoft.com/office/drawing/2014/main" id="{8D715EE1-32F0-4BAE-86BD-83B54B3137EB}"/>
+                <a16:creationId xmlns:a16="http://schemas.microsoft.com/office/drawing/2014/main" xmlns="" id="{8D715EE1-32F0-4BAE-86BD-83B54B3137EB}"/>
               </a:ext>
             </a:extLst>
           </p:cNvPr>
@@ -30802,7 +30902,7 @@
           <p:cNvPr id="4" name="Rectangle 3">
             <a:extLst>
               <a:ext uri="{FF2B5EF4-FFF2-40B4-BE49-F238E27FC236}">
-                <a16:creationId xmlns:a16="http://schemas.microsoft.com/office/drawing/2014/main" id="{2CBF344E-950A-4767-97FA-13FFE695BBC3}"/>
+                <a16:creationId xmlns:a16="http://schemas.microsoft.com/office/drawing/2014/main" xmlns="" id="{2CBF344E-950A-4767-97FA-13FFE695BBC3}"/>
               </a:ext>
             </a:extLst>
           </p:cNvPr>
@@ -30843,7 +30943,7 @@
           <p:cNvPr id="126" name="Rectangle 125">
             <a:extLst>
               <a:ext uri="{FF2B5EF4-FFF2-40B4-BE49-F238E27FC236}">
-                <a16:creationId xmlns:a16="http://schemas.microsoft.com/office/drawing/2014/main" id="{AFE62E66-21DE-45BB-AB76-2BCE8E9BEC95}"/>
+                <a16:creationId xmlns:a16="http://schemas.microsoft.com/office/drawing/2014/main" xmlns="" id="{AFE62E66-21DE-45BB-AB76-2BCE8E9BEC95}"/>
               </a:ext>
             </a:extLst>
           </p:cNvPr>
@@ -30969,7 +31069,7 @@
           <p:cNvPr id="128" name="Rectangle 127">
             <a:extLst>
               <a:ext uri="{FF2B5EF4-FFF2-40B4-BE49-F238E27FC236}">
-                <a16:creationId xmlns:a16="http://schemas.microsoft.com/office/drawing/2014/main" id="{57B25911-E59E-4329-B921-A0EBAE8F9C7E}"/>
+                <a16:creationId xmlns:a16="http://schemas.microsoft.com/office/drawing/2014/main" xmlns="" id="{57B25911-E59E-4329-B921-A0EBAE8F9C7E}"/>
               </a:ext>
             </a:extLst>
           </p:cNvPr>
@@ -31123,7 +31223,7 @@
           <p:cNvPr id="5" name="Rectangle 4">
             <a:extLst>
               <a:ext uri="{FF2B5EF4-FFF2-40B4-BE49-F238E27FC236}">
-                <a16:creationId xmlns:a16="http://schemas.microsoft.com/office/drawing/2014/main" id="{798B0573-B3AD-48CB-9F8F-13EC6567D0D3}"/>
+                <a16:creationId xmlns:a16="http://schemas.microsoft.com/office/drawing/2014/main" xmlns="" id="{798B0573-B3AD-48CB-9F8F-13EC6567D0D3}"/>
               </a:ext>
             </a:extLst>
           </p:cNvPr>
@@ -31218,7 +31318,7 @@
           <p:cNvPr id="6" name="Rectangle 5">
             <a:extLst>
               <a:ext uri="{FF2B5EF4-FFF2-40B4-BE49-F238E27FC236}">
-                <a16:creationId xmlns:a16="http://schemas.microsoft.com/office/drawing/2014/main" id="{2B5D63EA-C9C9-4E25-A071-89FBDD4231BE}"/>
+                <a16:creationId xmlns:a16="http://schemas.microsoft.com/office/drawing/2014/main" xmlns="" id="{2B5D63EA-C9C9-4E25-A071-89FBDD4231BE}"/>
               </a:ext>
             </a:extLst>
           </p:cNvPr>
@@ -31256,7 +31356,7 @@
           <p:cNvPr id="8" name="Rectangle 7">
             <a:extLst>
               <a:ext uri="{FF2B5EF4-FFF2-40B4-BE49-F238E27FC236}">
-                <a16:creationId xmlns:a16="http://schemas.microsoft.com/office/drawing/2014/main" id="{BE0255C1-0F86-4BC8-84D8-4B76F00785A9}"/>
+                <a16:creationId xmlns:a16="http://schemas.microsoft.com/office/drawing/2014/main" xmlns="" id="{BE0255C1-0F86-4BC8-84D8-4B76F00785A9}"/>
               </a:ext>
             </a:extLst>
           </p:cNvPr>
@@ -31297,7 +31397,7 @@
           <p:cNvPr id="9" name="Rectangle 8">
             <a:extLst>
               <a:ext uri="{FF2B5EF4-FFF2-40B4-BE49-F238E27FC236}">
-                <a16:creationId xmlns:a16="http://schemas.microsoft.com/office/drawing/2014/main" id="{CFD7F599-A36B-4AA7-86FA-23355394169C}"/>
+                <a16:creationId xmlns:a16="http://schemas.microsoft.com/office/drawing/2014/main" xmlns="" id="{CFD7F599-A36B-4AA7-86FA-23355394169C}"/>
               </a:ext>
             </a:extLst>
           </p:cNvPr>
@@ -31338,7 +31438,7 @@
           <p:cNvPr id="130" name="Rectangle 129">
             <a:extLst>
               <a:ext uri="{FF2B5EF4-FFF2-40B4-BE49-F238E27FC236}">
-                <a16:creationId xmlns:a16="http://schemas.microsoft.com/office/drawing/2014/main" id="{F21A4D44-CAD2-400B-8E2D-F8B1FEA0E5B6}"/>
+                <a16:creationId xmlns:a16="http://schemas.microsoft.com/office/drawing/2014/main" xmlns="" id="{F21A4D44-CAD2-400B-8E2D-F8B1FEA0E5B6}"/>
               </a:ext>
             </a:extLst>
           </p:cNvPr>
@@ -31379,7 +31479,7 @@
           <p:cNvPr id="131" name="Rectangle 130">
             <a:extLst>
               <a:ext uri="{FF2B5EF4-FFF2-40B4-BE49-F238E27FC236}">
-                <a16:creationId xmlns:a16="http://schemas.microsoft.com/office/drawing/2014/main" id="{7ECE62BA-C5A0-4279-B504-BAC3C2C73E71}"/>
+                <a16:creationId xmlns:a16="http://schemas.microsoft.com/office/drawing/2014/main" xmlns="" id="{7ECE62BA-C5A0-4279-B504-BAC3C2C73E71}"/>
               </a:ext>
             </a:extLst>
           </p:cNvPr>
@@ -31431,7 +31531,7 @@
           <p:cNvPr id="10" name="Cube 9">
             <a:extLst>
               <a:ext uri="{FF2B5EF4-FFF2-40B4-BE49-F238E27FC236}">
-                <a16:creationId xmlns:a16="http://schemas.microsoft.com/office/drawing/2014/main" id="{F871D032-A4AE-406F-A80A-38A8B0BED40E}"/>
+                <a16:creationId xmlns:a16="http://schemas.microsoft.com/office/drawing/2014/main" xmlns="" id="{F871D032-A4AE-406F-A80A-38A8B0BED40E}"/>
               </a:ext>
             </a:extLst>
           </p:cNvPr>
@@ -31491,7 +31591,7 @@
           <p:cNvPr id="133" name="Folded Corner 14">
             <a:extLst>
               <a:ext uri="{FF2B5EF4-FFF2-40B4-BE49-F238E27FC236}">
-                <a16:creationId xmlns:a16="http://schemas.microsoft.com/office/drawing/2014/main" id="{DDDEB2FA-CB2B-41A1-82A4-458F3DD3A4D7}"/>
+                <a16:creationId xmlns:a16="http://schemas.microsoft.com/office/drawing/2014/main" xmlns="" id="{DDDEB2FA-CB2B-41A1-82A4-458F3DD3A4D7}"/>
               </a:ext>
             </a:extLst>
           </p:cNvPr>
@@ -31540,7 +31640,7 @@
           <p:cNvPr id="11" name="Rectangle 10">
             <a:extLst>
               <a:ext uri="{FF2B5EF4-FFF2-40B4-BE49-F238E27FC236}">
-                <a16:creationId xmlns:a16="http://schemas.microsoft.com/office/drawing/2014/main" id="{F638F98D-376A-4707-AFEB-3116E75204BA}"/>
+                <a16:creationId xmlns:a16="http://schemas.microsoft.com/office/drawing/2014/main" xmlns="" id="{F638F98D-376A-4707-AFEB-3116E75204BA}"/>
               </a:ext>
             </a:extLst>
           </p:cNvPr>
@@ -31595,7 +31695,7 @@
           <p:cNvPr id="18" name="Picture 17" descr="A close up of an animal&#10;&#10;Description generated with high confidence">
             <a:extLst>
               <a:ext uri="{FF2B5EF4-FFF2-40B4-BE49-F238E27FC236}">
-                <a16:creationId xmlns:a16="http://schemas.microsoft.com/office/drawing/2014/main" id="{4132CF14-571D-4435-9A41-BF9FAEA4439C}"/>
+                <a16:creationId xmlns:a16="http://schemas.microsoft.com/office/drawing/2014/main" xmlns="" id="{4132CF14-571D-4435-9A41-BF9FAEA4439C}"/>
               </a:ext>
             </a:extLst>
           </p:cNvPr>
@@ -31631,7 +31731,7 @@
           <p:cNvPr id="19" name="Rectangle 18">
             <a:extLst>
               <a:ext uri="{FF2B5EF4-FFF2-40B4-BE49-F238E27FC236}">
-                <a16:creationId xmlns:a16="http://schemas.microsoft.com/office/drawing/2014/main" id="{1047E73B-15B2-47B6-9C78-BCDB588C3019}"/>
+                <a16:creationId xmlns:a16="http://schemas.microsoft.com/office/drawing/2014/main" xmlns="" id="{1047E73B-15B2-47B6-9C78-BCDB588C3019}"/>
               </a:ext>
             </a:extLst>
           </p:cNvPr>
@@ -31673,7 +31773,7 @@
           <p:cNvPr id="31" name="Straight Arrow Connector 30">
             <a:extLst>
               <a:ext uri="{FF2B5EF4-FFF2-40B4-BE49-F238E27FC236}">
-                <a16:creationId xmlns:a16="http://schemas.microsoft.com/office/drawing/2014/main" id="{E3ACBD9C-E946-4C83-82A0-7C79817A1EB9}"/>
+                <a16:creationId xmlns:a16="http://schemas.microsoft.com/office/drawing/2014/main" xmlns="" id="{E3ACBD9C-E946-4C83-82A0-7C79817A1EB9}"/>
               </a:ext>
             </a:extLst>
           </p:cNvPr>
@@ -31716,7 +31816,7 @@
           <p:cNvPr id="32" name="Rectangle 31">
             <a:extLst>
               <a:ext uri="{FF2B5EF4-FFF2-40B4-BE49-F238E27FC236}">
-                <a16:creationId xmlns:a16="http://schemas.microsoft.com/office/drawing/2014/main" id="{DAD5A302-C880-4E8C-9E1D-640CD5CF0CBE}"/>
+                <a16:creationId xmlns:a16="http://schemas.microsoft.com/office/drawing/2014/main" xmlns="" id="{DAD5A302-C880-4E8C-9E1D-640CD5CF0CBE}"/>
               </a:ext>
             </a:extLst>
           </p:cNvPr>
@@ -31754,7 +31854,7 @@
           <p:cNvPr id="135" name="Rectangle 134">
             <a:extLst>
               <a:ext uri="{FF2B5EF4-FFF2-40B4-BE49-F238E27FC236}">
-                <a16:creationId xmlns:a16="http://schemas.microsoft.com/office/drawing/2014/main" id="{9D239E65-7C2B-4AD5-A1F4-F716E33EF928}"/>
+                <a16:creationId xmlns:a16="http://schemas.microsoft.com/office/drawing/2014/main" xmlns="" id="{9D239E65-7C2B-4AD5-A1F4-F716E33EF928}"/>
               </a:ext>
             </a:extLst>
           </p:cNvPr>
@@ -31792,7 +31892,7 @@
           <p:cNvPr id="146" name="Rectangle 145">
             <a:extLst>
               <a:ext uri="{FF2B5EF4-FFF2-40B4-BE49-F238E27FC236}">
-                <a16:creationId xmlns:a16="http://schemas.microsoft.com/office/drawing/2014/main" id="{02CB9ACB-9175-4592-A0A2-5F6EBA3916AA}"/>
+                <a16:creationId xmlns:a16="http://schemas.microsoft.com/office/drawing/2014/main" xmlns="" id="{02CB9ACB-9175-4592-A0A2-5F6EBA3916AA}"/>
               </a:ext>
             </a:extLst>
           </p:cNvPr>
@@ -31830,7 +31930,7 @@
           <p:cNvPr id="33" name="Rectangle 32">
             <a:extLst>
               <a:ext uri="{FF2B5EF4-FFF2-40B4-BE49-F238E27FC236}">
-                <a16:creationId xmlns:a16="http://schemas.microsoft.com/office/drawing/2014/main" id="{A5445AD6-3298-4B4A-BFAA-36E271EE36D3}"/>
+                <a16:creationId xmlns:a16="http://schemas.microsoft.com/office/drawing/2014/main" xmlns="" id="{A5445AD6-3298-4B4A-BFAA-36E271EE36D3}"/>
               </a:ext>
             </a:extLst>
           </p:cNvPr>
@@ -31871,7 +31971,7 @@
           <p:cNvPr id="148" name="Cube 147">
             <a:extLst>
               <a:ext uri="{FF2B5EF4-FFF2-40B4-BE49-F238E27FC236}">
-                <a16:creationId xmlns:a16="http://schemas.microsoft.com/office/drawing/2014/main" id="{3C1DB64A-F95E-4BBA-AAB7-E382DEE6D3AD}"/>
+                <a16:creationId xmlns:a16="http://schemas.microsoft.com/office/drawing/2014/main" xmlns="" id="{3C1DB64A-F95E-4BBA-AAB7-E382DEE6D3AD}"/>
               </a:ext>
             </a:extLst>
           </p:cNvPr>
@@ -31931,7 +32031,7 @@
           <p:cNvPr id="149" name="Rectangle 148">
             <a:extLst>
               <a:ext uri="{FF2B5EF4-FFF2-40B4-BE49-F238E27FC236}">
-                <a16:creationId xmlns:a16="http://schemas.microsoft.com/office/drawing/2014/main" id="{8ADE2C1F-3705-4E1D-9D1A-CEFA5BBDC4AE}"/>
+                <a16:creationId xmlns:a16="http://schemas.microsoft.com/office/drawing/2014/main" xmlns="" id="{8ADE2C1F-3705-4E1D-9D1A-CEFA5BBDC4AE}"/>
               </a:ext>
             </a:extLst>
           </p:cNvPr>
@@ -31972,7 +32072,7 @@
           <p:cNvPr id="152" name="Folded Corner 14">
             <a:extLst>
               <a:ext uri="{FF2B5EF4-FFF2-40B4-BE49-F238E27FC236}">
-                <a16:creationId xmlns:a16="http://schemas.microsoft.com/office/drawing/2014/main" id="{E9E59862-8121-45E9-B034-254AA5F85A9E}"/>
+                <a16:creationId xmlns:a16="http://schemas.microsoft.com/office/drawing/2014/main" xmlns="" id="{E9E59862-8121-45E9-B034-254AA5F85A9E}"/>
               </a:ext>
             </a:extLst>
           </p:cNvPr>
@@ -32021,7 +32121,7 @@
           <p:cNvPr id="159" name="Rectangle 158">
             <a:extLst>
               <a:ext uri="{FF2B5EF4-FFF2-40B4-BE49-F238E27FC236}">
-                <a16:creationId xmlns:a16="http://schemas.microsoft.com/office/drawing/2014/main" id="{9189909A-C973-403D-AC10-F162C1C50251}"/>
+                <a16:creationId xmlns:a16="http://schemas.microsoft.com/office/drawing/2014/main" xmlns="" id="{9189909A-C973-403D-AC10-F162C1C50251}"/>
               </a:ext>
             </a:extLst>
           </p:cNvPr>
@@ -32076,7 +32176,7 @@
           <p:cNvPr id="160" name="Straight Arrow Connector 159">
             <a:extLst>
               <a:ext uri="{FF2B5EF4-FFF2-40B4-BE49-F238E27FC236}">
-                <a16:creationId xmlns:a16="http://schemas.microsoft.com/office/drawing/2014/main" id="{4104DBBE-32EA-425C-8DB2-CA3E800CA64E}"/>
+                <a16:creationId xmlns:a16="http://schemas.microsoft.com/office/drawing/2014/main" xmlns="" id="{4104DBBE-32EA-425C-8DB2-CA3E800CA64E}"/>
               </a:ext>
             </a:extLst>
           </p:cNvPr>
@@ -32121,7 +32221,7 @@
           <p:cNvPr id="163" name="Cube 162">
             <a:extLst>
               <a:ext uri="{FF2B5EF4-FFF2-40B4-BE49-F238E27FC236}">
-                <a16:creationId xmlns:a16="http://schemas.microsoft.com/office/drawing/2014/main" id="{DCC62459-FE7B-48A9-A2FB-D56CDC251746}"/>
+                <a16:creationId xmlns:a16="http://schemas.microsoft.com/office/drawing/2014/main" xmlns="" id="{DCC62459-FE7B-48A9-A2FB-D56CDC251746}"/>
               </a:ext>
             </a:extLst>
           </p:cNvPr>
@@ -32181,7 +32281,7 @@
           <p:cNvPr id="164" name="Rectangle 163">
             <a:extLst>
               <a:ext uri="{FF2B5EF4-FFF2-40B4-BE49-F238E27FC236}">
-                <a16:creationId xmlns:a16="http://schemas.microsoft.com/office/drawing/2014/main" id="{A17E061D-69B0-4C5E-9A8B-BA722BA64CA4}"/>
+                <a16:creationId xmlns:a16="http://schemas.microsoft.com/office/drawing/2014/main" xmlns="" id="{A17E061D-69B0-4C5E-9A8B-BA722BA64CA4}"/>
               </a:ext>
             </a:extLst>
           </p:cNvPr>
@@ -32222,7 +32322,7 @@
           <p:cNvPr id="165" name="Folded Corner 14">
             <a:extLst>
               <a:ext uri="{FF2B5EF4-FFF2-40B4-BE49-F238E27FC236}">
-                <a16:creationId xmlns:a16="http://schemas.microsoft.com/office/drawing/2014/main" id="{E1EF52F6-55FE-4BD8-A276-7961F4C14406}"/>
+                <a16:creationId xmlns:a16="http://schemas.microsoft.com/office/drawing/2014/main" xmlns="" id="{E1EF52F6-55FE-4BD8-A276-7961F4C14406}"/>
               </a:ext>
             </a:extLst>
           </p:cNvPr>
@@ -32271,7 +32371,7 @@
           <p:cNvPr id="170" name="Rectangle 169">
             <a:extLst>
               <a:ext uri="{FF2B5EF4-FFF2-40B4-BE49-F238E27FC236}">
-                <a16:creationId xmlns:a16="http://schemas.microsoft.com/office/drawing/2014/main" id="{CD422137-5DD0-430D-A335-3434D32EC278}"/>
+                <a16:creationId xmlns:a16="http://schemas.microsoft.com/office/drawing/2014/main" xmlns="" id="{CD422137-5DD0-430D-A335-3434D32EC278}"/>
               </a:ext>
             </a:extLst>
           </p:cNvPr>
@@ -32323,7 +32423,7 @@
           <p:cNvPr id="171" name="Straight Arrow Connector 170">
             <a:extLst>
               <a:ext uri="{FF2B5EF4-FFF2-40B4-BE49-F238E27FC236}">
-                <a16:creationId xmlns:a16="http://schemas.microsoft.com/office/drawing/2014/main" id="{26251F63-0F9B-46FC-B288-264E1954D111}"/>
+                <a16:creationId xmlns:a16="http://schemas.microsoft.com/office/drawing/2014/main" xmlns="" id="{26251F63-0F9B-46FC-B288-264E1954D111}"/>
               </a:ext>
             </a:extLst>
           </p:cNvPr>
@@ -32368,7 +32468,7 @@
           <p:cNvPr id="172" name="Folded Corner 14">
             <a:extLst>
               <a:ext uri="{FF2B5EF4-FFF2-40B4-BE49-F238E27FC236}">
-                <a16:creationId xmlns:a16="http://schemas.microsoft.com/office/drawing/2014/main" id="{2198A703-2FEE-48EA-B0B0-656B73C08CA7}"/>
+                <a16:creationId xmlns:a16="http://schemas.microsoft.com/office/drawing/2014/main" xmlns="" id="{2198A703-2FEE-48EA-B0B0-656B73C08CA7}"/>
               </a:ext>
             </a:extLst>
           </p:cNvPr>
@@ -32417,7 +32517,7 @@
           <p:cNvPr id="173" name="Rectangle 172">
             <a:extLst>
               <a:ext uri="{FF2B5EF4-FFF2-40B4-BE49-F238E27FC236}">
-                <a16:creationId xmlns:a16="http://schemas.microsoft.com/office/drawing/2014/main" id="{FCC85E64-312F-4851-B756-3019DD6FA99F}"/>
+                <a16:creationId xmlns:a16="http://schemas.microsoft.com/office/drawing/2014/main" xmlns="" id="{FCC85E64-312F-4851-B756-3019DD6FA99F}"/>
               </a:ext>
             </a:extLst>
           </p:cNvPr>
@@ -32469,7 +32569,7 @@
           <p:cNvPr id="174" name="Straight Arrow Connector 173">
             <a:extLst>
               <a:ext uri="{FF2B5EF4-FFF2-40B4-BE49-F238E27FC236}">
-                <a16:creationId xmlns:a16="http://schemas.microsoft.com/office/drawing/2014/main" id="{518C8625-6187-4D33-A1AC-9208CA68F263}"/>
+                <a16:creationId xmlns:a16="http://schemas.microsoft.com/office/drawing/2014/main" xmlns="" id="{518C8625-6187-4D33-A1AC-9208CA68F263}"/>
               </a:ext>
             </a:extLst>
           </p:cNvPr>
@@ -32514,7 +32614,7 @@
           <p:cNvPr id="39" name="Rectangle 38">
             <a:extLst>
               <a:ext uri="{FF2B5EF4-FFF2-40B4-BE49-F238E27FC236}">
-                <a16:creationId xmlns:a16="http://schemas.microsoft.com/office/drawing/2014/main" id="{D01A5617-56DC-4B84-AF69-7027F4C7E7B3}"/>
+                <a16:creationId xmlns:a16="http://schemas.microsoft.com/office/drawing/2014/main" xmlns="" id="{D01A5617-56DC-4B84-AF69-7027F4C7E7B3}"/>
               </a:ext>
             </a:extLst>
           </p:cNvPr>
@@ -32569,7 +32669,7 @@
           <p:cNvPr id="40" name="Arrow: Right 39">
             <a:extLst>
               <a:ext uri="{FF2B5EF4-FFF2-40B4-BE49-F238E27FC236}">
-                <a16:creationId xmlns:a16="http://schemas.microsoft.com/office/drawing/2014/main" id="{AB7C45BA-0078-4BA1-A2B3-BC9A66ACD955}"/>
+                <a16:creationId xmlns:a16="http://schemas.microsoft.com/office/drawing/2014/main" xmlns="" id="{AB7C45BA-0078-4BA1-A2B3-BC9A66ACD955}"/>
               </a:ext>
             </a:extLst>
           </p:cNvPr>
@@ -32621,7 +32721,7 @@
           <p:cNvPr id="12" name="Picture 11" descr="A picture containing outdoor object&#10;&#10;Description generated with high confidence">
             <a:extLst>
               <a:ext uri="{FF2B5EF4-FFF2-40B4-BE49-F238E27FC236}">
-                <a16:creationId xmlns:a16="http://schemas.microsoft.com/office/drawing/2014/main" id="{684713F9-9ECF-4663-A027-A6113FA71893}"/>
+                <a16:creationId xmlns:a16="http://schemas.microsoft.com/office/drawing/2014/main" xmlns="" id="{684713F9-9ECF-4663-A027-A6113FA71893}"/>
               </a:ext>
             </a:extLst>
           </p:cNvPr>
@@ -32657,7 +32757,7 @@
           <p:cNvPr id="42" name="Straight Arrow Connector 41">
             <a:extLst>
               <a:ext uri="{FF2B5EF4-FFF2-40B4-BE49-F238E27FC236}">
-                <a16:creationId xmlns:a16="http://schemas.microsoft.com/office/drawing/2014/main" id="{AE9F3928-6603-4F44-B87F-D5568E789A51}"/>
+                <a16:creationId xmlns:a16="http://schemas.microsoft.com/office/drawing/2014/main" xmlns="" id="{AE9F3928-6603-4F44-B87F-D5568E789A51}"/>
               </a:ext>
             </a:extLst>
           </p:cNvPr>
@@ -32702,7 +32802,7 @@
           <p:cNvPr id="13" name="Rectangle 12">
             <a:extLst>
               <a:ext uri="{FF2B5EF4-FFF2-40B4-BE49-F238E27FC236}">
-                <a16:creationId xmlns:a16="http://schemas.microsoft.com/office/drawing/2014/main" id="{BE9850A2-3BDB-4A68-BCBD-94C436747806}"/>
+                <a16:creationId xmlns:a16="http://schemas.microsoft.com/office/drawing/2014/main" xmlns="" id="{BE9850A2-3BDB-4A68-BCBD-94C436747806}"/>
               </a:ext>
             </a:extLst>
           </p:cNvPr>
@@ -32768,7 +32868,7 @@
           <p:cNvPr id="44" name="Folded Corner 14">
             <a:extLst>
               <a:ext uri="{FF2B5EF4-FFF2-40B4-BE49-F238E27FC236}">
-                <a16:creationId xmlns:a16="http://schemas.microsoft.com/office/drawing/2014/main" id="{048A78E4-38F4-403F-B262-3393CB25026A}"/>
+                <a16:creationId xmlns:a16="http://schemas.microsoft.com/office/drawing/2014/main" xmlns="" id="{048A78E4-38F4-403F-B262-3393CB25026A}"/>
               </a:ext>
             </a:extLst>
           </p:cNvPr>
@@ -32817,7 +32917,7 @@
           <p:cNvPr id="45" name="Rectangle 44">
             <a:extLst>
               <a:ext uri="{FF2B5EF4-FFF2-40B4-BE49-F238E27FC236}">
-                <a16:creationId xmlns:a16="http://schemas.microsoft.com/office/drawing/2014/main" id="{B6EF94B6-C2BD-4454-B081-DC4CDC0FA78B}"/>
+                <a16:creationId xmlns:a16="http://schemas.microsoft.com/office/drawing/2014/main" xmlns="" id="{B6EF94B6-C2BD-4454-B081-DC4CDC0FA78B}"/>
               </a:ext>
             </a:extLst>
           </p:cNvPr>
@@ -32869,7 +32969,7 @@
           <p:cNvPr id="14" name="Rectangle 13">
             <a:extLst>
               <a:ext uri="{FF2B5EF4-FFF2-40B4-BE49-F238E27FC236}">
-                <a16:creationId xmlns:a16="http://schemas.microsoft.com/office/drawing/2014/main" id="{9F89B982-51DA-4A7B-B50E-BA08031E2C12}"/>
+                <a16:creationId xmlns:a16="http://schemas.microsoft.com/office/drawing/2014/main" xmlns="" id="{9F89B982-51DA-4A7B-B50E-BA08031E2C12}"/>
               </a:ext>
             </a:extLst>
           </p:cNvPr>
@@ -32907,7 +33007,7 @@
           <p:cNvPr id="15" name="Rectangle 14">
             <a:extLst>
               <a:ext uri="{FF2B5EF4-FFF2-40B4-BE49-F238E27FC236}">
-                <a16:creationId xmlns:a16="http://schemas.microsoft.com/office/drawing/2014/main" id="{4F318F00-3DF3-4DD0-9F9C-3D2FB2746086}"/>
+                <a16:creationId xmlns:a16="http://schemas.microsoft.com/office/drawing/2014/main" xmlns="" id="{4F318F00-3DF3-4DD0-9F9C-3D2FB2746086}"/>
               </a:ext>
             </a:extLst>
           </p:cNvPr>
@@ -32945,7 +33045,7 @@
           <p:cNvPr id="48" name="Rectangle 47">
             <a:extLst>
               <a:ext uri="{FF2B5EF4-FFF2-40B4-BE49-F238E27FC236}">
-                <a16:creationId xmlns:a16="http://schemas.microsoft.com/office/drawing/2014/main" id="{4B4F362E-13BC-4500-8556-53A8FC39D0B9}"/>
+                <a16:creationId xmlns:a16="http://schemas.microsoft.com/office/drawing/2014/main" xmlns="" id="{4B4F362E-13BC-4500-8556-53A8FC39D0B9}"/>
               </a:ext>
             </a:extLst>
           </p:cNvPr>
@@ -32983,7 +33083,7 @@
           <p:cNvPr id="17" name="Rectangle 16">
             <a:extLst>
               <a:ext uri="{FF2B5EF4-FFF2-40B4-BE49-F238E27FC236}">
-                <a16:creationId xmlns:a16="http://schemas.microsoft.com/office/drawing/2014/main" id="{E971B6A2-9BA5-482C-991E-4489D5C190FD}"/>
+                <a16:creationId xmlns:a16="http://schemas.microsoft.com/office/drawing/2014/main" xmlns="" id="{E971B6A2-9BA5-482C-991E-4489D5C190FD}"/>
               </a:ext>
             </a:extLst>
           </p:cNvPr>
@@ -33021,7 +33121,7 @@
           <p:cNvPr id="20" name="Rectangle 19">
             <a:extLst>
               <a:ext uri="{FF2B5EF4-FFF2-40B4-BE49-F238E27FC236}">
-                <a16:creationId xmlns:a16="http://schemas.microsoft.com/office/drawing/2014/main" id="{99534692-59D2-4947-83E0-D4E8E4591FD6}"/>
+                <a16:creationId xmlns:a16="http://schemas.microsoft.com/office/drawing/2014/main" xmlns="" id="{99534692-59D2-4947-83E0-D4E8E4591FD6}"/>
               </a:ext>
             </a:extLst>
           </p:cNvPr>
@@ -33103,7 +33203,7 @@
           <p:cNvPr id="175" name="Folded Corner 14">
             <a:extLst>
               <a:ext uri="{FF2B5EF4-FFF2-40B4-BE49-F238E27FC236}">
-                <a16:creationId xmlns:a16="http://schemas.microsoft.com/office/drawing/2014/main" id="{D7925C44-E3E5-47AF-9CC8-BF6471802A70}"/>
+                <a16:creationId xmlns:a16="http://schemas.microsoft.com/office/drawing/2014/main" xmlns="" id="{D7925C44-E3E5-47AF-9CC8-BF6471802A70}"/>
               </a:ext>
             </a:extLst>
           </p:cNvPr>
@@ -33152,7 +33252,7 @@
           <p:cNvPr id="2" name="Diagram 1">
             <a:extLst>
               <a:ext uri="{FF2B5EF4-FFF2-40B4-BE49-F238E27FC236}">
-                <a16:creationId xmlns:a16="http://schemas.microsoft.com/office/drawing/2014/main" id="{214EDC3A-CB98-4BD4-86CB-C3DE5CC0A317}"/>
+                <a16:creationId xmlns:a16="http://schemas.microsoft.com/office/drawing/2014/main" xmlns="" id="{214EDC3A-CB98-4BD4-86CB-C3DE5CC0A317}"/>
               </a:ext>
             </a:extLst>
           </p:cNvPr>
@@ -33180,7 +33280,7 @@
           <p:cNvPr id="3" name="Rectangle 2">
             <a:extLst>
               <a:ext uri="{FF2B5EF4-FFF2-40B4-BE49-F238E27FC236}">
-                <a16:creationId xmlns:a16="http://schemas.microsoft.com/office/drawing/2014/main" id="{8D715EE1-32F0-4BAE-86BD-83B54B3137EB}"/>
+                <a16:creationId xmlns:a16="http://schemas.microsoft.com/office/drawing/2014/main" xmlns="" id="{8D715EE1-32F0-4BAE-86BD-83B54B3137EB}"/>
               </a:ext>
             </a:extLst>
           </p:cNvPr>
@@ -33257,7 +33357,7 @@
           <p:cNvPr id="4" name="Rectangle 3">
             <a:extLst>
               <a:ext uri="{FF2B5EF4-FFF2-40B4-BE49-F238E27FC236}">
-                <a16:creationId xmlns:a16="http://schemas.microsoft.com/office/drawing/2014/main" id="{2CBF344E-950A-4767-97FA-13FFE695BBC3}"/>
+                <a16:creationId xmlns:a16="http://schemas.microsoft.com/office/drawing/2014/main" xmlns="" id="{2CBF344E-950A-4767-97FA-13FFE695BBC3}"/>
               </a:ext>
             </a:extLst>
           </p:cNvPr>
@@ -33298,7 +33398,7 @@
           <p:cNvPr id="126" name="Rectangle 125">
             <a:extLst>
               <a:ext uri="{FF2B5EF4-FFF2-40B4-BE49-F238E27FC236}">
-                <a16:creationId xmlns:a16="http://schemas.microsoft.com/office/drawing/2014/main" id="{AFE62E66-21DE-45BB-AB76-2BCE8E9BEC95}"/>
+                <a16:creationId xmlns:a16="http://schemas.microsoft.com/office/drawing/2014/main" xmlns="" id="{AFE62E66-21DE-45BB-AB76-2BCE8E9BEC95}"/>
               </a:ext>
             </a:extLst>
           </p:cNvPr>
@@ -33399,7 +33499,7 @@
           <p:cNvPr id="128" name="Rectangle 127">
             <a:extLst>
               <a:ext uri="{FF2B5EF4-FFF2-40B4-BE49-F238E27FC236}">
-                <a16:creationId xmlns:a16="http://schemas.microsoft.com/office/drawing/2014/main" id="{57B25911-E59E-4329-B921-A0EBAE8F9C7E}"/>
+                <a16:creationId xmlns:a16="http://schemas.microsoft.com/office/drawing/2014/main" xmlns="" id="{57B25911-E59E-4329-B921-A0EBAE8F9C7E}"/>
               </a:ext>
             </a:extLst>
           </p:cNvPr>
@@ -33476,7 +33576,7 @@
           <p:cNvPr id="5" name="Rectangle 4">
             <a:extLst>
               <a:ext uri="{FF2B5EF4-FFF2-40B4-BE49-F238E27FC236}">
-                <a16:creationId xmlns:a16="http://schemas.microsoft.com/office/drawing/2014/main" id="{798B0573-B3AD-48CB-9F8F-13EC6567D0D3}"/>
+                <a16:creationId xmlns:a16="http://schemas.microsoft.com/office/drawing/2014/main" xmlns="" id="{798B0573-B3AD-48CB-9F8F-13EC6567D0D3}"/>
               </a:ext>
             </a:extLst>
           </p:cNvPr>
@@ -33571,7 +33671,7 @@
           <p:cNvPr id="6" name="Rectangle 5">
             <a:extLst>
               <a:ext uri="{FF2B5EF4-FFF2-40B4-BE49-F238E27FC236}">
-                <a16:creationId xmlns:a16="http://schemas.microsoft.com/office/drawing/2014/main" id="{2B5D63EA-C9C9-4E25-A071-89FBDD4231BE}"/>
+                <a16:creationId xmlns:a16="http://schemas.microsoft.com/office/drawing/2014/main" xmlns="" id="{2B5D63EA-C9C9-4E25-A071-89FBDD4231BE}"/>
               </a:ext>
             </a:extLst>
           </p:cNvPr>
@@ -33609,7 +33709,7 @@
           <p:cNvPr id="8" name="Rectangle 7">
             <a:extLst>
               <a:ext uri="{FF2B5EF4-FFF2-40B4-BE49-F238E27FC236}">
-                <a16:creationId xmlns:a16="http://schemas.microsoft.com/office/drawing/2014/main" id="{BE0255C1-0F86-4BC8-84D8-4B76F00785A9}"/>
+                <a16:creationId xmlns:a16="http://schemas.microsoft.com/office/drawing/2014/main" xmlns="" id="{BE0255C1-0F86-4BC8-84D8-4B76F00785A9}"/>
               </a:ext>
             </a:extLst>
           </p:cNvPr>
@@ -33650,7 +33750,7 @@
           <p:cNvPr id="9" name="Rectangle 8">
             <a:extLst>
               <a:ext uri="{FF2B5EF4-FFF2-40B4-BE49-F238E27FC236}">
-                <a16:creationId xmlns:a16="http://schemas.microsoft.com/office/drawing/2014/main" id="{CFD7F599-A36B-4AA7-86FA-23355394169C}"/>
+                <a16:creationId xmlns:a16="http://schemas.microsoft.com/office/drawing/2014/main" xmlns="" id="{CFD7F599-A36B-4AA7-86FA-23355394169C}"/>
               </a:ext>
             </a:extLst>
           </p:cNvPr>
@@ -33691,7 +33791,7 @@
           <p:cNvPr id="130" name="Rectangle 129">
             <a:extLst>
               <a:ext uri="{FF2B5EF4-FFF2-40B4-BE49-F238E27FC236}">
-                <a16:creationId xmlns:a16="http://schemas.microsoft.com/office/drawing/2014/main" id="{F21A4D44-CAD2-400B-8E2D-F8B1FEA0E5B6}"/>
+                <a16:creationId xmlns:a16="http://schemas.microsoft.com/office/drawing/2014/main" xmlns="" id="{F21A4D44-CAD2-400B-8E2D-F8B1FEA0E5B6}"/>
               </a:ext>
             </a:extLst>
           </p:cNvPr>
@@ -33732,7 +33832,7 @@
           <p:cNvPr id="131" name="Rectangle 130">
             <a:extLst>
               <a:ext uri="{FF2B5EF4-FFF2-40B4-BE49-F238E27FC236}">
-                <a16:creationId xmlns:a16="http://schemas.microsoft.com/office/drawing/2014/main" id="{7ECE62BA-C5A0-4279-B504-BAC3C2C73E71}"/>
+                <a16:creationId xmlns:a16="http://schemas.microsoft.com/office/drawing/2014/main" xmlns="" id="{7ECE62BA-C5A0-4279-B504-BAC3C2C73E71}"/>
               </a:ext>
             </a:extLst>
           </p:cNvPr>
@@ -33784,7 +33884,7 @@
           <p:cNvPr id="10" name="Cube 9">
             <a:extLst>
               <a:ext uri="{FF2B5EF4-FFF2-40B4-BE49-F238E27FC236}">
-                <a16:creationId xmlns:a16="http://schemas.microsoft.com/office/drawing/2014/main" id="{F871D032-A4AE-406F-A80A-38A8B0BED40E}"/>
+                <a16:creationId xmlns:a16="http://schemas.microsoft.com/office/drawing/2014/main" xmlns="" id="{F871D032-A4AE-406F-A80A-38A8B0BED40E}"/>
               </a:ext>
             </a:extLst>
           </p:cNvPr>
@@ -33844,7 +33944,7 @@
           <p:cNvPr id="133" name="Folded Corner 14">
             <a:extLst>
               <a:ext uri="{FF2B5EF4-FFF2-40B4-BE49-F238E27FC236}">
-                <a16:creationId xmlns:a16="http://schemas.microsoft.com/office/drawing/2014/main" id="{DDDEB2FA-CB2B-41A1-82A4-458F3DD3A4D7}"/>
+                <a16:creationId xmlns:a16="http://schemas.microsoft.com/office/drawing/2014/main" xmlns="" id="{DDDEB2FA-CB2B-41A1-82A4-458F3DD3A4D7}"/>
               </a:ext>
             </a:extLst>
           </p:cNvPr>
@@ -33893,7 +33993,7 @@
           <p:cNvPr id="11" name="Rectangle 10">
             <a:extLst>
               <a:ext uri="{FF2B5EF4-FFF2-40B4-BE49-F238E27FC236}">
-                <a16:creationId xmlns:a16="http://schemas.microsoft.com/office/drawing/2014/main" id="{F638F98D-376A-4707-AFEB-3116E75204BA}"/>
+                <a16:creationId xmlns:a16="http://schemas.microsoft.com/office/drawing/2014/main" xmlns="" id="{F638F98D-376A-4707-AFEB-3116E75204BA}"/>
               </a:ext>
             </a:extLst>
           </p:cNvPr>
@@ -33948,7 +34048,7 @@
           <p:cNvPr id="18" name="Picture 17" descr="A close up of an animal&#10;&#10;Description generated with high confidence">
             <a:extLst>
               <a:ext uri="{FF2B5EF4-FFF2-40B4-BE49-F238E27FC236}">
-                <a16:creationId xmlns:a16="http://schemas.microsoft.com/office/drawing/2014/main" id="{4132CF14-571D-4435-9A41-BF9FAEA4439C}"/>
+                <a16:creationId xmlns:a16="http://schemas.microsoft.com/office/drawing/2014/main" xmlns="" id="{4132CF14-571D-4435-9A41-BF9FAEA4439C}"/>
               </a:ext>
             </a:extLst>
           </p:cNvPr>
@@ -33984,7 +34084,7 @@
           <p:cNvPr id="19" name="Rectangle 18">
             <a:extLst>
               <a:ext uri="{FF2B5EF4-FFF2-40B4-BE49-F238E27FC236}">
-                <a16:creationId xmlns:a16="http://schemas.microsoft.com/office/drawing/2014/main" id="{1047E73B-15B2-47B6-9C78-BCDB588C3019}"/>
+                <a16:creationId xmlns:a16="http://schemas.microsoft.com/office/drawing/2014/main" xmlns="" id="{1047E73B-15B2-47B6-9C78-BCDB588C3019}"/>
               </a:ext>
             </a:extLst>
           </p:cNvPr>
@@ -34026,7 +34126,7 @@
           <p:cNvPr id="31" name="Straight Arrow Connector 30">
             <a:extLst>
               <a:ext uri="{FF2B5EF4-FFF2-40B4-BE49-F238E27FC236}">
-                <a16:creationId xmlns:a16="http://schemas.microsoft.com/office/drawing/2014/main" id="{E3ACBD9C-E946-4C83-82A0-7C79817A1EB9}"/>
+                <a16:creationId xmlns:a16="http://schemas.microsoft.com/office/drawing/2014/main" xmlns="" id="{E3ACBD9C-E946-4C83-82A0-7C79817A1EB9}"/>
               </a:ext>
             </a:extLst>
           </p:cNvPr>
@@ -34069,7 +34169,7 @@
           <p:cNvPr id="32" name="Rectangle 31">
             <a:extLst>
               <a:ext uri="{FF2B5EF4-FFF2-40B4-BE49-F238E27FC236}">
-                <a16:creationId xmlns:a16="http://schemas.microsoft.com/office/drawing/2014/main" id="{DAD5A302-C880-4E8C-9E1D-640CD5CF0CBE}"/>
+                <a16:creationId xmlns:a16="http://schemas.microsoft.com/office/drawing/2014/main" xmlns="" id="{DAD5A302-C880-4E8C-9E1D-640CD5CF0CBE}"/>
               </a:ext>
             </a:extLst>
           </p:cNvPr>
@@ -34107,7 +34207,7 @@
           <p:cNvPr id="135" name="Rectangle 134">
             <a:extLst>
               <a:ext uri="{FF2B5EF4-FFF2-40B4-BE49-F238E27FC236}">
-                <a16:creationId xmlns:a16="http://schemas.microsoft.com/office/drawing/2014/main" id="{9D239E65-7C2B-4AD5-A1F4-F716E33EF928}"/>
+                <a16:creationId xmlns:a16="http://schemas.microsoft.com/office/drawing/2014/main" xmlns="" id="{9D239E65-7C2B-4AD5-A1F4-F716E33EF928}"/>
               </a:ext>
             </a:extLst>
           </p:cNvPr>
@@ -34145,7 +34245,7 @@
           <p:cNvPr id="146" name="Rectangle 145">
             <a:extLst>
               <a:ext uri="{FF2B5EF4-FFF2-40B4-BE49-F238E27FC236}">
-                <a16:creationId xmlns:a16="http://schemas.microsoft.com/office/drawing/2014/main" id="{02CB9ACB-9175-4592-A0A2-5F6EBA3916AA}"/>
+                <a16:creationId xmlns:a16="http://schemas.microsoft.com/office/drawing/2014/main" xmlns="" id="{02CB9ACB-9175-4592-A0A2-5F6EBA3916AA}"/>
               </a:ext>
             </a:extLst>
           </p:cNvPr>
@@ -34183,7 +34283,7 @@
           <p:cNvPr id="33" name="Rectangle 32">
             <a:extLst>
               <a:ext uri="{FF2B5EF4-FFF2-40B4-BE49-F238E27FC236}">
-                <a16:creationId xmlns:a16="http://schemas.microsoft.com/office/drawing/2014/main" id="{A5445AD6-3298-4B4A-BFAA-36E271EE36D3}"/>
+                <a16:creationId xmlns:a16="http://schemas.microsoft.com/office/drawing/2014/main" xmlns="" id="{A5445AD6-3298-4B4A-BFAA-36E271EE36D3}"/>
               </a:ext>
             </a:extLst>
           </p:cNvPr>
@@ -34224,7 +34324,7 @@
           <p:cNvPr id="148" name="Cube 147">
             <a:extLst>
               <a:ext uri="{FF2B5EF4-FFF2-40B4-BE49-F238E27FC236}">
-                <a16:creationId xmlns:a16="http://schemas.microsoft.com/office/drawing/2014/main" id="{3C1DB64A-F95E-4BBA-AAB7-E382DEE6D3AD}"/>
+                <a16:creationId xmlns:a16="http://schemas.microsoft.com/office/drawing/2014/main" xmlns="" id="{3C1DB64A-F95E-4BBA-AAB7-E382DEE6D3AD}"/>
               </a:ext>
             </a:extLst>
           </p:cNvPr>
@@ -34284,7 +34384,7 @@
           <p:cNvPr id="149" name="Rectangle 148">
             <a:extLst>
               <a:ext uri="{FF2B5EF4-FFF2-40B4-BE49-F238E27FC236}">
-                <a16:creationId xmlns:a16="http://schemas.microsoft.com/office/drawing/2014/main" id="{8ADE2C1F-3705-4E1D-9D1A-CEFA5BBDC4AE}"/>
+                <a16:creationId xmlns:a16="http://schemas.microsoft.com/office/drawing/2014/main" xmlns="" id="{8ADE2C1F-3705-4E1D-9D1A-CEFA5BBDC4AE}"/>
               </a:ext>
             </a:extLst>
           </p:cNvPr>
@@ -34325,7 +34425,7 @@
           <p:cNvPr id="152" name="Folded Corner 14">
             <a:extLst>
               <a:ext uri="{FF2B5EF4-FFF2-40B4-BE49-F238E27FC236}">
-                <a16:creationId xmlns:a16="http://schemas.microsoft.com/office/drawing/2014/main" id="{E9E59862-8121-45E9-B034-254AA5F85A9E}"/>
+                <a16:creationId xmlns:a16="http://schemas.microsoft.com/office/drawing/2014/main" xmlns="" id="{E9E59862-8121-45E9-B034-254AA5F85A9E}"/>
               </a:ext>
             </a:extLst>
           </p:cNvPr>
@@ -34374,7 +34474,7 @@
           <p:cNvPr id="159" name="Rectangle 158">
             <a:extLst>
               <a:ext uri="{FF2B5EF4-FFF2-40B4-BE49-F238E27FC236}">
-                <a16:creationId xmlns:a16="http://schemas.microsoft.com/office/drawing/2014/main" id="{9189909A-C973-403D-AC10-F162C1C50251}"/>
+                <a16:creationId xmlns:a16="http://schemas.microsoft.com/office/drawing/2014/main" xmlns="" id="{9189909A-C973-403D-AC10-F162C1C50251}"/>
               </a:ext>
             </a:extLst>
           </p:cNvPr>
@@ -34429,7 +34529,7 @@
           <p:cNvPr id="160" name="Straight Arrow Connector 159">
             <a:extLst>
               <a:ext uri="{FF2B5EF4-FFF2-40B4-BE49-F238E27FC236}">
-                <a16:creationId xmlns:a16="http://schemas.microsoft.com/office/drawing/2014/main" id="{4104DBBE-32EA-425C-8DB2-CA3E800CA64E}"/>
+                <a16:creationId xmlns:a16="http://schemas.microsoft.com/office/drawing/2014/main" xmlns="" id="{4104DBBE-32EA-425C-8DB2-CA3E800CA64E}"/>
               </a:ext>
             </a:extLst>
           </p:cNvPr>
@@ -34474,7 +34574,7 @@
           <p:cNvPr id="163" name="Cube 162">
             <a:extLst>
               <a:ext uri="{FF2B5EF4-FFF2-40B4-BE49-F238E27FC236}">
-                <a16:creationId xmlns:a16="http://schemas.microsoft.com/office/drawing/2014/main" id="{DCC62459-FE7B-48A9-A2FB-D56CDC251746}"/>
+                <a16:creationId xmlns:a16="http://schemas.microsoft.com/office/drawing/2014/main" xmlns="" id="{DCC62459-FE7B-48A9-A2FB-D56CDC251746}"/>
               </a:ext>
             </a:extLst>
           </p:cNvPr>
@@ -34534,7 +34634,7 @@
           <p:cNvPr id="164" name="Rectangle 163">
             <a:extLst>
               <a:ext uri="{FF2B5EF4-FFF2-40B4-BE49-F238E27FC236}">
-                <a16:creationId xmlns:a16="http://schemas.microsoft.com/office/drawing/2014/main" id="{A17E061D-69B0-4C5E-9A8B-BA722BA64CA4}"/>
+                <a16:creationId xmlns:a16="http://schemas.microsoft.com/office/drawing/2014/main" xmlns="" id="{A17E061D-69B0-4C5E-9A8B-BA722BA64CA4}"/>
               </a:ext>
             </a:extLst>
           </p:cNvPr>
@@ -34575,7 +34675,7 @@
           <p:cNvPr id="165" name="Folded Corner 14">
             <a:extLst>
               <a:ext uri="{FF2B5EF4-FFF2-40B4-BE49-F238E27FC236}">
-                <a16:creationId xmlns:a16="http://schemas.microsoft.com/office/drawing/2014/main" id="{E1EF52F6-55FE-4BD8-A276-7961F4C14406}"/>
+                <a16:creationId xmlns:a16="http://schemas.microsoft.com/office/drawing/2014/main" xmlns="" id="{E1EF52F6-55FE-4BD8-A276-7961F4C14406}"/>
               </a:ext>
             </a:extLst>
           </p:cNvPr>
@@ -34624,7 +34724,7 @@
           <p:cNvPr id="170" name="Rectangle 169">
             <a:extLst>
               <a:ext uri="{FF2B5EF4-FFF2-40B4-BE49-F238E27FC236}">
-                <a16:creationId xmlns:a16="http://schemas.microsoft.com/office/drawing/2014/main" id="{CD422137-5DD0-430D-A335-3434D32EC278}"/>
+                <a16:creationId xmlns:a16="http://schemas.microsoft.com/office/drawing/2014/main" xmlns="" id="{CD422137-5DD0-430D-A335-3434D32EC278}"/>
               </a:ext>
             </a:extLst>
           </p:cNvPr>
@@ -34676,7 +34776,7 @@
           <p:cNvPr id="171" name="Straight Arrow Connector 170">
             <a:extLst>
               <a:ext uri="{FF2B5EF4-FFF2-40B4-BE49-F238E27FC236}">
-                <a16:creationId xmlns:a16="http://schemas.microsoft.com/office/drawing/2014/main" id="{26251F63-0F9B-46FC-B288-264E1954D111}"/>
+                <a16:creationId xmlns:a16="http://schemas.microsoft.com/office/drawing/2014/main" xmlns="" id="{26251F63-0F9B-46FC-B288-264E1954D111}"/>
               </a:ext>
             </a:extLst>
           </p:cNvPr>
@@ -34721,7 +34821,7 @@
           <p:cNvPr id="172" name="Folded Corner 14">
             <a:extLst>
               <a:ext uri="{FF2B5EF4-FFF2-40B4-BE49-F238E27FC236}">
-                <a16:creationId xmlns:a16="http://schemas.microsoft.com/office/drawing/2014/main" id="{2198A703-2FEE-48EA-B0B0-656B73C08CA7}"/>
+                <a16:creationId xmlns:a16="http://schemas.microsoft.com/office/drawing/2014/main" xmlns="" id="{2198A703-2FEE-48EA-B0B0-656B73C08CA7}"/>
               </a:ext>
             </a:extLst>
           </p:cNvPr>
@@ -34770,7 +34870,7 @@
           <p:cNvPr id="173" name="Rectangle 172">
             <a:extLst>
               <a:ext uri="{FF2B5EF4-FFF2-40B4-BE49-F238E27FC236}">
-                <a16:creationId xmlns:a16="http://schemas.microsoft.com/office/drawing/2014/main" id="{FCC85E64-312F-4851-B756-3019DD6FA99F}"/>
+                <a16:creationId xmlns:a16="http://schemas.microsoft.com/office/drawing/2014/main" xmlns="" id="{FCC85E64-312F-4851-B756-3019DD6FA99F}"/>
               </a:ext>
             </a:extLst>
           </p:cNvPr>
@@ -34822,7 +34922,7 @@
           <p:cNvPr id="174" name="Straight Arrow Connector 173">
             <a:extLst>
               <a:ext uri="{FF2B5EF4-FFF2-40B4-BE49-F238E27FC236}">
-                <a16:creationId xmlns:a16="http://schemas.microsoft.com/office/drawing/2014/main" id="{518C8625-6187-4D33-A1AC-9208CA68F263}"/>
+                <a16:creationId xmlns:a16="http://schemas.microsoft.com/office/drawing/2014/main" xmlns="" id="{518C8625-6187-4D33-A1AC-9208CA68F263}"/>
               </a:ext>
             </a:extLst>
           </p:cNvPr>
@@ -34867,7 +34967,7 @@
           <p:cNvPr id="39" name="Rectangle 38">
             <a:extLst>
               <a:ext uri="{FF2B5EF4-FFF2-40B4-BE49-F238E27FC236}">
-                <a16:creationId xmlns:a16="http://schemas.microsoft.com/office/drawing/2014/main" id="{D01A5617-56DC-4B84-AF69-7027F4C7E7B3}"/>
+                <a16:creationId xmlns:a16="http://schemas.microsoft.com/office/drawing/2014/main" xmlns="" id="{D01A5617-56DC-4B84-AF69-7027F4C7E7B3}"/>
               </a:ext>
             </a:extLst>
           </p:cNvPr>
@@ -34922,7 +35022,7 @@
           <p:cNvPr id="40" name="Arrow: Right 39">
             <a:extLst>
               <a:ext uri="{FF2B5EF4-FFF2-40B4-BE49-F238E27FC236}">
-                <a16:creationId xmlns:a16="http://schemas.microsoft.com/office/drawing/2014/main" id="{AB7C45BA-0078-4BA1-A2B3-BC9A66ACD955}"/>
+                <a16:creationId xmlns:a16="http://schemas.microsoft.com/office/drawing/2014/main" xmlns="" id="{AB7C45BA-0078-4BA1-A2B3-BC9A66ACD955}"/>
               </a:ext>
             </a:extLst>
           </p:cNvPr>
@@ -34974,7 +35074,7 @@
           <p:cNvPr id="12" name="Picture 11" descr="A picture containing outdoor object&#10;&#10;Description generated with high confidence">
             <a:extLst>
               <a:ext uri="{FF2B5EF4-FFF2-40B4-BE49-F238E27FC236}">
-                <a16:creationId xmlns:a16="http://schemas.microsoft.com/office/drawing/2014/main" id="{684713F9-9ECF-4663-A027-A6113FA71893}"/>
+                <a16:creationId xmlns:a16="http://schemas.microsoft.com/office/drawing/2014/main" xmlns="" id="{684713F9-9ECF-4663-A027-A6113FA71893}"/>
               </a:ext>
             </a:extLst>
           </p:cNvPr>
@@ -35010,7 +35110,7 @@
           <p:cNvPr id="42" name="Straight Arrow Connector 41">
             <a:extLst>
               <a:ext uri="{FF2B5EF4-FFF2-40B4-BE49-F238E27FC236}">
-                <a16:creationId xmlns:a16="http://schemas.microsoft.com/office/drawing/2014/main" id="{AE9F3928-6603-4F44-B87F-D5568E789A51}"/>
+                <a16:creationId xmlns:a16="http://schemas.microsoft.com/office/drawing/2014/main" xmlns="" id="{AE9F3928-6603-4F44-B87F-D5568E789A51}"/>
               </a:ext>
             </a:extLst>
           </p:cNvPr>
@@ -35055,7 +35155,7 @@
           <p:cNvPr id="13" name="Rectangle 12">
             <a:extLst>
               <a:ext uri="{FF2B5EF4-FFF2-40B4-BE49-F238E27FC236}">
-                <a16:creationId xmlns:a16="http://schemas.microsoft.com/office/drawing/2014/main" id="{BE9850A2-3BDB-4A68-BCBD-94C436747806}"/>
+                <a16:creationId xmlns:a16="http://schemas.microsoft.com/office/drawing/2014/main" xmlns="" id="{BE9850A2-3BDB-4A68-BCBD-94C436747806}"/>
               </a:ext>
             </a:extLst>
           </p:cNvPr>
@@ -35121,7 +35221,7 @@
           <p:cNvPr id="44" name="Folded Corner 14">
             <a:extLst>
               <a:ext uri="{FF2B5EF4-FFF2-40B4-BE49-F238E27FC236}">
-                <a16:creationId xmlns:a16="http://schemas.microsoft.com/office/drawing/2014/main" id="{048A78E4-38F4-403F-B262-3393CB25026A}"/>
+                <a16:creationId xmlns:a16="http://schemas.microsoft.com/office/drawing/2014/main" xmlns="" id="{048A78E4-38F4-403F-B262-3393CB25026A}"/>
               </a:ext>
             </a:extLst>
           </p:cNvPr>
@@ -35170,7 +35270,7 @@
           <p:cNvPr id="45" name="Rectangle 44">
             <a:extLst>
               <a:ext uri="{FF2B5EF4-FFF2-40B4-BE49-F238E27FC236}">
-                <a16:creationId xmlns:a16="http://schemas.microsoft.com/office/drawing/2014/main" id="{B6EF94B6-C2BD-4454-B081-DC4CDC0FA78B}"/>
+                <a16:creationId xmlns:a16="http://schemas.microsoft.com/office/drawing/2014/main" xmlns="" id="{B6EF94B6-C2BD-4454-B081-DC4CDC0FA78B}"/>
               </a:ext>
             </a:extLst>
           </p:cNvPr>
@@ -35222,7 +35322,7 @@
           <p:cNvPr id="14" name="Rectangle 13">
             <a:extLst>
               <a:ext uri="{FF2B5EF4-FFF2-40B4-BE49-F238E27FC236}">
-                <a16:creationId xmlns:a16="http://schemas.microsoft.com/office/drawing/2014/main" id="{9F89B982-51DA-4A7B-B50E-BA08031E2C12}"/>
+                <a16:creationId xmlns:a16="http://schemas.microsoft.com/office/drawing/2014/main" xmlns="" id="{9F89B982-51DA-4A7B-B50E-BA08031E2C12}"/>
               </a:ext>
             </a:extLst>
           </p:cNvPr>
@@ -35260,7 +35360,7 @@
           <p:cNvPr id="15" name="Rectangle 14">
             <a:extLst>
               <a:ext uri="{FF2B5EF4-FFF2-40B4-BE49-F238E27FC236}">
-                <a16:creationId xmlns:a16="http://schemas.microsoft.com/office/drawing/2014/main" id="{4F318F00-3DF3-4DD0-9F9C-3D2FB2746086}"/>
+                <a16:creationId xmlns:a16="http://schemas.microsoft.com/office/drawing/2014/main" xmlns="" id="{4F318F00-3DF3-4DD0-9F9C-3D2FB2746086}"/>
               </a:ext>
             </a:extLst>
           </p:cNvPr>
@@ -35298,7 +35398,7 @@
           <p:cNvPr id="48" name="Rectangle 47">
             <a:extLst>
               <a:ext uri="{FF2B5EF4-FFF2-40B4-BE49-F238E27FC236}">
-                <a16:creationId xmlns:a16="http://schemas.microsoft.com/office/drawing/2014/main" id="{4B4F362E-13BC-4500-8556-53A8FC39D0B9}"/>
+                <a16:creationId xmlns:a16="http://schemas.microsoft.com/office/drawing/2014/main" xmlns="" id="{4B4F362E-13BC-4500-8556-53A8FC39D0B9}"/>
               </a:ext>
             </a:extLst>
           </p:cNvPr>
@@ -35336,7 +35436,7 @@
           <p:cNvPr id="17" name="Rectangle 16">
             <a:extLst>
               <a:ext uri="{FF2B5EF4-FFF2-40B4-BE49-F238E27FC236}">
-                <a16:creationId xmlns:a16="http://schemas.microsoft.com/office/drawing/2014/main" id="{E971B6A2-9BA5-482C-991E-4489D5C190FD}"/>
+                <a16:creationId xmlns:a16="http://schemas.microsoft.com/office/drawing/2014/main" xmlns="" id="{E971B6A2-9BA5-482C-991E-4489D5C190FD}"/>
               </a:ext>
             </a:extLst>
           </p:cNvPr>
@@ -35512,7 +35612,7 @@
           <p:cNvPr id="52" name="Rectangle 51">
             <a:extLst>
               <a:ext uri="{FF2B5EF4-FFF2-40B4-BE49-F238E27FC236}">
-                <a16:creationId xmlns:a16="http://schemas.microsoft.com/office/drawing/2014/main" id="{99534692-59D2-4947-83E0-D4E8E4591FD6}"/>
+                <a16:creationId xmlns:a16="http://schemas.microsoft.com/office/drawing/2014/main" xmlns="" id="{99534692-59D2-4947-83E0-D4E8E4591FD6}"/>
               </a:ext>
             </a:extLst>
           </p:cNvPr>
@@ -35594,7 +35694,7 @@
           <p:cNvPr id="175" name="Folded Corner 14">
             <a:extLst>
               <a:ext uri="{FF2B5EF4-FFF2-40B4-BE49-F238E27FC236}">
-                <a16:creationId xmlns:a16="http://schemas.microsoft.com/office/drawing/2014/main" id="{D7925C44-E3E5-47AF-9CC8-BF6471802A70}"/>
+                <a16:creationId xmlns:a16="http://schemas.microsoft.com/office/drawing/2014/main" xmlns="" id="{D7925C44-E3E5-47AF-9CC8-BF6471802A70}"/>
               </a:ext>
             </a:extLst>
           </p:cNvPr>
@@ -35643,7 +35743,7 @@
           <p:cNvPr id="2" name="Diagram 1">
             <a:extLst>
               <a:ext uri="{FF2B5EF4-FFF2-40B4-BE49-F238E27FC236}">
-                <a16:creationId xmlns:a16="http://schemas.microsoft.com/office/drawing/2014/main" id="{214EDC3A-CB98-4BD4-86CB-C3DE5CC0A317}"/>
+                <a16:creationId xmlns:a16="http://schemas.microsoft.com/office/drawing/2014/main" xmlns="" id="{214EDC3A-CB98-4BD4-86CB-C3DE5CC0A317}"/>
               </a:ext>
             </a:extLst>
           </p:cNvPr>
@@ -35671,7 +35771,7 @@
           <p:cNvPr id="3" name="Rectangle 2">
             <a:extLst>
               <a:ext uri="{FF2B5EF4-FFF2-40B4-BE49-F238E27FC236}">
-                <a16:creationId xmlns:a16="http://schemas.microsoft.com/office/drawing/2014/main" id="{8D715EE1-32F0-4BAE-86BD-83B54B3137EB}"/>
+                <a16:creationId xmlns:a16="http://schemas.microsoft.com/office/drawing/2014/main" xmlns="" id="{8D715EE1-32F0-4BAE-86BD-83B54B3137EB}"/>
               </a:ext>
             </a:extLst>
           </p:cNvPr>
@@ -35726,7 +35826,7 @@
           <p:cNvPr id="4" name="Rectangle 3">
             <a:extLst>
               <a:ext uri="{FF2B5EF4-FFF2-40B4-BE49-F238E27FC236}">
-                <a16:creationId xmlns:a16="http://schemas.microsoft.com/office/drawing/2014/main" id="{2CBF344E-950A-4767-97FA-13FFE695BBC3}"/>
+                <a16:creationId xmlns:a16="http://schemas.microsoft.com/office/drawing/2014/main" xmlns="" id="{2CBF344E-950A-4767-97FA-13FFE695BBC3}"/>
               </a:ext>
             </a:extLst>
           </p:cNvPr>
@@ -35767,7 +35867,7 @@
           <p:cNvPr id="126" name="Rectangle 125">
             <a:extLst>
               <a:ext uri="{FF2B5EF4-FFF2-40B4-BE49-F238E27FC236}">
-                <a16:creationId xmlns:a16="http://schemas.microsoft.com/office/drawing/2014/main" id="{AFE62E66-21DE-45BB-AB76-2BCE8E9BEC95}"/>
+                <a16:creationId xmlns:a16="http://schemas.microsoft.com/office/drawing/2014/main" xmlns="" id="{AFE62E66-21DE-45BB-AB76-2BCE8E9BEC95}"/>
               </a:ext>
             </a:extLst>
           </p:cNvPr>
@@ -35815,7 +35915,7 @@
           <p:cNvPr id="128" name="Rectangle 127">
             <a:extLst>
               <a:ext uri="{FF2B5EF4-FFF2-40B4-BE49-F238E27FC236}">
-                <a16:creationId xmlns:a16="http://schemas.microsoft.com/office/drawing/2014/main" id="{57B25911-E59E-4329-B921-A0EBAE8F9C7E}"/>
+                <a16:creationId xmlns:a16="http://schemas.microsoft.com/office/drawing/2014/main" xmlns="" id="{57B25911-E59E-4329-B921-A0EBAE8F9C7E}"/>
               </a:ext>
             </a:extLst>
           </p:cNvPr>
@@ -35870,7 +35970,7 @@
           <p:cNvPr id="5" name="Rectangle 4">
             <a:extLst>
               <a:ext uri="{FF2B5EF4-FFF2-40B4-BE49-F238E27FC236}">
-                <a16:creationId xmlns:a16="http://schemas.microsoft.com/office/drawing/2014/main" id="{798B0573-B3AD-48CB-9F8F-13EC6567D0D3}"/>
+                <a16:creationId xmlns:a16="http://schemas.microsoft.com/office/drawing/2014/main" xmlns="" id="{798B0573-B3AD-48CB-9F8F-13EC6567D0D3}"/>
               </a:ext>
             </a:extLst>
           </p:cNvPr>
@@ -35965,7 +36065,7 @@
           <p:cNvPr id="6" name="Rectangle 5">
             <a:extLst>
               <a:ext uri="{FF2B5EF4-FFF2-40B4-BE49-F238E27FC236}">
-                <a16:creationId xmlns:a16="http://schemas.microsoft.com/office/drawing/2014/main" id="{2B5D63EA-C9C9-4E25-A071-89FBDD4231BE}"/>
+                <a16:creationId xmlns:a16="http://schemas.microsoft.com/office/drawing/2014/main" xmlns="" id="{2B5D63EA-C9C9-4E25-A071-89FBDD4231BE}"/>
               </a:ext>
             </a:extLst>
           </p:cNvPr>
@@ -36003,7 +36103,7 @@
           <p:cNvPr id="8" name="Rectangle 7">
             <a:extLst>
               <a:ext uri="{FF2B5EF4-FFF2-40B4-BE49-F238E27FC236}">
-                <a16:creationId xmlns:a16="http://schemas.microsoft.com/office/drawing/2014/main" id="{BE0255C1-0F86-4BC8-84D8-4B76F00785A9}"/>
+                <a16:creationId xmlns:a16="http://schemas.microsoft.com/office/drawing/2014/main" xmlns="" id="{BE0255C1-0F86-4BC8-84D8-4B76F00785A9}"/>
               </a:ext>
             </a:extLst>
           </p:cNvPr>
@@ -36044,7 +36144,7 @@
           <p:cNvPr id="9" name="Rectangle 8">
             <a:extLst>
               <a:ext uri="{FF2B5EF4-FFF2-40B4-BE49-F238E27FC236}">
-                <a16:creationId xmlns:a16="http://schemas.microsoft.com/office/drawing/2014/main" id="{CFD7F599-A36B-4AA7-86FA-23355394169C}"/>
+                <a16:creationId xmlns:a16="http://schemas.microsoft.com/office/drawing/2014/main" xmlns="" id="{CFD7F599-A36B-4AA7-86FA-23355394169C}"/>
               </a:ext>
             </a:extLst>
           </p:cNvPr>
@@ -36085,7 +36185,7 @@
           <p:cNvPr id="130" name="Rectangle 129">
             <a:extLst>
               <a:ext uri="{FF2B5EF4-FFF2-40B4-BE49-F238E27FC236}">
-                <a16:creationId xmlns:a16="http://schemas.microsoft.com/office/drawing/2014/main" id="{F21A4D44-CAD2-400B-8E2D-F8B1FEA0E5B6}"/>
+                <a16:creationId xmlns:a16="http://schemas.microsoft.com/office/drawing/2014/main" xmlns="" id="{F21A4D44-CAD2-400B-8E2D-F8B1FEA0E5B6}"/>
               </a:ext>
             </a:extLst>
           </p:cNvPr>
@@ -36126,7 +36226,7 @@
           <p:cNvPr id="131" name="Rectangle 130">
             <a:extLst>
               <a:ext uri="{FF2B5EF4-FFF2-40B4-BE49-F238E27FC236}">
-                <a16:creationId xmlns:a16="http://schemas.microsoft.com/office/drawing/2014/main" id="{7ECE62BA-C5A0-4279-B504-BAC3C2C73E71}"/>
+                <a16:creationId xmlns:a16="http://schemas.microsoft.com/office/drawing/2014/main" xmlns="" id="{7ECE62BA-C5A0-4279-B504-BAC3C2C73E71}"/>
               </a:ext>
             </a:extLst>
           </p:cNvPr>
@@ -36178,7 +36278,7 @@
           <p:cNvPr id="10" name="Cube 9">
             <a:extLst>
               <a:ext uri="{FF2B5EF4-FFF2-40B4-BE49-F238E27FC236}">
-                <a16:creationId xmlns:a16="http://schemas.microsoft.com/office/drawing/2014/main" id="{F871D032-A4AE-406F-A80A-38A8B0BED40E}"/>
+                <a16:creationId xmlns:a16="http://schemas.microsoft.com/office/drawing/2014/main" xmlns="" id="{F871D032-A4AE-406F-A80A-38A8B0BED40E}"/>
               </a:ext>
             </a:extLst>
           </p:cNvPr>
@@ -36238,7 +36338,7 @@
           <p:cNvPr id="133" name="Folded Corner 14">
             <a:extLst>
               <a:ext uri="{FF2B5EF4-FFF2-40B4-BE49-F238E27FC236}">
-                <a16:creationId xmlns:a16="http://schemas.microsoft.com/office/drawing/2014/main" id="{DDDEB2FA-CB2B-41A1-82A4-458F3DD3A4D7}"/>
+                <a16:creationId xmlns:a16="http://schemas.microsoft.com/office/drawing/2014/main" xmlns="" id="{DDDEB2FA-CB2B-41A1-82A4-458F3DD3A4D7}"/>
               </a:ext>
             </a:extLst>
           </p:cNvPr>
@@ -36287,7 +36387,7 @@
           <p:cNvPr id="11" name="Rectangle 10">
             <a:extLst>
               <a:ext uri="{FF2B5EF4-FFF2-40B4-BE49-F238E27FC236}">
-                <a16:creationId xmlns:a16="http://schemas.microsoft.com/office/drawing/2014/main" id="{F638F98D-376A-4707-AFEB-3116E75204BA}"/>
+                <a16:creationId xmlns:a16="http://schemas.microsoft.com/office/drawing/2014/main" xmlns="" id="{F638F98D-376A-4707-AFEB-3116E75204BA}"/>
               </a:ext>
             </a:extLst>
           </p:cNvPr>
@@ -36342,7 +36442,7 @@
           <p:cNvPr id="18" name="Picture 17" descr="A close up of an animal&#10;&#10;Description generated with high confidence">
             <a:extLst>
               <a:ext uri="{FF2B5EF4-FFF2-40B4-BE49-F238E27FC236}">
-                <a16:creationId xmlns:a16="http://schemas.microsoft.com/office/drawing/2014/main" id="{4132CF14-571D-4435-9A41-BF9FAEA4439C}"/>
+                <a16:creationId xmlns:a16="http://schemas.microsoft.com/office/drawing/2014/main" xmlns="" id="{4132CF14-571D-4435-9A41-BF9FAEA4439C}"/>
               </a:ext>
             </a:extLst>
           </p:cNvPr>
@@ -36378,7 +36478,7 @@
           <p:cNvPr id="19" name="Rectangle 18">
             <a:extLst>
               <a:ext uri="{FF2B5EF4-FFF2-40B4-BE49-F238E27FC236}">
-                <a16:creationId xmlns:a16="http://schemas.microsoft.com/office/drawing/2014/main" id="{1047E73B-15B2-47B6-9C78-BCDB588C3019}"/>
+                <a16:creationId xmlns:a16="http://schemas.microsoft.com/office/drawing/2014/main" xmlns="" id="{1047E73B-15B2-47B6-9C78-BCDB588C3019}"/>
               </a:ext>
             </a:extLst>
           </p:cNvPr>
@@ -36420,7 +36520,7 @@
           <p:cNvPr id="31" name="Straight Arrow Connector 30">
             <a:extLst>
               <a:ext uri="{FF2B5EF4-FFF2-40B4-BE49-F238E27FC236}">
-                <a16:creationId xmlns:a16="http://schemas.microsoft.com/office/drawing/2014/main" id="{E3ACBD9C-E946-4C83-82A0-7C79817A1EB9}"/>
+                <a16:creationId xmlns:a16="http://schemas.microsoft.com/office/drawing/2014/main" xmlns="" id="{E3ACBD9C-E946-4C83-82A0-7C79817A1EB9}"/>
               </a:ext>
             </a:extLst>
           </p:cNvPr>
@@ -36463,7 +36563,7 @@
           <p:cNvPr id="32" name="Rectangle 31">
             <a:extLst>
               <a:ext uri="{FF2B5EF4-FFF2-40B4-BE49-F238E27FC236}">
-                <a16:creationId xmlns:a16="http://schemas.microsoft.com/office/drawing/2014/main" id="{DAD5A302-C880-4E8C-9E1D-640CD5CF0CBE}"/>
+                <a16:creationId xmlns:a16="http://schemas.microsoft.com/office/drawing/2014/main" xmlns="" id="{DAD5A302-C880-4E8C-9E1D-640CD5CF0CBE}"/>
               </a:ext>
             </a:extLst>
           </p:cNvPr>
@@ -36501,7 +36601,7 @@
           <p:cNvPr id="135" name="Rectangle 134">
             <a:extLst>
               <a:ext uri="{FF2B5EF4-FFF2-40B4-BE49-F238E27FC236}">
-                <a16:creationId xmlns:a16="http://schemas.microsoft.com/office/drawing/2014/main" id="{9D239E65-7C2B-4AD5-A1F4-F716E33EF928}"/>
+                <a16:creationId xmlns:a16="http://schemas.microsoft.com/office/drawing/2014/main" xmlns="" id="{9D239E65-7C2B-4AD5-A1F4-F716E33EF928}"/>
               </a:ext>
             </a:extLst>
           </p:cNvPr>
@@ -36539,7 +36639,7 @@
           <p:cNvPr id="146" name="Rectangle 145">
             <a:extLst>
               <a:ext uri="{FF2B5EF4-FFF2-40B4-BE49-F238E27FC236}">
-                <a16:creationId xmlns:a16="http://schemas.microsoft.com/office/drawing/2014/main" id="{02CB9ACB-9175-4592-A0A2-5F6EBA3916AA}"/>
+                <a16:creationId xmlns:a16="http://schemas.microsoft.com/office/drawing/2014/main" xmlns="" id="{02CB9ACB-9175-4592-A0A2-5F6EBA3916AA}"/>
               </a:ext>
             </a:extLst>
           </p:cNvPr>
@@ -36577,7 +36677,7 @@
           <p:cNvPr id="33" name="Rectangle 32">
             <a:extLst>
               <a:ext uri="{FF2B5EF4-FFF2-40B4-BE49-F238E27FC236}">
-                <a16:creationId xmlns:a16="http://schemas.microsoft.com/office/drawing/2014/main" id="{A5445AD6-3298-4B4A-BFAA-36E271EE36D3}"/>
+                <a16:creationId xmlns:a16="http://schemas.microsoft.com/office/drawing/2014/main" xmlns="" id="{A5445AD6-3298-4B4A-BFAA-36E271EE36D3}"/>
               </a:ext>
             </a:extLst>
           </p:cNvPr>
@@ -36618,7 +36718,7 @@
           <p:cNvPr id="148" name="Cube 147">
             <a:extLst>
               <a:ext uri="{FF2B5EF4-FFF2-40B4-BE49-F238E27FC236}">
-                <a16:creationId xmlns:a16="http://schemas.microsoft.com/office/drawing/2014/main" id="{3C1DB64A-F95E-4BBA-AAB7-E382DEE6D3AD}"/>
+                <a16:creationId xmlns:a16="http://schemas.microsoft.com/office/drawing/2014/main" xmlns="" id="{3C1DB64A-F95E-4BBA-AAB7-E382DEE6D3AD}"/>
               </a:ext>
             </a:extLst>
           </p:cNvPr>
@@ -36678,7 +36778,7 @@
           <p:cNvPr id="149" name="Rectangle 148">
             <a:extLst>
               <a:ext uri="{FF2B5EF4-FFF2-40B4-BE49-F238E27FC236}">
-                <a16:creationId xmlns:a16="http://schemas.microsoft.com/office/drawing/2014/main" id="{8ADE2C1F-3705-4E1D-9D1A-CEFA5BBDC4AE}"/>
+                <a16:creationId xmlns:a16="http://schemas.microsoft.com/office/drawing/2014/main" xmlns="" id="{8ADE2C1F-3705-4E1D-9D1A-CEFA5BBDC4AE}"/>
               </a:ext>
             </a:extLst>
           </p:cNvPr>
@@ -36719,7 +36819,7 @@
           <p:cNvPr id="152" name="Folded Corner 14">
             <a:extLst>
               <a:ext uri="{FF2B5EF4-FFF2-40B4-BE49-F238E27FC236}">
-                <a16:creationId xmlns:a16="http://schemas.microsoft.com/office/drawing/2014/main" id="{E9E59862-8121-45E9-B034-254AA5F85A9E}"/>
+                <a16:creationId xmlns:a16="http://schemas.microsoft.com/office/drawing/2014/main" xmlns="" id="{E9E59862-8121-45E9-B034-254AA5F85A9E}"/>
               </a:ext>
             </a:extLst>
           </p:cNvPr>
@@ -36768,7 +36868,7 @@
           <p:cNvPr id="159" name="Rectangle 158">
             <a:extLst>
               <a:ext uri="{FF2B5EF4-FFF2-40B4-BE49-F238E27FC236}">
-                <a16:creationId xmlns:a16="http://schemas.microsoft.com/office/drawing/2014/main" id="{9189909A-C973-403D-AC10-F162C1C50251}"/>
+                <a16:creationId xmlns:a16="http://schemas.microsoft.com/office/drawing/2014/main" xmlns="" id="{9189909A-C973-403D-AC10-F162C1C50251}"/>
               </a:ext>
             </a:extLst>
           </p:cNvPr>
@@ -36823,7 +36923,7 @@
           <p:cNvPr id="160" name="Straight Arrow Connector 159">
             <a:extLst>
               <a:ext uri="{FF2B5EF4-FFF2-40B4-BE49-F238E27FC236}">
-                <a16:creationId xmlns:a16="http://schemas.microsoft.com/office/drawing/2014/main" id="{4104DBBE-32EA-425C-8DB2-CA3E800CA64E}"/>
+                <a16:creationId xmlns:a16="http://schemas.microsoft.com/office/drawing/2014/main" xmlns="" id="{4104DBBE-32EA-425C-8DB2-CA3E800CA64E}"/>
               </a:ext>
             </a:extLst>
           </p:cNvPr>
@@ -36868,7 +36968,7 @@
           <p:cNvPr id="163" name="Cube 162">
             <a:extLst>
               <a:ext uri="{FF2B5EF4-FFF2-40B4-BE49-F238E27FC236}">
-                <a16:creationId xmlns:a16="http://schemas.microsoft.com/office/drawing/2014/main" id="{DCC62459-FE7B-48A9-A2FB-D56CDC251746}"/>
+                <a16:creationId xmlns:a16="http://schemas.microsoft.com/office/drawing/2014/main" xmlns="" id="{DCC62459-FE7B-48A9-A2FB-D56CDC251746}"/>
               </a:ext>
             </a:extLst>
           </p:cNvPr>
@@ -36928,7 +37028,7 @@
           <p:cNvPr id="164" name="Rectangle 163">
             <a:extLst>
               <a:ext uri="{FF2B5EF4-FFF2-40B4-BE49-F238E27FC236}">
-                <a16:creationId xmlns:a16="http://schemas.microsoft.com/office/drawing/2014/main" id="{A17E061D-69B0-4C5E-9A8B-BA722BA64CA4}"/>
+                <a16:creationId xmlns:a16="http://schemas.microsoft.com/office/drawing/2014/main" xmlns="" id="{A17E061D-69B0-4C5E-9A8B-BA722BA64CA4}"/>
               </a:ext>
             </a:extLst>
           </p:cNvPr>
@@ -36969,7 +37069,7 @@
           <p:cNvPr id="165" name="Folded Corner 14">
             <a:extLst>
               <a:ext uri="{FF2B5EF4-FFF2-40B4-BE49-F238E27FC236}">
-                <a16:creationId xmlns:a16="http://schemas.microsoft.com/office/drawing/2014/main" id="{E1EF52F6-55FE-4BD8-A276-7961F4C14406}"/>
+                <a16:creationId xmlns:a16="http://schemas.microsoft.com/office/drawing/2014/main" xmlns="" id="{E1EF52F6-55FE-4BD8-A276-7961F4C14406}"/>
               </a:ext>
             </a:extLst>
           </p:cNvPr>
@@ -37018,7 +37118,7 @@
           <p:cNvPr id="170" name="Rectangle 169">
             <a:extLst>
               <a:ext uri="{FF2B5EF4-FFF2-40B4-BE49-F238E27FC236}">
-                <a16:creationId xmlns:a16="http://schemas.microsoft.com/office/drawing/2014/main" id="{CD422137-5DD0-430D-A335-3434D32EC278}"/>
+                <a16:creationId xmlns:a16="http://schemas.microsoft.com/office/drawing/2014/main" xmlns="" id="{CD422137-5DD0-430D-A335-3434D32EC278}"/>
               </a:ext>
             </a:extLst>
           </p:cNvPr>
@@ -37070,7 +37170,7 @@
           <p:cNvPr id="171" name="Straight Arrow Connector 170">
             <a:extLst>
               <a:ext uri="{FF2B5EF4-FFF2-40B4-BE49-F238E27FC236}">
-                <a16:creationId xmlns:a16="http://schemas.microsoft.com/office/drawing/2014/main" id="{26251F63-0F9B-46FC-B288-264E1954D111}"/>
+                <a16:creationId xmlns:a16="http://schemas.microsoft.com/office/drawing/2014/main" xmlns="" id="{26251F63-0F9B-46FC-B288-264E1954D111}"/>
               </a:ext>
             </a:extLst>
           </p:cNvPr>
@@ -37115,7 +37215,7 @@
           <p:cNvPr id="172" name="Folded Corner 14">
             <a:extLst>
               <a:ext uri="{FF2B5EF4-FFF2-40B4-BE49-F238E27FC236}">
-                <a16:creationId xmlns:a16="http://schemas.microsoft.com/office/drawing/2014/main" id="{2198A703-2FEE-48EA-B0B0-656B73C08CA7}"/>
+                <a16:creationId xmlns:a16="http://schemas.microsoft.com/office/drawing/2014/main" xmlns="" id="{2198A703-2FEE-48EA-B0B0-656B73C08CA7}"/>
               </a:ext>
             </a:extLst>
           </p:cNvPr>
@@ -37164,7 +37264,7 @@
           <p:cNvPr id="173" name="Rectangle 172">
             <a:extLst>
               <a:ext uri="{FF2B5EF4-FFF2-40B4-BE49-F238E27FC236}">
-                <a16:creationId xmlns:a16="http://schemas.microsoft.com/office/drawing/2014/main" id="{FCC85E64-312F-4851-B756-3019DD6FA99F}"/>
+                <a16:creationId xmlns:a16="http://schemas.microsoft.com/office/drawing/2014/main" xmlns="" id="{FCC85E64-312F-4851-B756-3019DD6FA99F}"/>
               </a:ext>
             </a:extLst>
           </p:cNvPr>
@@ -37216,7 +37316,7 @@
           <p:cNvPr id="174" name="Straight Arrow Connector 173">
             <a:extLst>
               <a:ext uri="{FF2B5EF4-FFF2-40B4-BE49-F238E27FC236}">
-                <a16:creationId xmlns:a16="http://schemas.microsoft.com/office/drawing/2014/main" id="{518C8625-6187-4D33-A1AC-9208CA68F263}"/>
+                <a16:creationId xmlns:a16="http://schemas.microsoft.com/office/drawing/2014/main" xmlns="" id="{518C8625-6187-4D33-A1AC-9208CA68F263}"/>
               </a:ext>
             </a:extLst>
           </p:cNvPr>
@@ -37261,7 +37361,7 @@
           <p:cNvPr id="39" name="Rectangle 38">
             <a:extLst>
               <a:ext uri="{FF2B5EF4-FFF2-40B4-BE49-F238E27FC236}">
-                <a16:creationId xmlns:a16="http://schemas.microsoft.com/office/drawing/2014/main" id="{D01A5617-56DC-4B84-AF69-7027F4C7E7B3}"/>
+                <a16:creationId xmlns:a16="http://schemas.microsoft.com/office/drawing/2014/main" xmlns="" id="{D01A5617-56DC-4B84-AF69-7027F4C7E7B3}"/>
               </a:ext>
             </a:extLst>
           </p:cNvPr>
@@ -37316,7 +37416,7 @@
           <p:cNvPr id="40" name="Arrow: Right 39">
             <a:extLst>
               <a:ext uri="{FF2B5EF4-FFF2-40B4-BE49-F238E27FC236}">
-                <a16:creationId xmlns:a16="http://schemas.microsoft.com/office/drawing/2014/main" id="{AB7C45BA-0078-4BA1-A2B3-BC9A66ACD955}"/>
+                <a16:creationId xmlns:a16="http://schemas.microsoft.com/office/drawing/2014/main" xmlns="" id="{AB7C45BA-0078-4BA1-A2B3-BC9A66ACD955}"/>
               </a:ext>
             </a:extLst>
           </p:cNvPr>
@@ -37368,7 +37468,7 @@
           <p:cNvPr id="12" name="Picture 11" descr="A picture containing outdoor object&#10;&#10;Description generated with high confidence">
             <a:extLst>
               <a:ext uri="{FF2B5EF4-FFF2-40B4-BE49-F238E27FC236}">
-                <a16:creationId xmlns:a16="http://schemas.microsoft.com/office/drawing/2014/main" id="{684713F9-9ECF-4663-A027-A6113FA71893}"/>
+                <a16:creationId xmlns:a16="http://schemas.microsoft.com/office/drawing/2014/main" xmlns="" id="{684713F9-9ECF-4663-A027-A6113FA71893}"/>
               </a:ext>
             </a:extLst>
           </p:cNvPr>
@@ -37404,7 +37504,7 @@
           <p:cNvPr id="42" name="Straight Arrow Connector 41">
             <a:extLst>
               <a:ext uri="{FF2B5EF4-FFF2-40B4-BE49-F238E27FC236}">
-                <a16:creationId xmlns:a16="http://schemas.microsoft.com/office/drawing/2014/main" id="{AE9F3928-6603-4F44-B87F-D5568E789A51}"/>
+                <a16:creationId xmlns:a16="http://schemas.microsoft.com/office/drawing/2014/main" xmlns="" id="{AE9F3928-6603-4F44-B87F-D5568E789A51}"/>
               </a:ext>
             </a:extLst>
           </p:cNvPr>
@@ -37449,7 +37549,7 @@
           <p:cNvPr id="13" name="Rectangle 12">
             <a:extLst>
               <a:ext uri="{FF2B5EF4-FFF2-40B4-BE49-F238E27FC236}">
-                <a16:creationId xmlns:a16="http://schemas.microsoft.com/office/drawing/2014/main" id="{BE9850A2-3BDB-4A68-BCBD-94C436747806}"/>
+                <a16:creationId xmlns:a16="http://schemas.microsoft.com/office/drawing/2014/main" xmlns="" id="{BE9850A2-3BDB-4A68-BCBD-94C436747806}"/>
               </a:ext>
             </a:extLst>
           </p:cNvPr>
@@ -37515,7 +37615,7 @@
           <p:cNvPr id="44" name="Folded Corner 14">
             <a:extLst>
               <a:ext uri="{FF2B5EF4-FFF2-40B4-BE49-F238E27FC236}">
-                <a16:creationId xmlns:a16="http://schemas.microsoft.com/office/drawing/2014/main" id="{048A78E4-38F4-403F-B262-3393CB25026A}"/>
+                <a16:creationId xmlns:a16="http://schemas.microsoft.com/office/drawing/2014/main" xmlns="" id="{048A78E4-38F4-403F-B262-3393CB25026A}"/>
               </a:ext>
             </a:extLst>
           </p:cNvPr>
@@ -37564,7 +37664,7 @@
           <p:cNvPr id="45" name="Rectangle 44">
             <a:extLst>
               <a:ext uri="{FF2B5EF4-FFF2-40B4-BE49-F238E27FC236}">
-                <a16:creationId xmlns:a16="http://schemas.microsoft.com/office/drawing/2014/main" id="{B6EF94B6-C2BD-4454-B081-DC4CDC0FA78B}"/>
+                <a16:creationId xmlns:a16="http://schemas.microsoft.com/office/drawing/2014/main" xmlns="" id="{B6EF94B6-C2BD-4454-B081-DC4CDC0FA78B}"/>
               </a:ext>
             </a:extLst>
           </p:cNvPr>
@@ -37616,7 +37716,7 @@
           <p:cNvPr id="14" name="Rectangle 13">
             <a:extLst>
               <a:ext uri="{FF2B5EF4-FFF2-40B4-BE49-F238E27FC236}">
-                <a16:creationId xmlns:a16="http://schemas.microsoft.com/office/drawing/2014/main" id="{9F89B982-51DA-4A7B-B50E-BA08031E2C12}"/>
+                <a16:creationId xmlns:a16="http://schemas.microsoft.com/office/drawing/2014/main" xmlns="" id="{9F89B982-51DA-4A7B-B50E-BA08031E2C12}"/>
               </a:ext>
             </a:extLst>
           </p:cNvPr>
@@ -37654,7 +37754,7 @@
           <p:cNvPr id="15" name="Rectangle 14">
             <a:extLst>
               <a:ext uri="{FF2B5EF4-FFF2-40B4-BE49-F238E27FC236}">
-                <a16:creationId xmlns:a16="http://schemas.microsoft.com/office/drawing/2014/main" id="{4F318F00-3DF3-4DD0-9F9C-3D2FB2746086}"/>
+                <a16:creationId xmlns:a16="http://schemas.microsoft.com/office/drawing/2014/main" xmlns="" id="{4F318F00-3DF3-4DD0-9F9C-3D2FB2746086}"/>
               </a:ext>
             </a:extLst>
           </p:cNvPr>
@@ -37692,7 +37792,7 @@
           <p:cNvPr id="48" name="Rectangle 47">
             <a:extLst>
               <a:ext uri="{FF2B5EF4-FFF2-40B4-BE49-F238E27FC236}">
-                <a16:creationId xmlns:a16="http://schemas.microsoft.com/office/drawing/2014/main" id="{4B4F362E-13BC-4500-8556-53A8FC39D0B9}"/>
+                <a16:creationId xmlns:a16="http://schemas.microsoft.com/office/drawing/2014/main" xmlns="" id="{4B4F362E-13BC-4500-8556-53A8FC39D0B9}"/>
               </a:ext>
             </a:extLst>
           </p:cNvPr>
@@ -37730,7 +37830,7 @@
           <p:cNvPr id="17" name="Rectangle 16">
             <a:extLst>
               <a:ext uri="{FF2B5EF4-FFF2-40B4-BE49-F238E27FC236}">
-                <a16:creationId xmlns:a16="http://schemas.microsoft.com/office/drawing/2014/main" id="{E971B6A2-9BA5-482C-991E-4489D5C190FD}"/>
+                <a16:creationId xmlns:a16="http://schemas.microsoft.com/office/drawing/2014/main" xmlns="" id="{E971B6A2-9BA5-482C-991E-4489D5C190FD}"/>
               </a:ext>
             </a:extLst>
           </p:cNvPr>
@@ -37814,7 +37914,7 @@
           <p:cNvPr id="52" name="Rectangle 51">
             <a:extLst>
               <a:ext uri="{FF2B5EF4-FFF2-40B4-BE49-F238E27FC236}">
-                <a16:creationId xmlns:a16="http://schemas.microsoft.com/office/drawing/2014/main" id="{99534692-59D2-4947-83E0-D4E8E4591FD6}"/>
+                <a16:creationId xmlns:a16="http://schemas.microsoft.com/office/drawing/2014/main" xmlns="" id="{99534692-59D2-4947-83E0-D4E8E4591FD6}"/>
               </a:ext>
             </a:extLst>
           </p:cNvPr>
@@ -37896,7 +37996,7 @@
           <p:cNvPr id="175" name="Folded Corner 14">
             <a:extLst>
               <a:ext uri="{FF2B5EF4-FFF2-40B4-BE49-F238E27FC236}">
-                <a16:creationId xmlns:a16="http://schemas.microsoft.com/office/drawing/2014/main" id="{D7925C44-E3E5-47AF-9CC8-BF6471802A70}"/>
+                <a16:creationId xmlns:a16="http://schemas.microsoft.com/office/drawing/2014/main" xmlns="" id="{D7925C44-E3E5-47AF-9CC8-BF6471802A70}"/>
               </a:ext>
             </a:extLst>
           </p:cNvPr>
@@ -37945,7 +38045,7 @@
           <p:cNvPr id="2" name="Diagram 1">
             <a:extLst>
               <a:ext uri="{FF2B5EF4-FFF2-40B4-BE49-F238E27FC236}">
-                <a16:creationId xmlns:a16="http://schemas.microsoft.com/office/drawing/2014/main" id="{214EDC3A-CB98-4BD4-86CB-C3DE5CC0A317}"/>
+                <a16:creationId xmlns:a16="http://schemas.microsoft.com/office/drawing/2014/main" xmlns="" id="{214EDC3A-CB98-4BD4-86CB-C3DE5CC0A317}"/>
               </a:ext>
             </a:extLst>
           </p:cNvPr>
@@ -37973,7 +38073,7 @@
           <p:cNvPr id="3" name="Rectangle 2">
             <a:extLst>
               <a:ext uri="{FF2B5EF4-FFF2-40B4-BE49-F238E27FC236}">
-                <a16:creationId xmlns:a16="http://schemas.microsoft.com/office/drawing/2014/main" id="{8D715EE1-32F0-4BAE-86BD-83B54B3137EB}"/>
+                <a16:creationId xmlns:a16="http://schemas.microsoft.com/office/drawing/2014/main" xmlns="" id="{8D715EE1-32F0-4BAE-86BD-83B54B3137EB}"/>
               </a:ext>
             </a:extLst>
           </p:cNvPr>
@@ -38037,7 +38137,7 @@
           <p:cNvPr id="4" name="Rectangle 3">
             <a:extLst>
               <a:ext uri="{FF2B5EF4-FFF2-40B4-BE49-F238E27FC236}">
-                <a16:creationId xmlns:a16="http://schemas.microsoft.com/office/drawing/2014/main" id="{2CBF344E-950A-4767-97FA-13FFE695BBC3}"/>
+                <a16:creationId xmlns:a16="http://schemas.microsoft.com/office/drawing/2014/main" xmlns="" id="{2CBF344E-950A-4767-97FA-13FFE695BBC3}"/>
               </a:ext>
             </a:extLst>
           </p:cNvPr>
@@ -38078,7 +38178,7 @@
           <p:cNvPr id="126" name="Rectangle 125">
             <a:extLst>
               <a:ext uri="{FF2B5EF4-FFF2-40B4-BE49-F238E27FC236}">
-                <a16:creationId xmlns:a16="http://schemas.microsoft.com/office/drawing/2014/main" id="{AFE62E66-21DE-45BB-AB76-2BCE8E9BEC95}"/>
+                <a16:creationId xmlns:a16="http://schemas.microsoft.com/office/drawing/2014/main" xmlns="" id="{AFE62E66-21DE-45BB-AB76-2BCE8E9BEC95}"/>
               </a:ext>
             </a:extLst>
           </p:cNvPr>
@@ -38139,7 +38239,7 @@
           <p:cNvPr id="128" name="Rectangle 127">
             <a:extLst>
               <a:ext uri="{FF2B5EF4-FFF2-40B4-BE49-F238E27FC236}">
-                <a16:creationId xmlns:a16="http://schemas.microsoft.com/office/drawing/2014/main" id="{57B25911-E59E-4329-B921-A0EBAE8F9C7E}"/>
+                <a16:creationId xmlns:a16="http://schemas.microsoft.com/office/drawing/2014/main" xmlns="" id="{57B25911-E59E-4329-B921-A0EBAE8F9C7E}"/>
               </a:ext>
             </a:extLst>
           </p:cNvPr>
@@ -38190,7 +38290,7 @@
           <p:cNvPr id="5" name="Rectangle 4">
             <a:extLst>
               <a:ext uri="{FF2B5EF4-FFF2-40B4-BE49-F238E27FC236}">
-                <a16:creationId xmlns:a16="http://schemas.microsoft.com/office/drawing/2014/main" id="{798B0573-B3AD-48CB-9F8F-13EC6567D0D3}"/>
+                <a16:creationId xmlns:a16="http://schemas.microsoft.com/office/drawing/2014/main" xmlns="" id="{798B0573-B3AD-48CB-9F8F-13EC6567D0D3}"/>
               </a:ext>
             </a:extLst>
           </p:cNvPr>
@@ -38285,7 +38385,7 @@
           <p:cNvPr id="6" name="Rectangle 5">
             <a:extLst>
               <a:ext uri="{FF2B5EF4-FFF2-40B4-BE49-F238E27FC236}">
-                <a16:creationId xmlns:a16="http://schemas.microsoft.com/office/drawing/2014/main" id="{2B5D63EA-C9C9-4E25-A071-89FBDD4231BE}"/>
+                <a16:creationId xmlns:a16="http://schemas.microsoft.com/office/drawing/2014/main" xmlns="" id="{2B5D63EA-C9C9-4E25-A071-89FBDD4231BE}"/>
               </a:ext>
             </a:extLst>
           </p:cNvPr>
@@ -38323,7 +38423,7 @@
           <p:cNvPr id="8" name="Rectangle 7">
             <a:extLst>
               <a:ext uri="{FF2B5EF4-FFF2-40B4-BE49-F238E27FC236}">
-                <a16:creationId xmlns:a16="http://schemas.microsoft.com/office/drawing/2014/main" id="{BE0255C1-0F86-4BC8-84D8-4B76F00785A9}"/>
+                <a16:creationId xmlns:a16="http://schemas.microsoft.com/office/drawing/2014/main" xmlns="" id="{BE0255C1-0F86-4BC8-84D8-4B76F00785A9}"/>
               </a:ext>
             </a:extLst>
           </p:cNvPr>
@@ -38364,7 +38464,7 @@
           <p:cNvPr id="9" name="Rectangle 8">
             <a:extLst>
               <a:ext uri="{FF2B5EF4-FFF2-40B4-BE49-F238E27FC236}">
-                <a16:creationId xmlns:a16="http://schemas.microsoft.com/office/drawing/2014/main" id="{CFD7F599-A36B-4AA7-86FA-23355394169C}"/>
+                <a16:creationId xmlns:a16="http://schemas.microsoft.com/office/drawing/2014/main" xmlns="" id="{CFD7F599-A36B-4AA7-86FA-23355394169C}"/>
               </a:ext>
             </a:extLst>
           </p:cNvPr>
@@ -38405,7 +38505,7 @@
           <p:cNvPr id="130" name="Rectangle 129">
             <a:extLst>
               <a:ext uri="{FF2B5EF4-FFF2-40B4-BE49-F238E27FC236}">
-                <a16:creationId xmlns:a16="http://schemas.microsoft.com/office/drawing/2014/main" id="{F21A4D44-CAD2-400B-8E2D-F8B1FEA0E5B6}"/>
+                <a16:creationId xmlns:a16="http://schemas.microsoft.com/office/drawing/2014/main" xmlns="" id="{F21A4D44-CAD2-400B-8E2D-F8B1FEA0E5B6}"/>
               </a:ext>
             </a:extLst>
           </p:cNvPr>
@@ -38446,7 +38546,7 @@
           <p:cNvPr id="131" name="Rectangle 130">
             <a:extLst>
               <a:ext uri="{FF2B5EF4-FFF2-40B4-BE49-F238E27FC236}">
-                <a16:creationId xmlns:a16="http://schemas.microsoft.com/office/drawing/2014/main" id="{7ECE62BA-C5A0-4279-B504-BAC3C2C73E71}"/>
+                <a16:creationId xmlns:a16="http://schemas.microsoft.com/office/drawing/2014/main" xmlns="" id="{7ECE62BA-C5A0-4279-B504-BAC3C2C73E71}"/>
               </a:ext>
             </a:extLst>
           </p:cNvPr>
@@ -38498,7 +38598,7 @@
           <p:cNvPr id="10" name="Cube 9">
             <a:extLst>
               <a:ext uri="{FF2B5EF4-FFF2-40B4-BE49-F238E27FC236}">
-                <a16:creationId xmlns:a16="http://schemas.microsoft.com/office/drawing/2014/main" id="{F871D032-A4AE-406F-A80A-38A8B0BED40E}"/>
+                <a16:creationId xmlns:a16="http://schemas.microsoft.com/office/drawing/2014/main" xmlns="" id="{F871D032-A4AE-406F-A80A-38A8B0BED40E}"/>
               </a:ext>
             </a:extLst>
           </p:cNvPr>
@@ -38558,7 +38658,7 @@
           <p:cNvPr id="133" name="Folded Corner 14">
             <a:extLst>
               <a:ext uri="{FF2B5EF4-FFF2-40B4-BE49-F238E27FC236}">
-                <a16:creationId xmlns:a16="http://schemas.microsoft.com/office/drawing/2014/main" id="{DDDEB2FA-CB2B-41A1-82A4-458F3DD3A4D7}"/>
+                <a16:creationId xmlns:a16="http://schemas.microsoft.com/office/drawing/2014/main" xmlns="" id="{DDDEB2FA-CB2B-41A1-82A4-458F3DD3A4D7}"/>
               </a:ext>
             </a:extLst>
           </p:cNvPr>
@@ -38607,7 +38707,7 @@
           <p:cNvPr id="11" name="Rectangle 10">
             <a:extLst>
               <a:ext uri="{FF2B5EF4-FFF2-40B4-BE49-F238E27FC236}">
-                <a16:creationId xmlns:a16="http://schemas.microsoft.com/office/drawing/2014/main" id="{F638F98D-376A-4707-AFEB-3116E75204BA}"/>
+                <a16:creationId xmlns:a16="http://schemas.microsoft.com/office/drawing/2014/main" xmlns="" id="{F638F98D-376A-4707-AFEB-3116E75204BA}"/>
               </a:ext>
             </a:extLst>
           </p:cNvPr>
@@ -38662,7 +38762,7 @@
           <p:cNvPr id="18" name="Picture 17" descr="A close up of an animal&#10;&#10;Description generated with high confidence">
             <a:extLst>
               <a:ext uri="{FF2B5EF4-FFF2-40B4-BE49-F238E27FC236}">
-                <a16:creationId xmlns:a16="http://schemas.microsoft.com/office/drawing/2014/main" id="{4132CF14-571D-4435-9A41-BF9FAEA4439C}"/>
+                <a16:creationId xmlns:a16="http://schemas.microsoft.com/office/drawing/2014/main" xmlns="" id="{4132CF14-571D-4435-9A41-BF9FAEA4439C}"/>
               </a:ext>
             </a:extLst>
           </p:cNvPr>
@@ -38698,7 +38798,7 @@
           <p:cNvPr id="19" name="Rectangle 18">
             <a:extLst>
               <a:ext uri="{FF2B5EF4-FFF2-40B4-BE49-F238E27FC236}">
-                <a16:creationId xmlns:a16="http://schemas.microsoft.com/office/drawing/2014/main" id="{1047E73B-15B2-47B6-9C78-BCDB588C3019}"/>
+                <a16:creationId xmlns:a16="http://schemas.microsoft.com/office/drawing/2014/main" xmlns="" id="{1047E73B-15B2-47B6-9C78-BCDB588C3019}"/>
               </a:ext>
             </a:extLst>
           </p:cNvPr>
@@ -38740,7 +38840,7 @@
           <p:cNvPr id="31" name="Straight Arrow Connector 30">
             <a:extLst>
               <a:ext uri="{FF2B5EF4-FFF2-40B4-BE49-F238E27FC236}">
-                <a16:creationId xmlns:a16="http://schemas.microsoft.com/office/drawing/2014/main" id="{E3ACBD9C-E946-4C83-82A0-7C79817A1EB9}"/>
+                <a16:creationId xmlns:a16="http://schemas.microsoft.com/office/drawing/2014/main" xmlns="" id="{E3ACBD9C-E946-4C83-82A0-7C79817A1EB9}"/>
               </a:ext>
             </a:extLst>
           </p:cNvPr>
@@ -38783,7 +38883,7 @@
           <p:cNvPr id="32" name="Rectangle 31">
             <a:extLst>
               <a:ext uri="{FF2B5EF4-FFF2-40B4-BE49-F238E27FC236}">
-                <a16:creationId xmlns:a16="http://schemas.microsoft.com/office/drawing/2014/main" id="{DAD5A302-C880-4E8C-9E1D-640CD5CF0CBE}"/>
+                <a16:creationId xmlns:a16="http://schemas.microsoft.com/office/drawing/2014/main" xmlns="" id="{DAD5A302-C880-4E8C-9E1D-640CD5CF0CBE}"/>
               </a:ext>
             </a:extLst>
           </p:cNvPr>
@@ -38821,7 +38921,7 @@
           <p:cNvPr id="135" name="Rectangle 134">
             <a:extLst>
               <a:ext uri="{FF2B5EF4-FFF2-40B4-BE49-F238E27FC236}">
-                <a16:creationId xmlns:a16="http://schemas.microsoft.com/office/drawing/2014/main" id="{9D239E65-7C2B-4AD5-A1F4-F716E33EF928}"/>
+                <a16:creationId xmlns:a16="http://schemas.microsoft.com/office/drawing/2014/main" xmlns="" id="{9D239E65-7C2B-4AD5-A1F4-F716E33EF928}"/>
               </a:ext>
             </a:extLst>
           </p:cNvPr>
@@ -38859,7 +38959,7 @@
           <p:cNvPr id="146" name="Rectangle 145">
             <a:extLst>
               <a:ext uri="{FF2B5EF4-FFF2-40B4-BE49-F238E27FC236}">
-                <a16:creationId xmlns:a16="http://schemas.microsoft.com/office/drawing/2014/main" id="{02CB9ACB-9175-4592-A0A2-5F6EBA3916AA}"/>
+                <a16:creationId xmlns:a16="http://schemas.microsoft.com/office/drawing/2014/main" xmlns="" id="{02CB9ACB-9175-4592-A0A2-5F6EBA3916AA}"/>
               </a:ext>
             </a:extLst>
           </p:cNvPr>
@@ -38897,7 +38997,7 @@
           <p:cNvPr id="33" name="Rectangle 32">
             <a:extLst>
               <a:ext uri="{FF2B5EF4-FFF2-40B4-BE49-F238E27FC236}">
-                <a16:creationId xmlns:a16="http://schemas.microsoft.com/office/drawing/2014/main" id="{A5445AD6-3298-4B4A-BFAA-36E271EE36D3}"/>
+                <a16:creationId xmlns:a16="http://schemas.microsoft.com/office/drawing/2014/main" xmlns="" id="{A5445AD6-3298-4B4A-BFAA-36E271EE36D3}"/>
               </a:ext>
             </a:extLst>
           </p:cNvPr>
@@ -38938,7 +39038,7 @@
           <p:cNvPr id="148" name="Cube 147">
             <a:extLst>
               <a:ext uri="{FF2B5EF4-FFF2-40B4-BE49-F238E27FC236}">
-                <a16:creationId xmlns:a16="http://schemas.microsoft.com/office/drawing/2014/main" id="{3C1DB64A-F95E-4BBA-AAB7-E382DEE6D3AD}"/>
+                <a16:creationId xmlns:a16="http://schemas.microsoft.com/office/drawing/2014/main" xmlns="" id="{3C1DB64A-F95E-4BBA-AAB7-E382DEE6D3AD}"/>
               </a:ext>
             </a:extLst>
           </p:cNvPr>
@@ -38998,7 +39098,7 @@
           <p:cNvPr id="149" name="Rectangle 148">
             <a:extLst>
               <a:ext uri="{FF2B5EF4-FFF2-40B4-BE49-F238E27FC236}">
-                <a16:creationId xmlns:a16="http://schemas.microsoft.com/office/drawing/2014/main" id="{8ADE2C1F-3705-4E1D-9D1A-CEFA5BBDC4AE}"/>
+                <a16:creationId xmlns:a16="http://schemas.microsoft.com/office/drawing/2014/main" xmlns="" id="{8ADE2C1F-3705-4E1D-9D1A-CEFA5BBDC4AE}"/>
               </a:ext>
             </a:extLst>
           </p:cNvPr>
@@ -39039,7 +39139,7 @@
           <p:cNvPr id="152" name="Folded Corner 14">
             <a:extLst>
               <a:ext uri="{FF2B5EF4-FFF2-40B4-BE49-F238E27FC236}">
-                <a16:creationId xmlns:a16="http://schemas.microsoft.com/office/drawing/2014/main" id="{E9E59862-8121-45E9-B034-254AA5F85A9E}"/>
+                <a16:creationId xmlns:a16="http://schemas.microsoft.com/office/drawing/2014/main" xmlns="" id="{E9E59862-8121-45E9-B034-254AA5F85A9E}"/>
               </a:ext>
             </a:extLst>
           </p:cNvPr>
@@ -39088,7 +39188,7 @@
           <p:cNvPr id="159" name="Rectangle 158">
             <a:extLst>
               <a:ext uri="{FF2B5EF4-FFF2-40B4-BE49-F238E27FC236}">
-                <a16:creationId xmlns:a16="http://schemas.microsoft.com/office/drawing/2014/main" id="{9189909A-C973-403D-AC10-F162C1C50251}"/>
+                <a16:creationId xmlns:a16="http://schemas.microsoft.com/office/drawing/2014/main" xmlns="" id="{9189909A-C973-403D-AC10-F162C1C50251}"/>
               </a:ext>
             </a:extLst>
           </p:cNvPr>
@@ -39143,7 +39243,7 @@
           <p:cNvPr id="160" name="Straight Arrow Connector 159">
             <a:extLst>
               <a:ext uri="{FF2B5EF4-FFF2-40B4-BE49-F238E27FC236}">
-                <a16:creationId xmlns:a16="http://schemas.microsoft.com/office/drawing/2014/main" id="{4104DBBE-32EA-425C-8DB2-CA3E800CA64E}"/>
+                <a16:creationId xmlns:a16="http://schemas.microsoft.com/office/drawing/2014/main" xmlns="" id="{4104DBBE-32EA-425C-8DB2-CA3E800CA64E}"/>
               </a:ext>
             </a:extLst>
           </p:cNvPr>
@@ -39188,7 +39288,7 @@
           <p:cNvPr id="163" name="Cube 162">
             <a:extLst>
               <a:ext uri="{FF2B5EF4-FFF2-40B4-BE49-F238E27FC236}">
-                <a16:creationId xmlns:a16="http://schemas.microsoft.com/office/drawing/2014/main" id="{DCC62459-FE7B-48A9-A2FB-D56CDC251746}"/>
+                <a16:creationId xmlns:a16="http://schemas.microsoft.com/office/drawing/2014/main" xmlns="" id="{DCC62459-FE7B-48A9-A2FB-D56CDC251746}"/>
               </a:ext>
             </a:extLst>
           </p:cNvPr>
@@ -39248,7 +39348,7 @@
           <p:cNvPr id="164" name="Rectangle 163">
             <a:extLst>
               <a:ext uri="{FF2B5EF4-FFF2-40B4-BE49-F238E27FC236}">
-                <a16:creationId xmlns:a16="http://schemas.microsoft.com/office/drawing/2014/main" id="{A17E061D-69B0-4C5E-9A8B-BA722BA64CA4}"/>
+                <a16:creationId xmlns:a16="http://schemas.microsoft.com/office/drawing/2014/main" xmlns="" id="{A17E061D-69B0-4C5E-9A8B-BA722BA64CA4}"/>
               </a:ext>
             </a:extLst>
           </p:cNvPr>
@@ -39289,7 +39389,7 @@
           <p:cNvPr id="165" name="Folded Corner 14">
             <a:extLst>
               <a:ext uri="{FF2B5EF4-FFF2-40B4-BE49-F238E27FC236}">
-                <a16:creationId xmlns:a16="http://schemas.microsoft.com/office/drawing/2014/main" id="{E1EF52F6-55FE-4BD8-A276-7961F4C14406}"/>
+                <a16:creationId xmlns:a16="http://schemas.microsoft.com/office/drawing/2014/main" xmlns="" id="{E1EF52F6-55FE-4BD8-A276-7961F4C14406}"/>
               </a:ext>
             </a:extLst>
           </p:cNvPr>
@@ -39338,7 +39438,7 @@
           <p:cNvPr id="170" name="Rectangle 169">
             <a:extLst>
               <a:ext uri="{FF2B5EF4-FFF2-40B4-BE49-F238E27FC236}">
-                <a16:creationId xmlns:a16="http://schemas.microsoft.com/office/drawing/2014/main" id="{CD422137-5DD0-430D-A335-3434D32EC278}"/>
+                <a16:creationId xmlns:a16="http://schemas.microsoft.com/office/drawing/2014/main" xmlns="" id="{CD422137-5DD0-430D-A335-3434D32EC278}"/>
               </a:ext>
             </a:extLst>
           </p:cNvPr>
@@ -39390,7 +39490,7 @@
           <p:cNvPr id="171" name="Straight Arrow Connector 170">
             <a:extLst>
               <a:ext uri="{FF2B5EF4-FFF2-40B4-BE49-F238E27FC236}">
-                <a16:creationId xmlns:a16="http://schemas.microsoft.com/office/drawing/2014/main" id="{26251F63-0F9B-46FC-B288-264E1954D111}"/>
+                <a16:creationId xmlns:a16="http://schemas.microsoft.com/office/drawing/2014/main" xmlns="" id="{26251F63-0F9B-46FC-B288-264E1954D111}"/>
               </a:ext>
             </a:extLst>
           </p:cNvPr>
@@ -39435,7 +39535,7 @@
           <p:cNvPr id="172" name="Folded Corner 14">
             <a:extLst>
               <a:ext uri="{FF2B5EF4-FFF2-40B4-BE49-F238E27FC236}">
-                <a16:creationId xmlns:a16="http://schemas.microsoft.com/office/drawing/2014/main" id="{2198A703-2FEE-48EA-B0B0-656B73C08CA7}"/>
+                <a16:creationId xmlns:a16="http://schemas.microsoft.com/office/drawing/2014/main" xmlns="" id="{2198A703-2FEE-48EA-B0B0-656B73C08CA7}"/>
               </a:ext>
             </a:extLst>
           </p:cNvPr>
@@ -39484,7 +39584,7 @@
           <p:cNvPr id="173" name="Rectangle 172">
             <a:extLst>
               <a:ext uri="{FF2B5EF4-FFF2-40B4-BE49-F238E27FC236}">
-                <a16:creationId xmlns:a16="http://schemas.microsoft.com/office/drawing/2014/main" id="{FCC85E64-312F-4851-B756-3019DD6FA99F}"/>
+                <a16:creationId xmlns:a16="http://schemas.microsoft.com/office/drawing/2014/main" xmlns="" id="{FCC85E64-312F-4851-B756-3019DD6FA99F}"/>
               </a:ext>
             </a:extLst>
           </p:cNvPr>
@@ -39536,7 +39636,7 @@
           <p:cNvPr id="174" name="Straight Arrow Connector 173">
             <a:extLst>
               <a:ext uri="{FF2B5EF4-FFF2-40B4-BE49-F238E27FC236}">
-                <a16:creationId xmlns:a16="http://schemas.microsoft.com/office/drawing/2014/main" id="{518C8625-6187-4D33-A1AC-9208CA68F263}"/>
+                <a16:creationId xmlns:a16="http://schemas.microsoft.com/office/drawing/2014/main" xmlns="" id="{518C8625-6187-4D33-A1AC-9208CA68F263}"/>
               </a:ext>
             </a:extLst>
           </p:cNvPr>
@@ -39581,7 +39681,7 @@
           <p:cNvPr id="39" name="Rectangle 38">
             <a:extLst>
               <a:ext uri="{FF2B5EF4-FFF2-40B4-BE49-F238E27FC236}">
-                <a16:creationId xmlns:a16="http://schemas.microsoft.com/office/drawing/2014/main" id="{D01A5617-56DC-4B84-AF69-7027F4C7E7B3}"/>
+                <a16:creationId xmlns:a16="http://schemas.microsoft.com/office/drawing/2014/main" xmlns="" id="{D01A5617-56DC-4B84-AF69-7027F4C7E7B3}"/>
               </a:ext>
             </a:extLst>
           </p:cNvPr>
@@ -39636,7 +39736,7 @@
           <p:cNvPr id="40" name="Arrow: Right 39">
             <a:extLst>
               <a:ext uri="{FF2B5EF4-FFF2-40B4-BE49-F238E27FC236}">
-                <a16:creationId xmlns:a16="http://schemas.microsoft.com/office/drawing/2014/main" id="{AB7C45BA-0078-4BA1-A2B3-BC9A66ACD955}"/>
+                <a16:creationId xmlns:a16="http://schemas.microsoft.com/office/drawing/2014/main" xmlns="" id="{AB7C45BA-0078-4BA1-A2B3-BC9A66ACD955}"/>
               </a:ext>
             </a:extLst>
           </p:cNvPr>
@@ -39688,7 +39788,7 @@
           <p:cNvPr id="12" name="Picture 11" descr="A picture containing outdoor object&#10;&#10;Description generated with high confidence">
             <a:extLst>
               <a:ext uri="{FF2B5EF4-FFF2-40B4-BE49-F238E27FC236}">
-                <a16:creationId xmlns:a16="http://schemas.microsoft.com/office/drawing/2014/main" id="{684713F9-9ECF-4663-A027-A6113FA71893}"/>
+                <a16:creationId xmlns:a16="http://schemas.microsoft.com/office/drawing/2014/main" xmlns="" id="{684713F9-9ECF-4663-A027-A6113FA71893}"/>
               </a:ext>
             </a:extLst>
           </p:cNvPr>
@@ -39724,7 +39824,7 @@
           <p:cNvPr id="42" name="Straight Arrow Connector 41">
             <a:extLst>
               <a:ext uri="{FF2B5EF4-FFF2-40B4-BE49-F238E27FC236}">
-                <a16:creationId xmlns:a16="http://schemas.microsoft.com/office/drawing/2014/main" id="{AE9F3928-6603-4F44-B87F-D5568E789A51}"/>
+                <a16:creationId xmlns:a16="http://schemas.microsoft.com/office/drawing/2014/main" xmlns="" id="{AE9F3928-6603-4F44-B87F-D5568E789A51}"/>
               </a:ext>
             </a:extLst>
           </p:cNvPr>
@@ -39769,7 +39869,7 @@
           <p:cNvPr id="13" name="Rectangle 12">
             <a:extLst>
               <a:ext uri="{FF2B5EF4-FFF2-40B4-BE49-F238E27FC236}">
-                <a16:creationId xmlns:a16="http://schemas.microsoft.com/office/drawing/2014/main" id="{BE9850A2-3BDB-4A68-BCBD-94C436747806}"/>
+                <a16:creationId xmlns:a16="http://schemas.microsoft.com/office/drawing/2014/main" xmlns="" id="{BE9850A2-3BDB-4A68-BCBD-94C436747806}"/>
               </a:ext>
             </a:extLst>
           </p:cNvPr>
@@ -39835,7 +39935,7 @@
           <p:cNvPr id="44" name="Folded Corner 14">
             <a:extLst>
               <a:ext uri="{FF2B5EF4-FFF2-40B4-BE49-F238E27FC236}">
-                <a16:creationId xmlns:a16="http://schemas.microsoft.com/office/drawing/2014/main" id="{048A78E4-38F4-403F-B262-3393CB25026A}"/>
+                <a16:creationId xmlns:a16="http://schemas.microsoft.com/office/drawing/2014/main" xmlns="" id="{048A78E4-38F4-403F-B262-3393CB25026A}"/>
               </a:ext>
             </a:extLst>
           </p:cNvPr>
@@ -39884,7 +39984,7 @@
           <p:cNvPr id="45" name="Rectangle 44">
             <a:extLst>
               <a:ext uri="{FF2B5EF4-FFF2-40B4-BE49-F238E27FC236}">
-                <a16:creationId xmlns:a16="http://schemas.microsoft.com/office/drawing/2014/main" id="{B6EF94B6-C2BD-4454-B081-DC4CDC0FA78B}"/>
+                <a16:creationId xmlns:a16="http://schemas.microsoft.com/office/drawing/2014/main" xmlns="" id="{B6EF94B6-C2BD-4454-B081-DC4CDC0FA78B}"/>
               </a:ext>
             </a:extLst>
           </p:cNvPr>
@@ -39936,7 +40036,7 @@
           <p:cNvPr id="14" name="Rectangle 13">
             <a:extLst>
               <a:ext uri="{FF2B5EF4-FFF2-40B4-BE49-F238E27FC236}">
-                <a16:creationId xmlns:a16="http://schemas.microsoft.com/office/drawing/2014/main" id="{9F89B982-51DA-4A7B-B50E-BA08031E2C12}"/>
+                <a16:creationId xmlns:a16="http://schemas.microsoft.com/office/drawing/2014/main" xmlns="" id="{9F89B982-51DA-4A7B-B50E-BA08031E2C12}"/>
               </a:ext>
             </a:extLst>
           </p:cNvPr>
@@ -39974,7 +40074,7 @@
           <p:cNvPr id="15" name="Rectangle 14">
             <a:extLst>
               <a:ext uri="{FF2B5EF4-FFF2-40B4-BE49-F238E27FC236}">
-                <a16:creationId xmlns:a16="http://schemas.microsoft.com/office/drawing/2014/main" id="{4F318F00-3DF3-4DD0-9F9C-3D2FB2746086}"/>
+                <a16:creationId xmlns:a16="http://schemas.microsoft.com/office/drawing/2014/main" xmlns="" id="{4F318F00-3DF3-4DD0-9F9C-3D2FB2746086}"/>
               </a:ext>
             </a:extLst>
           </p:cNvPr>
@@ -40012,7 +40112,7 @@
           <p:cNvPr id="48" name="Rectangle 47">
             <a:extLst>
               <a:ext uri="{FF2B5EF4-FFF2-40B4-BE49-F238E27FC236}">
-                <a16:creationId xmlns:a16="http://schemas.microsoft.com/office/drawing/2014/main" id="{4B4F362E-13BC-4500-8556-53A8FC39D0B9}"/>
+                <a16:creationId xmlns:a16="http://schemas.microsoft.com/office/drawing/2014/main" xmlns="" id="{4B4F362E-13BC-4500-8556-53A8FC39D0B9}"/>
               </a:ext>
             </a:extLst>
           </p:cNvPr>
@@ -40050,7 +40150,7 @@
           <p:cNvPr id="17" name="Rectangle 16">
             <a:extLst>
               <a:ext uri="{FF2B5EF4-FFF2-40B4-BE49-F238E27FC236}">
-                <a16:creationId xmlns:a16="http://schemas.microsoft.com/office/drawing/2014/main" id="{E971B6A2-9BA5-482C-991E-4489D5C190FD}"/>
+                <a16:creationId xmlns:a16="http://schemas.microsoft.com/office/drawing/2014/main" xmlns="" id="{E971B6A2-9BA5-482C-991E-4489D5C190FD}"/>
               </a:ext>
             </a:extLst>
           </p:cNvPr>
@@ -40088,7 +40188,7 @@
           <p:cNvPr id="52" name="Rectangle 51">
             <a:extLst>
               <a:ext uri="{FF2B5EF4-FFF2-40B4-BE49-F238E27FC236}">
-                <a16:creationId xmlns:a16="http://schemas.microsoft.com/office/drawing/2014/main" id="{99534692-59D2-4947-83E0-D4E8E4591FD6}"/>
+                <a16:creationId xmlns:a16="http://schemas.microsoft.com/office/drawing/2014/main" xmlns="" id="{99534692-59D2-4947-83E0-D4E8E4591FD6}"/>
               </a:ext>
             </a:extLst>
           </p:cNvPr>
@@ -40216,7 +40316,7 @@
           <p:cNvPr id="5" name="Oval 4">
             <a:extLst>
               <a:ext uri="{FF2B5EF4-FFF2-40B4-BE49-F238E27FC236}">
-                <a16:creationId xmlns:a16="http://schemas.microsoft.com/office/drawing/2014/main" id="{1BE905D4-A72F-472F-85B9-E5262CB9A9BA}"/>
+                <a16:creationId xmlns:a16="http://schemas.microsoft.com/office/drawing/2014/main" xmlns="" id="{1BE905D4-A72F-472F-85B9-E5262CB9A9BA}"/>
               </a:ext>
             </a:extLst>
           </p:cNvPr>
@@ -40268,7 +40368,7 @@
           <p:cNvPr id="6" name="Oval 5">
             <a:extLst>
               <a:ext uri="{FF2B5EF4-FFF2-40B4-BE49-F238E27FC236}">
-                <a16:creationId xmlns:a16="http://schemas.microsoft.com/office/drawing/2014/main" id="{DA8FA223-F814-41D8-8A8C-99F6794FF949}"/>
+                <a16:creationId xmlns:a16="http://schemas.microsoft.com/office/drawing/2014/main" xmlns="" id="{DA8FA223-F814-41D8-8A8C-99F6794FF949}"/>
               </a:ext>
             </a:extLst>
           </p:cNvPr>
@@ -40320,7 +40420,7 @@
           <p:cNvPr id="7" name="Oval 6">
             <a:extLst>
               <a:ext uri="{FF2B5EF4-FFF2-40B4-BE49-F238E27FC236}">
-                <a16:creationId xmlns:a16="http://schemas.microsoft.com/office/drawing/2014/main" id="{2C06C390-1650-43A9-92CD-878AF82A2EDE}"/>
+                <a16:creationId xmlns:a16="http://schemas.microsoft.com/office/drawing/2014/main" xmlns="" id="{2C06C390-1650-43A9-92CD-878AF82A2EDE}"/>
               </a:ext>
             </a:extLst>
           </p:cNvPr>
@@ -40372,7 +40472,7 @@
           <p:cNvPr id="8" name="Rectangle 7">
             <a:extLst>
               <a:ext uri="{FF2B5EF4-FFF2-40B4-BE49-F238E27FC236}">
-                <a16:creationId xmlns:a16="http://schemas.microsoft.com/office/drawing/2014/main" id="{42BB545C-B9B2-4B88-A085-D7573212A8A6}"/>
+                <a16:creationId xmlns:a16="http://schemas.microsoft.com/office/drawing/2014/main" xmlns="" id="{42BB545C-B9B2-4B88-A085-D7573212A8A6}"/>
               </a:ext>
             </a:extLst>
           </p:cNvPr>
@@ -40411,7 +40511,7 @@
           <p:cNvPr id="9" name="Rectangle 8">
             <a:extLst>
               <a:ext uri="{FF2B5EF4-FFF2-40B4-BE49-F238E27FC236}">
-                <a16:creationId xmlns:a16="http://schemas.microsoft.com/office/drawing/2014/main" id="{822A8BCF-BF7A-45F3-AEB2-2A8B87E5DD2B}"/>
+                <a16:creationId xmlns:a16="http://schemas.microsoft.com/office/drawing/2014/main" xmlns="" id="{822A8BCF-BF7A-45F3-AEB2-2A8B87E5DD2B}"/>
               </a:ext>
             </a:extLst>
           </p:cNvPr>
@@ -40450,7 +40550,7 @@
           <p:cNvPr id="10" name="Rectangle 9">
             <a:extLst>
               <a:ext uri="{FF2B5EF4-FFF2-40B4-BE49-F238E27FC236}">
-                <a16:creationId xmlns:a16="http://schemas.microsoft.com/office/drawing/2014/main" id="{37CDA193-5920-4DBA-9F62-8C8CE4AE6FFB}"/>
+                <a16:creationId xmlns:a16="http://schemas.microsoft.com/office/drawing/2014/main" xmlns="" id="{37CDA193-5920-4DBA-9F62-8C8CE4AE6FFB}"/>
               </a:ext>
             </a:extLst>
           </p:cNvPr>
@@ -40816,7 +40916,7 @@
   <a:extraClrSchemeLst/>
   <a:extLst>
     <a:ext uri="{05A4C25C-085E-4340-85A3-A5531E510DB2}">
-      <thm15:themeFamily xmlns:thm15="http://schemas.microsoft.com/office/thememl/2012/main" name="Office Theme" id="{62F939B6-93AF-4DB8-9C6B-D6C7DFDC589F}" vid="{4A3C46E8-61CC-4603-A589-7422A47A8E4A}"/>
+      <thm15:themeFamily xmlns:thm15="http://schemas.microsoft.com/office/thememl/2012/main" xmlns="" name="Office Theme" id="{62F939B6-93AF-4DB8-9C6B-D6C7DFDC589F}" vid="{4A3C46E8-61CC-4603-A589-7422A47A8E4A}"/>
     </a:ext>
   </a:extLst>
 </a:theme>

</xml_diff>

<commit_message>
v0.5 - Revised after internal review
</commit_message>
<xml_diff>
--- a/project/rumble/etsa02_figures.pptx
+++ b/project/rumble/etsa02_figures.pptx
@@ -133,7 +133,7 @@
       </p14:sectionLst>
     </p:ext>
     <p:ext uri="{EFAFB233-063F-42B5-8137-9DF3F51BA10A}">
-      <p15:sldGuideLst xmlns:p15="http://schemas.microsoft.com/office/powerpoint/2012/main">
+      <p15:sldGuideLst xmlns:p15="http://schemas.microsoft.com/office/powerpoint/2012/main" xmlns="">
         <p15:guide id="1" orient="horz" pos="2160" userDrawn="1">
           <p15:clr>
             <a:srgbClr val="A4A3A4"/>
@@ -3517,6 +3517,13 @@
         </dgm:presLayoutVars>
       </dgm:prSet>
       <dgm:spPr/>
+      <dgm:t>
+        <a:bodyPr/>
+        <a:lstStyle/>
+        <a:p>
+          <a:endParaRPr lang="sv-SE"/>
+        </a:p>
+      </dgm:t>
     </dgm:pt>
     <dgm:pt modelId="{C85ED1F6-1417-4DD8-9F0B-B522CDE30503}" type="pres">
       <dgm:prSet presAssocID="{A79E2A2D-7F2D-43CD-89C5-4F06702239C7}" presName="Accent1" presStyleCnt="0"/>
@@ -3535,6 +3542,13 @@
         </dgm:presLayoutVars>
       </dgm:prSet>
       <dgm:spPr/>
+      <dgm:t>
+        <a:bodyPr/>
+        <a:lstStyle/>
+        <a:p>
+          <a:endParaRPr lang="sv-SE"/>
+        </a:p>
+      </dgm:t>
     </dgm:pt>
     <dgm:pt modelId="{9E66601F-5507-4159-89CD-FE8318C483CA}" type="pres">
       <dgm:prSet presAssocID="{3A128CF5-9AE7-4EAC-9485-E88F8BE77004}" presName="Accent2" presStyleCnt="0"/>
@@ -3553,6 +3567,13 @@
         </dgm:presLayoutVars>
       </dgm:prSet>
       <dgm:spPr/>
+      <dgm:t>
+        <a:bodyPr/>
+        <a:lstStyle/>
+        <a:p>
+          <a:endParaRPr lang="sv-SE"/>
+        </a:p>
+      </dgm:t>
     </dgm:pt>
     <dgm:pt modelId="{2D7E4C0B-382B-42B1-A371-45C4C315ACE4}" type="pres">
       <dgm:prSet presAssocID="{3E974AE7-F6F7-44CE-AA7A-02FBDD58B1F1}" presName="Accent3" presStyleCnt="0"/>
@@ -3571,16 +3592,23 @@
         </dgm:presLayoutVars>
       </dgm:prSet>
       <dgm:spPr/>
+      <dgm:t>
+        <a:bodyPr/>
+        <a:lstStyle/>
+        <a:p>
+          <a:endParaRPr lang="sv-SE"/>
+        </a:p>
+      </dgm:t>
     </dgm:pt>
   </dgm:ptLst>
   <dgm:cxnLst>
     <dgm:cxn modelId="{DEA8841A-7F97-4B12-B19D-7DBC9CCCA6CA}" type="presOf" srcId="{A79E2A2D-7F2D-43CD-89C5-4F06702239C7}" destId="{DE40A598-37E1-4A8B-B30A-361891655E32}" srcOrd="0" destOrd="0" presId="urn:microsoft.com/office/officeart/2009/layout/CircleArrowProcess"/>
-    <dgm:cxn modelId="{D240A36B-F62A-4C70-9CAD-58226B0BD43D}" srcId="{E967B93F-BC7F-4FB4-BC87-6392A0B631BD}" destId="{3E974AE7-F6F7-44CE-AA7A-02FBDD58B1F1}" srcOrd="2" destOrd="0" parTransId="{0B1B9D87-069F-4C74-8A0B-950CD6773332}" sibTransId="{73096607-54D9-4500-9B80-0F6BD95D4725}"/>
-    <dgm:cxn modelId="{801CC257-8EC3-43DF-8DA1-6CFC36AAD2A3}" srcId="{E967B93F-BC7F-4FB4-BC87-6392A0B631BD}" destId="{3A128CF5-9AE7-4EAC-9485-E88F8BE77004}" srcOrd="1" destOrd="0" parTransId="{8B28C7C3-F1D0-4BA1-9C4B-79E975C3D84A}" sibTransId="{6842B30A-4C8A-4177-9D91-676F7D95EFE3}"/>
-    <dgm:cxn modelId="{157A1A7C-BF9C-4030-A3D2-FC015CDAB6FE}" srcId="{E967B93F-BC7F-4FB4-BC87-6392A0B631BD}" destId="{A79E2A2D-7F2D-43CD-89C5-4F06702239C7}" srcOrd="0" destOrd="0" parTransId="{80084990-0EF9-4F24-80B5-B857B4647FC3}" sibTransId="{56F09064-C6D9-41DF-9B01-CB0B167CEDEB}"/>
     <dgm:cxn modelId="{E919CC95-27B8-4C68-8343-831B7888018A}" type="presOf" srcId="{3A128CF5-9AE7-4EAC-9485-E88F8BE77004}" destId="{FF94DD58-C0AC-4F2E-B336-D810E8C84263}" srcOrd="0" destOrd="0" presId="urn:microsoft.com/office/officeart/2009/layout/CircleArrowProcess"/>
     <dgm:cxn modelId="{EAD55AA6-A136-4C50-8B79-CC6B400CC981}" type="presOf" srcId="{E967B93F-BC7F-4FB4-BC87-6392A0B631BD}" destId="{71406755-23F2-4109-BA41-146F988774CB}" srcOrd="0" destOrd="0" presId="urn:microsoft.com/office/officeart/2009/layout/CircleArrowProcess"/>
     <dgm:cxn modelId="{3F5E1DE0-0383-48CC-9203-6C9AD5C5267D}" type="presOf" srcId="{3E974AE7-F6F7-44CE-AA7A-02FBDD58B1F1}" destId="{90083342-A34C-49F2-A9E2-A7E389073F00}" srcOrd="0" destOrd="0" presId="urn:microsoft.com/office/officeart/2009/layout/CircleArrowProcess"/>
+    <dgm:cxn modelId="{157A1A7C-BF9C-4030-A3D2-FC015CDAB6FE}" srcId="{E967B93F-BC7F-4FB4-BC87-6392A0B631BD}" destId="{A79E2A2D-7F2D-43CD-89C5-4F06702239C7}" srcOrd="0" destOrd="0" parTransId="{80084990-0EF9-4F24-80B5-B857B4647FC3}" sibTransId="{56F09064-C6D9-41DF-9B01-CB0B167CEDEB}"/>
+    <dgm:cxn modelId="{D240A36B-F62A-4C70-9CAD-58226B0BD43D}" srcId="{E967B93F-BC7F-4FB4-BC87-6392A0B631BD}" destId="{3E974AE7-F6F7-44CE-AA7A-02FBDD58B1F1}" srcOrd="2" destOrd="0" parTransId="{0B1B9D87-069F-4C74-8A0B-950CD6773332}" sibTransId="{73096607-54D9-4500-9B80-0F6BD95D4725}"/>
+    <dgm:cxn modelId="{801CC257-8EC3-43DF-8DA1-6CFC36AAD2A3}" srcId="{E967B93F-BC7F-4FB4-BC87-6392A0B631BD}" destId="{3A128CF5-9AE7-4EAC-9485-E88F8BE77004}" srcOrd="1" destOrd="0" parTransId="{8B28C7C3-F1D0-4BA1-9C4B-79E975C3D84A}" sibTransId="{6842B30A-4C8A-4177-9D91-676F7D95EFE3}"/>
     <dgm:cxn modelId="{CF176182-E8A3-4225-A216-451BAF65A36F}" type="presParOf" srcId="{71406755-23F2-4109-BA41-146F988774CB}" destId="{C85ED1F6-1417-4DD8-9F0B-B522CDE30503}" srcOrd="0" destOrd="0" presId="urn:microsoft.com/office/officeart/2009/layout/CircleArrowProcess"/>
     <dgm:cxn modelId="{981AAF99-5CEA-4325-83DB-F7B976729878}" type="presParOf" srcId="{C85ED1F6-1417-4DD8-9F0B-B522CDE30503}" destId="{C215277F-04B7-4D4C-9F84-0EFFD842F138}" srcOrd="0" destOrd="0" presId="urn:microsoft.com/office/officeart/2009/layout/CircleArrowProcess"/>
     <dgm:cxn modelId="{0382EFEC-3211-418D-AAB6-6AFF1D404234}" type="presParOf" srcId="{71406755-23F2-4109-BA41-146F988774CB}" destId="{DE40A598-37E1-4A8B-B30A-361891655E32}" srcOrd="1" destOrd="0" presId="urn:microsoft.com/office/officeart/2009/layout/CircleArrowProcess"/>
@@ -3736,6 +3764,13 @@
         </dgm:presLayoutVars>
       </dgm:prSet>
       <dgm:spPr/>
+      <dgm:t>
+        <a:bodyPr/>
+        <a:lstStyle/>
+        <a:p>
+          <a:endParaRPr lang="sv-SE"/>
+        </a:p>
+      </dgm:t>
     </dgm:pt>
     <dgm:pt modelId="{C85ED1F6-1417-4DD8-9F0B-B522CDE30503}" type="pres">
       <dgm:prSet presAssocID="{A79E2A2D-7F2D-43CD-89C5-4F06702239C7}" presName="Accent1" presStyleCnt="0"/>
@@ -3754,6 +3789,13 @@
         </dgm:presLayoutVars>
       </dgm:prSet>
       <dgm:spPr/>
+      <dgm:t>
+        <a:bodyPr/>
+        <a:lstStyle/>
+        <a:p>
+          <a:endParaRPr lang="sv-SE"/>
+        </a:p>
+      </dgm:t>
     </dgm:pt>
     <dgm:pt modelId="{9E66601F-5507-4159-89CD-FE8318C483CA}" type="pres">
       <dgm:prSet presAssocID="{3A128CF5-9AE7-4EAC-9485-E88F8BE77004}" presName="Accent2" presStyleCnt="0"/>
@@ -3772,6 +3814,13 @@
         </dgm:presLayoutVars>
       </dgm:prSet>
       <dgm:spPr/>
+      <dgm:t>
+        <a:bodyPr/>
+        <a:lstStyle/>
+        <a:p>
+          <a:endParaRPr lang="sv-SE"/>
+        </a:p>
+      </dgm:t>
     </dgm:pt>
     <dgm:pt modelId="{2D7E4C0B-382B-42B1-A371-45C4C315ACE4}" type="pres">
       <dgm:prSet presAssocID="{3E974AE7-F6F7-44CE-AA7A-02FBDD58B1F1}" presName="Accent3" presStyleCnt="0"/>
@@ -3790,16 +3839,23 @@
         </dgm:presLayoutVars>
       </dgm:prSet>
       <dgm:spPr/>
+      <dgm:t>
+        <a:bodyPr/>
+        <a:lstStyle/>
+        <a:p>
+          <a:endParaRPr lang="sv-SE"/>
+        </a:p>
+      </dgm:t>
     </dgm:pt>
   </dgm:ptLst>
   <dgm:cxnLst>
     <dgm:cxn modelId="{DEA8841A-7F97-4B12-B19D-7DBC9CCCA6CA}" type="presOf" srcId="{A79E2A2D-7F2D-43CD-89C5-4F06702239C7}" destId="{DE40A598-37E1-4A8B-B30A-361891655E32}" srcOrd="0" destOrd="0" presId="urn:microsoft.com/office/officeart/2009/layout/CircleArrowProcess"/>
-    <dgm:cxn modelId="{D240A36B-F62A-4C70-9CAD-58226B0BD43D}" srcId="{E967B93F-BC7F-4FB4-BC87-6392A0B631BD}" destId="{3E974AE7-F6F7-44CE-AA7A-02FBDD58B1F1}" srcOrd="2" destOrd="0" parTransId="{0B1B9D87-069F-4C74-8A0B-950CD6773332}" sibTransId="{73096607-54D9-4500-9B80-0F6BD95D4725}"/>
-    <dgm:cxn modelId="{801CC257-8EC3-43DF-8DA1-6CFC36AAD2A3}" srcId="{E967B93F-BC7F-4FB4-BC87-6392A0B631BD}" destId="{3A128CF5-9AE7-4EAC-9485-E88F8BE77004}" srcOrd="1" destOrd="0" parTransId="{8B28C7C3-F1D0-4BA1-9C4B-79E975C3D84A}" sibTransId="{6842B30A-4C8A-4177-9D91-676F7D95EFE3}"/>
-    <dgm:cxn modelId="{157A1A7C-BF9C-4030-A3D2-FC015CDAB6FE}" srcId="{E967B93F-BC7F-4FB4-BC87-6392A0B631BD}" destId="{A79E2A2D-7F2D-43CD-89C5-4F06702239C7}" srcOrd="0" destOrd="0" parTransId="{80084990-0EF9-4F24-80B5-B857B4647FC3}" sibTransId="{56F09064-C6D9-41DF-9B01-CB0B167CEDEB}"/>
     <dgm:cxn modelId="{E919CC95-27B8-4C68-8343-831B7888018A}" type="presOf" srcId="{3A128CF5-9AE7-4EAC-9485-E88F8BE77004}" destId="{FF94DD58-C0AC-4F2E-B336-D810E8C84263}" srcOrd="0" destOrd="0" presId="urn:microsoft.com/office/officeart/2009/layout/CircleArrowProcess"/>
     <dgm:cxn modelId="{EAD55AA6-A136-4C50-8B79-CC6B400CC981}" type="presOf" srcId="{E967B93F-BC7F-4FB4-BC87-6392A0B631BD}" destId="{71406755-23F2-4109-BA41-146F988774CB}" srcOrd="0" destOrd="0" presId="urn:microsoft.com/office/officeart/2009/layout/CircleArrowProcess"/>
     <dgm:cxn modelId="{3F5E1DE0-0383-48CC-9203-6C9AD5C5267D}" type="presOf" srcId="{3E974AE7-F6F7-44CE-AA7A-02FBDD58B1F1}" destId="{90083342-A34C-49F2-A9E2-A7E389073F00}" srcOrd="0" destOrd="0" presId="urn:microsoft.com/office/officeart/2009/layout/CircleArrowProcess"/>
+    <dgm:cxn modelId="{157A1A7C-BF9C-4030-A3D2-FC015CDAB6FE}" srcId="{E967B93F-BC7F-4FB4-BC87-6392A0B631BD}" destId="{A79E2A2D-7F2D-43CD-89C5-4F06702239C7}" srcOrd="0" destOrd="0" parTransId="{80084990-0EF9-4F24-80B5-B857B4647FC3}" sibTransId="{56F09064-C6D9-41DF-9B01-CB0B167CEDEB}"/>
+    <dgm:cxn modelId="{D240A36B-F62A-4C70-9CAD-58226B0BD43D}" srcId="{E967B93F-BC7F-4FB4-BC87-6392A0B631BD}" destId="{3E974AE7-F6F7-44CE-AA7A-02FBDD58B1F1}" srcOrd="2" destOrd="0" parTransId="{0B1B9D87-069F-4C74-8A0B-950CD6773332}" sibTransId="{73096607-54D9-4500-9B80-0F6BD95D4725}"/>
+    <dgm:cxn modelId="{801CC257-8EC3-43DF-8DA1-6CFC36AAD2A3}" srcId="{E967B93F-BC7F-4FB4-BC87-6392A0B631BD}" destId="{3A128CF5-9AE7-4EAC-9485-E88F8BE77004}" srcOrd="1" destOrd="0" parTransId="{8B28C7C3-F1D0-4BA1-9C4B-79E975C3D84A}" sibTransId="{6842B30A-4C8A-4177-9D91-676F7D95EFE3}"/>
     <dgm:cxn modelId="{CF176182-E8A3-4225-A216-451BAF65A36F}" type="presParOf" srcId="{71406755-23F2-4109-BA41-146F988774CB}" destId="{C85ED1F6-1417-4DD8-9F0B-B522CDE30503}" srcOrd="0" destOrd="0" presId="urn:microsoft.com/office/officeart/2009/layout/CircleArrowProcess"/>
     <dgm:cxn modelId="{981AAF99-5CEA-4325-83DB-F7B976729878}" type="presParOf" srcId="{C85ED1F6-1417-4DD8-9F0B-B522CDE30503}" destId="{C215277F-04B7-4D4C-9F84-0EFFD842F138}" srcOrd="0" destOrd="0" presId="urn:microsoft.com/office/officeart/2009/layout/CircleArrowProcess"/>
     <dgm:cxn modelId="{0382EFEC-3211-418D-AAB6-6AFF1D404234}" type="presParOf" srcId="{71406755-23F2-4109-BA41-146F988774CB}" destId="{DE40A598-37E1-4A8B-B30A-361891655E32}" srcOrd="1" destOrd="0" presId="urn:microsoft.com/office/officeart/2009/layout/CircleArrowProcess"/>
@@ -3955,6 +4011,13 @@
         </dgm:presLayoutVars>
       </dgm:prSet>
       <dgm:spPr/>
+      <dgm:t>
+        <a:bodyPr/>
+        <a:lstStyle/>
+        <a:p>
+          <a:endParaRPr lang="sv-SE"/>
+        </a:p>
+      </dgm:t>
     </dgm:pt>
     <dgm:pt modelId="{C85ED1F6-1417-4DD8-9F0B-B522CDE30503}" type="pres">
       <dgm:prSet presAssocID="{A79E2A2D-7F2D-43CD-89C5-4F06702239C7}" presName="Accent1" presStyleCnt="0"/>
@@ -3973,6 +4036,13 @@
         </dgm:presLayoutVars>
       </dgm:prSet>
       <dgm:spPr/>
+      <dgm:t>
+        <a:bodyPr/>
+        <a:lstStyle/>
+        <a:p>
+          <a:endParaRPr lang="sv-SE"/>
+        </a:p>
+      </dgm:t>
     </dgm:pt>
     <dgm:pt modelId="{9E66601F-5507-4159-89CD-FE8318C483CA}" type="pres">
       <dgm:prSet presAssocID="{3A128CF5-9AE7-4EAC-9485-E88F8BE77004}" presName="Accent2" presStyleCnt="0"/>
@@ -3991,6 +4061,13 @@
         </dgm:presLayoutVars>
       </dgm:prSet>
       <dgm:spPr/>
+      <dgm:t>
+        <a:bodyPr/>
+        <a:lstStyle/>
+        <a:p>
+          <a:endParaRPr lang="sv-SE"/>
+        </a:p>
+      </dgm:t>
     </dgm:pt>
     <dgm:pt modelId="{2D7E4C0B-382B-42B1-A371-45C4C315ACE4}" type="pres">
       <dgm:prSet presAssocID="{3E974AE7-F6F7-44CE-AA7A-02FBDD58B1F1}" presName="Accent3" presStyleCnt="0"/>
@@ -4009,16 +4086,23 @@
         </dgm:presLayoutVars>
       </dgm:prSet>
       <dgm:spPr/>
+      <dgm:t>
+        <a:bodyPr/>
+        <a:lstStyle/>
+        <a:p>
+          <a:endParaRPr lang="sv-SE"/>
+        </a:p>
+      </dgm:t>
     </dgm:pt>
   </dgm:ptLst>
   <dgm:cxnLst>
     <dgm:cxn modelId="{103B3A60-C213-4827-853E-FA5096CF201C}" type="presOf" srcId="{3E974AE7-F6F7-44CE-AA7A-02FBDD58B1F1}" destId="{90083342-A34C-49F2-A9E2-A7E389073F00}" srcOrd="0" destOrd="0" presId="urn:microsoft.com/office/officeart/2009/layout/CircleArrowProcess"/>
+    <dgm:cxn modelId="{157A1A7C-BF9C-4030-A3D2-FC015CDAB6FE}" srcId="{E967B93F-BC7F-4FB4-BC87-6392A0B631BD}" destId="{A79E2A2D-7F2D-43CD-89C5-4F06702239C7}" srcOrd="0" destOrd="0" parTransId="{80084990-0EF9-4F24-80B5-B857B4647FC3}" sibTransId="{56F09064-C6D9-41DF-9B01-CB0B167CEDEB}"/>
+    <dgm:cxn modelId="{278F84EA-CF0B-414C-B45F-94E89A5CD16B}" type="presOf" srcId="{E967B93F-BC7F-4FB4-BC87-6392A0B631BD}" destId="{71406755-23F2-4109-BA41-146F988774CB}" srcOrd="0" destOrd="0" presId="urn:microsoft.com/office/officeart/2009/layout/CircleArrowProcess"/>
+    <dgm:cxn modelId="{2819B5DB-1C08-447F-82FA-A53AB9AA54A5}" type="presOf" srcId="{A79E2A2D-7F2D-43CD-89C5-4F06702239C7}" destId="{DE40A598-37E1-4A8B-B30A-361891655E32}" srcOrd="0" destOrd="0" presId="urn:microsoft.com/office/officeart/2009/layout/CircleArrowProcess"/>
     <dgm:cxn modelId="{3F38DC68-3BC1-4923-B0DA-6ABFD5E441E6}" type="presOf" srcId="{3A128CF5-9AE7-4EAC-9485-E88F8BE77004}" destId="{FF94DD58-C0AC-4F2E-B336-D810E8C84263}" srcOrd="0" destOrd="0" presId="urn:microsoft.com/office/officeart/2009/layout/CircleArrowProcess"/>
     <dgm:cxn modelId="{D240A36B-F62A-4C70-9CAD-58226B0BD43D}" srcId="{E967B93F-BC7F-4FB4-BC87-6392A0B631BD}" destId="{3E974AE7-F6F7-44CE-AA7A-02FBDD58B1F1}" srcOrd="2" destOrd="0" parTransId="{0B1B9D87-069F-4C74-8A0B-950CD6773332}" sibTransId="{73096607-54D9-4500-9B80-0F6BD95D4725}"/>
     <dgm:cxn modelId="{801CC257-8EC3-43DF-8DA1-6CFC36AAD2A3}" srcId="{E967B93F-BC7F-4FB4-BC87-6392A0B631BD}" destId="{3A128CF5-9AE7-4EAC-9485-E88F8BE77004}" srcOrd="1" destOrd="0" parTransId="{8B28C7C3-F1D0-4BA1-9C4B-79E975C3D84A}" sibTransId="{6842B30A-4C8A-4177-9D91-676F7D95EFE3}"/>
-    <dgm:cxn modelId="{157A1A7C-BF9C-4030-A3D2-FC015CDAB6FE}" srcId="{E967B93F-BC7F-4FB4-BC87-6392A0B631BD}" destId="{A79E2A2D-7F2D-43CD-89C5-4F06702239C7}" srcOrd="0" destOrd="0" parTransId="{80084990-0EF9-4F24-80B5-B857B4647FC3}" sibTransId="{56F09064-C6D9-41DF-9B01-CB0B167CEDEB}"/>
-    <dgm:cxn modelId="{2819B5DB-1C08-447F-82FA-A53AB9AA54A5}" type="presOf" srcId="{A79E2A2D-7F2D-43CD-89C5-4F06702239C7}" destId="{DE40A598-37E1-4A8B-B30A-361891655E32}" srcOrd="0" destOrd="0" presId="urn:microsoft.com/office/officeart/2009/layout/CircleArrowProcess"/>
-    <dgm:cxn modelId="{278F84EA-CF0B-414C-B45F-94E89A5CD16B}" type="presOf" srcId="{E967B93F-BC7F-4FB4-BC87-6392A0B631BD}" destId="{71406755-23F2-4109-BA41-146F988774CB}" srcOrd="0" destOrd="0" presId="urn:microsoft.com/office/officeart/2009/layout/CircleArrowProcess"/>
     <dgm:cxn modelId="{A8EAE903-A8CE-4773-BB2B-45A11FE2157D}" type="presParOf" srcId="{71406755-23F2-4109-BA41-146F988774CB}" destId="{C85ED1F6-1417-4DD8-9F0B-B522CDE30503}" srcOrd="0" destOrd="0" presId="urn:microsoft.com/office/officeart/2009/layout/CircleArrowProcess"/>
     <dgm:cxn modelId="{5E39C4BD-E42F-4FDB-A0E9-1E3DEDD2CB3A}" type="presParOf" srcId="{C85ED1F6-1417-4DD8-9F0B-B522CDE30503}" destId="{C215277F-04B7-4D4C-9F84-0EFFD842F138}" srcOrd="0" destOrd="0" presId="urn:microsoft.com/office/officeart/2009/layout/CircleArrowProcess"/>
     <dgm:cxn modelId="{3AD4A5DD-ADC8-48E7-BF40-3415A2B5657A}" type="presParOf" srcId="{71406755-23F2-4109-BA41-146F988774CB}" destId="{DE40A598-37E1-4A8B-B30A-361891655E32}" srcOrd="1" destOrd="0" presId="urn:microsoft.com/office/officeart/2009/layout/CircleArrowProcess"/>
@@ -4174,6 +4258,13 @@
         </dgm:presLayoutVars>
       </dgm:prSet>
       <dgm:spPr/>
+      <dgm:t>
+        <a:bodyPr/>
+        <a:lstStyle/>
+        <a:p>
+          <a:endParaRPr lang="sv-SE"/>
+        </a:p>
+      </dgm:t>
     </dgm:pt>
     <dgm:pt modelId="{C85ED1F6-1417-4DD8-9F0B-B522CDE30503}" type="pres">
       <dgm:prSet presAssocID="{A79E2A2D-7F2D-43CD-89C5-4F06702239C7}" presName="Accent1" presStyleCnt="0"/>
@@ -4192,6 +4283,13 @@
         </dgm:presLayoutVars>
       </dgm:prSet>
       <dgm:spPr/>
+      <dgm:t>
+        <a:bodyPr/>
+        <a:lstStyle/>
+        <a:p>
+          <a:endParaRPr lang="sv-SE"/>
+        </a:p>
+      </dgm:t>
     </dgm:pt>
     <dgm:pt modelId="{9E66601F-5507-4159-89CD-FE8318C483CA}" type="pres">
       <dgm:prSet presAssocID="{3A128CF5-9AE7-4EAC-9485-E88F8BE77004}" presName="Accent2" presStyleCnt="0"/>
@@ -4210,6 +4308,13 @@
         </dgm:presLayoutVars>
       </dgm:prSet>
       <dgm:spPr/>
+      <dgm:t>
+        <a:bodyPr/>
+        <a:lstStyle/>
+        <a:p>
+          <a:endParaRPr lang="sv-SE"/>
+        </a:p>
+      </dgm:t>
     </dgm:pt>
     <dgm:pt modelId="{2D7E4C0B-382B-42B1-A371-45C4C315ACE4}" type="pres">
       <dgm:prSet presAssocID="{3E974AE7-F6F7-44CE-AA7A-02FBDD58B1F1}" presName="Accent3" presStyleCnt="0"/>
@@ -4228,16 +4333,23 @@
         </dgm:presLayoutVars>
       </dgm:prSet>
       <dgm:spPr/>
+      <dgm:t>
+        <a:bodyPr/>
+        <a:lstStyle/>
+        <a:p>
+          <a:endParaRPr lang="sv-SE"/>
+        </a:p>
+      </dgm:t>
     </dgm:pt>
   </dgm:ptLst>
   <dgm:cxnLst>
+    <dgm:cxn modelId="{0CF490D5-4FC5-4FD2-80CA-22AC293CC9C5}" type="presOf" srcId="{3E974AE7-F6F7-44CE-AA7A-02FBDD58B1F1}" destId="{90083342-A34C-49F2-A9E2-A7E389073F00}" srcOrd="0" destOrd="0" presId="urn:microsoft.com/office/officeart/2009/layout/CircleArrowProcess"/>
     <dgm:cxn modelId="{DAA54803-BAA8-46A2-B693-8800EEF81E2D}" type="presOf" srcId="{3A128CF5-9AE7-4EAC-9485-E88F8BE77004}" destId="{FF94DD58-C0AC-4F2E-B336-D810E8C84263}" srcOrd="0" destOrd="0" presId="urn:microsoft.com/office/officeart/2009/layout/CircleArrowProcess"/>
+    <dgm:cxn modelId="{157A1A7C-BF9C-4030-A3D2-FC015CDAB6FE}" srcId="{E967B93F-BC7F-4FB4-BC87-6392A0B631BD}" destId="{A79E2A2D-7F2D-43CD-89C5-4F06702239C7}" srcOrd="0" destOrd="0" parTransId="{80084990-0EF9-4F24-80B5-B857B4647FC3}" sibTransId="{56F09064-C6D9-41DF-9B01-CB0B167CEDEB}"/>
+    <dgm:cxn modelId="{D240A36B-F62A-4C70-9CAD-58226B0BD43D}" srcId="{E967B93F-BC7F-4FB4-BC87-6392A0B631BD}" destId="{3E974AE7-F6F7-44CE-AA7A-02FBDD58B1F1}" srcOrd="2" destOrd="0" parTransId="{0B1B9D87-069F-4C74-8A0B-950CD6773332}" sibTransId="{73096607-54D9-4500-9B80-0F6BD95D4725}"/>
+    <dgm:cxn modelId="{F6128391-6C10-4DB8-8E61-FB636FA7803B}" type="presOf" srcId="{A79E2A2D-7F2D-43CD-89C5-4F06702239C7}" destId="{DE40A598-37E1-4A8B-B30A-361891655E32}" srcOrd="0" destOrd="0" presId="urn:microsoft.com/office/officeart/2009/layout/CircleArrowProcess"/>
     <dgm:cxn modelId="{D92D1413-62FC-4A92-B658-FA81F646084F}" type="presOf" srcId="{E967B93F-BC7F-4FB4-BC87-6392A0B631BD}" destId="{71406755-23F2-4109-BA41-146F988774CB}" srcOrd="0" destOrd="0" presId="urn:microsoft.com/office/officeart/2009/layout/CircleArrowProcess"/>
-    <dgm:cxn modelId="{D240A36B-F62A-4C70-9CAD-58226B0BD43D}" srcId="{E967B93F-BC7F-4FB4-BC87-6392A0B631BD}" destId="{3E974AE7-F6F7-44CE-AA7A-02FBDD58B1F1}" srcOrd="2" destOrd="0" parTransId="{0B1B9D87-069F-4C74-8A0B-950CD6773332}" sibTransId="{73096607-54D9-4500-9B80-0F6BD95D4725}"/>
     <dgm:cxn modelId="{801CC257-8EC3-43DF-8DA1-6CFC36AAD2A3}" srcId="{E967B93F-BC7F-4FB4-BC87-6392A0B631BD}" destId="{3A128CF5-9AE7-4EAC-9485-E88F8BE77004}" srcOrd="1" destOrd="0" parTransId="{8B28C7C3-F1D0-4BA1-9C4B-79E975C3D84A}" sibTransId="{6842B30A-4C8A-4177-9D91-676F7D95EFE3}"/>
-    <dgm:cxn modelId="{157A1A7C-BF9C-4030-A3D2-FC015CDAB6FE}" srcId="{E967B93F-BC7F-4FB4-BC87-6392A0B631BD}" destId="{A79E2A2D-7F2D-43CD-89C5-4F06702239C7}" srcOrd="0" destOrd="0" parTransId="{80084990-0EF9-4F24-80B5-B857B4647FC3}" sibTransId="{56F09064-C6D9-41DF-9B01-CB0B167CEDEB}"/>
-    <dgm:cxn modelId="{F6128391-6C10-4DB8-8E61-FB636FA7803B}" type="presOf" srcId="{A79E2A2D-7F2D-43CD-89C5-4F06702239C7}" destId="{DE40A598-37E1-4A8B-B30A-361891655E32}" srcOrd="0" destOrd="0" presId="urn:microsoft.com/office/officeart/2009/layout/CircleArrowProcess"/>
-    <dgm:cxn modelId="{0CF490D5-4FC5-4FD2-80CA-22AC293CC9C5}" type="presOf" srcId="{3E974AE7-F6F7-44CE-AA7A-02FBDD58B1F1}" destId="{90083342-A34C-49F2-A9E2-A7E389073F00}" srcOrd="0" destOrd="0" presId="urn:microsoft.com/office/officeart/2009/layout/CircleArrowProcess"/>
     <dgm:cxn modelId="{02AEF925-D09B-4AE5-AB07-5090D9B2AF66}" type="presParOf" srcId="{71406755-23F2-4109-BA41-146F988774CB}" destId="{C85ED1F6-1417-4DD8-9F0B-B522CDE30503}" srcOrd="0" destOrd="0" presId="urn:microsoft.com/office/officeart/2009/layout/CircleArrowProcess"/>
     <dgm:cxn modelId="{02284FAC-3C1A-4BBB-A07D-5028EEF9C545}" type="presParOf" srcId="{C85ED1F6-1417-4DD8-9F0B-B522CDE30503}" destId="{C215277F-04B7-4D4C-9F84-0EFFD842F138}" srcOrd="0" destOrd="0" presId="urn:microsoft.com/office/officeart/2009/layout/CircleArrowProcess"/>
     <dgm:cxn modelId="{262A2359-396F-4B4C-9A19-09B22DF2AB3F}" type="presParOf" srcId="{71406755-23F2-4109-BA41-146F988774CB}" destId="{DE40A598-37E1-4A8B-B30A-361891655E32}" srcOrd="1" destOrd="0" presId="urn:microsoft.com/office/officeart/2009/layout/CircleArrowProcess"/>
@@ -4360,7 +4472,7 @@
         </a:bodyPr>
         <a:lstStyle/>
         <a:p>
-          <a:pPr marL="0" lvl="0" indent="0" algn="ctr" defTabSz="1555750">
+          <a:pPr lvl="0" algn="ctr" defTabSz="1555750">
             <a:lnSpc>
               <a:spcPct val="90000"/>
             </a:lnSpc>
@@ -4370,7 +4482,6 @@
             <a:spcAft>
               <a:spcPct val="35000"/>
             </a:spcAft>
-            <a:buNone/>
           </a:pPr>
           <a:r>
             <a:rPr lang="sv-SE" sz="3500" kern="1200" dirty="0"/>
@@ -4478,7 +4589,7 @@
         </a:bodyPr>
         <a:lstStyle/>
         <a:p>
-          <a:pPr marL="0" lvl="0" indent="0" algn="ctr" defTabSz="1555750">
+          <a:pPr lvl="0" algn="ctr" defTabSz="1555750">
             <a:lnSpc>
               <a:spcPct val="90000"/>
             </a:lnSpc>
@@ -4488,7 +4599,6 @@
             <a:spcAft>
               <a:spcPct val="35000"/>
             </a:spcAft>
-            <a:buNone/>
           </a:pPr>
           <a:r>
             <a:rPr lang="sv-SE" sz="3500" kern="1200" dirty="0"/>
@@ -4594,7 +4704,7 @@
         </a:bodyPr>
         <a:lstStyle/>
         <a:p>
-          <a:pPr marL="0" lvl="0" indent="0" algn="ctr" defTabSz="1555750">
+          <a:pPr lvl="0" algn="ctr" defTabSz="1555750">
             <a:lnSpc>
               <a:spcPct val="90000"/>
             </a:lnSpc>
@@ -4604,7 +4714,6 @@
             <a:spcAft>
               <a:spcPct val="35000"/>
             </a:spcAft>
-            <a:buNone/>
           </a:pPr>
           <a:r>
             <a:rPr lang="sv-SE" sz="3500" kern="1200" dirty="0"/>
@@ -4724,7 +4833,7 @@
         </a:bodyPr>
         <a:lstStyle/>
         <a:p>
-          <a:pPr marL="0" lvl="0" indent="0" algn="ctr" defTabSz="1555750">
+          <a:pPr lvl="0" algn="ctr" defTabSz="1555750">
             <a:lnSpc>
               <a:spcPct val="90000"/>
             </a:lnSpc>
@@ -4734,7 +4843,6 @@
             <a:spcAft>
               <a:spcPct val="35000"/>
             </a:spcAft>
-            <a:buNone/>
           </a:pPr>
           <a:r>
             <a:rPr lang="sv-SE" sz="3500" kern="1200" dirty="0"/>
@@ -4842,7 +4950,7 @@
         </a:bodyPr>
         <a:lstStyle/>
         <a:p>
-          <a:pPr marL="0" lvl="0" indent="0" algn="ctr" defTabSz="1555750">
+          <a:pPr lvl="0" algn="ctr" defTabSz="1555750">
             <a:lnSpc>
               <a:spcPct val="90000"/>
             </a:lnSpc>
@@ -4852,7 +4960,6 @@
             <a:spcAft>
               <a:spcPct val="35000"/>
             </a:spcAft>
-            <a:buNone/>
           </a:pPr>
           <a:r>
             <a:rPr lang="sv-SE" sz="3500" kern="1200" dirty="0"/>
@@ -4958,7 +5065,7 @@
         </a:bodyPr>
         <a:lstStyle/>
         <a:p>
-          <a:pPr marL="0" lvl="0" indent="0" algn="ctr" defTabSz="1555750">
+          <a:pPr lvl="0" algn="ctr" defTabSz="1555750">
             <a:lnSpc>
               <a:spcPct val="90000"/>
             </a:lnSpc>
@@ -4968,7 +5075,6 @@
             <a:spcAft>
               <a:spcPct val="35000"/>
             </a:spcAft>
-            <a:buNone/>
           </a:pPr>
           <a:r>
             <a:rPr lang="sv-SE" sz="3500" kern="1200" dirty="0"/>
@@ -5088,7 +5194,7 @@
         </a:bodyPr>
         <a:lstStyle/>
         <a:p>
-          <a:pPr marL="0" lvl="0" indent="0" algn="ctr" defTabSz="1555750">
+          <a:pPr lvl="0" algn="ctr" defTabSz="1555750">
             <a:lnSpc>
               <a:spcPct val="90000"/>
             </a:lnSpc>
@@ -5098,7 +5204,6 @@
             <a:spcAft>
               <a:spcPct val="35000"/>
             </a:spcAft>
-            <a:buNone/>
           </a:pPr>
           <a:r>
             <a:rPr lang="sv-SE" sz="3500" kern="1200" dirty="0"/>
@@ -5206,7 +5311,7 @@
         </a:bodyPr>
         <a:lstStyle/>
         <a:p>
-          <a:pPr marL="0" lvl="0" indent="0" algn="ctr" defTabSz="1555750">
+          <a:pPr lvl="0" algn="ctr" defTabSz="1555750">
             <a:lnSpc>
               <a:spcPct val="90000"/>
             </a:lnSpc>
@@ -5216,7 +5321,6 @@
             <a:spcAft>
               <a:spcPct val="35000"/>
             </a:spcAft>
-            <a:buNone/>
           </a:pPr>
           <a:r>
             <a:rPr lang="sv-SE" sz="3500" kern="1200" dirty="0"/>
@@ -5322,7 +5426,7 @@
         </a:bodyPr>
         <a:lstStyle/>
         <a:p>
-          <a:pPr marL="0" lvl="0" indent="0" algn="ctr" defTabSz="1555750">
+          <a:pPr lvl="0" algn="ctr" defTabSz="1555750">
             <a:lnSpc>
               <a:spcPct val="90000"/>
             </a:lnSpc>
@@ -5332,7 +5436,6 @@
             <a:spcAft>
               <a:spcPct val="35000"/>
             </a:spcAft>
-            <a:buNone/>
           </a:pPr>
           <a:r>
             <a:rPr lang="sv-SE" sz="3500" kern="1200" dirty="0"/>
@@ -5452,7 +5555,7 @@
         </a:bodyPr>
         <a:lstStyle/>
         <a:p>
-          <a:pPr marL="0" lvl="0" indent="0" algn="ctr" defTabSz="1555750">
+          <a:pPr lvl="0" algn="ctr" defTabSz="1555750">
             <a:lnSpc>
               <a:spcPct val="90000"/>
             </a:lnSpc>
@@ -5462,7 +5565,6 @@
             <a:spcAft>
               <a:spcPct val="35000"/>
             </a:spcAft>
-            <a:buNone/>
           </a:pPr>
           <a:r>
             <a:rPr lang="sv-SE" sz="3500" kern="1200" dirty="0"/>
@@ -5570,7 +5672,7 @@
         </a:bodyPr>
         <a:lstStyle/>
         <a:p>
-          <a:pPr marL="0" lvl="0" indent="0" algn="ctr" defTabSz="1555750">
+          <a:pPr lvl="0" algn="ctr" defTabSz="1555750">
             <a:lnSpc>
               <a:spcPct val="90000"/>
             </a:lnSpc>
@@ -5580,7 +5682,6 @@
             <a:spcAft>
               <a:spcPct val="35000"/>
             </a:spcAft>
-            <a:buNone/>
           </a:pPr>
           <a:r>
             <a:rPr lang="sv-SE" sz="3500" kern="1200" dirty="0"/>
@@ -5686,7 +5787,7 @@
         </a:bodyPr>
         <a:lstStyle/>
         <a:p>
-          <a:pPr marL="0" lvl="0" indent="0" algn="ctr" defTabSz="1555750">
+          <a:pPr lvl="0" algn="ctr" defTabSz="1555750">
             <a:lnSpc>
               <a:spcPct val="90000"/>
             </a:lnSpc>
@@ -5696,7 +5797,6 @@
             <a:spcAft>
               <a:spcPct val="35000"/>
             </a:spcAft>
-            <a:buNone/>
           </a:pPr>
           <a:r>
             <a:rPr lang="sv-SE" sz="3500" kern="1200" dirty="0"/>
@@ -18176,7 +18276,7 @@
           <p:cNvPr id="2" name="Title 1">
             <a:extLst>
               <a:ext uri="{FF2B5EF4-FFF2-40B4-BE49-F238E27FC236}">
-                <a16:creationId xmlns:a16="http://schemas.microsoft.com/office/drawing/2014/main" id="{38809996-FD0E-4D06-9105-CA4D02CD18B8}"/>
+                <a16:creationId xmlns:a16="http://schemas.microsoft.com/office/drawing/2014/main" xmlns="" id="{38809996-FD0E-4D06-9105-CA4D02CD18B8}"/>
               </a:ext>
             </a:extLst>
           </p:cNvPr>
@@ -18213,7 +18313,7 @@
           <p:cNvPr id="3" name="Subtitle 2">
             <a:extLst>
               <a:ext uri="{FF2B5EF4-FFF2-40B4-BE49-F238E27FC236}">
-                <a16:creationId xmlns:a16="http://schemas.microsoft.com/office/drawing/2014/main" id="{F4B5C0B2-8A4C-4F8A-950C-1720ED26E84E}"/>
+                <a16:creationId xmlns:a16="http://schemas.microsoft.com/office/drawing/2014/main" xmlns="" id="{F4B5C0B2-8A4C-4F8A-950C-1720ED26E84E}"/>
               </a:ext>
             </a:extLst>
           </p:cNvPr>
@@ -18283,7 +18383,7 @@
           <p:cNvPr id="4" name="Date Placeholder 3">
             <a:extLst>
               <a:ext uri="{FF2B5EF4-FFF2-40B4-BE49-F238E27FC236}">
-                <a16:creationId xmlns:a16="http://schemas.microsoft.com/office/drawing/2014/main" id="{3F9EBE98-590E-4431-AB5E-9B0B41A8A01E}"/>
+                <a16:creationId xmlns:a16="http://schemas.microsoft.com/office/drawing/2014/main" xmlns="" id="{3F9EBE98-590E-4431-AB5E-9B0B41A8A01E}"/>
               </a:ext>
             </a:extLst>
           </p:cNvPr>
@@ -18301,7 +18401,7 @@
           <a:p>
             <a:fld id="{CACABD52-BF91-4CCE-9EEC-6A02225A646E}" type="datetimeFigureOut">
               <a:rPr lang="en-US" smtClean="0"/>
-              <a:t>2017-12-28</a:t>
+              <a:t>2/5/2018</a:t>
             </a:fld>
             <a:endParaRPr lang="en-US"/>
           </a:p>
@@ -18312,7 +18412,7 @@
           <p:cNvPr id="5" name="Footer Placeholder 4">
             <a:extLst>
               <a:ext uri="{FF2B5EF4-FFF2-40B4-BE49-F238E27FC236}">
-                <a16:creationId xmlns:a16="http://schemas.microsoft.com/office/drawing/2014/main" id="{9079E9AE-9DD9-4CDB-BB86-1AAC9BD03C3A}"/>
+                <a16:creationId xmlns:a16="http://schemas.microsoft.com/office/drawing/2014/main" xmlns="" id="{9079E9AE-9DD9-4CDB-BB86-1AAC9BD03C3A}"/>
               </a:ext>
             </a:extLst>
           </p:cNvPr>
@@ -18337,7 +18437,7 @@
           <p:cNvPr id="6" name="Slide Number Placeholder 5">
             <a:extLst>
               <a:ext uri="{FF2B5EF4-FFF2-40B4-BE49-F238E27FC236}">
-                <a16:creationId xmlns:a16="http://schemas.microsoft.com/office/drawing/2014/main" id="{FC4A9CAB-8CD4-4C79-BA87-3E9312D0C8A8}"/>
+                <a16:creationId xmlns:a16="http://schemas.microsoft.com/office/drawing/2014/main" xmlns="" id="{FC4A9CAB-8CD4-4C79-BA87-3E9312D0C8A8}"/>
               </a:ext>
             </a:extLst>
           </p:cNvPr>
@@ -18396,7 +18496,7 @@
           <p:cNvPr id="2" name="Title 1">
             <a:extLst>
               <a:ext uri="{FF2B5EF4-FFF2-40B4-BE49-F238E27FC236}">
-                <a16:creationId xmlns:a16="http://schemas.microsoft.com/office/drawing/2014/main" id="{44AAC031-47FD-42F7-98FD-EF67FAFD8504}"/>
+                <a16:creationId xmlns:a16="http://schemas.microsoft.com/office/drawing/2014/main" xmlns="" id="{44AAC031-47FD-42F7-98FD-EF67FAFD8504}"/>
               </a:ext>
             </a:extLst>
           </p:cNvPr>
@@ -18424,7 +18524,7 @@
           <p:cNvPr id="3" name="Vertical Text Placeholder 2">
             <a:extLst>
               <a:ext uri="{FF2B5EF4-FFF2-40B4-BE49-F238E27FC236}">
-                <a16:creationId xmlns:a16="http://schemas.microsoft.com/office/drawing/2014/main" id="{F940540A-38C9-42A6-88EE-93C27F9CF251}"/>
+                <a16:creationId xmlns:a16="http://schemas.microsoft.com/office/drawing/2014/main" xmlns="" id="{F940540A-38C9-42A6-88EE-93C27F9CF251}"/>
               </a:ext>
             </a:extLst>
           </p:cNvPr>
@@ -18481,7 +18581,7 @@
           <p:cNvPr id="4" name="Date Placeholder 3">
             <a:extLst>
               <a:ext uri="{FF2B5EF4-FFF2-40B4-BE49-F238E27FC236}">
-                <a16:creationId xmlns:a16="http://schemas.microsoft.com/office/drawing/2014/main" id="{7BBA4C03-528E-42F3-B006-6C00F986D9A0}"/>
+                <a16:creationId xmlns:a16="http://schemas.microsoft.com/office/drawing/2014/main" xmlns="" id="{7BBA4C03-528E-42F3-B006-6C00F986D9A0}"/>
               </a:ext>
             </a:extLst>
           </p:cNvPr>
@@ -18499,7 +18599,7 @@
           <a:p>
             <a:fld id="{CACABD52-BF91-4CCE-9EEC-6A02225A646E}" type="datetimeFigureOut">
               <a:rPr lang="en-US" smtClean="0"/>
-              <a:t>2017-12-28</a:t>
+              <a:t>2/5/2018</a:t>
             </a:fld>
             <a:endParaRPr lang="en-US"/>
           </a:p>
@@ -18510,7 +18610,7 @@
           <p:cNvPr id="5" name="Footer Placeholder 4">
             <a:extLst>
               <a:ext uri="{FF2B5EF4-FFF2-40B4-BE49-F238E27FC236}">
-                <a16:creationId xmlns:a16="http://schemas.microsoft.com/office/drawing/2014/main" id="{ED8875F2-E3C5-4AE4-A309-0392C9C665F7}"/>
+                <a16:creationId xmlns:a16="http://schemas.microsoft.com/office/drawing/2014/main" xmlns="" id="{ED8875F2-E3C5-4AE4-A309-0392C9C665F7}"/>
               </a:ext>
             </a:extLst>
           </p:cNvPr>
@@ -18535,7 +18635,7 @@
           <p:cNvPr id="6" name="Slide Number Placeholder 5">
             <a:extLst>
               <a:ext uri="{FF2B5EF4-FFF2-40B4-BE49-F238E27FC236}">
-                <a16:creationId xmlns:a16="http://schemas.microsoft.com/office/drawing/2014/main" id="{59901938-1E8B-4CBD-ADCC-73C8496F4D53}"/>
+                <a16:creationId xmlns:a16="http://schemas.microsoft.com/office/drawing/2014/main" xmlns="" id="{59901938-1E8B-4CBD-ADCC-73C8496F4D53}"/>
               </a:ext>
             </a:extLst>
           </p:cNvPr>
@@ -18594,7 +18694,7 @@
           <p:cNvPr id="2" name="Vertical Title 1">
             <a:extLst>
               <a:ext uri="{FF2B5EF4-FFF2-40B4-BE49-F238E27FC236}">
-                <a16:creationId xmlns:a16="http://schemas.microsoft.com/office/drawing/2014/main" id="{9B24AD40-9F90-441E-B3CD-06BCD4159D89}"/>
+                <a16:creationId xmlns:a16="http://schemas.microsoft.com/office/drawing/2014/main" xmlns="" id="{9B24AD40-9F90-441E-B3CD-06BCD4159D89}"/>
               </a:ext>
             </a:extLst>
           </p:cNvPr>
@@ -18627,7 +18727,7 @@
           <p:cNvPr id="3" name="Vertical Text Placeholder 2">
             <a:extLst>
               <a:ext uri="{FF2B5EF4-FFF2-40B4-BE49-F238E27FC236}">
-                <a16:creationId xmlns:a16="http://schemas.microsoft.com/office/drawing/2014/main" id="{B74361D9-50A9-49B2-AADE-3827E420C64B}"/>
+                <a16:creationId xmlns:a16="http://schemas.microsoft.com/office/drawing/2014/main" xmlns="" id="{B74361D9-50A9-49B2-AADE-3827E420C64B}"/>
               </a:ext>
             </a:extLst>
           </p:cNvPr>
@@ -18689,7 +18789,7 @@
           <p:cNvPr id="4" name="Date Placeholder 3">
             <a:extLst>
               <a:ext uri="{FF2B5EF4-FFF2-40B4-BE49-F238E27FC236}">
-                <a16:creationId xmlns:a16="http://schemas.microsoft.com/office/drawing/2014/main" id="{7F22F958-0D54-4BDA-999D-E0C058886540}"/>
+                <a16:creationId xmlns:a16="http://schemas.microsoft.com/office/drawing/2014/main" xmlns="" id="{7F22F958-0D54-4BDA-999D-E0C058886540}"/>
               </a:ext>
             </a:extLst>
           </p:cNvPr>
@@ -18707,7 +18807,7 @@
           <a:p>
             <a:fld id="{CACABD52-BF91-4CCE-9EEC-6A02225A646E}" type="datetimeFigureOut">
               <a:rPr lang="en-US" smtClean="0"/>
-              <a:t>2017-12-28</a:t>
+              <a:t>2/5/2018</a:t>
             </a:fld>
             <a:endParaRPr lang="en-US"/>
           </a:p>
@@ -18718,7 +18818,7 @@
           <p:cNvPr id="5" name="Footer Placeholder 4">
             <a:extLst>
               <a:ext uri="{FF2B5EF4-FFF2-40B4-BE49-F238E27FC236}">
-                <a16:creationId xmlns:a16="http://schemas.microsoft.com/office/drawing/2014/main" id="{D08C878B-2A4A-49CD-99FF-A2D91560EE82}"/>
+                <a16:creationId xmlns:a16="http://schemas.microsoft.com/office/drawing/2014/main" xmlns="" id="{D08C878B-2A4A-49CD-99FF-A2D91560EE82}"/>
               </a:ext>
             </a:extLst>
           </p:cNvPr>
@@ -18743,7 +18843,7 @@
           <p:cNvPr id="6" name="Slide Number Placeholder 5">
             <a:extLst>
               <a:ext uri="{FF2B5EF4-FFF2-40B4-BE49-F238E27FC236}">
-                <a16:creationId xmlns:a16="http://schemas.microsoft.com/office/drawing/2014/main" id="{7F6F18DB-03CB-4B93-A607-07373FECE861}"/>
+                <a16:creationId xmlns:a16="http://schemas.microsoft.com/office/drawing/2014/main" xmlns="" id="{7F6F18DB-03CB-4B93-A607-07373FECE861}"/>
               </a:ext>
             </a:extLst>
           </p:cNvPr>
@@ -18802,7 +18902,7 @@
           <p:cNvPr id="2" name="Title 1">
             <a:extLst>
               <a:ext uri="{FF2B5EF4-FFF2-40B4-BE49-F238E27FC236}">
-                <a16:creationId xmlns:a16="http://schemas.microsoft.com/office/drawing/2014/main" id="{8FB510DB-06DE-4AAA-BDD8-FA07F2218D44}"/>
+                <a16:creationId xmlns:a16="http://schemas.microsoft.com/office/drawing/2014/main" xmlns="" id="{8FB510DB-06DE-4AAA-BDD8-FA07F2218D44}"/>
               </a:ext>
             </a:extLst>
           </p:cNvPr>
@@ -18830,7 +18930,7 @@
           <p:cNvPr id="3" name="Content Placeholder 2">
             <a:extLst>
               <a:ext uri="{FF2B5EF4-FFF2-40B4-BE49-F238E27FC236}">
-                <a16:creationId xmlns:a16="http://schemas.microsoft.com/office/drawing/2014/main" id="{89739ADC-B421-43D0-BE43-47DFF5BFDE19}"/>
+                <a16:creationId xmlns:a16="http://schemas.microsoft.com/office/drawing/2014/main" xmlns="" id="{89739ADC-B421-43D0-BE43-47DFF5BFDE19}"/>
               </a:ext>
             </a:extLst>
           </p:cNvPr>
@@ -18887,7 +18987,7 @@
           <p:cNvPr id="4" name="Date Placeholder 3">
             <a:extLst>
               <a:ext uri="{FF2B5EF4-FFF2-40B4-BE49-F238E27FC236}">
-                <a16:creationId xmlns:a16="http://schemas.microsoft.com/office/drawing/2014/main" id="{1CB7D97A-A3BB-44A1-806C-A8AD62C7278F}"/>
+                <a16:creationId xmlns:a16="http://schemas.microsoft.com/office/drawing/2014/main" xmlns="" id="{1CB7D97A-A3BB-44A1-806C-A8AD62C7278F}"/>
               </a:ext>
             </a:extLst>
           </p:cNvPr>
@@ -18905,7 +19005,7 @@
           <a:p>
             <a:fld id="{CACABD52-BF91-4CCE-9EEC-6A02225A646E}" type="datetimeFigureOut">
               <a:rPr lang="en-US" smtClean="0"/>
-              <a:t>2017-12-28</a:t>
+              <a:t>2/5/2018</a:t>
             </a:fld>
             <a:endParaRPr lang="en-US"/>
           </a:p>
@@ -18916,7 +19016,7 @@
           <p:cNvPr id="5" name="Footer Placeholder 4">
             <a:extLst>
               <a:ext uri="{FF2B5EF4-FFF2-40B4-BE49-F238E27FC236}">
-                <a16:creationId xmlns:a16="http://schemas.microsoft.com/office/drawing/2014/main" id="{7DEAD42F-6AB4-4248-AC38-9039155A9DD0}"/>
+                <a16:creationId xmlns:a16="http://schemas.microsoft.com/office/drawing/2014/main" xmlns="" id="{7DEAD42F-6AB4-4248-AC38-9039155A9DD0}"/>
               </a:ext>
             </a:extLst>
           </p:cNvPr>
@@ -18941,7 +19041,7 @@
           <p:cNvPr id="6" name="Slide Number Placeholder 5">
             <a:extLst>
               <a:ext uri="{FF2B5EF4-FFF2-40B4-BE49-F238E27FC236}">
-                <a16:creationId xmlns:a16="http://schemas.microsoft.com/office/drawing/2014/main" id="{921A2A62-D7C3-461A-B4FA-673F07E09149}"/>
+                <a16:creationId xmlns:a16="http://schemas.microsoft.com/office/drawing/2014/main" xmlns="" id="{921A2A62-D7C3-461A-B4FA-673F07E09149}"/>
               </a:ext>
             </a:extLst>
           </p:cNvPr>
@@ -19000,7 +19100,7 @@
           <p:cNvPr id="2" name="Title 1">
             <a:extLst>
               <a:ext uri="{FF2B5EF4-FFF2-40B4-BE49-F238E27FC236}">
-                <a16:creationId xmlns:a16="http://schemas.microsoft.com/office/drawing/2014/main" id="{D3EC2B89-DE66-4A09-A1A8-0B5FBF95170B}"/>
+                <a16:creationId xmlns:a16="http://schemas.microsoft.com/office/drawing/2014/main" xmlns="" id="{D3EC2B89-DE66-4A09-A1A8-0B5FBF95170B}"/>
               </a:ext>
             </a:extLst>
           </p:cNvPr>
@@ -19037,7 +19137,7 @@
           <p:cNvPr id="3" name="Text Placeholder 2">
             <a:extLst>
               <a:ext uri="{FF2B5EF4-FFF2-40B4-BE49-F238E27FC236}">
-                <a16:creationId xmlns:a16="http://schemas.microsoft.com/office/drawing/2014/main" id="{8CED882E-A08F-4FF3-887F-2701DD1A3CEF}"/>
+                <a16:creationId xmlns:a16="http://schemas.microsoft.com/office/drawing/2014/main" xmlns="" id="{8CED882E-A08F-4FF3-887F-2701DD1A3CEF}"/>
               </a:ext>
             </a:extLst>
           </p:cNvPr>
@@ -19162,7 +19262,7 @@
           <p:cNvPr id="4" name="Date Placeholder 3">
             <a:extLst>
               <a:ext uri="{FF2B5EF4-FFF2-40B4-BE49-F238E27FC236}">
-                <a16:creationId xmlns:a16="http://schemas.microsoft.com/office/drawing/2014/main" id="{E1FD4AEF-2DAD-4E82-9A3B-1B5493C84A37}"/>
+                <a16:creationId xmlns:a16="http://schemas.microsoft.com/office/drawing/2014/main" xmlns="" id="{E1FD4AEF-2DAD-4E82-9A3B-1B5493C84A37}"/>
               </a:ext>
             </a:extLst>
           </p:cNvPr>
@@ -19180,7 +19280,7 @@
           <a:p>
             <a:fld id="{CACABD52-BF91-4CCE-9EEC-6A02225A646E}" type="datetimeFigureOut">
               <a:rPr lang="en-US" smtClean="0"/>
-              <a:t>2017-12-28</a:t>
+              <a:t>2/5/2018</a:t>
             </a:fld>
             <a:endParaRPr lang="en-US"/>
           </a:p>
@@ -19191,7 +19291,7 @@
           <p:cNvPr id="5" name="Footer Placeholder 4">
             <a:extLst>
               <a:ext uri="{FF2B5EF4-FFF2-40B4-BE49-F238E27FC236}">
-                <a16:creationId xmlns:a16="http://schemas.microsoft.com/office/drawing/2014/main" id="{F51F1357-D870-47CC-BEB9-41F9B9A25041}"/>
+                <a16:creationId xmlns:a16="http://schemas.microsoft.com/office/drawing/2014/main" xmlns="" id="{F51F1357-D870-47CC-BEB9-41F9B9A25041}"/>
               </a:ext>
             </a:extLst>
           </p:cNvPr>
@@ -19216,7 +19316,7 @@
           <p:cNvPr id="6" name="Slide Number Placeholder 5">
             <a:extLst>
               <a:ext uri="{FF2B5EF4-FFF2-40B4-BE49-F238E27FC236}">
-                <a16:creationId xmlns:a16="http://schemas.microsoft.com/office/drawing/2014/main" id="{A64956B2-B0C5-4472-92F3-5D4EECF7B18C}"/>
+                <a16:creationId xmlns:a16="http://schemas.microsoft.com/office/drawing/2014/main" xmlns="" id="{A64956B2-B0C5-4472-92F3-5D4EECF7B18C}"/>
               </a:ext>
             </a:extLst>
           </p:cNvPr>
@@ -19275,7 +19375,7 @@
           <p:cNvPr id="2" name="Title 1">
             <a:extLst>
               <a:ext uri="{FF2B5EF4-FFF2-40B4-BE49-F238E27FC236}">
-                <a16:creationId xmlns:a16="http://schemas.microsoft.com/office/drawing/2014/main" id="{EABFB98B-058E-4646-B2D2-41B744B1A0A4}"/>
+                <a16:creationId xmlns:a16="http://schemas.microsoft.com/office/drawing/2014/main" xmlns="" id="{EABFB98B-058E-4646-B2D2-41B744B1A0A4}"/>
               </a:ext>
             </a:extLst>
           </p:cNvPr>
@@ -19303,7 +19403,7 @@
           <p:cNvPr id="3" name="Content Placeholder 2">
             <a:extLst>
               <a:ext uri="{FF2B5EF4-FFF2-40B4-BE49-F238E27FC236}">
-                <a16:creationId xmlns:a16="http://schemas.microsoft.com/office/drawing/2014/main" id="{6803D61E-3276-408C-A6CF-DBCFECD13A3E}"/>
+                <a16:creationId xmlns:a16="http://schemas.microsoft.com/office/drawing/2014/main" xmlns="" id="{6803D61E-3276-408C-A6CF-DBCFECD13A3E}"/>
               </a:ext>
             </a:extLst>
           </p:cNvPr>
@@ -19365,7 +19465,7 @@
           <p:cNvPr id="4" name="Content Placeholder 3">
             <a:extLst>
               <a:ext uri="{FF2B5EF4-FFF2-40B4-BE49-F238E27FC236}">
-                <a16:creationId xmlns:a16="http://schemas.microsoft.com/office/drawing/2014/main" id="{61C32ADE-FE92-459B-9667-7D3E3CEACD34}"/>
+                <a16:creationId xmlns:a16="http://schemas.microsoft.com/office/drawing/2014/main" xmlns="" id="{61C32ADE-FE92-459B-9667-7D3E3CEACD34}"/>
               </a:ext>
             </a:extLst>
           </p:cNvPr>
@@ -19427,7 +19527,7 @@
           <p:cNvPr id="5" name="Date Placeholder 4">
             <a:extLst>
               <a:ext uri="{FF2B5EF4-FFF2-40B4-BE49-F238E27FC236}">
-                <a16:creationId xmlns:a16="http://schemas.microsoft.com/office/drawing/2014/main" id="{AA5C3425-1D21-4103-982C-CBB3F24532F8}"/>
+                <a16:creationId xmlns:a16="http://schemas.microsoft.com/office/drawing/2014/main" xmlns="" id="{AA5C3425-1D21-4103-982C-CBB3F24532F8}"/>
               </a:ext>
             </a:extLst>
           </p:cNvPr>
@@ -19445,7 +19545,7 @@
           <a:p>
             <a:fld id="{CACABD52-BF91-4CCE-9EEC-6A02225A646E}" type="datetimeFigureOut">
               <a:rPr lang="en-US" smtClean="0"/>
-              <a:t>2017-12-28</a:t>
+              <a:t>2/5/2018</a:t>
             </a:fld>
             <a:endParaRPr lang="en-US"/>
           </a:p>
@@ -19456,7 +19556,7 @@
           <p:cNvPr id="6" name="Footer Placeholder 5">
             <a:extLst>
               <a:ext uri="{FF2B5EF4-FFF2-40B4-BE49-F238E27FC236}">
-                <a16:creationId xmlns:a16="http://schemas.microsoft.com/office/drawing/2014/main" id="{8329BAC1-E5E4-4AE3-AB13-1C2026A99E43}"/>
+                <a16:creationId xmlns:a16="http://schemas.microsoft.com/office/drawing/2014/main" xmlns="" id="{8329BAC1-E5E4-4AE3-AB13-1C2026A99E43}"/>
               </a:ext>
             </a:extLst>
           </p:cNvPr>
@@ -19481,7 +19581,7 @@
           <p:cNvPr id="7" name="Slide Number Placeholder 6">
             <a:extLst>
               <a:ext uri="{FF2B5EF4-FFF2-40B4-BE49-F238E27FC236}">
-                <a16:creationId xmlns:a16="http://schemas.microsoft.com/office/drawing/2014/main" id="{6C6CF1CA-09C2-4A33-B916-07E421F331B0}"/>
+                <a16:creationId xmlns:a16="http://schemas.microsoft.com/office/drawing/2014/main" xmlns="" id="{6C6CF1CA-09C2-4A33-B916-07E421F331B0}"/>
               </a:ext>
             </a:extLst>
           </p:cNvPr>
@@ -19540,7 +19640,7 @@
           <p:cNvPr id="2" name="Title 1">
             <a:extLst>
               <a:ext uri="{FF2B5EF4-FFF2-40B4-BE49-F238E27FC236}">
-                <a16:creationId xmlns:a16="http://schemas.microsoft.com/office/drawing/2014/main" id="{A1425347-21FB-44DF-B884-E37BC9F395E5}"/>
+                <a16:creationId xmlns:a16="http://schemas.microsoft.com/office/drawing/2014/main" xmlns="" id="{A1425347-21FB-44DF-B884-E37BC9F395E5}"/>
               </a:ext>
             </a:extLst>
           </p:cNvPr>
@@ -19573,7 +19673,7 @@
           <p:cNvPr id="3" name="Text Placeholder 2">
             <a:extLst>
               <a:ext uri="{FF2B5EF4-FFF2-40B4-BE49-F238E27FC236}">
-                <a16:creationId xmlns:a16="http://schemas.microsoft.com/office/drawing/2014/main" id="{10FCB843-1A4E-484E-BFFD-E5A33AA5A1BA}"/>
+                <a16:creationId xmlns:a16="http://schemas.microsoft.com/office/drawing/2014/main" xmlns="" id="{10FCB843-1A4E-484E-BFFD-E5A33AA5A1BA}"/>
               </a:ext>
             </a:extLst>
           </p:cNvPr>
@@ -19644,7 +19744,7 @@
           <p:cNvPr id="4" name="Content Placeholder 3">
             <a:extLst>
               <a:ext uri="{FF2B5EF4-FFF2-40B4-BE49-F238E27FC236}">
-                <a16:creationId xmlns:a16="http://schemas.microsoft.com/office/drawing/2014/main" id="{A9302C9B-AE8D-4BC0-BA1A-C5E20BCD7028}"/>
+                <a16:creationId xmlns:a16="http://schemas.microsoft.com/office/drawing/2014/main" xmlns="" id="{A9302C9B-AE8D-4BC0-BA1A-C5E20BCD7028}"/>
               </a:ext>
             </a:extLst>
           </p:cNvPr>
@@ -19706,7 +19806,7 @@
           <p:cNvPr id="5" name="Text Placeholder 4">
             <a:extLst>
               <a:ext uri="{FF2B5EF4-FFF2-40B4-BE49-F238E27FC236}">
-                <a16:creationId xmlns:a16="http://schemas.microsoft.com/office/drawing/2014/main" id="{CD27FDF8-B188-4B1D-8742-7E0AA837AACF}"/>
+                <a16:creationId xmlns:a16="http://schemas.microsoft.com/office/drawing/2014/main" xmlns="" id="{CD27FDF8-B188-4B1D-8742-7E0AA837AACF}"/>
               </a:ext>
             </a:extLst>
           </p:cNvPr>
@@ -19777,7 +19877,7 @@
           <p:cNvPr id="6" name="Content Placeholder 5">
             <a:extLst>
               <a:ext uri="{FF2B5EF4-FFF2-40B4-BE49-F238E27FC236}">
-                <a16:creationId xmlns:a16="http://schemas.microsoft.com/office/drawing/2014/main" id="{E1A95380-C50D-4E52-B728-84873FB27C11}"/>
+                <a16:creationId xmlns:a16="http://schemas.microsoft.com/office/drawing/2014/main" xmlns="" id="{E1A95380-C50D-4E52-B728-84873FB27C11}"/>
               </a:ext>
             </a:extLst>
           </p:cNvPr>
@@ -19839,7 +19939,7 @@
           <p:cNvPr id="7" name="Date Placeholder 6">
             <a:extLst>
               <a:ext uri="{FF2B5EF4-FFF2-40B4-BE49-F238E27FC236}">
-                <a16:creationId xmlns:a16="http://schemas.microsoft.com/office/drawing/2014/main" id="{B4C33C57-B7A8-4001-A94F-EA1EDCAC6DDA}"/>
+                <a16:creationId xmlns:a16="http://schemas.microsoft.com/office/drawing/2014/main" xmlns="" id="{B4C33C57-B7A8-4001-A94F-EA1EDCAC6DDA}"/>
               </a:ext>
             </a:extLst>
           </p:cNvPr>
@@ -19857,7 +19957,7 @@
           <a:p>
             <a:fld id="{CACABD52-BF91-4CCE-9EEC-6A02225A646E}" type="datetimeFigureOut">
               <a:rPr lang="en-US" smtClean="0"/>
-              <a:t>2017-12-28</a:t>
+              <a:t>2/5/2018</a:t>
             </a:fld>
             <a:endParaRPr lang="en-US"/>
           </a:p>
@@ -19868,7 +19968,7 @@
           <p:cNvPr id="8" name="Footer Placeholder 7">
             <a:extLst>
               <a:ext uri="{FF2B5EF4-FFF2-40B4-BE49-F238E27FC236}">
-                <a16:creationId xmlns:a16="http://schemas.microsoft.com/office/drawing/2014/main" id="{0F445291-F30E-4913-B074-8D1F2B0BE100}"/>
+                <a16:creationId xmlns:a16="http://schemas.microsoft.com/office/drawing/2014/main" xmlns="" id="{0F445291-F30E-4913-B074-8D1F2B0BE100}"/>
               </a:ext>
             </a:extLst>
           </p:cNvPr>
@@ -19893,7 +19993,7 @@
           <p:cNvPr id="9" name="Slide Number Placeholder 8">
             <a:extLst>
               <a:ext uri="{FF2B5EF4-FFF2-40B4-BE49-F238E27FC236}">
-                <a16:creationId xmlns:a16="http://schemas.microsoft.com/office/drawing/2014/main" id="{D47A2067-EF69-45A2-897C-EC9B3020412E}"/>
+                <a16:creationId xmlns:a16="http://schemas.microsoft.com/office/drawing/2014/main" xmlns="" id="{D47A2067-EF69-45A2-897C-EC9B3020412E}"/>
               </a:ext>
             </a:extLst>
           </p:cNvPr>
@@ -19952,7 +20052,7 @@
           <p:cNvPr id="2" name="Title 1">
             <a:extLst>
               <a:ext uri="{FF2B5EF4-FFF2-40B4-BE49-F238E27FC236}">
-                <a16:creationId xmlns:a16="http://schemas.microsoft.com/office/drawing/2014/main" id="{5897FFA4-EBF8-4ED7-B54B-F14702E84B63}"/>
+                <a16:creationId xmlns:a16="http://schemas.microsoft.com/office/drawing/2014/main" xmlns="" id="{5897FFA4-EBF8-4ED7-B54B-F14702E84B63}"/>
               </a:ext>
             </a:extLst>
           </p:cNvPr>
@@ -19980,7 +20080,7 @@
           <p:cNvPr id="3" name="Date Placeholder 2">
             <a:extLst>
               <a:ext uri="{FF2B5EF4-FFF2-40B4-BE49-F238E27FC236}">
-                <a16:creationId xmlns:a16="http://schemas.microsoft.com/office/drawing/2014/main" id="{C5E02E21-09EB-46F5-9088-2AE3AC08EC9E}"/>
+                <a16:creationId xmlns:a16="http://schemas.microsoft.com/office/drawing/2014/main" xmlns="" id="{C5E02E21-09EB-46F5-9088-2AE3AC08EC9E}"/>
               </a:ext>
             </a:extLst>
           </p:cNvPr>
@@ -19998,7 +20098,7 @@
           <a:p>
             <a:fld id="{CACABD52-BF91-4CCE-9EEC-6A02225A646E}" type="datetimeFigureOut">
               <a:rPr lang="en-US" smtClean="0"/>
-              <a:t>2017-12-28</a:t>
+              <a:t>2/5/2018</a:t>
             </a:fld>
             <a:endParaRPr lang="en-US"/>
           </a:p>
@@ -20009,7 +20109,7 @@
           <p:cNvPr id="4" name="Footer Placeholder 3">
             <a:extLst>
               <a:ext uri="{FF2B5EF4-FFF2-40B4-BE49-F238E27FC236}">
-                <a16:creationId xmlns:a16="http://schemas.microsoft.com/office/drawing/2014/main" id="{EE6BC8B5-5449-4D2A-8497-FFC8B77BAF4F}"/>
+                <a16:creationId xmlns:a16="http://schemas.microsoft.com/office/drawing/2014/main" xmlns="" id="{EE6BC8B5-5449-4D2A-8497-FFC8B77BAF4F}"/>
               </a:ext>
             </a:extLst>
           </p:cNvPr>
@@ -20034,7 +20134,7 @@
           <p:cNvPr id="5" name="Slide Number Placeholder 4">
             <a:extLst>
               <a:ext uri="{FF2B5EF4-FFF2-40B4-BE49-F238E27FC236}">
-                <a16:creationId xmlns:a16="http://schemas.microsoft.com/office/drawing/2014/main" id="{7AD3CBB2-19BF-40F9-83B8-566D1EAB7777}"/>
+                <a16:creationId xmlns:a16="http://schemas.microsoft.com/office/drawing/2014/main" xmlns="" id="{7AD3CBB2-19BF-40F9-83B8-566D1EAB7777}"/>
               </a:ext>
             </a:extLst>
           </p:cNvPr>
@@ -20093,7 +20193,7 @@
           <p:cNvPr id="2" name="Date Placeholder 1">
             <a:extLst>
               <a:ext uri="{FF2B5EF4-FFF2-40B4-BE49-F238E27FC236}">
-                <a16:creationId xmlns:a16="http://schemas.microsoft.com/office/drawing/2014/main" id="{1C0D7943-B554-4E88-86D3-37CE1D6FC6D3}"/>
+                <a16:creationId xmlns:a16="http://schemas.microsoft.com/office/drawing/2014/main" xmlns="" id="{1C0D7943-B554-4E88-86D3-37CE1D6FC6D3}"/>
               </a:ext>
             </a:extLst>
           </p:cNvPr>
@@ -20111,7 +20211,7 @@
           <a:p>
             <a:fld id="{CACABD52-BF91-4CCE-9EEC-6A02225A646E}" type="datetimeFigureOut">
               <a:rPr lang="en-US" smtClean="0"/>
-              <a:t>2017-12-28</a:t>
+              <a:t>2/5/2018</a:t>
             </a:fld>
             <a:endParaRPr lang="en-US"/>
           </a:p>
@@ -20122,7 +20222,7 @@
           <p:cNvPr id="3" name="Footer Placeholder 2">
             <a:extLst>
               <a:ext uri="{FF2B5EF4-FFF2-40B4-BE49-F238E27FC236}">
-                <a16:creationId xmlns:a16="http://schemas.microsoft.com/office/drawing/2014/main" id="{6DA0A29A-95E2-4A43-9A62-DA676D2B1DD1}"/>
+                <a16:creationId xmlns:a16="http://schemas.microsoft.com/office/drawing/2014/main" xmlns="" id="{6DA0A29A-95E2-4A43-9A62-DA676D2B1DD1}"/>
               </a:ext>
             </a:extLst>
           </p:cNvPr>
@@ -20147,7 +20247,7 @@
           <p:cNvPr id="4" name="Slide Number Placeholder 3">
             <a:extLst>
               <a:ext uri="{FF2B5EF4-FFF2-40B4-BE49-F238E27FC236}">
-                <a16:creationId xmlns:a16="http://schemas.microsoft.com/office/drawing/2014/main" id="{C733AC5F-3B81-45A4-9505-752A3975B565}"/>
+                <a16:creationId xmlns:a16="http://schemas.microsoft.com/office/drawing/2014/main" xmlns="" id="{C733AC5F-3B81-45A4-9505-752A3975B565}"/>
               </a:ext>
             </a:extLst>
           </p:cNvPr>
@@ -20206,7 +20306,7 @@
           <p:cNvPr id="2" name="Title 1">
             <a:extLst>
               <a:ext uri="{FF2B5EF4-FFF2-40B4-BE49-F238E27FC236}">
-                <a16:creationId xmlns:a16="http://schemas.microsoft.com/office/drawing/2014/main" id="{429AA10F-A3F0-4FF5-86C2-B3E7658E4596}"/>
+                <a16:creationId xmlns:a16="http://schemas.microsoft.com/office/drawing/2014/main" xmlns="" id="{429AA10F-A3F0-4FF5-86C2-B3E7658E4596}"/>
               </a:ext>
             </a:extLst>
           </p:cNvPr>
@@ -20243,7 +20343,7 @@
           <p:cNvPr id="3" name="Content Placeholder 2">
             <a:extLst>
               <a:ext uri="{FF2B5EF4-FFF2-40B4-BE49-F238E27FC236}">
-                <a16:creationId xmlns:a16="http://schemas.microsoft.com/office/drawing/2014/main" id="{79CF4306-E7D1-4D7A-84BC-F0BCE1518D23}"/>
+                <a16:creationId xmlns:a16="http://schemas.microsoft.com/office/drawing/2014/main" xmlns="" id="{79CF4306-E7D1-4D7A-84BC-F0BCE1518D23}"/>
               </a:ext>
             </a:extLst>
           </p:cNvPr>
@@ -20333,7 +20433,7 @@
           <p:cNvPr id="4" name="Text Placeholder 3">
             <a:extLst>
               <a:ext uri="{FF2B5EF4-FFF2-40B4-BE49-F238E27FC236}">
-                <a16:creationId xmlns:a16="http://schemas.microsoft.com/office/drawing/2014/main" id="{4FEE7CF5-887D-49EC-9D20-69E2FB1A1A13}"/>
+                <a16:creationId xmlns:a16="http://schemas.microsoft.com/office/drawing/2014/main" xmlns="" id="{4FEE7CF5-887D-49EC-9D20-69E2FB1A1A13}"/>
               </a:ext>
             </a:extLst>
           </p:cNvPr>
@@ -20404,7 +20504,7 @@
           <p:cNvPr id="5" name="Date Placeholder 4">
             <a:extLst>
               <a:ext uri="{FF2B5EF4-FFF2-40B4-BE49-F238E27FC236}">
-                <a16:creationId xmlns:a16="http://schemas.microsoft.com/office/drawing/2014/main" id="{3ACFAEBD-A045-4A8C-878A-36EC892577BB}"/>
+                <a16:creationId xmlns:a16="http://schemas.microsoft.com/office/drawing/2014/main" xmlns="" id="{3ACFAEBD-A045-4A8C-878A-36EC892577BB}"/>
               </a:ext>
             </a:extLst>
           </p:cNvPr>
@@ -20422,7 +20522,7 @@
           <a:p>
             <a:fld id="{CACABD52-BF91-4CCE-9EEC-6A02225A646E}" type="datetimeFigureOut">
               <a:rPr lang="en-US" smtClean="0"/>
-              <a:t>2017-12-28</a:t>
+              <a:t>2/5/2018</a:t>
             </a:fld>
             <a:endParaRPr lang="en-US"/>
           </a:p>
@@ -20433,7 +20533,7 @@
           <p:cNvPr id="6" name="Footer Placeholder 5">
             <a:extLst>
               <a:ext uri="{FF2B5EF4-FFF2-40B4-BE49-F238E27FC236}">
-                <a16:creationId xmlns:a16="http://schemas.microsoft.com/office/drawing/2014/main" id="{16611E4C-81E3-45AD-8F0A-FF48107D1271}"/>
+                <a16:creationId xmlns:a16="http://schemas.microsoft.com/office/drawing/2014/main" xmlns="" id="{16611E4C-81E3-45AD-8F0A-FF48107D1271}"/>
               </a:ext>
             </a:extLst>
           </p:cNvPr>
@@ -20458,7 +20558,7 @@
           <p:cNvPr id="7" name="Slide Number Placeholder 6">
             <a:extLst>
               <a:ext uri="{FF2B5EF4-FFF2-40B4-BE49-F238E27FC236}">
-                <a16:creationId xmlns:a16="http://schemas.microsoft.com/office/drawing/2014/main" id="{9E6440E9-F4F2-4D20-A061-BB4A4DC64927}"/>
+                <a16:creationId xmlns:a16="http://schemas.microsoft.com/office/drawing/2014/main" xmlns="" id="{9E6440E9-F4F2-4D20-A061-BB4A4DC64927}"/>
               </a:ext>
             </a:extLst>
           </p:cNvPr>
@@ -20517,7 +20617,7 @@
           <p:cNvPr id="2" name="Title 1">
             <a:extLst>
               <a:ext uri="{FF2B5EF4-FFF2-40B4-BE49-F238E27FC236}">
-                <a16:creationId xmlns:a16="http://schemas.microsoft.com/office/drawing/2014/main" id="{F084EE26-126E-4E97-BF36-9F1DCD972C05}"/>
+                <a16:creationId xmlns:a16="http://schemas.microsoft.com/office/drawing/2014/main" xmlns="" id="{F084EE26-126E-4E97-BF36-9F1DCD972C05}"/>
               </a:ext>
             </a:extLst>
           </p:cNvPr>
@@ -20554,7 +20654,7 @@
           <p:cNvPr id="3" name="Picture Placeholder 2">
             <a:extLst>
               <a:ext uri="{FF2B5EF4-FFF2-40B4-BE49-F238E27FC236}">
-                <a16:creationId xmlns:a16="http://schemas.microsoft.com/office/drawing/2014/main" id="{257A8E82-AF17-438E-98D9-5C3489248FFC}"/>
+                <a16:creationId xmlns:a16="http://schemas.microsoft.com/office/drawing/2014/main" xmlns="" id="{257A8E82-AF17-438E-98D9-5C3489248FFC}"/>
               </a:ext>
             </a:extLst>
           </p:cNvPr>
@@ -20621,7 +20721,7 @@
           <p:cNvPr id="4" name="Text Placeholder 3">
             <a:extLst>
               <a:ext uri="{FF2B5EF4-FFF2-40B4-BE49-F238E27FC236}">
-                <a16:creationId xmlns:a16="http://schemas.microsoft.com/office/drawing/2014/main" id="{EA8DEB40-38F9-4310-AFB2-610843E376E6}"/>
+                <a16:creationId xmlns:a16="http://schemas.microsoft.com/office/drawing/2014/main" xmlns="" id="{EA8DEB40-38F9-4310-AFB2-610843E376E6}"/>
               </a:ext>
             </a:extLst>
           </p:cNvPr>
@@ -20692,7 +20792,7 @@
           <p:cNvPr id="5" name="Date Placeholder 4">
             <a:extLst>
               <a:ext uri="{FF2B5EF4-FFF2-40B4-BE49-F238E27FC236}">
-                <a16:creationId xmlns:a16="http://schemas.microsoft.com/office/drawing/2014/main" id="{0BC78A07-219B-4178-A5CE-EC09127A3FE2}"/>
+                <a16:creationId xmlns:a16="http://schemas.microsoft.com/office/drawing/2014/main" xmlns="" id="{0BC78A07-219B-4178-A5CE-EC09127A3FE2}"/>
               </a:ext>
             </a:extLst>
           </p:cNvPr>
@@ -20710,7 +20810,7 @@
           <a:p>
             <a:fld id="{CACABD52-BF91-4CCE-9EEC-6A02225A646E}" type="datetimeFigureOut">
               <a:rPr lang="en-US" smtClean="0"/>
-              <a:t>2017-12-28</a:t>
+              <a:t>2/5/2018</a:t>
             </a:fld>
             <a:endParaRPr lang="en-US"/>
           </a:p>
@@ -20721,7 +20821,7 @@
           <p:cNvPr id="6" name="Footer Placeholder 5">
             <a:extLst>
               <a:ext uri="{FF2B5EF4-FFF2-40B4-BE49-F238E27FC236}">
-                <a16:creationId xmlns:a16="http://schemas.microsoft.com/office/drawing/2014/main" id="{18B6F62C-9928-41E5-8044-CC305A40137C}"/>
+                <a16:creationId xmlns:a16="http://schemas.microsoft.com/office/drawing/2014/main" xmlns="" id="{18B6F62C-9928-41E5-8044-CC305A40137C}"/>
               </a:ext>
             </a:extLst>
           </p:cNvPr>
@@ -20746,7 +20846,7 @@
           <p:cNvPr id="7" name="Slide Number Placeholder 6">
             <a:extLst>
               <a:ext uri="{FF2B5EF4-FFF2-40B4-BE49-F238E27FC236}">
-                <a16:creationId xmlns:a16="http://schemas.microsoft.com/office/drawing/2014/main" id="{6267D2BB-92BB-4DDD-81C8-6617E54E1C27}"/>
+                <a16:creationId xmlns:a16="http://schemas.microsoft.com/office/drawing/2014/main" xmlns="" id="{6267D2BB-92BB-4DDD-81C8-6617E54E1C27}"/>
               </a:ext>
             </a:extLst>
           </p:cNvPr>
@@ -20810,7 +20910,7 @@
           <p:cNvPr id="2" name="Title Placeholder 1">
             <a:extLst>
               <a:ext uri="{FF2B5EF4-FFF2-40B4-BE49-F238E27FC236}">
-                <a16:creationId xmlns:a16="http://schemas.microsoft.com/office/drawing/2014/main" id="{EA7D838B-B41F-4FCE-8E52-9F72F4E6B9F7}"/>
+                <a16:creationId xmlns:a16="http://schemas.microsoft.com/office/drawing/2014/main" xmlns="" id="{EA7D838B-B41F-4FCE-8E52-9F72F4E6B9F7}"/>
               </a:ext>
             </a:extLst>
           </p:cNvPr>
@@ -20848,7 +20948,7 @@
           <p:cNvPr id="3" name="Text Placeholder 2">
             <a:extLst>
               <a:ext uri="{FF2B5EF4-FFF2-40B4-BE49-F238E27FC236}">
-                <a16:creationId xmlns:a16="http://schemas.microsoft.com/office/drawing/2014/main" id="{7FF521DE-86A0-4F35-9D33-DE3297EF3BEE}"/>
+                <a16:creationId xmlns:a16="http://schemas.microsoft.com/office/drawing/2014/main" xmlns="" id="{7FF521DE-86A0-4F35-9D33-DE3297EF3BEE}"/>
               </a:ext>
             </a:extLst>
           </p:cNvPr>
@@ -20915,7 +21015,7 @@
           <p:cNvPr id="4" name="Date Placeholder 3">
             <a:extLst>
               <a:ext uri="{FF2B5EF4-FFF2-40B4-BE49-F238E27FC236}">
-                <a16:creationId xmlns:a16="http://schemas.microsoft.com/office/drawing/2014/main" id="{0001F5AF-9B49-4031-B5E1-414FE235625E}"/>
+                <a16:creationId xmlns:a16="http://schemas.microsoft.com/office/drawing/2014/main" xmlns="" id="{0001F5AF-9B49-4031-B5E1-414FE235625E}"/>
               </a:ext>
             </a:extLst>
           </p:cNvPr>
@@ -20951,7 +21051,7 @@
           <a:p>
             <a:fld id="{CACABD52-BF91-4CCE-9EEC-6A02225A646E}" type="datetimeFigureOut">
               <a:rPr lang="en-US" smtClean="0"/>
-              <a:t>2017-12-28</a:t>
+              <a:t>2/5/2018</a:t>
             </a:fld>
             <a:endParaRPr lang="en-US"/>
           </a:p>
@@ -20962,7 +21062,7 @@
           <p:cNvPr id="5" name="Footer Placeholder 4">
             <a:extLst>
               <a:ext uri="{FF2B5EF4-FFF2-40B4-BE49-F238E27FC236}">
-                <a16:creationId xmlns:a16="http://schemas.microsoft.com/office/drawing/2014/main" id="{236B538C-FB52-488D-A23A-B0EA26045C11}"/>
+                <a16:creationId xmlns:a16="http://schemas.microsoft.com/office/drawing/2014/main" xmlns="" id="{236B538C-FB52-488D-A23A-B0EA26045C11}"/>
               </a:ext>
             </a:extLst>
           </p:cNvPr>
@@ -21005,7 +21105,7 @@
           <p:cNvPr id="6" name="Slide Number Placeholder 5">
             <a:extLst>
               <a:ext uri="{FF2B5EF4-FFF2-40B4-BE49-F238E27FC236}">
-                <a16:creationId xmlns:a16="http://schemas.microsoft.com/office/drawing/2014/main" id="{73C7A0F4-E59F-4A9A-90B5-40AD161A49F8}"/>
+                <a16:creationId xmlns:a16="http://schemas.microsoft.com/office/drawing/2014/main" xmlns="" id="{73C7A0F4-E59F-4A9A-90B5-40AD161A49F8}"/>
               </a:ext>
             </a:extLst>
           </p:cNvPr>
@@ -21373,7 +21473,7 @@
           <p:cNvPr id="14" name="Rectangle 13">
             <a:extLst>
               <a:ext uri="{FF2B5EF4-FFF2-40B4-BE49-F238E27FC236}">
-                <a16:creationId xmlns:a16="http://schemas.microsoft.com/office/drawing/2014/main" id="{8FC191C5-FA04-4B6A-890B-39B4A66DFC1D}"/>
+                <a16:creationId xmlns:a16="http://schemas.microsoft.com/office/drawing/2014/main" xmlns="" id="{8FC191C5-FA04-4B6A-890B-39B4A66DFC1D}"/>
               </a:ext>
             </a:extLst>
           </p:cNvPr>
@@ -21424,7 +21524,7 @@
           <p:cNvPr id="21" name="Rectangle 20">
             <a:extLst>
               <a:ext uri="{FF2B5EF4-FFF2-40B4-BE49-F238E27FC236}">
-                <a16:creationId xmlns:a16="http://schemas.microsoft.com/office/drawing/2014/main" id="{9F88DBF0-1CBF-432D-ABF5-C3B72583CCBD}"/>
+                <a16:creationId xmlns:a16="http://schemas.microsoft.com/office/drawing/2014/main" xmlns="" id="{9F88DBF0-1CBF-432D-ABF5-C3B72583CCBD}"/>
               </a:ext>
             </a:extLst>
           </p:cNvPr>
@@ -21480,7 +21580,7 @@
           <p:cNvPr id="22" name="Rectangle 21">
             <a:extLst>
               <a:ext uri="{FF2B5EF4-FFF2-40B4-BE49-F238E27FC236}">
-                <a16:creationId xmlns:a16="http://schemas.microsoft.com/office/drawing/2014/main" id="{21231BCA-7ABC-4F19-9161-5A02A16DD524}"/>
+                <a16:creationId xmlns:a16="http://schemas.microsoft.com/office/drawing/2014/main" xmlns="" id="{21231BCA-7ABC-4F19-9161-5A02A16DD524}"/>
               </a:ext>
             </a:extLst>
           </p:cNvPr>
@@ -21534,7 +21634,7 @@
           <p:cNvPr id="23" name="Rectangle 22">
             <a:extLst>
               <a:ext uri="{FF2B5EF4-FFF2-40B4-BE49-F238E27FC236}">
-                <a16:creationId xmlns:a16="http://schemas.microsoft.com/office/drawing/2014/main" id="{D61255F3-A5EA-4758-9469-30B2086D3E91}"/>
+                <a16:creationId xmlns:a16="http://schemas.microsoft.com/office/drawing/2014/main" xmlns="" id="{D61255F3-A5EA-4758-9469-30B2086D3E91}"/>
               </a:ext>
             </a:extLst>
           </p:cNvPr>
@@ -21588,7 +21688,7 @@
           <p:cNvPr id="7" name="Picture 9">
             <a:extLst>
               <a:ext uri="{FF2B5EF4-FFF2-40B4-BE49-F238E27FC236}">
-                <a16:creationId xmlns:a16="http://schemas.microsoft.com/office/drawing/2014/main" id="{61F991B1-26AE-44CD-BECD-7874DC212641}"/>
+                <a16:creationId xmlns:a16="http://schemas.microsoft.com/office/drawing/2014/main" xmlns="" id="{61F991B1-26AE-44CD-BECD-7874DC212641}"/>
               </a:ext>
             </a:extLst>
           </p:cNvPr>
@@ -21648,7 +21748,7 @@
           <p:cNvPr id="12" name="Picture 9">
             <a:extLst>
               <a:ext uri="{FF2B5EF4-FFF2-40B4-BE49-F238E27FC236}">
-                <a16:creationId xmlns:a16="http://schemas.microsoft.com/office/drawing/2014/main" id="{C9F0EEA1-9F31-4557-BFDA-475C767CF656}"/>
+                <a16:creationId xmlns:a16="http://schemas.microsoft.com/office/drawing/2014/main" xmlns="" id="{C9F0EEA1-9F31-4557-BFDA-475C767CF656}"/>
               </a:ext>
             </a:extLst>
           </p:cNvPr>
@@ -21708,7 +21808,7 @@
           <p:cNvPr id="24" name="Picture 9">
             <a:extLst>
               <a:ext uri="{FF2B5EF4-FFF2-40B4-BE49-F238E27FC236}">
-                <a16:creationId xmlns:a16="http://schemas.microsoft.com/office/drawing/2014/main" id="{037940A9-EC14-46F4-AEBF-4C4350B9FA9D}"/>
+                <a16:creationId xmlns:a16="http://schemas.microsoft.com/office/drawing/2014/main" xmlns="" id="{037940A9-EC14-46F4-AEBF-4C4350B9FA9D}"/>
               </a:ext>
             </a:extLst>
           </p:cNvPr>
@@ -21768,7 +21868,7 @@
           <p:cNvPr id="25" name="Picture 9">
             <a:extLst>
               <a:ext uri="{FF2B5EF4-FFF2-40B4-BE49-F238E27FC236}">
-                <a16:creationId xmlns:a16="http://schemas.microsoft.com/office/drawing/2014/main" id="{AC1FC543-EE8D-43D1-A2E2-8B7CE0EE97F9}"/>
+                <a16:creationId xmlns:a16="http://schemas.microsoft.com/office/drawing/2014/main" xmlns="" id="{AC1FC543-EE8D-43D1-A2E2-8B7CE0EE97F9}"/>
               </a:ext>
             </a:extLst>
           </p:cNvPr>
@@ -21828,7 +21928,7 @@
           <p:cNvPr id="26" name="Picture 9">
             <a:extLst>
               <a:ext uri="{FF2B5EF4-FFF2-40B4-BE49-F238E27FC236}">
-                <a16:creationId xmlns:a16="http://schemas.microsoft.com/office/drawing/2014/main" id="{6AC15EDC-F8F5-4698-B923-1EC9F1999593}"/>
+                <a16:creationId xmlns:a16="http://schemas.microsoft.com/office/drawing/2014/main" xmlns="" id="{6AC15EDC-F8F5-4698-B923-1EC9F1999593}"/>
               </a:ext>
             </a:extLst>
           </p:cNvPr>
@@ -21888,7 +21988,7 @@
           <p:cNvPr id="27" name="Picture 9">
             <a:extLst>
               <a:ext uri="{FF2B5EF4-FFF2-40B4-BE49-F238E27FC236}">
-                <a16:creationId xmlns:a16="http://schemas.microsoft.com/office/drawing/2014/main" id="{4B495DA8-87A8-41A0-A125-87A4DE3108C8}"/>
+                <a16:creationId xmlns:a16="http://schemas.microsoft.com/office/drawing/2014/main" xmlns="" id="{4B495DA8-87A8-41A0-A125-87A4DE3108C8}"/>
               </a:ext>
             </a:extLst>
           </p:cNvPr>
@@ -21948,7 +22048,7 @@
           <p:cNvPr id="28" name="Rectangle 27">
             <a:extLst>
               <a:ext uri="{FF2B5EF4-FFF2-40B4-BE49-F238E27FC236}">
-                <a16:creationId xmlns:a16="http://schemas.microsoft.com/office/drawing/2014/main" id="{3F335173-C56C-4E77-BBC0-1A5C875AEF46}"/>
+                <a16:creationId xmlns:a16="http://schemas.microsoft.com/office/drawing/2014/main" xmlns="" id="{3F335173-C56C-4E77-BBC0-1A5C875AEF46}"/>
               </a:ext>
             </a:extLst>
           </p:cNvPr>
@@ -21989,7 +22089,7 @@
           <p:cNvPr id="29" name="Rectangle 28">
             <a:extLst>
               <a:ext uri="{FF2B5EF4-FFF2-40B4-BE49-F238E27FC236}">
-                <a16:creationId xmlns:a16="http://schemas.microsoft.com/office/drawing/2014/main" id="{DA16A2E4-6CB6-42D5-82E7-2BCC5D1720B7}"/>
+                <a16:creationId xmlns:a16="http://schemas.microsoft.com/office/drawing/2014/main" xmlns="" id="{DA16A2E4-6CB6-42D5-82E7-2BCC5D1720B7}"/>
               </a:ext>
             </a:extLst>
           </p:cNvPr>
@@ -22030,7 +22130,7 @@
           <p:cNvPr id="30" name="Rectangle 29">
             <a:extLst>
               <a:ext uri="{FF2B5EF4-FFF2-40B4-BE49-F238E27FC236}">
-                <a16:creationId xmlns:a16="http://schemas.microsoft.com/office/drawing/2014/main" id="{81F02153-EB60-495D-8DAF-1949C468CB7A}"/>
+                <a16:creationId xmlns:a16="http://schemas.microsoft.com/office/drawing/2014/main" xmlns="" id="{81F02153-EB60-495D-8DAF-1949C468CB7A}"/>
               </a:ext>
             </a:extLst>
           </p:cNvPr>
@@ -22072,7 +22172,7 @@
           <p:cNvPr id="34" name="Straight Connector 33">
             <a:extLst>
               <a:ext uri="{FF2B5EF4-FFF2-40B4-BE49-F238E27FC236}">
-                <a16:creationId xmlns:a16="http://schemas.microsoft.com/office/drawing/2014/main" id="{1D15A13C-E5E4-4DE9-A9F2-058123546270}"/>
+                <a16:creationId xmlns:a16="http://schemas.microsoft.com/office/drawing/2014/main" xmlns="" id="{1D15A13C-E5E4-4DE9-A9F2-058123546270}"/>
               </a:ext>
             </a:extLst>
           </p:cNvPr>
@@ -22117,7 +22217,7 @@
           <p:cNvPr id="36" name="Straight Connector 35">
             <a:extLst>
               <a:ext uri="{FF2B5EF4-FFF2-40B4-BE49-F238E27FC236}">
-                <a16:creationId xmlns:a16="http://schemas.microsoft.com/office/drawing/2014/main" id="{4612C6FF-F6F9-45E3-A2C0-D4BA837DA5BC}"/>
+                <a16:creationId xmlns:a16="http://schemas.microsoft.com/office/drawing/2014/main" xmlns="" id="{4612C6FF-F6F9-45E3-A2C0-D4BA837DA5BC}"/>
               </a:ext>
             </a:extLst>
           </p:cNvPr>
@@ -22162,7 +22262,7 @@
           <p:cNvPr id="38" name="Straight Connector 37">
             <a:extLst>
               <a:ext uri="{FF2B5EF4-FFF2-40B4-BE49-F238E27FC236}">
-                <a16:creationId xmlns:a16="http://schemas.microsoft.com/office/drawing/2014/main" id="{10587871-2D25-46EC-B9D5-36263ECB22E7}"/>
+                <a16:creationId xmlns:a16="http://schemas.microsoft.com/office/drawing/2014/main" xmlns="" id="{10587871-2D25-46EC-B9D5-36263ECB22E7}"/>
               </a:ext>
             </a:extLst>
           </p:cNvPr>
@@ -22207,7 +22307,7 @@
           <p:cNvPr id="42" name="Straight Connector 41">
             <a:extLst>
               <a:ext uri="{FF2B5EF4-FFF2-40B4-BE49-F238E27FC236}">
-                <a16:creationId xmlns:a16="http://schemas.microsoft.com/office/drawing/2014/main" id="{26C3F60D-928C-472B-97AC-56ED78A81F28}"/>
+                <a16:creationId xmlns:a16="http://schemas.microsoft.com/office/drawing/2014/main" xmlns="" id="{26C3F60D-928C-472B-97AC-56ED78A81F28}"/>
               </a:ext>
             </a:extLst>
           </p:cNvPr>
@@ -22252,7 +22352,7 @@
           <p:cNvPr id="44" name="Straight Connector 43">
             <a:extLst>
               <a:ext uri="{FF2B5EF4-FFF2-40B4-BE49-F238E27FC236}">
-                <a16:creationId xmlns:a16="http://schemas.microsoft.com/office/drawing/2014/main" id="{2E721FDC-89A7-4988-B1BE-FF07CA41458A}"/>
+                <a16:creationId xmlns:a16="http://schemas.microsoft.com/office/drawing/2014/main" xmlns="" id="{2E721FDC-89A7-4988-B1BE-FF07CA41458A}"/>
               </a:ext>
             </a:extLst>
           </p:cNvPr>
@@ -22297,7 +22397,7 @@
           <p:cNvPr id="46" name="Rectangle 45">
             <a:extLst>
               <a:ext uri="{FF2B5EF4-FFF2-40B4-BE49-F238E27FC236}">
-                <a16:creationId xmlns:a16="http://schemas.microsoft.com/office/drawing/2014/main" id="{209F45D2-258B-45DE-87F5-944A1682AC6B}"/>
+                <a16:creationId xmlns:a16="http://schemas.microsoft.com/office/drawing/2014/main" xmlns="" id="{209F45D2-258B-45DE-87F5-944A1682AC6B}"/>
               </a:ext>
             </a:extLst>
           </p:cNvPr>
@@ -22359,7 +22459,7 @@
           <p:cNvPr id="47" name="Rectangle 46">
             <a:extLst>
               <a:ext uri="{FF2B5EF4-FFF2-40B4-BE49-F238E27FC236}">
-                <a16:creationId xmlns:a16="http://schemas.microsoft.com/office/drawing/2014/main" id="{C7C3DD58-9FD5-423D-81F0-65F260109267}"/>
+                <a16:creationId xmlns:a16="http://schemas.microsoft.com/office/drawing/2014/main" xmlns="" id="{C7C3DD58-9FD5-423D-81F0-65F260109267}"/>
               </a:ext>
             </a:extLst>
           </p:cNvPr>
@@ -22401,7 +22501,7 @@
           <p:cNvPr id="48" name="Rectangle 47">
             <a:extLst>
               <a:ext uri="{FF2B5EF4-FFF2-40B4-BE49-F238E27FC236}">
-                <a16:creationId xmlns:a16="http://schemas.microsoft.com/office/drawing/2014/main" id="{5F2B4F2F-F55B-4F17-A7B6-1A931A40CA68}"/>
+                <a16:creationId xmlns:a16="http://schemas.microsoft.com/office/drawing/2014/main" xmlns="" id="{5F2B4F2F-F55B-4F17-A7B6-1A931A40CA68}"/>
               </a:ext>
             </a:extLst>
           </p:cNvPr>
@@ -22457,7 +22557,7 @@
           <p:cNvPr id="51" name="Rectangle 50">
             <a:extLst>
               <a:ext uri="{FF2B5EF4-FFF2-40B4-BE49-F238E27FC236}">
-                <a16:creationId xmlns:a16="http://schemas.microsoft.com/office/drawing/2014/main" id="{4F5CFA18-B35B-4DA0-A1C8-D81AC1AEE2BC}"/>
+                <a16:creationId xmlns:a16="http://schemas.microsoft.com/office/drawing/2014/main" xmlns="" id="{4F5CFA18-B35B-4DA0-A1C8-D81AC1AEE2BC}"/>
               </a:ext>
             </a:extLst>
           </p:cNvPr>
@@ -22518,7 +22618,7 @@
           <p:cNvPr id="52" name="Rectangle 51">
             <a:extLst>
               <a:ext uri="{FF2B5EF4-FFF2-40B4-BE49-F238E27FC236}">
-                <a16:creationId xmlns:a16="http://schemas.microsoft.com/office/drawing/2014/main" id="{48F2455D-070C-4806-92D6-3F679E9866F1}"/>
+                <a16:creationId xmlns:a16="http://schemas.microsoft.com/office/drawing/2014/main" xmlns="" id="{48F2455D-070C-4806-92D6-3F679E9866F1}"/>
               </a:ext>
             </a:extLst>
           </p:cNvPr>
@@ -22574,7 +22674,7 @@
           <p:cNvPr id="53" name="Rectangle 52">
             <a:extLst>
               <a:ext uri="{FF2B5EF4-FFF2-40B4-BE49-F238E27FC236}">
-                <a16:creationId xmlns:a16="http://schemas.microsoft.com/office/drawing/2014/main" id="{FDAFD61E-CF23-40A2-9706-CEB024710019}"/>
+                <a16:creationId xmlns:a16="http://schemas.microsoft.com/office/drawing/2014/main" xmlns="" id="{FDAFD61E-CF23-40A2-9706-CEB024710019}"/>
               </a:ext>
             </a:extLst>
           </p:cNvPr>
@@ -22628,7 +22728,7 @@
           <p:cNvPr id="54" name="Rectangle 53">
             <a:extLst>
               <a:ext uri="{FF2B5EF4-FFF2-40B4-BE49-F238E27FC236}">
-                <a16:creationId xmlns:a16="http://schemas.microsoft.com/office/drawing/2014/main" id="{B79A9F92-DA98-4C00-8C98-D7409A63A49E}"/>
+                <a16:creationId xmlns:a16="http://schemas.microsoft.com/office/drawing/2014/main" xmlns="" id="{B79A9F92-DA98-4C00-8C98-D7409A63A49E}"/>
               </a:ext>
             </a:extLst>
           </p:cNvPr>
@@ -22682,7 +22782,7 @@
           <p:cNvPr id="55" name="Picture 9">
             <a:extLst>
               <a:ext uri="{FF2B5EF4-FFF2-40B4-BE49-F238E27FC236}">
-                <a16:creationId xmlns:a16="http://schemas.microsoft.com/office/drawing/2014/main" id="{6F38A3E1-E0DA-432B-BBFA-348F0321BCD3}"/>
+                <a16:creationId xmlns:a16="http://schemas.microsoft.com/office/drawing/2014/main" xmlns="" id="{6F38A3E1-E0DA-432B-BBFA-348F0321BCD3}"/>
               </a:ext>
             </a:extLst>
           </p:cNvPr>
@@ -22742,7 +22842,7 @@
           <p:cNvPr id="69" name="Rectangle 68">
             <a:extLst>
               <a:ext uri="{FF2B5EF4-FFF2-40B4-BE49-F238E27FC236}">
-                <a16:creationId xmlns:a16="http://schemas.microsoft.com/office/drawing/2014/main" id="{19EC4CF9-2E6B-4D8B-80AB-7CDBA38CF6D3}"/>
+                <a16:creationId xmlns:a16="http://schemas.microsoft.com/office/drawing/2014/main" xmlns="" id="{19EC4CF9-2E6B-4D8B-80AB-7CDBA38CF6D3}"/>
               </a:ext>
             </a:extLst>
           </p:cNvPr>
@@ -22804,7 +22904,7 @@
           <p:cNvPr id="72" name="Straight Connector 71">
             <a:extLst>
               <a:ext uri="{FF2B5EF4-FFF2-40B4-BE49-F238E27FC236}">
-                <a16:creationId xmlns:a16="http://schemas.microsoft.com/office/drawing/2014/main" id="{DFD04D63-40EA-4A51-A48E-8B19F6A831F1}"/>
+                <a16:creationId xmlns:a16="http://schemas.microsoft.com/office/drawing/2014/main" xmlns="" id="{DFD04D63-40EA-4A51-A48E-8B19F6A831F1}"/>
               </a:ext>
             </a:extLst>
           </p:cNvPr>
@@ -22850,7 +22950,7 @@
           <p:cNvPr id="75" name="Rectangle 74">
             <a:extLst>
               <a:ext uri="{FF2B5EF4-FFF2-40B4-BE49-F238E27FC236}">
-                <a16:creationId xmlns:a16="http://schemas.microsoft.com/office/drawing/2014/main" id="{BDB9CA6D-4FA5-4175-AAC0-17D87D1050C9}"/>
+                <a16:creationId xmlns:a16="http://schemas.microsoft.com/office/drawing/2014/main" xmlns="" id="{BDB9CA6D-4FA5-4175-AAC0-17D87D1050C9}"/>
               </a:ext>
             </a:extLst>
           </p:cNvPr>
@@ -22911,7 +23011,7 @@
           <p:cNvPr id="76" name="Rectangle 75">
             <a:extLst>
               <a:ext uri="{FF2B5EF4-FFF2-40B4-BE49-F238E27FC236}">
-                <a16:creationId xmlns:a16="http://schemas.microsoft.com/office/drawing/2014/main" id="{9A9F6FDC-0558-487A-8683-2B4AC3E3F11A}"/>
+                <a16:creationId xmlns:a16="http://schemas.microsoft.com/office/drawing/2014/main" xmlns="" id="{9A9F6FDC-0558-487A-8683-2B4AC3E3F11A}"/>
               </a:ext>
             </a:extLst>
           </p:cNvPr>
@@ -22967,7 +23067,7 @@
           <p:cNvPr id="77" name="Rectangle 76">
             <a:extLst>
               <a:ext uri="{FF2B5EF4-FFF2-40B4-BE49-F238E27FC236}">
-                <a16:creationId xmlns:a16="http://schemas.microsoft.com/office/drawing/2014/main" id="{FC12E18A-CEC6-48F5-94C8-E315D4035FF8}"/>
+                <a16:creationId xmlns:a16="http://schemas.microsoft.com/office/drawing/2014/main" xmlns="" id="{FC12E18A-CEC6-48F5-94C8-E315D4035FF8}"/>
               </a:ext>
             </a:extLst>
           </p:cNvPr>
@@ -23021,7 +23121,7 @@
           <p:cNvPr id="78" name="Rectangle 77">
             <a:extLst>
               <a:ext uri="{FF2B5EF4-FFF2-40B4-BE49-F238E27FC236}">
-                <a16:creationId xmlns:a16="http://schemas.microsoft.com/office/drawing/2014/main" id="{A92CEE74-4DA2-4F7C-8BCE-ED5BE42D301D}"/>
+                <a16:creationId xmlns:a16="http://schemas.microsoft.com/office/drawing/2014/main" xmlns="" id="{A92CEE74-4DA2-4F7C-8BCE-ED5BE42D301D}"/>
               </a:ext>
             </a:extLst>
           </p:cNvPr>
@@ -23075,7 +23175,7 @@
           <p:cNvPr id="79" name="Picture 9">
             <a:extLst>
               <a:ext uri="{FF2B5EF4-FFF2-40B4-BE49-F238E27FC236}">
-                <a16:creationId xmlns:a16="http://schemas.microsoft.com/office/drawing/2014/main" id="{3236DC49-84B5-4BA6-A0C5-B630F26A56EE}"/>
+                <a16:creationId xmlns:a16="http://schemas.microsoft.com/office/drawing/2014/main" xmlns="" id="{3236DC49-84B5-4BA6-A0C5-B630F26A56EE}"/>
               </a:ext>
             </a:extLst>
           </p:cNvPr>
@@ -23135,7 +23235,7 @@
           <p:cNvPr id="80" name="Rectangle 79">
             <a:extLst>
               <a:ext uri="{FF2B5EF4-FFF2-40B4-BE49-F238E27FC236}">
-                <a16:creationId xmlns:a16="http://schemas.microsoft.com/office/drawing/2014/main" id="{44F2AE50-EBD9-416A-9E45-2E98B87AC808}"/>
+                <a16:creationId xmlns:a16="http://schemas.microsoft.com/office/drawing/2014/main" xmlns="" id="{44F2AE50-EBD9-416A-9E45-2E98B87AC808}"/>
               </a:ext>
             </a:extLst>
           </p:cNvPr>
@@ -23194,7 +23294,7 @@
           <p:cNvPr id="82" name="Straight Connector 81">
             <a:extLst>
               <a:ext uri="{FF2B5EF4-FFF2-40B4-BE49-F238E27FC236}">
-                <a16:creationId xmlns:a16="http://schemas.microsoft.com/office/drawing/2014/main" id="{4FFA2BE3-2EDF-43CC-8FD1-826085DDAA2A}"/>
+                <a16:creationId xmlns:a16="http://schemas.microsoft.com/office/drawing/2014/main" xmlns="" id="{4FFA2BE3-2EDF-43CC-8FD1-826085DDAA2A}"/>
               </a:ext>
             </a:extLst>
           </p:cNvPr>
@@ -23240,7 +23340,7 @@
           <p:cNvPr id="83" name="Cloud 82">
             <a:extLst>
               <a:ext uri="{FF2B5EF4-FFF2-40B4-BE49-F238E27FC236}">
-                <a16:creationId xmlns:a16="http://schemas.microsoft.com/office/drawing/2014/main" id="{F1413CEC-28FE-4C2E-901A-A967D7B48E9F}"/>
+                <a16:creationId xmlns:a16="http://schemas.microsoft.com/office/drawing/2014/main" xmlns="" id="{F1413CEC-28FE-4C2E-901A-A967D7B48E9F}"/>
               </a:ext>
             </a:extLst>
           </p:cNvPr>
@@ -23311,7 +23411,7 @@
           <p:cNvPr id="86" name="Straight Connector 85">
             <a:extLst>
               <a:ext uri="{FF2B5EF4-FFF2-40B4-BE49-F238E27FC236}">
-                <a16:creationId xmlns:a16="http://schemas.microsoft.com/office/drawing/2014/main" id="{743B6992-EE85-455B-9771-636069D178E5}"/>
+                <a16:creationId xmlns:a16="http://schemas.microsoft.com/office/drawing/2014/main" xmlns="" id="{743B6992-EE85-455B-9771-636069D178E5}"/>
               </a:ext>
             </a:extLst>
           </p:cNvPr>
@@ -23357,7 +23457,7 @@
           <p:cNvPr id="88" name="Straight Connector 87">
             <a:extLst>
               <a:ext uri="{FF2B5EF4-FFF2-40B4-BE49-F238E27FC236}">
-                <a16:creationId xmlns:a16="http://schemas.microsoft.com/office/drawing/2014/main" id="{5CC1E663-D34D-46FA-9E20-A9E44AA2D51F}"/>
+                <a16:creationId xmlns:a16="http://schemas.microsoft.com/office/drawing/2014/main" xmlns="" id="{5CC1E663-D34D-46FA-9E20-A9E44AA2D51F}"/>
               </a:ext>
             </a:extLst>
           </p:cNvPr>
@@ -23403,7 +23503,7 @@
           <p:cNvPr id="92" name="Cube 91">
             <a:extLst>
               <a:ext uri="{FF2B5EF4-FFF2-40B4-BE49-F238E27FC236}">
-                <a16:creationId xmlns:a16="http://schemas.microsoft.com/office/drawing/2014/main" id="{F17CBDCB-434B-40FD-8BCE-BEE38C96FBCB}"/>
+                <a16:creationId xmlns:a16="http://schemas.microsoft.com/office/drawing/2014/main" xmlns="" id="{F17CBDCB-434B-40FD-8BCE-BEE38C96FBCB}"/>
               </a:ext>
             </a:extLst>
           </p:cNvPr>
@@ -23485,7 +23585,7 @@
           <p:cNvPr id="97" name="Straight Connector 96">
             <a:extLst>
               <a:ext uri="{FF2B5EF4-FFF2-40B4-BE49-F238E27FC236}">
-                <a16:creationId xmlns:a16="http://schemas.microsoft.com/office/drawing/2014/main" id="{D25A6F54-F129-4330-BE58-15EFA559459F}"/>
+                <a16:creationId xmlns:a16="http://schemas.microsoft.com/office/drawing/2014/main" xmlns="" id="{D25A6F54-F129-4330-BE58-15EFA559459F}"/>
               </a:ext>
             </a:extLst>
           </p:cNvPr>
@@ -23531,7 +23631,7 @@
           <p:cNvPr id="102" name="Group 101">
             <a:extLst>
               <a:ext uri="{FF2B5EF4-FFF2-40B4-BE49-F238E27FC236}">
-                <a16:creationId xmlns:a16="http://schemas.microsoft.com/office/drawing/2014/main" id="{4D5C9D6C-2BA6-4210-9BE8-391169B593BF}"/>
+                <a16:creationId xmlns:a16="http://schemas.microsoft.com/office/drawing/2014/main" xmlns="" id="{4D5C9D6C-2BA6-4210-9BE8-391169B593BF}"/>
               </a:ext>
             </a:extLst>
           </p:cNvPr>
@@ -23551,7 +23651,7 @@
             <p:cNvPr id="99" name="Rectangle 98">
               <a:extLst>
                 <a:ext uri="{FF2B5EF4-FFF2-40B4-BE49-F238E27FC236}">
-                  <a16:creationId xmlns:a16="http://schemas.microsoft.com/office/drawing/2014/main" id="{8A2A5D3B-8D5B-4534-95C5-7EDE4E4A2EE5}"/>
+                  <a16:creationId xmlns:a16="http://schemas.microsoft.com/office/drawing/2014/main" xmlns="" id="{8A2A5D3B-8D5B-4534-95C5-7EDE4E4A2EE5}"/>
                 </a:ext>
               </a:extLst>
             </p:cNvPr>
@@ -23607,7 +23707,7 @@
             <p:cNvPr id="100" name="Rectangle 99">
               <a:extLst>
                 <a:ext uri="{FF2B5EF4-FFF2-40B4-BE49-F238E27FC236}">
-                  <a16:creationId xmlns:a16="http://schemas.microsoft.com/office/drawing/2014/main" id="{9C28B60A-2088-48A0-B569-F3936386E898}"/>
+                  <a16:creationId xmlns:a16="http://schemas.microsoft.com/office/drawing/2014/main" xmlns="" id="{9C28B60A-2088-48A0-B569-F3936386E898}"/>
                 </a:ext>
               </a:extLst>
             </p:cNvPr>
@@ -23661,7 +23761,7 @@
             <p:cNvPr id="101" name="Rectangle 100">
               <a:extLst>
                 <a:ext uri="{FF2B5EF4-FFF2-40B4-BE49-F238E27FC236}">
-                  <a16:creationId xmlns:a16="http://schemas.microsoft.com/office/drawing/2014/main" id="{562E2C42-74F4-4E91-A195-585D7FB0B2BC}"/>
+                  <a16:creationId xmlns:a16="http://schemas.microsoft.com/office/drawing/2014/main" xmlns="" id="{562E2C42-74F4-4E91-A195-585D7FB0B2BC}"/>
                 </a:ext>
               </a:extLst>
             </p:cNvPr>
@@ -23716,7 +23816,7 @@
           <p:cNvPr id="103" name="Group 102">
             <a:extLst>
               <a:ext uri="{FF2B5EF4-FFF2-40B4-BE49-F238E27FC236}">
-                <a16:creationId xmlns:a16="http://schemas.microsoft.com/office/drawing/2014/main" id="{6F132A65-5FBB-4398-A7E1-2290DFCF2905}"/>
+                <a16:creationId xmlns:a16="http://schemas.microsoft.com/office/drawing/2014/main" xmlns="" id="{6F132A65-5FBB-4398-A7E1-2290DFCF2905}"/>
               </a:ext>
             </a:extLst>
           </p:cNvPr>
@@ -23736,7 +23836,7 @@
             <p:cNvPr id="104" name="Rectangle 103">
               <a:extLst>
                 <a:ext uri="{FF2B5EF4-FFF2-40B4-BE49-F238E27FC236}">
-                  <a16:creationId xmlns:a16="http://schemas.microsoft.com/office/drawing/2014/main" id="{16ABE599-3C70-4AF6-A393-239EE2B0DEA7}"/>
+                  <a16:creationId xmlns:a16="http://schemas.microsoft.com/office/drawing/2014/main" xmlns="" id="{16ABE599-3C70-4AF6-A393-239EE2B0DEA7}"/>
                 </a:ext>
               </a:extLst>
             </p:cNvPr>
@@ -23792,7 +23892,7 @@
             <p:cNvPr id="105" name="Rectangle 104">
               <a:extLst>
                 <a:ext uri="{FF2B5EF4-FFF2-40B4-BE49-F238E27FC236}">
-                  <a16:creationId xmlns:a16="http://schemas.microsoft.com/office/drawing/2014/main" id="{216B8055-F5E9-4F2E-A47F-7CAEF386110D}"/>
+                  <a16:creationId xmlns:a16="http://schemas.microsoft.com/office/drawing/2014/main" xmlns="" id="{216B8055-F5E9-4F2E-A47F-7CAEF386110D}"/>
                 </a:ext>
               </a:extLst>
             </p:cNvPr>
@@ -23846,7 +23946,7 @@
             <p:cNvPr id="106" name="Rectangle 105">
               <a:extLst>
                 <a:ext uri="{FF2B5EF4-FFF2-40B4-BE49-F238E27FC236}">
-                  <a16:creationId xmlns:a16="http://schemas.microsoft.com/office/drawing/2014/main" id="{6DB048BD-0A0D-4854-92DB-BCD958D65BEF}"/>
+                  <a16:creationId xmlns:a16="http://schemas.microsoft.com/office/drawing/2014/main" xmlns="" id="{6DB048BD-0A0D-4854-92DB-BCD958D65BEF}"/>
                 </a:ext>
               </a:extLst>
             </p:cNvPr>
@@ -23901,7 +24001,7 @@
           <p:cNvPr id="107" name="Group 106">
             <a:extLst>
               <a:ext uri="{FF2B5EF4-FFF2-40B4-BE49-F238E27FC236}">
-                <a16:creationId xmlns:a16="http://schemas.microsoft.com/office/drawing/2014/main" id="{CEEACBB4-96B5-487A-B258-27A968459662}"/>
+                <a16:creationId xmlns:a16="http://schemas.microsoft.com/office/drawing/2014/main" xmlns="" id="{CEEACBB4-96B5-487A-B258-27A968459662}"/>
               </a:ext>
             </a:extLst>
           </p:cNvPr>
@@ -23921,7 +24021,7 @@
             <p:cNvPr id="108" name="Rectangle 107">
               <a:extLst>
                 <a:ext uri="{FF2B5EF4-FFF2-40B4-BE49-F238E27FC236}">
-                  <a16:creationId xmlns:a16="http://schemas.microsoft.com/office/drawing/2014/main" id="{5995F40C-3BAE-4251-B5D3-2C3C3B7FEA16}"/>
+                  <a16:creationId xmlns:a16="http://schemas.microsoft.com/office/drawing/2014/main" xmlns="" id="{5995F40C-3BAE-4251-B5D3-2C3C3B7FEA16}"/>
                 </a:ext>
               </a:extLst>
             </p:cNvPr>
@@ -23977,7 +24077,7 @@
             <p:cNvPr id="109" name="Rectangle 108">
               <a:extLst>
                 <a:ext uri="{FF2B5EF4-FFF2-40B4-BE49-F238E27FC236}">
-                  <a16:creationId xmlns:a16="http://schemas.microsoft.com/office/drawing/2014/main" id="{B69C8503-1C90-4528-B997-40C8FBA2FC2B}"/>
+                  <a16:creationId xmlns:a16="http://schemas.microsoft.com/office/drawing/2014/main" xmlns="" id="{B69C8503-1C90-4528-B997-40C8FBA2FC2B}"/>
                 </a:ext>
               </a:extLst>
             </p:cNvPr>
@@ -24031,7 +24131,7 @@
             <p:cNvPr id="110" name="Rectangle 109">
               <a:extLst>
                 <a:ext uri="{FF2B5EF4-FFF2-40B4-BE49-F238E27FC236}">
-                  <a16:creationId xmlns:a16="http://schemas.microsoft.com/office/drawing/2014/main" id="{60BD8BEC-8D15-460D-AAC6-DDD94FD7734C}"/>
+                  <a16:creationId xmlns:a16="http://schemas.microsoft.com/office/drawing/2014/main" xmlns="" id="{60BD8BEC-8D15-460D-AAC6-DDD94FD7734C}"/>
                 </a:ext>
               </a:extLst>
             </p:cNvPr>
@@ -24086,7 +24186,7 @@
           <p:cNvPr id="111" name="Group 110">
             <a:extLst>
               <a:ext uri="{FF2B5EF4-FFF2-40B4-BE49-F238E27FC236}">
-                <a16:creationId xmlns:a16="http://schemas.microsoft.com/office/drawing/2014/main" id="{AF3A3A3E-82A2-44AB-B341-0828444899BB}"/>
+                <a16:creationId xmlns:a16="http://schemas.microsoft.com/office/drawing/2014/main" xmlns="" id="{AF3A3A3E-82A2-44AB-B341-0828444899BB}"/>
               </a:ext>
             </a:extLst>
           </p:cNvPr>
@@ -24106,7 +24206,7 @@
             <p:cNvPr id="112" name="Rectangle 111">
               <a:extLst>
                 <a:ext uri="{FF2B5EF4-FFF2-40B4-BE49-F238E27FC236}">
-                  <a16:creationId xmlns:a16="http://schemas.microsoft.com/office/drawing/2014/main" id="{CD09AB16-0F5F-4E51-A2F2-02AE1A63BAFE}"/>
+                  <a16:creationId xmlns:a16="http://schemas.microsoft.com/office/drawing/2014/main" xmlns="" id="{CD09AB16-0F5F-4E51-A2F2-02AE1A63BAFE}"/>
                 </a:ext>
               </a:extLst>
             </p:cNvPr>
@@ -24162,7 +24262,7 @@
             <p:cNvPr id="113" name="Rectangle 112">
               <a:extLst>
                 <a:ext uri="{FF2B5EF4-FFF2-40B4-BE49-F238E27FC236}">
-                  <a16:creationId xmlns:a16="http://schemas.microsoft.com/office/drawing/2014/main" id="{21C4174B-77B7-4633-AA76-4BC4A90F15F8}"/>
+                  <a16:creationId xmlns:a16="http://schemas.microsoft.com/office/drawing/2014/main" xmlns="" id="{21C4174B-77B7-4633-AA76-4BC4A90F15F8}"/>
                 </a:ext>
               </a:extLst>
             </p:cNvPr>
@@ -24216,7 +24316,7 @@
             <p:cNvPr id="114" name="Rectangle 113">
               <a:extLst>
                 <a:ext uri="{FF2B5EF4-FFF2-40B4-BE49-F238E27FC236}">
-                  <a16:creationId xmlns:a16="http://schemas.microsoft.com/office/drawing/2014/main" id="{507E7324-4559-48EF-85EE-99BE143F9800}"/>
+                  <a16:creationId xmlns:a16="http://schemas.microsoft.com/office/drawing/2014/main" xmlns="" id="{507E7324-4559-48EF-85EE-99BE143F9800}"/>
                 </a:ext>
               </a:extLst>
             </p:cNvPr>
@@ -24271,7 +24371,7 @@
           <p:cNvPr id="115" name="Group 114">
             <a:extLst>
               <a:ext uri="{FF2B5EF4-FFF2-40B4-BE49-F238E27FC236}">
-                <a16:creationId xmlns:a16="http://schemas.microsoft.com/office/drawing/2014/main" id="{BCE1673F-7C2A-44DE-8675-A371ABC0FAFF}"/>
+                <a16:creationId xmlns:a16="http://schemas.microsoft.com/office/drawing/2014/main" xmlns="" id="{BCE1673F-7C2A-44DE-8675-A371ABC0FAFF}"/>
               </a:ext>
             </a:extLst>
           </p:cNvPr>
@@ -24291,7 +24391,7 @@
             <p:cNvPr id="116" name="Rectangle 115">
               <a:extLst>
                 <a:ext uri="{FF2B5EF4-FFF2-40B4-BE49-F238E27FC236}">
-                  <a16:creationId xmlns:a16="http://schemas.microsoft.com/office/drawing/2014/main" id="{96A4D985-749B-4056-B803-480A56FB4B39}"/>
+                  <a16:creationId xmlns:a16="http://schemas.microsoft.com/office/drawing/2014/main" xmlns="" id="{96A4D985-749B-4056-B803-480A56FB4B39}"/>
                 </a:ext>
               </a:extLst>
             </p:cNvPr>
@@ -24347,7 +24447,7 @@
             <p:cNvPr id="117" name="Rectangle 116">
               <a:extLst>
                 <a:ext uri="{FF2B5EF4-FFF2-40B4-BE49-F238E27FC236}">
-                  <a16:creationId xmlns:a16="http://schemas.microsoft.com/office/drawing/2014/main" id="{1E45C74E-9151-4668-9B08-BCE77E0DEA1D}"/>
+                  <a16:creationId xmlns:a16="http://schemas.microsoft.com/office/drawing/2014/main" xmlns="" id="{1E45C74E-9151-4668-9B08-BCE77E0DEA1D}"/>
                 </a:ext>
               </a:extLst>
             </p:cNvPr>
@@ -24401,7 +24501,7 @@
             <p:cNvPr id="118" name="Rectangle 117">
               <a:extLst>
                 <a:ext uri="{FF2B5EF4-FFF2-40B4-BE49-F238E27FC236}">
-                  <a16:creationId xmlns:a16="http://schemas.microsoft.com/office/drawing/2014/main" id="{9057D8E6-5106-4AE2-B962-A8EFBD19B23B}"/>
+                  <a16:creationId xmlns:a16="http://schemas.microsoft.com/office/drawing/2014/main" xmlns="" id="{9057D8E6-5106-4AE2-B962-A8EFBD19B23B}"/>
                 </a:ext>
               </a:extLst>
             </p:cNvPr>
@@ -24456,7 +24556,7 @@
           <p:cNvPr id="119" name="Group 118">
             <a:extLst>
               <a:ext uri="{FF2B5EF4-FFF2-40B4-BE49-F238E27FC236}">
-                <a16:creationId xmlns:a16="http://schemas.microsoft.com/office/drawing/2014/main" id="{FBBCED85-9120-499D-B32D-282C614615DF}"/>
+                <a16:creationId xmlns:a16="http://schemas.microsoft.com/office/drawing/2014/main" xmlns="" id="{FBBCED85-9120-499D-B32D-282C614615DF}"/>
               </a:ext>
             </a:extLst>
           </p:cNvPr>
@@ -24476,7 +24576,7 @@
             <p:cNvPr id="120" name="Rectangle 119">
               <a:extLst>
                 <a:ext uri="{FF2B5EF4-FFF2-40B4-BE49-F238E27FC236}">
-                  <a16:creationId xmlns:a16="http://schemas.microsoft.com/office/drawing/2014/main" id="{FFDDF095-C7D2-4206-8CCB-DC1DA9F7792B}"/>
+                  <a16:creationId xmlns:a16="http://schemas.microsoft.com/office/drawing/2014/main" xmlns="" id="{FFDDF095-C7D2-4206-8CCB-DC1DA9F7792B}"/>
                 </a:ext>
               </a:extLst>
             </p:cNvPr>
@@ -24532,7 +24632,7 @@
             <p:cNvPr id="121" name="Rectangle 120">
               <a:extLst>
                 <a:ext uri="{FF2B5EF4-FFF2-40B4-BE49-F238E27FC236}">
-                  <a16:creationId xmlns:a16="http://schemas.microsoft.com/office/drawing/2014/main" id="{86FAB6CB-F868-4CB9-9C3F-CFAB78301E3D}"/>
+                  <a16:creationId xmlns:a16="http://schemas.microsoft.com/office/drawing/2014/main" xmlns="" id="{86FAB6CB-F868-4CB9-9C3F-CFAB78301E3D}"/>
                 </a:ext>
               </a:extLst>
             </p:cNvPr>
@@ -24586,7 +24686,7 @@
             <p:cNvPr id="122" name="Rectangle 121">
               <a:extLst>
                 <a:ext uri="{FF2B5EF4-FFF2-40B4-BE49-F238E27FC236}">
-                  <a16:creationId xmlns:a16="http://schemas.microsoft.com/office/drawing/2014/main" id="{4CE5F8D3-5C12-4AEC-8DA1-E89EABEFD2E0}"/>
+                  <a16:creationId xmlns:a16="http://schemas.microsoft.com/office/drawing/2014/main" xmlns="" id="{4CE5F8D3-5C12-4AEC-8DA1-E89EABEFD2E0}"/>
                 </a:ext>
               </a:extLst>
             </p:cNvPr>
@@ -24641,7 +24741,7 @@
           <p:cNvPr id="123" name="Straight Connector 122">
             <a:extLst>
               <a:ext uri="{FF2B5EF4-FFF2-40B4-BE49-F238E27FC236}">
-                <a16:creationId xmlns:a16="http://schemas.microsoft.com/office/drawing/2014/main" id="{1A0B7294-0B67-4368-9293-D9F7009B597F}"/>
+                <a16:creationId xmlns:a16="http://schemas.microsoft.com/office/drawing/2014/main" xmlns="" id="{1A0B7294-0B67-4368-9293-D9F7009B597F}"/>
               </a:ext>
             </a:extLst>
           </p:cNvPr>
@@ -24687,7 +24787,7 @@
           <p:cNvPr id="125" name="Straight Connector 124">
             <a:extLst>
               <a:ext uri="{FF2B5EF4-FFF2-40B4-BE49-F238E27FC236}">
-                <a16:creationId xmlns:a16="http://schemas.microsoft.com/office/drawing/2014/main" id="{6170125F-BC10-4487-BC0A-87812AA23F38}"/>
+                <a16:creationId xmlns:a16="http://schemas.microsoft.com/office/drawing/2014/main" xmlns="" id="{6170125F-BC10-4487-BC0A-87812AA23F38}"/>
               </a:ext>
             </a:extLst>
           </p:cNvPr>
@@ -24733,7 +24833,7 @@
           <p:cNvPr id="127" name="Straight Connector 126">
             <a:extLst>
               <a:ext uri="{FF2B5EF4-FFF2-40B4-BE49-F238E27FC236}">
-                <a16:creationId xmlns:a16="http://schemas.microsoft.com/office/drawing/2014/main" id="{DBEFB81E-C2E9-45AE-BBFF-A848F52864EF}"/>
+                <a16:creationId xmlns:a16="http://schemas.microsoft.com/office/drawing/2014/main" xmlns="" id="{DBEFB81E-C2E9-45AE-BBFF-A848F52864EF}"/>
               </a:ext>
             </a:extLst>
           </p:cNvPr>
@@ -24779,7 +24879,7 @@
           <p:cNvPr id="129" name="Straight Connector 128">
             <a:extLst>
               <a:ext uri="{FF2B5EF4-FFF2-40B4-BE49-F238E27FC236}">
-                <a16:creationId xmlns:a16="http://schemas.microsoft.com/office/drawing/2014/main" id="{3E973232-5460-4BB0-B496-1E1EFE8A7C59}"/>
+                <a16:creationId xmlns:a16="http://schemas.microsoft.com/office/drawing/2014/main" xmlns="" id="{3E973232-5460-4BB0-B496-1E1EFE8A7C59}"/>
               </a:ext>
             </a:extLst>
           </p:cNvPr>
@@ -24825,7 +24925,7 @@
           <p:cNvPr id="132" name="Straight Connector 131">
             <a:extLst>
               <a:ext uri="{FF2B5EF4-FFF2-40B4-BE49-F238E27FC236}">
-                <a16:creationId xmlns:a16="http://schemas.microsoft.com/office/drawing/2014/main" id="{620B048A-61B0-4E3A-BF1C-D0C0EBC563B5}"/>
+                <a16:creationId xmlns:a16="http://schemas.microsoft.com/office/drawing/2014/main" xmlns="" id="{620B048A-61B0-4E3A-BF1C-D0C0EBC563B5}"/>
               </a:ext>
             </a:extLst>
           </p:cNvPr>
@@ -24871,7 +24971,7 @@
           <p:cNvPr id="134" name="Straight Connector 133">
             <a:extLst>
               <a:ext uri="{FF2B5EF4-FFF2-40B4-BE49-F238E27FC236}">
-                <a16:creationId xmlns:a16="http://schemas.microsoft.com/office/drawing/2014/main" id="{FC77DA65-9C2F-4878-96CA-C4646F1EA32E}"/>
+                <a16:creationId xmlns:a16="http://schemas.microsoft.com/office/drawing/2014/main" xmlns="" id="{FC77DA65-9C2F-4878-96CA-C4646F1EA32E}"/>
               </a:ext>
             </a:extLst>
           </p:cNvPr>
@@ -24917,7 +25017,7 @@
           <p:cNvPr id="136" name="Rectangle 135">
             <a:extLst>
               <a:ext uri="{FF2B5EF4-FFF2-40B4-BE49-F238E27FC236}">
-                <a16:creationId xmlns:a16="http://schemas.microsoft.com/office/drawing/2014/main" id="{617D824C-5F23-4B55-A50E-5501A1BC9D66}"/>
+                <a16:creationId xmlns:a16="http://schemas.microsoft.com/office/drawing/2014/main" xmlns="" id="{617D824C-5F23-4B55-A50E-5501A1BC9D66}"/>
               </a:ext>
             </a:extLst>
           </p:cNvPr>
@@ -24960,7 +25060,7 @@
           <p:cNvPr id="137" name="Group 136">
             <a:extLst>
               <a:ext uri="{FF2B5EF4-FFF2-40B4-BE49-F238E27FC236}">
-                <a16:creationId xmlns:a16="http://schemas.microsoft.com/office/drawing/2014/main" id="{CF1C29A0-0434-4CCC-8A6A-AFD1A7DF29BB}"/>
+                <a16:creationId xmlns:a16="http://schemas.microsoft.com/office/drawing/2014/main" xmlns="" id="{CF1C29A0-0434-4CCC-8A6A-AFD1A7DF29BB}"/>
               </a:ext>
             </a:extLst>
           </p:cNvPr>
@@ -24980,7 +25080,7 @@
             <p:cNvPr id="138" name="Rectangle 137">
               <a:extLst>
                 <a:ext uri="{FF2B5EF4-FFF2-40B4-BE49-F238E27FC236}">
-                  <a16:creationId xmlns:a16="http://schemas.microsoft.com/office/drawing/2014/main" id="{33AAA53A-C957-4B5A-B16D-720DF9BE205C}"/>
+                  <a16:creationId xmlns:a16="http://schemas.microsoft.com/office/drawing/2014/main" xmlns="" id="{33AAA53A-C957-4B5A-B16D-720DF9BE205C}"/>
                 </a:ext>
               </a:extLst>
             </p:cNvPr>
@@ -25036,7 +25136,7 @@
             <p:cNvPr id="139" name="Rectangle 138">
               <a:extLst>
                 <a:ext uri="{FF2B5EF4-FFF2-40B4-BE49-F238E27FC236}">
-                  <a16:creationId xmlns:a16="http://schemas.microsoft.com/office/drawing/2014/main" id="{E80A1B97-6005-4140-8B50-E0E3F5F293F4}"/>
+                  <a16:creationId xmlns:a16="http://schemas.microsoft.com/office/drawing/2014/main" xmlns="" id="{E80A1B97-6005-4140-8B50-E0E3F5F293F4}"/>
                 </a:ext>
               </a:extLst>
             </p:cNvPr>
@@ -25090,7 +25190,7 @@
             <p:cNvPr id="140" name="Rectangle 139">
               <a:extLst>
                 <a:ext uri="{FF2B5EF4-FFF2-40B4-BE49-F238E27FC236}">
-                  <a16:creationId xmlns:a16="http://schemas.microsoft.com/office/drawing/2014/main" id="{A66DE1DD-10F2-4CFA-9ECD-D01722FE86F2}"/>
+                  <a16:creationId xmlns:a16="http://schemas.microsoft.com/office/drawing/2014/main" xmlns="" id="{A66DE1DD-10F2-4CFA-9ECD-D01722FE86F2}"/>
                 </a:ext>
               </a:extLst>
             </p:cNvPr>
@@ -25145,7 +25245,7 @@
           <p:cNvPr id="141" name="Group 140">
             <a:extLst>
               <a:ext uri="{FF2B5EF4-FFF2-40B4-BE49-F238E27FC236}">
-                <a16:creationId xmlns:a16="http://schemas.microsoft.com/office/drawing/2014/main" id="{967D4F39-C61F-47A4-B9DB-650E7754FA42}"/>
+                <a16:creationId xmlns:a16="http://schemas.microsoft.com/office/drawing/2014/main" xmlns="" id="{967D4F39-C61F-47A4-B9DB-650E7754FA42}"/>
               </a:ext>
             </a:extLst>
           </p:cNvPr>
@@ -25165,7 +25265,7 @@
             <p:cNvPr id="142" name="Rectangle 141">
               <a:extLst>
                 <a:ext uri="{FF2B5EF4-FFF2-40B4-BE49-F238E27FC236}">
-                  <a16:creationId xmlns:a16="http://schemas.microsoft.com/office/drawing/2014/main" id="{C05992EE-4B74-446B-8E4A-53DD1A97836E}"/>
+                  <a16:creationId xmlns:a16="http://schemas.microsoft.com/office/drawing/2014/main" xmlns="" id="{C05992EE-4B74-446B-8E4A-53DD1A97836E}"/>
                 </a:ext>
               </a:extLst>
             </p:cNvPr>
@@ -25221,7 +25321,7 @@
             <p:cNvPr id="143" name="Rectangle 142">
               <a:extLst>
                 <a:ext uri="{FF2B5EF4-FFF2-40B4-BE49-F238E27FC236}">
-                  <a16:creationId xmlns:a16="http://schemas.microsoft.com/office/drawing/2014/main" id="{F82FE5FE-0275-4AC5-83B1-3844D067251E}"/>
+                  <a16:creationId xmlns:a16="http://schemas.microsoft.com/office/drawing/2014/main" xmlns="" id="{F82FE5FE-0275-4AC5-83B1-3844D067251E}"/>
                 </a:ext>
               </a:extLst>
             </p:cNvPr>
@@ -25275,7 +25375,7 @@
             <p:cNvPr id="144" name="Rectangle 143">
               <a:extLst>
                 <a:ext uri="{FF2B5EF4-FFF2-40B4-BE49-F238E27FC236}">
-                  <a16:creationId xmlns:a16="http://schemas.microsoft.com/office/drawing/2014/main" id="{DC81E49B-3796-47D3-96B2-03FFAB1F18EE}"/>
+                  <a16:creationId xmlns:a16="http://schemas.microsoft.com/office/drawing/2014/main" xmlns="" id="{DC81E49B-3796-47D3-96B2-03FFAB1F18EE}"/>
                 </a:ext>
               </a:extLst>
             </p:cNvPr>
@@ -25330,7 +25430,7 @@
           <p:cNvPr id="145" name="Straight Connector 144">
             <a:extLst>
               <a:ext uri="{FF2B5EF4-FFF2-40B4-BE49-F238E27FC236}">
-                <a16:creationId xmlns:a16="http://schemas.microsoft.com/office/drawing/2014/main" id="{60E0FC48-CC90-4BCD-B106-6EAA449D5219}"/>
+                <a16:creationId xmlns:a16="http://schemas.microsoft.com/office/drawing/2014/main" xmlns="" id="{60E0FC48-CC90-4BCD-B106-6EAA449D5219}"/>
               </a:ext>
             </a:extLst>
           </p:cNvPr>
@@ -25376,7 +25476,7 @@
           <p:cNvPr id="147" name="Straight Connector 146">
             <a:extLst>
               <a:ext uri="{FF2B5EF4-FFF2-40B4-BE49-F238E27FC236}">
-                <a16:creationId xmlns:a16="http://schemas.microsoft.com/office/drawing/2014/main" id="{296D3F54-A6CA-4543-887C-EE0ADBBBD802}"/>
+                <a16:creationId xmlns:a16="http://schemas.microsoft.com/office/drawing/2014/main" xmlns="" id="{296D3F54-A6CA-4543-887C-EE0ADBBBD802}"/>
               </a:ext>
             </a:extLst>
           </p:cNvPr>
@@ -25422,7 +25522,7 @@
           <p:cNvPr id="150" name="Rectangle 149">
             <a:extLst>
               <a:ext uri="{FF2B5EF4-FFF2-40B4-BE49-F238E27FC236}">
-                <a16:creationId xmlns:a16="http://schemas.microsoft.com/office/drawing/2014/main" id="{8C1C3700-0CDD-4AA7-AD10-D16B0C42B27A}"/>
+                <a16:creationId xmlns:a16="http://schemas.microsoft.com/office/drawing/2014/main" xmlns="" id="{8C1C3700-0CDD-4AA7-AD10-D16B0C42B27A}"/>
               </a:ext>
             </a:extLst>
           </p:cNvPr>
@@ -25476,7 +25576,7 @@
           <p:cNvPr id="151" name="Rectangle 150">
             <a:extLst>
               <a:ext uri="{FF2B5EF4-FFF2-40B4-BE49-F238E27FC236}">
-                <a16:creationId xmlns:a16="http://schemas.microsoft.com/office/drawing/2014/main" id="{2F9971B5-F97B-48C5-A359-DE29289F3691}"/>
+                <a16:creationId xmlns:a16="http://schemas.microsoft.com/office/drawing/2014/main" xmlns="" id="{2F9971B5-F97B-48C5-A359-DE29289F3691}"/>
               </a:ext>
             </a:extLst>
           </p:cNvPr>
@@ -25514,7 +25614,7 @@
           <p:cNvPr id="153" name="Rectangle 152">
             <a:extLst>
               <a:ext uri="{FF2B5EF4-FFF2-40B4-BE49-F238E27FC236}">
-                <a16:creationId xmlns:a16="http://schemas.microsoft.com/office/drawing/2014/main" id="{C3F9E766-6B1A-461B-9524-C2CC2A772BB9}"/>
+                <a16:creationId xmlns:a16="http://schemas.microsoft.com/office/drawing/2014/main" xmlns="" id="{C3F9E766-6B1A-461B-9524-C2CC2A772BB9}"/>
               </a:ext>
             </a:extLst>
           </p:cNvPr>
@@ -25568,7 +25668,7 @@
           <p:cNvPr id="154" name="Rectangle 153">
             <a:extLst>
               <a:ext uri="{FF2B5EF4-FFF2-40B4-BE49-F238E27FC236}">
-                <a16:creationId xmlns:a16="http://schemas.microsoft.com/office/drawing/2014/main" id="{37BC63D4-5013-4717-BF24-9D22F80351B1}"/>
+                <a16:creationId xmlns:a16="http://schemas.microsoft.com/office/drawing/2014/main" xmlns="" id="{37BC63D4-5013-4717-BF24-9D22F80351B1}"/>
               </a:ext>
             </a:extLst>
           </p:cNvPr>
@@ -25606,7 +25706,7 @@
           <p:cNvPr id="155" name="Rectangle 154">
             <a:extLst>
               <a:ext uri="{FF2B5EF4-FFF2-40B4-BE49-F238E27FC236}">
-                <a16:creationId xmlns:a16="http://schemas.microsoft.com/office/drawing/2014/main" id="{5D1518F9-1B64-4B1D-AB44-4C8FB2A63992}"/>
+                <a16:creationId xmlns:a16="http://schemas.microsoft.com/office/drawing/2014/main" xmlns="" id="{5D1518F9-1B64-4B1D-AB44-4C8FB2A63992}"/>
               </a:ext>
             </a:extLst>
           </p:cNvPr>
@@ -25660,7 +25760,7 @@
           <p:cNvPr id="156" name="Rectangle 155">
             <a:extLst>
               <a:ext uri="{FF2B5EF4-FFF2-40B4-BE49-F238E27FC236}">
-                <a16:creationId xmlns:a16="http://schemas.microsoft.com/office/drawing/2014/main" id="{B5F5C08B-1AFD-4916-9AA6-3FAA2CE0B281}"/>
+                <a16:creationId xmlns:a16="http://schemas.microsoft.com/office/drawing/2014/main" xmlns="" id="{B5F5C08B-1AFD-4916-9AA6-3FAA2CE0B281}"/>
               </a:ext>
             </a:extLst>
           </p:cNvPr>
@@ -25698,7 +25798,7 @@
           <p:cNvPr id="157" name="Rectangle 156">
             <a:extLst>
               <a:ext uri="{FF2B5EF4-FFF2-40B4-BE49-F238E27FC236}">
-                <a16:creationId xmlns:a16="http://schemas.microsoft.com/office/drawing/2014/main" id="{0D9B2368-3D66-4F16-8C56-BFA12DA73810}"/>
+                <a16:creationId xmlns:a16="http://schemas.microsoft.com/office/drawing/2014/main" xmlns="" id="{0D9B2368-3D66-4F16-8C56-BFA12DA73810}"/>
               </a:ext>
             </a:extLst>
           </p:cNvPr>
@@ -25739,7 +25839,7 @@
           <p:cNvPr id="158" name="Straight Connector 157">
             <a:extLst>
               <a:ext uri="{FF2B5EF4-FFF2-40B4-BE49-F238E27FC236}">
-                <a16:creationId xmlns:a16="http://schemas.microsoft.com/office/drawing/2014/main" id="{2200D39C-0C04-4D17-BFBA-EBCD8A568A28}"/>
+                <a16:creationId xmlns:a16="http://schemas.microsoft.com/office/drawing/2014/main" xmlns="" id="{2200D39C-0C04-4D17-BFBA-EBCD8A568A28}"/>
               </a:ext>
             </a:extLst>
           </p:cNvPr>
@@ -25785,7 +25885,7 @@
           <p:cNvPr id="161" name="Rectangle 160">
             <a:extLst>
               <a:ext uri="{FF2B5EF4-FFF2-40B4-BE49-F238E27FC236}">
-                <a16:creationId xmlns:a16="http://schemas.microsoft.com/office/drawing/2014/main" id="{D54B475D-F2DF-47E0-A493-7F8E0E32B006}"/>
+                <a16:creationId xmlns:a16="http://schemas.microsoft.com/office/drawing/2014/main" xmlns="" id="{D54B475D-F2DF-47E0-A493-7F8E0E32B006}"/>
               </a:ext>
             </a:extLst>
           </p:cNvPr>
@@ -25826,7 +25926,7 @@
           <p:cNvPr id="162" name="Straight Connector 161">
             <a:extLst>
               <a:ext uri="{FF2B5EF4-FFF2-40B4-BE49-F238E27FC236}">
-                <a16:creationId xmlns:a16="http://schemas.microsoft.com/office/drawing/2014/main" id="{E66AD3B3-28EE-44F9-9E83-E3469196F970}"/>
+                <a16:creationId xmlns:a16="http://schemas.microsoft.com/office/drawing/2014/main" xmlns="" id="{E66AD3B3-28EE-44F9-9E83-E3469196F970}"/>
               </a:ext>
             </a:extLst>
           </p:cNvPr>
@@ -25872,7 +25972,7 @@
           <p:cNvPr id="166" name="Rectangle 165">
             <a:extLst>
               <a:ext uri="{FF2B5EF4-FFF2-40B4-BE49-F238E27FC236}">
-                <a16:creationId xmlns:a16="http://schemas.microsoft.com/office/drawing/2014/main" id="{0D97EAB7-B6E6-4B45-A497-FEE4EFE30294}"/>
+                <a16:creationId xmlns:a16="http://schemas.microsoft.com/office/drawing/2014/main" xmlns="" id="{0D97EAB7-B6E6-4B45-A497-FEE4EFE30294}"/>
               </a:ext>
             </a:extLst>
           </p:cNvPr>
@@ -25913,7 +26013,7 @@
           <p:cNvPr id="167" name="Straight Connector 166">
             <a:extLst>
               <a:ext uri="{FF2B5EF4-FFF2-40B4-BE49-F238E27FC236}">
-                <a16:creationId xmlns:a16="http://schemas.microsoft.com/office/drawing/2014/main" id="{3017B4EF-BEFA-4FC2-A7EE-9B908FDFB234}"/>
+                <a16:creationId xmlns:a16="http://schemas.microsoft.com/office/drawing/2014/main" xmlns="" id="{3017B4EF-BEFA-4FC2-A7EE-9B908FDFB234}"/>
               </a:ext>
             </a:extLst>
           </p:cNvPr>
@@ -25959,7 +26059,7 @@
           <p:cNvPr id="168" name="Rectangle 167">
             <a:extLst>
               <a:ext uri="{FF2B5EF4-FFF2-40B4-BE49-F238E27FC236}">
-                <a16:creationId xmlns:a16="http://schemas.microsoft.com/office/drawing/2014/main" id="{AE73D496-C1F5-477E-9F63-7BC75DCCB9E1}"/>
+                <a16:creationId xmlns:a16="http://schemas.microsoft.com/office/drawing/2014/main" xmlns="" id="{AE73D496-C1F5-477E-9F63-7BC75DCCB9E1}"/>
               </a:ext>
             </a:extLst>
           </p:cNvPr>
@@ -26011,7 +26111,7 @@
           <p:cNvPr id="169" name="Rectangle 168">
             <a:extLst>
               <a:ext uri="{FF2B5EF4-FFF2-40B4-BE49-F238E27FC236}">
-                <a16:creationId xmlns:a16="http://schemas.microsoft.com/office/drawing/2014/main" id="{9CA58566-F95C-4C13-8F09-4690FE2DC9A7}"/>
+                <a16:creationId xmlns:a16="http://schemas.microsoft.com/office/drawing/2014/main" xmlns="" id="{9CA58566-F95C-4C13-8F09-4690FE2DC9A7}"/>
               </a:ext>
             </a:extLst>
           </p:cNvPr>
@@ -26392,7 +26492,7 @@
           <p:cNvPr id="7" name="Group 6">
             <a:extLst>
               <a:ext uri="{FF2B5EF4-FFF2-40B4-BE49-F238E27FC236}">
-                <a16:creationId xmlns:a16="http://schemas.microsoft.com/office/drawing/2014/main" id="{A8561038-DE88-4359-BE6C-A8A161683EA4}"/>
+                <a16:creationId xmlns:a16="http://schemas.microsoft.com/office/drawing/2014/main" xmlns="" id="{A8561038-DE88-4359-BE6C-A8A161683EA4}"/>
               </a:ext>
             </a:extLst>
           </p:cNvPr>
@@ -26412,7 +26512,7 @@
             <p:cNvPr id="16" name="Arrow: Circular 15">
               <a:extLst>
                 <a:ext uri="{FF2B5EF4-FFF2-40B4-BE49-F238E27FC236}">
-                  <a16:creationId xmlns:a16="http://schemas.microsoft.com/office/drawing/2014/main" id="{F284D861-CC57-434F-AE13-62D12C205157}"/>
+                  <a16:creationId xmlns:a16="http://schemas.microsoft.com/office/drawing/2014/main" xmlns="" id="{F284D861-CC57-434F-AE13-62D12C205157}"/>
                 </a:ext>
               </a:extLst>
             </p:cNvPr>
@@ -26475,7 +26575,7 @@
             <p:cNvPr id="21" name="Freeform: Shape 20">
               <a:extLst>
                 <a:ext uri="{FF2B5EF4-FFF2-40B4-BE49-F238E27FC236}">
-                  <a16:creationId xmlns:a16="http://schemas.microsoft.com/office/drawing/2014/main" id="{569B1660-42B8-47F7-8895-3F50C17724C8}"/>
+                  <a16:creationId xmlns:a16="http://schemas.microsoft.com/office/drawing/2014/main" xmlns="" id="{569B1660-42B8-47F7-8895-3F50C17724C8}"/>
                 </a:ext>
               </a:extLst>
             </p:cNvPr>
@@ -26606,7 +26706,7 @@
             <p:cNvPr id="22" name="Shape 21">
               <a:extLst>
                 <a:ext uri="{FF2B5EF4-FFF2-40B4-BE49-F238E27FC236}">
-                  <a16:creationId xmlns:a16="http://schemas.microsoft.com/office/drawing/2014/main" id="{1DFD1396-D97A-4438-96C5-867C86C04866}"/>
+                  <a16:creationId xmlns:a16="http://schemas.microsoft.com/office/drawing/2014/main" xmlns="" id="{1DFD1396-D97A-4438-96C5-867C86C04866}"/>
                 </a:ext>
               </a:extLst>
             </p:cNvPr>
@@ -26669,7 +26769,7 @@
             <p:cNvPr id="23" name="Freeform: Shape 22">
               <a:extLst>
                 <a:ext uri="{FF2B5EF4-FFF2-40B4-BE49-F238E27FC236}">
-                  <a16:creationId xmlns:a16="http://schemas.microsoft.com/office/drawing/2014/main" id="{7DFE206A-E4B7-424E-B634-62CBE811CC85}"/>
+                  <a16:creationId xmlns:a16="http://schemas.microsoft.com/office/drawing/2014/main" xmlns="" id="{7DFE206A-E4B7-424E-B634-62CBE811CC85}"/>
                 </a:ext>
               </a:extLst>
             </p:cNvPr>
@@ -26800,7 +26900,7 @@
             <p:cNvPr id="24" name="Block Arc 23">
               <a:extLst>
                 <a:ext uri="{FF2B5EF4-FFF2-40B4-BE49-F238E27FC236}">
-                  <a16:creationId xmlns:a16="http://schemas.microsoft.com/office/drawing/2014/main" id="{3617736B-EF56-44F0-89DD-052CDFB8A126}"/>
+                  <a16:creationId xmlns:a16="http://schemas.microsoft.com/office/drawing/2014/main" xmlns="" id="{3617736B-EF56-44F0-89DD-052CDFB8A126}"/>
                 </a:ext>
               </a:extLst>
             </p:cNvPr>
@@ -26861,7 +26961,7 @@
             <p:cNvPr id="25" name="Freeform: Shape 24">
               <a:extLst>
                 <a:ext uri="{FF2B5EF4-FFF2-40B4-BE49-F238E27FC236}">
-                  <a16:creationId xmlns:a16="http://schemas.microsoft.com/office/drawing/2014/main" id="{5F534E20-4911-4D0C-A42B-770F92F117B5}"/>
+                  <a16:creationId xmlns:a16="http://schemas.microsoft.com/office/drawing/2014/main" xmlns="" id="{5F534E20-4911-4D0C-A42B-770F92F117B5}"/>
                 </a:ext>
               </a:extLst>
             </p:cNvPr>
@@ -26993,7 +27093,7 @@
           <p:cNvPr id="40" name="Arrow: Right 39">
             <a:extLst>
               <a:ext uri="{FF2B5EF4-FFF2-40B4-BE49-F238E27FC236}">
-                <a16:creationId xmlns:a16="http://schemas.microsoft.com/office/drawing/2014/main" id="{AB7C45BA-0078-4BA1-A2B3-BC9A66ACD955}"/>
+                <a16:creationId xmlns:a16="http://schemas.microsoft.com/office/drawing/2014/main" xmlns="" id="{AB7C45BA-0078-4BA1-A2B3-BC9A66ACD955}"/>
               </a:ext>
             </a:extLst>
           </p:cNvPr>
@@ -27045,7 +27145,7 @@
           <p:cNvPr id="12" name="Picture 11" descr="A picture containing outdoor object&#10;&#10;Description generated with high confidence">
             <a:extLst>
               <a:ext uri="{FF2B5EF4-FFF2-40B4-BE49-F238E27FC236}">
-                <a16:creationId xmlns:a16="http://schemas.microsoft.com/office/drawing/2014/main" id="{684713F9-9ECF-4663-A027-A6113FA71893}"/>
+                <a16:creationId xmlns:a16="http://schemas.microsoft.com/office/drawing/2014/main" xmlns="" id="{684713F9-9ECF-4663-A027-A6113FA71893}"/>
               </a:ext>
             </a:extLst>
           </p:cNvPr>
@@ -27081,7 +27181,7 @@
           <p:cNvPr id="26" name="Rectangle 25">
             <a:extLst>
               <a:ext uri="{FF2B5EF4-FFF2-40B4-BE49-F238E27FC236}">
-                <a16:creationId xmlns:a16="http://schemas.microsoft.com/office/drawing/2014/main" id="{BB49DDA5-5677-40D8-B6EC-AF518F4EF4C9}"/>
+                <a16:creationId xmlns:a16="http://schemas.microsoft.com/office/drawing/2014/main" xmlns="" id="{BB49DDA5-5677-40D8-B6EC-AF518F4EF4C9}"/>
               </a:ext>
             </a:extLst>
           </p:cNvPr>
@@ -27139,7 +27239,7 @@
           <p:cNvPr id="57" name="Rectangle 56">
             <a:extLst>
               <a:ext uri="{FF2B5EF4-FFF2-40B4-BE49-F238E27FC236}">
-                <a16:creationId xmlns:a16="http://schemas.microsoft.com/office/drawing/2014/main" id="{48C55BC0-B2B6-499C-829C-664985214C5E}"/>
+                <a16:creationId xmlns:a16="http://schemas.microsoft.com/office/drawing/2014/main" xmlns="" id="{48C55BC0-B2B6-499C-829C-664985214C5E}"/>
               </a:ext>
             </a:extLst>
           </p:cNvPr>
@@ -27197,7 +27297,7 @@
           <p:cNvPr id="27" name="Rectangle 26">
             <a:extLst>
               <a:ext uri="{FF2B5EF4-FFF2-40B4-BE49-F238E27FC236}">
-                <a16:creationId xmlns:a16="http://schemas.microsoft.com/office/drawing/2014/main" id="{5A55CB4F-5432-46E9-93D9-15090BEF7BC3}"/>
+                <a16:creationId xmlns:a16="http://schemas.microsoft.com/office/drawing/2014/main" xmlns="" id="{5A55CB4F-5432-46E9-93D9-15090BEF7BC3}"/>
               </a:ext>
             </a:extLst>
           </p:cNvPr>
@@ -27249,7 +27349,7 @@
           <p:cNvPr id="59" name="Rectangle 58">
             <a:extLst>
               <a:ext uri="{FF2B5EF4-FFF2-40B4-BE49-F238E27FC236}">
-                <a16:creationId xmlns:a16="http://schemas.microsoft.com/office/drawing/2014/main" id="{82A87F86-E4B1-4EDF-A870-C3D51B76494E}"/>
+                <a16:creationId xmlns:a16="http://schemas.microsoft.com/office/drawing/2014/main" xmlns="" id="{82A87F86-E4B1-4EDF-A870-C3D51B76494E}"/>
               </a:ext>
             </a:extLst>
           </p:cNvPr>
@@ -27322,7 +27422,7 @@
           <p:cNvPr id="28" name="Rectangle 27">
             <a:extLst>
               <a:ext uri="{FF2B5EF4-FFF2-40B4-BE49-F238E27FC236}">
-                <a16:creationId xmlns:a16="http://schemas.microsoft.com/office/drawing/2014/main" id="{0C902A55-E171-462C-91BF-53B8EC2B1CED}"/>
+                <a16:creationId xmlns:a16="http://schemas.microsoft.com/office/drawing/2014/main" xmlns="" id="{0C902A55-E171-462C-91BF-53B8EC2B1CED}"/>
               </a:ext>
             </a:extLst>
           </p:cNvPr>
@@ -27363,7 +27463,7 @@
           <p:cNvPr id="61" name="Picture 9">
             <a:extLst>
               <a:ext uri="{FF2B5EF4-FFF2-40B4-BE49-F238E27FC236}">
-                <a16:creationId xmlns:a16="http://schemas.microsoft.com/office/drawing/2014/main" id="{7CA4DCD7-E1D7-43ED-A034-F7B8A33E4482}"/>
+                <a16:creationId xmlns:a16="http://schemas.microsoft.com/office/drawing/2014/main" xmlns="" id="{7CA4DCD7-E1D7-43ED-A034-F7B8A33E4482}"/>
               </a:ext>
             </a:extLst>
           </p:cNvPr>
@@ -27423,7 +27523,7 @@
           <p:cNvPr id="62" name="Picture 9">
             <a:extLst>
               <a:ext uri="{FF2B5EF4-FFF2-40B4-BE49-F238E27FC236}">
-                <a16:creationId xmlns:a16="http://schemas.microsoft.com/office/drawing/2014/main" id="{3E15DB23-C9A8-4D02-AED9-52AE9E42BC6F}"/>
+                <a16:creationId xmlns:a16="http://schemas.microsoft.com/office/drawing/2014/main" xmlns="" id="{3E15DB23-C9A8-4D02-AED9-52AE9E42BC6F}"/>
               </a:ext>
             </a:extLst>
           </p:cNvPr>
@@ -27483,7 +27583,7 @@
           <p:cNvPr id="63" name="Picture 9">
             <a:extLst>
               <a:ext uri="{FF2B5EF4-FFF2-40B4-BE49-F238E27FC236}">
-                <a16:creationId xmlns:a16="http://schemas.microsoft.com/office/drawing/2014/main" id="{F13E6F69-4653-4FC6-B420-2A3711660161}"/>
+                <a16:creationId xmlns:a16="http://schemas.microsoft.com/office/drawing/2014/main" xmlns="" id="{F13E6F69-4653-4FC6-B420-2A3711660161}"/>
               </a:ext>
             </a:extLst>
           </p:cNvPr>
@@ -27543,7 +27643,7 @@
           <p:cNvPr id="64" name="Picture 9">
             <a:extLst>
               <a:ext uri="{FF2B5EF4-FFF2-40B4-BE49-F238E27FC236}">
-                <a16:creationId xmlns:a16="http://schemas.microsoft.com/office/drawing/2014/main" id="{E58CD232-697B-4057-87B5-C852ACD14980}"/>
+                <a16:creationId xmlns:a16="http://schemas.microsoft.com/office/drawing/2014/main" xmlns="" id="{E58CD232-697B-4057-87B5-C852ACD14980}"/>
               </a:ext>
             </a:extLst>
           </p:cNvPr>
@@ -27603,7 +27703,7 @@
           <p:cNvPr id="65" name="Picture 9">
             <a:extLst>
               <a:ext uri="{FF2B5EF4-FFF2-40B4-BE49-F238E27FC236}">
-                <a16:creationId xmlns:a16="http://schemas.microsoft.com/office/drawing/2014/main" id="{55FA8B74-483B-4E18-A676-08845700F1B6}"/>
+                <a16:creationId xmlns:a16="http://schemas.microsoft.com/office/drawing/2014/main" xmlns="" id="{55FA8B74-483B-4E18-A676-08845700F1B6}"/>
               </a:ext>
             </a:extLst>
           </p:cNvPr>
@@ -27663,7 +27763,7 @@
           <p:cNvPr id="66" name="Picture 9">
             <a:extLst>
               <a:ext uri="{FF2B5EF4-FFF2-40B4-BE49-F238E27FC236}">
-                <a16:creationId xmlns:a16="http://schemas.microsoft.com/office/drawing/2014/main" id="{A6A6836D-4520-4E4E-8C8D-4E2DB3C2CF9F}"/>
+                <a16:creationId xmlns:a16="http://schemas.microsoft.com/office/drawing/2014/main" xmlns="" id="{A6A6836D-4520-4E4E-8C8D-4E2DB3C2CF9F}"/>
               </a:ext>
             </a:extLst>
           </p:cNvPr>
@@ -27723,7 +27823,7 @@
           <p:cNvPr id="73" name="Arrow: Right 72">
             <a:extLst>
               <a:ext uri="{FF2B5EF4-FFF2-40B4-BE49-F238E27FC236}">
-                <a16:creationId xmlns:a16="http://schemas.microsoft.com/office/drawing/2014/main" id="{8B51D19B-ED16-4D8F-91D9-264400D26995}"/>
+                <a16:creationId xmlns:a16="http://schemas.microsoft.com/office/drawing/2014/main" xmlns="" id="{8B51D19B-ED16-4D8F-91D9-264400D26995}"/>
               </a:ext>
             </a:extLst>
           </p:cNvPr>
@@ -27775,7 +27875,7 @@
           <p:cNvPr id="74" name="Rectangle 73">
             <a:extLst>
               <a:ext uri="{FF2B5EF4-FFF2-40B4-BE49-F238E27FC236}">
-                <a16:creationId xmlns:a16="http://schemas.microsoft.com/office/drawing/2014/main" id="{8C49519C-8ED0-42A2-827B-8EFE26EFEC6C}"/>
+                <a16:creationId xmlns:a16="http://schemas.microsoft.com/office/drawing/2014/main" xmlns="" id="{8C49519C-8ED0-42A2-827B-8EFE26EFEC6C}"/>
               </a:ext>
             </a:extLst>
           </p:cNvPr>
@@ -27833,7 +27933,7 @@
           <p:cNvPr id="41" name="Picture 40" descr="A close up of a logo&#10;&#10;Description generated with high confidence">
             <a:extLst>
               <a:ext uri="{FF2B5EF4-FFF2-40B4-BE49-F238E27FC236}">
-                <a16:creationId xmlns:a16="http://schemas.microsoft.com/office/drawing/2014/main" id="{1B1A1B10-88A1-4127-BDDC-654E374590CB}"/>
+                <a16:creationId xmlns:a16="http://schemas.microsoft.com/office/drawing/2014/main" xmlns="" id="{1B1A1B10-88A1-4127-BDDC-654E374590CB}"/>
               </a:ext>
             </a:extLst>
           </p:cNvPr>
@@ -27843,13 +27943,13 @@
           <p:nvPr/>
         </p:nvPicPr>
         <p:blipFill>
-          <a:blip r:embed="rId4">
+          <a:blip r:embed="rId4" cstate="print">
             <a:extLst>
               <a:ext uri="{28A0092B-C50C-407E-A947-70E740481C1C}">
                 <a14:useLocalDpi xmlns:a14="http://schemas.microsoft.com/office/drawing/2010/main" val="0"/>
               </a:ext>
               <a:ext uri="{837473B0-CC2E-450A-ABE3-18F120FF3D39}">
-                <a1611:picAttrSrcUrl xmlns:a1611="http://schemas.microsoft.com/office/drawing/2016/11/main" r:id="rId5"/>
+                <a1611:picAttrSrcUrl xmlns:a1611="http://schemas.microsoft.com/office/drawing/2016/11/main" xmlns="" r:id="rId5"/>
               </a:ext>
             </a:extLst>
           </a:blip>
@@ -27872,7 +27972,7 @@
           <p:cNvPr id="51" name="Picture 50" descr="A close up of a logo&#10;&#10;Description generated with very high confidence">
             <a:extLst>
               <a:ext uri="{FF2B5EF4-FFF2-40B4-BE49-F238E27FC236}">
-                <a16:creationId xmlns:a16="http://schemas.microsoft.com/office/drawing/2014/main" id="{12DB071B-9FE4-47F0-9242-7CA3AD89BA45}"/>
+                <a16:creationId xmlns:a16="http://schemas.microsoft.com/office/drawing/2014/main" xmlns="" id="{12DB071B-9FE4-47F0-9242-7CA3AD89BA45}"/>
               </a:ext>
             </a:extLst>
           </p:cNvPr>
@@ -27882,13 +27982,13 @@
           <p:nvPr/>
         </p:nvPicPr>
         <p:blipFill>
-          <a:blip r:embed="rId6">
+          <a:blip r:embed="rId6" cstate="print">
             <a:extLst>
               <a:ext uri="{28A0092B-C50C-407E-A947-70E740481C1C}">
                 <a14:useLocalDpi xmlns:a14="http://schemas.microsoft.com/office/drawing/2010/main" val="0"/>
               </a:ext>
               <a:ext uri="{837473B0-CC2E-450A-ABE3-18F120FF3D39}">
-                <a1611:picAttrSrcUrl xmlns:a1611="http://schemas.microsoft.com/office/drawing/2016/11/main" r:id="rId7"/>
+                <a1611:picAttrSrcUrl xmlns:a1611="http://schemas.microsoft.com/office/drawing/2016/11/main" xmlns="" r:id="rId7"/>
               </a:ext>
             </a:extLst>
           </a:blip>
@@ -27911,7 +28011,7 @@
           <p:cNvPr id="90" name="Rectangle 89">
             <a:extLst>
               <a:ext uri="{FF2B5EF4-FFF2-40B4-BE49-F238E27FC236}">
-                <a16:creationId xmlns:a16="http://schemas.microsoft.com/office/drawing/2014/main" id="{91289779-90EE-49B2-95D6-F41058463510}"/>
+                <a16:creationId xmlns:a16="http://schemas.microsoft.com/office/drawing/2014/main" xmlns="" id="{91289779-90EE-49B2-95D6-F41058463510}"/>
               </a:ext>
             </a:extLst>
           </p:cNvPr>
@@ -27920,8 +28020,8 @@
         </p:nvSpPr>
         <p:spPr>
           <a:xfrm>
-            <a:off x="5572832" y="2292344"/>
-            <a:ext cx="1492716" cy="369332"/>
+            <a:off x="5585657" y="2292344"/>
+            <a:ext cx="1467068" cy="369332"/>
           </a:xfrm>
           <a:prstGeom prst="rect">
             <a:avLst/>
@@ -27939,7 +28039,14 @@
                 <a:latin typeface="Arial" panose="020B0604020202020204" pitchFamily="34" charset="0"/>
                 <a:cs typeface="Arial" panose="020B0604020202020204" pitchFamily="34" charset="0"/>
               </a:rPr>
-              <a:t>Post mortem</a:t>
+              <a:t>Post </a:t>
+            </a:r>
+            <a:r>
+              <a:rPr lang="sv-SE" dirty="0" smtClean="0">
+                <a:latin typeface="Arial" panose="020B0604020202020204" pitchFamily="34" charset="0"/>
+                <a:cs typeface="Arial" panose="020B0604020202020204" pitchFamily="34" charset="0"/>
+              </a:rPr>
+              <a:t>release</a:t>
             </a:r>
             <a:endParaRPr lang="en-US" dirty="0">
               <a:latin typeface="Arial" panose="020B0604020202020204" pitchFamily="34" charset="0"/>
@@ -27953,7 +28060,7 @@
           <p:cNvPr id="91" name="Arrow: Right 90">
             <a:extLst>
               <a:ext uri="{FF2B5EF4-FFF2-40B4-BE49-F238E27FC236}">
-                <a16:creationId xmlns:a16="http://schemas.microsoft.com/office/drawing/2014/main" id="{3DBCC447-F731-44CE-896D-3CEE37C031A1}"/>
+                <a16:creationId xmlns:a16="http://schemas.microsoft.com/office/drawing/2014/main" xmlns="" id="{3DBCC447-F731-44CE-896D-3CEE37C031A1}"/>
               </a:ext>
             </a:extLst>
           </p:cNvPr>
@@ -28005,7 +28112,7 @@
           <p:cNvPr id="92" name="Rectangle 91">
             <a:extLst>
               <a:ext uri="{FF2B5EF4-FFF2-40B4-BE49-F238E27FC236}">
-                <a16:creationId xmlns:a16="http://schemas.microsoft.com/office/drawing/2014/main" id="{B3A00306-95B5-4F99-AAEA-74434B776B12}"/>
+                <a16:creationId xmlns:a16="http://schemas.microsoft.com/office/drawing/2014/main" xmlns="" id="{B3A00306-95B5-4F99-AAEA-74434B776B12}"/>
               </a:ext>
             </a:extLst>
           </p:cNvPr>
@@ -28063,7 +28170,7 @@
           <p:cNvPr id="53" name="Rectangle 52">
             <a:extLst>
               <a:ext uri="{FF2B5EF4-FFF2-40B4-BE49-F238E27FC236}">
-                <a16:creationId xmlns:a16="http://schemas.microsoft.com/office/drawing/2014/main" id="{388E73F8-63C8-46A9-B27C-C9211C204266}"/>
+                <a16:creationId xmlns:a16="http://schemas.microsoft.com/office/drawing/2014/main" xmlns="" id="{388E73F8-63C8-46A9-B27C-C9211C204266}"/>
               </a:ext>
             </a:extLst>
           </p:cNvPr>
@@ -28112,7 +28219,7 @@
           <p:cNvPr id="2" name="Rectangle 1">
             <a:extLst>
               <a:ext uri="{FF2B5EF4-FFF2-40B4-BE49-F238E27FC236}">
-                <a16:creationId xmlns:a16="http://schemas.microsoft.com/office/drawing/2014/main" id="{35B408D3-DC8D-4EBC-B037-59C4D3CD1A67}"/>
+                <a16:creationId xmlns:a16="http://schemas.microsoft.com/office/drawing/2014/main" xmlns="" id="{35B408D3-DC8D-4EBC-B037-59C4D3CD1A67}"/>
               </a:ext>
             </a:extLst>
           </p:cNvPr>
@@ -28158,7 +28265,7 @@
           <p:cNvPr id="31" name="Rectangle 30">
             <a:extLst>
               <a:ext uri="{FF2B5EF4-FFF2-40B4-BE49-F238E27FC236}">
-                <a16:creationId xmlns:a16="http://schemas.microsoft.com/office/drawing/2014/main" id="{837668D4-746D-44E8-9D48-A4F9B365EA7E}"/>
+                <a16:creationId xmlns:a16="http://schemas.microsoft.com/office/drawing/2014/main" xmlns="" id="{837668D4-746D-44E8-9D48-A4F9B365EA7E}"/>
               </a:ext>
             </a:extLst>
           </p:cNvPr>
@@ -28214,7 +28321,7 @@
           <p:cNvPr id="32" name="Rectangle 31">
             <a:extLst>
               <a:ext uri="{FF2B5EF4-FFF2-40B4-BE49-F238E27FC236}">
-                <a16:creationId xmlns:a16="http://schemas.microsoft.com/office/drawing/2014/main" id="{75D6D87D-383C-40BE-BD42-CBCEE986D241}"/>
+                <a16:creationId xmlns:a16="http://schemas.microsoft.com/office/drawing/2014/main" xmlns="" id="{75D6D87D-383C-40BE-BD42-CBCEE986D241}"/>
               </a:ext>
             </a:extLst>
           </p:cNvPr>
@@ -28282,7 +28389,7 @@
           <p:cNvPr id="4" name="Cloud 3">
             <a:extLst>
               <a:ext uri="{FF2B5EF4-FFF2-40B4-BE49-F238E27FC236}">
-                <a16:creationId xmlns:a16="http://schemas.microsoft.com/office/drawing/2014/main" id="{3141B1FA-0C65-4790-B026-C4DF262B0BD7}"/>
+                <a16:creationId xmlns:a16="http://schemas.microsoft.com/office/drawing/2014/main" xmlns="" id="{3141B1FA-0C65-4790-B026-C4DF262B0BD7}"/>
               </a:ext>
             </a:extLst>
           </p:cNvPr>
@@ -28393,7 +28500,7 @@
           <p:cNvPr id="12" name="Rectangle 11">
             <a:extLst>
               <a:ext uri="{FF2B5EF4-FFF2-40B4-BE49-F238E27FC236}">
-                <a16:creationId xmlns:a16="http://schemas.microsoft.com/office/drawing/2014/main" id="{1F37C778-DFF2-4C39-9755-E6BF0C148F35}"/>
+                <a16:creationId xmlns:a16="http://schemas.microsoft.com/office/drawing/2014/main" xmlns="" id="{1F37C778-DFF2-4C39-9755-E6BF0C148F35}"/>
               </a:ext>
             </a:extLst>
           </p:cNvPr>
@@ -28431,7 +28538,7 @@
           <p:cNvPr id="13" name="Rectangle 12">
             <a:extLst>
               <a:ext uri="{FF2B5EF4-FFF2-40B4-BE49-F238E27FC236}">
-                <a16:creationId xmlns:a16="http://schemas.microsoft.com/office/drawing/2014/main" id="{AD3DE133-097E-4D53-90A0-BDE00462AE50}"/>
+                <a16:creationId xmlns:a16="http://schemas.microsoft.com/office/drawing/2014/main" xmlns="" id="{AD3DE133-097E-4D53-90A0-BDE00462AE50}"/>
               </a:ext>
             </a:extLst>
           </p:cNvPr>
@@ -28469,7 +28576,7 @@
           <p:cNvPr id="14" name="Rectangle 13">
             <a:extLst>
               <a:ext uri="{FF2B5EF4-FFF2-40B4-BE49-F238E27FC236}">
-                <a16:creationId xmlns:a16="http://schemas.microsoft.com/office/drawing/2014/main" id="{92D4F564-9B8A-41F2-8344-AD34196FAFEF}"/>
+                <a16:creationId xmlns:a16="http://schemas.microsoft.com/office/drawing/2014/main" xmlns="" id="{92D4F564-9B8A-41F2-8344-AD34196FAFEF}"/>
               </a:ext>
             </a:extLst>
           </p:cNvPr>
@@ -28507,7 +28614,7 @@
           <p:cNvPr id="15" name="Rectangle 14">
             <a:extLst>
               <a:ext uri="{FF2B5EF4-FFF2-40B4-BE49-F238E27FC236}">
-                <a16:creationId xmlns:a16="http://schemas.microsoft.com/office/drawing/2014/main" id="{1116CA10-F054-4AF7-812F-2E14C3DB92A8}"/>
+                <a16:creationId xmlns:a16="http://schemas.microsoft.com/office/drawing/2014/main" xmlns="" id="{1116CA10-F054-4AF7-812F-2E14C3DB92A8}"/>
               </a:ext>
             </a:extLst>
           </p:cNvPr>
@@ -28545,7 +28652,7 @@
           <p:cNvPr id="16" name="Rectangle 15">
             <a:extLst>
               <a:ext uri="{FF2B5EF4-FFF2-40B4-BE49-F238E27FC236}">
-                <a16:creationId xmlns:a16="http://schemas.microsoft.com/office/drawing/2014/main" id="{63714086-3485-4087-A683-F1C203CF3F3A}"/>
+                <a16:creationId xmlns:a16="http://schemas.microsoft.com/office/drawing/2014/main" xmlns="" id="{63714086-3485-4087-A683-F1C203CF3F3A}"/>
               </a:ext>
             </a:extLst>
           </p:cNvPr>
@@ -28583,7 +28690,7 @@
           <p:cNvPr id="17" name="Rectangle 16">
             <a:extLst>
               <a:ext uri="{FF2B5EF4-FFF2-40B4-BE49-F238E27FC236}">
-                <a16:creationId xmlns:a16="http://schemas.microsoft.com/office/drawing/2014/main" id="{A871A22D-3138-4F20-953F-81B2D34BC353}"/>
+                <a16:creationId xmlns:a16="http://schemas.microsoft.com/office/drawing/2014/main" xmlns="" id="{A871A22D-3138-4F20-953F-81B2D34BC353}"/>
               </a:ext>
             </a:extLst>
           </p:cNvPr>
@@ -28621,7 +28728,7 @@
           <p:cNvPr id="18" name="Rectangle 17">
             <a:extLst>
               <a:ext uri="{FF2B5EF4-FFF2-40B4-BE49-F238E27FC236}">
-                <a16:creationId xmlns:a16="http://schemas.microsoft.com/office/drawing/2014/main" id="{35D06240-088C-41F7-9749-83216E384825}"/>
+                <a16:creationId xmlns:a16="http://schemas.microsoft.com/office/drawing/2014/main" xmlns="" id="{35D06240-088C-41F7-9749-83216E384825}"/>
               </a:ext>
             </a:extLst>
           </p:cNvPr>
@@ -28659,7 +28766,7 @@
           <p:cNvPr id="19" name="Rectangle 18">
             <a:extLst>
               <a:ext uri="{FF2B5EF4-FFF2-40B4-BE49-F238E27FC236}">
-                <a16:creationId xmlns:a16="http://schemas.microsoft.com/office/drawing/2014/main" id="{507C15F6-17F8-4344-860D-324D4C1B2851}"/>
+                <a16:creationId xmlns:a16="http://schemas.microsoft.com/office/drawing/2014/main" xmlns="" id="{507C15F6-17F8-4344-860D-324D4C1B2851}"/>
               </a:ext>
             </a:extLst>
           </p:cNvPr>
@@ -28697,7 +28804,7 @@
           <p:cNvPr id="20" name="Rectangle 19">
             <a:extLst>
               <a:ext uri="{FF2B5EF4-FFF2-40B4-BE49-F238E27FC236}">
-                <a16:creationId xmlns:a16="http://schemas.microsoft.com/office/drawing/2014/main" id="{C08A1ED6-5BE5-4CF2-BA4F-0BF592BA9433}"/>
+                <a16:creationId xmlns:a16="http://schemas.microsoft.com/office/drawing/2014/main" xmlns="" id="{C08A1ED6-5BE5-4CF2-BA4F-0BF592BA9433}"/>
               </a:ext>
             </a:extLst>
           </p:cNvPr>
@@ -28735,7 +28842,7 @@
           <p:cNvPr id="21" name="Rectangle 20">
             <a:extLst>
               <a:ext uri="{FF2B5EF4-FFF2-40B4-BE49-F238E27FC236}">
-                <a16:creationId xmlns:a16="http://schemas.microsoft.com/office/drawing/2014/main" id="{2CB84429-4C8B-4D28-B92A-683A872D3EF0}"/>
+                <a16:creationId xmlns:a16="http://schemas.microsoft.com/office/drawing/2014/main" xmlns="" id="{2CB84429-4C8B-4D28-B92A-683A872D3EF0}"/>
               </a:ext>
             </a:extLst>
           </p:cNvPr>
@@ -28773,7 +28880,7 @@
           <p:cNvPr id="23" name="Straight Arrow Connector 22">
             <a:extLst>
               <a:ext uri="{FF2B5EF4-FFF2-40B4-BE49-F238E27FC236}">
-                <a16:creationId xmlns:a16="http://schemas.microsoft.com/office/drawing/2014/main" id="{CF5BE959-978C-48AF-8508-DE76B7326356}"/>
+                <a16:creationId xmlns:a16="http://schemas.microsoft.com/office/drawing/2014/main" xmlns="" id="{CF5BE959-978C-48AF-8508-DE76B7326356}"/>
               </a:ext>
             </a:extLst>
           </p:cNvPr>
@@ -28820,7 +28927,7 @@
           <p:cNvPr id="24" name="Straight Arrow Connector 23">
             <a:extLst>
               <a:ext uri="{FF2B5EF4-FFF2-40B4-BE49-F238E27FC236}">
-                <a16:creationId xmlns:a16="http://schemas.microsoft.com/office/drawing/2014/main" id="{EA94AA31-2348-488D-AF95-C5BD4CD8C3FC}"/>
+                <a16:creationId xmlns:a16="http://schemas.microsoft.com/office/drawing/2014/main" xmlns="" id="{EA94AA31-2348-488D-AF95-C5BD4CD8C3FC}"/>
               </a:ext>
             </a:extLst>
           </p:cNvPr>
@@ -28864,7 +28971,7 @@
           <p:cNvPr id="28" name="Rectangle 27">
             <a:extLst>
               <a:ext uri="{FF2B5EF4-FFF2-40B4-BE49-F238E27FC236}">
-                <a16:creationId xmlns:a16="http://schemas.microsoft.com/office/drawing/2014/main" id="{FF0E0202-04C0-41BA-AD7D-C64268A08F36}"/>
+                <a16:creationId xmlns:a16="http://schemas.microsoft.com/office/drawing/2014/main" xmlns="" id="{FF0E0202-04C0-41BA-AD7D-C64268A08F36}"/>
               </a:ext>
             </a:extLst>
           </p:cNvPr>
@@ -28902,7 +29009,7 @@
           <p:cNvPr id="29" name="Straight Arrow Connector 28">
             <a:extLst>
               <a:ext uri="{FF2B5EF4-FFF2-40B4-BE49-F238E27FC236}">
-                <a16:creationId xmlns:a16="http://schemas.microsoft.com/office/drawing/2014/main" id="{AE1D563C-18F7-40C4-8C12-89E6F334705F}"/>
+                <a16:creationId xmlns:a16="http://schemas.microsoft.com/office/drawing/2014/main" xmlns="" id="{AE1D563C-18F7-40C4-8C12-89E6F334705F}"/>
               </a:ext>
             </a:extLst>
           </p:cNvPr>
@@ -28947,7 +29054,7 @@
           <p:cNvPr id="30" name="Rectangle 29">
             <a:extLst>
               <a:ext uri="{FF2B5EF4-FFF2-40B4-BE49-F238E27FC236}">
-                <a16:creationId xmlns:a16="http://schemas.microsoft.com/office/drawing/2014/main" id="{2AB490D3-2200-47DD-88EE-2B6DB3DFE0E5}"/>
+                <a16:creationId xmlns:a16="http://schemas.microsoft.com/office/drawing/2014/main" xmlns="" id="{2AB490D3-2200-47DD-88EE-2B6DB3DFE0E5}"/>
               </a:ext>
             </a:extLst>
           </p:cNvPr>
@@ -28999,7 +29106,7 @@
           <p:cNvPr id="31" name="Rectangle 30">
             <a:extLst>
               <a:ext uri="{FF2B5EF4-FFF2-40B4-BE49-F238E27FC236}">
-                <a16:creationId xmlns:a16="http://schemas.microsoft.com/office/drawing/2014/main" id="{A5AC5AEE-9CA9-4FBA-ABF1-040C70742F85}"/>
+                <a16:creationId xmlns:a16="http://schemas.microsoft.com/office/drawing/2014/main" xmlns="" id="{A5AC5AEE-9CA9-4FBA-ABF1-040C70742F85}"/>
               </a:ext>
             </a:extLst>
           </p:cNvPr>
@@ -29051,7 +29158,7 @@
           <p:cNvPr id="32" name="Oval 31">
             <a:extLst>
               <a:ext uri="{FF2B5EF4-FFF2-40B4-BE49-F238E27FC236}">
-                <a16:creationId xmlns:a16="http://schemas.microsoft.com/office/drawing/2014/main" id="{E3D788FF-545E-49BE-812A-B835E474F58E}"/>
+                <a16:creationId xmlns:a16="http://schemas.microsoft.com/office/drawing/2014/main" xmlns="" id="{E3D788FF-545E-49BE-812A-B835E474F58E}"/>
               </a:ext>
             </a:extLst>
           </p:cNvPr>
@@ -29103,7 +29210,7 @@
           <p:cNvPr id="33" name="Isosceles Triangle 32">
             <a:extLst>
               <a:ext uri="{FF2B5EF4-FFF2-40B4-BE49-F238E27FC236}">
-                <a16:creationId xmlns:a16="http://schemas.microsoft.com/office/drawing/2014/main" id="{3293596F-27FE-47F0-B885-CC2AE68D7DCA}"/>
+                <a16:creationId xmlns:a16="http://schemas.microsoft.com/office/drawing/2014/main" xmlns="" id="{3293596F-27FE-47F0-B885-CC2AE68D7DCA}"/>
               </a:ext>
             </a:extLst>
           </p:cNvPr>
@@ -29155,7 +29262,7 @@
           <p:cNvPr id="56" name="Group 55">
             <a:extLst>
               <a:ext uri="{FF2B5EF4-FFF2-40B4-BE49-F238E27FC236}">
-                <a16:creationId xmlns:a16="http://schemas.microsoft.com/office/drawing/2014/main" id="{375610F4-3FA6-4104-882D-717313BF7701}"/>
+                <a16:creationId xmlns:a16="http://schemas.microsoft.com/office/drawing/2014/main" xmlns="" id="{375610F4-3FA6-4104-882D-717313BF7701}"/>
               </a:ext>
             </a:extLst>
           </p:cNvPr>
@@ -29175,7 +29282,7 @@
             <p:cNvPr id="35" name="Rectangle 34">
               <a:extLst>
                 <a:ext uri="{FF2B5EF4-FFF2-40B4-BE49-F238E27FC236}">
-                  <a16:creationId xmlns:a16="http://schemas.microsoft.com/office/drawing/2014/main" id="{879F8447-5CD1-4C24-A2B0-C99C2D7F227E}"/>
+                  <a16:creationId xmlns:a16="http://schemas.microsoft.com/office/drawing/2014/main" xmlns="" id="{879F8447-5CD1-4C24-A2B0-C99C2D7F227E}"/>
                 </a:ext>
               </a:extLst>
             </p:cNvPr>
@@ -29229,7 +29336,7 @@
             <p:cNvPr id="36" name="Rectangle 35">
               <a:extLst>
                 <a:ext uri="{FF2B5EF4-FFF2-40B4-BE49-F238E27FC236}">
-                  <a16:creationId xmlns:a16="http://schemas.microsoft.com/office/drawing/2014/main" id="{5F4A4132-62A0-4359-A556-90169DF61140}"/>
+                  <a16:creationId xmlns:a16="http://schemas.microsoft.com/office/drawing/2014/main" xmlns="" id="{5F4A4132-62A0-4359-A556-90169DF61140}"/>
                 </a:ext>
               </a:extLst>
             </p:cNvPr>
@@ -29281,7 +29388,7 @@
             <p:cNvPr id="37" name="Rectangle 36">
               <a:extLst>
                 <a:ext uri="{FF2B5EF4-FFF2-40B4-BE49-F238E27FC236}">
-                  <a16:creationId xmlns:a16="http://schemas.microsoft.com/office/drawing/2014/main" id="{4B101870-D617-4B38-8C70-2394252B3323}"/>
+                  <a16:creationId xmlns:a16="http://schemas.microsoft.com/office/drawing/2014/main" xmlns="" id="{4B101870-D617-4B38-8C70-2394252B3323}"/>
                 </a:ext>
               </a:extLst>
             </p:cNvPr>
@@ -29337,7 +29444,7 @@
             <p:cNvPr id="38" name="Rectangle 37">
               <a:extLst>
                 <a:ext uri="{FF2B5EF4-FFF2-40B4-BE49-F238E27FC236}">
-                  <a16:creationId xmlns:a16="http://schemas.microsoft.com/office/drawing/2014/main" id="{C917C82C-58B7-4AA7-A94D-98D12F824498}"/>
+                  <a16:creationId xmlns:a16="http://schemas.microsoft.com/office/drawing/2014/main" xmlns="" id="{C917C82C-58B7-4AA7-A94D-98D12F824498}"/>
                 </a:ext>
               </a:extLst>
             </p:cNvPr>
@@ -29375,7 +29482,7 @@
             <p:cNvPr id="41" name="Rectangle 40">
               <a:extLst>
                 <a:ext uri="{FF2B5EF4-FFF2-40B4-BE49-F238E27FC236}">
-                  <a16:creationId xmlns:a16="http://schemas.microsoft.com/office/drawing/2014/main" id="{C96D5A3A-401E-4360-A926-9ADE459BBEF2}"/>
+                  <a16:creationId xmlns:a16="http://schemas.microsoft.com/office/drawing/2014/main" xmlns="" id="{C96D5A3A-401E-4360-A926-9ADE459BBEF2}"/>
                 </a:ext>
               </a:extLst>
             </p:cNvPr>
@@ -29424,7 +29531,7 @@
             <p:cNvPr id="42" name="Rectangle 41">
               <a:extLst>
                 <a:ext uri="{FF2B5EF4-FFF2-40B4-BE49-F238E27FC236}">
-                  <a16:creationId xmlns:a16="http://schemas.microsoft.com/office/drawing/2014/main" id="{2190B5B3-6D2B-4506-B8FE-FD7E6CB3E43D}"/>
+                  <a16:creationId xmlns:a16="http://schemas.microsoft.com/office/drawing/2014/main" xmlns="" id="{2190B5B3-6D2B-4506-B8FE-FD7E6CB3E43D}"/>
                 </a:ext>
               </a:extLst>
             </p:cNvPr>
@@ -29462,7 +29569,7 @@
             <p:cNvPr id="43" name="Oval 42">
               <a:extLst>
                 <a:ext uri="{FF2B5EF4-FFF2-40B4-BE49-F238E27FC236}">
-                  <a16:creationId xmlns:a16="http://schemas.microsoft.com/office/drawing/2014/main" id="{4D266B7E-018C-46ED-8D35-52F9E5B7E141}"/>
+                  <a16:creationId xmlns:a16="http://schemas.microsoft.com/office/drawing/2014/main" xmlns="" id="{4D266B7E-018C-46ED-8D35-52F9E5B7E141}"/>
                 </a:ext>
               </a:extLst>
             </p:cNvPr>
@@ -29514,7 +29621,7 @@
             <p:cNvPr id="44" name="Rectangle 43">
               <a:extLst>
                 <a:ext uri="{FF2B5EF4-FFF2-40B4-BE49-F238E27FC236}">
-                  <a16:creationId xmlns:a16="http://schemas.microsoft.com/office/drawing/2014/main" id="{7EE4F98B-E7AC-475C-9644-7DFFA759FB0B}"/>
+                  <a16:creationId xmlns:a16="http://schemas.microsoft.com/office/drawing/2014/main" xmlns="" id="{7EE4F98B-E7AC-475C-9644-7DFFA759FB0B}"/>
                 </a:ext>
               </a:extLst>
             </p:cNvPr>
@@ -29563,7 +29670,7 @@
             <p:cNvPr id="45" name="Rectangle 44">
               <a:extLst>
                 <a:ext uri="{FF2B5EF4-FFF2-40B4-BE49-F238E27FC236}">
-                  <a16:creationId xmlns:a16="http://schemas.microsoft.com/office/drawing/2014/main" id="{3317DF71-E5C0-4D1B-9FF7-14D271D9E7DA}"/>
+                  <a16:creationId xmlns:a16="http://schemas.microsoft.com/office/drawing/2014/main" xmlns="" id="{3317DF71-E5C0-4D1B-9FF7-14D271D9E7DA}"/>
                 </a:ext>
               </a:extLst>
             </p:cNvPr>
@@ -29601,7 +29708,7 @@
             <p:cNvPr id="47" name="Isosceles Triangle 46">
               <a:extLst>
                 <a:ext uri="{FF2B5EF4-FFF2-40B4-BE49-F238E27FC236}">
-                  <a16:creationId xmlns:a16="http://schemas.microsoft.com/office/drawing/2014/main" id="{365D57FF-0831-4183-8DC8-946B7A8F2BC8}"/>
+                  <a16:creationId xmlns:a16="http://schemas.microsoft.com/office/drawing/2014/main" xmlns="" id="{365D57FF-0831-4183-8DC8-946B7A8F2BC8}"/>
                 </a:ext>
               </a:extLst>
             </p:cNvPr>
@@ -29654,7 +29761,7 @@
           <p:cNvPr id="48" name="Rectangle 47">
             <a:extLst>
               <a:ext uri="{FF2B5EF4-FFF2-40B4-BE49-F238E27FC236}">
-                <a16:creationId xmlns:a16="http://schemas.microsoft.com/office/drawing/2014/main" id="{F5359955-D619-4358-950D-11FFC7F3CF9F}"/>
+                <a16:creationId xmlns:a16="http://schemas.microsoft.com/office/drawing/2014/main" xmlns="" id="{F5359955-D619-4358-950D-11FFC7F3CF9F}"/>
               </a:ext>
             </a:extLst>
           </p:cNvPr>
@@ -29706,7 +29813,7 @@
           <p:cNvPr id="49" name="Oval 48">
             <a:extLst>
               <a:ext uri="{FF2B5EF4-FFF2-40B4-BE49-F238E27FC236}">
-                <a16:creationId xmlns:a16="http://schemas.microsoft.com/office/drawing/2014/main" id="{C897382F-DB40-4D09-A46F-D78D8100EC22}"/>
+                <a16:creationId xmlns:a16="http://schemas.microsoft.com/office/drawing/2014/main" xmlns="" id="{C897382F-DB40-4D09-A46F-D78D8100EC22}"/>
               </a:ext>
             </a:extLst>
           </p:cNvPr>
@@ -29758,7 +29865,7 @@
           <p:cNvPr id="50" name="Isosceles Triangle 49">
             <a:extLst>
               <a:ext uri="{FF2B5EF4-FFF2-40B4-BE49-F238E27FC236}">
-                <a16:creationId xmlns:a16="http://schemas.microsoft.com/office/drawing/2014/main" id="{A701C5C9-AEA9-4193-9E85-0AB493C0BE10}"/>
+                <a16:creationId xmlns:a16="http://schemas.microsoft.com/office/drawing/2014/main" xmlns="" id="{A701C5C9-AEA9-4193-9E85-0AB493C0BE10}"/>
               </a:ext>
             </a:extLst>
           </p:cNvPr>
@@ -29810,7 +29917,7 @@
           <p:cNvPr id="51" name="Rectangle 50">
             <a:extLst>
               <a:ext uri="{FF2B5EF4-FFF2-40B4-BE49-F238E27FC236}">
-                <a16:creationId xmlns:a16="http://schemas.microsoft.com/office/drawing/2014/main" id="{0E76F026-2452-4896-A572-F7CE53C174A2}"/>
+                <a16:creationId xmlns:a16="http://schemas.microsoft.com/office/drawing/2014/main" xmlns="" id="{0E76F026-2452-4896-A572-F7CE53C174A2}"/>
               </a:ext>
             </a:extLst>
           </p:cNvPr>
@@ -29855,7 +29962,7 @@
           <p:cNvPr id="53" name="Rectangle 52">
             <a:extLst>
               <a:ext uri="{FF2B5EF4-FFF2-40B4-BE49-F238E27FC236}">
-                <a16:creationId xmlns:a16="http://schemas.microsoft.com/office/drawing/2014/main" id="{D5448F18-C362-4F8D-BDE9-67585A9F1232}"/>
+                <a16:creationId xmlns:a16="http://schemas.microsoft.com/office/drawing/2014/main" xmlns="" id="{D5448F18-C362-4F8D-BDE9-67585A9F1232}"/>
               </a:ext>
             </a:extLst>
           </p:cNvPr>
@@ -29893,7 +30000,7 @@
           <p:cNvPr id="54" name="Rectangle 53">
             <a:extLst>
               <a:ext uri="{FF2B5EF4-FFF2-40B4-BE49-F238E27FC236}">
-                <a16:creationId xmlns:a16="http://schemas.microsoft.com/office/drawing/2014/main" id="{CCB4F67D-B10C-40C9-BD04-30237B979029}"/>
+                <a16:creationId xmlns:a16="http://schemas.microsoft.com/office/drawing/2014/main" xmlns="" id="{CCB4F67D-B10C-40C9-BD04-30237B979029}"/>
               </a:ext>
             </a:extLst>
           </p:cNvPr>
@@ -29931,7 +30038,7 @@
           <p:cNvPr id="55" name="Rectangle 54">
             <a:extLst>
               <a:ext uri="{FF2B5EF4-FFF2-40B4-BE49-F238E27FC236}">
-                <a16:creationId xmlns:a16="http://schemas.microsoft.com/office/drawing/2014/main" id="{9BE72583-89CE-4A5E-BE1B-80DC1EEDC4BD}"/>
+                <a16:creationId xmlns:a16="http://schemas.microsoft.com/office/drawing/2014/main" xmlns="" id="{9BE72583-89CE-4A5E-BE1B-80DC1EEDC4BD}"/>
               </a:ext>
             </a:extLst>
           </p:cNvPr>
@@ -29983,7 +30090,7 @@
           <p:cNvPr id="58" name="Rectangle 57">
             <a:extLst>
               <a:ext uri="{FF2B5EF4-FFF2-40B4-BE49-F238E27FC236}">
-                <a16:creationId xmlns:a16="http://schemas.microsoft.com/office/drawing/2014/main" id="{008A882D-E05D-4360-9FE0-EAC6BFDC9DC1}"/>
+                <a16:creationId xmlns:a16="http://schemas.microsoft.com/office/drawing/2014/main" xmlns="" id="{008A882D-E05D-4360-9FE0-EAC6BFDC9DC1}"/>
               </a:ext>
             </a:extLst>
           </p:cNvPr>
@@ -30040,7 +30147,7 @@
           <p:cNvPr id="59" name="Rectangle 58">
             <a:extLst>
               <a:ext uri="{FF2B5EF4-FFF2-40B4-BE49-F238E27FC236}">
-                <a16:creationId xmlns:a16="http://schemas.microsoft.com/office/drawing/2014/main" id="{056EDE35-63CE-478C-8ED2-7E7F75128045}"/>
+                <a16:creationId xmlns:a16="http://schemas.microsoft.com/office/drawing/2014/main" xmlns="" id="{056EDE35-63CE-478C-8ED2-7E7F75128045}"/>
               </a:ext>
             </a:extLst>
           </p:cNvPr>
@@ -30120,7 +30227,7 @@
           <p:cNvPr id="61" name="Rectangle 60">
             <a:extLst>
               <a:ext uri="{FF2B5EF4-FFF2-40B4-BE49-F238E27FC236}">
-                <a16:creationId xmlns:a16="http://schemas.microsoft.com/office/drawing/2014/main" id="{2555CB7B-E89E-4FAA-90C1-77E7EDE66192}"/>
+                <a16:creationId xmlns:a16="http://schemas.microsoft.com/office/drawing/2014/main" xmlns="" id="{2555CB7B-E89E-4FAA-90C1-77E7EDE66192}"/>
               </a:ext>
             </a:extLst>
           </p:cNvPr>
@@ -30158,7 +30265,7 @@
           <p:cNvPr id="62" name="Straight Arrow Connector 61">
             <a:extLst>
               <a:ext uri="{FF2B5EF4-FFF2-40B4-BE49-F238E27FC236}">
-                <a16:creationId xmlns:a16="http://schemas.microsoft.com/office/drawing/2014/main" id="{CD0D2D9E-BF44-4F05-8A34-7D366C108330}"/>
+                <a16:creationId xmlns:a16="http://schemas.microsoft.com/office/drawing/2014/main" xmlns="" id="{CD0D2D9E-BF44-4F05-8A34-7D366C108330}"/>
               </a:ext>
             </a:extLst>
           </p:cNvPr>
@@ -30204,7 +30311,7 @@
           <p:cNvPr id="65" name="Straight Arrow Connector 64">
             <a:extLst>
               <a:ext uri="{FF2B5EF4-FFF2-40B4-BE49-F238E27FC236}">
-                <a16:creationId xmlns:a16="http://schemas.microsoft.com/office/drawing/2014/main" id="{246C7C9F-0B2A-4180-BBF3-91835824417D}"/>
+                <a16:creationId xmlns:a16="http://schemas.microsoft.com/office/drawing/2014/main" xmlns="" id="{246C7C9F-0B2A-4180-BBF3-91835824417D}"/>
               </a:ext>
             </a:extLst>
           </p:cNvPr>
@@ -30249,7 +30356,7 @@
           <p:cNvPr id="69" name="Rectangle 68">
             <a:extLst>
               <a:ext uri="{FF2B5EF4-FFF2-40B4-BE49-F238E27FC236}">
-                <a16:creationId xmlns:a16="http://schemas.microsoft.com/office/drawing/2014/main" id="{C83A164E-C563-4661-88E8-6ECF4A2EFD91}"/>
+                <a16:creationId xmlns:a16="http://schemas.microsoft.com/office/drawing/2014/main" xmlns="" id="{C83A164E-C563-4661-88E8-6ECF4A2EFD91}"/>
               </a:ext>
             </a:extLst>
           </p:cNvPr>
@@ -30301,7 +30408,7 @@
           <p:cNvPr id="70" name="Rectangle 69">
             <a:extLst>
               <a:ext uri="{FF2B5EF4-FFF2-40B4-BE49-F238E27FC236}">
-                <a16:creationId xmlns:a16="http://schemas.microsoft.com/office/drawing/2014/main" id="{63126789-69EB-4A05-B3F1-9FBBE1870485}"/>
+                <a16:creationId xmlns:a16="http://schemas.microsoft.com/office/drawing/2014/main" xmlns="" id="{63126789-69EB-4A05-B3F1-9FBBE1870485}"/>
               </a:ext>
             </a:extLst>
           </p:cNvPr>
@@ -30347,7 +30454,7 @@
           <p:cNvPr id="71" name="Rectangle 70">
             <a:extLst>
               <a:ext uri="{FF2B5EF4-FFF2-40B4-BE49-F238E27FC236}">
-                <a16:creationId xmlns:a16="http://schemas.microsoft.com/office/drawing/2014/main" id="{344B0749-0CB8-4421-876A-8DFE0A980333}"/>
+                <a16:creationId xmlns:a16="http://schemas.microsoft.com/office/drawing/2014/main" xmlns="" id="{344B0749-0CB8-4421-876A-8DFE0A980333}"/>
               </a:ext>
             </a:extLst>
           </p:cNvPr>
@@ -30386,7 +30493,7 @@
           <p:cNvPr id="72" name="Straight Arrow Connector 71">
             <a:extLst>
               <a:ext uri="{FF2B5EF4-FFF2-40B4-BE49-F238E27FC236}">
-                <a16:creationId xmlns:a16="http://schemas.microsoft.com/office/drawing/2014/main" id="{ED92BC3B-9A65-49BB-A725-60214763FBDC}"/>
+                <a16:creationId xmlns:a16="http://schemas.microsoft.com/office/drawing/2014/main" xmlns="" id="{ED92BC3B-9A65-49BB-A725-60214763FBDC}"/>
               </a:ext>
             </a:extLst>
           </p:cNvPr>
@@ -30430,7 +30537,7 @@
           <p:cNvPr id="75" name="Straight Arrow Connector 74">
             <a:extLst>
               <a:ext uri="{FF2B5EF4-FFF2-40B4-BE49-F238E27FC236}">
-                <a16:creationId xmlns:a16="http://schemas.microsoft.com/office/drawing/2014/main" id="{2077B21C-FF58-4DD2-A484-CB04AB2993AE}"/>
+                <a16:creationId xmlns:a16="http://schemas.microsoft.com/office/drawing/2014/main" xmlns="" id="{2077B21C-FF58-4DD2-A484-CB04AB2993AE}"/>
               </a:ext>
             </a:extLst>
           </p:cNvPr>
@@ -30474,7 +30581,7 @@
           <p:cNvPr id="77" name="Rectangle 76">
             <a:extLst>
               <a:ext uri="{FF2B5EF4-FFF2-40B4-BE49-F238E27FC236}">
-                <a16:creationId xmlns:a16="http://schemas.microsoft.com/office/drawing/2014/main" id="{B88EADB8-1203-446F-A495-2DCA82F847EF}"/>
+                <a16:creationId xmlns:a16="http://schemas.microsoft.com/office/drawing/2014/main" xmlns="" id="{B88EADB8-1203-446F-A495-2DCA82F847EF}"/>
               </a:ext>
             </a:extLst>
           </p:cNvPr>
@@ -30512,7 +30619,7 @@
           <p:cNvPr id="78" name="Straight Arrow Connector 77">
             <a:extLst>
               <a:ext uri="{FF2B5EF4-FFF2-40B4-BE49-F238E27FC236}">
-                <a16:creationId xmlns:a16="http://schemas.microsoft.com/office/drawing/2014/main" id="{396437B9-EEFB-4A03-B933-1CDFB1C8BC64}"/>
+                <a16:creationId xmlns:a16="http://schemas.microsoft.com/office/drawing/2014/main" xmlns="" id="{396437B9-EEFB-4A03-B933-1CDFB1C8BC64}"/>
               </a:ext>
             </a:extLst>
           </p:cNvPr>
@@ -30557,7 +30664,7 @@
           <p:cNvPr id="79" name="Rectangle 78">
             <a:extLst>
               <a:ext uri="{FF2B5EF4-FFF2-40B4-BE49-F238E27FC236}">
-                <a16:creationId xmlns:a16="http://schemas.microsoft.com/office/drawing/2014/main" id="{48CD2476-701A-4C45-9F84-14B0B78541D7}"/>
+                <a16:creationId xmlns:a16="http://schemas.microsoft.com/office/drawing/2014/main" xmlns="" id="{48CD2476-701A-4C45-9F84-14B0B78541D7}"/>
               </a:ext>
             </a:extLst>
           </p:cNvPr>
@@ -30632,7 +30739,7 @@
           <p:cNvPr id="175" name="Folded Corner 14">
             <a:extLst>
               <a:ext uri="{FF2B5EF4-FFF2-40B4-BE49-F238E27FC236}">
-                <a16:creationId xmlns:a16="http://schemas.microsoft.com/office/drawing/2014/main" id="{D7925C44-E3E5-47AF-9CC8-BF6471802A70}"/>
+                <a16:creationId xmlns:a16="http://schemas.microsoft.com/office/drawing/2014/main" xmlns="" id="{D7925C44-E3E5-47AF-9CC8-BF6471802A70}"/>
               </a:ext>
             </a:extLst>
           </p:cNvPr>
@@ -30681,7 +30788,7 @@
           <p:cNvPr id="2" name="Diagram 1">
             <a:extLst>
               <a:ext uri="{FF2B5EF4-FFF2-40B4-BE49-F238E27FC236}">
-                <a16:creationId xmlns:a16="http://schemas.microsoft.com/office/drawing/2014/main" id="{214EDC3A-CB98-4BD4-86CB-C3DE5CC0A317}"/>
+                <a16:creationId xmlns:a16="http://schemas.microsoft.com/office/drawing/2014/main" xmlns="" id="{214EDC3A-CB98-4BD4-86CB-C3DE5CC0A317}"/>
               </a:ext>
             </a:extLst>
           </p:cNvPr>
@@ -30703,7 +30810,7 @@
           <p:cNvPr id="3" name="Rectangle 2">
             <a:extLst>
               <a:ext uri="{FF2B5EF4-FFF2-40B4-BE49-F238E27FC236}">
-                <a16:creationId xmlns:a16="http://schemas.microsoft.com/office/drawing/2014/main" id="{8D715EE1-32F0-4BAE-86BD-83B54B3137EB}"/>
+                <a16:creationId xmlns:a16="http://schemas.microsoft.com/office/drawing/2014/main" xmlns="" id="{8D715EE1-32F0-4BAE-86BD-83B54B3137EB}"/>
               </a:ext>
             </a:extLst>
           </p:cNvPr>
@@ -30802,7 +30909,7 @@
           <p:cNvPr id="4" name="Rectangle 3">
             <a:extLst>
               <a:ext uri="{FF2B5EF4-FFF2-40B4-BE49-F238E27FC236}">
-                <a16:creationId xmlns:a16="http://schemas.microsoft.com/office/drawing/2014/main" id="{2CBF344E-950A-4767-97FA-13FFE695BBC3}"/>
+                <a16:creationId xmlns:a16="http://schemas.microsoft.com/office/drawing/2014/main" xmlns="" id="{2CBF344E-950A-4767-97FA-13FFE695BBC3}"/>
               </a:ext>
             </a:extLst>
           </p:cNvPr>
@@ -30843,7 +30950,7 @@
           <p:cNvPr id="126" name="Rectangle 125">
             <a:extLst>
               <a:ext uri="{FF2B5EF4-FFF2-40B4-BE49-F238E27FC236}">
-                <a16:creationId xmlns:a16="http://schemas.microsoft.com/office/drawing/2014/main" id="{AFE62E66-21DE-45BB-AB76-2BCE8E9BEC95}"/>
+                <a16:creationId xmlns:a16="http://schemas.microsoft.com/office/drawing/2014/main" xmlns="" id="{AFE62E66-21DE-45BB-AB76-2BCE8E9BEC95}"/>
               </a:ext>
             </a:extLst>
           </p:cNvPr>
@@ -30969,7 +31076,7 @@
           <p:cNvPr id="128" name="Rectangle 127">
             <a:extLst>
               <a:ext uri="{FF2B5EF4-FFF2-40B4-BE49-F238E27FC236}">
-                <a16:creationId xmlns:a16="http://schemas.microsoft.com/office/drawing/2014/main" id="{57B25911-E59E-4329-B921-A0EBAE8F9C7E}"/>
+                <a16:creationId xmlns:a16="http://schemas.microsoft.com/office/drawing/2014/main" xmlns="" id="{57B25911-E59E-4329-B921-A0EBAE8F9C7E}"/>
               </a:ext>
             </a:extLst>
           </p:cNvPr>
@@ -31123,7 +31230,7 @@
           <p:cNvPr id="5" name="Rectangle 4">
             <a:extLst>
               <a:ext uri="{FF2B5EF4-FFF2-40B4-BE49-F238E27FC236}">
-                <a16:creationId xmlns:a16="http://schemas.microsoft.com/office/drawing/2014/main" id="{798B0573-B3AD-48CB-9F8F-13EC6567D0D3}"/>
+                <a16:creationId xmlns:a16="http://schemas.microsoft.com/office/drawing/2014/main" xmlns="" id="{798B0573-B3AD-48CB-9F8F-13EC6567D0D3}"/>
               </a:ext>
             </a:extLst>
           </p:cNvPr>
@@ -31218,7 +31325,7 @@
           <p:cNvPr id="6" name="Rectangle 5">
             <a:extLst>
               <a:ext uri="{FF2B5EF4-FFF2-40B4-BE49-F238E27FC236}">
-                <a16:creationId xmlns:a16="http://schemas.microsoft.com/office/drawing/2014/main" id="{2B5D63EA-C9C9-4E25-A071-89FBDD4231BE}"/>
+                <a16:creationId xmlns:a16="http://schemas.microsoft.com/office/drawing/2014/main" xmlns="" id="{2B5D63EA-C9C9-4E25-A071-89FBDD4231BE}"/>
               </a:ext>
             </a:extLst>
           </p:cNvPr>
@@ -31256,7 +31363,7 @@
           <p:cNvPr id="8" name="Rectangle 7">
             <a:extLst>
               <a:ext uri="{FF2B5EF4-FFF2-40B4-BE49-F238E27FC236}">
-                <a16:creationId xmlns:a16="http://schemas.microsoft.com/office/drawing/2014/main" id="{BE0255C1-0F86-4BC8-84D8-4B76F00785A9}"/>
+                <a16:creationId xmlns:a16="http://schemas.microsoft.com/office/drawing/2014/main" xmlns="" id="{BE0255C1-0F86-4BC8-84D8-4B76F00785A9}"/>
               </a:ext>
             </a:extLst>
           </p:cNvPr>
@@ -31297,7 +31404,7 @@
           <p:cNvPr id="9" name="Rectangle 8">
             <a:extLst>
               <a:ext uri="{FF2B5EF4-FFF2-40B4-BE49-F238E27FC236}">
-                <a16:creationId xmlns:a16="http://schemas.microsoft.com/office/drawing/2014/main" id="{CFD7F599-A36B-4AA7-86FA-23355394169C}"/>
+                <a16:creationId xmlns:a16="http://schemas.microsoft.com/office/drawing/2014/main" xmlns="" id="{CFD7F599-A36B-4AA7-86FA-23355394169C}"/>
               </a:ext>
             </a:extLst>
           </p:cNvPr>
@@ -31338,7 +31445,7 @@
           <p:cNvPr id="130" name="Rectangle 129">
             <a:extLst>
               <a:ext uri="{FF2B5EF4-FFF2-40B4-BE49-F238E27FC236}">
-                <a16:creationId xmlns:a16="http://schemas.microsoft.com/office/drawing/2014/main" id="{F21A4D44-CAD2-400B-8E2D-F8B1FEA0E5B6}"/>
+                <a16:creationId xmlns:a16="http://schemas.microsoft.com/office/drawing/2014/main" xmlns="" id="{F21A4D44-CAD2-400B-8E2D-F8B1FEA0E5B6}"/>
               </a:ext>
             </a:extLst>
           </p:cNvPr>
@@ -31379,7 +31486,7 @@
           <p:cNvPr id="131" name="Rectangle 130">
             <a:extLst>
               <a:ext uri="{FF2B5EF4-FFF2-40B4-BE49-F238E27FC236}">
-                <a16:creationId xmlns:a16="http://schemas.microsoft.com/office/drawing/2014/main" id="{7ECE62BA-C5A0-4279-B504-BAC3C2C73E71}"/>
+                <a16:creationId xmlns:a16="http://schemas.microsoft.com/office/drawing/2014/main" xmlns="" id="{7ECE62BA-C5A0-4279-B504-BAC3C2C73E71}"/>
               </a:ext>
             </a:extLst>
           </p:cNvPr>
@@ -31431,7 +31538,7 @@
           <p:cNvPr id="10" name="Cube 9">
             <a:extLst>
               <a:ext uri="{FF2B5EF4-FFF2-40B4-BE49-F238E27FC236}">
-                <a16:creationId xmlns:a16="http://schemas.microsoft.com/office/drawing/2014/main" id="{F871D032-A4AE-406F-A80A-38A8B0BED40E}"/>
+                <a16:creationId xmlns:a16="http://schemas.microsoft.com/office/drawing/2014/main" xmlns="" id="{F871D032-A4AE-406F-A80A-38A8B0BED40E}"/>
               </a:ext>
             </a:extLst>
           </p:cNvPr>
@@ -31491,7 +31598,7 @@
           <p:cNvPr id="133" name="Folded Corner 14">
             <a:extLst>
               <a:ext uri="{FF2B5EF4-FFF2-40B4-BE49-F238E27FC236}">
-                <a16:creationId xmlns:a16="http://schemas.microsoft.com/office/drawing/2014/main" id="{DDDEB2FA-CB2B-41A1-82A4-458F3DD3A4D7}"/>
+                <a16:creationId xmlns:a16="http://schemas.microsoft.com/office/drawing/2014/main" xmlns="" id="{DDDEB2FA-CB2B-41A1-82A4-458F3DD3A4D7}"/>
               </a:ext>
             </a:extLst>
           </p:cNvPr>
@@ -31540,7 +31647,7 @@
           <p:cNvPr id="11" name="Rectangle 10">
             <a:extLst>
               <a:ext uri="{FF2B5EF4-FFF2-40B4-BE49-F238E27FC236}">
-                <a16:creationId xmlns:a16="http://schemas.microsoft.com/office/drawing/2014/main" id="{F638F98D-376A-4707-AFEB-3116E75204BA}"/>
+                <a16:creationId xmlns:a16="http://schemas.microsoft.com/office/drawing/2014/main" xmlns="" id="{F638F98D-376A-4707-AFEB-3116E75204BA}"/>
               </a:ext>
             </a:extLst>
           </p:cNvPr>
@@ -31595,7 +31702,7 @@
           <p:cNvPr id="18" name="Picture 17" descr="A close up of an animal&#10;&#10;Description generated with high confidence">
             <a:extLst>
               <a:ext uri="{FF2B5EF4-FFF2-40B4-BE49-F238E27FC236}">
-                <a16:creationId xmlns:a16="http://schemas.microsoft.com/office/drawing/2014/main" id="{4132CF14-571D-4435-9A41-BF9FAEA4439C}"/>
+                <a16:creationId xmlns:a16="http://schemas.microsoft.com/office/drawing/2014/main" xmlns="" id="{4132CF14-571D-4435-9A41-BF9FAEA4439C}"/>
               </a:ext>
             </a:extLst>
           </p:cNvPr>
@@ -31631,7 +31738,7 @@
           <p:cNvPr id="19" name="Rectangle 18">
             <a:extLst>
               <a:ext uri="{FF2B5EF4-FFF2-40B4-BE49-F238E27FC236}">
-                <a16:creationId xmlns:a16="http://schemas.microsoft.com/office/drawing/2014/main" id="{1047E73B-15B2-47B6-9C78-BCDB588C3019}"/>
+                <a16:creationId xmlns:a16="http://schemas.microsoft.com/office/drawing/2014/main" xmlns="" id="{1047E73B-15B2-47B6-9C78-BCDB588C3019}"/>
               </a:ext>
             </a:extLst>
           </p:cNvPr>
@@ -31673,7 +31780,7 @@
           <p:cNvPr id="31" name="Straight Arrow Connector 30">
             <a:extLst>
               <a:ext uri="{FF2B5EF4-FFF2-40B4-BE49-F238E27FC236}">
-                <a16:creationId xmlns:a16="http://schemas.microsoft.com/office/drawing/2014/main" id="{E3ACBD9C-E946-4C83-82A0-7C79817A1EB9}"/>
+                <a16:creationId xmlns:a16="http://schemas.microsoft.com/office/drawing/2014/main" xmlns="" id="{E3ACBD9C-E946-4C83-82A0-7C79817A1EB9}"/>
               </a:ext>
             </a:extLst>
           </p:cNvPr>
@@ -31716,7 +31823,7 @@
           <p:cNvPr id="32" name="Rectangle 31">
             <a:extLst>
               <a:ext uri="{FF2B5EF4-FFF2-40B4-BE49-F238E27FC236}">
-                <a16:creationId xmlns:a16="http://schemas.microsoft.com/office/drawing/2014/main" id="{DAD5A302-C880-4E8C-9E1D-640CD5CF0CBE}"/>
+                <a16:creationId xmlns:a16="http://schemas.microsoft.com/office/drawing/2014/main" xmlns="" id="{DAD5A302-C880-4E8C-9E1D-640CD5CF0CBE}"/>
               </a:ext>
             </a:extLst>
           </p:cNvPr>
@@ -31754,7 +31861,7 @@
           <p:cNvPr id="135" name="Rectangle 134">
             <a:extLst>
               <a:ext uri="{FF2B5EF4-FFF2-40B4-BE49-F238E27FC236}">
-                <a16:creationId xmlns:a16="http://schemas.microsoft.com/office/drawing/2014/main" id="{9D239E65-7C2B-4AD5-A1F4-F716E33EF928}"/>
+                <a16:creationId xmlns:a16="http://schemas.microsoft.com/office/drawing/2014/main" xmlns="" id="{9D239E65-7C2B-4AD5-A1F4-F716E33EF928}"/>
               </a:ext>
             </a:extLst>
           </p:cNvPr>
@@ -31792,7 +31899,7 @@
           <p:cNvPr id="146" name="Rectangle 145">
             <a:extLst>
               <a:ext uri="{FF2B5EF4-FFF2-40B4-BE49-F238E27FC236}">
-                <a16:creationId xmlns:a16="http://schemas.microsoft.com/office/drawing/2014/main" id="{02CB9ACB-9175-4592-A0A2-5F6EBA3916AA}"/>
+                <a16:creationId xmlns:a16="http://schemas.microsoft.com/office/drawing/2014/main" xmlns="" id="{02CB9ACB-9175-4592-A0A2-5F6EBA3916AA}"/>
               </a:ext>
             </a:extLst>
           </p:cNvPr>
@@ -31830,7 +31937,7 @@
           <p:cNvPr id="33" name="Rectangle 32">
             <a:extLst>
               <a:ext uri="{FF2B5EF4-FFF2-40B4-BE49-F238E27FC236}">
-                <a16:creationId xmlns:a16="http://schemas.microsoft.com/office/drawing/2014/main" id="{A5445AD6-3298-4B4A-BFAA-36E271EE36D3}"/>
+                <a16:creationId xmlns:a16="http://schemas.microsoft.com/office/drawing/2014/main" xmlns="" id="{A5445AD6-3298-4B4A-BFAA-36E271EE36D3}"/>
               </a:ext>
             </a:extLst>
           </p:cNvPr>
@@ -31871,7 +31978,7 @@
           <p:cNvPr id="148" name="Cube 147">
             <a:extLst>
               <a:ext uri="{FF2B5EF4-FFF2-40B4-BE49-F238E27FC236}">
-                <a16:creationId xmlns:a16="http://schemas.microsoft.com/office/drawing/2014/main" id="{3C1DB64A-F95E-4BBA-AAB7-E382DEE6D3AD}"/>
+                <a16:creationId xmlns:a16="http://schemas.microsoft.com/office/drawing/2014/main" xmlns="" id="{3C1DB64A-F95E-4BBA-AAB7-E382DEE6D3AD}"/>
               </a:ext>
             </a:extLst>
           </p:cNvPr>
@@ -31931,7 +32038,7 @@
           <p:cNvPr id="149" name="Rectangle 148">
             <a:extLst>
               <a:ext uri="{FF2B5EF4-FFF2-40B4-BE49-F238E27FC236}">
-                <a16:creationId xmlns:a16="http://schemas.microsoft.com/office/drawing/2014/main" id="{8ADE2C1F-3705-4E1D-9D1A-CEFA5BBDC4AE}"/>
+                <a16:creationId xmlns:a16="http://schemas.microsoft.com/office/drawing/2014/main" xmlns="" id="{8ADE2C1F-3705-4E1D-9D1A-CEFA5BBDC4AE}"/>
               </a:ext>
             </a:extLst>
           </p:cNvPr>
@@ -31972,7 +32079,7 @@
           <p:cNvPr id="152" name="Folded Corner 14">
             <a:extLst>
               <a:ext uri="{FF2B5EF4-FFF2-40B4-BE49-F238E27FC236}">
-                <a16:creationId xmlns:a16="http://schemas.microsoft.com/office/drawing/2014/main" id="{E9E59862-8121-45E9-B034-254AA5F85A9E}"/>
+                <a16:creationId xmlns:a16="http://schemas.microsoft.com/office/drawing/2014/main" xmlns="" id="{E9E59862-8121-45E9-B034-254AA5F85A9E}"/>
               </a:ext>
             </a:extLst>
           </p:cNvPr>
@@ -32021,7 +32128,7 @@
           <p:cNvPr id="159" name="Rectangle 158">
             <a:extLst>
               <a:ext uri="{FF2B5EF4-FFF2-40B4-BE49-F238E27FC236}">
-                <a16:creationId xmlns:a16="http://schemas.microsoft.com/office/drawing/2014/main" id="{9189909A-C973-403D-AC10-F162C1C50251}"/>
+                <a16:creationId xmlns:a16="http://schemas.microsoft.com/office/drawing/2014/main" xmlns="" id="{9189909A-C973-403D-AC10-F162C1C50251}"/>
               </a:ext>
             </a:extLst>
           </p:cNvPr>
@@ -32076,7 +32183,7 @@
           <p:cNvPr id="160" name="Straight Arrow Connector 159">
             <a:extLst>
               <a:ext uri="{FF2B5EF4-FFF2-40B4-BE49-F238E27FC236}">
-                <a16:creationId xmlns:a16="http://schemas.microsoft.com/office/drawing/2014/main" id="{4104DBBE-32EA-425C-8DB2-CA3E800CA64E}"/>
+                <a16:creationId xmlns:a16="http://schemas.microsoft.com/office/drawing/2014/main" xmlns="" id="{4104DBBE-32EA-425C-8DB2-CA3E800CA64E}"/>
               </a:ext>
             </a:extLst>
           </p:cNvPr>
@@ -32121,7 +32228,7 @@
           <p:cNvPr id="163" name="Cube 162">
             <a:extLst>
               <a:ext uri="{FF2B5EF4-FFF2-40B4-BE49-F238E27FC236}">
-                <a16:creationId xmlns:a16="http://schemas.microsoft.com/office/drawing/2014/main" id="{DCC62459-FE7B-48A9-A2FB-D56CDC251746}"/>
+                <a16:creationId xmlns:a16="http://schemas.microsoft.com/office/drawing/2014/main" xmlns="" id="{DCC62459-FE7B-48A9-A2FB-D56CDC251746}"/>
               </a:ext>
             </a:extLst>
           </p:cNvPr>
@@ -32181,7 +32288,7 @@
           <p:cNvPr id="164" name="Rectangle 163">
             <a:extLst>
               <a:ext uri="{FF2B5EF4-FFF2-40B4-BE49-F238E27FC236}">
-                <a16:creationId xmlns:a16="http://schemas.microsoft.com/office/drawing/2014/main" id="{A17E061D-69B0-4C5E-9A8B-BA722BA64CA4}"/>
+                <a16:creationId xmlns:a16="http://schemas.microsoft.com/office/drawing/2014/main" xmlns="" id="{A17E061D-69B0-4C5E-9A8B-BA722BA64CA4}"/>
               </a:ext>
             </a:extLst>
           </p:cNvPr>
@@ -32222,7 +32329,7 @@
           <p:cNvPr id="165" name="Folded Corner 14">
             <a:extLst>
               <a:ext uri="{FF2B5EF4-FFF2-40B4-BE49-F238E27FC236}">
-                <a16:creationId xmlns:a16="http://schemas.microsoft.com/office/drawing/2014/main" id="{E1EF52F6-55FE-4BD8-A276-7961F4C14406}"/>
+                <a16:creationId xmlns:a16="http://schemas.microsoft.com/office/drawing/2014/main" xmlns="" id="{E1EF52F6-55FE-4BD8-A276-7961F4C14406}"/>
               </a:ext>
             </a:extLst>
           </p:cNvPr>
@@ -32271,7 +32378,7 @@
           <p:cNvPr id="170" name="Rectangle 169">
             <a:extLst>
               <a:ext uri="{FF2B5EF4-FFF2-40B4-BE49-F238E27FC236}">
-                <a16:creationId xmlns:a16="http://schemas.microsoft.com/office/drawing/2014/main" id="{CD422137-5DD0-430D-A335-3434D32EC278}"/>
+                <a16:creationId xmlns:a16="http://schemas.microsoft.com/office/drawing/2014/main" xmlns="" id="{CD422137-5DD0-430D-A335-3434D32EC278}"/>
               </a:ext>
             </a:extLst>
           </p:cNvPr>
@@ -32323,7 +32430,7 @@
           <p:cNvPr id="171" name="Straight Arrow Connector 170">
             <a:extLst>
               <a:ext uri="{FF2B5EF4-FFF2-40B4-BE49-F238E27FC236}">
-                <a16:creationId xmlns:a16="http://schemas.microsoft.com/office/drawing/2014/main" id="{26251F63-0F9B-46FC-B288-264E1954D111}"/>
+                <a16:creationId xmlns:a16="http://schemas.microsoft.com/office/drawing/2014/main" xmlns="" id="{26251F63-0F9B-46FC-B288-264E1954D111}"/>
               </a:ext>
             </a:extLst>
           </p:cNvPr>
@@ -32368,7 +32475,7 @@
           <p:cNvPr id="172" name="Folded Corner 14">
             <a:extLst>
               <a:ext uri="{FF2B5EF4-FFF2-40B4-BE49-F238E27FC236}">
-                <a16:creationId xmlns:a16="http://schemas.microsoft.com/office/drawing/2014/main" id="{2198A703-2FEE-48EA-B0B0-656B73C08CA7}"/>
+                <a16:creationId xmlns:a16="http://schemas.microsoft.com/office/drawing/2014/main" xmlns="" id="{2198A703-2FEE-48EA-B0B0-656B73C08CA7}"/>
               </a:ext>
             </a:extLst>
           </p:cNvPr>
@@ -32417,7 +32524,7 @@
           <p:cNvPr id="173" name="Rectangle 172">
             <a:extLst>
               <a:ext uri="{FF2B5EF4-FFF2-40B4-BE49-F238E27FC236}">
-                <a16:creationId xmlns:a16="http://schemas.microsoft.com/office/drawing/2014/main" id="{FCC85E64-312F-4851-B756-3019DD6FA99F}"/>
+                <a16:creationId xmlns:a16="http://schemas.microsoft.com/office/drawing/2014/main" xmlns="" id="{FCC85E64-312F-4851-B756-3019DD6FA99F}"/>
               </a:ext>
             </a:extLst>
           </p:cNvPr>
@@ -32469,7 +32576,7 @@
           <p:cNvPr id="174" name="Straight Arrow Connector 173">
             <a:extLst>
               <a:ext uri="{FF2B5EF4-FFF2-40B4-BE49-F238E27FC236}">
-                <a16:creationId xmlns:a16="http://schemas.microsoft.com/office/drawing/2014/main" id="{518C8625-6187-4D33-A1AC-9208CA68F263}"/>
+                <a16:creationId xmlns:a16="http://schemas.microsoft.com/office/drawing/2014/main" xmlns="" id="{518C8625-6187-4D33-A1AC-9208CA68F263}"/>
               </a:ext>
             </a:extLst>
           </p:cNvPr>
@@ -32514,7 +32621,7 @@
           <p:cNvPr id="39" name="Rectangle 38">
             <a:extLst>
               <a:ext uri="{FF2B5EF4-FFF2-40B4-BE49-F238E27FC236}">
-                <a16:creationId xmlns:a16="http://schemas.microsoft.com/office/drawing/2014/main" id="{D01A5617-56DC-4B84-AF69-7027F4C7E7B3}"/>
+                <a16:creationId xmlns:a16="http://schemas.microsoft.com/office/drawing/2014/main" xmlns="" id="{D01A5617-56DC-4B84-AF69-7027F4C7E7B3}"/>
               </a:ext>
             </a:extLst>
           </p:cNvPr>
@@ -32569,7 +32676,7 @@
           <p:cNvPr id="40" name="Arrow: Right 39">
             <a:extLst>
               <a:ext uri="{FF2B5EF4-FFF2-40B4-BE49-F238E27FC236}">
-                <a16:creationId xmlns:a16="http://schemas.microsoft.com/office/drawing/2014/main" id="{AB7C45BA-0078-4BA1-A2B3-BC9A66ACD955}"/>
+                <a16:creationId xmlns:a16="http://schemas.microsoft.com/office/drawing/2014/main" xmlns="" id="{AB7C45BA-0078-4BA1-A2B3-BC9A66ACD955}"/>
               </a:ext>
             </a:extLst>
           </p:cNvPr>
@@ -32621,7 +32728,7 @@
           <p:cNvPr id="12" name="Picture 11" descr="A picture containing outdoor object&#10;&#10;Description generated with high confidence">
             <a:extLst>
               <a:ext uri="{FF2B5EF4-FFF2-40B4-BE49-F238E27FC236}">
-                <a16:creationId xmlns:a16="http://schemas.microsoft.com/office/drawing/2014/main" id="{684713F9-9ECF-4663-A027-A6113FA71893}"/>
+                <a16:creationId xmlns:a16="http://schemas.microsoft.com/office/drawing/2014/main" xmlns="" id="{684713F9-9ECF-4663-A027-A6113FA71893}"/>
               </a:ext>
             </a:extLst>
           </p:cNvPr>
@@ -32657,7 +32764,7 @@
           <p:cNvPr id="42" name="Straight Arrow Connector 41">
             <a:extLst>
               <a:ext uri="{FF2B5EF4-FFF2-40B4-BE49-F238E27FC236}">
-                <a16:creationId xmlns:a16="http://schemas.microsoft.com/office/drawing/2014/main" id="{AE9F3928-6603-4F44-B87F-D5568E789A51}"/>
+                <a16:creationId xmlns:a16="http://schemas.microsoft.com/office/drawing/2014/main" xmlns="" id="{AE9F3928-6603-4F44-B87F-D5568E789A51}"/>
               </a:ext>
             </a:extLst>
           </p:cNvPr>
@@ -32702,7 +32809,7 @@
           <p:cNvPr id="13" name="Rectangle 12">
             <a:extLst>
               <a:ext uri="{FF2B5EF4-FFF2-40B4-BE49-F238E27FC236}">
-                <a16:creationId xmlns:a16="http://schemas.microsoft.com/office/drawing/2014/main" id="{BE9850A2-3BDB-4A68-BCBD-94C436747806}"/>
+                <a16:creationId xmlns:a16="http://schemas.microsoft.com/office/drawing/2014/main" xmlns="" id="{BE9850A2-3BDB-4A68-BCBD-94C436747806}"/>
               </a:ext>
             </a:extLst>
           </p:cNvPr>
@@ -32768,7 +32875,7 @@
           <p:cNvPr id="44" name="Folded Corner 14">
             <a:extLst>
               <a:ext uri="{FF2B5EF4-FFF2-40B4-BE49-F238E27FC236}">
-                <a16:creationId xmlns:a16="http://schemas.microsoft.com/office/drawing/2014/main" id="{048A78E4-38F4-403F-B262-3393CB25026A}"/>
+                <a16:creationId xmlns:a16="http://schemas.microsoft.com/office/drawing/2014/main" xmlns="" id="{048A78E4-38F4-403F-B262-3393CB25026A}"/>
               </a:ext>
             </a:extLst>
           </p:cNvPr>
@@ -32817,7 +32924,7 @@
           <p:cNvPr id="45" name="Rectangle 44">
             <a:extLst>
               <a:ext uri="{FF2B5EF4-FFF2-40B4-BE49-F238E27FC236}">
-                <a16:creationId xmlns:a16="http://schemas.microsoft.com/office/drawing/2014/main" id="{B6EF94B6-C2BD-4454-B081-DC4CDC0FA78B}"/>
+                <a16:creationId xmlns:a16="http://schemas.microsoft.com/office/drawing/2014/main" xmlns="" id="{B6EF94B6-C2BD-4454-B081-DC4CDC0FA78B}"/>
               </a:ext>
             </a:extLst>
           </p:cNvPr>
@@ -32869,7 +32976,7 @@
           <p:cNvPr id="14" name="Rectangle 13">
             <a:extLst>
               <a:ext uri="{FF2B5EF4-FFF2-40B4-BE49-F238E27FC236}">
-                <a16:creationId xmlns:a16="http://schemas.microsoft.com/office/drawing/2014/main" id="{9F89B982-51DA-4A7B-B50E-BA08031E2C12}"/>
+                <a16:creationId xmlns:a16="http://schemas.microsoft.com/office/drawing/2014/main" xmlns="" id="{9F89B982-51DA-4A7B-B50E-BA08031E2C12}"/>
               </a:ext>
             </a:extLst>
           </p:cNvPr>
@@ -32907,7 +33014,7 @@
           <p:cNvPr id="15" name="Rectangle 14">
             <a:extLst>
               <a:ext uri="{FF2B5EF4-FFF2-40B4-BE49-F238E27FC236}">
-                <a16:creationId xmlns:a16="http://schemas.microsoft.com/office/drawing/2014/main" id="{4F318F00-3DF3-4DD0-9F9C-3D2FB2746086}"/>
+                <a16:creationId xmlns:a16="http://schemas.microsoft.com/office/drawing/2014/main" xmlns="" id="{4F318F00-3DF3-4DD0-9F9C-3D2FB2746086}"/>
               </a:ext>
             </a:extLst>
           </p:cNvPr>
@@ -32945,7 +33052,7 @@
           <p:cNvPr id="48" name="Rectangle 47">
             <a:extLst>
               <a:ext uri="{FF2B5EF4-FFF2-40B4-BE49-F238E27FC236}">
-                <a16:creationId xmlns:a16="http://schemas.microsoft.com/office/drawing/2014/main" id="{4B4F362E-13BC-4500-8556-53A8FC39D0B9}"/>
+                <a16:creationId xmlns:a16="http://schemas.microsoft.com/office/drawing/2014/main" xmlns="" id="{4B4F362E-13BC-4500-8556-53A8FC39D0B9}"/>
               </a:ext>
             </a:extLst>
           </p:cNvPr>
@@ -32983,7 +33090,7 @@
           <p:cNvPr id="17" name="Rectangle 16">
             <a:extLst>
               <a:ext uri="{FF2B5EF4-FFF2-40B4-BE49-F238E27FC236}">
-                <a16:creationId xmlns:a16="http://schemas.microsoft.com/office/drawing/2014/main" id="{E971B6A2-9BA5-482C-991E-4489D5C190FD}"/>
+                <a16:creationId xmlns:a16="http://schemas.microsoft.com/office/drawing/2014/main" xmlns="" id="{E971B6A2-9BA5-482C-991E-4489D5C190FD}"/>
               </a:ext>
             </a:extLst>
           </p:cNvPr>
@@ -33021,7 +33128,7 @@
           <p:cNvPr id="20" name="Rectangle 19">
             <a:extLst>
               <a:ext uri="{FF2B5EF4-FFF2-40B4-BE49-F238E27FC236}">
-                <a16:creationId xmlns:a16="http://schemas.microsoft.com/office/drawing/2014/main" id="{99534692-59D2-4947-83E0-D4E8E4591FD6}"/>
+                <a16:creationId xmlns:a16="http://schemas.microsoft.com/office/drawing/2014/main" xmlns="" id="{99534692-59D2-4947-83E0-D4E8E4591FD6}"/>
               </a:ext>
             </a:extLst>
           </p:cNvPr>
@@ -33103,7 +33210,7 @@
           <p:cNvPr id="175" name="Folded Corner 14">
             <a:extLst>
               <a:ext uri="{FF2B5EF4-FFF2-40B4-BE49-F238E27FC236}">
-                <a16:creationId xmlns:a16="http://schemas.microsoft.com/office/drawing/2014/main" id="{D7925C44-E3E5-47AF-9CC8-BF6471802A70}"/>
+                <a16:creationId xmlns:a16="http://schemas.microsoft.com/office/drawing/2014/main" xmlns="" id="{D7925C44-E3E5-47AF-9CC8-BF6471802A70}"/>
               </a:ext>
             </a:extLst>
           </p:cNvPr>
@@ -33152,7 +33259,7 @@
           <p:cNvPr id="2" name="Diagram 1">
             <a:extLst>
               <a:ext uri="{FF2B5EF4-FFF2-40B4-BE49-F238E27FC236}">
-                <a16:creationId xmlns:a16="http://schemas.microsoft.com/office/drawing/2014/main" id="{214EDC3A-CB98-4BD4-86CB-C3DE5CC0A317}"/>
+                <a16:creationId xmlns:a16="http://schemas.microsoft.com/office/drawing/2014/main" xmlns="" id="{214EDC3A-CB98-4BD4-86CB-C3DE5CC0A317}"/>
               </a:ext>
             </a:extLst>
           </p:cNvPr>
@@ -33180,7 +33287,7 @@
           <p:cNvPr id="3" name="Rectangle 2">
             <a:extLst>
               <a:ext uri="{FF2B5EF4-FFF2-40B4-BE49-F238E27FC236}">
-                <a16:creationId xmlns:a16="http://schemas.microsoft.com/office/drawing/2014/main" id="{8D715EE1-32F0-4BAE-86BD-83B54B3137EB}"/>
+                <a16:creationId xmlns:a16="http://schemas.microsoft.com/office/drawing/2014/main" xmlns="" id="{8D715EE1-32F0-4BAE-86BD-83B54B3137EB}"/>
               </a:ext>
             </a:extLst>
           </p:cNvPr>
@@ -33257,7 +33364,7 @@
           <p:cNvPr id="4" name="Rectangle 3">
             <a:extLst>
               <a:ext uri="{FF2B5EF4-FFF2-40B4-BE49-F238E27FC236}">
-                <a16:creationId xmlns:a16="http://schemas.microsoft.com/office/drawing/2014/main" id="{2CBF344E-950A-4767-97FA-13FFE695BBC3}"/>
+                <a16:creationId xmlns:a16="http://schemas.microsoft.com/office/drawing/2014/main" xmlns="" id="{2CBF344E-950A-4767-97FA-13FFE695BBC3}"/>
               </a:ext>
             </a:extLst>
           </p:cNvPr>
@@ -33298,7 +33405,7 @@
           <p:cNvPr id="126" name="Rectangle 125">
             <a:extLst>
               <a:ext uri="{FF2B5EF4-FFF2-40B4-BE49-F238E27FC236}">
-                <a16:creationId xmlns:a16="http://schemas.microsoft.com/office/drawing/2014/main" id="{AFE62E66-21DE-45BB-AB76-2BCE8E9BEC95}"/>
+                <a16:creationId xmlns:a16="http://schemas.microsoft.com/office/drawing/2014/main" xmlns="" id="{AFE62E66-21DE-45BB-AB76-2BCE8E9BEC95}"/>
               </a:ext>
             </a:extLst>
           </p:cNvPr>
@@ -33399,7 +33506,7 @@
           <p:cNvPr id="128" name="Rectangle 127">
             <a:extLst>
               <a:ext uri="{FF2B5EF4-FFF2-40B4-BE49-F238E27FC236}">
-                <a16:creationId xmlns:a16="http://schemas.microsoft.com/office/drawing/2014/main" id="{57B25911-E59E-4329-B921-A0EBAE8F9C7E}"/>
+                <a16:creationId xmlns:a16="http://schemas.microsoft.com/office/drawing/2014/main" xmlns="" id="{57B25911-E59E-4329-B921-A0EBAE8F9C7E}"/>
               </a:ext>
             </a:extLst>
           </p:cNvPr>
@@ -33476,7 +33583,7 @@
           <p:cNvPr id="5" name="Rectangle 4">
             <a:extLst>
               <a:ext uri="{FF2B5EF4-FFF2-40B4-BE49-F238E27FC236}">
-                <a16:creationId xmlns:a16="http://schemas.microsoft.com/office/drawing/2014/main" id="{798B0573-B3AD-48CB-9F8F-13EC6567D0D3}"/>
+                <a16:creationId xmlns:a16="http://schemas.microsoft.com/office/drawing/2014/main" xmlns="" id="{798B0573-B3AD-48CB-9F8F-13EC6567D0D3}"/>
               </a:ext>
             </a:extLst>
           </p:cNvPr>
@@ -33571,7 +33678,7 @@
           <p:cNvPr id="6" name="Rectangle 5">
             <a:extLst>
               <a:ext uri="{FF2B5EF4-FFF2-40B4-BE49-F238E27FC236}">
-                <a16:creationId xmlns:a16="http://schemas.microsoft.com/office/drawing/2014/main" id="{2B5D63EA-C9C9-4E25-A071-89FBDD4231BE}"/>
+                <a16:creationId xmlns:a16="http://schemas.microsoft.com/office/drawing/2014/main" xmlns="" id="{2B5D63EA-C9C9-4E25-A071-89FBDD4231BE}"/>
               </a:ext>
             </a:extLst>
           </p:cNvPr>
@@ -33609,7 +33716,7 @@
           <p:cNvPr id="8" name="Rectangle 7">
             <a:extLst>
               <a:ext uri="{FF2B5EF4-FFF2-40B4-BE49-F238E27FC236}">
-                <a16:creationId xmlns:a16="http://schemas.microsoft.com/office/drawing/2014/main" id="{BE0255C1-0F86-4BC8-84D8-4B76F00785A9}"/>
+                <a16:creationId xmlns:a16="http://schemas.microsoft.com/office/drawing/2014/main" xmlns="" id="{BE0255C1-0F86-4BC8-84D8-4B76F00785A9}"/>
               </a:ext>
             </a:extLst>
           </p:cNvPr>
@@ -33650,7 +33757,7 @@
           <p:cNvPr id="9" name="Rectangle 8">
             <a:extLst>
               <a:ext uri="{FF2B5EF4-FFF2-40B4-BE49-F238E27FC236}">
-                <a16:creationId xmlns:a16="http://schemas.microsoft.com/office/drawing/2014/main" id="{CFD7F599-A36B-4AA7-86FA-23355394169C}"/>
+                <a16:creationId xmlns:a16="http://schemas.microsoft.com/office/drawing/2014/main" xmlns="" id="{CFD7F599-A36B-4AA7-86FA-23355394169C}"/>
               </a:ext>
             </a:extLst>
           </p:cNvPr>
@@ -33691,7 +33798,7 @@
           <p:cNvPr id="130" name="Rectangle 129">
             <a:extLst>
               <a:ext uri="{FF2B5EF4-FFF2-40B4-BE49-F238E27FC236}">
-                <a16:creationId xmlns:a16="http://schemas.microsoft.com/office/drawing/2014/main" id="{F21A4D44-CAD2-400B-8E2D-F8B1FEA0E5B6}"/>
+                <a16:creationId xmlns:a16="http://schemas.microsoft.com/office/drawing/2014/main" xmlns="" id="{F21A4D44-CAD2-400B-8E2D-F8B1FEA0E5B6}"/>
               </a:ext>
             </a:extLst>
           </p:cNvPr>
@@ -33732,7 +33839,7 @@
           <p:cNvPr id="131" name="Rectangle 130">
             <a:extLst>
               <a:ext uri="{FF2B5EF4-FFF2-40B4-BE49-F238E27FC236}">
-                <a16:creationId xmlns:a16="http://schemas.microsoft.com/office/drawing/2014/main" id="{7ECE62BA-C5A0-4279-B504-BAC3C2C73E71}"/>
+                <a16:creationId xmlns:a16="http://schemas.microsoft.com/office/drawing/2014/main" xmlns="" id="{7ECE62BA-C5A0-4279-B504-BAC3C2C73E71}"/>
               </a:ext>
             </a:extLst>
           </p:cNvPr>
@@ -33784,7 +33891,7 @@
           <p:cNvPr id="10" name="Cube 9">
             <a:extLst>
               <a:ext uri="{FF2B5EF4-FFF2-40B4-BE49-F238E27FC236}">
-                <a16:creationId xmlns:a16="http://schemas.microsoft.com/office/drawing/2014/main" id="{F871D032-A4AE-406F-A80A-38A8B0BED40E}"/>
+                <a16:creationId xmlns:a16="http://schemas.microsoft.com/office/drawing/2014/main" xmlns="" id="{F871D032-A4AE-406F-A80A-38A8B0BED40E}"/>
               </a:ext>
             </a:extLst>
           </p:cNvPr>
@@ -33844,7 +33951,7 @@
           <p:cNvPr id="133" name="Folded Corner 14">
             <a:extLst>
               <a:ext uri="{FF2B5EF4-FFF2-40B4-BE49-F238E27FC236}">
-                <a16:creationId xmlns:a16="http://schemas.microsoft.com/office/drawing/2014/main" id="{DDDEB2FA-CB2B-41A1-82A4-458F3DD3A4D7}"/>
+                <a16:creationId xmlns:a16="http://schemas.microsoft.com/office/drawing/2014/main" xmlns="" id="{DDDEB2FA-CB2B-41A1-82A4-458F3DD3A4D7}"/>
               </a:ext>
             </a:extLst>
           </p:cNvPr>
@@ -33893,7 +34000,7 @@
           <p:cNvPr id="11" name="Rectangle 10">
             <a:extLst>
               <a:ext uri="{FF2B5EF4-FFF2-40B4-BE49-F238E27FC236}">
-                <a16:creationId xmlns:a16="http://schemas.microsoft.com/office/drawing/2014/main" id="{F638F98D-376A-4707-AFEB-3116E75204BA}"/>
+                <a16:creationId xmlns:a16="http://schemas.microsoft.com/office/drawing/2014/main" xmlns="" id="{F638F98D-376A-4707-AFEB-3116E75204BA}"/>
               </a:ext>
             </a:extLst>
           </p:cNvPr>
@@ -33948,7 +34055,7 @@
           <p:cNvPr id="18" name="Picture 17" descr="A close up of an animal&#10;&#10;Description generated with high confidence">
             <a:extLst>
               <a:ext uri="{FF2B5EF4-FFF2-40B4-BE49-F238E27FC236}">
-                <a16:creationId xmlns:a16="http://schemas.microsoft.com/office/drawing/2014/main" id="{4132CF14-571D-4435-9A41-BF9FAEA4439C}"/>
+                <a16:creationId xmlns:a16="http://schemas.microsoft.com/office/drawing/2014/main" xmlns="" id="{4132CF14-571D-4435-9A41-BF9FAEA4439C}"/>
               </a:ext>
             </a:extLst>
           </p:cNvPr>
@@ -33984,7 +34091,7 @@
           <p:cNvPr id="19" name="Rectangle 18">
             <a:extLst>
               <a:ext uri="{FF2B5EF4-FFF2-40B4-BE49-F238E27FC236}">
-                <a16:creationId xmlns:a16="http://schemas.microsoft.com/office/drawing/2014/main" id="{1047E73B-15B2-47B6-9C78-BCDB588C3019}"/>
+                <a16:creationId xmlns:a16="http://schemas.microsoft.com/office/drawing/2014/main" xmlns="" id="{1047E73B-15B2-47B6-9C78-BCDB588C3019}"/>
               </a:ext>
             </a:extLst>
           </p:cNvPr>
@@ -34026,7 +34133,7 @@
           <p:cNvPr id="31" name="Straight Arrow Connector 30">
             <a:extLst>
               <a:ext uri="{FF2B5EF4-FFF2-40B4-BE49-F238E27FC236}">
-                <a16:creationId xmlns:a16="http://schemas.microsoft.com/office/drawing/2014/main" id="{E3ACBD9C-E946-4C83-82A0-7C79817A1EB9}"/>
+                <a16:creationId xmlns:a16="http://schemas.microsoft.com/office/drawing/2014/main" xmlns="" id="{E3ACBD9C-E946-4C83-82A0-7C79817A1EB9}"/>
               </a:ext>
             </a:extLst>
           </p:cNvPr>
@@ -34069,7 +34176,7 @@
           <p:cNvPr id="32" name="Rectangle 31">
             <a:extLst>
               <a:ext uri="{FF2B5EF4-FFF2-40B4-BE49-F238E27FC236}">
-                <a16:creationId xmlns:a16="http://schemas.microsoft.com/office/drawing/2014/main" id="{DAD5A302-C880-4E8C-9E1D-640CD5CF0CBE}"/>
+                <a16:creationId xmlns:a16="http://schemas.microsoft.com/office/drawing/2014/main" xmlns="" id="{DAD5A302-C880-4E8C-9E1D-640CD5CF0CBE}"/>
               </a:ext>
             </a:extLst>
           </p:cNvPr>
@@ -34107,7 +34214,7 @@
           <p:cNvPr id="135" name="Rectangle 134">
             <a:extLst>
               <a:ext uri="{FF2B5EF4-FFF2-40B4-BE49-F238E27FC236}">
-                <a16:creationId xmlns:a16="http://schemas.microsoft.com/office/drawing/2014/main" id="{9D239E65-7C2B-4AD5-A1F4-F716E33EF928}"/>
+                <a16:creationId xmlns:a16="http://schemas.microsoft.com/office/drawing/2014/main" xmlns="" id="{9D239E65-7C2B-4AD5-A1F4-F716E33EF928}"/>
               </a:ext>
             </a:extLst>
           </p:cNvPr>
@@ -34145,7 +34252,7 @@
           <p:cNvPr id="146" name="Rectangle 145">
             <a:extLst>
               <a:ext uri="{FF2B5EF4-FFF2-40B4-BE49-F238E27FC236}">
-                <a16:creationId xmlns:a16="http://schemas.microsoft.com/office/drawing/2014/main" id="{02CB9ACB-9175-4592-A0A2-5F6EBA3916AA}"/>
+                <a16:creationId xmlns:a16="http://schemas.microsoft.com/office/drawing/2014/main" xmlns="" id="{02CB9ACB-9175-4592-A0A2-5F6EBA3916AA}"/>
               </a:ext>
             </a:extLst>
           </p:cNvPr>
@@ -34183,7 +34290,7 @@
           <p:cNvPr id="33" name="Rectangle 32">
             <a:extLst>
               <a:ext uri="{FF2B5EF4-FFF2-40B4-BE49-F238E27FC236}">
-                <a16:creationId xmlns:a16="http://schemas.microsoft.com/office/drawing/2014/main" id="{A5445AD6-3298-4B4A-BFAA-36E271EE36D3}"/>
+                <a16:creationId xmlns:a16="http://schemas.microsoft.com/office/drawing/2014/main" xmlns="" id="{A5445AD6-3298-4B4A-BFAA-36E271EE36D3}"/>
               </a:ext>
             </a:extLst>
           </p:cNvPr>
@@ -34224,7 +34331,7 @@
           <p:cNvPr id="148" name="Cube 147">
             <a:extLst>
               <a:ext uri="{FF2B5EF4-FFF2-40B4-BE49-F238E27FC236}">
-                <a16:creationId xmlns:a16="http://schemas.microsoft.com/office/drawing/2014/main" id="{3C1DB64A-F95E-4BBA-AAB7-E382DEE6D3AD}"/>
+                <a16:creationId xmlns:a16="http://schemas.microsoft.com/office/drawing/2014/main" xmlns="" id="{3C1DB64A-F95E-4BBA-AAB7-E382DEE6D3AD}"/>
               </a:ext>
             </a:extLst>
           </p:cNvPr>
@@ -34284,7 +34391,7 @@
           <p:cNvPr id="149" name="Rectangle 148">
             <a:extLst>
               <a:ext uri="{FF2B5EF4-FFF2-40B4-BE49-F238E27FC236}">
-                <a16:creationId xmlns:a16="http://schemas.microsoft.com/office/drawing/2014/main" id="{8ADE2C1F-3705-4E1D-9D1A-CEFA5BBDC4AE}"/>
+                <a16:creationId xmlns:a16="http://schemas.microsoft.com/office/drawing/2014/main" xmlns="" id="{8ADE2C1F-3705-4E1D-9D1A-CEFA5BBDC4AE}"/>
               </a:ext>
             </a:extLst>
           </p:cNvPr>
@@ -34325,7 +34432,7 @@
           <p:cNvPr id="152" name="Folded Corner 14">
             <a:extLst>
               <a:ext uri="{FF2B5EF4-FFF2-40B4-BE49-F238E27FC236}">
-                <a16:creationId xmlns:a16="http://schemas.microsoft.com/office/drawing/2014/main" id="{E9E59862-8121-45E9-B034-254AA5F85A9E}"/>
+                <a16:creationId xmlns:a16="http://schemas.microsoft.com/office/drawing/2014/main" xmlns="" id="{E9E59862-8121-45E9-B034-254AA5F85A9E}"/>
               </a:ext>
             </a:extLst>
           </p:cNvPr>
@@ -34374,7 +34481,7 @@
           <p:cNvPr id="159" name="Rectangle 158">
             <a:extLst>
               <a:ext uri="{FF2B5EF4-FFF2-40B4-BE49-F238E27FC236}">
-                <a16:creationId xmlns:a16="http://schemas.microsoft.com/office/drawing/2014/main" id="{9189909A-C973-403D-AC10-F162C1C50251}"/>
+                <a16:creationId xmlns:a16="http://schemas.microsoft.com/office/drawing/2014/main" xmlns="" id="{9189909A-C973-403D-AC10-F162C1C50251}"/>
               </a:ext>
             </a:extLst>
           </p:cNvPr>
@@ -34429,7 +34536,7 @@
           <p:cNvPr id="160" name="Straight Arrow Connector 159">
             <a:extLst>
               <a:ext uri="{FF2B5EF4-FFF2-40B4-BE49-F238E27FC236}">
-                <a16:creationId xmlns:a16="http://schemas.microsoft.com/office/drawing/2014/main" id="{4104DBBE-32EA-425C-8DB2-CA3E800CA64E}"/>
+                <a16:creationId xmlns:a16="http://schemas.microsoft.com/office/drawing/2014/main" xmlns="" id="{4104DBBE-32EA-425C-8DB2-CA3E800CA64E}"/>
               </a:ext>
             </a:extLst>
           </p:cNvPr>
@@ -34474,7 +34581,7 @@
           <p:cNvPr id="163" name="Cube 162">
             <a:extLst>
               <a:ext uri="{FF2B5EF4-FFF2-40B4-BE49-F238E27FC236}">
-                <a16:creationId xmlns:a16="http://schemas.microsoft.com/office/drawing/2014/main" id="{DCC62459-FE7B-48A9-A2FB-D56CDC251746}"/>
+                <a16:creationId xmlns:a16="http://schemas.microsoft.com/office/drawing/2014/main" xmlns="" id="{DCC62459-FE7B-48A9-A2FB-D56CDC251746}"/>
               </a:ext>
             </a:extLst>
           </p:cNvPr>
@@ -34534,7 +34641,7 @@
           <p:cNvPr id="164" name="Rectangle 163">
             <a:extLst>
               <a:ext uri="{FF2B5EF4-FFF2-40B4-BE49-F238E27FC236}">
-                <a16:creationId xmlns:a16="http://schemas.microsoft.com/office/drawing/2014/main" id="{A17E061D-69B0-4C5E-9A8B-BA722BA64CA4}"/>
+                <a16:creationId xmlns:a16="http://schemas.microsoft.com/office/drawing/2014/main" xmlns="" id="{A17E061D-69B0-4C5E-9A8B-BA722BA64CA4}"/>
               </a:ext>
             </a:extLst>
           </p:cNvPr>
@@ -34575,7 +34682,7 @@
           <p:cNvPr id="165" name="Folded Corner 14">
             <a:extLst>
               <a:ext uri="{FF2B5EF4-FFF2-40B4-BE49-F238E27FC236}">
-                <a16:creationId xmlns:a16="http://schemas.microsoft.com/office/drawing/2014/main" id="{E1EF52F6-55FE-4BD8-A276-7961F4C14406}"/>
+                <a16:creationId xmlns:a16="http://schemas.microsoft.com/office/drawing/2014/main" xmlns="" id="{E1EF52F6-55FE-4BD8-A276-7961F4C14406}"/>
               </a:ext>
             </a:extLst>
           </p:cNvPr>
@@ -34624,7 +34731,7 @@
           <p:cNvPr id="170" name="Rectangle 169">
             <a:extLst>
               <a:ext uri="{FF2B5EF4-FFF2-40B4-BE49-F238E27FC236}">
-                <a16:creationId xmlns:a16="http://schemas.microsoft.com/office/drawing/2014/main" id="{CD422137-5DD0-430D-A335-3434D32EC278}"/>
+                <a16:creationId xmlns:a16="http://schemas.microsoft.com/office/drawing/2014/main" xmlns="" id="{CD422137-5DD0-430D-A335-3434D32EC278}"/>
               </a:ext>
             </a:extLst>
           </p:cNvPr>
@@ -34676,7 +34783,7 @@
           <p:cNvPr id="171" name="Straight Arrow Connector 170">
             <a:extLst>
               <a:ext uri="{FF2B5EF4-FFF2-40B4-BE49-F238E27FC236}">
-                <a16:creationId xmlns:a16="http://schemas.microsoft.com/office/drawing/2014/main" id="{26251F63-0F9B-46FC-B288-264E1954D111}"/>
+                <a16:creationId xmlns:a16="http://schemas.microsoft.com/office/drawing/2014/main" xmlns="" id="{26251F63-0F9B-46FC-B288-264E1954D111}"/>
               </a:ext>
             </a:extLst>
           </p:cNvPr>
@@ -34721,7 +34828,7 @@
           <p:cNvPr id="172" name="Folded Corner 14">
             <a:extLst>
               <a:ext uri="{FF2B5EF4-FFF2-40B4-BE49-F238E27FC236}">
-                <a16:creationId xmlns:a16="http://schemas.microsoft.com/office/drawing/2014/main" id="{2198A703-2FEE-48EA-B0B0-656B73C08CA7}"/>
+                <a16:creationId xmlns:a16="http://schemas.microsoft.com/office/drawing/2014/main" xmlns="" id="{2198A703-2FEE-48EA-B0B0-656B73C08CA7}"/>
               </a:ext>
             </a:extLst>
           </p:cNvPr>
@@ -34770,7 +34877,7 @@
           <p:cNvPr id="173" name="Rectangle 172">
             <a:extLst>
               <a:ext uri="{FF2B5EF4-FFF2-40B4-BE49-F238E27FC236}">
-                <a16:creationId xmlns:a16="http://schemas.microsoft.com/office/drawing/2014/main" id="{FCC85E64-312F-4851-B756-3019DD6FA99F}"/>
+                <a16:creationId xmlns:a16="http://schemas.microsoft.com/office/drawing/2014/main" xmlns="" id="{FCC85E64-312F-4851-B756-3019DD6FA99F}"/>
               </a:ext>
             </a:extLst>
           </p:cNvPr>
@@ -34822,7 +34929,7 @@
           <p:cNvPr id="174" name="Straight Arrow Connector 173">
             <a:extLst>
               <a:ext uri="{FF2B5EF4-FFF2-40B4-BE49-F238E27FC236}">
-                <a16:creationId xmlns:a16="http://schemas.microsoft.com/office/drawing/2014/main" id="{518C8625-6187-4D33-A1AC-9208CA68F263}"/>
+                <a16:creationId xmlns:a16="http://schemas.microsoft.com/office/drawing/2014/main" xmlns="" id="{518C8625-6187-4D33-A1AC-9208CA68F263}"/>
               </a:ext>
             </a:extLst>
           </p:cNvPr>
@@ -34867,7 +34974,7 @@
           <p:cNvPr id="39" name="Rectangle 38">
             <a:extLst>
               <a:ext uri="{FF2B5EF4-FFF2-40B4-BE49-F238E27FC236}">
-                <a16:creationId xmlns:a16="http://schemas.microsoft.com/office/drawing/2014/main" id="{D01A5617-56DC-4B84-AF69-7027F4C7E7B3}"/>
+                <a16:creationId xmlns:a16="http://schemas.microsoft.com/office/drawing/2014/main" xmlns="" id="{D01A5617-56DC-4B84-AF69-7027F4C7E7B3}"/>
               </a:ext>
             </a:extLst>
           </p:cNvPr>
@@ -34922,7 +35029,7 @@
           <p:cNvPr id="40" name="Arrow: Right 39">
             <a:extLst>
               <a:ext uri="{FF2B5EF4-FFF2-40B4-BE49-F238E27FC236}">
-                <a16:creationId xmlns:a16="http://schemas.microsoft.com/office/drawing/2014/main" id="{AB7C45BA-0078-4BA1-A2B3-BC9A66ACD955}"/>
+                <a16:creationId xmlns:a16="http://schemas.microsoft.com/office/drawing/2014/main" xmlns="" id="{AB7C45BA-0078-4BA1-A2B3-BC9A66ACD955}"/>
               </a:ext>
             </a:extLst>
           </p:cNvPr>
@@ -34974,7 +35081,7 @@
           <p:cNvPr id="12" name="Picture 11" descr="A picture containing outdoor object&#10;&#10;Description generated with high confidence">
             <a:extLst>
               <a:ext uri="{FF2B5EF4-FFF2-40B4-BE49-F238E27FC236}">
-                <a16:creationId xmlns:a16="http://schemas.microsoft.com/office/drawing/2014/main" id="{684713F9-9ECF-4663-A027-A6113FA71893}"/>
+                <a16:creationId xmlns:a16="http://schemas.microsoft.com/office/drawing/2014/main" xmlns="" id="{684713F9-9ECF-4663-A027-A6113FA71893}"/>
               </a:ext>
             </a:extLst>
           </p:cNvPr>
@@ -35010,7 +35117,7 @@
           <p:cNvPr id="42" name="Straight Arrow Connector 41">
             <a:extLst>
               <a:ext uri="{FF2B5EF4-FFF2-40B4-BE49-F238E27FC236}">
-                <a16:creationId xmlns:a16="http://schemas.microsoft.com/office/drawing/2014/main" id="{AE9F3928-6603-4F44-B87F-D5568E789A51}"/>
+                <a16:creationId xmlns:a16="http://schemas.microsoft.com/office/drawing/2014/main" xmlns="" id="{AE9F3928-6603-4F44-B87F-D5568E789A51}"/>
               </a:ext>
             </a:extLst>
           </p:cNvPr>
@@ -35055,7 +35162,7 @@
           <p:cNvPr id="13" name="Rectangle 12">
             <a:extLst>
               <a:ext uri="{FF2B5EF4-FFF2-40B4-BE49-F238E27FC236}">
-                <a16:creationId xmlns:a16="http://schemas.microsoft.com/office/drawing/2014/main" id="{BE9850A2-3BDB-4A68-BCBD-94C436747806}"/>
+                <a16:creationId xmlns:a16="http://schemas.microsoft.com/office/drawing/2014/main" xmlns="" id="{BE9850A2-3BDB-4A68-BCBD-94C436747806}"/>
               </a:ext>
             </a:extLst>
           </p:cNvPr>
@@ -35121,7 +35228,7 @@
           <p:cNvPr id="44" name="Folded Corner 14">
             <a:extLst>
               <a:ext uri="{FF2B5EF4-FFF2-40B4-BE49-F238E27FC236}">
-                <a16:creationId xmlns:a16="http://schemas.microsoft.com/office/drawing/2014/main" id="{048A78E4-38F4-403F-B262-3393CB25026A}"/>
+                <a16:creationId xmlns:a16="http://schemas.microsoft.com/office/drawing/2014/main" xmlns="" id="{048A78E4-38F4-403F-B262-3393CB25026A}"/>
               </a:ext>
             </a:extLst>
           </p:cNvPr>
@@ -35170,7 +35277,7 @@
           <p:cNvPr id="45" name="Rectangle 44">
             <a:extLst>
               <a:ext uri="{FF2B5EF4-FFF2-40B4-BE49-F238E27FC236}">
-                <a16:creationId xmlns:a16="http://schemas.microsoft.com/office/drawing/2014/main" id="{B6EF94B6-C2BD-4454-B081-DC4CDC0FA78B}"/>
+                <a16:creationId xmlns:a16="http://schemas.microsoft.com/office/drawing/2014/main" xmlns="" id="{B6EF94B6-C2BD-4454-B081-DC4CDC0FA78B}"/>
               </a:ext>
             </a:extLst>
           </p:cNvPr>
@@ -35222,7 +35329,7 @@
           <p:cNvPr id="14" name="Rectangle 13">
             <a:extLst>
               <a:ext uri="{FF2B5EF4-FFF2-40B4-BE49-F238E27FC236}">
-                <a16:creationId xmlns:a16="http://schemas.microsoft.com/office/drawing/2014/main" id="{9F89B982-51DA-4A7B-B50E-BA08031E2C12}"/>
+                <a16:creationId xmlns:a16="http://schemas.microsoft.com/office/drawing/2014/main" xmlns="" id="{9F89B982-51DA-4A7B-B50E-BA08031E2C12}"/>
               </a:ext>
             </a:extLst>
           </p:cNvPr>
@@ -35260,7 +35367,7 @@
           <p:cNvPr id="15" name="Rectangle 14">
             <a:extLst>
               <a:ext uri="{FF2B5EF4-FFF2-40B4-BE49-F238E27FC236}">
-                <a16:creationId xmlns:a16="http://schemas.microsoft.com/office/drawing/2014/main" id="{4F318F00-3DF3-4DD0-9F9C-3D2FB2746086}"/>
+                <a16:creationId xmlns:a16="http://schemas.microsoft.com/office/drawing/2014/main" xmlns="" id="{4F318F00-3DF3-4DD0-9F9C-3D2FB2746086}"/>
               </a:ext>
             </a:extLst>
           </p:cNvPr>
@@ -35298,7 +35405,7 @@
           <p:cNvPr id="48" name="Rectangle 47">
             <a:extLst>
               <a:ext uri="{FF2B5EF4-FFF2-40B4-BE49-F238E27FC236}">
-                <a16:creationId xmlns:a16="http://schemas.microsoft.com/office/drawing/2014/main" id="{4B4F362E-13BC-4500-8556-53A8FC39D0B9}"/>
+                <a16:creationId xmlns:a16="http://schemas.microsoft.com/office/drawing/2014/main" xmlns="" id="{4B4F362E-13BC-4500-8556-53A8FC39D0B9}"/>
               </a:ext>
             </a:extLst>
           </p:cNvPr>
@@ -35336,7 +35443,7 @@
           <p:cNvPr id="17" name="Rectangle 16">
             <a:extLst>
               <a:ext uri="{FF2B5EF4-FFF2-40B4-BE49-F238E27FC236}">
-                <a16:creationId xmlns:a16="http://schemas.microsoft.com/office/drawing/2014/main" id="{E971B6A2-9BA5-482C-991E-4489D5C190FD}"/>
+                <a16:creationId xmlns:a16="http://schemas.microsoft.com/office/drawing/2014/main" xmlns="" id="{E971B6A2-9BA5-482C-991E-4489D5C190FD}"/>
               </a:ext>
             </a:extLst>
           </p:cNvPr>
@@ -35512,7 +35619,7 @@
           <p:cNvPr id="52" name="Rectangle 51">
             <a:extLst>
               <a:ext uri="{FF2B5EF4-FFF2-40B4-BE49-F238E27FC236}">
-                <a16:creationId xmlns:a16="http://schemas.microsoft.com/office/drawing/2014/main" id="{99534692-59D2-4947-83E0-D4E8E4591FD6}"/>
+                <a16:creationId xmlns:a16="http://schemas.microsoft.com/office/drawing/2014/main" xmlns="" id="{99534692-59D2-4947-83E0-D4E8E4591FD6}"/>
               </a:ext>
             </a:extLst>
           </p:cNvPr>
@@ -35594,7 +35701,7 @@
           <p:cNvPr id="175" name="Folded Corner 14">
             <a:extLst>
               <a:ext uri="{FF2B5EF4-FFF2-40B4-BE49-F238E27FC236}">
-                <a16:creationId xmlns:a16="http://schemas.microsoft.com/office/drawing/2014/main" id="{D7925C44-E3E5-47AF-9CC8-BF6471802A70}"/>
+                <a16:creationId xmlns:a16="http://schemas.microsoft.com/office/drawing/2014/main" xmlns="" id="{D7925C44-E3E5-47AF-9CC8-BF6471802A70}"/>
               </a:ext>
             </a:extLst>
           </p:cNvPr>
@@ -35643,7 +35750,7 @@
           <p:cNvPr id="2" name="Diagram 1">
             <a:extLst>
               <a:ext uri="{FF2B5EF4-FFF2-40B4-BE49-F238E27FC236}">
-                <a16:creationId xmlns:a16="http://schemas.microsoft.com/office/drawing/2014/main" id="{214EDC3A-CB98-4BD4-86CB-C3DE5CC0A317}"/>
+                <a16:creationId xmlns:a16="http://schemas.microsoft.com/office/drawing/2014/main" xmlns="" id="{214EDC3A-CB98-4BD4-86CB-C3DE5CC0A317}"/>
               </a:ext>
             </a:extLst>
           </p:cNvPr>
@@ -35671,7 +35778,7 @@
           <p:cNvPr id="3" name="Rectangle 2">
             <a:extLst>
               <a:ext uri="{FF2B5EF4-FFF2-40B4-BE49-F238E27FC236}">
-                <a16:creationId xmlns:a16="http://schemas.microsoft.com/office/drawing/2014/main" id="{8D715EE1-32F0-4BAE-86BD-83B54B3137EB}"/>
+                <a16:creationId xmlns:a16="http://schemas.microsoft.com/office/drawing/2014/main" xmlns="" id="{8D715EE1-32F0-4BAE-86BD-83B54B3137EB}"/>
               </a:ext>
             </a:extLst>
           </p:cNvPr>
@@ -35726,7 +35833,7 @@
           <p:cNvPr id="4" name="Rectangle 3">
             <a:extLst>
               <a:ext uri="{FF2B5EF4-FFF2-40B4-BE49-F238E27FC236}">
-                <a16:creationId xmlns:a16="http://schemas.microsoft.com/office/drawing/2014/main" id="{2CBF344E-950A-4767-97FA-13FFE695BBC3}"/>
+                <a16:creationId xmlns:a16="http://schemas.microsoft.com/office/drawing/2014/main" xmlns="" id="{2CBF344E-950A-4767-97FA-13FFE695BBC3}"/>
               </a:ext>
             </a:extLst>
           </p:cNvPr>
@@ -35767,7 +35874,7 @@
           <p:cNvPr id="126" name="Rectangle 125">
             <a:extLst>
               <a:ext uri="{FF2B5EF4-FFF2-40B4-BE49-F238E27FC236}">
-                <a16:creationId xmlns:a16="http://schemas.microsoft.com/office/drawing/2014/main" id="{AFE62E66-21DE-45BB-AB76-2BCE8E9BEC95}"/>
+                <a16:creationId xmlns:a16="http://schemas.microsoft.com/office/drawing/2014/main" xmlns="" id="{AFE62E66-21DE-45BB-AB76-2BCE8E9BEC95}"/>
               </a:ext>
             </a:extLst>
           </p:cNvPr>
@@ -35815,7 +35922,7 @@
           <p:cNvPr id="128" name="Rectangle 127">
             <a:extLst>
               <a:ext uri="{FF2B5EF4-FFF2-40B4-BE49-F238E27FC236}">
-                <a16:creationId xmlns:a16="http://schemas.microsoft.com/office/drawing/2014/main" id="{57B25911-E59E-4329-B921-A0EBAE8F9C7E}"/>
+                <a16:creationId xmlns:a16="http://schemas.microsoft.com/office/drawing/2014/main" xmlns="" id="{57B25911-E59E-4329-B921-A0EBAE8F9C7E}"/>
               </a:ext>
             </a:extLst>
           </p:cNvPr>
@@ -35870,7 +35977,7 @@
           <p:cNvPr id="5" name="Rectangle 4">
             <a:extLst>
               <a:ext uri="{FF2B5EF4-FFF2-40B4-BE49-F238E27FC236}">
-                <a16:creationId xmlns:a16="http://schemas.microsoft.com/office/drawing/2014/main" id="{798B0573-B3AD-48CB-9F8F-13EC6567D0D3}"/>
+                <a16:creationId xmlns:a16="http://schemas.microsoft.com/office/drawing/2014/main" xmlns="" id="{798B0573-B3AD-48CB-9F8F-13EC6567D0D3}"/>
               </a:ext>
             </a:extLst>
           </p:cNvPr>
@@ -35965,7 +36072,7 @@
           <p:cNvPr id="6" name="Rectangle 5">
             <a:extLst>
               <a:ext uri="{FF2B5EF4-FFF2-40B4-BE49-F238E27FC236}">
-                <a16:creationId xmlns:a16="http://schemas.microsoft.com/office/drawing/2014/main" id="{2B5D63EA-C9C9-4E25-A071-89FBDD4231BE}"/>
+                <a16:creationId xmlns:a16="http://schemas.microsoft.com/office/drawing/2014/main" xmlns="" id="{2B5D63EA-C9C9-4E25-A071-89FBDD4231BE}"/>
               </a:ext>
             </a:extLst>
           </p:cNvPr>
@@ -36003,7 +36110,7 @@
           <p:cNvPr id="8" name="Rectangle 7">
             <a:extLst>
               <a:ext uri="{FF2B5EF4-FFF2-40B4-BE49-F238E27FC236}">
-                <a16:creationId xmlns:a16="http://schemas.microsoft.com/office/drawing/2014/main" id="{BE0255C1-0F86-4BC8-84D8-4B76F00785A9}"/>
+                <a16:creationId xmlns:a16="http://schemas.microsoft.com/office/drawing/2014/main" xmlns="" id="{BE0255C1-0F86-4BC8-84D8-4B76F00785A9}"/>
               </a:ext>
             </a:extLst>
           </p:cNvPr>
@@ -36044,7 +36151,7 @@
           <p:cNvPr id="9" name="Rectangle 8">
             <a:extLst>
               <a:ext uri="{FF2B5EF4-FFF2-40B4-BE49-F238E27FC236}">
-                <a16:creationId xmlns:a16="http://schemas.microsoft.com/office/drawing/2014/main" id="{CFD7F599-A36B-4AA7-86FA-23355394169C}"/>
+                <a16:creationId xmlns:a16="http://schemas.microsoft.com/office/drawing/2014/main" xmlns="" id="{CFD7F599-A36B-4AA7-86FA-23355394169C}"/>
               </a:ext>
             </a:extLst>
           </p:cNvPr>
@@ -36085,7 +36192,7 @@
           <p:cNvPr id="130" name="Rectangle 129">
             <a:extLst>
               <a:ext uri="{FF2B5EF4-FFF2-40B4-BE49-F238E27FC236}">
-                <a16:creationId xmlns:a16="http://schemas.microsoft.com/office/drawing/2014/main" id="{F21A4D44-CAD2-400B-8E2D-F8B1FEA0E5B6}"/>
+                <a16:creationId xmlns:a16="http://schemas.microsoft.com/office/drawing/2014/main" xmlns="" id="{F21A4D44-CAD2-400B-8E2D-F8B1FEA0E5B6}"/>
               </a:ext>
             </a:extLst>
           </p:cNvPr>
@@ -36126,7 +36233,7 @@
           <p:cNvPr id="131" name="Rectangle 130">
             <a:extLst>
               <a:ext uri="{FF2B5EF4-FFF2-40B4-BE49-F238E27FC236}">
-                <a16:creationId xmlns:a16="http://schemas.microsoft.com/office/drawing/2014/main" id="{7ECE62BA-C5A0-4279-B504-BAC3C2C73E71}"/>
+                <a16:creationId xmlns:a16="http://schemas.microsoft.com/office/drawing/2014/main" xmlns="" id="{7ECE62BA-C5A0-4279-B504-BAC3C2C73E71}"/>
               </a:ext>
             </a:extLst>
           </p:cNvPr>
@@ -36178,7 +36285,7 @@
           <p:cNvPr id="10" name="Cube 9">
             <a:extLst>
               <a:ext uri="{FF2B5EF4-FFF2-40B4-BE49-F238E27FC236}">
-                <a16:creationId xmlns:a16="http://schemas.microsoft.com/office/drawing/2014/main" id="{F871D032-A4AE-406F-A80A-38A8B0BED40E}"/>
+                <a16:creationId xmlns:a16="http://schemas.microsoft.com/office/drawing/2014/main" xmlns="" id="{F871D032-A4AE-406F-A80A-38A8B0BED40E}"/>
               </a:ext>
             </a:extLst>
           </p:cNvPr>
@@ -36238,7 +36345,7 @@
           <p:cNvPr id="133" name="Folded Corner 14">
             <a:extLst>
               <a:ext uri="{FF2B5EF4-FFF2-40B4-BE49-F238E27FC236}">
-                <a16:creationId xmlns:a16="http://schemas.microsoft.com/office/drawing/2014/main" id="{DDDEB2FA-CB2B-41A1-82A4-458F3DD3A4D7}"/>
+                <a16:creationId xmlns:a16="http://schemas.microsoft.com/office/drawing/2014/main" xmlns="" id="{DDDEB2FA-CB2B-41A1-82A4-458F3DD3A4D7}"/>
               </a:ext>
             </a:extLst>
           </p:cNvPr>
@@ -36287,7 +36394,7 @@
           <p:cNvPr id="11" name="Rectangle 10">
             <a:extLst>
               <a:ext uri="{FF2B5EF4-FFF2-40B4-BE49-F238E27FC236}">
-                <a16:creationId xmlns:a16="http://schemas.microsoft.com/office/drawing/2014/main" id="{F638F98D-376A-4707-AFEB-3116E75204BA}"/>
+                <a16:creationId xmlns:a16="http://schemas.microsoft.com/office/drawing/2014/main" xmlns="" id="{F638F98D-376A-4707-AFEB-3116E75204BA}"/>
               </a:ext>
             </a:extLst>
           </p:cNvPr>
@@ -36342,7 +36449,7 @@
           <p:cNvPr id="18" name="Picture 17" descr="A close up of an animal&#10;&#10;Description generated with high confidence">
             <a:extLst>
               <a:ext uri="{FF2B5EF4-FFF2-40B4-BE49-F238E27FC236}">
-                <a16:creationId xmlns:a16="http://schemas.microsoft.com/office/drawing/2014/main" id="{4132CF14-571D-4435-9A41-BF9FAEA4439C}"/>
+                <a16:creationId xmlns:a16="http://schemas.microsoft.com/office/drawing/2014/main" xmlns="" id="{4132CF14-571D-4435-9A41-BF9FAEA4439C}"/>
               </a:ext>
             </a:extLst>
           </p:cNvPr>
@@ -36378,7 +36485,7 @@
           <p:cNvPr id="19" name="Rectangle 18">
             <a:extLst>
               <a:ext uri="{FF2B5EF4-FFF2-40B4-BE49-F238E27FC236}">
-                <a16:creationId xmlns:a16="http://schemas.microsoft.com/office/drawing/2014/main" id="{1047E73B-15B2-47B6-9C78-BCDB588C3019}"/>
+                <a16:creationId xmlns:a16="http://schemas.microsoft.com/office/drawing/2014/main" xmlns="" id="{1047E73B-15B2-47B6-9C78-BCDB588C3019}"/>
               </a:ext>
             </a:extLst>
           </p:cNvPr>
@@ -36420,7 +36527,7 @@
           <p:cNvPr id="31" name="Straight Arrow Connector 30">
             <a:extLst>
               <a:ext uri="{FF2B5EF4-FFF2-40B4-BE49-F238E27FC236}">
-                <a16:creationId xmlns:a16="http://schemas.microsoft.com/office/drawing/2014/main" id="{E3ACBD9C-E946-4C83-82A0-7C79817A1EB9}"/>
+                <a16:creationId xmlns:a16="http://schemas.microsoft.com/office/drawing/2014/main" xmlns="" id="{E3ACBD9C-E946-4C83-82A0-7C79817A1EB9}"/>
               </a:ext>
             </a:extLst>
           </p:cNvPr>
@@ -36463,7 +36570,7 @@
           <p:cNvPr id="32" name="Rectangle 31">
             <a:extLst>
               <a:ext uri="{FF2B5EF4-FFF2-40B4-BE49-F238E27FC236}">
-                <a16:creationId xmlns:a16="http://schemas.microsoft.com/office/drawing/2014/main" id="{DAD5A302-C880-4E8C-9E1D-640CD5CF0CBE}"/>
+                <a16:creationId xmlns:a16="http://schemas.microsoft.com/office/drawing/2014/main" xmlns="" id="{DAD5A302-C880-4E8C-9E1D-640CD5CF0CBE}"/>
               </a:ext>
             </a:extLst>
           </p:cNvPr>
@@ -36501,7 +36608,7 @@
           <p:cNvPr id="135" name="Rectangle 134">
             <a:extLst>
               <a:ext uri="{FF2B5EF4-FFF2-40B4-BE49-F238E27FC236}">
-                <a16:creationId xmlns:a16="http://schemas.microsoft.com/office/drawing/2014/main" id="{9D239E65-7C2B-4AD5-A1F4-F716E33EF928}"/>
+                <a16:creationId xmlns:a16="http://schemas.microsoft.com/office/drawing/2014/main" xmlns="" id="{9D239E65-7C2B-4AD5-A1F4-F716E33EF928}"/>
               </a:ext>
             </a:extLst>
           </p:cNvPr>
@@ -36539,7 +36646,7 @@
           <p:cNvPr id="146" name="Rectangle 145">
             <a:extLst>
               <a:ext uri="{FF2B5EF4-FFF2-40B4-BE49-F238E27FC236}">
-                <a16:creationId xmlns:a16="http://schemas.microsoft.com/office/drawing/2014/main" id="{02CB9ACB-9175-4592-A0A2-5F6EBA3916AA}"/>
+                <a16:creationId xmlns:a16="http://schemas.microsoft.com/office/drawing/2014/main" xmlns="" id="{02CB9ACB-9175-4592-A0A2-5F6EBA3916AA}"/>
               </a:ext>
             </a:extLst>
           </p:cNvPr>
@@ -36577,7 +36684,7 @@
           <p:cNvPr id="33" name="Rectangle 32">
             <a:extLst>
               <a:ext uri="{FF2B5EF4-FFF2-40B4-BE49-F238E27FC236}">
-                <a16:creationId xmlns:a16="http://schemas.microsoft.com/office/drawing/2014/main" id="{A5445AD6-3298-4B4A-BFAA-36E271EE36D3}"/>
+                <a16:creationId xmlns:a16="http://schemas.microsoft.com/office/drawing/2014/main" xmlns="" id="{A5445AD6-3298-4B4A-BFAA-36E271EE36D3}"/>
               </a:ext>
             </a:extLst>
           </p:cNvPr>
@@ -36618,7 +36725,7 @@
           <p:cNvPr id="148" name="Cube 147">
             <a:extLst>
               <a:ext uri="{FF2B5EF4-FFF2-40B4-BE49-F238E27FC236}">
-                <a16:creationId xmlns:a16="http://schemas.microsoft.com/office/drawing/2014/main" id="{3C1DB64A-F95E-4BBA-AAB7-E382DEE6D3AD}"/>
+                <a16:creationId xmlns:a16="http://schemas.microsoft.com/office/drawing/2014/main" xmlns="" id="{3C1DB64A-F95E-4BBA-AAB7-E382DEE6D3AD}"/>
               </a:ext>
             </a:extLst>
           </p:cNvPr>
@@ -36678,7 +36785,7 @@
           <p:cNvPr id="149" name="Rectangle 148">
             <a:extLst>
               <a:ext uri="{FF2B5EF4-FFF2-40B4-BE49-F238E27FC236}">
-                <a16:creationId xmlns:a16="http://schemas.microsoft.com/office/drawing/2014/main" id="{8ADE2C1F-3705-4E1D-9D1A-CEFA5BBDC4AE}"/>
+                <a16:creationId xmlns:a16="http://schemas.microsoft.com/office/drawing/2014/main" xmlns="" id="{8ADE2C1F-3705-4E1D-9D1A-CEFA5BBDC4AE}"/>
               </a:ext>
             </a:extLst>
           </p:cNvPr>
@@ -36719,7 +36826,7 @@
           <p:cNvPr id="152" name="Folded Corner 14">
             <a:extLst>
               <a:ext uri="{FF2B5EF4-FFF2-40B4-BE49-F238E27FC236}">
-                <a16:creationId xmlns:a16="http://schemas.microsoft.com/office/drawing/2014/main" id="{E9E59862-8121-45E9-B034-254AA5F85A9E}"/>
+                <a16:creationId xmlns:a16="http://schemas.microsoft.com/office/drawing/2014/main" xmlns="" id="{E9E59862-8121-45E9-B034-254AA5F85A9E}"/>
               </a:ext>
             </a:extLst>
           </p:cNvPr>
@@ -36768,7 +36875,7 @@
           <p:cNvPr id="159" name="Rectangle 158">
             <a:extLst>
               <a:ext uri="{FF2B5EF4-FFF2-40B4-BE49-F238E27FC236}">
-                <a16:creationId xmlns:a16="http://schemas.microsoft.com/office/drawing/2014/main" id="{9189909A-C973-403D-AC10-F162C1C50251}"/>
+                <a16:creationId xmlns:a16="http://schemas.microsoft.com/office/drawing/2014/main" xmlns="" id="{9189909A-C973-403D-AC10-F162C1C50251}"/>
               </a:ext>
             </a:extLst>
           </p:cNvPr>
@@ -36823,7 +36930,7 @@
           <p:cNvPr id="160" name="Straight Arrow Connector 159">
             <a:extLst>
               <a:ext uri="{FF2B5EF4-FFF2-40B4-BE49-F238E27FC236}">
-                <a16:creationId xmlns:a16="http://schemas.microsoft.com/office/drawing/2014/main" id="{4104DBBE-32EA-425C-8DB2-CA3E800CA64E}"/>
+                <a16:creationId xmlns:a16="http://schemas.microsoft.com/office/drawing/2014/main" xmlns="" id="{4104DBBE-32EA-425C-8DB2-CA3E800CA64E}"/>
               </a:ext>
             </a:extLst>
           </p:cNvPr>
@@ -36868,7 +36975,7 @@
           <p:cNvPr id="163" name="Cube 162">
             <a:extLst>
               <a:ext uri="{FF2B5EF4-FFF2-40B4-BE49-F238E27FC236}">
-                <a16:creationId xmlns:a16="http://schemas.microsoft.com/office/drawing/2014/main" id="{DCC62459-FE7B-48A9-A2FB-D56CDC251746}"/>
+                <a16:creationId xmlns:a16="http://schemas.microsoft.com/office/drawing/2014/main" xmlns="" id="{DCC62459-FE7B-48A9-A2FB-D56CDC251746}"/>
               </a:ext>
             </a:extLst>
           </p:cNvPr>
@@ -36928,7 +37035,7 @@
           <p:cNvPr id="164" name="Rectangle 163">
             <a:extLst>
               <a:ext uri="{FF2B5EF4-FFF2-40B4-BE49-F238E27FC236}">
-                <a16:creationId xmlns:a16="http://schemas.microsoft.com/office/drawing/2014/main" id="{A17E061D-69B0-4C5E-9A8B-BA722BA64CA4}"/>
+                <a16:creationId xmlns:a16="http://schemas.microsoft.com/office/drawing/2014/main" xmlns="" id="{A17E061D-69B0-4C5E-9A8B-BA722BA64CA4}"/>
               </a:ext>
             </a:extLst>
           </p:cNvPr>
@@ -36969,7 +37076,7 @@
           <p:cNvPr id="165" name="Folded Corner 14">
             <a:extLst>
               <a:ext uri="{FF2B5EF4-FFF2-40B4-BE49-F238E27FC236}">
-                <a16:creationId xmlns:a16="http://schemas.microsoft.com/office/drawing/2014/main" id="{E1EF52F6-55FE-4BD8-A276-7961F4C14406}"/>
+                <a16:creationId xmlns:a16="http://schemas.microsoft.com/office/drawing/2014/main" xmlns="" id="{E1EF52F6-55FE-4BD8-A276-7961F4C14406}"/>
               </a:ext>
             </a:extLst>
           </p:cNvPr>
@@ -37018,7 +37125,7 @@
           <p:cNvPr id="170" name="Rectangle 169">
             <a:extLst>
               <a:ext uri="{FF2B5EF4-FFF2-40B4-BE49-F238E27FC236}">
-                <a16:creationId xmlns:a16="http://schemas.microsoft.com/office/drawing/2014/main" id="{CD422137-5DD0-430D-A335-3434D32EC278}"/>
+                <a16:creationId xmlns:a16="http://schemas.microsoft.com/office/drawing/2014/main" xmlns="" id="{CD422137-5DD0-430D-A335-3434D32EC278}"/>
               </a:ext>
             </a:extLst>
           </p:cNvPr>
@@ -37070,7 +37177,7 @@
           <p:cNvPr id="171" name="Straight Arrow Connector 170">
             <a:extLst>
               <a:ext uri="{FF2B5EF4-FFF2-40B4-BE49-F238E27FC236}">
-                <a16:creationId xmlns:a16="http://schemas.microsoft.com/office/drawing/2014/main" id="{26251F63-0F9B-46FC-B288-264E1954D111}"/>
+                <a16:creationId xmlns:a16="http://schemas.microsoft.com/office/drawing/2014/main" xmlns="" id="{26251F63-0F9B-46FC-B288-264E1954D111}"/>
               </a:ext>
             </a:extLst>
           </p:cNvPr>
@@ -37115,7 +37222,7 @@
           <p:cNvPr id="172" name="Folded Corner 14">
             <a:extLst>
               <a:ext uri="{FF2B5EF4-FFF2-40B4-BE49-F238E27FC236}">
-                <a16:creationId xmlns:a16="http://schemas.microsoft.com/office/drawing/2014/main" id="{2198A703-2FEE-48EA-B0B0-656B73C08CA7}"/>
+                <a16:creationId xmlns:a16="http://schemas.microsoft.com/office/drawing/2014/main" xmlns="" id="{2198A703-2FEE-48EA-B0B0-656B73C08CA7}"/>
               </a:ext>
             </a:extLst>
           </p:cNvPr>
@@ -37164,7 +37271,7 @@
           <p:cNvPr id="173" name="Rectangle 172">
             <a:extLst>
               <a:ext uri="{FF2B5EF4-FFF2-40B4-BE49-F238E27FC236}">
-                <a16:creationId xmlns:a16="http://schemas.microsoft.com/office/drawing/2014/main" id="{FCC85E64-312F-4851-B756-3019DD6FA99F}"/>
+                <a16:creationId xmlns:a16="http://schemas.microsoft.com/office/drawing/2014/main" xmlns="" id="{FCC85E64-312F-4851-B756-3019DD6FA99F}"/>
               </a:ext>
             </a:extLst>
           </p:cNvPr>
@@ -37216,7 +37323,7 @@
           <p:cNvPr id="174" name="Straight Arrow Connector 173">
             <a:extLst>
               <a:ext uri="{FF2B5EF4-FFF2-40B4-BE49-F238E27FC236}">
-                <a16:creationId xmlns:a16="http://schemas.microsoft.com/office/drawing/2014/main" id="{518C8625-6187-4D33-A1AC-9208CA68F263}"/>
+                <a16:creationId xmlns:a16="http://schemas.microsoft.com/office/drawing/2014/main" xmlns="" id="{518C8625-6187-4D33-A1AC-9208CA68F263}"/>
               </a:ext>
             </a:extLst>
           </p:cNvPr>
@@ -37261,7 +37368,7 @@
           <p:cNvPr id="39" name="Rectangle 38">
             <a:extLst>
               <a:ext uri="{FF2B5EF4-FFF2-40B4-BE49-F238E27FC236}">
-                <a16:creationId xmlns:a16="http://schemas.microsoft.com/office/drawing/2014/main" id="{D01A5617-56DC-4B84-AF69-7027F4C7E7B3}"/>
+                <a16:creationId xmlns:a16="http://schemas.microsoft.com/office/drawing/2014/main" xmlns="" id="{D01A5617-56DC-4B84-AF69-7027F4C7E7B3}"/>
               </a:ext>
             </a:extLst>
           </p:cNvPr>
@@ -37316,7 +37423,7 @@
           <p:cNvPr id="40" name="Arrow: Right 39">
             <a:extLst>
               <a:ext uri="{FF2B5EF4-FFF2-40B4-BE49-F238E27FC236}">
-                <a16:creationId xmlns:a16="http://schemas.microsoft.com/office/drawing/2014/main" id="{AB7C45BA-0078-4BA1-A2B3-BC9A66ACD955}"/>
+                <a16:creationId xmlns:a16="http://schemas.microsoft.com/office/drawing/2014/main" xmlns="" id="{AB7C45BA-0078-4BA1-A2B3-BC9A66ACD955}"/>
               </a:ext>
             </a:extLst>
           </p:cNvPr>
@@ -37368,7 +37475,7 @@
           <p:cNvPr id="12" name="Picture 11" descr="A picture containing outdoor object&#10;&#10;Description generated with high confidence">
             <a:extLst>
               <a:ext uri="{FF2B5EF4-FFF2-40B4-BE49-F238E27FC236}">
-                <a16:creationId xmlns:a16="http://schemas.microsoft.com/office/drawing/2014/main" id="{684713F9-9ECF-4663-A027-A6113FA71893}"/>
+                <a16:creationId xmlns:a16="http://schemas.microsoft.com/office/drawing/2014/main" xmlns="" id="{684713F9-9ECF-4663-A027-A6113FA71893}"/>
               </a:ext>
             </a:extLst>
           </p:cNvPr>
@@ -37404,7 +37511,7 @@
           <p:cNvPr id="42" name="Straight Arrow Connector 41">
             <a:extLst>
               <a:ext uri="{FF2B5EF4-FFF2-40B4-BE49-F238E27FC236}">
-                <a16:creationId xmlns:a16="http://schemas.microsoft.com/office/drawing/2014/main" id="{AE9F3928-6603-4F44-B87F-D5568E789A51}"/>
+                <a16:creationId xmlns:a16="http://schemas.microsoft.com/office/drawing/2014/main" xmlns="" id="{AE9F3928-6603-4F44-B87F-D5568E789A51}"/>
               </a:ext>
             </a:extLst>
           </p:cNvPr>
@@ -37449,7 +37556,7 @@
           <p:cNvPr id="13" name="Rectangle 12">
             <a:extLst>
               <a:ext uri="{FF2B5EF4-FFF2-40B4-BE49-F238E27FC236}">
-                <a16:creationId xmlns:a16="http://schemas.microsoft.com/office/drawing/2014/main" id="{BE9850A2-3BDB-4A68-BCBD-94C436747806}"/>
+                <a16:creationId xmlns:a16="http://schemas.microsoft.com/office/drawing/2014/main" xmlns="" id="{BE9850A2-3BDB-4A68-BCBD-94C436747806}"/>
               </a:ext>
             </a:extLst>
           </p:cNvPr>
@@ -37515,7 +37622,7 @@
           <p:cNvPr id="44" name="Folded Corner 14">
             <a:extLst>
               <a:ext uri="{FF2B5EF4-FFF2-40B4-BE49-F238E27FC236}">
-                <a16:creationId xmlns:a16="http://schemas.microsoft.com/office/drawing/2014/main" id="{048A78E4-38F4-403F-B262-3393CB25026A}"/>
+                <a16:creationId xmlns:a16="http://schemas.microsoft.com/office/drawing/2014/main" xmlns="" id="{048A78E4-38F4-403F-B262-3393CB25026A}"/>
               </a:ext>
             </a:extLst>
           </p:cNvPr>
@@ -37564,7 +37671,7 @@
           <p:cNvPr id="45" name="Rectangle 44">
             <a:extLst>
               <a:ext uri="{FF2B5EF4-FFF2-40B4-BE49-F238E27FC236}">
-                <a16:creationId xmlns:a16="http://schemas.microsoft.com/office/drawing/2014/main" id="{B6EF94B6-C2BD-4454-B081-DC4CDC0FA78B}"/>
+                <a16:creationId xmlns:a16="http://schemas.microsoft.com/office/drawing/2014/main" xmlns="" id="{B6EF94B6-C2BD-4454-B081-DC4CDC0FA78B}"/>
               </a:ext>
             </a:extLst>
           </p:cNvPr>
@@ -37616,7 +37723,7 @@
           <p:cNvPr id="14" name="Rectangle 13">
             <a:extLst>
               <a:ext uri="{FF2B5EF4-FFF2-40B4-BE49-F238E27FC236}">
-                <a16:creationId xmlns:a16="http://schemas.microsoft.com/office/drawing/2014/main" id="{9F89B982-51DA-4A7B-B50E-BA08031E2C12}"/>
+                <a16:creationId xmlns:a16="http://schemas.microsoft.com/office/drawing/2014/main" xmlns="" id="{9F89B982-51DA-4A7B-B50E-BA08031E2C12}"/>
               </a:ext>
             </a:extLst>
           </p:cNvPr>
@@ -37654,7 +37761,7 @@
           <p:cNvPr id="15" name="Rectangle 14">
             <a:extLst>
               <a:ext uri="{FF2B5EF4-FFF2-40B4-BE49-F238E27FC236}">
-                <a16:creationId xmlns:a16="http://schemas.microsoft.com/office/drawing/2014/main" id="{4F318F00-3DF3-4DD0-9F9C-3D2FB2746086}"/>
+                <a16:creationId xmlns:a16="http://schemas.microsoft.com/office/drawing/2014/main" xmlns="" id="{4F318F00-3DF3-4DD0-9F9C-3D2FB2746086}"/>
               </a:ext>
             </a:extLst>
           </p:cNvPr>
@@ -37692,7 +37799,7 @@
           <p:cNvPr id="48" name="Rectangle 47">
             <a:extLst>
               <a:ext uri="{FF2B5EF4-FFF2-40B4-BE49-F238E27FC236}">
-                <a16:creationId xmlns:a16="http://schemas.microsoft.com/office/drawing/2014/main" id="{4B4F362E-13BC-4500-8556-53A8FC39D0B9}"/>
+                <a16:creationId xmlns:a16="http://schemas.microsoft.com/office/drawing/2014/main" xmlns="" id="{4B4F362E-13BC-4500-8556-53A8FC39D0B9}"/>
               </a:ext>
             </a:extLst>
           </p:cNvPr>
@@ -37730,7 +37837,7 @@
           <p:cNvPr id="17" name="Rectangle 16">
             <a:extLst>
               <a:ext uri="{FF2B5EF4-FFF2-40B4-BE49-F238E27FC236}">
-                <a16:creationId xmlns:a16="http://schemas.microsoft.com/office/drawing/2014/main" id="{E971B6A2-9BA5-482C-991E-4489D5C190FD}"/>
+                <a16:creationId xmlns:a16="http://schemas.microsoft.com/office/drawing/2014/main" xmlns="" id="{E971B6A2-9BA5-482C-991E-4489D5C190FD}"/>
               </a:ext>
             </a:extLst>
           </p:cNvPr>
@@ -37814,7 +37921,7 @@
           <p:cNvPr id="52" name="Rectangle 51">
             <a:extLst>
               <a:ext uri="{FF2B5EF4-FFF2-40B4-BE49-F238E27FC236}">
-                <a16:creationId xmlns:a16="http://schemas.microsoft.com/office/drawing/2014/main" id="{99534692-59D2-4947-83E0-D4E8E4591FD6}"/>
+                <a16:creationId xmlns:a16="http://schemas.microsoft.com/office/drawing/2014/main" xmlns="" id="{99534692-59D2-4947-83E0-D4E8E4591FD6}"/>
               </a:ext>
             </a:extLst>
           </p:cNvPr>
@@ -37896,7 +38003,7 @@
           <p:cNvPr id="175" name="Folded Corner 14">
             <a:extLst>
               <a:ext uri="{FF2B5EF4-FFF2-40B4-BE49-F238E27FC236}">
-                <a16:creationId xmlns:a16="http://schemas.microsoft.com/office/drawing/2014/main" id="{D7925C44-E3E5-47AF-9CC8-BF6471802A70}"/>
+                <a16:creationId xmlns:a16="http://schemas.microsoft.com/office/drawing/2014/main" xmlns="" id="{D7925C44-E3E5-47AF-9CC8-BF6471802A70}"/>
               </a:ext>
             </a:extLst>
           </p:cNvPr>
@@ -37945,7 +38052,7 @@
           <p:cNvPr id="2" name="Diagram 1">
             <a:extLst>
               <a:ext uri="{FF2B5EF4-FFF2-40B4-BE49-F238E27FC236}">
-                <a16:creationId xmlns:a16="http://schemas.microsoft.com/office/drawing/2014/main" id="{214EDC3A-CB98-4BD4-86CB-C3DE5CC0A317}"/>
+                <a16:creationId xmlns:a16="http://schemas.microsoft.com/office/drawing/2014/main" xmlns="" id="{214EDC3A-CB98-4BD4-86CB-C3DE5CC0A317}"/>
               </a:ext>
             </a:extLst>
           </p:cNvPr>
@@ -37973,7 +38080,7 @@
           <p:cNvPr id="3" name="Rectangle 2">
             <a:extLst>
               <a:ext uri="{FF2B5EF4-FFF2-40B4-BE49-F238E27FC236}">
-                <a16:creationId xmlns:a16="http://schemas.microsoft.com/office/drawing/2014/main" id="{8D715EE1-32F0-4BAE-86BD-83B54B3137EB}"/>
+                <a16:creationId xmlns:a16="http://schemas.microsoft.com/office/drawing/2014/main" xmlns="" id="{8D715EE1-32F0-4BAE-86BD-83B54B3137EB}"/>
               </a:ext>
             </a:extLst>
           </p:cNvPr>
@@ -38037,7 +38144,7 @@
           <p:cNvPr id="4" name="Rectangle 3">
             <a:extLst>
               <a:ext uri="{FF2B5EF4-FFF2-40B4-BE49-F238E27FC236}">
-                <a16:creationId xmlns:a16="http://schemas.microsoft.com/office/drawing/2014/main" id="{2CBF344E-950A-4767-97FA-13FFE695BBC3}"/>
+                <a16:creationId xmlns:a16="http://schemas.microsoft.com/office/drawing/2014/main" xmlns="" id="{2CBF344E-950A-4767-97FA-13FFE695BBC3}"/>
               </a:ext>
             </a:extLst>
           </p:cNvPr>
@@ -38078,7 +38185,7 @@
           <p:cNvPr id="126" name="Rectangle 125">
             <a:extLst>
               <a:ext uri="{FF2B5EF4-FFF2-40B4-BE49-F238E27FC236}">
-                <a16:creationId xmlns:a16="http://schemas.microsoft.com/office/drawing/2014/main" id="{AFE62E66-21DE-45BB-AB76-2BCE8E9BEC95}"/>
+                <a16:creationId xmlns:a16="http://schemas.microsoft.com/office/drawing/2014/main" xmlns="" id="{AFE62E66-21DE-45BB-AB76-2BCE8E9BEC95}"/>
               </a:ext>
             </a:extLst>
           </p:cNvPr>
@@ -38139,7 +38246,7 @@
           <p:cNvPr id="128" name="Rectangle 127">
             <a:extLst>
               <a:ext uri="{FF2B5EF4-FFF2-40B4-BE49-F238E27FC236}">
-                <a16:creationId xmlns:a16="http://schemas.microsoft.com/office/drawing/2014/main" id="{57B25911-E59E-4329-B921-A0EBAE8F9C7E}"/>
+                <a16:creationId xmlns:a16="http://schemas.microsoft.com/office/drawing/2014/main" xmlns="" id="{57B25911-E59E-4329-B921-A0EBAE8F9C7E}"/>
               </a:ext>
             </a:extLst>
           </p:cNvPr>
@@ -38190,7 +38297,7 @@
           <p:cNvPr id="5" name="Rectangle 4">
             <a:extLst>
               <a:ext uri="{FF2B5EF4-FFF2-40B4-BE49-F238E27FC236}">
-                <a16:creationId xmlns:a16="http://schemas.microsoft.com/office/drawing/2014/main" id="{798B0573-B3AD-48CB-9F8F-13EC6567D0D3}"/>
+                <a16:creationId xmlns:a16="http://schemas.microsoft.com/office/drawing/2014/main" xmlns="" id="{798B0573-B3AD-48CB-9F8F-13EC6567D0D3}"/>
               </a:ext>
             </a:extLst>
           </p:cNvPr>
@@ -38285,7 +38392,7 @@
           <p:cNvPr id="6" name="Rectangle 5">
             <a:extLst>
               <a:ext uri="{FF2B5EF4-FFF2-40B4-BE49-F238E27FC236}">
-                <a16:creationId xmlns:a16="http://schemas.microsoft.com/office/drawing/2014/main" id="{2B5D63EA-C9C9-4E25-A071-89FBDD4231BE}"/>
+                <a16:creationId xmlns:a16="http://schemas.microsoft.com/office/drawing/2014/main" xmlns="" id="{2B5D63EA-C9C9-4E25-A071-89FBDD4231BE}"/>
               </a:ext>
             </a:extLst>
           </p:cNvPr>
@@ -38323,7 +38430,7 @@
           <p:cNvPr id="8" name="Rectangle 7">
             <a:extLst>
               <a:ext uri="{FF2B5EF4-FFF2-40B4-BE49-F238E27FC236}">
-                <a16:creationId xmlns:a16="http://schemas.microsoft.com/office/drawing/2014/main" id="{BE0255C1-0F86-4BC8-84D8-4B76F00785A9}"/>
+                <a16:creationId xmlns:a16="http://schemas.microsoft.com/office/drawing/2014/main" xmlns="" id="{BE0255C1-0F86-4BC8-84D8-4B76F00785A9}"/>
               </a:ext>
             </a:extLst>
           </p:cNvPr>
@@ -38364,7 +38471,7 @@
           <p:cNvPr id="9" name="Rectangle 8">
             <a:extLst>
               <a:ext uri="{FF2B5EF4-FFF2-40B4-BE49-F238E27FC236}">
-                <a16:creationId xmlns:a16="http://schemas.microsoft.com/office/drawing/2014/main" id="{CFD7F599-A36B-4AA7-86FA-23355394169C}"/>
+                <a16:creationId xmlns:a16="http://schemas.microsoft.com/office/drawing/2014/main" xmlns="" id="{CFD7F599-A36B-4AA7-86FA-23355394169C}"/>
               </a:ext>
             </a:extLst>
           </p:cNvPr>
@@ -38405,7 +38512,7 @@
           <p:cNvPr id="130" name="Rectangle 129">
             <a:extLst>
               <a:ext uri="{FF2B5EF4-FFF2-40B4-BE49-F238E27FC236}">
-                <a16:creationId xmlns:a16="http://schemas.microsoft.com/office/drawing/2014/main" id="{F21A4D44-CAD2-400B-8E2D-F8B1FEA0E5B6}"/>
+                <a16:creationId xmlns:a16="http://schemas.microsoft.com/office/drawing/2014/main" xmlns="" id="{F21A4D44-CAD2-400B-8E2D-F8B1FEA0E5B6}"/>
               </a:ext>
             </a:extLst>
           </p:cNvPr>
@@ -38446,7 +38553,7 @@
           <p:cNvPr id="131" name="Rectangle 130">
             <a:extLst>
               <a:ext uri="{FF2B5EF4-FFF2-40B4-BE49-F238E27FC236}">
-                <a16:creationId xmlns:a16="http://schemas.microsoft.com/office/drawing/2014/main" id="{7ECE62BA-C5A0-4279-B504-BAC3C2C73E71}"/>
+                <a16:creationId xmlns:a16="http://schemas.microsoft.com/office/drawing/2014/main" xmlns="" id="{7ECE62BA-C5A0-4279-B504-BAC3C2C73E71}"/>
               </a:ext>
             </a:extLst>
           </p:cNvPr>
@@ -38498,7 +38605,7 @@
           <p:cNvPr id="10" name="Cube 9">
             <a:extLst>
               <a:ext uri="{FF2B5EF4-FFF2-40B4-BE49-F238E27FC236}">
-                <a16:creationId xmlns:a16="http://schemas.microsoft.com/office/drawing/2014/main" id="{F871D032-A4AE-406F-A80A-38A8B0BED40E}"/>
+                <a16:creationId xmlns:a16="http://schemas.microsoft.com/office/drawing/2014/main" xmlns="" id="{F871D032-A4AE-406F-A80A-38A8B0BED40E}"/>
               </a:ext>
             </a:extLst>
           </p:cNvPr>
@@ -38558,7 +38665,7 @@
           <p:cNvPr id="133" name="Folded Corner 14">
             <a:extLst>
               <a:ext uri="{FF2B5EF4-FFF2-40B4-BE49-F238E27FC236}">
-                <a16:creationId xmlns:a16="http://schemas.microsoft.com/office/drawing/2014/main" id="{DDDEB2FA-CB2B-41A1-82A4-458F3DD3A4D7}"/>
+                <a16:creationId xmlns:a16="http://schemas.microsoft.com/office/drawing/2014/main" xmlns="" id="{DDDEB2FA-CB2B-41A1-82A4-458F3DD3A4D7}"/>
               </a:ext>
             </a:extLst>
           </p:cNvPr>
@@ -38607,7 +38714,7 @@
           <p:cNvPr id="11" name="Rectangle 10">
             <a:extLst>
               <a:ext uri="{FF2B5EF4-FFF2-40B4-BE49-F238E27FC236}">
-                <a16:creationId xmlns:a16="http://schemas.microsoft.com/office/drawing/2014/main" id="{F638F98D-376A-4707-AFEB-3116E75204BA}"/>
+                <a16:creationId xmlns:a16="http://schemas.microsoft.com/office/drawing/2014/main" xmlns="" id="{F638F98D-376A-4707-AFEB-3116E75204BA}"/>
               </a:ext>
             </a:extLst>
           </p:cNvPr>
@@ -38662,7 +38769,7 @@
           <p:cNvPr id="18" name="Picture 17" descr="A close up of an animal&#10;&#10;Description generated with high confidence">
             <a:extLst>
               <a:ext uri="{FF2B5EF4-FFF2-40B4-BE49-F238E27FC236}">
-                <a16:creationId xmlns:a16="http://schemas.microsoft.com/office/drawing/2014/main" id="{4132CF14-571D-4435-9A41-BF9FAEA4439C}"/>
+                <a16:creationId xmlns:a16="http://schemas.microsoft.com/office/drawing/2014/main" xmlns="" id="{4132CF14-571D-4435-9A41-BF9FAEA4439C}"/>
               </a:ext>
             </a:extLst>
           </p:cNvPr>
@@ -38698,7 +38805,7 @@
           <p:cNvPr id="19" name="Rectangle 18">
             <a:extLst>
               <a:ext uri="{FF2B5EF4-FFF2-40B4-BE49-F238E27FC236}">
-                <a16:creationId xmlns:a16="http://schemas.microsoft.com/office/drawing/2014/main" id="{1047E73B-15B2-47B6-9C78-BCDB588C3019}"/>
+                <a16:creationId xmlns:a16="http://schemas.microsoft.com/office/drawing/2014/main" xmlns="" id="{1047E73B-15B2-47B6-9C78-BCDB588C3019}"/>
               </a:ext>
             </a:extLst>
           </p:cNvPr>
@@ -38740,7 +38847,7 @@
           <p:cNvPr id="31" name="Straight Arrow Connector 30">
             <a:extLst>
               <a:ext uri="{FF2B5EF4-FFF2-40B4-BE49-F238E27FC236}">
-                <a16:creationId xmlns:a16="http://schemas.microsoft.com/office/drawing/2014/main" id="{E3ACBD9C-E946-4C83-82A0-7C79817A1EB9}"/>
+                <a16:creationId xmlns:a16="http://schemas.microsoft.com/office/drawing/2014/main" xmlns="" id="{E3ACBD9C-E946-4C83-82A0-7C79817A1EB9}"/>
               </a:ext>
             </a:extLst>
           </p:cNvPr>
@@ -38783,7 +38890,7 @@
           <p:cNvPr id="32" name="Rectangle 31">
             <a:extLst>
               <a:ext uri="{FF2B5EF4-FFF2-40B4-BE49-F238E27FC236}">
-                <a16:creationId xmlns:a16="http://schemas.microsoft.com/office/drawing/2014/main" id="{DAD5A302-C880-4E8C-9E1D-640CD5CF0CBE}"/>
+                <a16:creationId xmlns:a16="http://schemas.microsoft.com/office/drawing/2014/main" xmlns="" id="{DAD5A302-C880-4E8C-9E1D-640CD5CF0CBE}"/>
               </a:ext>
             </a:extLst>
           </p:cNvPr>
@@ -38821,7 +38928,7 @@
           <p:cNvPr id="135" name="Rectangle 134">
             <a:extLst>
               <a:ext uri="{FF2B5EF4-FFF2-40B4-BE49-F238E27FC236}">
-                <a16:creationId xmlns:a16="http://schemas.microsoft.com/office/drawing/2014/main" id="{9D239E65-7C2B-4AD5-A1F4-F716E33EF928}"/>
+                <a16:creationId xmlns:a16="http://schemas.microsoft.com/office/drawing/2014/main" xmlns="" id="{9D239E65-7C2B-4AD5-A1F4-F716E33EF928}"/>
               </a:ext>
             </a:extLst>
           </p:cNvPr>
@@ -38859,7 +38966,7 @@
           <p:cNvPr id="146" name="Rectangle 145">
             <a:extLst>
               <a:ext uri="{FF2B5EF4-FFF2-40B4-BE49-F238E27FC236}">
-                <a16:creationId xmlns:a16="http://schemas.microsoft.com/office/drawing/2014/main" id="{02CB9ACB-9175-4592-A0A2-5F6EBA3916AA}"/>
+                <a16:creationId xmlns:a16="http://schemas.microsoft.com/office/drawing/2014/main" xmlns="" id="{02CB9ACB-9175-4592-A0A2-5F6EBA3916AA}"/>
               </a:ext>
             </a:extLst>
           </p:cNvPr>
@@ -38897,7 +39004,7 @@
           <p:cNvPr id="33" name="Rectangle 32">
             <a:extLst>
               <a:ext uri="{FF2B5EF4-FFF2-40B4-BE49-F238E27FC236}">
-                <a16:creationId xmlns:a16="http://schemas.microsoft.com/office/drawing/2014/main" id="{A5445AD6-3298-4B4A-BFAA-36E271EE36D3}"/>
+                <a16:creationId xmlns:a16="http://schemas.microsoft.com/office/drawing/2014/main" xmlns="" id="{A5445AD6-3298-4B4A-BFAA-36E271EE36D3}"/>
               </a:ext>
             </a:extLst>
           </p:cNvPr>
@@ -38938,7 +39045,7 @@
           <p:cNvPr id="148" name="Cube 147">
             <a:extLst>
               <a:ext uri="{FF2B5EF4-FFF2-40B4-BE49-F238E27FC236}">
-                <a16:creationId xmlns:a16="http://schemas.microsoft.com/office/drawing/2014/main" id="{3C1DB64A-F95E-4BBA-AAB7-E382DEE6D3AD}"/>
+                <a16:creationId xmlns:a16="http://schemas.microsoft.com/office/drawing/2014/main" xmlns="" id="{3C1DB64A-F95E-4BBA-AAB7-E382DEE6D3AD}"/>
               </a:ext>
             </a:extLst>
           </p:cNvPr>
@@ -38998,7 +39105,7 @@
           <p:cNvPr id="149" name="Rectangle 148">
             <a:extLst>
               <a:ext uri="{FF2B5EF4-FFF2-40B4-BE49-F238E27FC236}">
-                <a16:creationId xmlns:a16="http://schemas.microsoft.com/office/drawing/2014/main" id="{8ADE2C1F-3705-4E1D-9D1A-CEFA5BBDC4AE}"/>
+                <a16:creationId xmlns:a16="http://schemas.microsoft.com/office/drawing/2014/main" xmlns="" id="{8ADE2C1F-3705-4E1D-9D1A-CEFA5BBDC4AE}"/>
               </a:ext>
             </a:extLst>
           </p:cNvPr>
@@ -39039,7 +39146,7 @@
           <p:cNvPr id="152" name="Folded Corner 14">
             <a:extLst>
               <a:ext uri="{FF2B5EF4-FFF2-40B4-BE49-F238E27FC236}">
-                <a16:creationId xmlns:a16="http://schemas.microsoft.com/office/drawing/2014/main" id="{E9E59862-8121-45E9-B034-254AA5F85A9E}"/>
+                <a16:creationId xmlns:a16="http://schemas.microsoft.com/office/drawing/2014/main" xmlns="" id="{E9E59862-8121-45E9-B034-254AA5F85A9E}"/>
               </a:ext>
             </a:extLst>
           </p:cNvPr>
@@ -39088,7 +39195,7 @@
           <p:cNvPr id="159" name="Rectangle 158">
             <a:extLst>
               <a:ext uri="{FF2B5EF4-FFF2-40B4-BE49-F238E27FC236}">
-                <a16:creationId xmlns:a16="http://schemas.microsoft.com/office/drawing/2014/main" id="{9189909A-C973-403D-AC10-F162C1C50251}"/>
+                <a16:creationId xmlns:a16="http://schemas.microsoft.com/office/drawing/2014/main" xmlns="" id="{9189909A-C973-403D-AC10-F162C1C50251}"/>
               </a:ext>
             </a:extLst>
           </p:cNvPr>
@@ -39143,7 +39250,7 @@
           <p:cNvPr id="160" name="Straight Arrow Connector 159">
             <a:extLst>
               <a:ext uri="{FF2B5EF4-FFF2-40B4-BE49-F238E27FC236}">
-                <a16:creationId xmlns:a16="http://schemas.microsoft.com/office/drawing/2014/main" id="{4104DBBE-32EA-425C-8DB2-CA3E800CA64E}"/>
+                <a16:creationId xmlns:a16="http://schemas.microsoft.com/office/drawing/2014/main" xmlns="" id="{4104DBBE-32EA-425C-8DB2-CA3E800CA64E}"/>
               </a:ext>
             </a:extLst>
           </p:cNvPr>
@@ -39188,7 +39295,7 @@
           <p:cNvPr id="163" name="Cube 162">
             <a:extLst>
               <a:ext uri="{FF2B5EF4-FFF2-40B4-BE49-F238E27FC236}">
-                <a16:creationId xmlns:a16="http://schemas.microsoft.com/office/drawing/2014/main" id="{DCC62459-FE7B-48A9-A2FB-D56CDC251746}"/>
+                <a16:creationId xmlns:a16="http://schemas.microsoft.com/office/drawing/2014/main" xmlns="" id="{DCC62459-FE7B-48A9-A2FB-D56CDC251746}"/>
               </a:ext>
             </a:extLst>
           </p:cNvPr>
@@ -39248,7 +39355,7 @@
           <p:cNvPr id="164" name="Rectangle 163">
             <a:extLst>
               <a:ext uri="{FF2B5EF4-FFF2-40B4-BE49-F238E27FC236}">
-                <a16:creationId xmlns:a16="http://schemas.microsoft.com/office/drawing/2014/main" id="{A17E061D-69B0-4C5E-9A8B-BA722BA64CA4}"/>
+                <a16:creationId xmlns:a16="http://schemas.microsoft.com/office/drawing/2014/main" xmlns="" id="{A17E061D-69B0-4C5E-9A8B-BA722BA64CA4}"/>
               </a:ext>
             </a:extLst>
           </p:cNvPr>
@@ -39289,7 +39396,7 @@
           <p:cNvPr id="165" name="Folded Corner 14">
             <a:extLst>
               <a:ext uri="{FF2B5EF4-FFF2-40B4-BE49-F238E27FC236}">
-                <a16:creationId xmlns:a16="http://schemas.microsoft.com/office/drawing/2014/main" id="{E1EF52F6-55FE-4BD8-A276-7961F4C14406}"/>
+                <a16:creationId xmlns:a16="http://schemas.microsoft.com/office/drawing/2014/main" xmlns="" id="{E1EF52F6-55FE-4BD8-A276-7961F4C14406}"/>
               </a:ext>
             </a:extLst>
           </p:cNvPr>
@@ -39338,7 +39445,7 @@
           <p:cNvPr id="170" name="Rectangle 169">
             <a:extLst>
               <a:ext uri="{FF2B5EF4-FFF2-40B4-BE49-F238E27FC236}">
-                <a16:creationId xmlns:a16="http://schemas.microsoft.com/office/drawing/2014/main" id="{CD422137-5DD0-430D-A335-3434D32EC278}"/>
+                <a16:creationId xmlns:a16="http://schemas.microsoft.com/office/drawing/2014/main" xmlns="" id="{CD422137-5DD0-430D-A335-3434D32EC278}"/>
               </a:ext>
             </a:extLst>
           </p:cNvPr>
@@ -39390,7 +39497,7 @@
           <p:cNvPr id="171" name="Straight Arrow Connector 170">
             <a:extLst>
               <a:ext uri="{FF2B5EF4-FFF2-40B4-BE49-F238E27FC236}">
-                <a16:creationId xmlns:a16="http://schemas.microsoft.com/office/drawing/2014/main" id="{26251F63-0F9B-46FC-B288-264E1954D111}"/>
+                <a16:creationId xmlns:a16="http://schemas.microsoft.com/office/drawing/2014/main" xmlns="" id="{26251F63-0F9B-46FC-B288-264E1954D111}"/>
               </a:ext>
             </a:extLst>
           </p:cNvPr>
@@ -39435,7 +39542,7 @@
           <p:cNvPr id="172" name="Folded Corner 14">
             <a:extLst>
               <a:ext uri="{FF2B5EF4-FFF2-40B4-BE49-F238E27FC236}">
-                <a16:creationId xmlns:a16="http://schemas.microsoft.com/office/drawing/2014/main" id="{2198A703-2FEE-48EA-B0B0-656B73C08CA7}"/>
+                <a16:creationId xmlns:a16="http://schemas.microsoft.com/office/drawing/2014/main" xmlns="" id="{2198A703-2FEE-48EA-B0B0-656B73C08CA7}"/>
               </a:ext>
             </a:extLst>
           </p:cNvPr>
@@ -39484,7 +39591,7 @@
           <p:cNvPr id="173" name="Rectangle 172">
             <a:extLst>
               <a:ext uri="{FF2B5EF4-FFF2-40B4-BE49-F238E27FC236}">
-                <a16:creationId xmlns:a16="http://schemas.microsoft.com/office/drawing/2014/main" id="{FCC85E64-312F-4851-B756-3019DD6FA99F}"/>
+                <a16:creationId xmlns:a16="http://schemas.microsoft.com/office/drawing/2014/main" xmlns="" id="{FCC85E64-312F-4851-B756-3019DD6FA99F}"/>
               </a:ext>
             </a:extLst>
           </p:cNvPr>
@@ -39536,7 +39643,7 @@
           <p:cNvPr id="174" name="Straight Arrow Connector 173">
             <a:extLst>
               <a:ext uri="{FF2B5EF4-FFF2-40B4-BE49-F238E27FC236}">
-                <a16:creationId xmlns:a16="http://schemas.microsoft.com/office/drawing/2014/main" id="{518C8625-6187-4D33-A1AC-9208CA68F263}"/>
+                <a16:creationId xmlns:a16="http://schemas.microsoft.com/office/drawing/2014/main" xmlns="" id="{518C8625-6187-4D33-A1AC-9208CA68F263}"/>
               </a:ext>
             </a:extLst>
           </p:cNvPr>
@@ -39581,7 +39688,7 @@
           <p:cNvPr id="39" name="Rectangle 38">
             <a:extLst>
               <a:ext uri="{FF2B5EF4-FFF2-40B4-BE49-F238E27FC236}">
-                <a16:creationId xmlns:a16="http://schemas.microsoft.com/office/drawing/2014/main" id="{D01A5617-56DC-4B84-AF69-7027F4C7E7B3}"/>
+                <a16:creationId xmlns:a16="http://schemas.microsoft.com/office/drawing/2014/main" xmlns="" id="{D01A5617-56DC-4B84-AF69-7027F4C7E7B3}"/>
               </a:ext>
             </a:extLst>
           </p:cNvPr>
@@ -39636,7 +39743,7 @@
           <p:cNvPr id="40" name="Arrow: Right 39">
             <a:extLst>
               <a:ext uri="{FF2B5EF4-FFF2-40B4-BE49-F238E27FC236}">
-                <a16:creationId xmlns:a16="http://schemas.microsoft.com/office/drawing/2014/main" id="{AB7C45BA-0078-4BA1-A2B3-BC9A66ACD955}"/>
+                <a16:creationId xmlns:a16="http://schemas.microsoft.com/office/drawing/2014/main" xmlns="" id="{AB7C45BA-0078-4BA1-A2B3-BC9A66ACD955}"/>
               </a:ext>
             </a:extLst>
           </p:cNvPr>
@@ -39688,7 +39795,7 @@
           <p:cNvPr id="12" name="Picture 11" descr="A picture containing outdoor object&#10;&#10;Description generated with high confidence">
             <a:extLst>
               <a:ext uri="{FF2B5EF4-FFF2-40B4-BE49-F238E27FC236}">
-                <a16:creationId xmlns:a16="http://schemas.microsoft.com/office/drawing/2014/main" id="{684713F9-9ECF-4663-A027-A6113FA71893}"/>
+                <a16:creationId xmlns:a16="http://schemas.microsoft.com/office/drawing/2014/main" xmlns="" id="{684713F9-9ECF-4663-A027-A6113FA71893}"/>
               </a:ext>
             </a:extLst>
           </p:cNvPr>
@@ -39724,7 +39831,7 @@
           <p:cNvPr id="42" name="Straight Arrow Connector 41">
             <a:extLst>
               <a:ext uri="{FF2B5EF4-FFF2-40B4-BE49-F238E27FC236}">
-                <a16:creationId xmlns:a16="http://schemas.microsoft.com/office/drawing/2014/main" id="{AE9F3928-6603-4F44-B87F-D5568E789A51}"/>
+                <a16:creationId xmlns:a16="http://schemas.microsoft.com/office/drawing/2014/main" xmlns="" id="{AE9F3928-6603-4F44-B87F-D5568E789A51}"/>
               </a:ext>
             </a:extLst>
           </p:cNvPr>
@@ -39769,7 +39876,7 @@
           <p:cNvPr id="13" name="Rectangle 12">
             <a:extLst>
               <a:ext uri="{FF2B5EF4-FFF2-40B4-BE49-F238E27FC236}">
-                <a16:creationId xmlns:a16="http://schemas.microsoft.com/office/drawing/2014/main" id="{BE9850A2-3BDB-4A68-BCBD-94C436747806}"/>
+                <a16:creationId xmlns:a16="http://schemas.microsoft.com/office/drawing/2014/main" xmlns="" id="{BE9850A2-3BDB-4A68-BCBD-94C436747806}"/>
               </a:ext>
             </a:extLst>
           </p:cNvPr>
@@ -39835,7 +39942,7 @@
           <p:cNvPr id="44" name="Folded Corner 14">
             <a:extLst>
               <a:ext uri="{FF2B5EF4-FFF2-40B4-BE49-F238E27FC236}">
-                <a16:creationId xmlns:a16="http://schemas.microsoft.com/office/drawing/2014/main" id="{048A78E4-38F4-403F-B262-3393CB25026A}"/>
+                <a16:creationId xmlns:a16="http://schemas.microsoft.com/office/drawing/2014/main" xmlns="" id="{048A78E4-38F4-403F-B262-3393CB25026A}"/>
               </a:ext>
             </a:extLst>
           </p:cNvPr>
@@ -39884,7 +39991,7 @@
           <p:cNvPr id="45" name="Rectangle 44">
             <a:extLst>
               <a:ext uri="{FF2B5EF4-FFF2-40B4-BE49-F238E27FC236}">
-                <a16:creationId xmlns:a16="http://schemas.microsoft.com/office/drawing/2014/main" id="{B6EF94B6-C2BD-4454-B081-DC4CDC0FA78B}"/>
+                <a16:creationId xmlns:a16="http://schemas.microsoft.com/office/drawing/2014/main" xmlns="" id="{B6EF94B6-C2BD-4454-B081-DC4CDC0FA78B}"/>
               </a:ext>
             </a:extLst>
           </p:cNvPr>
@@ -39936,7 +40043,7 @@
           <p:cNvPr id="14" name="Rectangle 13">
             <a:extLst>
               <a:ext uri="{FF2B5EF4-FFF2-40B4-BE49-F238E27FC236}">
-                <a16:creationId xmlns:a16="http://schemas.microsoft.com/office/drawing/2014/main" id="{9F89B982-51DA-4A7B-B50E-BA08031E2C12}"/>
+                <a16:creationId xmlns:a16="http://schemas.microsoft.com/office/drawing/2014/main" xmlns="" id="{9F89B982-51DA-4A7B-B50E-BA08031E2C12}"/>
               </a:ext>
             </a:extLst>
           </p:cNvPr>
@@ -39974,7 +40081,7 @@
           <p:cNvPr id="15" name="Rectangle 14">
             <a:extLst>
               <a:ext uri="{FF2B5EF4-FFF2-40B4-BE49-F238E27FC236}">
-                <a16:creationId xmlns:a16="http://schemas.microsoft.com/office/drawing/2014/main" id="{4F318F00-3DF3-4DD0-9F9C-3D2FB2746086}"/>
+                <a16:creationId xmlns:a16="http://schemas.microsoft.com/office/drawing/2014/main" xmlns="" id="{4F318F00-3DF3-4DD0-9F9C-3D2FB2746086}"/>
               </a:ext>
             </a:extLst>
           </p:cNvPr>
@@ -40012,7 +40119,7 @@
           <p:cNvPr id="48" name="Rectangle 47">
             <a:extLst>
               <a:ext uri="{FF2B5EF4-FFF2-40B4-BE49-F238E27FC236}">
-                <a16:creationId xmlns:a16="http://schemas.microsoft.com/office/drawing/2014/main" id="{4B4F362E-13BC-4500-8556-53A8FC39D0B9}"/>
+                <a16:creationId xmlns:a16="http://schemas.microsoft.com/office/drawing/2014/main" xmlns="" id="{4B4F362E-13BC-4500-8556-53A8FC39D0B9}"/>
               </a:ext>
             </a:extLst>
           </p:cNvPr>
@@ -40050,7 +40157,7 @@
           <p:cNvPr id="17" name="Rectangle 16">
             <a:extLst>
               <a:ext uri="{FF2B5EF4-FFF2-40B4-BE49-F238E27FC236}">
-                <a16:creationId xmlns:a16="http://schemas.microsoft.com/office/drawing/2014/main" id="{E971B6A2-9BA5-482C-991E-4489D5C190FD}"/>
+                <a16:creationId xmlns:a16="http://schemas.microsoft.com/office/drawing/2014/main" xmlns="" id="{E971B6A2-9BA5-482C-991E-4489D5C190FD}"/>
               </a:ext>
             </a:extLst>
           </p:cNvPr>
@@ -40088,7 +40195,7 @@
           <p:cNvPr id="52" name="Rectangle 51">
             <a:extLst>
               <a:ext uri="{FF2B5EF4-FFF2-40B4-BE49-F238E27FC236}">
-                <a16:creationId xmlns:a16="http://schemas.microsoft.com/office/drawing/2014/main" id="{99534692-59D2-4947-83E0-D4E8E4591FD6}"/>
+                <a16:creationId xmlns:a16="http://schemas.microsoft.com/office/drawing/2014/main" xmlns="" id="{99534692-59D2-4947-83E0-D4E8E4591FD6}"/>
               </a:ext>
             </a:extLst>
           </p:cNvPr>
@@ -40216,7 +40323,7 @@
           <p:cNvPr id="5" name="Oval 4">
             <a:extLst>
               <a:ext uri="{FF2B5EF4-FFF2-40B4-BE49-F238E27FC236}">
-                <a16:creationId xmlns:a16="http://schemas.microsoft.com/office/drawing/2014/main" id="{1BE905D4-A72F-472F-85B9-E5262CB9A9BA}"/>
+                <a16:creationId xmlns:a16="http://schemas.microsoft.com/office/drawing/2014/main" xmlns="" id="{1BE905D4-A72F-472F-85B9-E5262CB9A9BA}"/>
               </a:ext>
             </a:extLst>
           </p:cNvPr>
@@ -40268,7 +40375,7 @@
           <p:cNvPr id="6" name="Oval 5">
             <a:extLst>
               <a:ext uri="{FF2B5EF4-FFF2-40B4-BE49-F238E27FC236}">
-                <a16:creationId xmlns:a16="http://schemas.microsoft.com/office/drawing/2014/main" id="{DA8FA223-F814-41D8-8A8C-99F6794FF949}"/>
+                <a16:creationId xmlns:a16="http://schemas.microsoft.com/office/drawing/2014/main" xmlns="" id="{DA8FA223-F814-41D8-8A8C-99F6794FF949}"/>
               </a:ext>
             </a:extLst>
           </p:cNvPr>
@@ -40320,7 +40427,7 @@
           <p:cNvPr id="7" name="Oval 6">
             <a:extLst>
               <a:ext uri="{FF2B5EF4-FFF2-40B4-BE49-F238E27FC236}">
-                <a16:creationId xmlns:a16="http://schemas.microsoft.com/office/drawing/2014/main" id="{2C06C390-1650-43A9-92CD-878AF82A2EDE}"/>
+                <a16:creationId xmlns:a16="http://schemas.microsoft.com/office/drawing/2014/main" xmlns="" id="{2C06C390-1650-43A9-92CD-878AF82A2EDE}"/>
               </a:ext>
             </a:extLst>
           </p:cNvPr>
@@ -40372,7 +40479,7 @@
           <p:cNvPr id="8" name="Rectangle 7">
             <a:extLst>
               <a:ext uri="{FF2B5EF4-FFF2-40B4-BE49-F238E27FC236}">
-                <a16:creationId xmlns:a16="http://schemas.microsoft.com/office/drawing/2014/main" id="{42BB545C-B9B2-4B88-A085-D7573212A8A6}"/>
+                <a16:creationId xmlns:a16="http://schemas.microsoft.com/office/drawing/2014/main" xmlns="" id="{42BB545C-B9B2-4B88-A085-D7573212A8A6}"/>
               </a:ext>
             </a:extLst>
           </p:cNvPr>
@@ -40411,7 +40518,7 @@
           <p:cNvPr id="9" name="Rectangle 8">
             <a:extLst>
               <a:ext uri="{FF2B5EF4-FFF2-40B4-BE49-F238E27FC236}">
-                <a16:creationId xmlns:a16="http://schemas.microsoft.com/office/drawing/2014/main" id="{822A8BCF-BF7A-45F3-AEB2-2A8B87E5DD2B}"/>
+                <a16:creationId xmlns:a16="http://schemas.microsoft.com/office/drawing/2014/main" xmlns="" id="{822A8BCF-BF7A-45F3-AEB2-2A8B87E5DD2B}"/>
               </a:ext>
             </a:extLst>
           </p:cNvPr>
@@ -40450,7 +40557,7 @@
           <p:cNvPr id="10" name="Rectangle 9">
             <a:extLst>
               <a:ext uri="{FF2B5EF4-FFF2-40B4-BE49-F238E27FC236}">
-                <a16:creationId xmlns:a16="http://schemas.microsoft.com/office/drawing/2014/main" id="{37CDA193-5920-4DBA-9F62-8C8CE4AE6FFB}"/>
+                <a16:creationId xmlns:a16="http://schemas.microsoft.com/office/drawing/2014/main" xmlns="" id="{37CDA193-5920-4DBA-9F62-8C8CE4AE6FFB}"/>
               </a:ext>
             </a:extLst>
           </p:cNvPr>
@@ -40816,7 +40923,7 @@
   <a:extraClrSchemeLst/>
   <a:extLst>
     <a:ext uri="{05A4C25C-085E-4340-85A3-A5531E510DB2}">
-      <thm15:themeFamily xmlns:thm15="http://schemas.microsoft.com/office/thememl/2012/main" name="Office Theme" id="{62F939B6-93AF-4DB8-9C6B-D6C7DFDC589F}" vid="{4A3C46E8-61CC-4603-A589-7422A47A8E4A}"/>
+      <thm15:themeFamily xmlns:thm15="http://schemas.microsoft.com/office/thememl/2012/main" xmlns="" name="Office Theme" id="{62F939B6-93AF-4DB8-9C6B-D6C7DFDC589F}" vid="{4A3C46E8-61CC-4603-A589-7422A47A8E4A}"/>
     </a:ext>
   </a:extLst>
 </a:theme>

</xml_diff>

<commit_message>
Fixed issue in market example figure
</commit_message>
<xml_diff>
--- a/project/rumble/etsa02_figures.pptx
+++ b/project/rumble/etsa02_figures.pptx
@@ -133,7 +133,7 @@
       </p14:sectionLst>
     </p:ext>
     <p:ext uri="{EFAFB233-063F-42B5-8137-9DF3F51BA10A}">
-      <p15:sldGuideLst xmlns:p15="http://schemas.microsoft.com/office/powerpoint/2012/main" xmlns="">
+      <p15:sldGuideLst xmlns:p15="http://schemas.microsoft.com/office/powerpoint/2012/main">
         <p15:guide id="1" orient="horz" pos="2160" userDrawn="1">
           <p15:clr>
             <a:srgbClr val="A4A3A4"/>
@@ -148,10 +148,6 @@
     </p:ext>
   </p:extLst>
 </p:presentation>
-</file>
-
-<file path=ppt/revisionInfo.xml><?xml version="1.0" encoding="utf-8"?>
-<p1510:revInfo xmlns:a="http://schemas.openxmlformats.org/drawingml/2006/main" xmlns:r="http://schemas.openxmlformats.org/officeDocument/2006/relationships" xmlns:p1510="http://schemas.microsoft.com/office/powerpoint/2015/10/main"/>
 </file>
 
 <file path=ppt/diagrams/colors1.xml><?xml version="1.0" encoding="utf-8"?>
@@ -3517,13 +3513,6 @@
         </dgm:presLayoutVars>
       </dgm:prSet>
       <dgm:spPr/>
-      <dgm:t>
-        <a:bodyPr/>
-        <a:lstStyle/>
-        <a:p>
-          <a:endParaRPr lang="sv-SE"/>
-        </a:p>
-      </dgm:t>
     </dgm:pt>
     <dgm:pt modelId="{C85ED1F6-1417-4DD8-9F0B-B522CDE30503}" type="pres">
       <dgm:prSet presAssocID="{A79E2A2D-7F2D-43CD-89C5-4F06702239C7}" presName="Accent1" presStyleCnt="0"/>
@@ -3542,13 +3531,6 @@
         </dgm:presLayoutVars>
       </dgm:prSet>
       <dgm:spPr/>
-      <dgm:t>
-        <a:bodyPr/>
-        <a:lstStyle/>
-        <a:p>
-          <a:endParaRPr lang="sv-SE"/>
-        </a:p>
-      </dgm:t>
     </dgm:pt>
     <dgm:pt modelId="{9E66601F-5507-4159-89CD-FE8318C483CA}" type="pres">
       <dgm:prSet presAssocID="{3A128CF5-9AE7-4EAC-9485-E88F8BE77004}" presName="Accent2" presStyleCnt="0"/>
@@ -3567,13 +3549,6 @@
         </dgm:presLayoutVars>
       </dgm:prSet>
       <dgm:spPr/>
-      <dgm:t>
-        <a:bodyPr/>
-        <a:lstStyle/>
-        <a:p>
-          <a:endParaRPr lang="sv-SE"/>
-        </a:p>
-      </dgm:t>
     </dgm:pt>
     <dgm:pt modelId="{2D7E4C0B-382B-42B1-A371-45C4C315ACE4}" type="pres">
       <dgm:prSet presAssocID="{3E974AE7-F6F7-44CE-AA7A-02FBDD58B1F1}" presName="Accent3" presStyleCnt="0"/>
@@ -3592,23 +3567,16 @@
         </dgm:presLayoutVars>
       </dgm:prSet>
       <dgm:spPr/>
-      <dgm:t>
-        <a:bodyPr/>
-        <a:lstStyle/>
-        <a:p>
-          <a:endParaRPr lang="sv-SE"/>
-        </a:p>
-      </dgm:t>
     </dgm:pt>
   </dgm:ptLst>
   <dgm:cxnLst>
     <dgm:cxn modelId="{DEA8841A-7F97-4B12-B19D-7DBC9CCCA6CA}" type="presOf" srcId="{A79E2A2D-7F2D-43CD-89C5-4F06702239C7}" destId="{DE40A598-37E1-4A8B-B30A-361891655E32}" srcOrd="0" destOrd="0" presId="urn:microsoft.com/office/officeart/2009/layout/CircleArrowProcess"/>
+    <dgm:cxn modelId="{D240A36B-F62A-4C70-9CAD-58226B0BD43D}" srcId="{E967B93F-BC7F-4FB4-BC87-6392A0B631BD}" destId="{3E974AE7-F6F7-44CE-AA7A-02FBDD58B1F1}" srcOrd="2" destOrd="0" parTransId="{0B1B9D87-069F-4C74-8A0B-950CD6773332}" sibTransId="{73096607-54D9-4500-9B80-0F6BD95D4725}"/>
+    <dgm:cxn modelId="{801CC257-8EC3-43DF-8DA1-6CFC36AAD2A3}" srcId="{E967B93F-BC7F-4FB4-BC87-6392A0B631BD}" destId="{3A128CF5-9AE7-4EAC-9485-E88F8BE77004}" srcOrd="1" destOrd="0" parTransId="{8B28C7C3-F1D0-4BA1-9C4B-79E975C3D84A}" sibTransId="{6842B30A-4C8A-4177-9D91-676F7D95EFE3}"/>
+    <dgm:cxn modelId="{157A1A7C-BF9C-4030-A3D2-FC015CDAB6FE}" srcId="{E967B93F-BC7F-4FB4-BC87-6392A0B631BD}" destId="{A79E2A2D-7F2D-43CD-89C5-4F06702239C7}" srcOrd="0" destOrd="0" parTransId="{80084990-0EF9-4F24-80B5-B857B4647FC3}" sibTransId="{56F09064-C6D9-41DF-9B01-CB0B167CEDEB}"/>
     <dgm:cxn modelId="{E919CC95-27B8-4C68-8343-831B7888018A}" type="presOf" srcId="{3A128CF5-9AE7-4EAC-9485-E88F8BE77004}" destId="{FF94DD58-C0AC-4F2E-B336-D810E8C84263}" srcOrd="0" destOrd="0" presId="urn:microsoft.com/office/officeart/2009/layout/CircleArrowProcess"/>
     <dgm:cxn modelId="{EAD55AA6-A136-4C50-8B79-CC6B400CC981}" type="presOf" srcId="{E967B93F-BC7F-4FB4-BC87-6392A0B631BD}" destId="{71406755-23F2-4109-BA41-146F988774CB}" srcOrd="0" destOrd="0" presId="urn:microsoft.com/office/officeart/2009/layout/CircleArrowProcess"/>
     <dgm:cxn modelId="{3F5E1DE0-0383-48CC-9203-6C9AD5C5267D}" type="presOf" srcId="{3E974AE7-F6F7-44CE-AA7A-02FBDD58B1F1}" destId="{90083342-A34C-49F2-A9E2-A7E389073F00}" srcOrd="0" destOrd="0" presId="urn:microsoft.com/office/officeart/2009/layout/CircleArrowProcess"/>
-    <dgm:cxn modelId="{157A1A7C-BF9C-4030-A3D2-FC015CDAB6FE}" srcId="{E967B93F-BC7F-4FB4-BC87-6392A0B631BD}" destId="{A79E2A2D-7F2D-43CD-89C5-4F06702239C7}" srcOrd="0" destOrd="0" parTransId="{80084990-0EF9-4F24-80B5-B857B4647FC3}" sibTransId="{56F09064-C6D9-41DF-9B01-CB0B167CEDEB}"/>
-    <dgm:cxn modelId="{D240A36B-F62A-4C70-9CAD-58226B0BD43D}" srcId="{E967B93F-BC7F-4FB4-BC87-6392A0B631BD}" destId="{3E974AE7-F6F7-44CE-AA7A-02FBDD58B1F1}" srcOrd="2" destOrd="0" parTransId="{0B1B9D87-069F-4C74-8A0B-950CD6773332}" sibTransId="{73096607-54D9-4500-9B80-0F6BD95D4725}"/>
-    <dgm:cxn modelId="{801CC257-8EC3-43DF-8DA1-6CFC36AAD2A3}" srcId="{E967B93F-BC7F-4FB4-BC87-6392A0B631BD}" destId="{3A128CF5-9AE7-4EAC-9485-E88F8BE77004}" srcOrd="1" destOrd="0" parTransId="{8B28C7C3-F1D0-4BA1-9C4B-79E975C3D84A}" sibTransId="{6842B30A-4C8A-4177-9D91-676F7D95EFE3}"/>
     <dgm:cxn modelId="{CF176182-E8A3-4225-A216-451BAF65A36F}" type="presParOf" srcId="{71406755-23F2-4109-BA41-146F988774CB}" destId="{C85ED1F6-1417-4DD8-9F0B-B522CDE30503}" srcOrd="0" destOrd="0" presId="urn:microsoft.com/office/officeart/2009/layout/CircleArrowProcess"/>
     <dgm:cxn modelId="{981AAF99-5CEA-4325-83DB-F7B976729878}" type="presParOf" srcId="{C85ED1F6-1417-4DD8-9F0B-B522CDE30503}" destId="{C215277F-04B7-4D4C-9F84-0EFFD842F138}" srcOrd="0" destOrd="0" presId="urn:microsoft.com/office/officeart/2009/layout/CircleArrowProcess"/>
     <dgm:cxn modelId="{0382EFEC-3211-418D-AAB6-6AFF1D404234}" type="presParOf" srcId="{71406755-23F2-4109-BA41-146F988774CB}" destId="{DE40A598-37E1-4A8B-B30A-361891655E32}" srcOrd="1" destOrd="0" presId="urn:microsoft.com/office/officeart/2009/layout/CircleArrowProcess"/>
@@ -3764,13 +3732,6 @@
         </dgm:presLayoutVars>
       </dgm:prSet>
       <dgm:spPr/>
-      <dgm:t>
-        <a:bodyPr/>
-        <a:lstStyle/>
-        <a:p>
-          <a:endParaRPr lang="sv-SE"/>
-        </a:p>
-      </dgm:t>
     </dgm:pt>
     <dgm:pt modelId="{C85ED1F6-1417-4DD8-9F0B-B522CDE30503}" type="pres">
       <dgm:prSet presAssocID="{A79E2A2D-7F2D-43CD-89C5-4F06702239C7}" presName="Accent1" presStyleCnt="0"/>
@@ -3789,13 +3750,6 @@
         </dgm:presLayoutVars>
       </dgm:prSet>
       <dgm:spPr/>
-      <dgm:t>
-        <a:bodyPr/>
-        <a:lstStyle/>
-        <a:p>
-          <a:endParaRPr lang="sv-SE"/>
-        </a:p>
-      </dgm:t>
     </dgm:pt>
     <dgm:pt modelId="{9E66601F-5507-4159-89CD-FE8318C483CA}" type="pres">
       <dgm:prSet presAssocID="{3A128CF5-9AE7-4EAC-9485-E88F8BE77004}" presName="Accent2" presStyleCnt="0"/>
@@ -3814,13 +3768,6 @@
         </dgm:presLayoutVars>
       </dgm:prSet>
       <dgm:spPr/>
-      <dgm:t>
-        <a:bodyPr/>
-        <a:lstStyle/>
-        <a:p>
-          <a:endParaRPr lang="sv-SE"/>
-        </a:p>
-      </dgm:t>
     </dgm:pt>
     <dgm:pt modelId="{2D7E4C0B-382B-42B1-A371-45C4C315ACE4}" type="pres">
       <dgm:prSet presAssocID="{3E974AE7-F6F7-44CE-AA7A-02FBDD58B1F1}" presName="Accent3" presStyleCnt="0"/>
@@ -3839,23 +3786,16 @@
         </dgm:presLayoutVars>
       </dgm:prSet>
       <dgm:spPr/>
-      <dgm:t>
-        <a:bodyPr/>
-        <a:lstStyle/>
-        <a:p>
-          <a:endParaRPr lang="sv-SE"/>
-        </a:p>
-      </dgm:t>
     </dgm:pt>
   </dgm:ptLst>
   <dgm:cxnLst>
     <dgm:cxn modelId="{DEA8841A-7F97-4B12-B19D-7DBC9CCCA6CA}" type="presOf" srcId="{A79E2A2D-7F2D-43CD-89C5-4F06702239C7}" destId="{DE40A598-37E1-4A8B-B30A-361891655E32}" srcOrd="0" destOrd="0" presId="urn:microsoft.com/office/officeart/2009/layout/CircleArrowProcess"/>
+    <dgm:cxn modelId="{D240A36B-F62A-4C70-9CAD-58226B0BD43D}" srcId="{E967B93F-BC7F-4FB4-BC87-6392A0B631BD}" destId="{3E974AE7-F6F7-44CE-AA7A-02FBDD58B1F1}" srcOrd="2" destOrd="0" parTransId="{0B1B9D87-069F-4C74-8A0B-950CD6773332}" sibTransId="{73096607-54D9-4500-9B80-0F6BD95D4725}"/>
+    <dgm:cxn modelId="{801CC257-8EC3-43DF-8DA1-6CFC36AAD2A3}" srcId="{E967B93F-BC7F-4FB4-BC87-6392A0B631BD}" destId="{3A128CF5-9AE7-4EAC-9485-E88F8BE77004}" srcOrd="1" destOrd="0" parTransId="{8B28C7C3-F1D0-4BA1-9C4B-79E975C3D84A}" sibTransId="{6842B30A-4C8A-4177-9D91-676F7D95EFE3}"/>
+    <dgm:cxn modelId="{157A1A7C-BF9C-4030-A3D2-FC015CDAB6FE}" srcId="{E967B93F-BC7F-4FB4-BC87-6392A0B631BD}" destId="{A79E2A2D-7F2D-43CD-89C5-4F06702239C7}" srcOrd="0" destOrd="0" parTransId="{80084990-0EF9-4F24-80B5-B857B4647FC3}" sibTransId="{56F09064-C6D9-41DF-9B01-CB0B167CEDEB}"/>
     <dgm:cxn modelId="{E919CC95-27B8-4C68-8343-831B7888018A}" type="presOf" srcId="{3A128CF5-9AE7-4EAC-9485-E88F8BE77004}" destId="{FF94DD58-C0AC-4F2E-B336-D810E8C84263}" srcOrd="0" destOrd="0" presId="urn:microsoft.com/office/officeart/2009/layout/CircleArrowProcess"/>
     <dgm:cxn modelId="{EAD55AA6-A136-4C50-8B79-CC6B400CC981}" type="presOf" srcId="{E967B93F-BC7F-4FB4-BC87-6392A0B631BD}" destId="{71406755-23F2-4109-BA41-146F988774CB}" srcOrd="0" destOrd="0" presId="urn:microsoft.com/office/officeart/2009/layout/CircleArrowProcess"/>
     <dgm:cxn modelId="{3F5E1DE0-0383-48CC-9203-6C9AD5C5267D}" type="presOf" srcId="{3E974AE7-F6F7-44CE-AA7A-02FBDD58B1F1}" destId="{90083342-A34C-49F2-A9E2-A7E389073F00}" srcOrd="0" destOrd="0" presId="urn:microsoft.com/office/officeart/2009/layout/CircleArrowProcess"/>
-    <dgm:cxn modelId="{157A1A7C-BF9C-4030-A3D2-FC015CDAB6FE}" srcId="{E967B93F-BC7F-4FB4-BC87-6392A0B631BD}" destId="{A79E2A2D-7F2D-43CD-89C5-4F06702239C7}" srcOrd="0" destOrd="0" parTransId="{80084990-0EF9-4F24-80B5-B857B4647FC3}" sibTransId="{56F09064-C6D9-41DF-9B01-CB0B167CEDEB}"/>
-    <dgm:cxn modelId="{D240A36B-F62A-4C70-9CAD-58226B0BD43D}" srcId="{E967B93F-BC7F-4FB4-BC87-6392A0B631BD}" destId="{3E974AE7-F6F7-44CE-AA7A-02FBDD58B1F1}" srcOrd="2" destOrd="0" parTransId="{0B1B9D87-069F-4C74-8A0B-950CD6773332}" sibTransId="{73096607-54D9-4500-9B80-0F6BD95D4725}"/>
-    <dgm:cxn modelId="{801CC257-8EC3-43DF-8DA1-6CFC36AAD2A3}" srcId="{E967B93F-BC7F-4FB4-BC87-6392A0B631BD}" destId="{3A128CF5-9AE7-4EAC-9485-E88F8BE77004}" srcOrd="1" destOrd="0" parTransId="{8B28C7C3-F1D0-4BA1-9C4B-79E975C3D84A}" sibTransId="{6842B30A-4C8A-4177-9D91-676F7D95EFE3}"/>
     <dgm:cxn modelId="{CF176182-E8A3-4225-A216-451BAF65A36F}" type="presParOf" srcId="{71406755-23F2-4109-BA41-146F988774CB}" destId="{C85ED1F6-1417-4DD8-9F0B-B522CDE30503}" srcOrd="0" destOrd="0" presId="urn:microsoft.com/office/officeart/2009/layout/CircleArrowProcess"/>
     <dgm:cxn modelId="{981AAF99-5CEA-4325-83DB-F7B976729878}" type="presParOf" srcId="{C85ED1F6-1417-4DD8-9F0B-B522CDE30503}" destId="{C215277F-04B7-4D4C-9F84-0EFFD842F138}" srcOrd="0" destOrd="0" presId="urn:microsoft.com/office/officeart/2009/layout/CircleArrowProcess"/>
     <dgm:cxn modelId="{0382EFEC-3211-418D-AAB6-6AFF1D404234}" type="presParOf" srcId="{71406755-23F2-4109-BA41-146F988774CB}" destId="{DE40A598-37E1-4A8B-B30A-361891655E32}" srcOrd="1" destOrd="0" presId="urn:microsoft.com/office/officeart/2009/layout/CircleArrowProcess"/>
@@ -4011,13 +3951,6 @@
         </dgm:presLayoutVars>
       </dgm:prSet>
       <dgm:spPr/>
-      <dgm:t>
-        <a:bodyPr/>
-        <a:lstStyle/>
-        <a:p>
-          <a:endParaRPr lang="sv-SE"/>
-        </a:p>
-      </dgm:t>
     </dgm:pt>
     <dgm:pt modelId="{C85ED1F6-1417-4DD8-9F0B-B522CDE30503}" type="pres">
       <dgm:prSet presAssocID="{A79E2A2D-7F2D-43CD-89C5-4F06702239C7}" presName="Accent1" presStyleCnt="0"/>
@@ -4036,13 +3969,6 @@
         </dgm:presLayoutVars>
       </dgm:prSet>
       <dgm:spPr/>
-      <dgm:t>
-        <a:bodyPr/>
-        <a:lstStyle/>
-        <a:p>
-          <a:endParaRPr lang="sv-SE"/>
-        </a:p>
-      </dgm:t>
     </dgm:pt>
     <dgm:pt modelId="{9E66601F-5507-4159-89CD-FE8318C483CA}" type="pres">
       <dgm:prSet presAssocID="{3A128CF5-9AE7-4EAC-9485-E88F8BE77004}" presName="Accent2" presStyleCnt="0"/>
@@ -4061,13 +3987,6 @@
         </dgm:presLayoutVars>
       </dgm:prSet>
       <dgm:spPr/>
-      <dgm:t>
-        <a:bodyPr/>
-        <a:lstStyle/>
-        <a:p>
-          <a:endParaRPr lang="sv-SE"/>
-        </a:p>
-      </dgm:t>
     </dgm:pt>
     <dgm:pt modelId="{2D7E4C0B-382B-42B1-A371-45C4C315ACE4}" type="pres">
       <dgm:prSet presAssocID="{3E974AE7-F6F7-44CE-AA7A-02FBDD58B1F1}" presName="Accent3" presStyleCnt="0"/>
@@ -4086,23 +4005,16 @@
         </dgm:presLayoutVars>
       </dgm:prSet>
       <dgm:spPr/>
-      <dgm:t>
-        <a:bodyPr/>
-        <a:lstStyle/>
-        <a:p>
-          <a:endParaRPr lang="sv-SE"/>
-        </a:p>
-      </dgm:t>
     </dgm:pt>
   </dgm:ptLst>
   <dgm:cxnLst>
     <dgm:cxn modelId="{103B3A60-C213-4827-853E-FA5096CF201C}" type="presOf" srcId="{3E974AE7-F6F7-44CE-AA7A-02FBDD58B1F1}" destId="{90083342-A34C-49F2-A9E2-A7E389073F00}" srcOrd="0" destOrd="0" presId="urn:microsoft.com/office/officeart/2009/layout/CircleArrowProcess"/>
-    <dgm:cxn modelId="{157A1A7C-BF9C-4030-A3D2-FC015CDAB6FE}" srcId="{E967B93F-BC7F-4FB4-BC87-6392A0B631BD}" destId="{A79E2A2D-7F2D-43CD-89C5-4F06702239C7}" srcOrd="0" destOrd="0" parTransId="{80084990-0EF9-4F24-80B5-B857B4647FC3}" sibTransId="{56F09064-C6D9-41DF-9B01-CB0B167CEDEB}"/>
-    <dgm:cxn modelId="{278F84EA-CF0B-414C-B45F-94E89A5CD16B}" type="presOf" srcId="{E967B93F-BC7F-4FB4-BC87-6392A0B631BD}" destId="{71406755-23F2-4109-BA41-146F988774CB}" srcOrd="0" destOrd="0" presId="urn:microsoft.com/office/officeart/2009/layout/CircleArrowProcess"/>
-    <dgm:cxn modelId="{2819B5DB-1C08-447F-82FA-A53AB9AA54A5}" type="presOf" srcId="{A79E2A2D-7F2D-43CD-89C5-4F06702239C7}" destId="{DE40A598-37E1-4A8B-B30A-361891655E32}" srcOrd="0" destOrd="0" presId="urn:microsoft.com/office/officeart/2009/layout/CircleArrowProcess"/>
     <dgm:cxn modelId="{3F38DC68-3BC1-4923-B0DA-6ABFD5E441E6}" type="presOf" srcId="{3A128CF5-9AE7-4EAC-9485-E88F8BE77004}" destId="{FF94DD58-C0AC-4F2E-B336-D810E8C84263}" srcOrd="0" destOrd="0" presId="urn:microsoft.com/office/officeart/2009/layout/CircleArrowProcess"/>
     <dgm:cxn modelId="{D240A36B-F62A-4C70-9CAD-58226B0BD43D}" srcId="{E967B93F-BC7F-4FB4-BC87-6392A0B631BD}" destId="{3E974AE7-F6F7-44CE-AA7A-02FBDD58B1F1}" srcOrd="2" destOrd="0" parTransId="{0B1B9D87-069F-4C74-8A0B-950CD6773332}" sibTransId="{73096607-54D9-4500-9B80-0F6BD95D4725}"/>
     <dgm:cxn modelId="{801CC257-8EC3-43DF-8DA1-6CFC36AAD2A3}" srcId="{E967B93F-BC7F-4FB4-BC87-6392A0B631BD}" destId="{3A128CF5-9AE7-4EAC-9485-E88F8BE77004}" srcOrd="1" destOrd="0" parTransId="{8B28C7C3-F1D0-4BA1-9C4B-79E975C3D84A}" sibTransId="{6842B30A-4C8A-4177-9D91-676F7D95EFE3}"/>
+    <dgm:cxn modelId="{157A1A7C-BF9C-4030-A3D2-FC015CDAB6FE}" srcId="{E967B93F-BC7F-4FB4-BC87-6392A0B631BD}" destId="{A79E2A2D-7F2D-43CD-89C5-4F06702239C7}" srcOrd="0" destOrd="0" parTransId="{80084990-0EF9-4F24-80B5-B857B4647FC3}" sibTransId="{56F09064-C6D9-41DF-9B01-CB0B167CEDEB}"/>
+    <dgm:cxn modelId="{2819B5DB-1C08-447F-82FA-A53AB9AA54A5}" type="presOf" srcId="{A79E2A2D-7F2D-43CD-89C5-4F06702239C7}" destId="{DE40A598-37E1-4A8B-B30A-361891655E32}" srcOrd="0" destOrd="0" presId="urn:microsoft.com/office/officeart/2009/layout/CircleArrowProcess"/>
+    <dgm:cxn modelId="{278F84EA-CF0B-414C-B45F-94E89A5CD16B}" type="presOf" srcId="{E967B93F-BC7F-4FB4-BC87-6392A0B631BD}" destId="{71406755-23F2-4109-BA41-146F988774CB}" srcOrd="0" destOrd="0" presId="urn:microsoft.com/office/officeart/2009/layout/CircleArrowProcess"/>
     <dgm:cxn modelId="{A8EAE903-A8CE-4773-BB2B-45A11FE2157D}" type="presParOf" srcId="{71406755-23F2-4109-BA41-146F988774CB}" destId="{C85ED1F6-1417-4DD8-9F0B-B522CDE30503}" srcOrd="0" destOrd="0" presId="urn:microsoft.com/office/officeart/2009/layout/CircleArrowProcess"/>
     <dgm:cxn modelId="{5E39C4BD-E42F-4FDB-A0E9-1E3DEDD2CB3A}" type="presParOf" srcId="{C85ED1F6-1417-4DD8-9F0B-B522CDE30503}" destId="{C215277F-04B7-4D4C-9F84-0EFFD842F138}" srcOrd="0" destOrd="0" presId="urn:microsoft.com/office/officeart/2009/layout/CircleArrowProcess"/>
     <dgm:cxn modelId="{3AD4A5DD-ADC8-48E7-BF40-3415A2B5657A}" type="presParOf" srcId="{71406755-23F2-4109-BA41-146F988774CB}" destId="{DE40A598-37E1-4A8B-B30A-361891655E32}" srcOrd="1" destOrd="0" presId="urn:microsoft.com/office/officeart/2009/layout/CircleArrowProcess"/>
@@ -4258,13 +4170,6 @@
         </dgm:presLayoutVars>
       </dgm:prSet>
       <dgm:spPr/>
-      <dgm:t>
-        <a:bodyPr/>
-        <a:lstStyle/>
-        <a:p>
-          <a:endParaRPr lang="sv-SE"/>
-        </a:p>
-      </dgm:t>
     </dgm:pt>
     <dgm:pt modelId="{C85ED1F6-1417-4DD8-9F0B-B522CDE30503}" type="pres">
       <dgm:prSet presAssocID="{A79E2A2D-7F2D-43CD-89C5-4F06702239C7}" presName="Accent1" presStyleCnt="0"/>
@@ -4283,13 +4188,6 @@
         </dgm:presLayoutVars>
       </dgm:prSet>
       <dgm:spPr/>
-      <dgm:t>
-        <a:bodyPr/>
-        <a:lstStyle/>
-        <a:p>
-          <a:endParaRPr lang="sv-SE"/>
-        </a:p>
-      </dgm:t>
     </dgm:pt>
     <dgm:pt modelId="{9E66601F-5507-4159-89CD-FE8318C483CA}" type="pres">
       <dgm:prSet presAssocID="{3A128CF5-9AE7-4EAC-9485-E88F8BE77004}" presName="Accent2" presStyleCnt="0"/>
@@ -4308,13 +4206,6 @@
         </dgm:presLayoutVars>
       </dgm:prSet>
       <dgm:spPr/>
-      <dgm:t>
-        <a:bodyPr/>
-        <a:lstStyle/>
-        <a:p>
-          <a:endParaRPr lang="sv-SE"/>
-        </a:p>
-      </dgm:t>
     </dgm:pt>
     <dgm:pt modelId="{2D7E4C0B-382B-42B1-A371-45C4C315ACE4}" type="pres">
       <dgm:prSet presAssocID="{3E974AE7-F6F7-44CE-AA7A-02FBDD58B1F1}" presName="Accent3" presStyleCnt="0"/>
@@ -4333,23 +4224,16 @@
         </dgm:presLayoutVars>
       </dgm:prSet>
       <dgm:spPr/>
-      <dgm:t>
-        <a:bodyPr/>
-        <a:lstStyle/>
-        <a:p>
-          <a:endParaRPr lang="sv-SE"/>
-        </a:p>
-      </dgm:t>
     </dgm:pt>
   </dgm:ptLst>
   <dgm:cxnLst>
+    <dgm:cxn modelId="{DAA54803-BAA8-46A2-B693-8800EEF81E2D}" type="presOf" srcId="{3A128CF5-9AE7-4EAC-9485-E88F8BE77004}" destId="{FF94DD58-C0AC-4F2E-B336-D810E8C84263}" srcOrd="0" destOrd="0" presId="urn:microsoft.com/office/officeart/2009/layout/CircleArrowProcess"/>
+    <dgm:cxn modelId="{D92D1413-62FC-4A92-B658-FA81F646084F}" type="presOf" srcId="{E967B93F-BC7F-4FB4-BC87-6392A0B631BD}" destId="{71406755-23F2-4109-BA41-146F988774CB}" srcOrd="0" destOrd="0" presId="urn:microsoft.com/office/officeart/2009/layout/CircleArrowProcess"/>
+    <dgm:cxn modelId="{D240A36B-F62A-4C70-9CAD-58226B0BD43D}" srcId="{E967B93F-BC7F-4FB4-BC87-6392A0B631BD}" destId="{3E974AE7-F6F7-44CE-AA7A-02FBDD58B1F1}" srcOrd="2" destOrd="0" parTransId="{0B1B9D87-069F-4C74-8A0B-950CD6773332}" sibTransId="{73096607-54D9-4500-9B80-0F6BD95D4725}"/>
+    <dgm:cxn modelId="{801CC257-8EC3-43DF-8DA1-6CFC36AAD2A3}" srcId="{E967B93F-BC7F-4FB4-BC87-6392A0B631BD}" destId="{3A128CF5-9AE7-4EAC-9485-E88F8BE77004}" srcOrd="1" destOrd="0" parTransId="{8B28C7C3-F1D0-4BA1-9C4B-79E975C3D84A}" sibTransId="{6842B30A-4C8A-4177-9D91-676F7D95EFE3}"/>
+    <dgm:cxn modelId="{157A1A7C-BF9C-4030-A3D2-FC015CDAB6FE}" srcId="{E967B93F-BC7F-4FB4-BC87-6392A0B631BD}" destId="{A79E2A2D-7F2D-43CD-89C5-4F06702239C7}" srcOrd="0" destOrd="0" parTransId="{80084990-0EF9-4F24-80B5-B857B4647FC3}" sibTransId="{56F09064-C6D9-41DF-9B01-CB0B167CEDEB}"/>
+    <dgm:cxn modelId="{F6128391-6C10-4DB8-8E61-FB636FA7803B}" type="presOf" srcId="{A79E2A2D-7F2D-43CD-89C5-4F06702239C7}" destId="{DE40A598-37E1-4A8B-B30A-361891655E32}" srcOrd="0" destOrd="0" presId="urn:microsoft.com/office/officeart/2009/layout/CircleArrowProcess"/>
     <dgm:cxn modelId="{0CF490D5-4FC5-4FD2-80CA-22AC293CC9C5}" type="presOf" srcId="{3E974AE7-F6F7-44CE-AA7A-02FBDD58B1F1}" destId="{90083342-A34C-49F2-A9E2-A7E389073F00}" srcOrd="0" destOrd="0" presId="urn:microsoft.com/office/officeart/2009/layout/CircleArrowProcess"/>
-    <dgm:cxn modelId="{DAA54803-BAA8-46A2-B693-8800EEF81E2D}" type="presOf" srcId="{3A128CF5-9AE7-4EAC-9485-E88F8BE77004}" destId="{FF94DD58-C0AC-4F2E-B336-D810E8C84263}" srcOrd="0" destOrd="0" presId="urn:microsoft.com/office/officeart/2009/layout/CircleArrowProcess"/>
-    <dgm:cxn modelId="{157A1A7C-BF9C-4030-A3D2-FC015CDAB6FE}" srcId="{E967B93F-BC7F-4FB4-BC87-6392A0B631BD}" destId="{A79E2A2D-7F2D-43CD-89C5-4F06702239C7}" srcOrd="0" destOrd="0" parTransId="{80084990-0EF9-4F24-80B5-B857B4647FC3}" sibTransId="{56F09064-C6D9-41DF-9B01-CB0B167CEDEB}"/>
-    <dgm:cxn modelId="{D240A36B-F62A-4C70-9CAD-58226B0BD43D}" srcId="{E967B93F-BC7F-4FB4-BC87-6392A0B631BD}" destId="{3E974AE7-F6F7-44CE-AA7A-02FBDD58B1F1}" srcOrd="2" destOrd="0" parTransId="{0B1B9D87-069F-4C74-8A0B-950CD6773332}" sibTransId="{73096607-54D9-4500-9B80-0F6BD95D4725}"/>
-    <dgm:cxn modelId="{F6128391-6C10-4DB8-8E61-FB636FA7803B}" type="presOf" srcId="{A79E2A2D-7F2D-43CD-89C5-4F06702239C7}" destId="{DE40A598-37E1-4A8B-B30A-361891655E32}" srcOrd="0" destOrd="0" presId="urn:microsoft.com/office/officeart/2009/layout/CircleArrowProcess"/>
-    <dgm:cxn modelId="{D92D1413-62FC-4A92-B658-FA81F646084F}" type="presOf" srcId="{E967B93F-BC7F-4FB4-BC87-6392A0B631BD}" destId="{71406755-23F2-4109-BA41-146F988774CB}" srcOrd="0" destOrd="0" presId="urn:microsoft.com/office/officeart/2009/layout/CircleArrowProcess"/>
-    <dgm:cxn modelId="{801CC257-8EC3-43DF-8DA1-6CFC36AAD2A3}" srcId="{E967B93F-BC7F-4FB4-BC87-6392A0B631BD}" destId="{3A128CF5-9AE7-4EAC-9485-E88F8BE77004}" srcOrd="1" destOrd="0" parTransId="{8B28C7C3-F1D0-4BA1-9C4B-79E975C3D84A}" sibTransId="{6842B30A-4C8A-4177-9D91-676F7D95EFE3}"/>
     <dgm:cxn modelId="{02AEF925-D09B-4AE5-AB07-5090D9B2AF66}" type="presParOf" srcId="{71406755-23F2-4109-BA41-146F988774CB}" destId="{C85ED1F6-1417-4DD8-9F0B-B522CDE30503}" srcOrd="0" destOrd="0" presId="urn:microsoft.com/office/officeart/2009/layout/CircleArrowProcess"/>
     <dgm:cxn modelId="{02284FAC-3C1A-4BBB-A07D-5028EEF9C545}" type="presParOf" srcId="{C85ED1F6-1417-4DD8-9F0B-B522CDE30503}" destId="{C215277F-04B7-4D4C-9F84-0EFFD842F138}" srcOrd="0" destOrd="0" presId="urn:microsoft.com/office/officeart/2009/layout/CircleArrowProcess"/>
     <dgm:cxn modelId="{262A2359-396F-4B4C-9A19-09B22DF2AB3F}" type="presParOf" srcId="{71406755-23F2-4109-BA41-146F988774CB}" destId="{DE40A598-37E1-4A8B-B30A-361891655E32}" srcOrd="1" destOrd="0" presId="urn:microsoft.com/office/officeart/2009/layout/CircleArrowProcess"/>
@@ -4472,7 +4356,7 @@
         </a:bodyPr>
         <a:lstStyle/>
         <a:p>
-          <a:pPr lvl="0" algn="ctr" defTabSz="1555750">
+          <a:pPr marL="0" lvl="0" indent="0" algn="ctr" defTabSz="1555750">
             <a:lnSpc>
               <a:spcPct val="90000"/>
             </a:lnSpc>
@@ -4482,6 +4366,7 @@
             <a:spcAft>
               <a:spcPct val="35000"/>
             </a:spcAft>
+            <a:buNone/>
           </a:pPr>
           <a:r>
             <a:rPr lang="sv-SE" sz="3500" kern="1200" dirty="0"/>
@@ -4589,7 +4474,7 @@
         </a:bodyPr>
         <a:lstStyle/>
         <a:p>
-          <a:pPr lvl="0" algn="ctr" defTabSz="1555750">
+          <a:pPr marL="0" lvl="0" indent="0" algn="ctr" defTabSz="1555750">
             <a:lnSpc>
               <a:spcPct val="90000"/>
             </a:lnSpc>
@@ -4599,6 +4484,7 @@
             <a:spcAft>
               <a:spcPct val="35000"/>
             </a:spcAft>
+            <a:buNone/>
           </a:pPr>
           <a:r>
             <a:rPr lang="sv-SE" sz="3500" kern="1200" dirty="0"/>
@@ -4704,7 +4590,7 @@
         </a:bodyPr>
         <a:lstStyle/>
         <a:p>
-          <a:pPr lvl="0" algn="ctr" defTabSz="1555750">
+          <a:pPr marL="0" lvl="0" indent="0" algn="ctr" defTabSz="1555750">
             <a:lnSpc>
               <a:spcPct val="90000"/>
             </a:lnSpc>
@@ -4714,6 +4600,7 @@
             <a:spcAft>
               <a:spcPct val="35000"/>
             </a:spcAft>
+            <a:buNone/>
           </a:pPr>
           <a:r>
             <a:rPr lang="sv-SE" sz="3500" kern="1200" dirty="0"/>
@@ -4833,7 +4720,7 @@
         </a:bodyPr>
         <a:lstStyle/>
         <a:p>
-          <a:pPr lvl="0" algn="ctr" defTabSz="1555750">
+          <a:pPr marL="0" lvl="0" indent="0" algn="ctr" defTabSz="1555750">
             <a:lnSpc>
               <a:spcPct val="90000"/>
             </a:lnSpc>
@@ -4843,6 +4730,7 @@
             <a:spcAft>
               <a:spcPct val="35000"/>
             </a:spcAft>
+            <a:buNone/>
           </a:pPr>
           <a:r>
             <a:rPr lang="sv-SE" sz="3500" kern="1200" dirty="0"/>
@@ -4950,7 +4838,7 @@
         </a:bodyPr>
         <a:lstStyle/>
         <a:p>
-          <a:pPr lvl="0" algn="ctr" defTabSz="1555750">
+          <a:pPr marL="0" lvl="0" indent="0" algn="ctr" defTabSz="1555750">
             <a:lnSpc>
               <a:spcPct val="90000"/>
             </a:lnSpc>
@@ -4960,6 +4848,7 @@
             <a:spcAft>
               <a:spcPct val="35000"/>
             </a:spcAft>
+            <a:buNone/>
           </a:pPr>
           <a:r>
             <a:rPr lang="sv-SE" sz="3500" kern="1200" dirty="0"/>
@@ -5065,7 +4954,7 @@
         </a:bodyPr>
         <a:lstStyle/>
         <a:p>
-          <a:pPr lvl="0" algn="ctr" defTabSz="1555750">
+          <a:pPr marL="0" lvl="0" indent="0" algn="ctr" defTabSz="1555750">
             <a:lnSpc>
               <a:spcPct val="90000"/>
             </a:lnSpc>
@@ -5075,6 +4964,7 @@
             <a:spcAft>
               <a:spcPct val="35000"/>
             </a:spcAft>
+            <a:buNone/>
           </a:pPr>
           <a:r>
             <a:rPr lang="sv-SE" sz="3500" kern="1200" dirty="0"/>
@@ -5194,7 +5084,7 @@
         </a:bodyPr>
         <a:lstStyle/>
         <a:p>
-          <a:pPr lvl="0" algn="ctr" defTabSz="1555750">
+          <a:pPr marL="0" lvl="0" indent="0" algn="ctr" defTabSz="1555750">
             <a:lnSpc>
               <a:spcPct val="90000"/>
             </a:lnSpc>
@@ -5204,6 +5094,7 @@
             <a:spcAft>
               <a:spcPct val="35000"/>
             </a:spcAft>
+            <a:buNone/>
           </a:pPr>
           <a:r>
             <a:rPr lang="sv-SE" sz="3500" kern="1200" dirty="0"/>
@@ -5311,7 +5202,7 @@
         </a:bodyPr>
         <a:lstStyle/>
         <a:p>
-          <a:pPr lvl="0" algn="ctr" defTabSz="1555750">
+          <a:pPr marL="0" lvl="0" indent="0" algn="ctr" defTabSz="1555750">
             <a:lnSpc>
               <a:spcPct val="90000"/>
             </a:lnSpc>
@@ -5321,6 +5212,7 @@
             <a:spcAft>
               <a:spcPct val="35000"/>
             </a:spcAft>
+            <a:buNone/>
           </a:pPr>
           <a:r>
             <a:rPr lang="sv-SE" sz="3500" kern="1200" dirty="0"/>
@@ -5426,7 +5318,7 @@
         </a:bodyPr>
         <a:lstStyle/>
         <a:p>
-          <a:pPr lvl="0" algn="ctr" defTabSz="1555750">
+          <a:pPr marL="0" lvl="0" indent="0" algn="ctr" defTabSz="1555750">
             <a:lnSpc>
               <a:spcPct val="90000"/>
             </a:lnSpc>
@@ -5436,6 +5328,7 @@
             <a:spcAft>
               <a:spcPct val="35000"/>
             </a:spcAft>
+            <a:buNone/>
           </a:pPr>
           <a:r>
             <a:rPr lang="sv-SE" sz="3500" kern="1200" dirty="0"/>
@@ -5555,7 +5448,7 @@
         </a:bodyPr>
         <a:lstStyle/>
         <a:p>
-          <a:pPr lvl="0" algn="ctr" defTabSz="1555750">
+          <a:pPr marL="0" lvl="0" indent="0" algn="ctr" defTabSz="1555750">
             <a:lnSpc>
               <a:spcPct val="90000"/>
             </a:lnSpc>
@@ -5565,6 +5458,7 @@
             <a:spcAft>
               <a:spcPct val="35000"/>
             </a:spcAft>
+            <a:buNone/>
           </a:pPr>
           <a:r>
             <a:rPr lang="sv-SE" sz="3500" kern="1200" dirty="0"/>
@@ -5672,7 +5566,7 @@
         </a:bodyPr>
         <a:lstStyle/>
         <a:p>
-          <a:pPr lvl="0" algn="ctr" defTabSz="1555750">
+          <a:pPr marL="0" lvl="0" indent="0" algn="ctr" defTabSz="1555750">
             <a:lnSpc>
               <a:spcPct val="90000"/>
             </a:lnSpc>
@@ -5682,6 +5576,7 @@
             <a:spcAft>
               <a:spcPct val="35000"/>
             </a:spcAft>
+            <a:buNone/>
           </a:pPr>
           <a:r>
             <a:rPr lang="sv-SE" sz="3500" kern="1200" dirty="0"/>
@@ -5787,7 +5682,7 @@
         </a:bodyPr>
         <a:lstStyle/>
         <a:p>
-          <a:pPr lvl="0" algn="ctr" defTabSz="1555750">
+          <a:pPr marL="0" lvl="0" indent="0" algn="ctr" defTabSz="1555750">
             <a:lnSpc>
               <a:spcPct val="90000"/>
             </a:lnSpc>
@@ -5797,6 +5692,7 @@
             <a:spcAft>
               <a:spcPct val="35000"/>
             </a:spcAft>
+            <a:buNone/>
           </a:pPr>
           <a:r>
             <a:rPr lang="sv-SE" sz="3500" kern="1200" dirty="0"/>
@@ -18276,7 +18172,7 @@
           <p:cNvPr id="2" name="Title 1">
             <a:extLst>
               <a:ext uri="{FF2B5EF4-FFF2-40B4-BE49-F238E27FC236}">
-                <a16:creationId xmlns:a16="http://schemas.microsoft.com/office/drawing/2014/main" xmlns="" id="{38809996-FD0E-4D06-9105-CA4D02CD18B8}"/>
+                <a16:creationId xmlns:a16="http://schemas.microsoft.com/office/drawing/2014/main" id="{38809996-FD0E-4D06-9105-CA4D02CD18B8}"/>
               </a:ext>
             </a:extLst>
           </p:cNvPr>
@@ -18313,7 +18209,7 @@
           <p:cNvPr id="3" name="Subtitle 2">
             <a:extLst>
               <a:ext uri="{FF2B5EF4-FFF2-40B4-BE49-F238E27FC236}">
-                <a16:creationId xmlns:a16="http://schemas.microsoft.com/office/drawing/2014/main" xmlns="" id="{F4B5C0B2-8A4C-4F8A-950C-1720ED26E84E}"/>
+                <a16:creationId xmlns:a16="http://schemas.microsoft.com/office/drawing/2014/main" id="{F4B5C0B2-8A4C-4F8A-950C-1720ED26E84E}"/>
               </a:ext>
             </a:extLst>
           </p:cNvPr>
@@ -18383,7 +18279,7 @@
           <p:cNvPr id="4" name="Date Placeholder 3">
             <a:extLst>
               <a:ext uri="{FF2B5EF4-FFF2-40B4-BE49-F238E27FC236}">
-                <a16:creationId xmlns:a16="http://schemas.microsoft.com/office/drawing/2014/main" xmlns="" id="{3F9EBE98-590E-4431-AB5E-9B0B41A8A01E}"/>
+                <a16:creationId xmlns:a16="http://schemas.microsoft.com/office/drawing/2014/main" id="{3F9EBE98-590E-4431-AB5E-9B0B41A8A01E}"/>
               </a:ext>
             </a:extLst>
           </p:cNvPr>
@@ -18401,7 +18297,7 @@
           <a:p>
             <a:fld id="{CACABD52-BF91-4CCE-9EEC-6A02225A646E}" type="datetimeFigureOut">
               <a:rPr lang="en-US" smtClean="0"/>
-              <a:t>2/5/2018</a:t>
+              <a:t>2018-03-08</a:t>
             </a:fld>
             <a:endParaRPr lang="en-US"/>
           </a:p>
@@ -18412,7 +18308,7 @@
           <p:cNvPr id="5" name="Footer Placeholder 4">
             <a:extLst>
               <a:ext uri="{FF2B5EF4-FFF2-40B4-BE49-F238E27FC236}">
-                <a16:creationId xmlns:a16="http://schemas.microsoft.com/office/drawing/2014/main" xmlns="" id="{9079E9AE-9DD9-4CDB-BB86-1AAC9BD03C3A}"/>
+                <a16:creationId xmlns:a16="http://schemas.microsoft.com/office/drawing/2014/main" id="{9079E9AE-9DD9-4CDB-BB86-1AAC9BD03C3A}"/>
               </a:ext>
             </a:extLst>
           </p:cNvPr>
@@ -18437,7 +18333,7 @@
           <p:cNvPr id="6" name="Slide Number Placeholder 5">
             <a:extLst>
               <a:ext uri="{FF2B5EF4-FFF2-40B4-BE49-F238E27FC236}">
-                <a16:creationId xmlns:a16="http://schemas.microsoft.com/office/drawing/2014/main" xmlns="" id="{FC4A9CAB-8CD4-4C79-BA87-3E9312D0C8A8}"/>
+                <a16:creationId xmlns:a16="http://schemas.microsoft.com/office/drawing/2014/main" id="{FC4A9CAB-8CD4-4C79-BA87-3E9312D0C8A8}"/>
               </a:ext>
             </a:extLst>
           </p:cNvPr>
@@ -18496,7 +18392,7 @@
           <p:cNvPr id="2" name="Title 1">
             <a:extLst>
               <a:ext uri="{FF2B5EF4-FFF2-40B4-BE49-F238E27FC236}">
-                <a16:creationId xmlns:a16="http://schemas.microsoft.com/office/drawing/2014/main" xmlns="" id="{44AAC031-47FD-42F7-98FD-EF67FAFD8504}"/>
+                <a16:creationId xmlns:a16="http://schemas.microsoft.com/office/drawing/2014/main" id="{44AAC031-47FD-42F7-98FD-EF67FAFD8504}"/>
               </a:ext>
             </a:extLst>
           </p:cNvPr>
@@ -18524,7 +18420,7 @@
           <p:cNvPr id="3" name="Vertical Text Placeholder 2">
             <a:extLst>
               <a:ext uri="{FF2B5EF4-FFF2-40B4-BE49-F238E27FC236}">
-                <a16:creationId xmlns:a16="http://schemas.microsoft.com/office/drawing/2014/main" xmlns="" id="{F940540A-38C9-42A6-88EE-93C27F9CF251}"/>
+                <a16:creationId xmlns:a16="http://schemas.microsoft.com/office/drawing/2014/main" id="{F940540A-38C9-42A6-88EE-93C27F9CF251}"/>
               </a:ext>
             </a:extLst>
           </p:cNvPr>
@@ -18581,7 +18477,7 @@
           <p:cNvPr id="4" name="Date Placeholder 3">
             <a:extLst>
               <a:ext uri="{FF2B5EF4-FFF2-40B4-BE49-F238E27FC236}">
-                <a16:creationId xmlns:a16="http://schemas.microsoft.com/office/drawing/2014/main" xmlns="" id="{7BBA4C03-528E-42F3-B006-6C00F986D9A0}"/>
+                <a16:creationId xmlns:a16="http://schemas.microsoft.com/office/drawing/2014/main" id="{7BBA4C03-528E-42F3-B006-6C00F986D9A0}"/>
               </a:ext>
             </a:extLst>
           </p:cNvPr>
@@ -18599,7 +18495,7 @@
           <a:p>
             <a:fld id="{CACABD52-BF91-4CCE-9EEC-6A02225A646E}" type="datetimeFigureOut">
               <a:rPr lang="en-US" smtClean="0"/>
-              <a:t>2/5/2018</a:t>
+              <a:t>2018-03-08</a:t>
             </a:fld>
             <a:endParaRPr lang="en-US"/>
           </a:p>
@@ -18610,7 +18506,7 @@
           <p:cNvPr id="5" name="Footer Placeholder 4">
             <a:extLst>
               <a:ext uri="{FF2B5EF4-FFF2-40B4-BE49-F238E27FC236}">
-                <a16:creationId xmlns:a16="http://schemas.microsoft.com/office/drawing/2014/main" xmlns="" id="{ED8875F2-E3C5-4AE4-A309-0392C9C665F7}"/>
+                <a16:creationId xmlns:a16="http://schemas.microsoft.com/office/drawing/2014/main" id="{ED8875F2-E3C5-4AE4-A309-0392C9C665F7}"/>
               </a:ext>
             </a:extLst>
           </p:cNvPr>
@@ -18635,7 +18531,7 @@
           <p:cNvPr id="6" name="Slide Number Placeholder 5">
             <a:extLst>
               <a:ext uri="{FF2B5EF4-FFF2-40B4-BE49-F238E27FC236}">
-                <a16:creationId xmlns:a16="http://schemas.microsoft.com/office/drawing/2014/main" xmlns="" id="{59901938-1E8B-4CBD-ADCC-73C8496F4D53}"/>
+                <a16:creationId xmlns:a16="http://schemas.microsoft.com/office/drawing/2014/main" id="{59901938-1E8B-4CBD-ADCC-73C8496F4D53}"/>
               </a:ext>
             </a:extLst>
           </p:cNvPr>
@@ -18694,7 +18590,7 @@
           <p:cNvPr id="2" name="Vertical Title 1">
             <a:extLst>
               <a:ext uri="{FF2B5EF4-FFF2-40B4-BE49-F238E27FC236}">
-                <a16:creationId xmlns:a16="http://schemas.microsoft.com/office/drawing/2014/main" xmlns="" id="{9B24AD40-9F90-441E-B3CD-06BCD4159D89}"/>
+                <a16:creationId xmlns:a16="http://schemas.microsoft.com/office/drawing/2014/main" id="{9B24AD40-9F90-441E-B3CD-06BCD4159D89}"/>
               </a:ext>
             </a:extLst>
           </p:cNvPr>
@@ -18727,7 +18623,7 @@
           <p:cNvPr id="3" name="Vertical Text Placeholder 2">
             <a:extLst>
               <a:ext uri="{FF2B5EF4-FFF2-40B4-BE49-F238E27FC236}">
-                <a16:creationId xmlns:a16="http://schemas.microsoft.com/office/drawing/2014/main" xmlns="" id="{B74361D9-50A9-49B2-AADE-3827E420C64B}"/>
+                <a16:creationId xmlns:a16="http://schemas.microsoft.com/office/drawing/2014/main" id="{B74361D9-50A9-49B2-AADE-3827E420C64B}"/>
               </a:ext>
             </a:extLst>
           </p:cNvPr>
@@ -18789,7 +18685,7 @@
           <p:cNvPr id="4" name="Date Placeholder 3">
             <a:extLst>
               <a:ext uri="{FF2B5EF4-FFF2-40B4-BE49-F238E27FC236}">
-                <a16:creationId xmlns:a16="http://schemas.microsoft.com/office/drawing/2014/main" xmlns="" id="{7F22F958-0D54-4BDA-999D-E0C058886540}"/>
+                <a16:creationId xmlns:a16="http://schemas.microsoft.com/office/drawing/2014/main" id="{7F22F958-0D54-4BDA-999D-E0C058886540}"/>
               </a:ext>
             </a:extLst>
           </p:cNvPr>
@@ -18807,7 +18703,7 @@
           <a:p>
             <a:fld id="{CACABD52-BF91-4CCE-9EEC-6A02225A646E}" type="datetimeFigureOut">
               <a:rPr lang="en-US" smtClean="0"/>
-              <a:t>2/5/2018</a:t>
+              <a:t>2018-03-08</a:t>
             </a:fld>
             <a:endParaRPr lang="en-US"/>
           </a:p>
@@ -18818,7 +18714,7 @@
           <p:cNvPr id="5" name="Footer Placeholder 4">
             <a:extLst>
               <a:ext uri="{FF2B5EF4-FFF2-40B4-BE49-F238E27FC236}">
-                <a16:creationId xmlns:a16="http://schemas.microsoft.com/office/drawing/2014/main" xmlns="" id="{D08C878B-2A4A-49CD-99FF-A2D91560EE82}"/>
+                <a16:creationId xmlns:a16="http://schemas.microsoft.com/office/drawing/2014/main" id="{D08C878B-2A4A-49CD-99FF-A2D91560EE82}"/>
               </a:ext>
             </a:extLst>
           </p:cNvPr>
@@ -18843,7 +18739,7 @@
           <p:cNvPr id="6" name="Slide Number Placeholder 5">
             <a:extLst>
               <a:ext uri="{FF2B5EF4-FFF2-40B4-BE49-F238E27FC236}">
-                <a16:creationId xmlns:a16="http://schemas.microsoft.com/office/drawing/2014/main" xmlns="" id="{7F6F18DB-03CB-4B93-A607-07373FECE861}"/>
+                <a16:creationId xmlns:a16="http://schemas.microsoft.com/office/drawing/2014/main" id="{7F6F18DB-03CB-4B93-A607-07373FECE861}"/>
               </a:ext>
             </a:extLst>
           </p:cNvPr>
@@ -18902,7 +18798,7 @@
           <p:cNvPr id="2" name="Title 1">
             <a:extLst>
               <a:ext uri="{FF2B5EF4-FFF2-40B4-BE49-F238E27FC236}">
-                <a16:creationId xmlns:a16="http://schemas.microsoft.com/office/drawing/2014/main" xmlns="" id="{8FB510DB-06DE-4AAA-BDD8-FA07F2218D44}"/>
+                <a16:creationId xmlns:a16="http://schemas.microsoft.com/office/drawing/2014/main" id="{8FB510DB-06DE-4AAA-BDD8-FA07F2218D44}"/>
               </a:ext>
             </a:extLst>
           </p:cNvPr>
@@ -18930,7 +18826,7 @@
           <p:cNvPr id="3" name="Content Placeholder 2">
             <a:extLst>
               <a:ext uri="{FF2B5EF4-FFF2-40B4-BE49-F238E27FC236}">
-                <a16:creationId xmlns:a16="http://schemas.microsoft.com/office/drawing/2014/main" xmlns="" id="{89739ADC-B421-43D0-BE43-47DFF5BFDE19}"/>
+                <a16:creationId xmlns:a16="http://schemas.microsoft.com/office/drawing/2014/main" id="{89739ADC-B421-43D0-BE43-47DFF5BFDE19}"/>
               </a:ext>
             </a:extLst>
           </p:cNvPr>
@@ -18987,7 +18883,7 @@
           <p:cNvPr id="4" name="Date Placeholder 3">
             <a:extLst>
               <a:ext uri="{FF2B5EF4-FFF2-40B4-BE49-F238E27FC236}">
-                <a16:creationId xmlns:a16="http://schemas.microsoft.com/office/drawing/2014/main" xmlns="" id="{1CB7D97A-A3BB-44A1-806C-A8AD62C7278F}"/>
+                <a16:creationId xmlns:a16="http://schemas.microsoft.com/office/drawing/2014/main" id="{1CB7D97A-A3BB-44A1-806C-A8AD62C7278F}"/>
               </a:ext>
             </a:extLst>
           </p:cNvPr>
@@ -19005,7 +18901,7 @@
           <a:p>
             <a:fld id="{CACABD52-BF91-4CCE-9EEC-6A02225A646E}" type="datetimeFigureOut">
               <a:rPr lang="en-US" smtClean="0"/>
-              <a:t>2/5/2018</a:t>
+              <a:t>2018-03-08</a:t>
             </a:fld>
             <a:endParaRPr lang="en-US"/>
           </a:p>
@@ -19016,7 +18912,7 @@
           <p:cNvPr id="5" name="Footer Placeholder 4">
             <a:extLst>
               <a:ext uri="{FF2B5EF4-FFF2-40B4-BE49-F238E27FC236}">
-                <a16:creationId xmlns:a16="http://schemas.microsoft.com/office/drawing/2014/main" xmlns="" id="{7DEAD42F-6AB4-4248-AC38-9039155A9DD0}"/>
+                <a16:creationId xmlns:a16="http://schemas.microsoft.com/office/drawing/2014/main" id="{7DEAD42F-6AB4-4248-AC38-9039155A9DD0}"/>
               </a:ext>
             </a:extLst>
           </p:cNvPr>
@@ -19041,7 +18937,7 @@
           <p:cNvPr id="6" name="Slide Number Placeholder 5">
             <a:extLst>
               <a:ext uri="{FF2B5EF4-FFF2-40B4-BE49-F238E27FC236}">
-                <a16:creationId xmlns:a16="http://schemas.microsoft.com/office/drawing/2014/main" xmlns="" id="{921A2A62-D7C3-461A-B4FA-673F07E09149}"/>
+                <a16:creationId xmlns:a16="http://schemas.microsoft.com/office/drawing/2014/main" id="{921A2A62-D7C3-461A-B4FA-673F07E09149}"/>
               </a:ext>
             </a:extLst>
           </p:cNvPr>
@@ -19100,7 +18996,7 @@
           <p:cNvPr id="2" name="Title 1">
             <a:extLst>
               <a:ext uri="{FF2B5EF4-FFF2-40B4-BE49-F238E27FC236}">
-                <a16:creationId xmlns:a16="http://schemas.microsoft.com/office/drawing/2014/main" xmlns="" id="{D3EC2B89-DE66-4A09-A1A8-0B5FBF95170B}"/>
+                <a16:creationId xmlns:a16="http://schemas.microsoft.com/office/drawing/2014/main" id="{D3EC2B89-DE66-4A09-A1A8-0B5FBF95170B}"/>
               </a:ext>
             </a:extLst>
           </p:cNvPr>
@@ -19137,7 +19033,7 @@
           <p:cNvPr id="3" name="Text Placeholder 2">
             <a:extLst>
               <a:ext uri="{FF2B5EF4-FFF2-40B4-BE49-F238E27FC236}">
-                <a16:creationId xmlns:a16="http://schemas.microsoft.com/office/drawing/2014/main" xmlns="" id="{8CED882E-A08F-4FF3-887F-2701DD1A3CEF}"/>
+                <a16:creationId xmlns:a16="http://schemas.microsoft.com/office/drawing/2014/main" id="{8CED882E-A08F-4FF3-887F-2701DD1A3CEF}"/>
               </a:ext>
             </a:extLst>
           </p:cNvPr>
@@ -19262,7 +19158,7 @@
           <p:cNvPr id="4" name="Date Placeholder 3">
             <a:extLst>
               <a:ext uri="{FF2B5EF4-FFF2-40B4-BE49-F238E27FC236}">
-                <a16:creationId xmlns:a16="http://schemas.microsoft.com/office/drawing/2014/main" xmlns="" id="{E1FD4AEF-2DAD-4E82-9A3B-1B5493C84A37}"/>
+                <a16:creationId xmlns:a16="http://schemas.microsoft.com/office/drawing/2014/main" id="{E1FD4AEF-2DAD-4E82-9A3B-1B5493C84A37}"/>
               </a:ext>
             </a:extLst>
           </p:cNvPr>
@@ -19280,7 +19176,7 @@
           <a:p>
             <a:fld id="{CACABD52-BF91-4CCE-9EEC-6A02225A646E}" type="datetimeFigureOut">
               <a:rPr lang="en-US" smtClean="0"/>
-              <a:t>2/5/2018</a:t>
+              <a:t>2018-03-08</a:t>
             </a:fld>
             <a:endParaRPr lang="en-US"/>
           </a:p>
@@ -19291,7 +19187,7 @@
           <p:cNvPr id="5" name="Footer Placeholder 4">
             <a:extLst>
               <a:ext uri="{FF2B5EF4-FFF2-40B4-BE49-F238E27FC236}">
-                <a16:creationId xmlns:a16="http://schemas.microsoft.com/office/drawing/2014/main" xmlns="" id="{F51F1357-D870-47CC-BEB9-41F9B9A25041}"/>
+                <a16:creationId xmlns:a16="http://schemas.microsoft.com/office/drawing/2014/main" id="{F51F1357-D870-47CC-BEB9-41F9B9A25041}"/>
               </a:ext>
             </a:extLst>
           </p:cNvPr>
@@ -19316,7 +19212,7 @@
           <p:cNvPr id="6" name="Slide Number Placeholder 5">
             <a:extLst>
               <a:ext uri="{FF2B5EF4-FFF2-40B4-BE49-F238E27FC236}">
-                <a16:creationId xmlns:a16="http://schemas.microsoft.com/office/drawing/2014/main" xmlns="" id="{A64956B2-B0C5-4472-92F3-5D4EECF7B18C}"/>
+                <a16:creationId xmlns:a16="http://schemas.microsoft.com/office/drawing/2014/main" id="{A64956B2-B0C5-4472-92F3-5D4EECF7B18C}"/>
               </a:ext>
             </a:extLst>
           </p:cNvPr>
@@ -19375,7 +19271,7 @@
           <p:cNvPr id="2" name="Title 1">
             <a:extLst>
               <a:ext uri="{FF2B5EF4-FFF2-40B4-BE49-F238E27FC236}">
-                <a16:creationId xmlns:a16="http://schemas.microsoft.com/office/drawing/2014/main" xmlns="" id="{EABFB98B-058E-4646-B2D2-41B744B1A0A4}"/>
+                <a16:creationId xmlns:a16="http://schemas.microsoft.com/office/drawing/2014/main" id="{EABFB98B-058E-4646-B2D2-41B744B1A0A4}"/>
               </a:ext>
             </a:extLst>
           </p:cNvPr>
@@ -19403,7 +19299,7 @@
           <p:cNvPr id="3" name="Content Placeholder 2">
             <a:extLst>
               <a:ext uri="{FF2B5EF4-FFF2-40B4-BE49-F238E27FC236}">
-                <a16:creationId xmlns:a16="http://schemas.microsoft.com/office/drawing/2014/main" xmlns="" id="{6803D61E-3276-408C-A6CF-DBCFECD13A3E}"/>
+                <a16:creationId xmlns:a16="http://schemas.microsoft.com/office/drawing/2014/main" id="{6803D61E-3276-408C-A6CF-DBCFECD13A3E}"/>
               </a:ext>
             </a:extLst>
           </p:cNvPr>
@@ -19465,7 +19361,7 @@
           <p:cNvPr id="4" name="Content Placeholder 3">
             <a:extLst>
               <a:ext uri="{FF2B5EF4-FFF2-40B4-BE49-F238E27FC236}">
-                <a16:creationId xmlns:a16="http://schemas.microsoft.com/office/drawing/2014/main" xmlns="" id="{61C32ADE-FE92-459B-9667-7D3E3CEACD34}"/>
+                <a16:creationId xmlns:a16="http://schemas.microsoft.com/office/drawing/2014/main" id="{61C32ADE-FE92-459B-9667-7D3E3CEACD34}"/>
               </a:ext>
             </a:extLst>
           </p:cNvPr>
@@ -19527,7 +19423,7 @@
           <p:cNvPr id="5" name="Date Placeholder 4">
             <a:extLst>
               <a:ext uri="{FF2B5EF4-FFF2-40B4-BE49-F238E27FC236}">
-                <a16:creationId xmlns:a16="http://schemas.microsoft.com/office/drawing/2014/main" xmlns="" id="{AA5C3425-1D21-4103-982C-CBB3F24532F8}"/>
+                <a16:creationId xmlns:a16="http://schemas.microsoft.com/office/drawing/2014/main" id="{AA5C3425-1D21-4103-982C-CBB3F24532F8}"/>
               </a:ext>
             </a:extLst>
           </p:cNvPr>
@@ -19545,7 +19441,7 @@
           <a:p>
             <a:fld id="{CACABD52-BF91-4CCE-9EEC-6A02225A646E}" type="datetimeFigureOut">
               <a:rPr lang="en-US" smtClean="0"/>
-              <a:t>2/5/2018</a:t>
+              <a:t>2018-03-08</a:t>
             </a:fld>
             <a:endParaRPr lang="en-US"/>
           </a:p>
@@ -19556,7 +19452,7 @@
           <p:cNvPr id="6" name="Footer Placeholder 5">
             <a:extLst>
               <a:ext uri="{FF2B5EF4-FFF2-40B4-BE49-F238E27FC236}">
-                <a16:creationId xmlns:a16="http://schemas.microsoft.com/office/drawing/2014/main" xmlns="" id="{8329BAC1-E5E4-4AE3-AB13-1C2026A99E43}"/>
+                <a16:creationId xmlns:a16="http://schemas.microsoft.com/office/drawing/2014/main" id="{8329BAC1-E5E4-4AE3-AB13-1C2026A99E43}"/>
               </a:ext>
             </a:extLst>
           </p:cNvPr>
@@ -19581,7 +19477,7 @@
           <p:cNvPr id="7" name="Slide Number Placeholder 6">
             <a:extLst>
               <a:ext uri="{FF2B5EF4-FFF2-40B4-BE49-F238E27FC236}">
-                <a16:creationId xmlns:a16="http://schemas.microsoft.com/office/drawing/2014/main" xmlns="" id="{6C6CF1CA-09C2-4A33-B916-07E421F331B0}"/>
+                <a16:creationId xmlns:a16="http://schemas.microsoft.com/office/drawing/2014/main" id="{6C6CF1CA-09C2-4A33-B916-07E421F331B0}"/>
               </a:ext>
             </a:extLst>
           </p:cNvPr>
@@ -19640,7 +19536,7 @@
           <p:cNvPr id="2" name="Title 1">
             <a:extLst>
               <a:ext uri="{FF2B5EF4-FFF2-40B4-BE49-F238E27FC236}">
-                <a16:creationId xmlns:a16="http://schemas.microsoft.com/office/drawing/2014/main" xmlns="" id="{A1425347-21FB-44DF-B884-E37BC9F395E5}"/>
+                <a16:creationId xmlns:a16="http://schemas.microsoft.com/office/drawing/2014/main" id="{A1425347-21FB-44DF-B884-E37BC9F395E5}"/>
               </a:ext>
             </a:extLst>
           </p:cNvPr>
@@ -19673,7 +19569,7 @@
           <p:cNvPr id="3" name="Text Placeholder 2">
             <a:extLst>
               <a:ext uri="{FF2B5EF4-FFF2-40B4-BE49-F238E27FC236}">
-                <a16:creationId xmlns:a16="http://schemas.microsoft.com/office/drawing/2014/main" xmlns="" id="{10FCB843-1A4E-484E-BFFD-E5A33AA5A1BA}"/>
+                <a16:creationId xmlns:a16="http://schemas.microsoft.com/office/drawing/2014/main" id="{10FCB843-1A4E-484E-BFFD-E5A33AA5A1BA}"/>
               </a:ext>
             </a:extLst>
           </p:cNvPr>
@@ -19744,7 +19640,7 @@
           <p:cNvPr id="4" name="Content Placeholder 3">
             <a:extLst>
               <a:ext uri="{FF2B5EF4-FFF2-40B4-BE49-F238E27FC236}">
-                <a16:creationId xmlns:a16="http://schemas.microsoft.com/office/drawing/2014/main" xmlns="" id="{A9302C9B-AE8D-4BC0-BA1A-C5E20BCD7028}"/>
+                <a16:creationId xmlns:a16="http://schemas.microsoft.com/office/drawing/2014/main" id="{A9302C9B-AE8D-4BC0-BA1A-C5E20BCD7028}"/>
               </a:ext>
             </a:extLst>
           </p:cNvPr>
@@ -19806,7 +19702,7 @@
           <p:cNvPr id="5" name="Text Placeholder 4">
             <a:extLst>
               <a:ext uri="{FF2B5EF4-FFF2-40B4-BE49-F238E27FC236}">
-                <a16:creationId xmlns:a16="http://schemas.microsoft.com/office/drawing/2014/main" xmlns="" id="{CD27FDF8-B188-4B1D-8742-7E0AA837AACF}"/>
+                <a16:creationId xmlns:a16="http://schemas.microsoft.com/office/drawing/2014/main" id="{CD27FDF8-B188-4B1D-8742-7E0AA837AACF}"/>
               </a:ext>
             </a:extLst>
           </p:cNvPr>
@@ -19877,7 +19773,7 @@
           <p:cNvPr id="6" name="Content Placeholder 5">
             <a:extLst>
               <a:ext uri="{FF2B5EF4-FFF2-40B4-BE49-F238E27FC236}">
-                <a16:creationId xmlns:a16="http://schemas.microsoft.com/office/drawing/2014/main" xmlns="" id="{E1A95380-C50D-4E52-B728-84873FB27C11}"/>
+                <a16:creationId xmlns:a16="http://schemas.microsoft.com/office/drawing/2014/main" id="{E1A95380-C50D-4E52-B728-84873FB27C11}"/>
               </a:ext>
             </a:extLst>
           </p:cNvPr>
@@ -19939,7 +19835,7 @@
           <p:cNvPr id="7" name="Date Placeholder 6">
             <a:extLst>
               <a:ext uri="{FF2B5EF4-FFF2-40B4-BE49-F238E27FC236}">
-                <a16:creationId xmlns:a16="http://schemas.microsoft.com/office/drawing/2014/main" xmlns="" id="{B4C33C57-B7A8-4001-A94F-EA1EDCAC6DDA}"/>
+                <a16:creationId xmlns:a16="http://schemas.microsoft.com/office/drawing/2014/main" id="{B4C33C57-B7A8-4001-A94F-EA1EDCAC6DDA}"/>
               </a:ext>
             </a:extLst>
           </p:cNvPr>
@@ -19957,7 +19853,7 @@
           <a:p>
             <a:fld id="{CACABD52-BF91-4CCE-9EEC-6A02225A646E}" type="datetimeFigureOut">
               <a:rPr lang="en-US" smtClean="0"/>
-              <a:t>2/5/2018</a:t>
+              <a:t>2018-03-08</a:t>
             </a:fld>
             <a:endParaRPr lang="en-US"/>
           </a:p>
@@ -19968,7 +19864,7 @@
           <p:cNvPr id="8" name="Footer Placeholder 7">
             <a:extLst>
               <a:ext uri="{FF2B5EF4-FFF2-40B4-BE49-F238E27FC236}">
-                <a16:creationId xmlns:a16="http://schemas.microsoft.com/office/drawing/2014/main" xmlns="" id="{0F445291-F30E-4913-B074-8D1F2B0BE100}"/>
+                <a16:creationId xmlns:a16="http://schemas.microsoft.com/office/drawing/2014/main" id="{0F445291-F30E-4913-B074-8D1F2B0BE100}"/>
               </a:ext>
             </a:extLst>
           </p:cNvPr>
@@ -19993,7 +19889,7 @@
           <p:cNvPr id="9" name="Slide Number Placeholder 8">
             <a:extLst>
               <a:ext uri="{FF2B5EF4-FFF2-40B4-BE49-F238E27FC236}">
-                <a16:creationId xmlns:a16="http://schemas.microsoft.com/office/drawing/2014/main" xmlns="" id="{D47A2067-EF69-45A2-897C-EC9B3020412E}"/>
+                <a16:creationId xmlns:a16="http://schemas.microsoft.com/office/drawing/2014/main" id="{D47A2067-EF69-45A2-897C-EC9B3020412E}"/>
               </a:ext>
             </a:extLst>
           </p:cNvPr>
@@ -20052,7 +19948,7 @@
           <p:cNvPr id="2" name="Title 1">
             <a:extLst>
               <a:ext uri="{FF2B5EF4-FFF2-40B4-BE49-F238E27FC236}">
-                <a16:creationId xmlns:a16="http://schemas.microsoft.com/office/drawing/2014/main" xmlns="" id="{5897FFA4-EBF8-4ED7-B54B-F14702E84B63}"/>
+                <a16:creationId xmlns:a16="http://schemas.microsoft.com/office/drawing/2014/main" id="{5897FFA4-EBF8-4ED7-B54B-F14702E84B63}"/>
               </a:ext>
             </a:extLst>
           </p:cNvPr>
@@ -20080,7 +19976,7 @@
           <p:cNvPr id="3" name="Date Placeholder 2">
             <a:extLst>
               <a:ext uri="{FF2B5EF4-FFF2-40B4-BE49-F238E27FC236}">
-                <a16:creationId xmlns:a16="http://schemas.microsoft.com/office/drawing/2014/main" xmlns="" id="{C5E02E21-09EB-46F5-9088-2AE3AC08EC9E}"/>
+                <a16:creationId xmlns:a16="http://schemas.microsoft.com/office/drawing/2014/main" id="{C5E02E21-09EB-46F5-9088-2AE3AC08EC9E}"/>
               </a:ext>
             </a:extLst>
           </p:cNvPr>
@@ -20098,7 +19994,7 @@
           <a:p>
             <a:fld id="{CACABD52-BF91-4CCE-9EEC-6A02225A646E}" type="datetimeFigureOut">
               <a:rPr lang="en-US" smtClean="0"/>
-              <a:t>2/5/2018</a:t>
+              <a:t>2018-03-08</a:t>
             </a:fld>
             <a:endParaRPr lang="en-US"/>
           </a:p>
@@ -20109,7 +20005,7 @@
           <p:cNvPr id="4" name="Footer Placeholder 3">
             <a:extLst>
               <a:ext uri="{FF2B5EF4-FFF2-40B4-BE49-F238E27FC236}">
-                <a16:creationId xmlns:a16="http://schemas.microsoft.com/office/drawing/2014/main" xmlns="" id="{EE6BC8B5-5449-4D2A-8497-FFC8B77BAF4F}"/>
+                <a16:creationId xmlns:a16="http://schemas.microsoft.com/office/drawing/2014/main" id="{EE6BC8B5-5449-4D2A-8497-FFC8B77BAF4F}"/>
               </a:ext>
             </a:extLst>
           </p:cNvPr>
@@ -20134,7 +20030,7 @@
           <p:cNvPr id="5" name="Slide Number Placeholder 4">
             <a:extLst>
               <a:ext uri="{FF2B5EF4-FFF2-40B4-BE49-F238E27FC236}">
-                <a16:creationId xmlns:a16="http://schemas.microsoft.com/office/drawing/2014/main" xmlns="" id="{7AD3CBB2-19BF-40F9-83B8-566D1EAB7777}"/>
+                <a16:creationId xmlns:a16="http://schemas.microsoft.com/office/drawing/2014/main" id="{7AD3CBB2-19BF-40F9-83B8-566D1EAB7777}"/>
               </a:ext>
             </a:extLst>
           </p:cNvPr>
@@ -20193,7 +20089,7 @@
           <p:cNvPr id="2" name="Date Placeholder 1">
             <a:extLst>
               <a:ext uri="{FF2B5EF4-FFF2-40B4-BE49-F238E27FC236}">
-                <a16:creationId xmlns:a16="http://schemas.microsoft.com/office/drawing/2014/main" xmlns="" id="{1C0D7943-B554-4E88-86D3-37CE1D6FC6D3}"/>
+                <a16:creationId xmlns:a16="http://schemas.microsoft.com/office/drawing/2014/main" id="{1C0D7943-B554-4E88-86D3-37CE1D6FC6D3}"/>
               </a:ext>
             </a:extLst>
           </p:cNvPr>
@@ -20211,7 +20107,7 @@
           <a:p>
             <a:fld id="{CACABD52-BF91-4CCE-9EEC-6A02225A646E}" type="datetimeFigureOut">
               <a:rPr lang="en-US" smtClean="0"/>
-              <a:t>2/5/2018</a:t>
+              <a:t>2018-03-08</a:t>
             </a:fld>
             <a:endParaRPr lang="en-US"/>
           </a:p>
@@ -20222,7 +20118,7 @@
           <p:cNvPr id="3" name="Footer Placeholder 2">
             <a:extLst>
               <a:ext uri="{FF2B5EF4-FFF2-40B4-BE49-F238E27FC236}">
-                <a16:creationId xmlns:a16="http://schemas.microsoft.com/office/drawing/2014/main" xmlns="" id="{6DA0A29A-95E2-4A43-9A62-DA676D2B1DD1}"/>
+                <a16:creationId xmlns:a16="http://schemas.microsoft.com/office/drawing/2014/main" id="{6DA0A29A-95E2-4A43-9A62-DA676D2B1DD1}"/>
               </a:ext>
             </a:extLst>
           </p:cNvPr>
@@ -20247,7 +20143,7 @@
           <p:cNvPr id="4" name="Slide Number Placeholder 3">
             <a:extLst>
               <a:ext uri="{FF2B5EF4-FFF2-40B4-BE49-F238E27FC236}">
-                <a16:creationId xmlns:a16="http://schemas.microsoft.com/office/drawing/2014/main" xmlns="" id="{C733AC5F-3B81-45A4-9505-752A3975B565}"/>
+                <a16:creationId xmlns:a16="http://schemas.microsoft.com/office/drawing/2014/main" id="{C733AC5F-3B81-45A4-9505-752A3975B565}"/>
               </a:ext>
             </a:extLst>
           </p:cNvPr>
@@ -20306,7 +20202,7 @@
           <p:cNvPr id="2" name="Title 1">
             <a:extLst>
               <a:ext uri="{FF2B5EF4-FFF2-40B4-BE49-F238E27FC236}">
-                <a16:creationId xmlns:a16="http://schemas.microsoft.com/office/drawing/2014/main" xmlns="" id="{429AA10F-A3F0-4FF5-86C2-B3E7658E4596}"/>
+                <a16:creationId xmlns:a16="http://schemas.microsoft.com/office/drawing/2014/main" id="{429AA10F-A3F0-4FF5-86C2-B3E7658E4596}"/>
               </a:ext>
             </a:extLst>
           </p:cNvPr>
@@ -20343,7 +20239,7 @@
           <p:cNvPr id="3" name="Content Placeholder 2">
             <a:extLst>
               <a:ext uri="{FF2B5EF4-FFF2-40B4-BE49-F238E27FC236}">
-                <a16:creationId xmlns:a16="http://schemas.microsoft.com/office/drawing/2014/main" xmlns="" id="{79CF4306-E7D1-4D7A-84BC-F0BCE1518D23}"/>
+                <a16:creationId xmlns:a16="http://schemas.microsoft.com/office/drawing/2014/main" id="{79CF4306-E7D1-4D7A-84BC-F0BCE1518D23}"/>
               </a:ext>
             </a:extLst>
           </p:cNvPr>
@@ -20433,7 +20329,7 @@
           <p:cNvPr id="4" name="Text Placeholder 3">
             <a:extLst>
               <a:ext uri="{FF2B5EF4-FFF2-40B4-BE49-F238E27FC236}">
-                <a16:creationId xmlns:a16="http://schemas.microsoft.com/office/drawing/2014/main" xmlns="" id="{4FEE7CF5-887D-49EC-9D20-69E2FB1A1A13}"/>
+                <a16:creationId xmlns:a16="http://schemas.microsoft.com/office/drawing/2014/main" id="{4FEE7CF5-887D-49EC-9D20-69E2FB1A1A13}"/>
               </a:ext>
             </a:extLst>
           </p:cNvPr>
@@ -20504,7 +20400,7 @@
           <p:cNvPr id="5" name="Date Placeholder 4">
             <a:extLst>
               <a:ext uri="{FF2B5EF4-FFF2-40B4-BE49-F238E27FC236}">
-                <a16:creationId xmlns:a16="http://schemas.microsoft.com/office/drawing/2014/main" xmlns="" id="{3ACFAEBD-A045-4A8C-878A-36EC892577BB}"/>
+                <a16:creationId xmlns:a16="http://schemas.microsoft.com/office/drawing/2014/main" id="{3ACFAEBD-A045-4A8C-878A-36EC892577BB}"/>
               </a:ext>
             </a:extLst>
           </p:cNvPr>
@@ -20522,7 +20418,7 @@
           <a:p>
             <a:fld id="{CACABD52-BF91-4CCE-9EEC-6A02225A646E}" type="datetimeFigureOut">
               <a:rPr lang="en-US" smtClean="0"/>
-              <a:t>2/5/2018</a:t>
+              <a:t>2018-03-08</a:t>
             </a:fld>
             <a:endParaRPr lang="en-US"/>
           </a:p>
@@ -20533,7 +20429,7 @@
           <p:cNvPr id="6" name="Footer Placeholder 5">
             <a:extLst>
               <a:ext uri="{FF2B5EF4-FFF2-40B4-BE49-F238E27FC236}">
-                <a16:creationId xmlns:a16="http://schemas.microsoft.com/office/drawing/2014/main" xmlns="" id="{16611E4C-81E3-45AD-8F0A-FF48107D1271}"/>
+                <a16:creationId xmlns:a16="http://schemas.microsoft.com/office/drawing/2014/main" id="{16611E4C-81E3-45AD-8F0A-FF48107D1271}"/>
               </a:ext>
             </a:extLst>
           </p:cNvPr>
@@ -20558,7 +20454,7 @@
           <p:cNvPr id="7" name="Slide Number Placeholder 6">
             <a:extLst>
               <a:ext uri="{FF2B5EF4-FFF2-40B4-BE49-F238E27FC236}">
-                <a16:creationId xmlns:a16="http://schemas.microsoft.com/office/drawing/2014/main" xmlns="" id="{9E6440E9-F4F2-4D20-A061-BB4A4DC64927}"/>
+                <a16:creationId xmlns:a16="http://schemas.microsoft.com/office/drawing/2014/main" id="{9E6440E9-F4F2-4D20-A061-BB4A4DC64927}"/>
               </a:ext>
             </a:extLst>
           </p:cNvPr>
@@ -20617,7 +20513,7 @@
           <p:cNvPr id="2" name="Title 1">
             <a:extLst>
               <a:ext uri="{FF2B5EF4-FFF2-40B4-BE49-F238E27FC236}">
-                <a16:creationId xmlns:a16="http://schemas.microsoft.com/office/drawing/2014/main" xmlns="" id="{F084EE26-126E-4E97-BF36-9F1DCD972C05}"/>
+                <a16:creationId xmlns:a16="http://schemas.microsoft.com/office/drawing/2014/main" id="{F084EE26-126E-4E97-BF36-9F1DCD972C05}"/>
               </a:ext>
             </a:extLst>
           </p:cNvPr>
@@ -20654,7 +20550,7 @@
           <p:cNvPr id="3" name="Picture Placeholder 2">
             <a:extLst>
               <a:ext uri="{FF2B5EF4-FFF2-40B4-BE49-F238E27FC236}">
-                <a16:creationId xmlns:a16="http://schemas.microsoft.com/office/drawing/2014/main" xmlns="" id="{257A8E82-AF17-438E-98D9-5C3489248FFC}"/>
+                <a16:creationId xmlns:a16="http://schemas.microsoft.com/office/drawing/2014/main" id="{257A8E82-AF17-438E-98D9-5C3489248FFC}"/>
               </a:ext>
             </a:extLst>
           </p:cNvPr>
@@ -20721,7 +20617,7 @@
           <p:cNvPr id="4" name="Text Placeholder 3">
             <a:extLst>
               <a:ext uri="{FF2B5EF4-FFF2-40B4-BE49-F238E27FC236}">
-                <a16:creationId xmlns:a16="http://schemas.microsoft.com/office/drawing/2014/main" xmlns="" id="{EA8DEB40-38F9-4310-AFB2-610843E376E6}"/>
+                <a16:creationId xmlns:a16="http://schemas.microsoft.com/office/drawing/2014/main" id="{EA8DEB40-38F9-4310-AFB2-610843E376E6}"/>
               </a:ext>
             </a:extLst>
           </p:cNvPr>
@@ -20792,7 +20688,7 @@
           <p:cNvPr id="5" name="Date Placeholder 4">
             <a:extLst>
               <a:ext uri="{FF2B5EF4-FFF2-40B4-BE49-F238E27FC236}">
-                <a16:creationId xmlns:a16="http://schemas.microsoft.com/office/drawing/2014/main" xmlns="" id="{0BC78A07-219B-4178-A5CE-EC09127A3FE2}"/>
+                <a16:creationId xmlns:a16="http://schemas.microsoft.com/office/drawing/2014/main" id="{0BC78A07-219B-4178-A5CE-EC09127A3FE2}"/>
               </a:ext>
             </a:extLst>
           </p:cNvPr>
@@ -20810,7 +20706,7 @@
           <a:p>
             <a:fld id="{CACABD52-BF91-4CCE-9EEC-6A02225A646E}" type="datetimeFigureOut">
               <a:rPr lang="en-US" smtClean="0"/>
-              <a:t>2/5/2018</a:t>
+              <a:t>2018-03-08</a:t>
             </a:fld>
             <a:endParaRPr lang="en-US"/>
           </a:p>
@@ -20821,7 +20717,7 @@
           <p:cNvPr id="6" name="Footer Placeholder 5">
             <a:extLst>
               <a:ext uri="{FF2B5EF4-FFF2-40B4-BE49-F238E27FC236}">
-                <a16:creationId xmlns:a16="http://schemas.microsoft.com/office/drawing/2014/main" xmlns="" id="{18B6F62C-9928-41E5-8044-CC305A40137C}"/>
+                <a16:creationId xmlns:a16="http://schemas.microsoft.com/office/drawing/2014/main" id="{18B6F62C-9928-41E5-8044-CC305A40137C}"/>
               </a:ext>
             </a:extLst>
           </p:cNvPr>
@@ -20846,7 +20742,7 @@
           <p:cNvPr id="7" name="Slide Number Placeholder 6">
             <a:extLst>
               <a:ext uri="{FF2B5EF4-FFF2-40B4-BE49-F238E27FC236}">
-                <a16:creationId xmlns:a16="http://schemas.microsoft.com/office/drawing/2014/main" xmlns="" id="{6267D2BB-92BB-4DDD-81C8-6617E54E1C27}"/>
+                <a16:creationId xmlns:a16="http://schemas.microsoft.com/office/drawing/2014/main" id="{6267D2BB-92BB-4DDD-81C8-6617E54E1C27}"/>
               </a:ext>
             </a:extLst>
           </p:cNvPr>
@@ -20910,7 +20806,7 @@
           <p:cNvPr id="2" name="Title Placeholder 1">
             <a:extLst>
               <a:ext uri="{FF2B5EF4-FFF2-40B4-BE49-F238E27FC236}">
-                <a16:creationId xmlns:a16="http://schemas.microsoft.com/office/drawing/2014/main" xmlns="" id="{EA7D838B-B41F-4FCE-8E52-9F72F4E6B9F7}"/>
+                <a16:creationId xmlns:a16="http://schemas.microsoft.com/office/drawing/2014/main" id="{EA7D838B-B41F-4FCE-8E52-9F72F4E6B9F7}"/>
               </a:ext>
             </a:extLst>
           </p:cNvPr>
@@ -20948,7 +20844,7 @@
           <p:cNvPr id="3" name="Text Placeholder 2">
             <a:extLst>
               <a:ext uri="{FF2B5EF4-FFF2-40B4-BE49-F238E27FC236}">
-                <a16:creationId xmlns:a16="http://schemas.microsoft.com/office/drawing/2014/main" xmlns="" id="{7FF521DE-86A0-4F35-9D33-DE3297EF3BEE}"/>
+                <a16:creationId xmlns:a16="http://schemas.microsoft.com/office/drawing/2014/main" id="{7FF521DE-86A0-4F35-9D33-DE3297EF3BEE}"/>
               </a:ext>
             </a:extLst>
           </p:cNvPr>
@@ -21015,7 +20911,7 @@
           <p:cNvPr id="4" name="Date Placeholder 3">
             <a:extLst>
               <a:ext uri="{FF2B5EF4-FFF2-40B4-BE49-F238E27FC236}">
-                <a16:creationId xmlns:a16="http://schemas.microsoft.com/office/drawing/2014/main" xmlns="" id="{0001F5AF-9B49-4031-B5E1-414FE235625E}"/>
+                <a16:creationId xmlns:a16="http://schemas.microsoft.com/office/drawing/2014/main" id="{0001F5AF-9B49-4031-B5E1-414FE235625E}"/>
               </a:ext>
             </a:extLst>
           </p:cNvPr>
@@ -21051,7 +20947,7 @@
           <a:p>
             <a:fld id="{CACABD52-BF91-4CCE-9EEC-6A02225A646E}" type="datetimeFigureOut">
               <a:rPr lang="en-US" smtClean="0"/>
-              <a:t>2/5/2018</a:t>
+              <a:t>2018-03-08</a:t>
             </a:fld>
             <a:endParaRPr lang="en-US"/>
           </a:p>
@@ -21062,7 +20958,7 @@
           <p:cNvPr id="5" name="Footer Placeholder 4">
             <a:extLst>
               <a:ext uri="{FF2B5EF4-FFF2-40B4-BE49-F238E27FC236}">
-                <a16:creationId xmlns:a16="http://schemas.microsoft.com/office/drawing/2014/main" xmlns="" id="{236B538C-FB52-488D-A23A-B0EA26045C11}"/>
+                <a16:creationId xmlns:a16="http://schemas.microsoft.com/office/drawing/2014/main" id="{236B538C-FB52-488D-A23A-B0EA26045C11}"/>
               </a:ext>
             </a:extLst>
           </p:cNvPr>
@@ -21105,7 +21001,7 @@
           <p:cNvPr id="6" name="Slide Number Placeholder 5">
             <a:extLst>
               <a:ext uri="{FF2B5EF4-FFF2-40B4-BE49-F238E27FC236}">
-                <a16:creationId xmlns:a16="http://schemas.microsoft.com/office/drawing/2014/main" xmlns="" id="{73C7A0F4-E59F-4A9A-90B5-40AD161A49F8}"/>
+                <a16:creationId xmlns:a16="http://schemas.microsoft.com/office/drawing/2014/main" id="{73C7A0F4-E59F-4A9A-90B5-40AD161A49F8}"/>
               </a:ext>
             </a:extLst>
           </p:cNvPr>
@@ -21473,7 +21369,7 @@
           <p:cNvPr id="14" name="Rectangle 13">
             <a:extLst>
               <a:ext uri="{FF2B5EF4-FFF2-40B4-BE49-F238E27FC236}">
-                <a16:creationId xmlns:a16="http://schemas.microsoft.com/office/drawing/2014/main" xmlns="" id="{8FC191C5-FA04-4B6A-890B-39B4A66DFC1D}"/>
+                <a16:creationId xmlns:a16="http://schemas.microsoft.com/office/drawing/2014/main" id="{8FC191C5-FA04-4B6A-890B-39B4A66DFC1D}"/>
               </a:ext>
             </a:extLst>
           </p:cNvPr>
@@ -21524,7 +21420,7 @@
           <p:cNvPr id="21" name="Rectangle 20">
             <a:extLst>
               <a:ext uri="{FF2B5EF4-FFF2-40B4-BE49-F238E27FC236}">
-                <a16:creationId xmlns:a16="http://schemas.microsoft.com/office/drawing/2014/main" xmlns="" id="{9F88DBF0-1CBF-432D-ABF5-C3B72583CCBD}"/>
+                <a16:creationId xmlns:a16="http://schemas.microsoft.com/office/drawing/2014/main" id="{9F88DBF0-1CBF-432D-ABF5-C3B72583CCBD}"/>
               </a:ext>
             </a:extLst>
           </p:cNvPr>
@@ -21580,7 +21476,7 @@
           <p:cNvPr id="22" name="Rectangle 21">
             <a:extLst>
               <a:ext uri="{FF2B5EF4-FFF2-40B4-BE49-F238E27FC236}">
-                <a16:creationId xmlns:a16="http://schemas.microsoft.com/office/drawing/2014/main" xmlns="" id="{21231BCA-7ABC-4F19-9161-5A02A16DD524}"/>
+                <a16:creationId xmlns:a16="http://schemas.microsoft.com/office/drawing/2014/main" id="{21231BCA-7ABC-4F19-9161-5A02A16DD524}"/>
               </a:ext>
             </a:extLst>
           </p:cNvPr>
@@ -21634,7 +21530,7 @@
           <p:cNvPr id="23" name="Rectangle 22">
             <a:extLst>
               <a:ext uri="{FF2B5EF4-FFF2-40B4-BE49-F238E27FC236}">
-                <a16:creationId xmlns:a16="http://schemas.microsoft.com/office/drawing/2014/main" xmlns="" id="{D61255F3-A5EA-4758-9469-30B2086D3E91}"/>
+                <a16:creationId xmlns:a16="http://schemas.microsoft.com/office/drawing/2014/main" id="{D61255F3-A5EA-4758-9469-30B2086D3E91}"/>
               </a:ext>
             </a:extLst>
           </p:cNvPr>
@@ -21688,7 +21584,7 @@
           <p:cNvPr id="7" name="Picture 9">
             <a:extLst>
               <a:ext uri="{FF2B5EF4-FFF2-40B4-BE49-F238E27FC236}">
-                <a16:creationId xmlns:a16="http://schemas.microsoft.com/office/drawing/2014/main" xmlns="" id="{61F991B1-26AE-44CD-BECD-7874DC212641}"/>
+                <a16:creationId xmlns:a16="http://schemas.microsoft.com/office/drawing/2014/main" id="{61F991B1-26AE-44CD-BECD-7874DC212641}"/>
               </a:ext>
             </a:extLst>
           </p:cNvPr>
@@ -21748,7 +21644,7 @@
           <p:cNvPr id="12" name="Picture 9">
             <a:extLst>
               <a:ext uri="{FF2B5EF4-FFF2-40B4-BE49-F238E27FC236}">
-                <a16:creationId xmlns:a16="http://schemas.microsoft.com/office/drawing/2014/main" xmlns="" id="{C9F0EEA1-9F31-4557-BFDA-475C767CF656}"/>
+                <a16:creationId xmlns:a16="http://schemas.microsoft.com/office/drawing/2014/main" id="{C9F0EEA1-9F31-4557-BFDA-475C767CF656}"/>
               </a:ext>
             </a:extLst>
           </p:cNvPr>
@@ -21808,7 +21704,7 @@
           <p:cNvPr id="24" name="Picture 9">
             <a:extLst>
               <a:ext uri="{FF2B5EF4-FFF2-40B4-BE49-F238E27FC236}">
-                <a16:creationId xmlns:a16="http://schemas.microsoft.com/office/drawing/2014/main" xmlns="" id="{037940A9-EC14-46F4-AEBF-4C4350B9FA9D}"/>
+                <a16:creationId xmlns:a16="http://schemas.microsoft.com/office/drawing/2014/main" id="{037940A9-EC14-46F4-AEBF-4C4350B9FA9D}"/>
               </a:ext>
             </a:extLst>
           </p:cNvPr>
@@ -21868,7 +21764,7 @@
           <p:cNvPr id="25" name="Picture 9">
             <a:extLst>
               <a:ext uri="{FF2B5EF4-FFF2-40B4-BE49-F238E27FC236}">
-                <a16:creationId xmlns:a16="http://schemas.microsoft.com/office/drawing/2014/main" xmlns="" id="{AC1FC543-EE8D-43D1-A2E2-8B7CE0EE97F9}"/>
+                <a16:creationId xmlns:a16="http://schemas.microsoft.com/office/drawing/2014/main" id="{AC1FC543-EE8D-43D1-A2E2-8B7CE0EE97F9}"/>
               </a:ext>
             </a:extLst>
           </p:cNvPr>
@@ -21928,7 +21824,7 @@
           <p:cNvPr id="26" name="Picture 9">
             <a:extLst>
               <a:ext uri="{FF2B5EF4-FFF2-40B4-BE49-F238E27FC236}">
-                <a16:creationId xmlns:a16="http://schemas.microsoft.com/office/drawing/2014/main" xmlns="" id="{6AC15EDC-F8F5-4698-B923-1EC9F1999593}"/>
+                <a16:creationId xmlns:a16="http://schemas.microsoft.com/office/drawing/2014/main" id="{6AC15EDC-F8F5-4698-B923-1EC9F1999593}"/>
               </a:ext>
             </a:extLst>
           </p:cNvPr>
@@ -21988,7 +21884,7 @@
           <p:cNvPr id="27" name="Picture 9">
             <a:extLst>
               <a:ext uri="{FF2B5EF4-FFF2-40B4-BE49-F238E27FC236}">
-                <a16:creationId xmlns:a16="http://schemas.microsoft.com/office/drawing/2014/main" xmlns="" id="{4B495DA8-87A8-41A0-A125-87A4DE3108C8}"/>
+                <a16:creationId xmlns:a16="http://schemas.microsoft.com/office/drawing/2014/main" id="{4B495DA8-87A8-41A0-A125-87A4DE3108C8}"/>
               </a:ext>
             </a:extLst>
           </p:cNvPr>
@@ -22048,7 +21944,7 @@
           <p:cNvPr id="28" name="Rectangle 27">
             <a:extLst>
               <a:ext uri="{FF2B5EF4-FFF2-40B4-BE49-F238E27FC236}">
-                <a16:creationId xmlns:a16="http://schemas.microsoft.com/office/drawing/2014/main" xmlns="" id="{3F335173-C56C-4E77-BBC0-1A5C875AEF46}"/>
+                <a16:creationId xmlns:a16="http://schemas.microsoft.com/office/drawing/2014/main" id="{3F335173-C56C-4E77-BBC0-1A5C875AEF46}"/>
               </a:ext>
             </a:extLst>
           </p:cNvPr>
@@ -22089,7 +21985,7 @@
           <p:cNvPr id="29" name="Rectangle 28">
             <a:extLst>
               <a:ext uri="{FF2B5EF4-FFF2-40B4-BE49-F238E27FC236}">
-                <a16:creationId xmlns:a16="http://schemas.microsoft.com/office/drawing/2014/main" xmlns="" id="{DA16A2E4-6CB6-42D5-82E7-2BCC5D1720B7}"/>
+                <a16:creationId xmlns:a16="http://schemas.microsoft.com/office/drawing/2014/main" id="{DA16A2E4-6CB6-42D5-82E7-2BCC5D1720B7}"/>
               </a:ext>
             </a:extLst>
           </p:cNvPr>
@@ -22130,7 +22026,7 @@
           <p:cNvPr id="30" name="Rectangle 29">
             <a:extLst>
               <a:ext uri="{FF2B5EF4-FFF2-40B4-BE49-F238E27FC236}">
-                <a16:creationId xmlns:a16="http://schemas.microsoft.com/office/drawing/2014/main" xmlns="" id="{81F02153-EB60-495D-8DAF-1949C468CB7A}"/>
+                <a16:creationId xmlns:a16="http://schemas.microsoft.com/office/drawing/2014/main" id="{81F02153-EB60-495D-8DAF-1949C468CB7A}"/>
               </a:ext>
             </a:extLst>
           </p:cNvPr>
@@ -22172,7 +22068,7 @@
           <p:cNvPr id="34" name="Straight Connector 33">
             <a:extLst>
               <a:ext uri="{FF2B5EF4-FFF2-40B4-BE49-F238E27FC236}">
-                <a16:creationId xmlns:a16="http://schemas.microsoft.com/office/drawing/2014/main" xmlns="" id="{1D15A13C-E5E4-4DE9-A9F2-058123546270}"/>
+                <a16:creationId xmlns:a16="http://schemas.microsoft.com/office/drawing/2014/main" id="{1D15A13C-E5E4-4DE9-A9F2-058123546270}"/>
               </a:ext>
             </a:extLst>
           </p:cNvPr>
@@ -22217,7 +22113,7 @@
           <p:cNvPr id="36" name="Straight Connector 35">
             <a:extLst>
               <a:ext uri="{FF2B5EF4-FFF2-40B4-BE49-F238E27FC236}">
-                <a16:creationId xmlns:a16="http://schemas.microsoft.com/office/drawing/2014/main" xmlns="" id="{4612C6FF-F6F9-45E3-A2C0-D4BA837DA5BC}"/>
+                <a16:creationId xmlns:a16="http://schemas.microsoft.com/office/drawing/2014/main" id="{4612C6FF-F6F9-45E3-A2C0-D4BA837DA5BC}"/>
               </a:ext>
             </a:extLst>
           </p:cNvPr>
@@ -22262,7 +22158,7 @@
           <p:cNvPr id="38" name="Straight Connector 37">
             <a:extLst>
               <a:ext uri="{FF2B5EF4-FFF2-40B4-BE49-F238E27FC236}">
-                <a16:creationId xmlns:a16="http://schemas.microsoft.com/office/drawing/2014/main" xmlns="" id="{10587871-2D25-46EC-B9D5-36263ECB22E7}"/>
+                <a16:creationId xmlns:a16="http://schemas.microsoft.com/office/drawing/2014/main" id="{10587871-2D25-46EC-B9D5-36263ECB22E7}"/>
               </a:ext>
             </a:extLst>
           </p:cNvPr>
@@ -22307,7 +22203,7 @@
           <p:cNvPr id="42" name="Straight Connector 41">
             <a:extLst>
               <a:ext uri="{FF2B5EF4-FFF2-40B4-BE49-F238E27FC236}">
-                <a16:creationId xmlns:a16="http://schemas.microsoft.com/office/drawing/2014/main" xmlns="" id="{26C3F60D-928C-472B-97AC-56ED78A81F28}"/>
+                <a16:creationId xmlns:a16="http://schemas.microsoft.com/office/drawing/2014/main" id="{26C3F60D-928C-472B-97AC-56ED78A81F28}"/>
               </a:ext>
             </a:extLst>
           </p:cNvPr>
@@ -22352,7 +22248,7 @@
           <p:cNvPr id="44" name="Straight Connector 43">
             <a:extLst>
               <a:ext uri="{FF2B5EF4-FFF2-40B4-BE49-F238E27FC236}">
-                <a16:creationId xmlns:a16="http://schemas.microsoft.com/office/drawing/2014/main" xmlns="" id="{2E721FDC-89A7-4988-B1BE-FF07CA41458A}"/>
+                <a16:creationId xmlns:a16="http://schemas.microsoft.com/office/drawing/2014/main" id="{2E721FDC-89A7-4988-B1BE-FF07CA41458A}"/>
               </a:ext>
             </a:extLst>
           </p:cNvPr>
@@ -22397,7 +22293,7 @@
           <p:cNvPr id="46" name="Rectangle 45">
             <a:extLst>
               <a:ext uri="{FF2B5EF4-FFF2-40B4-BE49-F238E27FC236}">
-                <a16:creationId xmlns:a16="http://schemas.microsoft.com/office/drawing/2014/main" xmlns="" id="{209F45D2-258B-45DE-87F5-944A1682AC6B}"/>
+                <a16:creationId xmlns:a16="http://schemas.microsoft.com/office/drawing/2014/main" id="{209F45D2-258B-45DE-87F5-944A1682AC6B}"/>
               </a:ext>
             </a:extLst>
           </p:cNvPr>
@@ -22459,7 +22355,7 @@
           <p:cNvPr id="47" name="Rectangle 46">
             <a:extLst>
               <a:ext uri="{FF2B5EF4-FFF2-40B4-BE49-F238E27FC236}">
-                <a16:creationId xmlns:a16="http://schemas.microsoft.com/office/drawing/2014/main" xmlns="" id="{C7C3DD58-9FD5-423D-81F0-65F260109267}"/>
+                <a16:creationId xmlns:a16="http://schemas.microsoft.com/office/drawing/2014/main" id="{C7C3DD58-9FD5-423D-81F0-65F260109267}"/>
               </a:ext>
             </a:extLst>
           </p:cNvPr>
@@ -22501,7 +22397,7 @@
           <p:cNvPr id="48" name="Rectangle 47">
             <a:extLst>
               <a:ext uri="{FF2B5EF4-FFF2-40B4-BE49-F238E27FC236}">
-                <a16:creationId xmlns:a16="http://schemas.microsoft.com/office/drawing/2014/main" xmlns="" id="{5F2B4F2F-F55B-4F17-A7B6-1A931A40CA68}"/>
+                <a16:creationId xmlns:a16="http://schemas.microsoft.com/office/drawing/2014/main" id="{5F2B4F2F-F55B-4F17-A7B6-1A931A40CA68}"/>
               </a:ext>
             </a:extLst>
           </p:cNvPr>
@@ -22557,7 +22453,7 @@
           <p:cNvPr id="51" name="Rectangle 50">
             <a:extLst>
               <a:ext uri="{FF2B5EF4-FFF2-40B4-BE49-F238E27FC236}">
-                <a16:creationId xmlns:a16="http://schemas.microsoft.com/office/drawing/2014/main" xmlns="" id="{4F5CFA18-B35B-4DA0-A1C8-D81AC1AEE2BC}"/>
+                <a16:creationId xmlns:a16="http://schemas.microsoft.com/office/drawing/2014/main" id="{4F5CFA18-B35B-4DA0-A1C8-D81AC1AEE2BC}"/>
               </a:ext>
             </a:extLst>
           </p:cNvPr>
@@ -22618,7 +22514,7 @@
           <p:cNvPr id="52" name="Rectangle 51">
             <a:extLst>
               <a:ext uri="{FF2B5EF4-FFF2-40B4-BE49-F238E27FC236}">
-                <a16:creationId xmlns:a16="http://schemas.microsoft.com/office/drawing/2014/main" xmlns="" id="{48F2455D-070C-4806-92D6-3F679E9866F1}"/>
+                <a16:creationId xmlns:a16="http://schemas.microsoft.com/office/drawing/2014/main" id="{48F2455D-070C-4806-92D6-3F679E9866F1}"/>
               </a:ext>
             </a:extLst>
           </p:cNvPr>
@@ -22674,7 +22570,7 @@
           <p:cNvPr id="53" name="Rectangle 52">
             <a:extLst>
               <a:ext uri="{FF2B5EF4-FFF2-40B4-BE49-F238E27FC236}">
-                <a16:creationId xmlns:a16="http://schemas.microsoft.com/office/drawing/2014/main" xmlns="" id="{FDAFD61E-CF23-40A2-9706-CEB024710019}"/>
+                <a16:creationId xmlns:a16="http://schemas.microsoft.com/office/drawing/2014/main" id="{FDAFD61E-CF23-40A2-9706-CEB024710019}"/>
               </a:ext>
             </a:extLst>
           </p:cNvPr>
@@ -22728,7 +22624,7 @@
           <p:cNvPr id="54" name="Rectangle 53">
             <a:extLst>
               <a:ext uri="{FF2B5EF4-FFF2-40B4-BE49-F238E27FC236}">
-                <a16:creationId xmlns:a16="http://schemas.microsoft.com/office/drawing/2014/main" xmlns="" id="{B79A9F92-DA98-4C00-8C98-D7409A63A49E}"/>
+                <a16:creationId xmlns:a16="http://schemas.microsoft.com/office/drawing/2014/main" id="{B79A9F92-DA98-4C00-8C98-D7409A63A49E}"/>
               </a:ext>
             </a:extLst>
           </p:cNvPr>
@@ -22782,7 +22678,7 @@
           <p:cNvPr id="55" name="Picture 9">
             <a:extLst>
               <a:ext uri="{FF2B5EF4-FFF2-40B4-BE49-F238E27FC236}">
-                <a16:creationId xmlns:a16="http://schemas.microsoft.com/office/drawing/2014/main" xmlns="" id="{6F38A3E1-E0DA-432B-BBFA-348F0321BCD3}"/>
+                <a16:creationId xmlns:a16="http://schemas.microsoft.com/office/drawing/2014/main" id="{6F38A3E1-E0DA-432B-BBFA-348F0321BCD3}"/>
               </a:ext>
             </a:extLst>
           </p:cNvPr>
@@ -22842,7 +22738,7 @@
           <p:cNvPr id="69" name="Rectangle 68">
             <a:extLst>
               <a:ext uri="{FF2B5EF4-FFF2-40B4-BE49-F238E27FC236}">
-                <a16:creationId xmlns:a16="http://schemas.microsoft.com/office/drawing/2014/main" xmlns="" id="{19EC4CF9-2E6B-4D8B-80AB-7CDBA38CF6D3}"/>
+                <a16:creationId xmlns:a16="http://schemas.microsoft.com/office/drawing/2014/main" id="{19EC4CF9-2E6B-4D8B-80AB-7CDBA38CF6D3}"/>
               </a:ext>
             </a:extLst>
           </p:cNvPr>
@@ -22904,7 +22800,7 @@
           <p:cNvPr id="72" name="Straight Connector 71">
             <a:extLst>
               <a:ext uri="{FF2B5EF4-FFF2-40B4-BE49-F238E27FC236}">
-                <a16:creationId xmlns:a16="http://schemas.microsoft.com/office/drawing/2014/main" xmlns="" id="{DFD04D63-40EA-4A51-A48E-8B19F6A831F1}"/>
+                <a16:creationId xmlns:a16="http://schemas.microsoft.com/office/drawing/2014/main" id="{DFD04D63-40EA-4A51-A48E-8B19F6A831F1}"/>
               </a:ext>
             </a:extLst>
           </p:cNvPr>
@@ -22950,7 +22846,7 @@
           <p:cNvPr id="75" name="Rectangle 74">
             <a:extLst>
               <a:ext uri="{FF2B5EF4-FFF2-40B4-BE49-F238E27FC236}">
-                <a16:creationId xmlns:a16="http://schemas.microsoft.com/office/drawing/2014/main" xmlns="" id="{BDB9CA6D-4FA5-4175-AAC0-17D87D1050C9}"/>
+                <a16:creationId xmlns:a16="http://schemas.microsoft.com/office/drawing/2014/main" id="{BDB9CA6D-4FA5-4175-AAC0-17D87D1050C9}"/>
               </a:ext>
             </a:extLst>
           </p:cNvPr>
@@ -23011,7 +22907,7 @@
           <p:cNvPr id="76" name="Rectangle 75">
             <a:extLst>
               <a:ext uri="{FF2B5EF4-FFF2-40B4-BE49-F238E27FC236}">
-                <a16:creationId xmlns:a16="http://schemas.microsoft.com/office/drawing/2014/main" xmlns="" id="{9A9F6FDC-0558-487A-8683-2B4AC3E3F11A}"/>
+                <a16:creationId xmlns:a16="http://schemas.microsoft.com/office/drawing/2014/main" id="{9A9F6FDC-0558-487A-8683-2B4AC3E3F11A}"/>
               </a:ext>
             </a:extLst>
           </p:cNvPr>
@@ -23067,7 +22963,7 @@
           <p:cNvPr id="77" name="Rectangle 76">
             <a:extLst>
               <a:ext uri="{FF2B5EF4-FFF2-40B4-BE49-F238E27FC236}">
-                <a16:creationId xmlns:a16="http://schemas.microsoft.com/office/drawing/2014/main" xmlns="" id="{FC12E18A-CEC6-48F5-94C8-E315D4035FF8}"/>
+                <a16:creationId xmlns:a16="http://schemas.microsoft.com/office/drawing/2014/main" id="{FC12E18A-CEC6-48F5-94C8-E315D4035FF8}"/>
               </a:ext>
             </a:extLst>
           </p:cNvPr>
@@ -23121,7 +23017,7 @@
           <p:cNvPr id="78" name="Rectangle 77">
             <a:extLst>
               <a:ext uri="{FF2B5EF4-FFF2-40B4-BE49-F238E27FC236}">
-                <a16:creationId xmlns:a16="http://schemas.microsoft.com/office/drawing/2014/main" xmlns="" id="{A92CEE74-4DA2-4F7C-8BCE-ED5BE42D301D}"/>
+                <a16:creationId xmlns:a16="http://schemas.microsoft.com/office/drawing/2014/main" id="{A92CEE74-4DA2-4F7C-8BCE-ED5BE42D301D}"/>
               </a:ext>
             </a:extLst>
           </p:cNvPr>
@@ -23175,7 +23071,7 @@
           <p:cNvPr id="79" name="Picture 9">
             <a:extLst>
               <a:ext uri="{FF2B5EF4-FFF2-40B4-BE49-F238E27FC236}">
-                <a16:creationId xmlns:a16="http://schemas.microsoft.com/office/drawing/2014/main" xmlns="" id="{3236DC49-84B5-4BA6-A0C5-B630F26A56EE}"/>
+                <a16:creationId xmlns:a16="http://schemas.microsoft.com/office/drawing/2014/main" id="{3236DC49-84B5-4BA6-A0C5-B630F26A56EE}"/>
               </a:ext>
             </a:extLst>
           </p:cNvPr>
@@ -23235,7 +23131,7 @@
           <p:cNvPr id="80" name="Rectangle 79">
             <a:extLst>
               <a:ext uri="{FF2B5EF4-FFF2-40B4-BE49-F238E27FC236}">
-                <a16:creationId xmlns:a16="http://schemas.microsoft.com/office/drawing/2014/main" xmlns="" id="{44F2AE50-EBD9-416A-9E45-2E98B87AC808}"/>
+                <a16:creationId xmlns:a16="http://schemas.microsoft.com/office/drawing/2014/main" id="{44F2AE50-EBD9-416A-9E45-2E98B87AC808}"/>
               </a:ext>
             </a:extLst>
           </p:cNvPr>
@@ -23294,7 +23190,7 @@
           <p:cNvPr id="82" name="Straight Connector 81">
             <a:extLst>
               <a:ext uri="{FF2B5EF4-FFF2-40B4-BE49-F238E27FC236}">
-                <a16:creationId xmlns:a16="http://schemas.microsoft.com/office/drawing/2014/main" xmlns="" id="{4FFA2BE3-2EDF-43CC-8FD1-826085DDAA2A}"/>
+                <a16:creationId xmlns:a16="http://schemas.microsoft.com/office/drawing/2014/main" id="{4FFA2BE3-2EDF-43CC-8FD1-826085DDAA2A}"/>
               </a:ext>
             </a:extLst>
           </p:cNvPr>
@@ -23340,7 +23236,7 @@
           <p:cNvPr id="83" name="Cloud 82">
             <a:extLst>
               <a:ext uri="{FF2B5EF4-FFF2-40B4-BE49-F238E27FC236}">
-                <a16:creationId xmlns:a16="http://schemas.microsoft.com/office/drawing/2014/main" xmlns="" id="{F1413CEC-28FE-4C2E-901A-A967D7B48E9F}"/>
+                <a16:creationId xmlns:a16="http://schemas.microsoft.com/office/drawing/2014/main" id="{F1413CEC-28FE-4C2E-901A-A967D7B48E9F}"/>
               </a:ext>
             </a:extLst>
           </p:cNvPr>
@@ -23411,7 +23307,7 @@
           <p:cNvPr id="86" name="Straight Connector 85">
             <a:extLst>
               <a:ext uri="{FF2B5EF4-FFF2-40B4-BE49-F238E27FC236}">
-                <a16:creationId xmlns:a16="http://schemas.microsoft.com/office/drawing/2014/main" xmlns="" id="{743B6992-EE85-455B-9771-636069D178E5}"/>
+                <a16:creationId xmlns:a16="http://schemas.microsoft.com/office/drawing/2014/main" id="{743B6992-EE85-455B-9771-636069D178E5}"/>
               </a:ext>
             </a:extLst>
           </p:cNvPr>
@@ -23457,7 +23353,7 @@
           <p:cNvPr id="88" name="Straight Connector 87">
             <a:extLst>
               <a:ext uri="{FF2B5EF4-FFF2-40B4-BE49-F238E27FC236}">
-                <a16:creationId xmlns:a16="http://schemas.microsoft.com/office/drawing/2014/main" xmlns="" id="{5CC1E663-D34D-46FA-9E20-A9E44AA2D51F}"/>
+                <a16:creationId xmlns:a16="http://schemas.microsoft.com/office/drawing/2014/main" id="{5CC1E663-D34D-46FA-9E20-A9E44AA2D51F}"/>
               </a:ext>
             </a:extLst>
           </p:cNvPr>
@@ -23503,7 +23399,7 @@
           <p:cNvPr id="92" name="Cube 91">
             <a:extLst>
               <a:ext uri="{FF2B5EF4-FFF2-40B4-BE49-F238E27FC236}">
-                <a16:creationId xmlns:a16="http://schemas.microsoft.com/office/drawing/2014/main" xmlns="" id="{F17CBDCB-434B-40FD-8BCE-BEE38C96FBCB}"/>
+                <a16:creationId xmlns:a16="http://schemas.microsoft.com/office/drawing/2014/main" id="{F17CBDCB-434B-40FD-8BCE-BEE38C96FBCB}"/>
               </a:ext>
             </a:extLst>
           </p:cNvPr>
@@ -23585,7 +23481,7 @@
           <p:cNvPr id="97" name="Straight Connector 96">
             <a:extLst>
               <a:ext uri="{FF2B5EF4-FFF2-40B4-BE49-F238E27FC236}">
-                <a16:creationId xmlns:a16="http://schemas.microsoft.com/office/drawing/2014/main" xmlns="" id="{D25A6F54-F129-4330-BE58-15EFA559459F}"/>
+                <a16:creationId xmlns:a16="http://schemas.microsoft.com/office/drawing/2014/main" id="{D25A6F54-F129-4330-BE58-15EFA559459F}"/>
               </a:ext>
             </a:extLst>
           </p:cNvPr>
@@ -23631,7 +23527,7 @@
           <p:cNvPr id="102" name="Group 101">
             <a:extLst>
               <a:ext uri="{FF2B5EF4-FFF2-40B4-BE49-F238E27FC236}">
-                <a16:creationId xmlns:a16="http://schemas.microsoft.com/office/drawing/2014/main" xmlns="" id="{4D5C9D6C-2BA6-4210-9BE8-391169B593BF}"/>
+                <a16:creationId xmlns:a16="http://schemas.microsoft.com/office/drawing/2014/main" id="{4D5C9D6C-2BA6-4210-9BE8-391169B593BF}"/>
               </a:ext>
             </a:extLst>
           </p:cNvPr>
@@ -23651,7 +23547,7 @@
             <p:cNvPr id="99" name="Rectangle 98">
               <a:extLst>
                 <a:ext uri="{FF2B5EF4-FFF2-40B4-BE49-F238E27FC236}">
-                  <a16:creationId xmlns:a16="http://schemas.microsoft.com/office/drawing/2014/main" xmlns="" id="{8A2A5D3B-8D5B-4534-95C5-7EDE4E4A2EE5}"/>
+                  <a16:creationId xmlns:a16="http://schemas.microsoft.com/office/drawing/2014/main" id="{8A2A5D3B-8D5B-4534-95C5-7EDE4E4A2EE5}"/>
                 </a:ext>
               </a:extLst>
             </p:cNvPr>
@@ -23707,7 +23603,7 @@
             <p:cNvPr id="100" name="Rectangle 99">
               <a:extLst>
                 <a:ext uri="{FF2B5EF4-FFF2-40B4-BE49-F238E27FC236}">
-                  <a16:creationId xmlns:a16="http://schemas.microsoft.com/office/drawing/2014/main" xmlns="" id="{9C28B60A-2088-48A0-B569-F3936386E898}"/>
+                  <a16:creationId xmlns:a16="http://schemas.microsoft.com/office/drawing/2014/main" id="{9C28B60A-2088-48A0-B569-F3936386E898}"/>
                 </a:ext>
               </a:extLst>
             </p:cNvPr>
@@ -23761,7 +23657,7 @@
             <p:cNvPr id="101" name="Rectangle 100">
               <a:extLst>
                 <a:ext uri="{FF2B5EF4-FFF2-40B4-BE49-F238E27FC236}">
-                  <a16:creationId xmlns:a16="http://schemas.microsoft.com/office/drawing/2014/main" xmlns="" id="{562E2C42-74F4-4E91-A195-585D7FB0B2BC}"/>
+                  <a16:creationId xmlns:a16="http://schemas.microsoft.com/office/drawing/2014/main" id="{562E2C42-74F4-4E91-A195-585D7FB0B2BC}"/>
                 </a:ext>
               </a:extLst>
             </p:cNvPr>
@@ -23816,7 +23712,7 @@
           <p:cNvPr id="103" name="Group 102">
             <a:extLst>
               <a:ext uri="{FF2B5EF4-FFF2-40B4-BE49-F238E27FC236}">
-                <a16:creationId xmlns:a16="http://schemas.microsoft.com/office/drawing/2014/main" xmlns="" id="{6F132A65-5FBB-4398-A7E1-2290DFCF2905}"/>
+                <a16:creationId xmlns:a16="http://schemas.microsoft.com/office/drawing/2014/main" id="{6F132A65-5FBB-4398-A7E1-2290DFCF2905}"/>
               </a:ext>
             </a:extLst>
           </p:cNvPr>
@@ -23836,7 +23732,7 @@
             <p:cNvPr id="104" name="Rectangle 103">
               <a:extLst>
                 <a:ext uri="{FF2B5EF4-FFF2-40B4-BE49-F238E27FC236}">
-                  <a16:creationId xmlns:a16="http://schemas.microsoft.com/office/drawing/2014/main" xmlns="" id="{16ABE599-3C70-4AF6-A393-239EE2B0DEA7}"/>
+                  <a16:creationId xmlns:a16="http://schemas.microsoft.com/office/drawing/2014/main" id="{16ABE599-3C70-4AF6-A393-239EE2B0DEA7}"/>
                 </a:ext>
               </a:extLst>
             </p:cNvPr>
@@ -23892,7 +23788,7 @@
             <p:cNvPr id="105" name="Rectangle 104">
               <a:extLst>
                 <a:ext uri="{FF2B5EF4-FFF2-40B4-BE49-F238E27FC236}">
-                  <a16:creationId xmlns:a16="http://schemas.microsoft.com/office/drawing/2014/main" xmlns="" id="{216B8055-F5E9-4F2E-A47F-7CAEF386110D}"/>
+                  <a16:creationId xmlns:a16="http://schemas.microsoft.com/office/drawing/2014/main" id="{216B8055-F5E9-4F2E-A47F-7CAEF386110D}"/>
                 </a:ext>
               </a:extLst>
             </p:cNvPr>
@@ -23946,7 +23842,7 @@
             <p:cNvPr id="106" name="Rectangle 105">
               <a:extLst>
                 <a:ext uri="{FF2B5EF4-FFF2-40B4-BE49-F238E27FC236}">
-                  <a16:creationId xmlns:a16="http://schemas.microsoft.com/office/drawing/2014/main" xmlns="" id="{6DB048BD-0A0D-4854-92DB-BCD958D65BEF}"/>
+                  <a16:creationId xmlns:a16="http://schemas.microsoft.com/office/drawing/2014/main" id="{6DB048BD-0A0D-4854-92DB-BCD958D65BEF}"/>
                 </a:ext>
               </a:extLst>
             </p:cNvPr>
@@ -24001,7 +23897,7 @@
           <p:cNvPr id="107" name="Group 106">
             <a:extLst>
               <a:ext uri="{FF2B5EF4-FFF2-40B4-BE49-F238E27FC236}">
-                <a16:creationId xmlns:a16="http://schemas.microsoft.com/office/drawing/2014/main" xmlns="" id="{CEEACBB4-96B5-487A-B258-27A968459662}"/>
+                <a16:creationId xmlns:a16="http://schemas.microsoft.com/office/drawing/2014/main" id="{CEEACBB4-96B5-487A-B258-27A968459662}"/>
               </a:ext>
             </a:extLst>
           </p:cNvPr>
@@ -24021,7 +23917,7 @@
             <p:cNvPr id="108" name="Rectangle 107">
               <a:extLst>
                 <a:ext uri="{FF2B5EF4-FFF2-40B4-BE49-F238E27FC236}">
-                  <a16:creationId xmlns:a16="http://schemas.microsoft.com/office/drawing/2014/main" xmlns="" id="{5995F40C-3BAE-4251-B5D3-2C3C3B7FEA16}"/>
+                  <a16:creationId xmlns:a16="http://schemas.microsoft.com/office/drawing/2014/main" id="{5995F40C-3BAE-4251-B5D3-2C3C3B7FEA16}"/>
                 </a:ext>
               </a:extLst>
             </p:cNvPr>
@@ -24077,7 +23973,7 @@
             <p:cNvPr id="109" name="Rectangle 108">
               <a:extLst>
                 <a:ext uri="{FF2B5EF4-FFF2-40B4-BE49-F238E27FC236}">
-                  <a16:creationId xmlns:a16="http://schemas.microsoft.com/office/drawing/2014/main" xmlns="" id="{B69C8503-1C90-4528-B997-40C8FBA2FC2B}"/>
+                  <a16:creationId xmlns:a16="http://schemas.microsoft.com/office/drawing/2014/main" id="{B69C8503-1C90-4528-B997-40C8FBA2FC2B}"/>
                 </a:ext>
               </a:extLst>
             </p:cNvPr>
@@ -24131,7 +24027,7 @@
             <p:cNvPr id="110" name="Rectangle 109">
               <a:extLst>
                 <a:ext uri="{FF2B5EF4-FFF2-40B4-BE49-F238E27FC236}">
-                  <a16:creationId xmlns:a16="http://schemas.microsoft.com/office/drawing/2014/main" xmlns="" id="{60BD8BEC-8D15-460D-AAC6-DDD94FD7734C}"/>
+                  <a16:creationId xmlns:a16="http://schemas.microsoft.com/office/drawing/2014/main" id="{60BD8BEC-8D15-460D-AAC6-DDD94FD7734C}"/>
                 </a:ext>
               </a:extLst>
             </p:cNvPr>
@@ -24186,7 +24082,7 @@
           <p:cNvPr id="111" name="Group 110">
             <a:extLst>
               <a:ext uri="{FF2B5EF4-FFF2-40B4-BE49-F238E27FC236}">
-                <a16:creationId xmlns:a16="http://schemas.microsoft.com/office/drawing/2014/main" xmlns="" id="{AF3A3A3E-82A2-44AB-B341-0828444899BB}"/>
+                <a16:creationId xmlns:a16="http://schemas.microsoft.com/office/drawing/2014/main" id="{AF3A3A3E-82A2-44AB-B341-0828444899BB}"/>
               </a:ext>
             </a:extLst>
           </p:cNvPr>
@@ -24206,7 +24102,7 @@
             <p:cNvPr id="112" name="Rectangle 111">
               <a:extLst>
                 <a:ext uri="{FF2B5EF4-FFF2-40B4-BE49-F238E27FC236}">
-                  <a16:creationId xmlns:a16="http://schemas.microsoft.com/office/drawing/2014/main" xmlns="" id="{CD09AB16-0F5F-4E51-A2F2-02AE1A63BAFE}"/>
+                  <a16:creationId xmlns:a16="http://schemas.microsoft.com/office/drawing/2014/main" id="{CD09AB16-0F5F-4E51-A2F2-02AE1A63BAFE}"/>
                 </a:ext>
               </a:extLst>
             </p:cNvPr>
@@ -24262,7 +24158,7 @@
             <p:cNvPr id="113" name="Rectangle 112">
               <a:extLst>
                 <a:ext uri="{FF2B5EF4-FFF2-40B4-BE49-F238E27FC236}">
-                  <a16:creationId xmlns:a16="http://schemas.microsoft.com/office/drawing/2014/main" xmlns="" id="{21C4174B-77B7-4633-AA76-4BC4A90F15F8}"/>
+                  <a16:creationId xmlns:a16="http://schemas.microsoft.com/office/drawing/2014/main" id="{21C4174B-77B7-4633-AA76-4BC4A90F15F8}"/>
                 </a:ext>
               </a:extLst>
             </p:cNvPr>
@@ -24316,7 +24212,7 @@
             <p:cNvPr id="114" name="Rectangle 113">
               <a:extLst>
                 <a:ext uri="{FF2B5EF4-FFF2-40B4-BE49-F238E27FC236}">
-                  <a16:creationId xmlns:a16="http://schemas.microsoft.com/office/drawing/2014/main" xmlns="" id="{507E7324-4559-48EF-85EE-99BE143F9800}"/>
+                  <a16:creationId xmlns:a16="http://schemas.microsoft.com/office/drawing/2014/main" id="{507E7324-4559-48EF-85EE-99BE143F9800}"/>
                 </a:ext>
               </a:extLst>
             </p:cNvPr>
@@ -24371,7 +24267,7 @@
           <p:cNvPr id="115" name="Group 114">
             <a:extLst>
               <a:ext uri="{FF2B5EF4-FFF2-40B4-BE49-F238E27FC236}">
-                <a16:creationId xmlns:a16="http://schemas.microsoft.com/office/drawing/2014/main" xmlns="" id="{BCE1673F-7C2A-44DE-8675-A371ABC0FAFF}"/>
+                <a16:creationId xmlns:a16="http://schemas.microsoft.com/office/drawing/2014/main" id="{BCE1673F-7C2A-44DE-8675-A371ABC0FAFF}"/>
               </a:ext>
             </a:extLst>
           </p:cNvPr>
@@ -24391,7 +24287,7 @@
             <p:cNvPr id="116" name="Rectangle 115">
               <a:extLst>
                 <a:ext uri="{FF2B5EF4-FFF2-40B4-BE49-F238E27FC236}">
-                  <a16:creationId xmlns:a16="http://schemas.microsoft.com/office/drawing/2014/main" xmlns="" id="{96A4D985-749B-4056-B803-480A56FB4B39}"/>
+                  <a16:creationId xmlns:a16="http://schemas.microsoft.com/office/drawing/2014/main" id="{96A4D985-749B-4056-B803-480A56FB4B39}"/>
                 </a:ext>
               </a:extLst>
             </p:cNvPr>
@@ -24447,7 +24343,7 @@
             <p:cNvPr id="117" name="Rectangle 116">
               <a:extLst>
                 <a:ext uri="{FF2B5EF4-FFF2-40B4-BE49-F238E27FC236}">
-                  <a16:creationId xmlns:a16="http://schemas.microsoft.com/office/drawing/2014/main" xmlns="" id="{1E45C74E-9151-4668-9B08-BCE77E0DEA1D}"/>
+                  <a16:creationId xmlns:a16="http://schemas.microsoft.com/office/drawing/2014/main" id="{1E45C74E-9151-4668-9B08-BCE77E0DEA1D}"/>
                 </a:ext>
               </a:extLst>
             </p:cNvPr>
@@ -24501,7 +24397,7 @@
             <p:cNvPr id="118" name="Rectangle 117">
               <a:extLst>
                 <a:ext uri="{FF2B5EF4-FFF2-40B4-BE49-F238E27FC236}">
-                  <a16:creationId xmlns:a16="http://schemas.microsoft.com/office/drawing/2014/main" xmlns="" id="{9057D8E6-5106-4AE2-B962-A8EFBD19B23B}"/>
+                  <a16:creationId xmlns:a16="http://schemas.microsoft.com/office/drawing/2014/main" id="{9057D8E6-5106-4AE2-B962-A8EFBD19B23B}"/>
                 </a:ext>
               </a:extLst>
             </p:cNvPr>
@@ -24556,7 +24452,7 @@
           <p:cNvPr id="119" name="Group 118">
             <a:extLst>
               <a:ext uri="{FF2B5EF4-FFF2-40B4-BE49-F238E27FC236}">
-                <a16:creationId xmlns:a16="http://schemas.microsoft.com/office/drawing/2014/main" xmlns="" id="{FBBCED85-9120-499D-B32D-282C614615DF}"/>
+                <a16:creationId xmlns:a16="http://schemas.microsoft.com/office/drawing/2014/main" id="{FBBCED85-9120-499D-B32D-282C614615DF}"/>
               </a:ext>
             </a:extLst>
           </p:cNvPr>
@@ -24576,7 +24472,7 @@
             <p:cNvPr id="120" name="Rectangle 119">
               <a:extLst>
                 <a:ext uri="{FF2B5EF4-FFF2-40B4-BE49-F238E27FC236}">
-                  <a16:creationId xmlns:a16="http://schemas.microsoft.com/office/drawing/2014/main" xmlns="" id="{FFDDF095-C7D2-4206-8CCB-DC1DA9F7792B}"/>
+                  <a16:creationId xmlns:a16="http://schemas.microsoft.com/office/drawing/2014/main" id="{FFDDF095-C7D2-4206-8CCB-DC1DA9F7792B}"/>
                 </a:ext>
               </a:extLst>
             </p:cNvPr>
@@ -24632,7 +24528,7 @@
             <p:cNvPr id="121" name="Rectangle 120">
               <a:extLst>
                 <a:ext uri="{FF2B5EF4-FFF2-40B4-BE49-F238E27FC236}">
-                  <a16:creationId xmlns:a16="http://schemas.microsoft.com/office/drawing/2014/main" xmlns="" id="{86FAB6CB-F868-4CB9-9C3F-CFAB78301E3D}"/>
+                  <a16:creationId xmlns:a16="http://schemas.microsoft.com/office/drawing/2014/main" id="{86FAB6CB-F868-4CB9-9C3F-CFAB78301E3D}"/>
                 </a:ext>
               </a:extLst>
             </p:cNvPr>
@@ -24686,7 +24582,7 @@
             <p:cNvPr id="122" name="Rectangle 121">
               <a:extLst>
                 <a:ext uri="{FF2B5EF4-FFF2-40B4-BE49-F238E27FC236}">
-                  <a16:creationId xmlns:a16="http://schemas.microsoft.com/office/drawing/2014/main" xmlns="" id="{4CE5F8D3-5C12-4AEC-8DA1-E89EABEFD2E0}"/>
+                  <a16:creationId xmlns:a16="http://schemas.microsoft.com/office/drawing/2014/main" id="{4CE5F8D3-5C12-4AEC-8DA1-E89EABEFD2E0}"/>
                 </a:ext>
               </a:extLst>
             </p:cNvPr>
@@ -24741,7 +24637,7 @@
           <p:cNvPr id="123" name="Straight Connector 122">
             <a:extLst>
               <a:ext uri="{FF2B5EF4-FFF2-40B4-BE49-F238E27FC236}">
-                <a16:creationId xmlns:a16="http://schemas.microsoft.com/office/drawing/2014/main" xmlns="" id="{1A0B7294-0B67-4368-9293-D9F7009B597F}"/>
+                <a16:creationId xmlns:a16="http://schemas.microsoft.com/office/drawing/2014/main" id="{1A0B7294-0B67-4368-9293-D9F7009B597F}"/>
               </a:ext>
             </a:extLst>
           </p:cNvPr>
@@ -24787,7 +24683,7 @@
           <p:cNvPr id="125" name="Straight Connector 124">
             <a:extLst>
               <a:ext uri="{FF2B5EF4-FFF2-40B4-BE49-F238E27FC236}">
-                <a16:creationId xmlns:a16="http://schemas.microsoft.com/office/drawing/2014/main" xmlns="" id="{6170125F-BC10-4487-BC0A-87812AA23F38}"/>
+                <a16:creationId xmlns:a16="http://schemas.microsoft.com/office/drawing/2014/main" id="{6170125F-BC10-4487-BC0A-87812AA23F38}"/>
               </a:ext>
             </a:extLst>
           </p:cNvPr>
@@ -24833,7 +24729,7 @@
           <p:cNvPr id="127" name="Straight Connector 126">
             <a:extLst>
               <a:ext uri="{FF2B5EF4-FFF2-40B4-BE49-F238E27FC236}">
-                <a16:creationId xmlns:a16="http://schemas.microsoft.com/office/drawing/2014/main" xmlns="" id="{DBEFB81E-C2E9-45AE-BBFF-A848F52864EF}"/>
+                <a16:creationId xmlns:a16="http://schemas.microsoft.com/office/drawing/2014/main" id="{DBEFB81E-C2E9-45AE-BBFF-A848F52864EF}"/>
               </a:ext>
             </a:extLst>
           </p:cNvPr>
@@ -24879,7 +24775,7 @@
           <p:cNvPr id="129" name="Straight Connector 128">
             <a:extLst>
               <a:ext uri="{FF2B5EF4-FFF2-40B4-BE49-F238E27FC236}">
-                <a16:creationId xmlns:a16="http://schemas.microsoft.com/office/drawing/2014/main" xmlns="" id="{3E973232-5460-4BB0-B496-1E1EFE8A7C59}"/>
+                <a16:creationId xmlns:a16="http://schemas.microsoft.com/office/drawing/2014/main" id="{3E973232-5460-4BB0-B496-1E1EFE8A7C59}"/>
               </a:ext>
             </a:extLst>
           </p:cNvPr>
@@ -24925,7 +24821,7 @@
           <p:cNvPr id="132" name="Straight Connector 131">
             <a:extLst>
               <a:ext uri="{FF2B5EF4-FFF2-40B4-BE49-F238E27FC236}">
-                <a16:creationId xmlns:a16="http://schemas.microsoft.com/office/drawing/2014/main" xmlns="" id="{620B048A-61B0-4E3A-BF1C-D0C0EBC563B5}"/>
+                <a16:creationId xmlns:a16="http://schemas.microsoft.com/office/drawing/2014/main" id="{620B048A-61B0-4E3A-BF1C-D0C0EBC563B5}"/>
               </a:ext>
             </a:extLst>
           </p:cNvPr>
@@ -24971,7 +24867,7 @@
           <p:cNvPr id="134" name="Straight Connector 133">
             <a:extLst>
               <a:ext uri="{FF2B5EF4-FFF2-40B4-BE49-F238E27FC236}">
-                <a16:creationId xmlns:a16="http://schemas.microsoft.com/office/drawing/2014/main" xmlns="" id="{FC77DA65-9C2F-4878-96CA-C4646F1EA32E}"/>
+                <a16:creationId xmlns:a16="http://schemas.microsoft.com/office/drawing/2014/main" id="{FC77DA65-9C2F-4878-96CA-C4646F1EA32E}"/>
               </a:ext>
             </a:extLst>
           </p:cNvPr>
@@ -25017,7 +24913,7 @@
           <p:cNvPr id="136" name="Rectangle 135">
             <a:extLst>
               <a:ext uri="{FF2B5EF4-FFF2-40B4-BE49-F238E27FC236}">
-                <a16:creationId xmlns:a16="http://schemas.microsoft.com/office/drawing/2014/main" xmlns="" id="{617D824C-5F23-4B55-A50E-5501A1BC9D66}"/>
+                <a16:creationId xmlns:a16="http://schemas.microsoft.com/office/drawing/2014/main" id="{617D824C-5F23-4B55-A50E-5501A1BC9D66}"/>
               </a:ext>
             </a:extLst>
           </p:cNvPr>
@@ -25060,7 +24956,7 @@
           <p:cNvPr id="137" name="Group 136">
             <a:extLst>
               <a:ext uri="{FF2B5EF4-FFF2-40B4-BE49-F238E27FC236}">
-                <a16:creationId xmlns:a16="http://schemas.microsoft.com/office/drawing/2014/main" xmlns="" id="{CF1C29A0-0434-4CCC-8A6A-AFD1A7DF29BB}"/>
+                <a16:creationId xmlns:a16="http://schemas.microsoft.com/office/drawing/2014/main" id="{CF1C29A0-0434-4CCC-8A6A-AFD1A7DF29BB}"/>
               </a:ext>
             </a:extLst>
           </p:cNvPr>
@@ -25080,7 +24976,7 @@
             <p:cNvPr id="138" name="Rectangle 137">
               <a:extLst>
                 <a:ext uri="{FF2B5EF4-FFF2-40B4-BE49-F238E27FC236}">
-                  <a16:creationId xmlns:a16="http://schemas.microsoft.com/office/drawing/2014/main" xmlns="" id="{33AAA53A-C957-4B5A-B16D-720DF9BE205C}"/>
+                  <a16:creationId xmlns:a16="http://schemas.microsoft.com/office/drawing/2014/main" id="{33AAA53A-C957-4B5A-B16D-720DF9BE205C}"/>
                 </a:ext>
               </a:extLst>
             </p:cNvPr>
@@ -25136,7 +25032,7 @@
             <p:cNvPr id="139" name="Rectangle 138">
               <a:extLst>
                 <a:ext uri="{FF2B5EF4-FFF2-40B4-BE49-F238E27FC236}">
-                  <a16:creationId xmlns:a16="http://schemas.microsoft.com/office/drawing/2014/main" xmlns="" id="{E80A1B97-6005-4140-8B50-E0E3F5F293F4}"/>
+                  <a16:creationId xmlns:a16="http://schemas.microsoft.com/office/drawing/2014/main" id="{E80A1B97-6005-4140-8B50-E0E3F5F293F4}"/>
                 </a:ext>
               </a:extLst>
             </p:cNvPr>
@@ -25190,7 +25086,7 @@
             <p:cNvPr id="140" name="Rectangle 139">
               <a:extLst>
                 <a:ext uri="{FF2B5EF4-FFF2-40B4-BE49-F238E27FC236}">
-                  <a16:creationId xmlns:a16="http://schemas.microsoft.com/office/drawing/2014/main" xmlns="" id="{A66DE1DD-10F2-4CFA-9ECD-D01722FE86F2}"/>
+                  <a16:creationId xmlns:a16="http://schemas.microsoft.com/office/drawing/2014/main" id="{A66DE1DD-10F2-4CFA-9ECD-D01722FE86F2}"/>
                 </a:ext>
               </a:extLst>
             </p:cNvPr>
@@ -25245,7 +25141,7 @@
           <p:cNvPr id="141" name="Group 140">
             <a:extLst>
               <a:ext uri="{FF2B5EF4-FFF2-40B4-BE49-F238E27FC236}">
-                <a16:creationId xmlns:a16="http://schemas.microsoft.com/office/drawing/2014/main" xmlns="" id="{967D4F39-C61F-47A4-B9DB-650E7754FA42}"/>
+                <a16:creationId xmlns:a16="http://schemas.microsoft.com/office/drawing/2014/main" id="{967D4F39-C61F-47A4-B9DB-650E7754FA42}"/>
               </a:ext>
             </a:extLst>
           </p:cNvPr>
@@ -25265,7 +25161,7 @@
             <p:cNvPr id="142" name="Rectangle 141">
               <a:extLst>
                 <a:ext uri="{FF2B5EF4-FFF2-40B4-BE49-F238E27FC236}">
-                  <a16:creationId xmlns:a16="http://schemas.microsoft.com/office/drawing/2014/main" xmlns="" id="{C05992EE-4B74-446B-8E4A-53DD1A97836E}"/>
+                  <a16:creationId xmlns:a16="http://schemas.microsoft.com/office/drawing/2014/main" id="{C05992EE-4B74-446B-8E4A-53DD1A97836E}"/>
                 </a:ext>
               </a:extLst>
             </p:cNvPr>
@@ -25321,7 +25217,7 @@
             <p:cNvPr id="143" name="Rectangle 142">
               <a:extLst>
                 <a:ext uri="{FF2B5EF4-FFF2-40B4-BE49-F238E27FC236}">
-                  <a16:creationId xmlns:a16="http://schemas.microsoft.com/office/drawing/2014/main" xmlns="" id="{F82FE5FE-0275-4AC5-83B1-3844D067251E}"/>
+                  <a16:creationId xmlns:a16="http://schemas.microsoft.com/office/drawing/2014/main" id="{F82FE5FE-0275-4AC5-83B1-3844D067251E}"/>
                 </a:ext>
               </a:extLst>
             </p:cNvPr>
@@ -25375,7 +25271,7 @@
             <p:cNvPr id="144" name="Rectangle 143">
               <a:extLst>
                 <a:ext uri="{FF2B5EF4-FFF2-40B4-BE49-F238E27FC236}">
-                  <a16:creationId xmlns:a16="http://schemas.microsoft.com/office/drawing/2014/main" xmlns="" id="{DC81E49B-3796-47D3-96B2-03FFAB1F18EE}"/>
+                  <a16:creationId xmlns:a16="http://schemas.microsoft.com/office/drawing/2014/main" id="{DC81E49B-3796-47D3-96B2-03FFAB1F18EE}"/>
                 </a:ext>
               </a:extLst>
             </p:cNvPr>
@@ -25430,7 +25326,7 @@
           <p:cNvPr id="145" name="Straight Connector 144">
             <a:extLst>
               <a:ext uri="{FF2B5EF4-FFF2-40B4-BE49-F238E27FC236}">
-                <a16:creationId xmlns:a16="http://schemas.microsoft.com/office/drawing/2014/main" xmlns="" id="{60E0FC48-CC90-4BCD-B106-6EAA449D5219}"/>
+                <a16:creationId xmlns:a16="http://schemas.microsoft.com/office/drawing/2014/main" id="{60E0FC48-CC90-4BCD-B106-6EAA449D5219}"/>
               </a:ext>
             </a:extLst>
           </p:cNvPr>
@@ -25476,7 +25372,7 @@
           <p:cNvPr id="147" name="Straight Connector 146">
             <a:extLst>
               <a:ext uri="{FF2B5EF4-FFF2-40B4-BE49-F238E27FC236}">
-                <a16:creationId xmlns:a16="http://schemas.microsoft.com/office/drawing/2014/main" xmlns="" id="{296D3F54-A6CA-4543-887C-EE0ADBBBD802}"/>
+                <a16:creationId xmlns:a16="http://schemas.microsoft.com/office/drawing/2014/main" id="{296D3F54-A6CA-4543-887C-EE0ADBBBD802}"/>
               </a:ext>
             </a:extLst>
           </p:cNvPr>
@@ -25522,7 +25418,7 @@
           <p:cNvPr id="150" name="Rectangle 149">
             <a:extLst>
               <a:ext uri="{FF2B5EF4-FFF2-40B4-BE49-F238E27FC236}">
-                <a16:creationId xmlns:a16="http://schemas.microsoft.com/office/drawing/2014/main" xmlns="" id="{8C1C3700-0CDD-4AA7-AD10-D16B0C42B27A}"/>
+                <a16:creationId xmlns:a16="http://schemas.microsoft.com/office/drawing/2014/main" id="{8C1C3700-0CDD-4AA7-AD10-D16B0C42B27A}"/>
               </a:ext>
             </a:extLst>
           </p:cNvPr>
@@ -25576,7 +25472,7 @@
           <p:cNvPr id="151" name="Rectangle 150">
             <a:extLst>
               <a:ext uri="{FF2B5EF4-FFF2-40B4-BE49-F238E27FC236}">
-                <a16:creationId xmlns:a16="http://schemas.microsoft.com/office/drawing/2014/main" xmlns="" id="{2F9971B5-F97B-48C5-A359-DE29289F3691}"/>
+                <a16:creationId xmlns:a16="http://schemas.microsoft.com/office/drawing/2014/main" id="{2F9971B5-F97B-48C5-A359-DE29289F3691}"/>
               </a:ext>
             </a:extLst>
           </p:cNvPr>
@@ -25614,7 +25510,7 @@
           <p:cNvPr id="153" name="Rectangle 152">
             <a:extLst>
               <a:ext uri="{FF2B5EF4-FFF2-40B4-BE49-F238E27FC236}">
-                <a16:creationId xmlns:a16="http://schemas.microsoft.com/office/drawing/2014/main" xmlns="" id="{C3F9E766-6B1A-461B-9524-C2CC2A772BB9}"/>
+                <a16:creationId xmlns:a16="http://schemas.microsoft.com/office/drawing/2014/main" id="{C3F9E766-6B1A-461B-9524-C2CC2A772BB9}"/>
               </a:ext>
             </a:extLst>
           </p:cNvPr>
@@ -25668,7 +25564,7 @@
           <p:cNvPr id="154" name="Rectangle 153">
             <a:extLst>
               <a:ext uri="{FF2B5EF4-FFF2-40B4-BE49-F238E27FC236}">
-                <a16:creationId xmlns:a16="http://schemas.microsoft.com/office/drawing/2014/main" xmlns="" id="{37BC63D4-5013-4717-BF24-9D22F80351B1}"/>
+                <a16:creationId xmlns:a16="http://schemas.microsoft.com/office/drawing/2014/main" id="{37BC63D4-5013-4717-BF24-9D22F80351B1}"/>
               </a:ext>
             </a:extLst>
           </p:cNvPr>
@@ -25706,7 +25602,7 @@
           <p:cNvPr id="155" name="Rectangle 154">
             <a:extLst>
               <a:ext uri="{FF2B5EF4-FFF2-40B4-BE49-F238E27FC236}">
-                <a16:creationId xmlns:a16="http://schemas.microsoft.com/office/drawing/2014/main" xmlns="" id="{5D1518F9-1B64-4B1D-AB44-4C8FB2A63992}"/>
+                <a16:creationId xmlns:a16="http://schemas.microsoft.com/office/drawing/2014/main" id="{5D1518F9-1B64-4B1D-AB44-4C8FB2A63992}"/>
               </a:ext>
             </a:extLst>
           </p:cNvPr>
@@ -25760,7 +25656,7 @@
           <p:cNvPr id="156" name="Rectangle 155">
             <a:extLst>
               <a:ext uri="{FF2B5EF4-FFF2-40B4-BE49-F238E27FC236}">
-                <a16:creationId xmlns:a16="http://schemas.microsoft.com/office/drawing/2014/main" xmlns="" id="{B5F5C08B-1AFD-4916-9AA6-3FAA2CE0B281}"/>
+                <a16:creationId xmlns:a16="http://schemas.microsoft.com/office/drawing/2014/main" id="{B5F5C08B-1AFD-4916-9AA6-3FAA2CE0B281}"/>
               </a:ext>
             </a:extLst>
           </p:cNvPr>
@@ -25798,7 +25694,7 @@
           <p:cNvPr id="157" name="Rectangle 156">
             <a:extLst>
               <a:ext uri="{FF2B5EF4-FFF2-40B4-BE49-F238E27FC236}">
-                <a16:creationId xmlns:a16="http://schemas.microsoft.com/office/drawing/2014/main" xmlns="" id="{0D9B2368-3D66-4F16-8C56-BFA12DA73810}"/>
+                <a16:creationId xmlns:a16="http://schemas.microsoft.com/office/drawing/2014/main" id="{0D9B2368-3D66-4F16-8C56-BFA12DA73810}"/>
               </a:ext>
             </a:extLst>
           </p:cNvPr>
@@ -25839,7 +25735,7 @@
           <p:cNvPr id="158" name="Straight Connector 157">
             <a:extLst>
               <a:ext uri="{FF2B5EF4-FFF2-40B4-BE49-F238E27FC236}">
-                <a16:creationId xmlns:a16="http://schemas.microsoft.com/office/drawing/2014/main" xmlns="" id="{2200D39C-0C04-4D17-BFBA-EBCD8A568A28}"/>
+                <a16:creationId xmlns:a16="http://schemas.microsoft.com/office/drawing/2014/main" id="{2200D39C-0C04-4D17-BFBA-EBCD8A568A28}"/>
               </a:ext>
             </a:extLst>
           </p:cNvPr>
@@ -25885,7 +25781,7 @@
           <p:cNvPr id="161" name="Rectangle 160">
             <a:extLst>
               <a:ext uri="{FF2B5EF4-FFF2-40B4-BE49-F238E27FC236}">
-                <a16:creationId xmlns:a16="http://schemas.microsoft.com/office/drawing/2014/main" xmlns="" id="{D54B475D-F2DF-47E0-A493-7F8E0E32B006}"/>
+                <a16:creationId xmlns:a16="http://schemas.microsoft.com/office/drawing/2014/main" id="{D54B475D-F2DF-47E0-A493-7F8E0E32B006}"/>
               </a:ext>
             </a:extLst>
           </p:cNvPr>
@@ -25926,7 +25822,7 @@
           <p:cNvPr id="162" name="Straight Connector 161">
             <a:extLst>
               <a:ext uri="{FF2B5EF4-FFF2-40B4-BE49-F238E27FC236}">
-                <a16:creationId xmlns:a16="http://schemas.microsoft.com/office/drawing/2014/main" xmlns="" id="{E66AD3B3-28EE-44F9-9E83-E3469196F970}"/>
+                <a16:creationId xmlns:a16="http://schemas.microsoft.com/office/drawing/2014/main" id="{E66AD3B3-28EE-44F9-9E83-E3469196F970}"/>
               </a:ext>
             </a:extLst>
           </p:cNvPr>
@@ -25972,7 +25868,7 @@
           <p:cNvPr id="166" name="Rectangle 165">
             <a:extLst>
               <a:ext uri="{FF2B5EF4-FFF2-40B4-BE49-F238E27FC236}">
-                <a16:creationId xmlns:a16="http://schemas.microsoft.com/office/drawing/2014/main" xmlns="" id="{0D97EAB7-B6E6-4B45-A497-FEE4EFE30294}"/>
+                <a16:creationId xmlns:a16="http://schemas.microsoft.com/office/drawing/2014/main" id="{0D97EAB7-B6E6-4B45-A497-FEE4EFE30294}"/>
               </a:ext>
             </a:extLst>
           </p:cNvPr>
@@ -26013,7 +25909,7 @@
           <p:cNvPr id="167" name="Straight Connector 166">
             <a:extLst>
               <a:ext uri="{FF2B5EF4-FFF2-40B4-BE49-F238E27FC236}">
-                <a16:creationId xmlns:a16="http://schemas.microsoft.com/office/drawing/2014/main" xmlns="" id="{3017B4EF-BEFA-4FC2-A7EE-9B908FDFB234}"/>
+                <a16:creationId xmlns:a16="http://schemas.microsoft.com/office/drawing/2014/main" id="{3017B4EF-BEFA-4FC2-A7EE-9B908FDFB234}"/>
               </a:ext>
             </a:extLst>
           </p:cNvPr>
@@ -26059,7 +25955,7 @@
           <p:cNvPr id="168" name="Rectangle 167">
             <a:extLst>
               <a:ext uri="{FF2B5EF4-FFF2-40B4-BE49-F238E27FC236}">
-                <a16:creationId xmlns:a16="http://schemas.microsoft.com/office/drawing/2014/main" xmlns="" id="{AE73D496-C1F5-477E-9F63-7BC75DCCB9E1}"/>
+                <a16:creationId xmlns:a16="http://schemas.microsoft.com/office/drawing/2014/main" id="{AE73D496-C1F5-477E-9F63-7BC75DCCB9E1}"/>
               </a:ext>
             </a:extLst>
           </p:cNvPr>
@@ -26111,7 +26007,7 @@
           <p:cNvPr id="169" name="Rectangle 168">
             <a:extLst>
               <a:ext uri="{FF2B5EF4-FFF2-40B4-BE49-F238E27FC236}">
-                <a16:creationId xmlns:a16="http://schemas.microsoft.com/office/drawing/2014/main" xmlns="" id="{9CA58566-F95C-4C13-8F09-4690FE2DC9A7}"/>
+                <a16:creationId xmlns:a16="http://schemas.microsoft.com/office/drawing/2014/main" id="{9CA58566-F95C-4C13-8F09-4690FE2DC9A7}"/>
               </a:ext>
             </a:extLst>
           </p:cNvPr>
@@ -26492,7 +26388,7 @@
           <p:cNvPr id="7" name="Group 6">
             <a:extLst>
               <a:ext uri="{FF2B5EF4-FFF2-40B4-BE49-F238E27FC236}">
-                <a16:creationId xmlns:a16="http://schemas.microsoft.com/office/drawing/2014/main" xmlns="" id="{A8561038-DE88-4359-BE6C-A8A161683EA4}"/>
+                <a16:creationId xmlns:a16="http://schemas.microsoft.com/office/drawing/2014/main" id="{A8561038-DE88-4359-BE6C-A8A161683EA4}"/>
               </a:ext>
             </a:extLst>
           </p:cNvPr>
@@ -26512,7 +26408,7 @@
             <p:cNvPr id="16" name="Arrow: Circular 15">
               <a:extLst>
                 <a:ext uri="{FF2B5EF4-FFF2-40B4-BE49-F238E27FC236}">
-                  <a16:creationId xmlns:a16="http://schemas.microsoft.com/office/drawing/2014/main" xmlns="" id="{F284D861-CC57-434F-AE13-62D12C205157}"/>
+                  <a16:creationId xmlns:a16="http://schemas.microsoft.com/office/drawing/2014/main" id="{F284D861-CC57-434F-AE13-62D12C205157}"/>
                 </a:ext>
               </a:extLst>
             </p:cNvPr>
@@ -26575,7 +26471,7 @@
             <p:cNvPr id="21" name="Freeform: Shape 20">
               <a:extLst>
                 <a:ext uri="{FF2B5EF4-FFF2-40B4-BE49-F238E27FC236}">
-                  <a16:creationId xmlns:a16="http://schemas.microsoft.com/office/drawing/2014/main" xmlns="" id="{569B1660-42B8-47F7-8895-3F50C17724C8}"/>
+                  <a16:creationId xmlns:a16="http://schemas.microsoft.com/office/drawing/2014/main" id="{569B1660-42B8-47F7-8895-3F50C17724C8}"/>
                 </a:ext>
               </a:extLst>
             </p:cNvPr>
@@ -26706,7 +26602,7 @@
             <p:cNvPr id="22" name="Shape 21">
               <a:extLst>
                 <a:ext uri="{FF2B5EF4-FFF2-40B4-BE49-F238E27FC236}">
-                  <a16:creationId xmlns:a16="http://schemas.microsoft.com/office/drawing/2014/main" xmlns="" id="{1DFD1396-D97A-4438-96C5-867C86C04866}"/>
+                  <a16:creationId xmlns:a16="http://schemas.microsoft.com/office/drawing/2014/main" id="{1DFD1396-D97A-4438-96C5-867C86C04866}"/>
                 </a:ext>
               </a:extLst>
             </p:cNvPr>
@@ -26769,7 +26665,7 @@
             <p:cNvPr id="23" name="Freeform: Shape 22">
               <a:extLst>
                 <a:ext uri="{FF2B5EF4-FFF2-40B4-BE49-F238E27FC236}">
-                  <a16:creationId xmlns:a16="http://schemas.microsoft.com/office/drawing/2014/main" xmlns="" id="{7DFE206A-E4B7-424E-B634-62CBE811CC85}"/>
+                  <a16:creationId xmlns:a16="http://schemas.microsoft.com/office/drawing/2014/main" id="{7DFE206A-E4B7-424E-B634-62CBE811CC85}"/>
                 </a:ext>
               </a:extLst>
             </p:cNvPr>
@@ -26900,7 +26796,7 @@
             <p:cNvPr id="24" name="Block Arc 23">
               <a:extLst>
                 <a:ext uri="{FF2B5EF4-FFF2-40B4-BE49-F238E27FC236}">
-                  <a16:creationId xmlns:a16="http://schemas.microsoft.com/office/drawing/2014/main" xmlns="" id="{3617736B-EF56-44F0-89DD-052CDFB8A126}"/>
+                  <a16:creationId xmlns:a16="http://schemas.microsoft.com/office/drawing/2014/main" id="{3617736B-EF56-44F0-89DD-052CDFB8A126}"/>
                 </a:ext>
               </a:extLst>
             </p:cNvPr>
@@ -26961,7 +26857,7 @@
             <p:cNvPr id="25" name="Freeform: Shape 24">
               <a:extLst>
                 <a:ext uri="{FF2B5EF4-FFF2-40B4-BE49-F238E27FC236}">
-                  <a16:creationId xmlns:a16="http://schemas.microsoft.com/office/drawing/2014/main" xmlns="" id="{5F534E20-4911-4D0C-A42B-770F92F117B5}"/>
+                  <a16:creationId xmlns:a16="http://schemas.microsoft.com/office/drawing/2014/main" id="{5F534E20-4911-4D0C-A42B-770F92F117B5}"/>
                 </a:ext>
               </a:extLst>
             </p:cNvPr>
@@ -27093,7 +26989,7 @@
           <p:cNvPr id="40" name="Arrow: Right 39">
             <a:extLst>
               <a:ext uri="{FF2B5EF4-FFF2-40B4-BE49-F238E27FC236}">
-                <a16:creationId xmlns:a16="http://schemas.microsoft.com/office/drawing/2014/main" xmlns="" id="{AB7C45BA-0078-4BA1-A2B3-BC9A66ACD955}"/>
+                <a16:creationId xmlns:a16="http://schemas.microsoft.com/office/drawing/2014/main" id="{AB7C45BA-0078-4BA1-A2B3-BC9A66ACD955}"/>
               </a:ext>
             </a:extLst>
           </p:cNvPr>
@@ -27145,7 +27041,7 @@
           <p:cNvPr id="12" name="Picture 11" descr="A picture containing outdoor object&#10;&#10;Description generated with high confidence">
             <a:extLst>
               <a:ext uri="{FF2B5EF4-FFF2-40B4-BE49-F238E27FC236}">
-                <a16:creationId xmlns:a16="http://schemas.microsoft.com/office/drawing/2014/main" xmlns="" id="{684713F9-9ECF-4663-A027-A6113FA71893}"/>
+                <a16:creationId xmlns:a16="http://schemas.microsoft.com/office/drawing/2014/main" id="{684713F9-9ECF-4663-A027-A6113FA71893}"/>
               </a:ext>
             </a:extLst>
           </p:cNvPr>
@@ -27181,7 +27077,7 @@
           <p:cNvPr id="26" name="Rectangle 25">
             <a:extLst>
               <a:ext uri="{FF2B5EF4-FFF2-40B4-BE49-F238E27FC236}">
-                <a16:creationId xmlns:a16="http://schemas.microsoft.com/office/drawing/2014/main" xmlns="" id="{BB49DDA5-5677-40D8-B6EC-AF518F4EF4C9}"/>
+                <a16:creationId xmlns:a16="http://schemas.microsoft.com/office/drawing/2014/main" id="{BB49DDA5-5677-40D8-B6EC-AF518F4EF4C9}"/>
               </a:ext>
             </a:extLst>
           </p:cNvPr>
@@ -27239,7 +27135,7 @@
           <p:cNvPr id="57" name="Rectangle 56">
             <a:extLst>
               <a:ext uri="{FF2B5EF4-FFF2-40B4-BE49-F238E27FC236}">
-                <a16:creationId xmlns:a16="http://schemas.microsoft.com/office/drawing/2014/main" xmlns="" id="{48C55BC0-B2B6-499C-829C-664985214C5E}"/>
+                <a16:creationId xmlns:a16="http://schemas.microsoft.com/office/drawing/2014/main" id="{48C55BC0-B2B6-499C-829C-664985214C5E}"/>
               </a:ext>
             </a:extLst>
           </p:cNvPr>
@@ -27297,7 +27193,7 @@
           <p:cNvPr id="27" name="Rectangle 26">
             <a:extLst>
               <a:ext uri="{FF2B5EF4-FFF2-40B4-BE49-F238E27FC236}">
-                <a16:creationId xmlns:a16="http://schemas.microsoft.com/office/drawing/2014/main" xmlns="" id="{5A55CB4F-5432-46E9-93D9-15090BEF7BC3}"/>
+                <a16:creationId xmlns:a16="http://schemas.microsoft.com/office/drawing/2014/main" id="{5A55CB4F-5432-46E9-93D9-15090BEF7BC3}"/>
               </a:ext>
             </a:extLst>
           </p:cNvPr>
@@ -27349,7 +27245,7 @@
           <p:cNvPr id="59" name="Rectangle 58">
             <a:extLst>
               <a:ext uri="{FF2B5EF4-FFF2-40B4-BE49-F238E27FC236}">
-                <a16:creationId xmlns:a16="http://schemas.microsoft.com/office/drawing/2014/main" xmlns="" id="{82A87F86-E4B1-4EDF-A870-C3D51B76494E}"/>
+                <a16:creationId xmlns:a16="http://schemas.microsoft.com/office/drawing/2014/main" id="{82A87F86-E4B1-4EDF-A870-C3D51B76494E}"/>
               </a:ext>
             </a:extLst>
           </p:cNvPr>
@@ -27422,7 +27318,7 @@
           <p:cNvPr id="28" name="Rectangle 27">
             <a:extLst>
               <a:ext uri="{FF2B5EF4-FFF2-40B4-BE49-F238E27FC236}">
-                <a16:creationId xmlns:a16="http://schemas.microsoft.com/office/drawing/2014/main" xmlns="" id="{0C902A55-E171-462C-91BF-53B8EC2B1CED}"/>
+                <a16:creationId xmlns:a16="http://schemas.microsoft.com/office/drawing/2014/main" id="{0C902A55-E171-462C-91BF-53B8EC2B1CED}"/>
               </a:ext>
             </a:extLst>
           </p:cNvPr>
@@ -27463,7 +27359,7 @@
           <p:cNvPr id="61" name="Picture 9">
             <a:extLst>
               <a:ext uri="{FF2B5EF4-FFF2-40B4-BE49-F238E27FC236}">
-                <a16:creationId xmlns:a16="http://schemas.microsoft.com/office/drawing/2014/main" xmlns="" id="{7CA4DCD7-E1D7-43ED-A034-F7B8A33E4482}"/>
+                <a16:creationId xmlns:a16="http://schemas.microsoft.com/office/drawing/2014/main" id="{7CA4DCD7-E1D7-43ED-A034-F7B8A33E4482}"/>
               </a:ext>
             </a:extLst>
           </p:cNvPr>
@@ -27523,7 +27419,7 @@
           <p:cNvPr id="62" name="Picture 9">
             <a:extLst>
               <a:ext uri="{FF2B5EF4-FFF2-40B4-BE49-F238E27FC236}">
-                <a16:creationId xmlns:a16="http://schemas.microsoft.com/office/drawing/2014/main" xmlns="" id="{3E15DB23-C9A8-4D02-AED9-52AE9E42BC6F}"/>
+                <a16:creationId xmlns:a16="http://schemas.microsoft.com/office/drawing/2014/main" id="{3E15DB23-C9A8-4D02-AED9-52AE9E42BC6F}"/>
               </a:ext>
             </a:extLst>
           </p:cNvPr>
@@ -27583,7 +27479,7 @@
           <p:cNvPr id="63" name="Picture 9">
             <a:extLst>
               <a:ext uri="{FF2B5EF4-FFF2-40B4-BE49-F238E27FC236}">
-                <a16:creationId xmlns:a16="http://schemas.microsoft.com/office/drawing/2014/main" xmlns="" id="{F13E6F69-4653-4FC6-B420-2A3711660161}"/>
+                <a16:creationId xmlns:a16="http://schemas.microsoft.com/office/drawing/2014/main" id="{F13E6F69-4653-4FC6-B420-2A3711660161}"/>
               </a:ext>
             </a:extLst>
           </p:cNvPr>
@@ -27643,7 +27539,7 @@
           <p:cNvPr id="64" name="Picture 9">
             <a:extLst>
               <a:ext uri="{FF2B5EF4-FFF2-40B4-BE49-F238E27FC236}">
-                <a16:creationId xmlns:a16="http://schemas.microsoft.com/office/drawing/2014/main" xmlns="" id="{E58CD232-697B-4057-87B5-C852ACD14980}"/>
+                <a16:creationId xmlns:a16="http://schemas.microsoft.com/office/drawing/2014/main" id="{E58CD232-697B-4057-87B5-C852ACD14980}"/>
               </a:ext>
             </a:extLst>
           </p:cNvPr>
@@ -27703,7 +27599,7 @@
           <p:cNvPr id="65" name="Picture 9">
             <a:extLst>
               <a:ext uri="{FF2B5EF4-FFF2-40B4-BE49-F238E27FC236}">
-                <a16:creationId xmlns:a16="http://schemas.microsoft.com/office/drawing/2014/main" xmlns="" id="{55FA8B74-483B-4E18-A676-08845700F1B6}"/>
+                <a16:creationId xmlns:a16="http://schemas.microsoft.com/office/drawing/2014/main" id="{55FA8B74-483B-4E18-A676-08845700F1B6}"/>
               </a:ext>
             </a:extLst>
           </p:cNvPr>
@@ -27763,7 +27659,7 @@
           <p:cNvPr id="66" name="Picture 9">
             <a:extLst>
               <a:ext uri="{FF2B5EF4-FFF2-40B4-BE49-F238E27FC236}">
-                <a16:creationId xmlns:a16="http://schemas.microsoft.com/office/drawing/2014/main" xmlns="" id="{A6A6836D-4520-4E4E-8C8D-4E2DB3C2CF9F}"/>
+                <a16:creationId xmlns:a16="http://schemas.microsoft.com/office/drawing/2014/main" id="{A6A6836D-4520-4E4E-8C8D-4E2DB3C2CF9F}"/>
               </a:ext>
             </a:extLst>
           </p:cNvPr>
@@ -27823,7 +27719,7 @@
           <p:cNvPr id="73" name="Arrow: Right 72">
             <a:extLst>
               <a:ext uri="{FF2B5EF4-FFF2-40B4-BE49-F238E27FC236}">
-                <a16:creationId xmlns:a16="http://schemas.microsoft.com/office/drawing/2014/main" xmlns="" id="{8B51D19B-ED16-4D8F-91D9-264400D26995}"/>
+                <a16:creationId xmlns:a16="http://schemas.microsoft.com/office/drawing/2014/main" id="{8B51D19B-ED16-4D8F-91D9-264400D26995}"/>
               </a:ext>
             </a:extLst>
           </p:cNvPr>
@@ -27875,7 +27771,7 @@
           <p:cNvPr id="74" name="Rectangle 73">
             <a:extLst>
               <a:ext uri="{FF2B5EF4-FFF2-40B4-BE49-F238E27FC236}">
-                <a16:creationId xmlns:a16="http://schemas.microsoft.com/office/drawing/2014/main" xmlns="" id="{8C49519C-8ED0-42A2-827B-8EFE26EFEC6C}"/>
+                <a16:creationId xmlns:a16="http://schemas.microsoft.com/office/drawing/2014/main" id="{8C49519C-8ED0-42A2-827B-8EFE26EFEC6C}"/>
               </a:ext>
             </a:extLst>
           </p:cNvPr>
@@ -27933,7 +27829,7 @@
           <p:cNvPr id="41" name="Picture 40" descr="A close up of a logo&#10;&#10;Description generated with high confidence">
             <a:extLst>
               <a:ext uri="{FF2B5EF4-FFF2-40B4-BE49-F238E27FC236}">
-                <a16:creationId xmlns:a16="http://schemas.microsoft.com/office/drawing/2014/main" xmlns="" id="{1B1A1B10-88A1-4127-BDDC-654E374590CB}"/>
+                <a16:creationId xmlns:a16="http://schemas.microsoft.com/office/drawing/2014/main" id="{1B1A1B10-88A1-4127-BDDC-654E374590CB}"/>
               </a:ext>
             </a:extLst>
           </p:cNvPr>
@@ -27949,7 +27845,7 @@
                 <a14:useLocalDpi xmlns:a14="http://schemas.microsoft.com/office/drawing/2010/main" val="0"/>
               </a:ext>
               <a:ext uri="{837473B0-CC2E-450A-ABE3-18F120FF3D39}">
-                <a1611:picAttrSrcUrl xmlns:a1611="http://schemas.microsoft.com/office/drawing/2016/11/main" xmlns="" r:id="rId5"/>
+                <a1611:picAttrSrcUrl xmlns:a1611="http://schemas.microsoft.com/office/drawing/2016/11/main" r:id="rId5"/>
               </a:ext>
             </a:extLst>
           </a:blip>
@@ -27972,7 +27868,7 @@
           <p:cNvPr id="51" name="Picture 50" descr="A close up of a logo&#10;&#10;Description generated with very high confidence">
             <a:extLst>
               <a:ext uri="{FF2B5EF4-FFF2-40B4-BE49-F238E27FC236}">
-                <a16:creationId xmlns:a16="http://schemas.microsoft.com/office/drawing/2014/main" xmlns="" id="{12DB071B-9FE4-47F0-9242-7CA3AD89BA45}"/>
+                <a16:creationId xmlns:a16="http://schemas.microsoft.com/office/drawing/2014/main" id="{12DB071B-9FE4-47F0-9242-7CA3AD89BA45}"/>
               </a:ext>
             </a:extLst>
           </p:cNvPr>
@@ -27988,7 +27884,7 @@
                 <a14:useLocalDpi xmlns:a14="http://schemas.microsoft.com/office/drawing/2010/main" val="0"/>
               </a:ext>
               <a:ext uri="{837473B0-CC2E-450A-ABE3-18F120FF3D39}">
-                <a1611:picAttrSrcUrl xmlns:a1611="http://schemas.microsoft.com/office/drawing/2016/11/main" xmlns="" r:id="rId7"/>
+                <a1611:picAttrSrcUrl xmlns:a1611="http://schemas.microsoft.com/office/drawing/2016/11/main" r:id="rId7"/>
               </a:ext>
             </a:extLst>
           </a:blip>
@@ -28011,7 +27907,7 @@
           <p:cNvPr id="90" name="Rectangle 89">
             <a:extLst>
               <a:ext uri="{FF2B5EF4-FFF2-40B4-BE49-F238E27FC236}">
-                <a16:creationId xmlns:a16="http://schemas.microsoft.com/office/drawing/2014/main" xmlns="" id="{91289779-90EE-49B2-95D6-F41058463510}"/>
+                <a16:creationId xmlns:a16="http://schemas.microsoft.com/office/drawing/2014/main" id="{91289779-90EE-49B2-95D6-F41058463510}"/>
               </a:ext>
             </a:extLst>
           </p:cNvPr>
@@ -28039,14 +27935,7 @@
                 <a:latin typeface="Arial" panose="020B0604020202020204" pitchFamily="34" charset="0"/>
                 <a:cs typeface="Arial" panose="020B0604020202020204" pitchFamily="34" charset="0"/>
               </a:rPr>
-              <a:t>Post </a:t>
-            </a:r>
-            <a:r>
-              <a:rPr lang="sv-SE" dirty="0" smtClean="0">
-                <a:latin typeface="Arial" panose="020B0604020202020204" pitchFamily="34" charset="0"/>
-                <a:cs typeface="Arial" panose="020B0604020202020204" pitchFamily="34" charset="0"/>
-              </a:rPr>
-              <a:t>release</a:t>
+              <a:t>Post release</a:t>
             </a:r>
             <a:endParaRPr lang="en-US" dirty="0">
               <a:latin typeface="Arial" panose="020B0604020202020204" pitchFamily="34" charset="0"/>
@@ -28060,7 +27949,7 @@
           <p:cNvPr id="91" name="Arrow: Right 90">
             <a:extLst>
               <a:ext uri="{FF2B5EF4-FFF2-40B4-BE49-F238E27FC236}">
-                <a16:creationId xmlns:a16="http://schemas.microsoft.com/office/drawing/2014/main" xmlns="" id="{3DBCC447-F731-44CE-896D-3CEE37C031A1}"/>
+                <a16:creationId xmlns:a16="http://schemas.microsoft.com/office/drawing/2014/main" id="{3DBCC447-F731-44CE-896D-3CEE37C031A1}"/>
               </a:ext>
             </a:extLst>
           </p:cNvPr>
@@ -28112,7 +28001,7 @@
           <p:cNvPr id="92" name="Rectangle 91">
             <a:extLst>
               <a:ext uri="{FF2B5EF4-FFF2-40B4-BE49-F238E27FC236}">
-                <a16:creationId xmlns:a16="http://schemas.microsoft.com/office/drawing/2014/main" xmlns="" id="{B3A00306-95B5-4F99-AAEA-74434B776B12}"/>
+                <a16:creationId xmlns:a16="http://schemas.microsoft.com/office/drawing/2014/main" id="{B3A00306-95B5-4F99-AAEA-74434B776B12}"/>
               </a:ext>
             </a:extLst>
           </p:cNvPr>
@@ -28170,7 +28059,7 @@
           <p:cNvPr id="53" name="Rectangle 52">
             <a:extLst>
               <a:ext uri="{FF2B5EF4-FFF2-40B4-BE49-F238E27FC236}">
-                <a16:creationId xmlns:a16="http://schemas.microsoft.com/office/drawing/2014/main" xmlns="" id="{388E73F8-63C8-46A9-B27C-C9211C204266}"/>
+                <a16:creationId xmlns:a16="http://schemas.microsoft.com/office/drawing/2014/main" id="{388E73F8-63C8-46A9-B27C-C9211C204266}"/>
               </a:ext>
             </a:extLst>
           </p:cNvPr>
@@ -28219,7 +28108,7 @@
           <p:cNvPr id="2" name="Rectangle 1">
             <a:extLst>
               <a:ext uri="{FF2B5EF4-FFF2-40B4-BE49-F238E27FC236}">
-                <a16:creationId xmlns:a16="http://schemas.microsoft.com/office/drawing/2014/main" xmlns="" id="{35B408D3-DC8D-4EBC-B037-59C4D3CD1A67}"/>
+                <a16:creationId xmlns:a16="http://schemas.microsoft.com/office/drawing/2014/main" id="{35B408D3-DC8D-4EBC-B037-59C4D3CD1A67}"/>
               </a:ext>
             </a:extLst>
           </p:cNvPr>
@@ -28265,7 +28154,7 @@
           <p:cNvPr id="31" name="Rectangle 30">
             <a:extLst>
               <a:ext uri="{FF2B5EF4-FFF2-40B4-BE49-F238E27FC236}">
-                <a16:creationId xmlns:a16="http://schemas.microsoft.com/office/drawing/2014/main" xmlns="" id="{837668D4-746D-44E8-9D48-A4F9B365EA7E}"/>
+                <a16:creationId xmlns:a16="http://schemas.microsoft.com/office/drawing/2014/main" id="{837668D4-746D-44E8-9D48-A4F9B365EA7E}"/>
               </a:ext>
             </a:extLst>
           </p:cNvPr>
@@ -28321,7 +28210,7 @@
           <p:cNvPr id="32" name="Rectangle 31">
             <a:extLst>
               <a:ext uri="{FF2B5EF4-FFF2-40B4-BE49-F238E27FC236}">
-                <a16:creationId xmlns:a16="http://schemas.microsoft.com/office/drawing/2014/main" xmlns="" id="{75D6D87D-383C-40BE-BD42-CBCEE986D241}"/>
+                <a16:creationId xmlns:a16="http://schemas.microsoft.com/office/drawing/2014/main" id="{75D6D87D-383C-40BE-BD42-CBCEE986D241}"/>
               </a:ext>
             </a:extLst>
           </p:cNvPr>
@@ -28389,7 +28278,7 @@
           <p:cNvPr id="4" name="Cloud 3">
             <a:extLst>
               <a:ext uri="{FF2B5EF4-FFF2-40B4-BE49-F238E27FC236}">
-                <a16:creationId xmlns:a16="http://schemas.microsoft.com/office/drawing/2014/main" xmlns="" id="{3141B1FA-0C65-4790-B026-C4DF262B0BD7}"/>
+                <a16:creationId xmlns:a16="http://schemas.microsoft.com/office/drawing/2014/main" id="{3141B1FA-0C65-4790-B026-C4DF262B0BD7}"/>
               </a:ext>
             </a:extLst>
           </p:cNvPr>
@@ -28500,7 +28389,7 @@
           <p:cNvPr id="12" name="Rectangle 11">
             <a:extLst>
               <a:ext uri="{FF2B5EF4-FFF2-40B4-BE49-F238E27FC236}">
-                <a16:creationId xmlns:a16="http://schemas.microsoft.com/office/drawing/2014/main" xmlns="" id="{1F37C778-DFF2-4C39-9755-E6BF0C148F35}"/>
+                <a16:creationId xmlns:a16="http://schemas.microsoft.com/office/drawing/2014/main" id="{1F37C778-DFF2-4C39-9755-E6BF0C148F35}"/>
               </a:ext>
             </a:extLst>
           </p:cNvPr>
@@ -28538,7 +28427,7 @@
           <p:cNvPr id="13" name="Rectangle 12">
             <a:extLst>
               <a:ext uri="{FF2B5EF4-FFF2-40B4-BE49-F238E27FC236}">
-                <a16:creationId xmlns:a16="http://schemas.microsoft.com/office/drawing/2014/main" xmlns="" id="{AD3DE133-097E-4D53-90A0-BDE00462AE50}"/>
+                <a16:creationId xmlns:a16="http://schemas.microsoft.com/office/drawing/2014/main" id="{AD3DE133-097E-4D53-90A0-BDE00462AE50}"/>
               </a:ext>
             </a:extLst>
           </p:cNvPr>
@@ -28576,7 +28465,7 @@
           <p:cNvPr id="14" name="Rectangle 13">
             <a:extLst>
               <a:ext uri="{FF2B5EF4-FFF2-40B4-BE49-F238E27FC236}">
-                <a16:creationId xmlns:a16="http://schemas.microsoft.com/office/drawing/2014/main" xmlns="" id="{92D4F564-9B8A-41F2-8344-AD34196FAFEF}"/>
+                <a16:creationId xmlns:a16="http://schemas.microsoft.com/office/drawing/2014/main" id="{92D4F564-9B8A-41F2-8344-AD34196FAFEF}"/>
               </a:ext>
             </a:extLst>
           </p:cNvPr>
@@ -28614,7 +28503,7 @@
           <p:cNvPr id="15" name="Rectangle 14">
             <a:extLst>
               <a:ext uri="{FF2B5EF4-FFF2-40B4-BE49-F238E27FC236}">
-                <a16:creationId xmlns:a16="http://schemas.microsoft.com/office/drawing/2014/main" xmlns="" id="{1116CA10-F054-4AF7-812F-2E14C3DB92A8}"/>
+                <a16:creationId xmlns:a16="http://schemas.microsoft.com/office/drawing/2014/main" id="{1116CA10-F054-4AF7-812F-2E14C3DB92A8}"/>
               </a:ext>
             </a:extLst>
           </p:cNvPr>
@@ -28652,7 +28541,7 @@
           <p:cNvPr id="16" name="Rectangle 15">
             <a:extLst>
               <a:ext uri="{FF2B5EF4-FFF2-40B4-BE49-F238E27FC236}">
-                <a16:creationId xmlns:a16="http://schemas.microsoft.com/office/drawing/2014/main" xmlns="" id="{63714086-3485-4087-A683-F1C203CF3F3A}"/>
+                <a16:creationId xmlns:a16="http://schemas.microsoft.com/office/drawing/2014/main" id="{63714086-3485-4087-A683-F1C203CF3F3A}"/>
               </a:ext>
             </a:extLst>
           </p:cNvPr>
@@ -28690,7 +28579,7 @@
           <p:cNvPr id="17" name="Rectangle 16">
             <a:extLst>
               <a:ext uri="{FF2B5EF4-FFF2-40B4-BE49-F238E27FC236}">
-                <a16:creationId xmlns:a16="http://schemas.microsoft.com/office/drawing/2014/main" xmlns="" id="{A871A22D-3138-4F20-953F-81B2D34BC353}"/>
+                <a16:creationId xmlns:a16="http://schemas.microsoft.com/office/drawing/2014/main" id="{A871A22D-3138-4F20-953F-81B2D34BC353}"/>
               </a:ext>
             </a:extLst>
           </p:cNvPr>
@@ -28728,7 +28617,7 @@
           <p:cNvPr id="18" name="Rectangle 17">
             <a:extLst>
               <a:ext uri="{FF2B5EF4-FFF2-40B4-BE49-F238E27FC236}">
-                <a16:creationId xmlns:a16="http://schemas.microsoft.com/office/drawing/2014/main" xmlns="" id="{35D06240-088C-41F7-9749-83216E384825}"/>
+                <a16:creationId xmlns:a16="http://schemas.microsoft.com/office/drawing/2014/main" id="{35D06240-088C-41F7-9749-83216E384825}"/>
               </a:ext>
             </a:extLst>
           </p:cNvPr>
@@ -28766,7 +28655,7 @@
           <p:cNvPr id="19" name="Rectangle 18">
             <a:extLst>
               <a:ext uri="{FF2B5EF4-FFF2-40B4-BE49-F238E27FC236}">
-                <a16:creationId xmlns:a16="http://schemas.microsoft.com/office/drawing/2014/main" xmlns="" id="{507C15F6-17F8-4344-860D-324D4C1B2851}"/>
+                <a16:creationId xmlns:a16="http://schemas.microsoft.com/office/drawing/2014/main" id="{507C15F6-17F8-4344-860D-324D4C1B2851}"/>
               </a:ext>
             </a:extLst>
           </p:cNvPr>
@@ -28804,7 +28693,7 @@
           <p:cNvPr id="20" name="Rectangle 19">
             <a:extLst>
               <a:ext uri="{FF2B5EF4-FFF2-40B4-BE49-F238E27FC236}">
-                <a16:creationId xmlns:a16="http://schemas.microsoft.com/office/drawing/2014/main" xmlns="" id="{C08A1ED6-5BE5-4CF2-BA4F-0BF592BA9433}"/>
+                <a16:creationId xmlns:a16="http://schemas.microsoft.com/office/drawing/2014/main" id="{C08A1ED6-5BE5-4CF2-BA4F-0BF592BA9433}"/>
               </a:ext>
             </a:extLst>
           </p:cNvPr>
@@ -28842,7 +28731,7 @@
           <p:cNvPr id="21" name="Rectangle 20">
             <a:extLst>
               <a:ext uri="{FF2B5EF4-FFF2-40B4-BE49-F238E27FC236}">
-                <a16:creationId xmlns:a16="http://schemas.microsoft.com/office/drawing/2014/main" xmlns="" id="{2CB84429-4C8B-4D28-B92A-683A872D3EF0}"/>
+                <a16:creationId xmlns:a16="http://schemas.microsoft.com/office/drawing/2014/main" id="{2CB84429-4C8B-4D28-B92A-683A872D3EF0}"/>
               </a:ext>
             </a:extLst>
           </p:cNvPr>
@@ -28880,7 +28769,7 @@
           <p:cNvPr id="23" name="Straight Arrow Connector 22">
             <a:extLst>
               <a:ext uri="{FF2B5EF4-FFF2-40B4-BE49-F238E27FC236}">
-                <a16:creationId xmlns:a16="http://schemas.microsoft.com/office/drawing/2014/main" xmlns="" id="{CF5BE959-978C-48AF-8508-DE76B7326356}"/>
+                <a16:creationId xmlns:a16="http://schemas.microsoft.com/office/drawing/2014/main" id="{CF5BE959-978C-48AF-8508-DE76B7326356}"/>
               </a:ext>
             </a:extLst>
           </p:cNvPr>
@@ -28927,7 +28816,7 @@
           <p:cNvPr id="24" name="Straight Arrow Connector 23">
             <a:extLst>
               <a:ext uri="{FF2B5EF4-FFF2-40B4-BE49-F238E27FC236}">
-                <a16:creationId xmlns:a16="http://schemas.microsoft.com/office/drawing/2014/main" xmlns="" id="{EA94AA31-2348-488D-AF95-C5BD4CD8C3FC}"/>
+                <a16:creationId xmlns:a16="http://schemas.microsoft.com/office/drawing/2014/main" id="{EA94AA31-2348-488D-AF95-C5BD4CD8C3FC}"/>
               </a:ext>
             </a:extLst>
           </p:cNvPr>
@@ -28971,7 +28860,7 @@
           <p:cNvPr id="28" name="Rectangle 27">
             <a:extLst>
               <a:ext uri="{FF2B5EF4-FFF2-40B4-BE49-F238E27FC236}">
-                <a16:creationId xmlns:a16="http://schemas.microsoft.com/office/drawing/2014/main" xmlns="" id="{FF0E0202-04C0-41BA-AD7D-C64268A08F36}"/>
+                <a16:creationId xmlns:a16="http://schemas.microsoft.com/office/drawing/2014/main" id="{FF0E0202-04C0-41BA-AD7D-C64268A08F36}"/>
               </a:ext>
             </a:extLst>
           </p:cNvPr>
@@ -29009,7 +28898,7 @@
           <p:cNvPr id="29" name="Straight Arrow Connector 28">
             <a:extLst>
               <a:ext uri="{FF2B5EF4-FFF2-40B4-BE49-F238E27FC236}">
-                <a16:creationId xmlns:a16="http://schemas.microsoft.com/office/drawing/2014/main" xmlns="" id="{AE1D563C-18F7-40C4-8C12-89E6F334705F}"/>
+                <a16:creationId xmlns:a16="http://schemas.microsoft.com/office/drawing/2014/main" id="{AE1D563C-18F7-40C4-8C12-89E6F334705F}"/>
               </a:ext>
             </a:extLst>
           </p:cNvPr>
@@ -29054,7 +28943,7 @@
           <p:cNvPr id="30" name="Rectangle 29">
             <a:extLst>
               <a:ext uri="{FF2B5EF4-FFF2-40B4-BE49-F238E27FC236}">
-                <a16:creationId xmlns:a16="http://schemas.microsoft.com/office/drawing/2014/main" xmlns="" id="{2AB490D3-2200-47DD-88EE-2B6DB3DFE0E5}"/>
+                <a16:creationId xmlns:a16="http://schemas.microsoft.com/office/drawing/2014/main" id="{2AB490D3-2200-47DD-88EE-2B6DB3DFE0E5}"/>
               </a:ext>
             </a:extLst>
           </p:cNvPr>
@@ -29106,7 +28995,7 @@
           <p:cNvPr id="31" name="Rectangle 30">
             <a:extLst>
               <a:ext uri="{FF2B5EF4-FFF2-40B4-BE49-F238E27FC236}">
-                <a16:creationId xmlns:a16="http://schemas.microsoft.com/office/drawing/2014/main" xmlns="" id="{A5AC5AEE-9CA9-4FBA-ABF1-040C70742F85}"/>
+                <a16:creationId xmlns:a16="http://schemas.microsoft.com/office/drawing/2014/main" id="{A5AC5AEE-9CA9-4FBA-ABF1-040C70742F85}"/>
               </a:ext>
             </a:extLst>
           </p:cNvPr>
@@ -29158,7 +29047,7 @@
           <p:cNvPr id="32" name="Oval 31">
             <a:extLst>
               <a:ext uri="{FF2B5EF4-FFF2-40B4-BE49-F238E27FC236}">
-                <a16:creationId xmlns:a16="http://schemas.microsoft.com/office/drawing/2014/main" xmlns="" id="{E3D788FF-545E-49BE-812A-B835E474F58E}"/>
+                <a16:creationId xmlns:a16="http://schemas.microsoft.com/office/drawing/2014/main" id="{E3D788FF-545E-49BE-812A-B835E474F58E}"/>
               </a:ext>
             </a:extLst>
           </p:cNvPr>
@@ -29210,7 +29099,7 @@
           <p:cNvPr id="33" name="Isosceles Triangle 32">
             <a:extLst>
               <a:ext uri="{FF2B5EF4-FFF2-40B4-BE49-F238E27FC236}">
-                <a16:creationId xmlns:a16="http://schemas.microsoft.com/office/drawing/2014/main" xmlns="" id="{3293596F-27FE-47F0-B885-CC2AE68D7DCA}"/>
+                <a16:creationId xmlns:a16="http://schemas.microsoft.com/office/drawing/2014/main" id="{3293596F-27FE-47F0-B885-CC2AE68D7DCA}"/>
               </a:ext>
             </a:extLst>
           </p:cNvPr>
@@ -29262,7 +29151,7 @@
           <p:cNvPr id="56" name="Group 55">
             <a:extLst>
               <a:ext uri="{FF2B5EF4-FFF2-40B4-BE49-F238E27FC236}">
-                <a16:creationId xmlns:a16="http://schemas.microsoft.com/office/drawing/2014/main" xmlns="" id="{375610F4-3FA6-4104-882D-717313BF7701}"/>
+                <a16:creationId xmlns:a16="http://schemas.microsoft.com/office/drawing/2014/main" id="{375610F4-3FA6-4104-882D-717313BF7701}"/>
               </a:ext>
             </a:extLst>
           </p:cNvPr>
@@ -29282,7 +29171,7 @@
             <p:cNvPr id="35" name="Rectangle 34">
               <a:extLst>
                 <a:ext uri="{FF2B5EF4-FFF2-40B4-BE49-F238E27FC236}">
-                  <a16:creationId xmlns:a16="http://schemas.microsoft.com/office/drawing/2014/main" xmlns="" id="{879F8447-5CD1-4C24-A2B0-C99C2D7F227E}"/>
+                  <a16:creationId xmlns:a16="http://schemas.microsoft.com/office/drawing/2014/main" id="{879F8447-5CD1-4C24-A2B0-C99C2D7F227E}"/>
                 </a:ext>
               </a:extLst>
             </p:cNvPr>
@@ -29336,7 +29225,7 @@
             <p:cNvPr id="36" name="Rectangle 35">
               <a:extLst>
                 <a:ext uri="{FF2B5EF4-FFF2-40B4-BE49-F238E27FC236}">
-                  <a16:creationId xmlns:a16="http://schemas.microsoft.com/office/drawing/2014/main" xmlns="" id="{5F4A4132-62A0-4359-A556-90169DF61140}"/>
+                  <a16:creationId xmlns:a16="http://schemas.microsoft.com/office/drawing/2014/main" id="{5F4A4132-62A0-4359-A556-90169DF61140}"/>
                 </a:ext>
               </a:extLst>
             </p:cNvPr>
@@ -29388,7 +29277,7 @@
             <p:cNvPr id="37" name="Rectangle 36">
               <a:extLst>
                 <a:ext uri="{FF2B5EF4-FFF2-40B4-BE49-F238E27FC236}">
-                  <a16:creationId xmlns:a16="http://schemas.microsoft.com/office/drawing/2014/main" xmlns="" id="{4B101870-D617-4B38-8C70-2394252B3323}"/>
+                  <a16:creationId xmlns:a16="http://schemas.microsoft.com/office/drawing/2014/main" id="{4B101870-D617-4B38-8C70-2394252B3323}"/>
                 </a:ext>
               </a:extLst>
             </p:cNvPr>
@@ -29444,7 +29333,7 @@
             <p:cNvPr id="38" name="Rectangle 37">
               <a:extLst>
                 <a:ext uri="{FF2B5EF4-FFF2-40B4-BE49-F238E27FC236}">
-                  <a16:creationId xmlns:a16="http://schemas.microsoft.com/office/drawing/2014/main" xmlns="" id="{C917C82C-58B7-4AA7-A94D-98D12F824498}"/>
+                  <a16:creationId xmlns:a16="http://schemas.microsoft.com/office/drawing/2014/main" id="{C917C82C-58B7-4AA7-A94D-98D12F824498}"/>
                 </a:ext>
               </a:extLst>
             </p:cNvPr>
@@ -29482,7 +29371,7 @@
             <p:cNvPr id="41" name="Rectangle 40">
               <a:extLst>
                 <a:ext uri="{FF2B5EF4-FFF2-40B4-BE49-F238E27FC236}">
-                  <a16:creationId xmlns:a16="http://schemas.microsoft.com/office/drawing/2014/main" xmlns="" id="{C96D5A3A-401E-4360-A926-9ADE459BBEF2}"/>
+                  <a16:creationId xmlns:a16="http://schemas.microsoft.com/office/drawing/2014/main" id="{C96D5A3A-401E-4360-A926-9ADE459BBEF2}"/>
                 </a:ext>
               </a:extLst>
             </p:cNvPr>
@@ -29531,7 +29420,7 @@
             <p:cNvPr id="42" name="Rectangle 41">
               <a:extLst>
                 <a:ext uri="{FF2B5EF4-FFF2-40B4-BE49-F238E27FC236}">
-                  <a16:creationId xmlns:a16="http://schemas.microsoft.com/office/drawing/2014/main" xmlns="" id="{2190B5B3-6D2B-4506-B8FE-FD7E6CB3E43D}"/>
+                  <a16:creationId xmlns:a16="http://schemas.microsoft.com/office/drawing/2014/main" id="{2190B5B3-6D2B-4506-B8FE-FD7E6CB3E43D}"/>
                 </a:ext>
               </a:extLst>
             </p:cNvPr>
@@ -29569,7 +29458,7 @@
             <p:cNvPr id="43" name="Oval 42">
               <a:extLst>
                 <a:ext uri="{FF2B5EF4-FFF2-40B4-BE49-F238E27FC236}">
-                  <a16:creationId xmlns:a16="http://schemas.microsoft.com/office/drawing/2014/main" xmlns="" id="{4D266B7E-018C-46ED-8D35-52F9E5B7E141}"/>
+                  <a16:creationId xmlns:a16="http://schemas.microsoft.com/office/drawing/2014/main" id="{4D266B7E-018C-46ED-8D35-52F9E5B7E141}"/>
                 </a:ext>
               </a:extLst>
             </p:cNvPr>
@@ -29621,7 +29510,7 @@
             <p:cNvPr id="44" name="Rectangle 43">
               <a:extLst>
                 <a:ext uri="{FF2B5EF4-FFF2-40B4-BE49-F238E27FC236}">
-                  <a16:creationId xmlns:a16="http://schemas.microsoft.com/office/drawing/2014/main" xmlns="" id="{7EE4F98B-E7AC-475C-9644-7DFFA759FB0B}"/>
+                  <a16:creationId xmlns:a16="http://schemas.microsoft.com/office/drawing/2014/main" id="{7EE4F98B-E7AC-475C-9644-7DFFA759FB0B}"/>
                 </a:ext>
               </a:extLst>
             </p:cNvPr>
@@ -29655,11 +29544,11 @@
             <a:p>
               <a:pPr algn="ctr"/>
               <a:r>
-                <a:rPr lang="sv-SE" dirty="0">
+                <a:rPr lang="sv-SE" dirty="0" err="1">
                   <a:latin typeface="Arial" panose="020B0604020202020204" pitchFamily="34" charset="0"/>
                   <a:cs typeface="Arial" panose="020B0604020202020204" pitchFamily="34" charset="0"/>
                 </a:rPr>
-                <a:t>Bot</a:t>
+                <a:t>Droid</a:t>
               </a:r>
               <a:endParaRPr lang="en-US" dirty="0"/>
             </a:p>
@@ -29670,7 +29559,7 @@
             <p:cNvPr id="45" name="Rectangle 44">
               <a:extLst>
                 <a:ext uri="{FF2B5EF4-FFF2-40B4-BE49-F238E27FC236}">
-                  <a16:creationId xmlns:a16="http://schemas.microsoft.com/office/drawing/2014/main" xmlns="" id="{3317DF71-E5C0-4D1B-9FF7-14D271D9E7DA}"/>
+                  <a16:creationId xmlns:a16="http://schemas.microsoft.com/office/drawing/2014/main" id="{3317DF71-E5C0-4D1B-9FF7-14D271D9E7DA}"/>
                 </a:ext>
               </a:extLst>
             </p:cNvPr>
@@ -29708,7 +29597,7 @@
             <p:cNvPr id="47" name="Isosceles Triangle 46">
               <a:extLst>
                 <a:ext uri="{FF2B5EF4-FFF2-40B4-BE49-F238E27FC236}">
-                  <a16:creationId xmlns:a16="http://schemas.microsoft.com/office/drawing/2014/main" xmlns="" id="{365D57FF-0831-4183-8DC8-946B7A8F2BC8}"/>
+                  <a16:creationId xmlns:a16="http://schemas.microsoft.com/office/drawing/2014/main" id="{365D57FF-0831-4183-8DC8-946B7A8F2BC8}"/>
                 </a:ext>
               </a:extLst>
             </p:cNvPr>
@@ -29761,7 +29650,7 @@
           <p:cNvPr id="48" name="Rectangle 47">
             <a:extLst>
               <a:ext uri="{FF2B5EF4-FFF2-40B4-BE49-F238E27FC236}">
-                <a16:creationId xmlns:a16="http://schemas.microsoft.com/office/drawing/2014/main" xmlns="" id="{F5359955-D619-4358-950D-11FFC7F3CF9F}"/>
+                <a16:creationId xmlns:a16="http://schemas.microsoft.com/office/drawing/2014/main" id="{F5359955-D619-4358-950D-11FFC7F3CF9F}"/>
               </a:ext>
             </a:extLst>
           </p:cNvPr>
@@ -29813,7 +29702,7 @@
           <p:cNvPr id="49" name="Oval 48">
             <a:extLst>
               <a:ext uri="{FF2B5EF4-FFF2-40B4-BE49-F238E27FC236}">
-                <a16:creationId xmlns:a16="http://schemas.microsoft.com/office/drawing/2014/main" xmlns="" id="{C897382F-DB40-4D09-A46F-D78D8100EC22}"/>
+                <a16:creationId xmlns:a16="http://schemas.microsoft.com/office/drawing/2014/main" id="{C897382F-DB40-4D09-A46F-D78D8100EC22}"/>
               </a:ext>
             </a:extLst>
           </p:cNvPr>
@@ -29865,7 +29754,7 @@
           <p:cNvPr id="50" name="Isosceles Triangle 49">
             <a:extLst>
               <a:ext uri="{FF2B5EF4-FFF2-40B4-BE49-F238E27FC236}">
-                <a16:creationId xmlns:a16="http://schemas.microsoft.com/office/drawing/2014/main" xmlns="" id="{A701C5C9-AEA9-4193-9E85-0AB493C0BE10}"/>
+                <a16:creationId xmlns:a16="http://schemas.microsoft.com/office/drawing/2014/main" id="{A701C5C9-AEA9-4193-9E85-0AB493C0BE10}"/>
               </a:ext>
             </a:extLst>
           </p:cNvPr>
@@ -29917,7 +29806,7 @@
           <p:cNvPr id="51" name="Rectangle 50">
             <a:extLst>
               <a:ext uri="{FF2B5EF4-FFF2-40B4-BE49-F238E27FC236}">
-                <a16:creationId xmlns:a16="http://schemas.microsoft.com/office/drawing/2014/main" xmlns="" id="{0E76F026-2452-4896-A572-F7CE53C174A2}"/>
+                <a16:creationId xmlns:a16="http://schemas.microsoft.com/office/drawing/2014/main" id="{0E76F026-2452-4896-A572-F7CE53C174A2}"/>
               </a:ext>
             </a:extLst>
           </p:cNvPr>
@@ -29962,7 +29851,7 @@
           <p:cNvPr id="53" name="Rectangle 52">
             <a:extLst>
               <a:ext uri="{FF2B5EF4-FFF2-40B4-BE49-F238E27FC236}">
-                <a16:creationId xmlns:a16="http://schemas.microsoft.com/office/drawing/2014/main" xmlns="" id="{D5448F18-C362-4F8D-BDE9-67585A9F1232}"/>
+                <a16:creationId xmlns:a16="http://schemas.microsoft.com/office/drawing/2014/main" id="{D5448F18-C362-4F8D-BDE9-67585A9F1232}"/>
               </a:ext>
             </a:extLst>
           </p:cNvPr>
@@ -30000,7 +29889,7 @@
           <p:cNvPr id="54" name="Rectangle 53">
             <a:extLst>
               <a:ext uri="{FF2B5EF4-FFF2-40B4-BE49-F238E27FC236}">
-                <a16:creationId xmlns:a16="http://schemas.microsoft.com/office/drawing/2014/main" xmlns="" id="{CCB4F67D-B10C-40C9-BD04-30237B979029}"/>
+                <a16:creationId xmlns:a16="http://schemas.microsoft.com/office/drawing/2014/main" id="{CCB4F67D-B10C-40C9-BD04-30237B979029}"/>
               </a:ext>
             </a:extLst>
           </p:cNvPr>
@@ -30038,7 +29927,7 @@
           <p:cNvPr id="55" name="Rectangle 54">
             <a:extLst>
               <a:ext uri="{FF2B5EF4-FFF2-40B4-BE49-F238E27FC236}">
-                <a16:creationId xmlns:a16="http://schemas.microsoft.com/office/drawing/2014/main" xmlns="" id="{9BE72583-89CE-4A5E-BE1B-80DC1EEDC4BD}"/>
+                <a16:creationId xmlns:a16="http://schemas.microsoft.com/office/drawing/2014/main" id="{9BE72583-89CE-4A5E-BE1B-80DC1EEDC4BD}"/>
               </a:ext>
             </a:extLst>
           </p:cNvPr>
@@ -30090,7 +29979,7 @@
           <p:cNvPr id="58" name="Rectangle 57">
             <a:extLst>
               <a:ext uri="{FF2B5EF4-FFF2-40B4-BE49-F238E27FC236}">
-                <a16:creationId xmlns:a16="http://schemas.microsoft.com/office/drawing/2014/main" xmlns="" id="{008A882D-E05D-4360-9FE0-EAC6BFDC9DC1}"/>
+                <a16:creationId xmlns:a16="http://schemas.microsoft.com/office/drawing/2014/main" id="{008A882D-E05D-4360-9FE0-EAC6BFDC9DC1}"/>
               </a:ext>
             </a:extLst>
           </p:cNvPr>
@@ -30147,7 +30036,7 @@
           <p:cNvPr id="59" name="Rectangle 58">
             <a:extLst>
               <a:ext uri="{FF2B5EF4-FFF2-40B4-BE49-F238E27FC236}">
-                <a16:creationId xmlns:a16="http://schemas.microsoft.com/office/drawing/2014/main" xmlns="" id="{056EDE35-63CE-478C-8ED2-7E7F75128045}"/>
+                <a16:creationId xmlns:a16="http://schemas.microsoft.com/office/drawing/2014/main" id="{056EDE35-63CE-478C-8ED2-7E7F75128045}"/>
               </a:ext>
             </a:extLst>
           </p:cNvPr>
@@ -30227,7 +30116,7 @@
           <p:cNvPr id="61" name="Rectangle 60">
             <a:extLst>
               <a:ext uri="{FF2B5EF4-FFF2-40B4-BE49-F238E27FC236}">
-                <a16:creationId xmlns:a16="http://schemas.microsoft.com/office/drawing/2014/main" xmlns="" id="{2555CB7B-E89E-4FAA-90C1-77E7EDE66192}"/>
+                <a16:creationId xmlns:a16="http://schemas.microsoft.com/office/drawing/2014/main" id="{2555CB7B-E89E-4FAA-90C1-77E7EDE66192}"/>
               </a:ext>
             </a:extLst>
           </p:cNvPr>
@@ -30265,7 +30154,7 @@
           <p:cNvPr id="62" name="Straight Arrow Connector 61">
             <a:extLst>
               <a:ext uri="{FF2B5EF4-FFF2-40B4-BE49-F238E27FC236}">
-                <a16:creationId xmlns:a16="http://schemas.microsoft.com/office/drawing/2014/main" xmlns="" id="{CD0D2D9E-BF44-4F05-8A34-7D366C108330}"/>
+                <a16:creationId xmlns:a16="http://schemas.microsoft.com/office/drawing/2014/main" id="{CD0D2D9E-BF44-4F05-8A34-7D366C108330}"/>
               </a:ext>
             </a:extLst>
           </p:cNvPr>
@@ -30311,7 +30200,7 @@
           <p:cNvPr id="65" name="Straight Arrow Connector 64">
             <a:extLst>
               <a:ext uri="{FF2B5EF4-FFF2-40B4-BE49-F238E27FC236}">
-                <a16:creationId xmlns:a16="http://schemas.microsoft.com/office/drawing/2014/main" xmlns="" id="{246C7C9F-0B2A-4180-BBF3-91835824417D}"/>
+                <a16:creationId xmlns:a16="http://schemas.microsoft.com/office/drawing/2014/main" id="{246C7C9F-0B2A-4180-BBF3-91835824417D}"/>
               </a:ext>
             </a:extLst>
           </p:cNvPr>
@@ -30356,7 +30245,7 @@
           <p:cNvPr id="69" name="Rectangle 68">
             <a:extLst>
               <a:ext uri="{FF2B5EF4-FFF2-40B4-BE49-F238E27FC236}">
-                <a16:creationId xmlns:a16="http://schemas.microsoft.com/office/drawing/2014/main" xmlns="" id="{C83A164E-C563-4661-88E8-6ECF4A2EFD91}"/>
+                <a16:creationId xmlns:a16="http://schemas.microsoft.com/office/drawing/2014/main" id="{C83A164E-C563-4661-88E8-6ECF4A2EFD91}"/>
               </a:ext>
             </a:extLst>
           </p:cNvPr>
@@ -30408,7 +30297,7 @@
           <p:cNvPr id="70" name="Rectangle 69">
             <a:extLst>
               <a:ext uri="{FF2B5EF4-FFF2-40B4-BE49-F238E27FC236}">
-                <a16:creationId xmlns:a16="http://schemas.microsoft.com/office/drawing/2014/main" xmlns="" id="{63126789-69EB-4A05-B3F1-9FBBE1870485}"/>
+                <a16:creationId xmlns:a16="http://schemas.microsoft.com/office/drawing/2014/main" id="{63126789-69EB-4A05-B3F1-9FBBE1870485}"/>
               </a:ext>
             </a:extLst>
           </p:cNvPr>
@@ -30454,7 +30343,7 @@
           <p:cNvPr id="71" name="Rectangle 70">
             <a:extLst>
               <a:ext uri="{FF2B5EF4-FFF2-40B4-BE49-F238E27FC236}">
-                <a16:creationId xmlns:a16="http://schemas.microsoft.com/office/drawing/2014/main" xmlns="" id="{344B0749-0CB8-4421-876A-8DFE0A980333}"/>
+                <a16:creationId xmlns:a16="http://schemas.microsoft.com/office/drawing/2014/main" id="{344B0749-0CB8-4421-876A-8DFE0A980333}"/>
               </a:ext>
             </a:extLst>
           </p:cNvPr>
@@ -30493,7 +30382,7 @@
           <p:cNvPr id="72" name="Straight Arrow Connector 71">
             <a:extLst>
               <a:ext uri="{FF2B5EF4-FFF2-40B4-BE49-F238E27FC236}">
-                <a16:creationId xmlns:a16="http://schemas.microsoft.com/office/drawing/2014/main" xmlns="" id="{ED92BC3B-9A65-49BB-A725-60214763FBDC}"/>
+                <a16:creationId xmlns:a16="http://schemas.microsoft.com/office/drawing/2014/main" id="{ED92BC3B-9A65-49BB-A725-60214763FBDC}"/>
               </a:ext>
             </a:extLst>
           </p:cNvPr>
@@ -30537,7 +30426,7 @@
           <p:cNvPr id="75" name="Straight Arrow Connector 74">
             <a:extLst>
               <a:ext uri="{FF2B5EF4-FFF2-40B4-BE49-F238E27FC236}">
-                <a16:creationId xmlns:a16="http://schemas.microsoft.com/office/drawing/2014/main" xmlns="" id="{2077B21C-FF58-4DD2-A484-CB04AB2993AE}"/>
+                <a16:creationId xmlns:a16="http://schemas.microsoft.com/office/drawing/2014/main" id="{2077B21C-FF58-4DD2-A484-CB04AB2993AE}"/>
               </a:ext>
             </a:extLst>
           </p:cNvPr>
@@ -30581,7 +30470,7 @@
           <p:cNvPr id="77" name="Rectangle 76">
             <a:extLst>
               <a:ext uri="{FF2B5EF4-FFF2-40B4-BE49-F238E27FC236}">
-                <a16:creationId xmlns:a16="http://schemas.microsoft.com/office/drawing/2014/main" xmlns="" id="{B88EADB8-1203-446F-A495-2DCA82F847EF}"/>
+                <a16:creationId xmlns:a16="http://schemas.microsoft.com/office/drawing/2014/main" id="{B88EADB8-1203-446F-A495-2DCA82F847EF}"/>
               </a:ext>
             </a:extLst>
           </p:cNvPr>
@@ -30619,7 +30508,7 @@
           <p:cNvPr id="78" name="Straight Arrow Connector 77">
             <a:extLst>
               <a:ext uri="{FF2B5EF4-FFF2-40B4-BE49-F238E27FC236}">
-                <a16:creationId xmlns:a16="http://schemas.microsoft.com/office/drawing/2014/main" xmlns="" id="{396437B9-EEFB-4A03-B933-1CDFB1C8BC64}"/>
+                <a16:creationId xmlns:a16="http://schemas.microsoft.com/office/drawing/2014/main" id="{396437B9-EEFB-4A03-B933-1CDFB1C8BC64}"/>
               </a:ext>
             </a:extLst>
           </p:cNvPr>
@@ -30664,7 +30553,7 @@
           <p:cNvPr id="79" name="Rectangle 78">
             <a:extLst>
               <a:ext uri="{FF2B5EF4-FFF2-40B4-BE49-F238E27FC236}">
-                <a16:creationId xmlns:a16="http://schemas.microsoft.com/office/drawing/2014/main" xmlns="" id="{48CD2476-701A-4C45-9F84-14B0B78541D7}"/>
+                <a16:creationId xmlns:a16="http://schemas.microsoft.com/office/drawing/2014/main" id="{48CD2476-701A-4C45-9F84-14B0B78541D7}"/>
               </a:ext>
             </a:extLst>
           </p:cNvPr>
@@ -30739,7 +30628,7 @@
           <p:cNvPr id="175" name="Folded Corner 14">
             <a:extLst>
               <a:ext uri="{FF2B5EF4-FFF2-40B4-BE49-F238E27FC236}">
-                <a16:creationId xmlns:a16="http://schemas.microsoft.com/office/drawing/2014/main" xmlns="" id="{D7925C44-E3E5-47AF-9CC8-BF6471802A70}"/>
+                <a16:creationId xmlns:a16="http://schemas.microsoft.com/office/drawing/2014/main" id="{D7925C44-E3E5-47AF-9CC8-BF6471802A70}"/>
               </a:ext>
             </a:extLst>
           </p:cNvPr>
@@ -30788,7 +30677,7 @@
           <p:cNvPr id="2" name="Diagram 1">
             <a:extLst>
               <a:ext uri="{FF2B5EF4-FFF2-40B4-BE49-F238E27FC236}">
-                <a16:creationId xmlns:a16="http://schemas.microsoft.com/office/drawing/2014/main" xmlns="" id="{214EDC3A-CB98-4BD4-86CB-C3DE5CC0A317}"/>
+                <a16:creationId xmlns:a16="http://schemas.microsoft.com/office/drawing/2014/main" id="{214EDC3A-CB98-4BD4-86CB-C3DE5CC0A317}"/>
               </a:ext>
             </a:extLst>
           </p:cNvPr>
@@ -30810,7 +30699,7 @@
           <p:cNvPr id="3" name="Rectangle 2">
             <a:extLst>
               <a:ext uri="{FF2B5EF4-FFF2-40B4-BE49-F238E27FC236}">
-                <a16:creationId xmlns:a16="http://schemas.microsoft.com/office/drawing/2014/main" xmlns="" id="{8D715EE1-32F0-4BAE-86BD-83B54B3137EB}"/>
+                <a16:creationId xmlns:a16="http://schemas.microsoft.com/office/drawing/2014/main" id="{8D715EE1-32F0-4BAE-86BD-83B54B3137EB}"/>
               </a:ext>
             </a:extLst>
           </p:cNvPr>
@@ -30909,7 +30798,7 @@
           <p:cNvPr id="4" name="Rectangle 3">
             <a:extLst>
               <a:ext uri="{FF2B5EF4-FFF2-40B4-BE49-F238E27FC236}">
-                <a16:creationId xmlns:a16="http://schemas.microsoft.com/office/drawing/2014/main" xmlns="" id="{2CBF344E-950A-4767-97FA-13FFE695BBC3}"/>
+                <a16:creationId xmlns:a16="http://schemas.microsoft.com/office/drawing/2014/main" id="{2CBF344E-950A-4767-97FA-13FFE695BBC3}"/>
               </a:ext>
             </a:extLst>
           </p:cNvPr>
@@ -30950,7 +30839,7 @@
           <p:cNvPr id="126" name="Rectangle 125">
             <a:extLst>
               <a:ext uri="{FF2B5EF4-FFF2-40B4-BE49-F238E27FC236}">
-                <a16:creationId xmlns:a16="http://schemas.microsoft.com/office/drawing/2014/main" xmlns="" id="{AFE62E66-21DE-45BB-AB76-2BCE8E9BEC95}"/>
+                <a16:creationId xmlns:a16="http://schemas.microsoft.com/office/drawing/2014/main" id="{AFE62E66-21DE-45BB-AB76-2BCE8E9BEC95}"/>
               </a:ext>
             </a:extLst>
           </p:cNvPr>
@@ -31076,7 +30965,7 @@
           <p:cNvPr id="128" name="Rectangle 127">
             <a:extLst>
               <a:ext uri="{FF2B5EF4-FFF2-40B4-BE49-F238E27FC236}">
-                <a16:creationId xmlns:a16="http://schemas.microsoft.com/office/drawing/2014/main" xmlns="" id="{57B25911-E59E-4329-B921-A0EBAE8F9C7E}"/>
+                <a16:creationId xmlns:a16="http://schemas.microsoft.com/office/drawing/2014/main" id="{57B25911-E59E-4329-B921-A0EBAE8F9C7E}"/>
               </a:ext>
             </a:extLst>
           </p:cNvPr>
@@ -31230,7 +31119,7 @@
           <p:cNvPr id="5" name="Rectangle 4">
             <a:extLst>
               <a:ext uri="{FF2B5EF4-FFF2-40B4-BE49-F238E27FC236}">
-                <a16:creationId xmlns:a16="http://schemas.microsoft.com/office/drawing/2014/main" xmlns="" id="{798B0573-B3AD-48CB-9F8F-13EC6567D0D3}"/>
+                <a16:creationId xmlns:a16="http://schemas.microsoft.com/office/drawing/2014/main" id="{798B0573-B3AD-48CB-9F8F-13EC6567D0D3}"/>
               </a:ext>
             </a:extLst>
           </p:cNvPr>
@@ -31325,7 +31214,7 @@
           <p:cNvPr id="6" name="Rectangle 5">
             <a:extLst>
               <a:ext uri="{FF2B5EF4-FFF2-40B4-BE49-F238E27FC236}">
-                <a16:creationId xmlns:a16="http://schemas.microsoft.com/office/drawing/2014/main" xmlns="" id="{2B5D63EA-C9C9-4E25-A071-89FBDD4231BE}"/>
+                <a16:creationId xmlns:a16="http://schemas.microsoft.com/office/drawing/2014/main" id="{2B5D63EA-C9C9-4E25-A071-89FBDD4231BE}"/>
               </a:ext>
             </a:extLst>
           </p:cNvPr>
@@ -31363,7 +31252,7 @@
           <p:cNvPr id="8" name="Rectangle 7">
             <a:extLst>
               <a:ext uri="{FF2B5EF4-FFF2-40B4-BE49-F238E27FC236}">
-                <a16:creationId xmlns:a16="http://schemas.microsoft.com/office/drawing/2014/main" xmlns="" id="{BE0255C1-0F86-4BC8-84D8-4B76F00785A9}"/>
+                <a16:creationId xmlns:a16="http://schemas.microsoft.com/office/drawing/2014/main" id="{BE0255C1-0F86-4BC8-84D8-4B76F00785A9}"/>
               </a:ext>
             </a:extLst>
           </p:cNvPr>
@@ -31404,7 +31293,7 @@
           <p:cNvPr id="9" name="Rectangle 8">
             <a:extLst>
               <a:ext uri="{FF2B5EF4-FFF2-40B4-BE49-F238E27FC236}">
-                <a16:creationId xmlns:a16="http://schemas.microsoft.com/office/drawing/2014/main" xmlns="" id="{CFD7F599-A36B-4AA7-86FA-23355394169C}"/>
+                <a16:creationId xmlns:a16="http://schemas.microsoft.com/office/drawing/2014/main" id="{CFD7F599-A36B-4AA7-86FA-23355394169C}"/>
               </a:ext>
             </a:extLst>
           </p:cNvPr>
@@ -31445,7 +31334,7 @@
           <p:cNvPr id="130" name="Rectangle 129">
             <a:extLst>
               <a:ext uri="{FF2B5EF4-FFF2-40B4-BE49-F238E27FC236}">
-                <a16:creationId xmlns:a16="http://schemas.microsoft.com/office/drawing/2014/main" xmlns="" id="{F21A4D44-CAD2-400B-8E2D-F8B1FEA0E5B6}"/>
+                <a16:creationId xmlns:a16="http://schemas.microsoft.com/office/drawing/2014/main" id="{F21A4D44-CAD2-400B-8E2D-F8B1FEA0E5B6}"/>
               </a:ext>
             </a:extLst>
           </p:cNvPr>
@@ -31486,7 +31375,7 @@
           <p:cNvPr id="131" name="Rectangle 130">
             <a:extLst>
               <a:ext uri="{FF2B5EF4-FFF2-40B4-BE49-F238E27FC236}">
-                <a16:creationId xmlns:a16="http://schemas.microsoft.com/office/drawing/2014/main" xmlns="" id="{7ECE62BA-C5A0-4279-B504-BAC3C2C73E71}"/>
+                <a16:creationId xmlns:a16="http://schemas.microsoft.com/office/drawing/2014/main" id="{7ECE62BA-C5A0-4279-B504-BAC3C2C73E71}"/>
               </a:ext>
             </a:extLst>
           </p:cNvPr>
@@ -31538,7 +31427,7 @@
           <p:cNvPr id="10" name="Cube 9">
             <a:extLst>
               <a:ext uri="{FF2B5EF4-FFF2-40B4-BE49-F238E27FC236}">
-                <a16:creationId xmlns:a16="http://schemas.microsoft.com/office/drawing/2014/main" xmlns="" id="{F871D032-A4AE-406F-A80A-38A8B0BED40E}"/>
+                <a16:creationId xmlns:a16="http://schemas.microsoft.com/office/drawing/2014/main" id="{F871D032-A4AE-406F-A80A-38A8B0BED40E}"/>
               </a:ext>
             </a:extLst>
           </p:cNvPr>
@@ -31598,7 +31487,7 @@
           <p:cNvPr id="133" name="Folded Corner 14">
             <a:extLst>
               <a:ext uri="{FF2B5EF4-FFF2-40B4-BE49-F238E27FC236}">
-                <a16:creationId xmlns:a16="http://schemas.microsoft.com/office/drawing/2014/main" xmlns="" id="{DDDEB2FA-CB2B-41A1-82A4-458F3DD3A4D7}"/>
+                <a16:creationId xmlns:a16="http://schemas.microsoft.com/office/drawing/2014/main" id="{DDDEB2FA-CB2B-41A1-82A4-458F3DD3A4D7}"/>
               </a:ext>
             </a:extLst>
           </p:cNvPr>
@@ -31647,7 +31536,7 @@
           <p:cNvPr id="11" name="Rectangle 10">
             <a:extLst>
               <a:ext uri="{FF2B5EF4-FFF2-40B4-BE49-F238E27FC236}">
-                <a16:creationId xmlns:a16="http://schemas.microsoft.com/office/drawing/2014/main" xmlns="" id="{F638F98D-376A-4707-AFEB-3116E75204BA}"/>
+                <a16:creationId xmlns:a16="http://schemas.microsoft.com/office/drawing/2014/main" id="{F638F98D-376A-4707-AFEB-3116E75204BA}"/>
               </a:ext>
             </a:extLst>
           </p:cNvPr>
@@ -31702,7 +31591,7 @@
           <p:cNvPr id="18" name="Picture 17" descr="A close up of an animal&#10;&#10;Description generated with high confidence">
             <a:extLst>
               <a:ext uri="{FF2B5EF4-FFF2-40B4-BE49-F238E27FC236}">
-                <a16:creationId xmlns:a16="http://schemas.microsoft.com/office/drawing/2014/main" xmlns="" id="{4132CF14-571D-4435-9A41-BF9FAEA4439C}"/>
+                <a16:creationId xmlns:a16="http://schemas.microsoft.com/office/drawing/2014/main" id="{4132CF14-571D-4435-9A41-BF9FAEA4439C}"/>
               </a:ext>
             </a:extLst>
           </p:cNvPr>
@@ -31738,7 +31627,7 @@
           <p:cNvPr id="19" name="Rectangle 18">
             <a:extLst>
               <a:ext uri="{FF2B5EF4-FFF2-40B4-BE49-F238E27FC236}">
-                <a16:creationId xmlns:a16="http://schemas.microsoft.com/office/drawing/2014/main" xmlns="" id="{1047E73B-15B2-47B6-9C78-BCDB588C3019}"/>
+                <a16:creationId xmlns:a16="http://schemas.microsoft.com/office/drawing/2014/main" id="{1047E73B-15B2-47B6-9C78-BCDB588C3019}"/>
               </a:ext>
             </a:extLst>
           </p:cNvPr>
@@ -31780,7 +31669,7 @@
           <p:cNvPr id="31" name="Straight Arrow Connector 30">
             <a:extLst>
               <a:ext uri="{FF2B5EF4-FFF2-40B4-BE49-F238E27FC236}">
-                <a16:creationId xmlns:a16="http://schemas.microsoft.com/office/drawing/2014/main" xmlns="" id="{E3ACBD9C-E946-4C83-82A0-7C79817A1EB9}"/>
+                <a16:creationId xmlns:a16="http://schemas.microsoft.com/office/drawing/2014/main" id="{E3ACBD9C-E946-4C83-82A0-7C79817A1EB9}"/>
               </a:ext>
             </a:extLst>
           </p:cNvPr>
@@ -31823,7 +31712,7 @@
           <p:cNvPr id="32" name="Rectangle 31">
             <a:extLst>
               <a:ext uri="{FF2B5EF4-FFF2-40B4-BE49-F238E27FC236}">
-                <a16:creationId xmlns:a16="http://schemas.microsoft.com/office/drawing/2014/main" xmlns="" id="{DAD5A302-C880-4E8C-9E1D-640CD5CF0CBE}"/>
+                <a16:creationId xmlns:a16="http://schemas.microsoft.com/office/drawing/2014/main" id="{DAD5A302-C880-4E8C-9E1D-640CD5CF0CBE}"/>
               </a:ext>
             </a:extLst>
           </p:cNvPr>
@@ -31861,7 +31750,7 @@
           <p:cNvPr id="135" name="Rectangle 134">
             <a:extLst>
               <a:ext uri="{FF2B5EF4-FFF2-40B4-BE49-F238E27FC236}">
-                <a16:creationId xmlns:a16="http://schemas.microsoft.com/office/drawing/2014/main" xmlns="" id="{9D239E65-7C2B-4AD5-A1F4-F716E33EF928}"/>
+                <a16:creationId xmlns:a16="http://schemas.microsoft.com/office/drawing/2014/main" id="{9D239E65-7C2B-4AD5-A1F4-F716E33EF928}"/>
               </a:ext>
             </a:extLst>
           </p:cNvPr>
@@ -31899,7 +31788,7 @@
           <p:cNvPr id="146" name="Rectangle 145">
             <a:extLst>
               <a:ext uri="{FF2B5EF4-FFF2-40B4-BE49-F238E27FC236}">
-                <a16:creationId xmlns:a16="http://schemas.microsoft.com/office/drawing/2014/main" xmlns="" id="{02CB9ACB-9175-4592-A0A2-5F6EBA3916AA}"/>
+                <a16:creationId xmlns:a16="http://schemas.microsoft.com/office/drawing/2014/main" id="{02CB9ACB-9175-4592-A0A2-5F6EBA3916AA}"/>
               </a:ext>
             </a:extLst>
           </p:cNvPr>
@@ -31937,7 +31826,7 @@
           <p:cNvPr id="33" name="Rectangle 32">
             <a:extLst>
               <a:ext uri="{FF2B5EF4-FFF2-40B4-BE49-F238E27FC236}">
-                <a16:creationId xmlns:a16="http://schemas.microsoft.com/office/drawing/2014/main" xmlns="" id="{A5445AD6-3298-4B4A-BFAA-36E271EE36D3}"/>
+                <a16:creationId xmlns:a16="http://schemas.microsoft.com/office/drawing/2014/main" id="{A5445AD6-3298-4B4A-BFAA-36E271EE36D3}"/>
               </a:ext>
             </a:extLst>
           </p:cNvPr>
@@ -31978,7 +31867,7 @@
           <p:cNvPr id="148" name="Cube 147">
             <a:extLst>
               <a:ext uri="{FF2B5EF4-FFF2-40B4-BE49-F238E27FC236}">
-                <a16:creationId xmlns:a16="http://schemas.microsoft.com/office/drawing/2014/main" xmlns="" id="{3C1DB64A-F95E-4BBA-AAB7-E382DEE6D3AD}"/>
+                <a16:creationId xmlns:a16="http://schemas.microsoft.com/office/drawing/2014/main" id="{3C1DB64A-F95E-4BBA-AAB7-E382DEE6D3AD}"/>
               </a:ext>
             </a:extLst>
           </p:cNvPr>
@@ -32038,7 +31927,7 @@
           <p:cNvPr id="149" name="Rectangle 148">
             <a:extLst>
               <a:ext uri="{FF2B5EF4-FFF2-40B4-BE49-F238E27FC236}">
-                <a16:creationId xmlns:a16="http://schemas.microsoft.com/office/drawing/2014/main" xmlns="" id="{8ADE2C1F-3705-4E1D-9D1A-CEFA5BBDC4AE}"/>
+                <a16:creationId xmlns:a16="http://schemas.microsoft.com/office/drawing/2014/main" id="{8ADE2C1F-3705-4E1D-9D1A-CEFA5BBDC4AE}"/>
               </a:ext>
             </a:extLst>
           </p:cNvPr>
@@ -32079,7 +31968,7 @@
           <p:cNvPr id="152" name="Folded Corner 14">
             <a:extLst>
               <a:ext uri="{FF2B5EF4-FFF2-40B4-BE49-F238E27FC236}">
-                <a16:creationId xmlns:a16="http://schemas.microsoft.com/office/drawing/2014/main" xmlns="" id="{E9E59862-8121-45E9-B034-254AA5F85A9E}"/>
+                <a16:creationId xmlns:a16="http://schemas.microsoft.com/office/drawing/2014/main" id="{E9E59862-8121-45E9-B034-254AA5F85A9E}"/>
               </a:ext>
             </a:extLst>
           </p:cNvPr>
@@ -32128,7 +32017,7 @@
           <p:cNvPr id="159" name="Rectangle 158">
             <a:extLst>
               <a:ext uri="{FF2B5EF4-FFF2-40B4-BE49-F238E27FC236}">
-                <a16:creationId xmlns:a16="http://schemas.microsoft.com/office/drawing/2014/main" xmlns="" id="{9189909A-C973-403D-AC10-F162C1C50251}"/>
+                <a16:creationId xmlns:a16="http://schemas.microsoft.com/office/drawing/2014/main" id="{9189909A-C973-403D-AC10-F162C1C50251}"/>
               </a:ext>
             </a:extLst>
           </p:cNvPr>
@@ -32183,7 +32072,7 @@
           <p:cNvPr id="160" name="Straight Arrow Connector 159">
             <a:extLst>
               <a:ext uri="{FF2B5EF4-FFF2-40B4-BE49-F238E27FC236}">
-                <a16:creationId xmlns:a16="http://schemas.microsoft.com/office/drawing/2014/main" xmlns="" id="{4104DBBE-32EA-425C-8DB2-CA3E800CA64E}"/>
+                <a16:creationId xmlns:a16="http://schemas.microsoft.com/office/drawing/2014/main" id="{4104DBBE-32EA-425C-8DB2-CA3E800CA64E}"/>
               </a:ext>
             </a:extLst>
           </p:cNvPr>
@@ -32228,7 +32117,7 @@
           <p:cNvPr id="163" name="Cube 162">
             <a:extLst>
               <a:ext uri="{FF2B5EF4-FFF2-40B4-BE49-F238E27FC236}">
-                <a16:creationId xmlns:a16="http://schemas.microsoft.com/office/drawing/2014/main" xmlns="" id="{DCC62459-FE7B-48A9-A2FB-D56CDC251746}"/>
+                <a16:creationId xmlns:a16="http://schemas.microsoft.com/office/drawing/2014/main" id="{DCC62459-FE7B-48A9-A2FB-D56CDC251746}"/>
               </a:ext>
             </a:extLst>
           </p:cNvPr>
@@ -32288,7 +32177,7 @@
           <p:cNvPr id="164" name="Rectangle 163">
             <a:extLst>
               <a:ext uri="{FF2B5EF4-FFF2-40B4-BE49-F238E27FC236}">
-                <a16:creationId xmlns:a16="http://schemas.microsoft.com/office/drawing/2014/main" xmlns="" id="{A17E061D-69B0-4C5E-9A8B-BA722BA64CA4}"/>
+                <a16:creationId xmlns:a16="http://schemas.microsoft.com/office/drawing/2014/main" id="{A17E061D-69B0-4C5E-9A8B-BA722BA64CA4}"/>
               </a:ext>
             </a:extLst>
           </p:cNvPr>
@@ -32329,7 +32218,7 @@
           <p:cNvPr id="165" name="Folded Corner 14">
             <a:extLst>
               <a:ext uri="{FF2B5EF4-FFF2-40B4-BE49-F238E27FC236}">
-                <a16:creationId xmlns:a16="http://schemas.microsoft.com/office/drawing/2014/main" xmlns="" id="{E1EF52F6-55FE-4BD8-A276-7961F4C14406}"/>
+                <a16:creationId xmlns:a16="http://schemas.microsoft.com/office/drawing/2014/main" id="{E1EF52F6-55FE-4BD8-A276-7961F4C14406}"/>
               </a:ext>
             </a:extLst>
           </p:cNvPr>
@@ -32378,7 +32267,7 @@
           <p:cNvPr id="170" name="Rectangle 169">
             <a:extLst>
               <a:ext uri="{FF2B5EF4-FFF2-40B4-BE49-F238E27FC236}">
-                <a16:creationId xmlns:a16="http://schemas.microsoft.com/office/drawing/2014/main" xmlns="" id="{CD422137-5DD0-430D-A335-3434D32EC278}"/>
+                <a16:creationId xmlns:a16="http://schemas.microsoft.com/office/drawing/2014/main" id="{CD422137-5DD0-430D-A335-3434D32EC278}"/>
               </a:ext>
             </a:extLst>
           </p:cNvPr>
@@ -32430,7 +32319,7 @@
           <p:cNvPr id="171" name="Straight Arrow Connector 170">
             <a:extLst>
               <a:ext uri="{FF2B5EF4-FFF2-40B4-BE49-F238E27FC236}">
-                <a16:creationId xmlns:a16="http://schemas.microsoft.com/office/drawing/2014/main" xmlns="" id="{26251F63-0F9B-46FC-B288-264E1954D111}"/>
+                <a16:creationId xmlns:a16="http://schemas.microsoft.com/office/drawing/2014/main" id="{26251F63-0F9B-46FC-B288-264E1954D111}"/>
               </a:ext>
             </a:extLst>
           </p:cNvPr>
@@ -32475,7 +32364,7 @@
           <p:cNvPr id="172" name="Folded Corner 14">
             <a:extLst>
               <a:ext uri="{FF2B5EF4-FFF2-40B4-BE49-F238E27FC236}">
-                <a16:creationId xmlns:a16="http://schemas.microsoft.com/office/drawing/2014/main" xmlns="" id="{2198A703-2FEE-48EA-B0B0-656B73C08CA7}"/>
+                <a16:creationId xmlns:a16="http://schemas.microsoft.com/office/drawing/2014/main" id="{2198A703-2FEE-48EA-B0B0-656B73C08CA7}"/>
               </a:ext>
             </a:extLst>
           </p:cNvPr>
@@ -32524,7 +32413,7 @@
           <p:cNvPr id="173" name="Rectangle 172">
             <a:extLst>
               <a:ext uri="{FF2B5EF4-FFF2-40B4-BE49-F238E27FC236}">
-                <a16:creationId xmlns:a16="http://schemas.microsoft.com/office/drawing/2014/main" xmlns="" id="{FCC85E64-312F-4851-B756-3019DD6FA99F}"/>
+                <a16:creationId xmlns:a16="http://schemas.microsoft.com/office/drawing/2014/main" id="{FCC85E64-312F-4851-B756-3019DD6FA99F}"/>
               </a:ext>
             </a:extLst>
           </p:cNvPr>
@@ -32576,7 +32465,7 @@
           <p:cNvPr id="174" name="Straight Arrow Connector 173">
             <a:extLst>
               <a:ext uri="{FF2B5EF4-FFF2-40B4-BE49-F238E27FC236}">
-                <a16:creationId xmlns:a16="http://schemas.microsoft.com/office/drawing/2014/main" xmlns="" id="{518C8625-6187-4D33-A1AC-9208CA68F263}"/>
+                <a16:creationId xmlns:a16="http://schemas.microsoft.com/office/drawing/2014/main" id="{518C8625-6187-4D33-A1AC-9208CA68F263}"/>
               </a:ext>
             </a:extLst>
           </p:cNvPr>
@@ -32621,7 +32510,7 @@
           <p:cNvPr id="39" name="Rectangle 38">
             <a:extLst>
               <a:ext uri="{FF2B5EF4-FFF2-40B4-BE49-F238E27FC236}">
-                <a16:creationId xmlns:a16="http://schemas.microsoft.com/office/drawing/2014/main" xmlns="" id="{D01A5617-56DC-4B84-AF69-7027F4C7E7B3}"/>
+                <a16:creationId xmlns:a16="http://schemas.microsoft.com/office/drawing/2014/main" id="{D01A5617-56DC-4B84-AF69-7027F4C7E7B3}"/>
               </a:ext>
             </a:extLst>
           </p:cNvPr>
@@ -32676,7 +32565,7 @@
           <p:cNvPr id="40" name="Arrow: Right 39">
             <a:extLst>
               <a:ext uri="{FF2B5EF4-FFF2-40B4-BE49-F238E27FC236}">
-                <a16:creationId xmlns:a16="http://schemas.microsoft.com/office/drawing/2014/main" xmlns="" id="{AB7C45BA-0078-4BA1-A2B3-BC9A66ACD955}"/>
+                <a16:creationId xmlns:a16="http://schemas.microsoft.com/office/drawing/2014/main" id="{AB7C45BA-0078-4BA1-A2B3-BC9A66ACD955}"/>
               </a:ext>
             </a:extLst>
           </p:cNvPr>
@@ -32728,7 +32617,7 @@
           <p:cNvPr id="12" name="Picture 11" descr="A picture containing outdoor object&#10;&#10;Description generated with high confidence">
             <a:extLst>
               <a:ext uri="{FF2B5EF4-FFF2-40B4-BE49-F238E27FC236}">
-                <a16:creationId xmlns:a16="http://schemas.microsoft.com/office/drawing/2014/main" xmlns="" id="{684713F9-9ECF-4663-A027-A6113FA71893}"/>
+                <a16:creationId xmlns:a16="http://schemas.microsoft.com/office/drawing/2014/main" id="{684713F9-9ECF-4663-A027-A6113FA71893}"/>
               </a:ext>
             </a:extLst>
           </p:cNvPr>
@@ -32764,7 +32653,7 @@
           <p:cNvPr id="42" name="Straight Arrow Connector 41">
             <a:extLst>
               <a:ext uri="{FF2B5EF4-FFF2-40B4-BE49-F238E27FC236}">
-                <a16:creationId xmlns:a16="http://schemas.microsoft.com/office/drawing/2014/main" xmlns="" id="{AE9F3928-6603-4F44-B87F-D5568E789A51}"/>
+                <a16:creationId xmlns:a16="http://schemas.microsoft.com/office/drawing/2014/main" id="{AE9F3928-6603-4F44-B87F-D5568E789A51}"/>
               </a:ext>
             </a:extLst>
           </p:cNvPr>
@@ -32809,7 +32698,7 @@
           <p:cNvPr id="13" name="Rectangle 12">
             <a:extLst>
               <a:ext uri="{FF2B5EF4-FFF2-40B4-BE49-F238E27FC236}">
-                <a16:creationId xmlns:a16="http://schemas.microsoft.com/office/drawing/2014/main" xmlns="" id="{BE9850A2-3BDB-4A68-BCBD-94C436747806}"/>
+                <a16:creationId xmlns:a16="http://schemas.microsoft.com/office/drawing/2014/main" id="{BE9850A2-3BDB-4A68-BCBD-94C436747806}"/>
               </a:ext>
             </a:extLst>
           </p:cNvPr>
@@ -32875,7 +32764,7 @@
           <p:cNvPr id="44" name="Folded Corner 14">
             <a:extLst>
               <a:ext uri="{FF2B5EF4-FFF2-40B4-BE49-F238E27FC236}">
-                <a16:creationId xmlns:a16="http://schemas.microsoft.com/office/drawing/2014/main" xmlns="" id="{048A78E4-38F4-403F-B262-3393CB25026A}"/>
+                <a16:creationId xmlns:a16="http://schemas.microsoft.com/office/drawing/2014/main" id="{048A78E4-38F4-403F-B262-3393CB25026A}"/>
               </a:ext>
             </a:extLst>
           </p:cNvPr>
@@ -32924,7 +32813,7 @@
           <p:cNvPr id="45" name="Rectangle 44">
             <a:extLst>
               <a:ext uri="{FF2B5EF4-FFF2-40B4-BE49-F238E27FC236}">
-                <a16:creationId xmlns:a16="http://schemas.microsoft.com/office/drawing/2014/main" xmlns="" id="{B6EF94B6-C2BD-4454-B081-DC4CDC0FA78B}"/>
+                <a16:creationId xmlns:a16="http://schemas.microsoft.com/office/drawing/2014/main" id="{B6EF94B6-C2BD-4454-B081-DC4CDC0FA78B}"/>
               </a:ext>
             </a:extLst>
           </p:cNvPr>
@@ -32976,7 +32865,7 @@
           <p:cNvPr id="14" name="Rectangle 13">
             <a:extLst>
               <a:ext uri="{FF2B5EF4-FFF2-40B4-BE49-F238E27FC236}">
-                <a16:creationId xmlns:a16="http://schemas.microsoft.com/office/drawing/2014/main" xmlns="" id="{9F89B982-51DA-4A7B-B50E-BA08031E2C12}"/>
+                <a16:creationId xmlns:a16="http://schemas.microsoft.com/office/drawing/2014/main" id="{9F89B982-51DA-4A7B-B50E-BA08031E2C12}"/>
               </a:ext>
             </a:extLst>
           </p:cNvPr>
@@ -33014,7 +32903,7 @@
           <p:cNvPr id="15" name="Rectangle 14">
             <a:extLst>
               <a:ext uri="{FF2B5EF4-FFF2-40B4-BE49-F238E27FC236}">
-                <a16:creationId xmlns:a16="http://schemas.microsoft.com/office/drawing/2014/main" xmlns="" id="{4F318F00-3DF3-4DD0-9F9C-3D2FB2746086}"/>
+                <a16:creationId xmlns:a16="http://schemas.microsoft.com/office/drawing/2014/main" id="{4F318F00-3DF3-4DD0-9F9C-3D2FB2746086}"/>
               </a:ext>
             </a:extLst>
           </p:cNvPr>
@@ -33052,7 +32941,7 @@
           <p:cNvPr id="48" name="Rectangle 47">
             <a:extLst>
               <a:ext uri="{FF2B5EF4-FFF2-40B4-BE49-F238E27FC236}">
-                <a16:creationId xmlns:a16="http://schemas.microsoft.com/office/drawing/2014/main" xmlns="" id="{4B4F362E-13BC-4500-8556-53A8FC39D0B9}"/>
+                <a16:creationId xmlns:a16="http://schemas.microsoft.com/office/drawing/2014/main" id="{4B4F362E-13BC-4500-8556-53A8FC39D0B9}"/>
               </a:ext>
             </a:extLst>
           </p:cNvPr>
@@ -33090,7 +32979,7 @@
           <p:cNvPr id="17" name="Rectangle 16">
             <a:extLst>
               <a:ext uri="{FF2B5EF4-FFF2-40B4-BE49-F238E27FC236}">
-                <a16:creationId xmlns:a16="http://schemas.microsoft.com/office/drawing/2014/main" xmlns="" id="{E971B6A2-9BA5-482C-991E-4489D5C190FD}"/>
+                <a16:creationId xmlns:a16="http://schemas.microsoft.com/office/drawing/2014/main" id="{E971B6A2-9BA5-482C-991E-4489D5C190FD}"/>
               </a:ext>
             </a:extLst>
           </p:cNvPr>
@@ -33128,7 +33017,7 @@
           <p:cNvPr id="20" name="Rectangle 19">
             <a:extLst>
               <a:ext uri="{FF2B5EF4-FFF2-40B4-BE49-F238E27FC236}">
-                <a16:creationId xmlns:a16="http://schemas.microsoft.com/office/drawing/2014/main" xmlns="" id="{99534692-59D2-4947-83E0-D4E8E4591FD6}"/>
+                <a16:creationId xmlns:a16="http://schemas.microsoft.com/office/drawing/2014/main" id="{99534692-59D2-4947-83E0-D4E8E4591FD6}"/>
               </a:ext>
             </a:extLst>
           </p:cNvPr>
@@ -33210,7 +33099,7 @@
           <p:cNvPr id="175" name="Folded Corner 14">
             <a:extLst>
               <a:ext uri="{FF2B5EF4-FFF2-40B4-BE49-F238E27FC236}">
-                <a16:creationId xmlns:a16="http://schemas.microsoft.com/office/drawing/2014/main" xmlns="" id="{D7925C44-E3E5-47AF-9CC8-BF6471802A70}"/>
+                <a16:creationId xmlns:a16="http://schemas.microsoft.com/office/drawing/2014/main" id="{D7925C44-E3E5-47AF-9CC8-BF6471802A70}"/>
               </a:ext>
             </a:extLst>
           </p:cNvPr>
@@ -33259,7 +33148,7 @@
           <p:cNvPr id="2" name="Diagram 1">
             <a:extLst>
               <a:ext uri="{FF2B5EF4-FFF2-40B4-BE49-F238E27FC236}">
-                <a16:creationId xmlns:a16="http://schemas.microsoft.com/office/drawing/2014/main" xmlns="" id="{214EDC3A-CB98-4BD4-86CB-C3DE5CC0A317}"/>
+                <a16:creationId xmlns:a16="http://schemas.microsoft.com/office/drawing/2014/main" id="{214EDC3A-CB98-4BD4-86CB-C3DE5CC0A317}"/>
               </a:ext>
             </a:extLst>
           </p:cNvPr>
@@ -33287,7 +33176,7 @@
           <p:cNvPr id="3" name="Rectangle 2">
             <a:extLst>
               <a:ext uri="{FF2B5EF4-FFF2-40B4-BE49-F238E27FC236}">
-                <a16:creationId xmlns:a16="http://schemas.microsoft.com/office/drawing/2014/main" xmlns="" id="{8D715EE1-32F0-4BAE-86BD-83B54B3137EB}"/>
+                <a16:creationId xmlns:a16="http://schemas.microsoft.com/office/drawing/2014/main" id="{8D715EE1-32F0-4BAE-86BD-83B54B3137EB}"/>
               </a:ext>
             </a:extLst>
           </p:cNvPr>
@@ -33364,7 +33253,7 @@
           <p:cNvPr id="4" name="Rectangle 3">
             <a:extLst>
               <a:ext uri="{FF2B5EF4-FFF2-40B4-BE49-F238E27FC236}">
-                <a16:creationId xmlns:a16="http://schemas.microsoft.com/office/drawing/2014/main" xmlns="" id="{2CBF344E-950A-4767-97FA-13FFE695BBC3}"/>
+                <a16:creationId xmlns:a16="http://schemas.microsoft.com/office/drawing/2014/main" id="{2CBF344E-950A-4767-97FA-13FFE695BBC3}"/>
               </a:ext>
             </a:extLst>
           </p:cNvPr>
@@ -33405,7 +33294,7 @@
           <p:cNvPr id="126" name="Rectangle 125">
             <a:extLst>
               <a:ext uri="{FF2B5EF4-FFF2-40B4-BE49-F238E27FC236}">
-                <a16:creationId xmlns:a16="http://schemas.microsoft.com/office/drawing/2014/main" xmlns="" id="{AFE62E66-21DE-45BB-AB76-2BCE8E9BEC95}"/>
+                <a16:creationId xmlns:a16="http://schemas.microsoft.com/office/drawing/2014/main" id="{AFE62E66-21DE-45BB-AB76-2BCE8E9BEC95}"/>
               </a:ext>
             </a:extLst>
           </p:cNvPr>
@@ -33506,7 +33395,7 @@
           <p:cNvPr id="128" name="Rectangle 127">
             <a:extLst>
               <a:ext uri="{FF2B5EF4-FFF2-40B4-BE49-F238E27FC236}">
-                <a16:creationId xmlns:a16="http://schemas.microsoft.com/office/drawing/2014/main" xmlns="" id="{57B25911-E59E-4329-B921-A0EBAE8F9C7E}"/>
+                <a16:creationId xmlns:a16="http://schemas.microsoft.com/office/drawing/2014/main" id="{57B25911-E59E-4329-B921-A0EBAE8F9C7E}"/>
               </a:ext>
             </a:extLst>
           </p:cNvPr>
@@ -33583,7 +33472,7 @@
           <p:cNvPr id="5" name="Rectangle 4">
             <a:extLst>
               <a:ext uri="{FF2B5EF4-FFF2-40B4-BE49-F238E27FC236}">
-                <a16:creationId xmlns:a16="http://schemas.microsoft.com/office/drawing/2014/main" xmlns="" id="{798B0573-B3AD-48CB-9F8F-13EC6567D0D3}"/>
+                <a16:creationId xmlns:a16="http://schemas.microsoft.com/office/drawing/2014/main" id="{798B0573-B3AD-48CB-9F8F-13EC6567D0D3}"/>
               </a:ext>
             </a:extLst>
           </p:cNvPr>
@@ -33678,7 +33567,7 @@
           <p:cNvPr id="6" name="Rectangle 5">
             <a:extLst>
               <a:ext uri="{FF2B5EF4-FFF2-40B4-BE49-F238E27FC236}">
-                <a16:creationId xmlns:a16="http://schemas.microsoft.com/office/drawing/2014/main" xmlns="" id="{2B5D63EA-C9C9-4E25-A071-89FBDD4231BE}"/>
+                <a16:creationId xmlns:a16="http://schemas.microsoft.com/office/drawing/2014/main" id="{2B5D63EA-C9C9-4E25-A071-89FBDD4231BE}"/>
               </a:ext>
             </a:extLst>
           </p:cNvPr>
@@ -33716,7 +33605,7 @@
           <p:cNvPr id="8" name="Rectangle 7">
             <a:extLst>
               <a:ext uri="{FF2B5EF4-FFF2-40B4-BE49-F238E27FC236}">
-                <a16:creationId xmlns:a16="http://schemas.microsoft.com/office/drawing/2014/main" xmlns="" id="{BE0255C1-0F86-4BC8-84D8-4B76F00785A9}"/>
+                <a16:creationId xmlns:a16="http://schemas.microsoft.com/office/drawing/2014/main" id="{BE0255C1-0F86-4BC8-84D8-4B76F00785A9}"/>
               </a:ext>
             </a:extLst>
           </p:cNvPr>
@@ -33757,7 +33646,7 @@
           <p:cNvPr id="9" name="Rectangle 8">
             <a:extLst>
               <a:ext uri="{FF2B5EF4-FFF2-40B4-BE49-F238E27FC236}">
-                <a16:creationId xmlns:a16="http://schemas.microsoft.com/office/drawing/2014/main" xmlns="" id="{CFD7F599-A36B-4AA7-86FA-23355394169C}"/>
+                <a16:creationId xmlns:a16="http://schemas.microsoft.com/office/drawing/2014/main" id="{CFD7F599-A36B-4AA7-86FA-23355394169C}"/>
               </a:ext>
             </a:extLst>
           </p:cNvPr>
@@ -33798,7 +33687,7 @@
           <p:cNvPr id="130" name="Rectangle 129">
             <a:extLst>
               <a:ext uri="{FF2B5EF4-FFF2-40B4-BE49-F238E27FC236}">
-                <a16:creationId xmlns:a16="http://schemas.microsoft.com/office/drawing/2014/main" xmlns="" id="{F21A4D44-CAD2-400B-8E2D-F8B1FEA0E5B6}"/>
+                <a16:creationId xmlns:a16="http://schemas.microsoft.com/office/drawing/2014/main" id="{F21A4D44-CAD2-400B-8E2D-F8B1FEA0E5B6}"/>
               </a:ext>
             </a:extLst>
           </p:cNvPr>
@@ -33839,7 +33728,7 @@
           <p:cNvPr id="131" name="Rectangle 130">
             <a:extLst>
               <a:ext uri="{FF2B5EF4-FFF2-40B4-BE49-F238E27FC236}">
-                <a16:creationId xmlns:a16="http://schemas.microsoft.com/office/drawing/2014/main" xmlns="" id="{7ECE62BA-C5A0-4279-B504-BAC3C2C73E71}"/>
+                <a16:creationId xmlns:a16="http://schemas.microsoft.com/office/drawing/2014/main" id="{7ECE62BA-C5A0-4279-B504-BAC3C2C73E71}"/>
               </a:ext>
             </a:extLst>
           </p:cNvPr>
@@ -33891,7 +33780,7 @@
           <p:cNvPr id="10" name="Cube 9">
             <a:extLst>
               <a:ext uri="{FF2B5EF4-FFF2-40B4-BE49-F238E27FC236}">
-                <a16:creationId xmlns:a16="http://schemas.microsoft.com/office/drawing/2014/main" xmlns="" id="{F871D032-A4AE-406F-A80A-38A8B0BED40E}"/>
+                <a16:creationId xmlns:a16="http://schemas.microsoft.com/office/drawing/2014/main" id="{F871D032-A4AE-406F-A80A-38A8B0BED40E}"/>
               </a:ext>
             </a:extLst>
           </p:cNvPr>
@@ -33951,7 +33840,7 @@
           <p:cNvPr id="133" name="Folded Corner 14">
             <a:extLst>
               <a:ext uri="{FF2B5EF4-FFF2-40B4-BE49-F238E27FC236}">
-                <a16:creationId xmlns:a16="http://schemas.microsoft.com/office/drawing/2014/main" xmlns="" id="{DDDEB2FA-CB2B-41A1-82A4-458F3DD3A4D7}"/>
+                <a16:creationId xmlns:a16="http://schemas.microsoft.com/office/drawing/2014/main" id="{DDDEB2FA-CB2B-41A1-82A4-458F3DD3A4D7}"/>
               </a:ext>
             </a:extLst>
           </p:cNvPr>
@@ -34000,7 +33889,7 @@
           <p:cNvPr id="11" name="Rectangle 10">
             <a:extLst>
               <a:ext uri="{FF2B5EF4-FFF2-40B4-BE49-F238E27FC236}">
-                <a16:creationId xmlns:a16="http://schemas.microsoft.com/office/drawing/2014/main" xmlns="" id="{F638F98D-376A-4707-AFEB-3116E75204BA}"/>
+                <a16:creationId xmlns:a16="http://schemas.microsoft.com/office/drawing/2014/main" id="{F638F98D-376A-4707-AFEB-3116E75204BA}"/>
               </a:ext>
             </a:extLst>
           </p:cNvPr>
@@ -34055,7 +33944,7 @@
           <p:cNvPr id="18" name="Picture 17" descr="A close up of an animal&#10;&#10;Description generated with high confidence">
             <a:extLst>
               <a:ext uri="{FF2B5EF4-FFF2-40B4-BE49-F238E27FC236}">
-                <a16:creationId xmlns:a16="http://schemas.microsoft.com/office/drawing/2014/main" xmlns="" id="{4132CF14-571D-4435-9A41-BF9FAEA4439C}"/>
+                <a16:creationId xmlns:a16="http://schemas.microsoft.com/office/drawing/2014/main" id="{4132CF14-571D-4435-9A41-BF9FAEA4439C}"/>
               </a:ext>
             </a:extLst>
           </p:cNvPr>
@@ -34091,7 +33980,7 @@
           <p:cNvPr id="19" name="Rectangle 18">
             <a:extLst>
               <a:ext uri="{FF2B5EF4-FFF2-40B4-BE49-F238E27FC236}">
-                <a16:creationId xmlns:a16="http://schemas.microsoft.com/office/drawing/2014/main" xmlns="" id="{1047E73B-15B2-47B6-9C78-BCDB588C3019}"/>
+                <a16:creationId xmlns:a16="http://schemas.microsoft.com/office/drawing/2014/main" id="{1047E73B-15B2-47B6-9C78-BCDB588C3019}"/>
               </a:ext>
             </a:extLst>
           </p:cNvPr>
@@ -34133,7 +34022,7 @@
           <p:cNvPr id="31" name="Straight Arrow Connector 30">
             <a:extLst>
               <a:ext uri="{FF2B5EF4-FFF2-40B4-BE49-F238E27FC236}">
-                <a16:creationId xmlns:a16="http://schemas.microsoft.com/office/drawing/2014/main" xmlns="" id="{E3ACBD9C-E946-4C83-82A0-7C79817A1EB9}"/>
+                <a16:creationId xmlns:a16="http://schemas.microsoft.com/office/drawing/2014/main" id="{E3ACBD9C-E946-4C83-82A0-7C79817A1EB9}"/>
               </a:ext>
             </a:extLst>
           </p:cNvPr>
@@ -34176,7 +34065,7 @@
           <p:cNvPr id="32" name="Rectangle 31">
             <a:extLst>
               <a:ext uri="{FF2B5EF4-FFF2-40B4-BE49-F238E27FC236}">
-                <a16:creationId xmlns:a16="http://schemas.microsoft.com/office/drawing/2014/main" xmlns="" id="{DAD5A302-C880-4E8C-9E1D-640CD5CF0CBE}"/>
+                <a16:creationId xmlns:a16="http://schemas.microsoft.com/office/drawing/2014/main" id="{DAD5A302-C880-4E8C-9E1D-640CD5CF0CBE}"/>
               </a:ext>
             </a:extLst>
           </p:cNvPr>
@@ -34214,7 +34103,7 @@
           <p:cNvPr id="135" name="Rectangle 134">
             <a:extLst>
               <a:ext uri="{FF2B5EF4-FFF2-40B4-BE49-F238E27FC236}">
-                <a16:creationId xmlns:a16="http://schemas.microsoft.com/office/drawing/2014/main" xmlns="" id="{9D239E65-7C2B-4AD5-A1F4-F716E33EF928}"/>
+                <a16:creationId xmlns:a16="http://schemas.microsoft.com/office/drawing/2014/main" id="{9D239E65-7C2B-4AD5-A1F4-F716E33EF928}"/>
               </a:ext>
             </a:extLst>
           </p:cNvPr>
@@ -34252,7 +34141,7 @@
           <p:cNvPr id="146" name="Rectangle 145">
             <a:extLst>
               <a:ext uri="{FF2B5EF4-FFF2-40B4-BE49-F238E27FC236}">
-                <a16:creationId xmlns:a16="http://schemas.microsoft.com/office/drawing/2014/main" xmlns="" id="{02CB9ACB-9175-4592-A0A2-5F6EBA3916AA}"/>
+                <a16:creationId xmlns:a16="http://schemas.microsoft.com/office/drawing/2014/main" id="{02CB9ACB-9175-4592-A0A2-5F6EBA3916AA}"/>
               </a:ext>
             </a:extLst>
           </p:cNvPr>
@@ -34290,7 +34179,7 @@
           <p:cNvPr id="33" name="Rectangle 32">
             <a:extLst>
               <a:ext uri="{FF2B5EF4-FFF2-40B4-BE49-F238E27FC236}">
-                <a16:creationId xmlns:a16="http://schemas.microsoft.com/office/drawing/2014/main" xmlns="" id="{A5445AD6-3298-4B4A-BFAA-36E271EE36D3}"/>
+                <a16:creationId xmlns:a16="http://schemas.microsoft.com/office/drawing/2014/main" id="{A5445AD6-3298-4B4A-BFAA-36E271EE36D3}"/>
               </a:ext>
             </a:extLst>
           </p:cNvPr>
@@ -34331,7 +34220,7 @@
           <p:cNvPr id="148" name="Cube 147">
             <a:extLst>
               <a:ext uri="{FF2B5EF4-FFF2-40B4-BE49-F238E27FC236}">
-                <a16:creationId xmlns:a16="http://schemas.microsoft.com/office/drawing/2014/main" xmlns="" id="{3C1DB64A-F95E-4BBA-AAB7-E382DEE6D3AD}"/>
+                <a16:creationId xmlns:a16="http://schemas.microsoft.com/office/drawing/2014/main" id="{3C1DB64A-F95E-4BBA-AAB7-E382DEE6D3AD}"/>
               </a:ext>
             </a:extLst>
           </p:cNvPr>
@@ -34391,7 +34280,7 @@
           <p:cNvPr id="149" name="Rectangle 148">
             <a:extLst>
               <a:ext uri="{FF2B5EF4-FFF2-40B4-BE49-F238E27FC236}">
-                <a16:creationId xmlns:a16="http://schemas.microsoft.com/office/drawing/2014/main" xmlns="" id="{8ADE2C1F-3705-4E1D-9D1A-CEFA5BBDC4AE}"/>
+                <a16:creationId xmlns:a16="http://schemas.microsoft.com/office/drawing/2014/main" id="{8ADE2C1F-3705-4E1D-9D1A-CEFA5BBDC4AE}"/>
               </a:ext>
             </a:extLst>
           </p:cNvPr>
@@ -34432,7 +34321,7 @@
           <p:cNvPr id="152" name="Folded Corner 14">
             <a:extLst>
               <a:ext uri="{FF2B5EF4-FFF2-40B4-BE49-F238E27FC236}">
-                <a16:creationId xmlns:a16="http://schemas.microsoft.com/office/drawing/2014/main" xmlns="" id="{E9E59862-8121-45E9-B034-254AA5F85A9E}"/>
+                <a16:creationId xmlns:a16="http://schemas.microsoft.com/office/drawing/2014/main" id="{E9E59862-8121-45E9-B034-254AA5F85A9E}"/>
               </a:ext>
             </a:extLst>
           </p:cNvPr>
@@ -34481,7 +34370,7 @@
           <p:cNvPr id="159" name="Rectangle 158">
             <a:extLst>
               <a:ext uri="{FF2B5EF4-FFF2-40B4-BE49-F238E27FC236}">
-                <a16:creationId xmlns:a16="http://schemas.microsoft.com/office/drawing/2014/main" xmlns="" id="{9189909A-C973-403D-AC10-F162C1C50251}"/>
+                <a16:creationId xmlns:a16="http://schemas.microsoft.com/office/drawing/2014/main" id="{9189909A-C973-403D-AC10-F162C1C50251}"/>
               </a:ext>
             </a:extLst>
           </p:cNvPr>
@@ -34536,7 +34425,7 @@
           <p:cNvPr id="160" name="Straight Arrow Connector 159">
             <a:extLst>
               <a:ext uri="{FF2B5EF4-FFF2-40B4-BE49-F238E27FC236}">
-                <a16:creationId xmlns:a16="http://schemas.microsoft.com/office/drawing/2014/main" xmlns="" id="{4104DBBE-32EA-425C-8DB2-CA3E800CA64E}"/>
+                <a16:creationId xmlns:a16="http://schemas.microsoft.com/office/drawing/2014/main" id="{4104DBBE-32EA-425C-8DB2-CA3E800CA64E}"/>
               </a:ext>
             </a:extLst>
           </p:cNvPr>
@@ -34581,7 +34470,7 @@
           <p:cNvPr id="163" name="Cube 162">
             <a:extLst>
               <a:ext uri="{FF2B5EF4-FFF2-40B4-BE49-F238E27FC236}">
-                <a16:creationId xmlns:a16="http://schemas.microsoft.com/office/drawing/2014/main" xmlns="" id="{DCC62459-FE7B-48A9-A2FB-D56CDC251746}"/>
+                <a16:creationId xmlns:a16="http://schemas.microsoft.com/office/drawing/2014/main" id="{DCC62459-FE7B-48A9-A2FB-D56CDC251746}"/>
               </a:ext>
             </a:extLst>
           </p:cNvPr>
@@ -34641,7 +34530,7 @@
           <p:cNvPr id="164" name="Rectangle 163">
             <a:extLst>
               <a:ext uri="{FF2B5EF4-FFF2-40B4-BE49-F238E27FC236}">
-                <a16:creationId xmlns:a16="http://schemas.microsoft.com/office/drawing/2014/main" xmlns="" id="{A17E061D-69B0-4C5E-9A8B-BA722BA64CA4}"/>
+                <a16:creationId xmlns:a16="http://schemas.microsoft.com/office/drawing/2014/main" id="{A17E061D-69B0-4C5E-9A8B-BA722BA64CA4}"/>
               </a:ext>
             </a:extLst>
           </p:cNvPr>
@@ -34682,7 +34571,7 @@
           <p:cNvPr id="165" name="Folded Corner 14">
             <a:extLst>
               <a:ext uri="{FF2B5EF4-FFF2-40B4-BE49-F238E27FC236}">
-                <a16:creationId xmlns:a16="http://schemas.microsoft.com/office/drawing/2014/main" xmlns="" id="{E1EF52F6-55FE-4BD8-A276-7961F4C14406}"/>
+                <a16:creationId xmlns:a16="http://schemas.microsoft.com/office/drawing/2014/main" id="{E1EF52F6-55FE-4BD8-A276-7961F4C14406}"/>
               </a:ext>
             </a:extLst>
           </p:cNvPr>
@@ -34731,7 +34620,7 @@
           <p:cNvPr id="170" name="Rectangle 169">
             <a:extLst>
               <a:ext uri="{FF2B5EF4-FFF2-40B4-BE49-F238E27FC236}">
-                <a16:creationId xmlns:a16="http://schemas.microsoft.com/office/drawing/2014/main" xmlns="" id="{CD422137-5DD0-430D-A335-3434D32EC278}"/>
+                <a16:creationId xmlns:a16="http://schemas.microsoft.com/office/drawing/2014/main" id="{CD422137-5DD0-430D-A335-3434D32EC278}"/>
               </a:ext>
             </a:extLst>
           </p:cNvPr>
@@ -34783,7 +34672,7 @@
           <p:cNvPr id="171" name="Straight Arrow Connector 170">
             <a:extLst>
               <a:ext uri="{FF2B5EF4-FFF2-40B4-BE49-F238E27FC236}">
-                <a16:creationId xmlns:a16="http://schemas.microsoft.com/office/drawing/2014/main" xmlns="" id="{26251F63-0F9B-46FC-B288-264E1954D111}"/>
+                <a16:creationId xmlns:a16="http://schemas.microsoft.com/office/drawing/2014/main" id="{26251F63-0F9B-46FC-B288-264E1954D111}"/>
               </a:ext>
             </a:extLst>
           </p:cNvPr>
@@ -34828,7 +34717,7 @@
           <p:cNvPr id="172" name="Folded Corner 14">
             <a:extLst>
               <a:ext uri="{FF2B5EF4-FFF2-40B4-BE49-F238E27FC236}">
-                <a16:creationId xmlns:a16="http://schemas.microsoft.com/office/drawing/2014/main" xmlns="" id="{2198A703-2FEE-48EA-B0B0-656B73C08CA7}"/>
+                <a16:creationId xmlns:a16="http://schemas.microsoft.com/office/drawing/2014/main" id="{2198A703-2FEE-48EA-B0B0-656B73C08CA7}"/>
               </a:ext>
             </a:extLst>
           </p:cNvPr>
@@ -34877,7 +34766,7 @@
           <p:cNvPr id="173" name="Rectangle 172">
             <a:extLst>
               <a:ext uri="{FF2B5EF4-FFF2-40B4-BE49-F238E27FC236}">
-                <a16:creationId xmlns:a16="http://schemas.microsoft.com/office/drawing/2014/main" xmlns="" id="{FCC85E64-312F-4851-B756-3019DD6FA99F}"/>
+                <a16:creationId xmlns:a16="http://schemas.microsoft.com/office/drawing/2014/main" id="{FCC85E64-312F-4851-B756-3019DD6FA99F}"/>
               </a:ext>
             </a:extLst>
           </p:cNvPr>
@@ -34929,7 +34818,7 @@
           <p:cNvPr id="174" name="Straight Arrow Connector 173">
             <a:extLst>
               <a:ext uri="{FF2B5EF4-FFF2-40B4-BE49-F238E27FC236}">
-                <a16:creationId xmlns:a16="http://schemas.microsoft.com/office/drawing/2014/main" xmlns="" id="{518C8625-6187-4D33-A1AC-9208CA68F263}"/>
+                <a16:creationId xmlns:a16="http://schemas.microsoft.com/office/drawing/2014/main" id="{518C8625-6187-4D33-A1AC-9208CA68F263}"/>
               </a:ext>
             </a:extLst>
           </p:cNvPr>
@@ -34974,7 +34863,7 @@
           <p:cNvPr id="39" name="Rectangle 38">
             <a:extLst>
               <a:ext uri="{FF2B5EF4-FFF2-40B4-BE49-F238E27FC236}">
-                <a16:creationId xmlns:a16="http://schemas.microsoft.com/office/drawing/2014/main" xmlns="" id="{D01A5617-56DC-4B84-AF69-7027F4C7E7B3}"/>
+                <a16:creationId xmlns:a16="http://schemas.microsoft.com/office/drawing/2014/main" id="{D01A5617-56DC-4B84-AF69-7027F4C7E7B3}"/>
               </a:ext>
             </a:extLst>
           </p:cNvPr>
@@ -35029,7 +34918,7 @@
           <p:cNvPr id="40" name="Arrow: Right 39">
             <a:extLst>
               <a:ext uri="{FF2B5EF4-FFF2-40B4-BE49-F238E27FC236}">
-                <a16:creationId xmlns:a16="http://schemas.microsoft.com/office/drawing/2014/main" xmlns="" id="{AB7C45BA-0078-4BA1-A2B3-BC9A66ACD955}"/>
+                <a16:creationId xmlns:a16="http://schemas.microsoft.com/office/drawing/2014/main" id="{AB7C45BA-0078-4BA1-A2B3-BC9A66ACD955}"/>
               </a:ext>
             </a:extLst>
           </p:cNvPr>
@@ -35081,7 +34970,7 @@
           <p:cNvPr id="12" name="Picture 11" descr="A picture containing outdoor object&#10;&#10;Description generated with high confidence">
             <a:extLst>
               <a:ext uri="{FF2B5EF4-FFF2-40B4-BE49-F238E27FC236}">
-                <a16:creationId xmlns:a16="http://schemas.microsoft.com/office/drawing/2014/main" xmlns="" id="{684713F9-9ECF-4663-A027-A6113FA71893}"/>
+                <a16:creationId xmlns:a16="http://schemas.microsoft.com/office/drawing/2014/main" id="{684713F9-9ECF-4663-A027-A6113FA71893}"/>
               </a:ext>
             </a:extLst>
           </p:cNvPr>
@@ -35117,7 +35006,7 @@
           <p:cNvPr id="42" name="Straight Arrow Connector 41">
             <a:extLst>
               <a:ext uri="{FF2B5EF4-FFF2-40B4-BE49-F238E27FC236}">
-                <a16:creationId xmlns:a16="http://schemas.microsoft.com/office/drawing/2014/main" xmlns="" id="{AE9F3928-6603-4F44-B87F-D5568E789A51}"/>
+                <a16:creationId xmlns:a16="http://schemas.microsoft.com/office/drawing/2014/main" id="{AE9F3928-6603-4F44-B87F-D5568E789A51}"/>
               </a:ext>
             </a:extLst>
           </p:cNvPr>
@@ -35162,7 +35051,7 @@
           <p:cNvPr id="13" name="Rectangle 12">
             <a:extLst>
               <a:ext uri="{FF2B5EF4-FFF2-40B4-BE49-F238E27FC236}">
-                <a16:creationId xmlns:a16="http://schemas.microsoft.com/office/drawing/2014/main" xmlns="" id="{BE9850A2-3BDB-4A68-BCBD-94C436747806}"/>
+                <a16:creationId xmlns:a16="http://schemas.microsoft.com/office/drawing/2014/main" id="{BE9850A2-3BDB-4A68-BCBD-94C436747806}"/>
               </a:ext>
             </a:extLst>
           </p:cNvPr>
@@ -35228,7 +35117,7 @@
           <p:cNvPr id="44" name="Folded Corner 14">
             <a:extLst>
               <a:ext uri="{FF2B5EF4-FFF2-40B4-BE49-F238E27FC236}">
-                <a16:creationId xmlns:a16="http://schemas.microsoft.com/office/drawing/2014/main" xmlns="" id="{048A78E4-38F4-403F-B262-3393CB25026A}"/>
+                <a16:creationId xmlns:a16="http://schemas.microsoft.com/office/drawing/2014/main" id="{048A78E4-38F4-403F-B262-3393CB25026A}"/>
               </a:ext>
             </a:extLst>
           </p:cNvPr>
@@ -35277,7 +35166,7 @@
           <p:cNvPr id="45" name="Rectangle 44">
             <a:extLst>
               <a:ext uri="{FF2B5EF4-FFF2-40B4-BE49-F238E27FC236}">
-                <a16:creationId xmlns:a16="http://schemas.microsoft.com/office/drawing/2014/main" xmlns="" id="{B6EF94B6-C2BD-4454-B081-DC4CDC0FA78B}"/>
+                <a16:creationId xmlns:a16="http://schemas.microsoft.com/office/drawing/2014/main" id="{B6EF94B6-C2BD-4454-B081-DC4CDC0FA78B}"/>
               </a:ext>
             </a:extLst>
           </p:cNvPr>
@@ -35329,7 +35218,7 @@
           <p:cNvPr id="14" name="Rectangle 13">
             <a:extLst>
               <a:ext uri="{FF2B5EF4-FFF2-40B4-BE49-F238E27FC236}">
-                <a16:creationId xmlns:a16="http://schemas.microsoft.com/office/drawing/2014/main" xmlns="" id="{9F89B982-51DA-4A7B-B50E-BA08031E2C12}"/>
+                <a16:creationId xmlns:a16="http://schemas.microsoft.com/office/drawing/2014/main" id="{9F89B982-51DA-4A7B-B50E-BA08031E2C12}"/>
               </a:ext>
             </a:extLst>
           </p:cNvPr>
@@ -35367,7 +35256,7 @@
           <p:cNvPr id="15" name="Rectangle 14">
             <a:extLst>
               <a:ext uri="{FF2B5EF4-FFF2-40B4-BE49-F238E27FC236}">
-                <a16:creationId xmlns:a16="http://schemas.microsoft.com/office/drawing/2014/main" xmlns="" id="{4F318F00-3DF3-4DD0-9F9C-3D2FB2746086}"/>
+                <a16:creationId xmlns:a16="http://schemas.microsoft.com/office/drawing/2014/main" id="{4F318F00-3DF3-4DD0-9F9C-3D2FB2746086}"/>
               </a:ext>
             </a:extLst>
           </p:cNvPr>
@@ -35405,7 +35294,7 @@
           <p:cNvPr id="48" name="Rectangle 47">
             <a:extLst>
               <a:ext uri="{FF2B5EF4-FFF2-40B4-BE49-F238E27FC236}">
-                <a16:creationId xmlns:a16="http://schemas.microsoft.com/office/drawing/2014/main" xmlns="" id="{4B4F362E-13BC-4500-8556-53A8FC39D0B9}"/>
+                <a16:creationId xmlns:a16="http://schemas.microsoft.com/office/drawing/2014/main" id="{4B4F362E-13BC-4500-8556-53A8FC39D0B9}"/>
               </a:ext>
             </a:extLst>
           </p:cNvPr>
@@ -35443,7 +35332,7 @@
           <p:cNvPr id="17" name="Rectangle 16">
             <a:extLst>
               <a:ext uri="{FF2B5EF4-FFF2-40B4-BE49-F238E27FC236}">
-                <a16:creationId xmlns:a16="http://schemas.microsoft.com/office/drawing/2014/main" xmlns="" id="{E971B6A2-9BA5-482C-991E-4489D5C190FD}"/>
+                <a16:creationId xmlns:a16="http://schemas.microsoft.com/office/drawing/2014/main" id="{E971B6A2-9BA5-482C-991E-4489D5C190FD}"/>
               </a:ext>
             </a:extLst>
           </p:cNvPr>
@@ -35619,7 +35508,7 @@
           <p:cNvPr id="52" name="Rectangle 51">
             <a:extLst>
               <a:ext uri="{FF2B5EF4-FFF2-40B4-BE49-F238E27FC236}">
-                <a16:creationId xmlns:a16="http://schemas.microsoft.com/office/drawing/2014/main" xmlns="" id="{99534692-59D2-4947-83E0-D4E8E4591FD6}"/>
+                <a16:creationId xmlns:a16="http://schemas.microsoft.com/office/drawing/2014/main" id="{99534692-59D2-4947-83E0-D4E8E4591FD6}"/>
               </a:ext>
             </a:extLst>
           </p:cNvPr>
@@ -35701,7 +35590,7 @@
           <p:cNvPr id="175" name="Folded Corner 14">
             <a:extLst>
               <a:ext uri="{FF2B5EF4-FFF2-40B4-BE49-F238E27FC236}">
-                <a16:creationId xmlns:a16="http://schemas.microsoft.com/office/drawing/2014/main" xmlns="" id="{D7925C44-E3E5-47AF-9CC8-BF6471802A70}"/>
+                <a16:creationId xmlns:a16="http://schemas.microsoft.com/office/drawing/2014/main" id="{D7925C44-E3E5-47AF-9CC8-BF6471802A70}"/>
               </a:ext>
             </a:extLst>
           </p:cNvPr>
@@ -35750,7 +35639,7 @@
           <p:cNvPr id="2" name="Diagram 1">
             <a:extLst>
               <a:ext uri="{FF2B5EF4-FFF2-40B4-BE49-F238E27FC236}">
-                <a16:creationId xmlns:a16="http://schemas.microsoft.com/office/drawing/2014/main" xmlns="" id="{214EDC3A-CB98-4BD4-86CB-C3DE5CC0A317}"/>
+                <a16:creationId xmlns:a16="http://schemas.microsoft.com/office/drawing/2014/main" id="{214EDC3A-CB98-4BD4-86CB-C3DE5CC0A317}"/>
               </a:ext>
             </a:extLst>
           </p:cNvPr>
@@ -35778,7 +35667,7 @@
           <p:cNvPr id="3" name="Rectangle 2">
             <a:extLst>
               <a:ext uri="{FF2B5EF4-FFF2-40B4-BE49-F238E27FC236}">
-                <a16:creationId xmlns:a16="http://schemas.microsoft.com/office/drawing/2014/main" xmlns="" id="{8D715EE1-32F0-4BAE-86BD-83B54B3137EB}"/>
+                <a16:creationId xmlns:a16="http://schemas.microsoft.com/office/drawing/2014/main" id="{8D715EE1-32F0-4BAE-86BD-83B54B3137EB}"/>
               </a:ext>
             </a:extLst>
           </p:cNvPr>
@@ -35833,7 +35722,7 @@
           <p:cNvPr id="4" name="Rectangle 3">
             <a:extLst>
               <a:ext uri="{FF2B5EF4-FFF2-40B4-BE49-F238E27FC236}">
-                <a16:creationId xmlns:a16="http://schemas.microsoft.com/office/drawing/2014/main" xmlns="" id="{2CBF344E-950A-4767-97FA-13FFE695BBC3}"/>
+                <a16:creationId xmlns:a16="http://schemas.microsoft.com/office/drawing/2014/main" id="{2CBF344E-950A-4767-97FA-13FFE695BBC3}"/>
               </a:ext>
             </a:extLst>
           </p:cNvPr>
@@ -35874,7 +35763,7 @@
           <p:cNvPr id="126" name="Rectangle 125">
             <a:extLst>
               <a:ext uri="{FF2B5EF4-FFF2-40B4-BE49-F238E27FC236}">
-                <a16:creationId xmlns:a16="http://schemas.microsoft.com/office/drawing/2014/main" xmlns="" id="{AFE62E66-21DE-45BB-AB76-2BCE8E9BEC95}"/>
+                <a16:creationId xmlns:a16="http://schemas.microsoft.com/office/drawing/2014/main" id="{AFE62E66-21DE-45BB-AB76-2BCE8E9BEC95}"/>
               </a:ext>
             </a:extLst>
           </p:cNvPr>
@@ -35922,7 +35811,7 @@
           <p:cNvPr id="128" name="Rectangle 127">
             <a:extLst>
               <a:ext uri="{FF2B5EF4-FFF2-40B4-BE49-F238E27FC236}">
-                <a16:creationId xmlns:a16="http://schemas.microsoft.com/office/drawing/2014/main" xmlns="" id="{57B25911-E59E-4329-B921-A0EBAE8F9C7E}"/>
+                <a16:creationId xmlns:a16="http://schemas.microsoft.com/office/drawing/2014/main" id="{57B25911-E59E-4329-B921-A0EBAE8F9C7E}"/>
               </a:ext>
             </a:extLst>
           </p:cNvPr>
@@ -35977,7 +35866,7 @@
           <p:cNvPr id="5" name="Rectangle 4">
             <a:extLst>
               <a:ext uri="{FF2B5EF4-FFF2-40B4-BE49-F238E27FC236}">
-                <a16:creationId xmlns:a16="http://schemas.microsoft.com/office/drawing/2014/main" xmlns="" id="{798B0573-B3AD-48CB-9F8F-13EC6567D0D3}"/>
+                <a16:creationId xmlns:a16="http://schemas.microsoft.com/office/drawing/2014/main" id="{798B0573-B3AD-48CB-9F8F-13EC6567D0D3}"/>
               </a:ext>
             </a:extLst>
           </p:cNvPr>
@@ -36072,7 +35961,7 @@
           <p:cNvPr id="6" name="Rectangle 5">
             <a:extLst>
               <a:ext uri="{FF2B5EF4-FFF2-40B4-BE49-F238E27FC236}">
-                <a16:creationId xmlns:a16="http://schemas.microsoft.com/office/drawing/2014/main" xmlns="" id="{2B5D63EA-C9C9-4E25-A071-89FBDD4231BE}"/>
+                <a16:creationId xmlns:a16="http://schemas.microsoft.com/office/drawing/2014/main" id="{2B5D63EA-C9C9-4E25-A071-89FBDD4231BE}"/>
               </a:ext>
             </a:extLst>
           </p:cNvPr>
@@ -36110,7 +35999,7 @@
           <p:cNvPr id="8" name="Rectangle 7">
             <a:extLst>
               <a:ext uri="{FF2B5EF4-FFF2-40B4-BE49-F238E27FC236}">
-                <a16:creationId xmlns:a16="http://schemas.microsoft.com/office/drawing/2014/main" xmlns="" id="{BE0255C1-0F86-4BC8-84D8-4B76F00785A9}"/>
+                <a16:creationId xmlns:a16="http://schemas.microsoft.com/office/drawing/2014/main" id="{BE0255C1-0F86-4BC8-84D8-4B76F00785A9}"/>
               </a:ext>
             </a:extLst>
           </p:cNvPr>
@@ -36151,7 +36040,7 @@
           <p:cNvPr id="9" name="Rectangle 8">
             <a:extLst>
               <a:ext uri="{FF2B5EF4-FFF2-40B4-BE49-F238E27FC236}">
-                <a16:creationId xmlns:a16="http://schemas.microsoft.com/office/drawing/2014/main" xmlns="" id="{CFD7F599-A36B-4AA7-86FA-23355394169C}"/>
+                <a16:creationId xmlns:a16="http://schemas.microsoft.com/office/drawing/2014/main" id="{CFD7F599-A36B-4AA7-86FA-23355394169C}"/>
               </a:ext>
             </a:extLst>
           </p:cNvPr>
@@ -36192,7 +36081,7 @@
           <p:cNvPr id="130" name="Rectangle 129">
             <a:extLst>
               <a:ext uri="{FF2B5EF4-FFF2-40B4-BE49-F238E27FC236}">
-                <a16:creationId xmlns:a16="http://schemas.microsoft.com/office/drawing/2014/main" xmlns="" id="{F21A4D44-CAD2-400B-8E2D-F8B1FEA0E5B6}"/>
+                <a16:creationId xmlns:a16="http://schemas.microsoft.com/office/drawing/2014/main" id="{F21A4D44-CAD2-400B-8E2D-F8B1FEA0E5B6}"/>
               </a:ext>
             </a:extLst>
           </p:cNvPr>
@@ -36233,7 +36122,7 @@
           <p:cNvPr id="131" name="Rectangle 130">
             <a:extLst>
               <a:ext uri="{FF2B5EF4-FFF2-40B4-BE49-F238E27FC236}">
-                <a16:creationId xmlns:a16="http://schemas.microsoft.com/office/drawing/2014/main" xmlns="" id="{7ECE62BA-C5A0-4279-B504-BAC3C2C73E71}"/>
+                <a16:creationId xmlns:a16="http://schemas.microsoft.com/office/drawing/2014/main" id="{7ECE62BA-C5A0-4279-B504-BAC3C2C73E71}"/>
               </a:ext>
             </a:extLst>
           </p:cNvPr>
@@ -36285,7 +36174,7 @@
           <p:cNvPr id="10" name="Cube 9">
             <a:extLst>
               <a:ext uri="{FF2B5EF4-FFF2-40B4-BE49-F238E27FC236}">
-                <a16:creationId xmlns:a16="http://schemas.microsoft.com/office/drawing/2014/main" xmlns="" id="{F871D032-A4AE-406F-A80A-38A8B0BED40E}"/>
+                <a16:creationId xmlns:a16="http://schemas.microsoft.com/office/drawing/2014/main" id="{F871D032-A4AE-406F-A80A-38A8B0BED40E}"/>
               </a:ext>
             </a:extLst>
           </p:cNvPr>
@@ -36345,7 +36234,7 @@
           <p:cNvPr id="133" name="Folded Corner 14">
             <a:extLst>
               <a:ext uri="{FF2B5EF4-FFF2-40B4-BE49-F238E27FC236}">
-                <a16:creationId xmlns:a16="http://schemas.microsoft.com/office/drawing/2014/main" xmlns="" id="{DDDEB2FA-CB2B-41A1-82A4-458F3DD3A4D7}"/>
+                <a16:creationId xmlns:a16="http://schemas.microsoft.com/office/drawing/2014/main" id="{DDDEB2FA-CB2B-41A1-82A4-458F3DD3A4D7}"/>
               </a:ext>
             </a:extLst>
           </p:cNvPr>
@@ -36394,7 +36283,7 @@
           <p:cNvPr id="11" name="Rectangle 10">
             <a:extLst>
               <a:ext uri="{FF2B5EF4-FFF2-40B4-BE49-F238E27FC236}">
-                <a16:creationId xmlns:a16="http://schemas.microsoft.com/office/drawing/2014/main" xmlns="" id="{F638F98D-376A-4707-AFEB-3116E75204BA}"/>
+                <a16:creationId xmlns:a16="http://schemas.microsoft.com/office/drawing/2014/main" id="{F638F98D-376A-4707-AFEB-3116E75204BA}"/>
               </a:ext>
             </a:extLst>
           </p:cNvPr>
@@ -36449,7 +36338,7 @@
           <p:cNvPr id="18" name="Picture 17" descr="A close up of an animal&#10;&#10;Description generated with high confidence">
             <a:extLst>
               <a:ext uri="{FF2B5EF4-FFF2-40B4-BE49-F238E27FC236}">
-                <a16:creationId xmlns:a16="http://schemas.microsoft.com/office/drawing/2014/main" xmlns="" id="{4132CF14-571D-4435-9A41-BF9FAEA4439C}"/>
+                <a16:creationId xmlns:a16="http://schemas.microsoft.com/office/drawing/2014/main" id="{4132CF14-571D-4435-9A41-BF9FAEA4439C}"/>
               </a:ext>
             </a:extLst>
           </p:cNvPr>
@@ -36485,7 +36374,7 @@
           <p:cNvPr id="19" name="Rectangle 18">
             <a:extLst>
               <a:ext uri="{FF2B5EF4-FFF2-40B4-BE49-F238E27FC236}">
-                <a16:creationId xmlns:a16="http://schemas.microsoft.com/office/drawing/2014/main" xmlns="" id="{1047E73B-15B2-47B6-9C78-BCDB588C3019}"/>
+                <a16:creationId xmlns:a16="http://schemas.microsoft.com/office/drawing/2014/main" id="{1047E73B-15B2-47B6-9C78-BCDB588C3019}"/>
               </a:ext>
             </a:extLst>
           </p:cNvPr>
@@ -36527,7 +36416,7 @@
           <p:cNvPr id="31" name="Straight Arrow Connector 30">
             <a:extLst>
               <a:ext uri="{FF2B5EF4-FFF2-40B4-BE49-F238E27FC236}">
-                <a16:creationId xmlns:a16="http://schemas.microsoft.com/office/drawing/2014/main" xmlns="" id="{E3ACBD9C-E946-4C83-82A0-7C79817A1EB9}"/>
+                <a16:creationId xmlns:a16="http://schemas.microsoft.com/office/drawing/2014/main" id="{E3ACBD9C-E946-4C83-82A0-7C79817A1EB9}"/>
               </a:ext>
             </a:extLst>
           </p:cNvPr>
@@ -36570,7 +36459,7 @@
           <p:cNvPr id="32" name="Rectangle 31">
             <a:extLst>
               <a:ext uri="{FF2B5EF4-FFF2-40B4-BE49-F238E27FC236}">
-                <a16:creationId xmlns:a16="http://schemas.microsoft.com/office/drawing/2014/main" xmlns="" id="{DAD5A302-C880-4E8C-9E1D-640CD5CF0CBE}"/>
+                <a16:creationId xmlns:a16="http://schemas.microsoft.com/office/drawing/2014/main" id="{DAD5A302-C880-4E8C-9E1D-640CD5CF0CBE}"/>
               </a:ext>
             </a:extLst>
           </p:cNvPr>
@@ -36608,7 +36497,7 @@
           <p:cNvPr id="135" name="Rectangle 134">
             <a:extLst>
               <a:ext uri="{FF2B5EF4-FFF2-40B4-BE49-F238E27FC236}">
-                <a16:creationId xmlns:a16="http://schemas.microsoft.com/office/drawing/2014/main" xmlns="" id="{9D239E65-7C2B-4AD5-A1F4-F716E33EF928}"/>
+                <a16:creationId xmlns:a16="http://schemas.microsoft.com/office/drawing/2014/main" id="{9D239E65-7C2B-4AD5-A1F4-F716E33EF928}"/>
               </a:ext>
             </a:extLst>
           </p:cNvPr>
@@ -36646,7 +36535,7 @@
           <p:cNvPr id="146" name="Rectangle 145">
             <a:extLst>
               <a:ext uri="{FF2B5EF4-FFF2-40B4-BE49-F238E27FC236}">
-                <a16:creationId xmlns:a16="http://schemas.microsoft.com/office/drawing/2014/main" xmlns="" id="{02CB9ACB-9175-4592-A0A2-5F6EBA3916AA}"/>
+                <a16:creationId xmlns:a16="http://schemas.microsoft.com/office/drawing/2014/main" id="{02CB9ACB-9175-4592-A0A2-5F6EBA3916AA}"/>
               </a:ext>
             </a:extLst>
           </p:cNvPr>
@@ -36684,7 +36573,7 @@
           <p:cNvPr id="33" name="Rectangle 32">
             <a:extLst>
               <a:ext uri="{FF2B5EF4-FFF2-40B4-BE49-F238E27FC236}">
-                <a16:creationId xmlns:a16="http://schemas.microsoft.com/office/drawing/2014/main" xmlns="" id="{A5445AD6-3298-4B4A-BFAA-36E271EE36D3}"/>
+                <a16:creationId xmlns:a16="http://schemas.microsoft.com/office/drawing/2014/main" id="{A5445AD6-3298-4B4A-BFAA-36E271EE36D3}"/>
               </a:ext>
             </a:extLst>
           </p:cNvPr>
@@ -36725,7 +36614,7 @@
           <p:cNvPr id="148" name="Cube 147">
             <a:extLst>
               <a:ext uri="{FF2B5EF4-FFF2-40B4-BE49-F238E27FC236}">
-                <a16:creationId xmlns:a16="http://schemas.microsoft.com/office/drawing/2014/main" xmlns="" id="{3C1DB64A-F95E-4BBA-AAB7-E382DEE6D3AD}"/>
+                <a16:creationId xmlns:a16="http://schemas.microsoft.com/office/drawing/2014/main" id="{3C1DB64A-F95E-4BBA-AAB7-E382DEE6D3AD}"/>
               </a:ext>
             </a:extLst>
           </p:cNvPr>
@@ -36785,7 +36674,7 @@
           <p:cNvPr id="149" name="Rectangle 148">
             <a:extLst>
               <a:ext uri="{FF2B5EF4-FFF2-40B4-BE49-F238E27FC236}">
-                <a16:creationId xmlns:a16="http://schemas.microsoft.com/office/drawing/2014/main" xmlns="" id="{8ADE2C1F-3705-4E1D-9D1A-CEFA5BBDC4AE}"/>
+                <a16:creationId xmlns:a16="http://schemas.microsoft.com/office/drawing/2014/main" id="{8ADE2C1F-3705-4E1D-9D1A-CEFA5BBDC4AE}"/>
               </a:ext>
             </a:extLst>
           </p:cNvPr>
@@ -36826,7 +36715,7 @@
           <p:cNvPr id="152" name="Folded Corner 14">
             <a:extLst>
               <a:ext uri="{FF2B5EF4-FFF2-40B4-BE49-F238E27FC236}">
-                <a16:creationId xmlns:a16="http://schemas.microsoft.com/office/drawing/2014/main" xmlns="" id="{E9E59862-8121-45E9-B034-254AA5F85A9E}"/>
+                <a16:creationId xmlns:a16="http://schemas.microsoft.com/office/drawing/2014/main" id="{E9E59862-8121-45E9-B034-254AA5F85A9E}"/>
               </a:ext>
             </a:extLst>
           </p:cNvPr>
@@ -36875,7 +36764,7 @@
           <p:cNvPr id="159" name="Rectangle 158">
             <a:extLst>
               <a:ext uri="{FF2B5EF4-FFF2-40B4-BE49-F238E27FC236}">
-                <a16:creationId xmlns:a16="http://schemas.microsoft.com/office/drawing/2014/main" xmlns="" id="{9189909A-C973-403D-AC10-F162C1C50251}"/>
+                <a16:creationId xmlns:a16="http://schemas.microsoft.com/office/drawing/2014/main" id="{9189909A-C973-403D-AC10-F162C1C50251}"/>
               </a:ext>
             </a:extLst>
           </p:cNvPr>
@@ -36930,7 +36819,7 @@
           <p:cNvPr id="160" name="Straight Arrow Connector 159">
             <a:extLst>
               <a:ext uri="{FF2B5EF4-FFF2-40B4-BE49-F238E27FC236}">
-                <a16:creationId xmlns:a16="http://schemas.microsoft.com/office/drawing/2014/main" xmlns="" id="{4104DBBE-32EA-425C-8DB2-CA3E800CA64E}"/>
+                <a16:creationId xmlns:a16="http://schemas.microsoft.com/office/drawing/2014/main" id="{4104DBBE-32EA-425C-8DB2-CA3E800CA64E}"/>
               </a:ext>
             </a:extLst>
           </p:cNvPr>
@@ -36975,7 +36864,7 @@
           <p:cNvPr id="163" name="Cube 162">
             <a:extLst>
               <a:ext uri="{FF2B5EF4-FFF2-40B4-BE49-F238E27FC236}">
-                <a16:creationId xmlns:a16="http://schemas.microsoft.com/office/drawing/2014/main" xmlns="" id="{DCC62459-FE7B-48A9-A2FB-D56CDC251746}"/>
+                <a16:creationId xmlns:a16="http://schemas.microsoft.com/office/drawing/2014/main" id="{DCC62459-FE7B-48A9-A2FB-D56CDC251746}"/>
               </a:ext>
             </a:extLst>
           </p:cNvPr>
@@ -37035,7 +36924,7 @@
           <p:cNvPr id="164" name="Rectangle 163">
             <a:extLst>
               <a:ext uri="{FF2B5EF4-FFF2-40B4-BE49-F238E27FC236}">
-                <a16:creationId xmlns:a16="http://schemas.microsoft.com/office/drawing/2014/main" xmlns="" id="{A17E061D-69B0-4C5E-9A8B-BA722BA64CA4}"/>
+                <a16:creationId xmlns:a16="http://schemas.microsoft.com/office/drawing/2014/main" id="{A17E061D-69B0-4C5E-9A8B-BA722BA64CA4}"/>
               </a:ext>
             </a:extLst>
           </p:cNvPr>
@@ -37076,7 +36965,7 @@
           <p:cNvPr id="165" name="Folded Corner 14">
             <a:extLst>
               <a:ext uri="{FF2B5EF4-FFF2-40B4-BE49-F238E27FC236}">
-                <a16:creationId xmlns:a16="http://schemas.microsoft.com/office/drawing/2014/main" xmlns="" id="{E1EF52F6-55FE-4BD8-A276-7961F4C14406}"/>
+                <a16:creationId xmlns:a16="http://schemas.microsoft.com/office/drawing/2014/main" id="{E1EF52F6-55FE-4BD8-A276-7961F4C14406}"/>
               </a:ext>
             </a:extLst>
           </p:cNvPr>
@@ -37125,7 +37014,7 @@
           <p:cNvPr id="170" name="Rectangle 169">
             <a:extLst>
               <a:ext uri="{FF2B5EF4-FFF2-40B4-BE49-F238E27FC236}">
-                <a16:creationId xmlns:a16="http://schemas.microsoft.com/office/drawing/2014/main" xmlns="" id="{CD422137-5DD0-430D-A335-3434D32EC278}"/>
+                <a16:creationId xmlns:a16="http://schemas.microsoft.com/office/drawing/2014/main" id="{CD422137-5DD0-430D-A335-3434D32EC278}"/>
               </a:ext>
             </a:extLst>
           </p:cNvPr>
@@ -37177,7 +37066,7 @@
           <p:cNvPr id="171" name="Straight Arrow Connector 170">
             <a:extLst>
               <a:ext uri="{FF2B5EF4-FFF2-40B4-BE49-F238E27FC236}">
-                <a16:creationId xmlns:a16="http://schemas.microsoft.com/office/drawing/2014/main" xmlns="" id="{26251F63-0F9B-46FC-B288-264E1954D111}"/>
+                <a16:creationId xmlns:a16="http://schemas.microsoft.com/office/drawing/2014/main" id="{26251F63-0F9B-46FC-B288-264E1954D111}"/>
               </a:ext>
             </a:extLst>
           </p:cNvPr>
@@ -37222,7 +37111,7 @@
           <p:cNvPr id="172" name="Folded Corner 14">
             <a:extLst>
               <a:ext uri="{FF2B5EF4-FFF2-40B4-BE49-F238E27FC236}">
-                <a16:creationId xmlns:a16="http://schemas.microsoft.com/office/drawing/2014/main" xmlns="" id="{2198A703-2FEE-48EA-B0B0-656B73C08CA7}"/>
+                <a16:creationId xmlns:a16="http://schemas.microsoft.com/office/drawing/2014/main" id="{2198A703-2FEE-48EA-B0B0-656B73C08CA7}"/>
               </a:ext>
             </a:extLst>
           </p:cNvPr>
@@ -37271,7 +37160,7 @@
           <p:cNvPr id="173" name="Rectangle 172">
             <a:extLst>
               <a:ext uri="{FF2B5EF4-FFF2-40B4-BE49-F238E27FC236}">
-                <a16:creationId xmlns:a16="http://schemas.microsoft.com/office/drawing/2014/main" xmlns="" id="{FCC85E64-312F-4851-B756-3019DD6FA99F}"/>
+                <a16:creationId xmlns:a16="http://schemas.microsoft.com/office/drawing/2014/main" id="{FCC85E64-312F-4851-B756-3019DD6FA99F}"/>
               </a:ext>
             </a:extLst>
           </p:cNvPr>
@@ -37323,7 +37212,7 @@
           <p:cNvPr id="174" name="Straight Arrow Connector 173">
             <a:extLst>
               <a:ext uri="{FF2B5EF4-FFF2-40B4-BE49-F238E27FC236}">
-                <a16:creationId xmlns:a16="http://schemas.microsoft.com/office/drawing/2014/main" xmlns="" id="{518C8625-6187-4D33-A1AC-9208CA68F263}"/>
+                <a16:creationId xmlns:a16="http://schemas.microsoft.com/office/drawing/2014/main" id="{518C8625-6187-4D33-A1AC-9208CA68F263}"/>
               </a:ext>
             </a:extLst>
           </p:cNvPr>
@@ -37368,7 +37257,7 @@
           <p:cNvPr id="39" name="Rectangle 38">
             <a:extLst>
               <a:ext uri="{FF2B5EF4-FFF2-40B4-BE49-F238E27FC236}">
-                <a16:creationId xmlns:a16="http://schemas.microsoft.com/office/drawing/2014/main" xmlns="" id="{D01A5617-56DC-4B84-AF69-7027F4C7E7B3}"/>
+                <a16:creationId xmlns:a16="http://schemas.microsoft.com/office/drawing/2014/main" id="{D01A5617-56DC-4B84-AF69-7027F4C7E7B3}"/>
               </a:ext>
             </a:extLst>
           </p:cNvPr>
@@ -37423,7 +37312,7 @@
           <p:cNvPr id="40" name="Arrow: Right 39">
             <a:extLst>
               <a:ext uri="{FF2B5EF4-FFF2-40B4-BE49-F238E27FC236}">
-                <a16:creationId xmlns:a16="http://schemas.microsoft.com/office/drawing/2014/main" xmlns="" id="{AB7C45BA-0078-4BA1-A2B3-BC9A66ACD955}"/>
+                <a16:creationId xmlns:a16="http://schemas.microsoft.com/office/drawing/2014/main" id="{AB7C45BA-0078-4BA1-A2B3-BC9A66ACD955}"/>
               </a:ext>
             </a:extLst>
           </p:cNvPr>
@@ -37475,7 +37364,7 @@
           <p:cNvPr id="12" name="Picture 11" descr="A picture containing outdoor object&#10;&#10;Description generated with high confidence">
             <a:extLst>
               <a:ext uri="{FF2B5EF4-FFF2-40B4-BE49-F238E27FC236}">
-                <a16:creationId xmlns:a16="http://schemas.microsoft.com/office/drawing/2014/main" xmlns="" id="{684713F9-9ECF-4663-A027-A6113FA71893}"/>
+                <a16:creationId xmlns:a16="http://schemas.microsoft.com/office/drawing/2014/main" id="{684713F9-9ECF-4663-A027-A6113FA71893}"/>
               </a:ext>
             </a:extLst>
           </p:cNvPr>
@@ -37511,7 +37400,7 @@
           <p:cNvPr id="42" name="Straight Arrow Connector 41">
             <a:extLst>
               <a:ext uri="{FF2B5EF4-FFF2-40B4-BE49-F238E27FC236}">
-                <a16:creationId xmlns:a16="http://schemas.microsoft.com/office/drawing/2014/main" xmlns="" id="{AE9F3928-6603-4F44-B87F-D5568E789A51}"/>
+                <a16:creationId xmlns:a16="http://schemas.microsoft.com/office/drawing/2014/main" id="{AE9F3928-6603-4F44-B87F-D5568E789A51}"/>
               </a:ext>
             </a:extLst>
           </p:cNvPr>
@@ -37556,7 +37445,7 @@
           <p:cNvPr id="13" name="Rectangle 12">
             <a:extLst>
               <a:ext uri="{FF2B5EF4-FFF2-40B4-BE49-F238E27FC236}">
-                <a16:creationId xmlns:a16="http://schemas.microsoft.com/office/drawing/2014/main" xmlns="" id="{BE9850A2-3BDB-4A68-BCBD-94C436747806}"/>
+                <a16:creationId xmlns:a16="http://schemas.microsoft.com/office/drawing/2014/main" id="{BE9850A2-3BDB-4A68-BCBD-94C436747806}"/>
               </a:ext>
             </a:extLst>
           </p:cNvPr>
@@ -37622,7 +37511,7 @@
           <p:cNvPr id="44" name="Folded Corner 14">
             <a:extLst>
               <a:ext uri="{FF2B5EF4-FFF2-40B4-BE49-F238E27FC236}">
-                <a16:creationId xmlns:a16="http://schemas.microsoft.com/office/drawing/2014/main" xmlns="" id="{048A78E4-38F4-403F-B262-3393CB25026A}"/>
+                <a16:creationId xmlns:a16="http://schemas.microsoft.com/office/drawing/2014/main" id="{048A78E4-38F4-403F-B262-3393CB25026A}"/>
               </a:ext>
             </a:extLst>
           </p:cNvPr>
@@ -37671,7 +37560,7 @@
           <p:cNvPr id="45" name="Rectangle 44">
             <a:extLst>
               <a:ext uri="{FF2B5EF4-FFF2-40B4-BE49-F238E27FC236}">
-                <a16:creationId xmlns:a16="http://schemas.microsoft.com/office/drawing/2014/main" xmlns="" id="{B6EF94B6-C2BD-4454-B081-DC4CDC0FA78B}"/>
+                <a16:creationId xmlns:a16="http://schemas.microsoft.com/office/drawing/2014/main" id="{B6EF94B6-C2BD-4454-B081-DC4CDC0FA78B}"/>
               </a:ext>
             </a:extLst>
           </p:cNvPr>
@@ -37723,7 +37612,7 @@
           <p:cNvPr id="14" name="Rectangle 13">
             <a:extLst>
               <a:ext uri="{FF2B5EF4-FFF2-40B4-BE49-F238E27FC236}">
-                <a16:creationId xmlns:a16="http://schemas.microsoft.com/office/drawing/2014/main" xmlns="" id="{9F89B982-51DA-4A7B-B50E-BA08031E2C12}"/>
+                <a16:creationId xmlns:a16="http://schemas.microsoft.com/office/drawing/2014/main" id="{9F89B982-51DA-4A7B-B50E-BA08031E2C12}"/>
               </a:ext>
             </a:extLst>
           </p:cNvPr>
@@ -37761,7 +37650,7 @@
           <p:cNvPr id="15" name="Rectangle 14">
             <a:extLst>
               <a:ext uri="{FF2B5EF4-FFF2-40B4-BE49-F238E27FC236}">
-                <a16:creationId xmlns:a16="http://schemas.microsoft.com/office/drawing/2014/main" xmlns="" id="{4F318F00-3DF3-4DD0-9F9C-3D2FB2746086}"/>
+                <a16:creationId xmlns:a16="http://schemas.microsoft.com/office/drawing/2014/main" id="{4F318F00-3DF3-4DD0-9F9C-3D2FB2746086}"/>
               </a:ext>
             </a:extLst>
           </p:cNvPr>
@@ -37799,7 +37688,7 @@
           <p:cNvPr id="48" name="Rectangle 47">
             <a:extLst>
               <a:ext uri="{FF2B5EF4-FFF2-40B4-BE49-F238E27FC236}">
-                <a16:creationId xmlns:a16="http://schemas.microsoft.com/office/drawing/2014/main" xmlns="" id="{4B4F362E-13BC-4500-8556-53A8FC39D0B9}"/>
+                <a16:creationId xmlns:a16="http://schemas.microsoft.com/office/drawing/2014/main" id="{4B4F362E-13BC-4500-8556-53A8FC39D0B9}"/>
               </a:ext>
             </a:extLst>
           </p:cNvPr>
@@ -37837,7 +37726,7 @@
           <p:cNvPr id="17" name="Rectangle 16">
             <a:extLst>
               <a:ext uri="{FF2B5EF4-FFF2-40B4-BE49-F238E27FC236}">
-                <a16:creationId xmlns:a16="http://schemas.microsoft.com/office/drawing/2014/main" xmlns="" id="{E971B6A2-9BA5-482C-991E-4489D5C190FD}"/>
+                <a16:creationId xmlns:a16="http://schemas.microsoft.com/office/drawing/2014/main" id="{E971B6A2-9BA5-482C-991E-4489D5C190FD}"/>
               </a:ext>
             </a:extLst>
           </p:cNvPr>
@@ -37921,7 +37810,7 @@
           <p:cNvPr id="52" name="Rectangle 51">
             <a:extLst>
               <a:ext uri="{FF2B5EF4-FFF2-40B4-BE49-F238E27FC236}">
-                <a16:creationId xmlns:a16="http://schemas.microsoft.com/office/drawing/2014/main" xmlns="" id="{99534692-59D2-4947-83E0-D4E8E4591FD6}"/>
+                <a16:creationId xmlns:a16="http://schemas.microsoft.com/office/drawing/2014/main" id="{99534692-59D2-4947-83E0-D4E8E4591FD6}"/>
               </a:ext>
             </a:extLst>
           </p:cNvPr>
@@ -38003,7 +37892,7 @@
           <p:cNvPr id="175" name="Folded Corner 14">
             <a:extLst>
               <a:ext uri="{FF2B5EF4-FFF2-40B4-BE49-F238E27FC236}">
-                <a16:creationId xmlns:a16="http://schemas.microsoft.com/office/drawing/2014/main" xmlns="" id="{D7925C44-E3E5-47AF-9CC8-BF6471802A70}"/>
+                <a16:creationId xmlns:a16="http://schemas.microsoft.com/office/drawing/2014/main" id="{D7925C44-E3E5-47AF-9CC8-BF6471802A70}"/>
               </a:ext>
             </a:extLst>
           </p:cNvPr>
@@ -38052,7 +37941,7 @@
           <p:cNvPr id="2" name="Diagram 1">
             <a:extLst>
               <a:ext uri="{FF2B5EF4-FFF2-40B4-BE49-F238E27FC236}">
-                <a16:creationId xmlns:a16="http://schemas.microsoft.com/office/drawing/2014/main" xmlns="" id="{214EDC3A-CB98-4BD4-86CB-C3DE5CC0A317}"/>
+                <a16:creationId xmlns:a16="http://schemas.microsoft.com/office/drawing/2014/main" id="{214EDC3A-CB98-4BD4-86CB-C3DE5CC0A317}"/>
               </a:ext>
             </a:extLst>
           </p:cNvPr>
@@ -38080,7 +37969,7 @@
           <p:cNvPr id="3" name="Rectangle 2">
             <a:extLst>
               <a:ext uri="{FF2B5EF4-FFF2-40B4-BE49-F238E27FC236}">
-                <a16:creationId xmlns:a16="http://schemas.microsoft.com/office/drawing/2014/main" xmlns="" id="{8D715EE1-32F0-4BAE-86BD-83B54B3137EB}"/>
+                <a16:creationId xmlns:a16="http://schemas.microsoft.com/office/drawing/2014/main" id="{8D715EE1-32F0-4BAE-86BD-83B54B3137EB}"/>
               </a:ext>
             </a:extLst>
           </p:cNvPr>
@@ -38144,7 +38033,7 @@
           <p:cNvPr id="4" name="Rectangle 3">
             <a:extLst>
               <a:ext uri="{FF2B5EF4-FFF2-40B4-BE49-F238E27FC236}">
-                <a16:creationId xmlns:a16="http://schemas.microsoft.com/office/drawing/2014/main" xmlns="" id="{2CBF344E-950A-4767-97FA-13FFE695BBC3}"/>
+                <a16:creationId xmlns:a16="http://schemas.microsoft.com/office/drawing/2014/main" id="{2CBF344E-950A-4767-97FA-13FFE695BBC3}"/>
               </a:ext>
             </a:extLst>
           </p:cNvPr>
@@ -38185,7 +38074,7 @@
           <p:cNvPr id="126" name="Rectangle 125">
             <a:extLst>
               <a:ext uri="{FF2B5EF4-FFF2-40B4-BE49-F238E27FC236}">
-                <a16:creationId xmlns:a16="http://schemas.microsoft.com/office/drawing/2014/main" xmlns="" id="{AFE62E66-21DE-45BB-AB76-2BCE8E9BEC95}"/>
+                <a16:creationId xmlns:a16="http://schemas.microsoft.com/office/drawing/2014/main" id="{AFE62E66-21DE-45BB-AB76-2BCE8E9BEC95}"/>
               </a:ext>
             </a:extLst>
           </p:cNvPr>
@@ -38246,7 +38135,7 @@
           <p:cNvPr id="128" name="Rectangle 127">
             <a:extLst>
               <a:ext uri="{FF2B5EF4-FFF2-40B4-BE49-F238E27FC236}">
-                <a16:creationId xmlns:a16="http://schemas.microsoft.com/office/drawing/2014/main" xmlns="" id="{57B25911-E59E-4329-B921-A0EBAE8F9C7E}"/>
+                <a16:creationId xmlns:a16="http://schemas.microsoft.com/office/drawing/2014/main" id="{57B25911-E59E-4329-B921-A0EBAE8F9C7E}"/>
               </a:ext>
             </a:extLst>
           </p:cNvPr>
@@ -38297,7 +38186,7 @@
           <p:cNvPr id="5" name="Rectangle 4">
             <a:extLst>
               <a:ext uri="{FF2B5EF4-FFF2-40B4-BE49-F238E27FC236}">
-                <a16:creationId xmlns:a16="http://schemas.microsoft.com/office/drawing/2014/main" xmlns="" id="{798B0573-B3AD-48CB-9F8F-13EC6567D0D3}"/>
+                <a16:creationId xmlns:a16="http://schemas.microsoft.com/office/drawing/2014/main" id="{798B0573-B3AD-48CB-9F8F-13EC6567D0D3}"/>
               </a:ext>
             </a:extLst>
           </p:cNvPr>
@@ -38392,7 +38281,7 @@
           <p:cNvPr id="6" name="Rectangle 5">
             <a:extLst>
               <a:ext uri="{FF2B5EF4-FFF2-40B4-BE49-F238E27FC236}">
-                <a16:creationId xmlns:a16="http://schemas.microsoft.com/office/drawing/2014/main" xmlns="" id="{2B5D63EA-C9C9-4E25-A071-89FBDD4231BE}"/>
+                <a16:creationId xmlns:a16="http://schemas.microsoft.com/office/drawing/2014/main" id="{2B5D63EA-C9C9-4E25-A071-89FBDD4231BE}"/>
               </a:ext>
             </a:extLst>
           </p:cNvPr>
@@ -38430,7 +38319,7 @@
           <p:cNvPr id="8" name="Rectangle 7">
             <a:extLst>
               <a:ext uri="{FF2B5EF4-FFF2-40B4-BE49-F238E27FC236}">
-                <a16:creationId xmlns:a16="http://schemas.microsoft.com/office/drawing/2014/main" xmlns="" id="{BE0255C1-0F86-4BC8-84D8-4B76F00785A9}"/>
+                <a16:creationId xmlns:a16="http://schemas.microsoft.com/office/drawing/2014/main" id="{BE0255C1-0F86-4BC8-84D8-4B76F00785A9}"/>
               </a:ext>
             </a:extLst>
           </p:cNvPr>
@@ -38471,7 +38360,7 @@
           <p:cNvPr id="9" name="Rectangle 8">
             <a:extLst>
               <a:ext uri="{FF2B5EF4-FFF2-40B4-BE49-F238E27FC236}">
-                <a16:creationId xmlns:a16="http://schemas.microsoft.com/office/drawing/2014/main" xmlns="" id="{CFD7F599-A36B-4AA7-86FA-23355394169C}"/>
+                <a16:creationId xmlns:a16="http://schemas.microsoft.com/office/drawing/2014/main" id="{CFD7F599-A36B-4AA7-86FA-23355394169C}"/>
               </a:ext>
             </a:extLst>
           </p:cNvPr>
@@ -38512,7 +38401,7 @@
           <p:cNvPr id="130" name="Rectangle 129">
             <a:extLst>
               <a:ext uri="{FF2B5EF4-FFF2-40B4-BE49-F238E27FC236}">
-                <a16:creationId xmlns:a16="http://schemas.microsoft.com/office/drawing/2014/main" xmlns="" id="{F21A4D44-CAD2-400B-8E2D-F8B1FEA0E5B6}"/>
+                <a16:creationId xmlns:a16="http://schemas.microsoft.com/office/drawing/2014/main" id="{F21A4D44-CAD2-400B-8E2D-F8B1FEA0E5B6}"/>
               </a:ext>
             </a:extLst>
           </p:cNvPr>
@@ -38553,7 +38442,7 @@
           <p:cNvPr id="131" name="Rectangle 130">
             <a:extLst>
               <a:ext uri="{FF2B5EF4-FFF2-40B4-BE49-F238E27FC236}">
-                <a16:creationId xmlns:a16="http://schemas.microsoft.com/office/drawing/2014/main" xmlns="" id="{7ECE62BA-C5A0-4279-B504-BAC3C2C73E71}"/>
+                <a16:creationId xmlns:a16="http://schemas.microsoft.com/office/drawing/2014/main" id="{7ECE62BA-C5A0-4279-B504-BAC3C2C73E71}"/>
               </a:ext>
             </a:extLst>
           </p:cNvPr>
@@ -38605,7 +38494,7 @@
           <p:cNvPr id="10" name="Cube 9">
             <a:extLst>
               <a:ext uri="{FF2B5EF4-FFF2-40B4-BE49-F238E27FC236}">
-                <a16:creationId xmlns:a16="http://schemas.microsoft.com/office/drawing/2014/main" xmlns="" id="{F871D032-A4AE-406F-A80A-38A8B0BED40E}"/>
+                <a16:creationId xmlns:a16="http://schemas.microsoft.com/office/drawing/2014/main" id="{F871D032-A4AE-406F-A80A-38A8B0BED40E}"/>
               </a:ext>
             </a:extLst>
           </p:cNvPr>
@@ -38665,7 +38554,7 @@
           <p:cNvPr id="133" name="Folded Corner 14">
             <a:extLst>
               <a:ext uri="{FF2B5EF4-FFF2-40B4-BE49-F238E27FC236}">
-                <a16:creationId xmlns:a16="http://schemas.microsoft.com/office/drawing/2014/main" xmlns="" id="{DDDEB2FA-CB2B-41A1-82A4-458F3DD3A4D7}"/>
+                <a16:creationId xmlns:a16="http://schemas.microsoft.com/office/drawing/2014/main" id="{DDDEB2FA-CB2B-41A1-82A4-458F3DD3A4D7}"/>
               </a:ext>
             </a:extLst>
           </p:cNvPr>
@@ -38714,7 +38603,7 @@
           <p:cNvPr id="11" name="Rectangle 10">
             <a:extLst>
               <a:ext uri="{FF2B5EF4-FFF2-40B4-BE49-F238E27FC236}">
-                <a16:creationId xmlns:a16="http://schemas.microsoft.com/office/drawing/2014/main" xmlns="" id="{F638F98D-376A-4707-AFEB-3116E75204BA}"/>
+                <a16:creationId xmlns:a16="http://schemas.microsoft.com/office/drawing/2014/main" id="{F638F98D-376A-4707-AFEB-3116E75204BA}"/>
               </a:ext>
             </a:extLst>
           </p:cNvPr>
@@ -38769,7 +38658,7 @@
           <p:cNvPr id="18" name="Picture 17" descr="A close up of an animal&#10;&#10;Description generated with high confidence">
             <a:extLst>
               <a:ext uri="{FF2B5EF4-FFF2-40B4-BE49-F238E27FC236}">
-                <a16:creationId xmlns:a16="http://schemas.microsoft.com/office/drawing/2014/main" xmlns="" id="{4132CF14-571D-4435-9A41-BF9FAEA4439C}"/>
+                <a16:creationId xmlns:a16="http://schemas.microsoft.com/office/drawing/2014/main" id="{4132CF14-571D-4435-9A41-BF9FAEA4439C}"/>
               </a:ext>
             </a:extLst>
           </p:cNvPr>
@@ -38805,7 +38694,7 @@
           <p:cNvPr id="19" name="Rectangle 18">
             <a:extLst>
               <a:ext uri="{FF2B5EF4-FFF2-40B4-BE49-F238E27FC236}">
-                <a16:creationId xmlns:a16="http://schemas.microsoft.com/office/drawing/2014/main" xmlns="" id="{1047E73B-15B2-47B6-9C78-BCDB588C3019}"/>
+                <a16:creationId xmlns:a16="http://schemas.microsoft.com/office/drawing/2014/main" id="{1047E73B-15B2-47B6-9C78-BCDB588C3019}"/>
               </a:ext>
             </a:extLst>
           </p:cNvPr>
@@ -38847,7 +38736,7 @@
           <p:cNvPr id="31" name="Straight Arrow Connector 30">
             <a:extLst>
               <a:ext uri="{FF2B5EF4-FFF2-40B4-BE49-F238E27FC236}">
-                <a16:creationId xmlns:a16="http://schemas.microsoft.com/office/drawing/2014/main" xmlns="" id="{E3ACBD9C-E946-4C83-82A0-7C79817A1EB9}"/>
+                <a16:creationId xmlns:a16="http://schemas.microsoft.com/office/drawing/2014/main" id="{E3ACBD9C-E946-4C83-82A0-7C79817A1EB9}"/>
               </a:ext>
             </a:extLst>
           </p:cNvPr>
@@ -38890,7 +38779,7 @@
           <p:cNvPr id="32" name="Rectangle 31">
             <a:extLst>
               <a:ext uri="{FF2B5EF4-FFF2-40B4-BE49-F238E27FC236}">
-                <a16:creationId xmlns:a16="http://schemas.microsoft.com/office/drawing/2014/main" xmlns="" id="{DAD5A302-C880-4E8C-9E1D-640CD5CF0CBE}"/>
+                <a16:creationId xmlns:a16="http://schemas.microsoft.com/office/drawing/2014/main" id="{DAD5A302-C880-4E8C-9E1D-640CD5CF0CBE}"/>
               </a:ext>
             </a:extLst>
           </p:cNvPr>
@@ -38928,7 +38817,7 @@
           <p:cNvPr id="135" name="Rectangle 134">
             <a:extLst>
               <a:ext uri="{FF2B5EF4-FFF2-40B4-BE49-F238E27FC236}">
-                <a16:creationId xmlns:a16="http://schemas.microsoft.com/office/drawing/2014/main" xmlns="" id="{9D239E65-7C2B-4AD5-A1F4-F716E33EF928}"/>
+                <a16:creationId xmlns:a16="http://schemas.microsoft.com/office/drawing/2014/main" id="{9D239E65-7C2B-4AD5-A1F4-F716E33EF928}"/>
               </a:ext>
             </a:extLst>
           </p:cNvPr>
@@ -38966,7 +38855,7 @@
           <p:cNvPr id="146" name="Rectangle 145">
             <a:extLst>
               <a:ext uri="{FF2B5EF4-FFF2-40B4-BE49-F238E27FC236}">
-                <a16:creationId xmlns:a16="http://schemas.microsoft.com/office/drawing/2014/main" xmlns="" id="{02CB9ACB-9175-4592-A0A2-5F6EBA3916AA}"/>
+                <a16:creationId xmlns:a16="http://schemas.microsoft.com/office/drawing/2014/main" id="{02CB9ACB-9175-4592-A0A2-5F6EBA3916AA}"/>
               </a:ext>
             </a:extLst>
           </p:cNvPr>
@@ -39004,7 +38893,7 @@
           <p:cNvPr id="33" name="Rectangle 32">
             <a:extLst>
               <a:ext uri="{FF2B5EF4-FFF2-40B4-BE49-F238E27FC236}">
-                <a16:creationId xmlns:a16="http://schemas.microsoft.com/office/drawing/2014/main" xmlns="" id="{A5445AD6-3298-4B4A-BFAA-36E271EE36D3}"/>
+                <a16:creationId xmlns:a16="http://schemas.microsoft.com/office/drawing/2014/main" id="{A5445AD6-3298-4B4A-BFAA-36E271EE36D3}"/>
               </a:ext>
             </a:extLst>
           </p:cNvPr>
@@ -39045,7 +38934,7 @@
           <p:cNvPr id="148" name="Cube 147">
             <a:extLst>
               <a:ext uri="{FF2B5EF4-FFF2-40B4-BE49-F238E27FC236}">
-                <a16:creationId xmlns:a16="http://schemas.microsoft.com/office/drawing/2014/main" xmlns="" id="{3C1DB64A-F95E-4BBA-AAB7-E382DEE6D3AD}"/>
+                <a16:creationId xmlns:a16="http://schemas.microsoft.com/office/drawing/2014/main" id="{3C1DB64A-F95E-4BBA-AAB7-E382DEE6D3AD}"/>
               </a:ext>
             </a:extLst>
           </p:cNvPr>
@@ -39105,7 +38994,7 @@
           <p:cNvPr id="149" name="Rectangle 148">
             <a:extLst>
               <a:ext uri="{FF2B5EF4-FFF2-40B4-BE49-F238E27FC236}">
-                <a16:creationId xmlns:a16="http://schemas.microsoft.com/office/drawing/2014/main" xmlns="" id="{8ADE2C1F-3705-4E1D-9D1A-CEFA5BBDC4AE}"/>
+                <a16:creationId xmlns:a16="http://schemas.microsoft.com/office/drawing/2014/main" id="{8ADE2C1F-3705-4E1D-9D1A-CEFA5BBDC4AE}"/>
               </a:ext>
             </a:extLst>
           </p:cNvPr>
@@ -39146,7 +39035,7 @@
           <p:cNvPr id="152" name="Folded Corner 14">
             <a:extLst>
               <a:ext uri="{FF2B5EF4-FFF2-40B4-BE49-F238E27FC236}">
-                <a16:creationId xmlns:a16="http://schemas.microsoft.com/office/drawing/2014/main" xmlns="" id="{E9E59862-8121-45E9-B034-254AA5F85A9E}"/>
+                <a16:creationId xmlns:a16="http://schemas.microsoft.com/office/drawing/2014/main" id="{E9E59862-8121-45E9-B034-254AA5F85A9E}"/>
               </a:ext>
             </a:extLst>
           </p:cNvPr>
@@ -39195,7 +39084,7 @@
           <p:cNvPr id="159" name="Rectangle 158">
             <a:extLst>
               <a:ext uri="{FF2B5EF4-FFF2-40B4-BE49-F238E27FC236}">
-                <a16:creationId xmlns:a16="http://schemas.microsoft.com/office/drawing/2014/main" xmlns="" id="{9189909A-C973-403D-AC10-F162C1C50251}"/>
+                <a16:creationId xmlns:a16="http://schemas.microsoft.com/office/drawing/2014/main" id="{9189909A-C973-403D-AC10-F162C1C50251}"/>
               </a:ext>
             </a:extLst>
           </p:cNvPr>
@@ -39250,7 +39139,7 @@
           <p:cNvPr id="160" name="Straight Arrow Connector 159">
             <a:extLst>
               <a:ext uri="{FF2B5EF4-FFF2-40B4-BE49-F238E27FC236}">
-                <a16:creationId xmlns:a16="http://schemas.microsoft.com/office/drawing/2014/main" xmlns="" id="{4104DBBE-32EA-425C-8DB2-CA3E800CA64E}"/>
+                <a16:creationId xmlns:a16="http://schemas.microsoft.com/office/drawing/2014/main" id="{4104DBBE-32EA-425C-8DB2-CA3E800CA64E}"/>
               </a:ext>
             </a:extLst>
           </p:cNvPr>
@@ -39295,7 +39184,7 @@
           <p:cNvPr id="163" name="Cube 162">
             <a:extLst>
               <a:ext uri="{FF2B5EF4-FFF2-40B4-BE49-F238E27FC236}">
-                <a16:creationId xmlns:a16="http://schemas.microsoft.com/office/drawing/2014/main" xmlns="" id="{DCC62459-FE7B-48A9-A2FB-D56CDC251746}"/>
+                <a16:creationId xmlns:a16="http://schemas.microsoft.com/office/drawing/2014/main" id="{DCC62459-FE7B-48A9-A2FB-D56CDC251746}"/>
               </a:ext>
             </a:extLst>
           </p:cNvPr>
@@ -39355,7 +39244,7 @@
           <p:cNvPr id="164" name="Rectangle 163">
             <a:extLst>
               <a:ext uri="{FF2B5EF4-FFF2-40B4-BE49-F238E27FC236}">
-                <a16:creationId xmlns:a16="http://schemas.microsoft.com/office/drawing/2014/main" xmlns="" id="{A17E061D-69B0-4C5E-9A8B-BA722BA64CA4}"/>
+                <a16:creationId xmlns:a16="http://schemas.microsoft.com/office/drawing/2014/main" id="{A17E061D-69B0-4C5E-9A8B-BA722BA64CA4}"/>
               </a:ext>
             </a:extLst>
           </p:cNvPr>
@@ -39396,7 +39285,7 @@
           <p:cNvPr id="165" name="Folded Corner 14">
             <a:extLst>
               <a:ext uri="{FF2B5EF4-FFF2-40B4-BE49-F238E27FC236}">
-                <a16:creationId xmlns:a16="http://schemas.microsoft.com/office/drawing/2014/main" xmlns="" id="{E1EF52F6-55FE-4BD8-A276-7961F4C14406}"/>
+                <a16:creationId xmlns:a16="http://schemas.microsoft.com/office/drawing/2014/main" id="{E1EF52F6-55FE-4BD8-A276-7961F4C14406}"/>
               </a:ext>
             </a:extLst>
           </p:cNvPr>
@@ -39445,7 +39334,7 @@
           <p:cNvPr id="170" name="Rectangle 169">
             <a:extLst>
               <a:ext uri="{FF2B5EF4-FFF2-40B4-BE49-F238E27FC236}">
-                <a16:creationId xmlns:a16="http://schemas.microsoft.com/office/drawing/2014/main" xmlns="" id="{CD422137-5DD0-430D-A335-3434D32EC278}"/>
+                <a16:creationId xmlns:a16="http://schemas.microsoft.com/office/drawing/2014/main" id="{CD422137-5DD0-430D-A335-3434D32EC278}"/>
               </a:ext>
             </a:extLst>
           </p:cNvPr>
@@ -39497,7 +39386,7 @@
           <p:cNvPr id="171" name="Straight Arrow Connector 170">
             <a:extLst>
               <a:ext uri="{FF2B5EF4-FFF2-40B4-BE49-F238E27FC236}">
-                <a16:creationId xmlns:a16="http://schemas.microsoft.com/office/drawing/2014/main" xmlns="" id="{26251F63-0F9B-46FC-B288-264E1954D111}"/>
+                <a16:creationId xmlns:a16="http://schemas.microsoft.com/office/drawing/2014/main" id="{26251F63-0F9B-46FC-B288-264E1954D111}"/>
               </a:ext>
             </a:extLst>
           </p:cNvPr>
@@ -39542,7 +39431,7 @@
           <p:cNvPr id="172" name="Folded Corner 14">
             <a:extLst>
               <a:ext uri="{FF2B5EF4-FFF2-40B4-BE49-F238E27FC236}">
-                <a16:creationId xmlns:a16="http://schemas.microsoft.com/office/drawing/2014/main" xmlns="" id="{2198A703-2FEE-48EA-B0B0-656B73C08CA7}"/>
+                <a16:creationId xmlns:a16="http://schemas.microsoft.com/office/drawing/2014/main" id="{2198A703-2FEE-48EA-B0B0-656B73C08CA7}"/>
               </a:ext>
             </a:extLst>
           </p:cNvPr>
@@ -39591,7 +39480,7 @@
           <p:cNvPr id="173" name="Rectangle 172">
             <a:extLst>
               <a:ext uri="{FF2B5EF4-FFF2-40B4-BE49-F238E27FC236}">
-                <a16:creationId xmlns:a16="http://schemas.microsoft.com/office/drawing/2014/main" xmlns="" id="{FCC85E64-312F-4851-B756-3019DD6FA99F}"/>
+                <a16:creationId xmlns:a16="http://schemas.microsoft.com/office/drawing/2014/main" id="{FCC85E64-312F-4851-B756-3019DD6FA99F}"/>
               </a:ext>
             </a:extLst>
           </p:cNvPr>
@@ -39643,7 +39532,7 @@
           <p:cNvPr id="174" name="Straight Arrow Connector 173">
             <a:extLst>
               <a:ext uri="{FF2B5EF4-FFF2-40B4-BE49-F238E27FC236}">
-                <a16:creationId xmlns:a16="http://schemas.microsoft.com/office/drawing/2014/main" xmlns="" id="{518C8625-6187-4D33-A1AC-9208CA68F263}"/>
+                <a16:creationId xmlns:a16="http://schemas.microsoft.com/office/drawing/2014/main" id="{518C8625-6187-4D33-A1AC-9208CA68F263}"/>
               </a:ext>
             </a:extLst>
           </p:cNvPr>
@@ -39688,7 +39577,7 @@
           <p:cNvPr id="39" name="Rectangle 38">
             <a:extLst>
               <a:ext uri="{FF2B5EF4-FFF2-40B4-BE49-F238E27FC236}">
-                <a16:creationId xmlns:a16="http://schemas.microsoft.com/office/drawing/2014/main" xmlns="" id="{D01A5617-56DC-4B84-AF69-7027F4C7E7B3}"/>
+                <a16:creationId xmlns:a16="http://schemas.microsoft.com/office/drawing/2014/main" id="{D01A5617-56DC-4B84-AF69-7027F4C7E7B3}"/>
               </a:ext>
             </a:extLst>
           </p:cNvPr>
@@ -39743,7 +39632,7 @@
           <p:cNvPr id="40" name="Arrow: Right 39">
             <a:extLst>
               <a:ext uri="{FF2B5EF4-FFF2-40B4-BE49-F238E27FC236}">
-                <a16:creationId xmlns:a16="http://schemas.microsoft.com/office/drawing/2014/main" xmlns="" id="{AB7C45BA-0078-4BA1-A2B3-BC9A66ACD955}"/>
+                <a16:creationId xmlns:a16="http://schemas.microsoft.com/office/drawing/2014/main" id="{AB7C45BA-0078-4BA1-A2B3-BC9A66ACD955}"/>
               </a:ext>
             </a:extLst>
           </p:cNvPr>
@@ -39795,7 +39684,7 @@
           <p:cNvPr id="12" name="Picture 11" descr="A picture containing outdoor object&#10;&#10;Description generated with high confidence">
             <a:extLst>
               <a:ext uri="{FF2B5EF4-FFF2-40B4-BE49-F238E27FC236}">
-                <a16:creationId xmlns:a16="http://schemas.microsoft.com/office/drawing/2014/main" xmlns="" id="{684713F9-9ECF-4663-A027-A6113FA71893}"/>
+                <a16:creationId xmlns:a16="http://schemas.microsoft.com/office/drawing/2014/main" id="{684713F9-9ECF-4663-A027-A6113FA71893}"/>
               </a:ext>
             </a:extLst>
           </p:cNvPr>
@@ -39831,7 +39720,7 @@
           <p:cNvPr id="42" name="Straight Arrow Connector 41">
             <a:extLst>
               <a:ext uri="{FF2B5EF4-FFF2-40B4-BE49-F238E27FC236}">
-                <a16:creationId xmlns:a16="http://schemas.microsoft.com/office/drawing/2014/main" xmlns="" id="{AE9F3928-6603-4F44-B87F-D5568E789A51}"/>
+                <a16:creationId xmlns:a16="http://schemas.microsoft.com/office/drawing/2014/main" id="{AE9F3928-6603-4F44-B87F-D5568E789A51}"/>
               </a:ext>
             </a:extLst>
           </p:cNvPr>
@@ -39876,7 +39765,7 @@
           <p:cNvPr id="13" name="Rectangle 12">
             <a:extLst>
               <a:ext uri="{FF2B5EF4-FFF2-40B4-BE49-F238E27FC236}">
-                <a16:creationId xmlns:a16="http://schemas.microsoft.com/office/drawing/2014/main" xmlns="" id="{BE9850A2-3BDB-4A68-BCBD-94C436747806}"/>
+                <a16:creationId xmlns:a16="http://schemas.microsoft.com/office/drawing/2014/main" id="{BE9850A2-3BDB-4A68-BCBD-94C436747806}"/>
               </a:ext>
             </a:extLst>
           </p:cNvPr>
@@ -39942,7 +39831,7 @@
           <p:cNvPr id="44" name="Folded Corner 14">
             <a:extLst>
               <a:ext uri="{FF2B5EF4-FFF2-40B4-BE49-F238E27FC236}">
-                <a16:creationId xmlns:a16="http://schemas.microsoft.com/office/drawing/2014/main" xmlns="" id="{048A78E4-38F4-403F-B262-3393CB25026A}"/>
+                <a16:creationId xmlns:a16="http://schemas.microsoft.com/office/drawing/2014/main" id="{048A78E4-38F4-403F-B262-3393CB25026A}"/>
               </a:ext>
             </a:extLst>
           </p:cNvPr>
@@ -39991,7 +39880,7 @@
           <p:cNvPr id="45" name="Rectangle 44">
             <a:extLst>
               <a:ext uri="{FF2B5EF4-FFF2-40B4-BE49-F238E27FC236}">
-                <a16:creationId xmlns:a16="http://schemas.microsoft.com/office/drawing/2014/main" xmlns="" id="{B6EF94B6-C2BD-4454-B081-DC4CDC0FA78B}"/>
+                <a16:creationId xmlns:a16="http://schemas.microsoft.com/office/drawing/2014/main" id="{B6EF94B6-C2BD-4454-B081-DC4CDC0FA78B}"/>
               </a:ext>
             </a:extLst>
           </p:cNvPr>
@@ -40043,7 +39932,7 @@
           <p:cNvPr id="14" name="Rectangle 13">
             <a:extLst>
               <a:ext uri="{FF2B5EF4-FFF2-40B4-BE49-F238E27FC236}">
-                <a16:creationId xmlns:a16="http://schemas.microsoft.com/office/drawing/2014/main" xmlns="" id="{9F89B982-51DA-4A7B-B50E-BA08031E2C12}"/>
+                <a16:creationId xmlns:a16="http://schemas.microsoft.com/office/drawing/2014/main" id="{9F89B982-51DA-4A7B-B50E-BA08031E2C12}"/>
               </a:ext>
             </a:extLst>
           </p:cNvPr>
@@ -40081,7 +39970,7 @@
           <p:cNvPr id="15" name="Rectangle 14">
             <a:extLst>
               <a:ext uri="{FF2B5EF4-FFF2-40B4-BE49-F238E27FC236}">
-                <a16:creationId xmlns:a16="http://schemas.microsoft.com/office/drawing/2014/main" xmlns="" id="{4F318F00-3DF3-4DD0-9F9C-3D2FB2746086}"/>
+                <a16:creationId xmlns:a16="http://schemas.microsoft.com/office/drawing/2014/main" id="{4F318F00-3DF3-4DD0-9F9C-3D2FB2746086}"/>
               </a:ext>
             </a:extLst>
           </p:cNvPr>
@@ -40119,7 +40008,7 @@
           <p:cNvPr id="48" name="Rectangle 47">
             <a:extLst>
               <a:ext uri="{FF2B5EF4-FFF2-40B4-BE49-F238E27FC236}">
-                <a16:creationId xmlns:a16="http://schemas.microsoft.com/office/drawing/2014/main" xmlns="" id="{4B4F362E-13BC-4500-8556-53A8FC39D0B9}"/>
+                <a16:creationId xmlns:a16="http://schemas.microsoft.com/office/drawing/2014/main" id="{4B4F362E-13BC-4500-8556-53A8FC39D0B9}"/>
               </a:ext>
             </a:extLst>
           </p:cNvPr>
@@ -40157,7 +40046,7 @@
           <p:cNvPr id="17" name="Rectangle 16">
             <a:extLst>
               <a:ext uri="{FF2B5EF4-FFF2-40B4-BE49-F238E27FC236}">
-                <a16:creationId xmlns:a16="http://schemas.microsoft.com/office/drawing/2014/main" xmlns="" id="{E971B6A2-9BA5-482C-991E-4489D5C190FD}"/>
+                <a16:creationId xmlns:a16="http://schemas.microsoft.com/office/drawing/2014/main" id="{E971B6A2-9BA5-482C-991E-4489D5C190FD}"/>
               </a:ext>
             </a:extLst>
           </p:cNvPr>
@@ -40195,7 +40084,7 @@
           <p:cNvPr id="52" name="Rectangle 51">
             <a:extLst>
               <a:ext uri="{FF2B5EF4-FFF2-40B4-BE49-F238E27FC236}">
-                <a16:creationId xmlns:a16="http://schemas.microsoft.com/office/drawing/2014/main" xmlns="" id="{99534692-59D2-4947-83E0-D4E8E4591FD6}"/>
+                <a16:creationId xmlns:a16="http://schemas.microsoft.com/office/drawing/2014/main" id="{99534692-59D2-4947-83E0-D4E8E4591FD6}"/>
               </a:ext>
             </a:extLst>
           </p:cNvPr>
@@ -40323,7 +40212,7 @@
           <p:cNvPr id="5" name="Oval 4">
             <a:extLst>
               <a:ext uri="{FF2B5EF4-FFF2-40B4-BE49-F238E27FC236}">
-                <a16:creationId xmlns:a16="http://schemas.microsoft.com/office/drawing/2014/main" xmlns="" id="{1BE905D4-A72F-472F-85B9-E5262CB9A9BA}"/>
+                <a16:creationId xmlns:a16="http://schemas.microsoft.com/office/drawing/2014/main" id="{1BE905D4-A72F-472F-85B9-E5262CB9A9BA}"/>
               </a:ext>
             </a:extLst>
           </p:cNvPr>
@@ -40375,7 +40264,7 @@
           <p:cNvPr id="6" name="Oval 5">
             <a:extLst>
               <a:ext uri="{FF2B5EF4-FFF2-40B4-BE49-F238E27FC236}">
-                <a16:creationId xmlns:a16="http://schemas.microsoft.com/office/drawing/2014/main" xmlns="" id="{DA8FA223-F814-41D8-8A8C-99F6794FF949}"/>
+                <a16:creationId xmlns:a16="http://schemas.microsoft.com/office/drawing/2014/main" id="{DA8FA223-F814-41D8-8A8C-99F6794FF949}"/>
               </a:ext>
             </a:extLst>
           </p:cNvPr>
@@ -40427,7 +40316,7 @@
           <p:cNvPr id="7" name="Oval 6">
             <a:extLst>
               <a:ext uri="{FF2B5EF4-FFF2-40B4-BE49-F238E27FC236}">
-                <a16:creationId xmlns:a16="http://schemas.microsoft.com/office/drawing/2014/main" xmlns="" id="{2C06C390-1650-43A9-92CD-878AF82A2EDE}"/>
+                <a16:creationId xmlns:a16="http://schemas.microsoft.com/office/drawing/2014/main" id="{2C06C390-1650-43A9-92CD-878AF82A2EDE}"/>
               </a:ext>
             </a:extLst>
           </p:cNvPr>
@@ -40479,7 +40368,7 @@
           <p:cNvPr id="8" name="Rectangle 7">
             <a:extLst>
               <a:ext uri="{FF2B5EF4-FFF2-40B4-BE49-F238E27FC236}">
-                <a16:creationId xmlns:a16="http://schemas.microsoft.com/office/drawing/2014/main" xmlns="" id="{42BB545C-B9B2-4B88-A085-D7573212A8A6}"/>
+                <a16:creationId xmlns:a16="http://schemas.microsoft.com/office/drawing/2014/main" id="{42BB545C-B9B2-4B88-A085-D7573212A8A6}"/>
               </a:ext>
             </a:extLst>
           </p:cNvPr>
@@ -40518,7 +40407,7 @@
           <p:cNvPr id="9" name="Rectangle 8">
             <a:extLst>
               <a:ext uri="{FF2B5EF4-FFF2-40B4-BE49-F238E27FC236}">
-                <a16:creationId xmlns:a16="http://schemas.microsoft.com/office/drawing/2014/main" xmlns="" id="{822A8BCF-BF7A-45F3-AEB2-2A8B87E5DD2B}"/>
+                <a16:creationId xmlns:a16="http://schemas.microsoft.com/office/drawing/2014/main" id="{822A8BCF-BF7A-45F3-AEB2-2A8B87E5DD2B}"/>
               </a:ext>
             </a:extLst>
           </p:cNvPr>
@@ -40557,7 +40446,7 @@
           <p:cNvPr id="10" name="Rectangle 9">
             <a:extLst>
               <a:ext uri="{FF2B5EF4-FFF2-40B4-BE49-F238E27FC236}">
-                <a16:creationId xmlns:a16="http://schemas.microsoft.com/office/drawing/2014/main" xmlns="" id="{37CDA193-5920-4DBA-9F62-8C8CE4AE6FFB}"/>
+                <a16:creationId xmlns:a16="http://schemas.microsoft.com/office/drawing/2014/main" id="{37CDA193-5920-4DBA-9F62-8C8CE4AE6FFB}"/>
               </a:ext>
             </a:extLst>
           </p:cNvPr>
@@ -40923,7 +40812,7 @@
   <a:extraClrSchemeLst/>
   <a:extLst>
     <a:ext uri="{05A4C25C-085E-4340-85A3-A5531E510DB2}">
-      <thm15:themeFamily xmlns:thm15="http://schemas.microsoft.com/office/thememl/2012/main" xmlns="" name="Office Theme" id="{62F939B6-93AF-4DB8-9C6B-D6C7DFDC589F}" vid="{4A3C46E8-61CC-4603-A589-7422A47A8E4A}"/>
+      <thm15:themeFamily xmlns:thm15="http://schemas.microsoft.com/office/thememl/2012/main" name="Office Theme" id="{62F939B6-93AF-4DB8-9C6B-D6C7DFDC589F}" vid="{4A3C46E8-61CC-4603-A589-7422A47A8E4A}"/>
     </a:ext>
   </a:extLst>
 </a:theme>

</xml_diff>

<commit_message>
Replaced marketing by sales promotion and pitching
</commit_message>
<xml_diff>
--- a/project/rumble/etsa02_figures.pptx
+++ b/project/rumble/etsa02_figures.pptx
@@ -134,7 +134,7 @@
     </p:ext>
     <p:ext uri="{EFAFB233-063F-42B5-8137-9DF3F51BA10A}">
       <p15:sldGuideLst xmlns:p15="http://schemas.microsoft.com/office/powerpoint/2012/main">
-        <p15:guide id="1" orient="horz" pos="2160" userDrawn="1">
+        <p15:guide id="1" orient="horz" pos="1656" userDrawn="1">
           <p15:clr>
             <a:srgbClr val="A4A3A4"/>
           </p15:clr>
@@ -29146,505 +29146,491 @@
           </a:p>
         </p:txBody>
       </p:sp>
-      <p:grpSp>
-        <p:nvGrpSpPr>
-          <p:cNvPr id="56" name="Group 55">
+      <p:sp>
+        <p:nvSpPr>
+          <p:cNvPr id="35" name="Rectangle 34">
             <a:extLst>
               <a:ext uri="{FF2B5EF4-FFF2-40B4-BE49-F238E27FC236}">
-                <a16:creationId xmlns:a16="http://schemas.microsoft.com/office/drawing/2014/main" id="{375610F4-3FA6-4104-882D-717313BF7701}"/>
+                <a16:creationId xmlns:a16="http://schemas.microsoft.com/office/drawing/2014/main" id="{879F8447-5CD1-4C24-A2B0-C99C2D7F227E}"/>
               </a:ext>
             </a:extLst>
           </p:cNvPr>
-          <p:cNvGrpSpPr/>
+          <p:cNvSpPr/>
           <p:nvPr/>
-        </p:nvGrpSpPr>
-        <p:grpSpPr>
+        </p:nvSpPr>
+        <p:spPr>
           <a:xfrm>
-            <a:off x="6053620" y="1061760"/>
-            <a:ext cx="3088962" cy="1784050"/>
-            <a:chOff x="5986212" y="1270508"/>
-            <a:chExt cx="3088962" cy="1784050"/>
+            <a:off x="6019955" y="1061760"/>
+            <a:ext cx="3251863" cy="1784050"/>
           </a:xfrm>
-        </p:grpSpPr>
-        <p:sp>
-          <p:nvSpPr>
-            <p:cNvPr id="35" name="Rectangle 34">
-              <a:extLst>
-                <a:ext uri="{FF2B5EF4-FFF2-40B4-BE49-F238E27FC236}">
-                  <a16:creationId xmlns:a16="http://schemas.microsoft.com/office/drawing/2014/main" id="{879F8447-5CD1-4C24-A2B0-C99C2D7F227E}"/>
-                </a:ext>
-              </a:extLst>
-            </p:cNvPr>
-            <p:cNvSpPr/>
-            <p:nvPr/>
-          </p:nvSpPr>
-          <p:spPr>
-            <a:xfrm>
-              <a:off x="6004340" y="1270508"/>
-              <a:ext cx="3070834" cy="1784050"/>
-            </a:xfrm>
-            <a:prstGeom prst="rect">
-              <a:avLst/>
-            </a:prstGeom>
+          <a:prstGeom prst="rect">
+            <a:avLst/>
+          </a:prstGeom>
+          <a:solidFill>
+            <a:schemeClr val="bg1">
+              <a:lumMod val="85000"/>
+            </a:schemeClr>
+          </a:solidFill>
+          <a:ln>
+            <a:noFill/>
+          </a:ln>
+        </p:spPr>
+        <p:style>
+          <a:lnRef idx="2">
+            <a:schemeClr val="accent1">
+              <a:shade val="50000"/>
+            </a:schemeClr>
+          </a:lnRef>
+          <a:fillRef idx="1">
+            <a:schemeClr val="accent1"/>
+          </a:fillRef>
+          <a:effectRef idx="0">
+            <a:schemeClr val="accent1"/>
+          </a:effectRef>
+          <a:fontRef idx="minor">
+            <a:schemeClr val="lt1"/>
+          </a:fontRef>
+        </p:style>
+        <p:txBody>
+          <a:bodyPr rtlCol="0" anchor="ctr"/>
+          <a:lstStyle/>
+          <a:p>
+            <a:pPr algn="ctr"/>
+            <a:endParaRPr lang="en-US"/>
+          </a:p>
+        </p:txBody>
+      </p:sp>
+      <p:sp>
+        <p:nvSpPr>
+          <p:cNvPr id="36" name="Rectangle 35">
+            <a:extLst>
+              <a:ext uri="{FF2B5EF4-FFF2-40B4-BE49-F238E27FC236}">
+                <a16:creationId xmlns:a16="http://schemas.microsoft.com/office/drawing/2014/main" id="{5F4A4132-62A0-4359-A556-90169DF61140}"/>
+              </a:ext>
+            </a:extLst>
+          </p:cNvPr>
+          <p:cNvSpPr/>
+          <p:nvPr/>
+        </p:nvSpPr>
+        <p:spPr>
+          <a:xfrm>
+            <a:off x="6354226" y="1520514"/>
+            <a:ext cx="589707" cy="548265"/>
+          </a:xfrm>
+          <a:prstGeom prst="rect">
+            <a:avLst/>
+          </a:prstGeom>
+          <a:noFill/>
+          <a:ln>
             <a:solidFill>
-              <a:schemeClr val="bg1">
-                <a:lumMod val="85000"/>
-              </a:schemeClr>
+              <a:schemeClr val="tx1"/>
             </a:solidFill>
-            <a:ln>
-              <a:noFill/>
-            </a:ln>
-          </p:spPr>
-          <p:style>
-            <a:lnRef idx="2">
-              <a:schemeClr val="accent1">
-                <a:shade val="50000"/>
-              </a:schemeClr>
-            </a:lnRef>
-            <a:fillRef idx="1">
-              <a:schemeClr val="accent1"/>
-            </a:fillRef>
-            <a:effectRef idx="0">
-              <a:schemeClr val="accent1"/>
-            </a:effectRef>
-            <a:fontRef idx="minor">
-              <a:schemeClr val="lt1"/>
-            </a:fontRef>
-          </p:style>
-          <p:txBody>
-            <a:bodyPr rtlCol="0" anchor="ctr"/>
-            <a:lstStyle/>
-            <a:p>
-              <a:pPr algn="ctr"/>
-              <a:endParaRPr lang="en-US"/>
-            </a:p>
-          </p:txBody>
-        </p:sp>
-        <p:sp>
-          <p:nvSpPr>
-            <p:cNvPr id="36" name="Rectangle 35">
-              <a:extLst>
-                <a:ext uri="{FF2B5EF4-FFF2-40B4-BE49-F238E27FC236}">
-                  <a16:creationId xmlns:a16="http://schemas.microsoft.com/office/drawing/2014/main" id="{5F4A4132-62A0-4359-A556-90169DF61140}"/>
-                </a:ext>
-              </a:extLst>
-            </p:cNvPr>
-            <p:cNvSpPr/>
-            <p:nvPr/>
-          </p:nvSpPr>
-          <p:spPr>
-            <a:xfrm>
-              <a:off x="6345810" y="1729262"/>
-              <a:ext cx="589707" cy="548265"/>
-            </a:xfrm>
-            <a:prstGeom prst="rect">
-              <a:avLst/>
-            </a:prstGeom>
-            <a:noFill/>
-            <a:ln>
-              <a:solidFill>
-                <a:schemeClr val="tx1"/>
-              </a:solidFill>
-            </a:ln>
-          </p:spPr>
-          <p:style>
-            <a:lnRef idx="2">
-              <a:schemeClr val="accent1">
-                <a:shade val="50000"/>
-              </a:schemeClr>
-            </a:lnRef>
-            <a:fillRef idx="1">
-              <a:schemeClr val="accent1"/>
-            </a:fillRef>
-            <a:effectRef idx="0">
-              <a:schemeClr val="accent1"/>
-            </a:effectRef>
-            <a:fontRef idx="minor">
-              <a:schemeClr val="lt1"/>
-            </a:fontRef>
-          </p:style>
-          <p:txBody>
-            <a:bodyPr rtlCol="0" anchor="ctr"/>
-            <a:lstStyle/>
-            <a:p>
-              <a:pPr algn="ctr"/>
-              <a:endParaRPr lang="en-US"/>
-            </a:p>
-          </p:txBody>
-        </p:sp>
-        <p:sp>
-          <p:nvSpPr>
-            <p:cNvPr id="37" name="Rectangle 36">
-              <a:extLst>
-                <a:ext uri="{FF2B5EF4-FFF2-40B4-BE49-F238E27FC236}">
-                  <a16:creationId xmlns:a16="http://schemas.microsoft.com/office/drawing/2014/main" id="{4B101870-D617-4B38-8C70-2394252B3323}"/>
-                </a:ext>
-              </a:extLst>
-            </p:cNvPr>
-            <p:cNvSpPr/>
-            <p:nvPr/>
-          </p:nvSpPr>
-          <p:spPr>
-            <a:xfrm>
-              <a:off x="5986212" y="2284478"/>
-              <a:ext cx="1313180" cy="646331"/>
-            </a:xfrm>
-            <a:prstGeom prst="rect">
-              <a:avLst/>
-            </a:prstGeom>
-          </p:spPr>
-          <p:txBody>
-            <a:bodyPr wrap="none">
-              <a:spAutoFit/>
-            </a:bodyPr>
-            <a:lstStyle/>
-            <a:p>
-              <a:pPr algn="ctr"/>
-              <a:r>
-                <a:rPr lang="sv-SE" dirty="0">
-                  <a:latin typeface="Arial" panose="020B0604020202020204" pitchFamily="34" charset="0"/>
-                  <a:cs typeface="Arial" panose="020B0604020202020204" pitchFamily="34" charset="0"/>
-                </a:rPr>
-                <a:t>Basic</a:t>
-              </a:r>
-            </a:p>
-            <a:p>
-              <a:pPr algn="ctr"/>
-              <a:r>
-                <a:rPr lang="sv-SE" dirty="0" err="1">
-                  <a:latin typeface="Arial" panose="020B0604020202020204" pitchFamily="34" charset="0"/>
-                  <a:cs typeface="Arial" panose="020B0604020202020204" pitchFamily="34" charset="0"/>
-                </a:rPr>
-                <a:t>Leader</a:t>
-              </a:r>
-              <a:r>
-                <a:rPr lang="sv-SE" dirty="0">
-                  <a:latin typeface="Arial" panose="020B0604020202020204" pitchFamily="34" charset="0"/>
-                  <a:cs typeface="Arial" panose="020B0604020202020204" pitchFamily="34" charset="0"/>
-                </a:rPr>
-                <a:t> Bot</a:t>
-              </a:r>
-              <a:endParaRPr lang="en-US" dirty="0"/>
-            </a:p>
-          </p:txBody>
-        </p:sp>
-        <p:sp>
-          <p:nvSpPr>
-            <p:cNvPr id="38" name="Rectangle 37">
-              <a:extLst>
-                <a:ext uri="{FF2B5EF4-FFF2-40B4-BE49-F238E27FC236}">
-                  <a16:creationId xmlns:a16="http://schemas.microsoft.com/office/drawing/2014/main" id="{C917C82C-58B7-4AA7-A94D-98D12F824498}"/>
-                </a:ext>
-              </a:extLst>
-            </p:cNvPr>
-            <p:cNvSpPr/>
-            <p:nvPr/>
-          </p:nvSpPr>
-          <p:spPr>
-            <a:xfrm>
-              <a:off x="6354582" y="1368036"/>
-              <a:ext cx="569387" cy="369332"/>
-            </a:xfrm>
-            <a:prstGeom prst="rect">
-              <a:avLst/>
-            </a:prstGeom>
-          </p:spPr>
-          <p:txBody>
-            <a:bodyPr wrap="none">
-              <a:spAutoFit/>
-            </a:bodyPr>
-            <a:lstStyle/>
-            <a:p>
-              <a:r>
-                <a:rPr lang="sv-SE" dirty="0">
-                  <a:latin typeface="Arial" panose="020B0604020202020204" pitchFamily="34" charset="0"/>
-                  <a:cs typeface="Arial" panose="020B0604020202020204" pitchFamily="34" charset="0"/>
-                </a:rPr>
-                <a:t>€20</a:t>
-              </a:r>
-              <a:endParaRPr lang="en-US" dirty="0"/>
-            </a:p>
-          </p:txBody>
-        </p:sp>
-        <p:sp>
-          <p:nvSpPr>
-            <p:cNvPr id="41" name="Rectangle 40">
-              <a:extLst>
-                <a:ext uri="{FF2B5EF4-FFF2-40B4-BE49-F238E27FC236}">
-                  <a16:creationId xmlns:a16="http://schemas.microsoft.com/office/drawing/2014/main" id="{C96D5A3A-401E-4360-A926-9ADE459BBEF2}"/>
-                </a:ext>
-              </a:extLst>
-            </p:cNvPr>
-            <p:cNvSpPr/>
-            <p:nvPr/>
-          </p:nvSpPr>
-          <p:spPr>
-            <a:xfrm>
-              <a:off x="7314746" y="2284478"/>
-              <a:ext cx="748923" cy="646331"/>
-            </a:xfrm>
-            <a:prstGeom prst="rect">
-              <a:avLst/>
-            </a:prstGeom>
-          </p:spPr>
-          <p:txBody>
-            <a:bodyPr wrap="none">
-              <a:spAutoFit/>
-            </a:bodyPr>
-            <a:lstStyle/>
-            <a:p>
-              <a:pPr algn="ctr"/>
-              <a:r>
-                <a:rPr lang="sv-SE" dirty="0">
-                  <a:latin typeface="Arial" panose="020B0604020202020204" pitchFamily="34" charset="0"/>
-                  <a:cs typeface="Arial" panose="020B0604020202020204" pitchFamily="34" charset="0"/>
-                </a:rPr>
-                <a:t>Basic</a:t>
-              </a:r>
-            </a:p>
-            <a:p>
-              <a:pPr algn="ctr"/>
-              <a:r>
-                <a:rPr lang="sv-SE" dirty="0">
-                  <a:latin typeface="Arial" panose="020B0604020202020204" pitchFamily="34" charset="0"/>
-                  <a:cs typeface="Arial" panose="020B0604020202020204" pitchFamily="34" charset="0"/>
-                </a:rPr>
-                <a:t>Bot</a:t>
-              </a:r>
-              <a:endParaRPr lang="en-US" dirty="0"/>
-            </a:p>
-          </p:txBody>
-        </p:sp>
-        <p:sp>
-          <p:nvSpPr>
-            <p:cNvPr id="42" name="Rectangle 41">
-              <a:extLst>
-                <a:ext uri="{FF2B5EF4-FFF2-40B4-BE49-F238E27FC236}">
-                  <a16:creationId xmlns:a16="http://schemas.microsoft.com/office/drawing/2014/main" id="{2190B5B3-6D2B-4506-B8FE-FD7E6CB3E43D}"/>
-                </a:ext>
-              </a:extLst>
-            </p:cNvPr>
-            <p:cNvSpPr/>
-            <p:nvPr/>
-          </p:nvSpPr>
-          <p:spPr>
-            <a:xfrm>
-              <a:off x="7400988" y="1368036"/>
-              <a:ext cx="569387" cy="369332"/>
-            </a:xfrm>
-            <a:prstGeom prst="rect">
-              <a:avLst/>
-            </a:prstGeom>
-          </p:spPr>
-          <p:txBody>
-            <a:bodyPr wrap="none">
-              <a:spAutoFit/>
-            </a:bodyPr>
-            <a:lstStyle/>
-            <a:p>
-              <a:r>
-                <a:rPr lang="sv-SE" dirty="0">
-                  <a:latin typeface="Arial" panose="020B0604020202020204" pitchFamily="34" charset="0"/>
-                  <a:cs typeface="Arial" panose="020B0604020202020204" pitchFamily="34" charset="0"/>
-                </a:rPr>
-                <a:t>€15</a:t>
-              </a:r>
-              <a:endParaRPr lang="en-US" dirty="0"/>
-            </a:p>
-          </p:txBody>
-        </p:sp>
-        <p:sp>
-          <p:nvSpPr>
-            <p:cNvPr id="43" name="Oval 42">
-              <a:extLst>
-                <a:ext uri="{FF2B5EF4-FFF2-40B4-BE49-F238E27FC236}">
-                  <a16:creationId xmlns:a16="http://schemas.microsoft.com/office/drawing/2014/main" id="{4D266B7E-018C-46ED-8D35-52F9E5B7E141}"/>
-                </a:ext>
-              </a:extLst>
-            </p:cNvPr>
-            <p:cNvSpPr/>
-            <p:nvPr/>
-          </p:nvSpPr>
-          <p:spPr>
-            <a:xfrm>
-              <a:off x="7381236" y="1723337"/>
-              <a:ext cx="608889" cy="595981"/>
-            </a:xfrm>
-            <a:prstGeom prst="ellipse">
-              <a:avLst/>
-            </a:prstGeom>
-            <a:noFill/>
-            <a:ln>
-              <a:solidFill>
-                <a:schemeClr val="tx1"/>
-              </a:solidFill>
-            </a:ln>
-          </p:spPr>
-          <p:style>
-            <a:lnRef idx="2">
-              <a:schemeClr val="accent1">
-                <a:shade val="50000"/>
-              </a:schemeClr>
-            </a:lnRef>
-            <a:fillRef idx="1">
-              <a:schemeClr val="accent1"/>
-            </a:fillRef>
-            <a:effectRef idx="0">
-              <a:schemeClr val="accent1"/>
-            </a:effectRef>
-            <a:fontRef idx="minor">
-              <a:schemeClr val="lt1"/>
-            </a:fontRef>
-          </p:style>
-          <p:txBody>
-            <a:bodyPr rtlCol="0" anchor="ctr"/>
-            <a:lstStyle/>
-            <a:p>
-              <a:pPr algn="ctr"/>
-              <a:endParaRPr lang="en-US"/>
-            </a:p>
-          </p:txBody>
-        </p:sp>
-        <p:sp>
-          <p:nvSpPr>
-            <p:cNvPr id="44" name="Rectangle 43">
-              <a:extLst>
-                <a:ext uri="{FF2B5EF4-FFF2-40B4-BE49-F238E27FC236}">
-                  <a16:creationId xmlns:a16="http://schemas.microsoft.com/office/drawing/2014/main" id="{7EE4F98B-E7AC-475C-9644-7DFFA759FB0B}"/>
-                </a:ext>
-              </a:extLst>
-            </p:cNvPr>
-            <p:cNvSpPr/>
-            <p:nvPr/>
-          </p:nvSpPr>
-          <p:spPr>
-            <a:xfrm>
-              <a:off x="8214104" y="2292906"/>
-              <a:ext cx="748923" cy="646331"/>
-            </a:xfrm>
-            <a:prstGeom prst="rect">
-              <a:avLst/>
-            </a:prstGeom>
-          </p:spPr>
-          <p:txBody>
-            <a:bodyPr wrap="none">
-              <a:spAutoFit/>
-            </a:bodyPr>
-            <a:lstStyle/>
-            <a:p>
-              <a:pPr algn="ctr"/>
-              <a:r>
-                <a:rPr lang="sv-SE" dirty="0">
-                  <a:latin typeface="Arial" panose="020B0604020202020204" pitchFamily="34" charset="0"/>
-                  <a:cs typeface="Arial" panose="020B0604020202020204" pitchFamily="34" charset="0"/>
-                </a:rPr>
-                <a:t>Basic</a:t>
-              </a:r>
-            </a:p>
-            <a:p>
-              <a:pPr algn="ctr"/>
-              <a:r>
-                <a:rPr lang="sv-SE" dirty="0" err="1">
-                  <a:latin typeface="Arial" panose="020B0604020202020204" pitchFamily="34" charset="0"/>
-                  <a:cs typeface="Arial" panose="020B0604020202020204" pitchFamily="34" charset="0"/>
-                </a:rPr>
-                <a:t>Droid</a:t>
-              </a:r>
-              <a:endParaRPr lang="en-US" dirty="0"/>
-            </a:p>
-          </p:txBody>
-        </p:sp>
-        <p:sp>
-          <p:nvSpPr>
-            <p:cNvPr id="45" name="Rectangle 44">
-              <a:extLst>
-                <a:ext uri="{FF2B5EF4-FFF2-40B4-BE49-F238E27FC236}">
-                  <a16:creationId xmlns:a16="http://schemas.microsoft.com/office/drawing/2014/main" id="{3317DF71-E5C0-4D1B-9FF7-14D271D9E7DA}"/>
-                </a:ext>
-              </a:extLst>
-            </p:cNvPr>
-            <p:cNvSpPr/>
-            <p:nvPr/>
-          </p:nvSpPr>
-          <p:spPr>
-            <a:xfrm>
-              <a:off x="8300346" y="1376464"/>
-              <a:ext cx="569387" cy="369332"/>
-            </a:xfrm>
-            <a:prstGeom prst="rect">
-              <a:avLst/>
-            </a:prstGeom>
-          </p:spPr>
-          <p:txBody>
-            <a:bodyPr wrap="none">
-              <a:spAutoFit/>
-            </a:bodyPr>
-            <a:lstStyle/>
-            <a:p>
-              <a:r>
-                <a:rPr lang="sv-SE" dirty="0">
-                  <a:latin typeface="Arial" panose="020B0604020202020204" pitchFamily="34" charset="0"/>
-                  <a:cs typeface="Arial" panose="020B0604020202020204" pitchFamily="34" charset="0"/>
-                </a:rPr>
-                <a:t>€10</a:t>
-              </a:r>
-              <a:endParaRPr lang="en-US" dirty="0"/>
-            </a:p>
-          </p:txBody>
-        </p:sp>
-        <p:sp>
-          <p:nvSpPr>
-            <p:cNvPr id="47" name="Isosceles Triangle 46">
-              <a:extLst>
-                <a:ext uri="{FF2B5EF4-FFF2-40B4-BE49-F238E27FC236}">
-                  <a16:creationId xmlns:a16="http://schemas.microsoft.com/office/drawing/2014/main" id="{365D57FF-0831-4183-8DC8-946B7A8F2BC8}"/>
-                </a:ext>
-              </a:extLst>
-            </p:cNvPr>
-            <p:cNvSpPr/>
-            <p:nvPr/>
-          </p:nvSpPr>
-          <p:spPr>
-            <a:xfrm>
-              <a:off x="8272660" y="1728935"/>
-              <a:ext cx="660938" cy="584783"/>
-            </a:xfrm>
-            <a:prstGeom prst="triangle">
-              <a:avLst/>
-            </a:prstGeom>
-            <a:noFill/>
-            <a:ln>
-              <a:solidFill>
-                <a:schemeClr val="tx1"/>
-              </a:solidFill>
-            </a:ln>
-          </p:spPr>
-          <p:style>
-            <a:lnRef idx="2">
-              <a:schemeClr val="accent1">
-                <a:shade val="50000"/>
-              </a:schemeClr>
-            </a:lnRef>
-            <a:fillRef idx="1">
-              <a:schemeClr val="accent1"/>
-            </a:fillRef>
-            <a:effectRef idx="0">
-              <a:schemeClr val="accent1"/>
-            </a:effectRef>
-            <a:fontRef idx="minor">
-              <a:schemeClr val="lt1"/>
-            </a:fontRef>
-          </p:style>
-          <p:txBody>
-            <a:bodyPr rtlCol="0" anchor="ctr"/>
-            <a:lstStyle/>
-            <a:p>
-              <a:pPr algn="ctr"/>
-              <a:endParaRPr lang="en-US"/>
-            </a:p>
-          </p:txBody>
-        </p:sp>
-      </p:grpSp>
+          </a:ln>
+        </p:spPr>
+        <p:style>
+          <a:lnRef idx="2">
+            <a:schemeClr val="accent1">
+              <a:shade val="50000"/>
+            </a:schemeClr>
+          </a:lnRef>
+          <a:fillRef idx="1">
+            <a:schemeClr val="accent1"/>
+          </a:fillRef>
+          <a:effectRef idx="0">
+            <a:schemeClr val="accent1"/>
+          </a:effectRef>
+          <a:fontRef idx="minor">
+            <a:schemeClr val="lt1"/>
+          </a:fontRef>
+        </p:style>
+        <p:txBody>
+          <a:bodyPr rtlCol="0" anchor="ctr"/>
+          <a:lstStyle/>
+          <a:p>
+            <a:pPr algn="ctr"/>
+            <a:endParaRPr lang="en-US"/>
+          </a:p>
+        </p:txBody>
+      </p:sp>
+      <p:sp>
+        <p:nvSpPr>
+          <p:cNvPr id="37" name="Rectangle 36">
+            <a:extLst>
+              <a:ext uri="{FF2B5EF4-FFF2-40B4-BE49-F238E27FC236}">
+                <a16:creationId xmlns:a16="http://schemas.microsoft.com/office/drawing/2014/main" id="{4B101870-D617-4B38-8C70-2394252B3323}"/>
+              </a:ext>
+            </a:extLst>
+          </p:cNvPr>
+          <p:cNvSpPr/>
+          <p:nvPr/>
+        </p:nvSpPr>
+        <p:spPr>
+          <a:xfrm>
+            <a:off x="5994628" y="2085562"/>
+            <a:ext cx="1313180" cy="646331"/>
+          </a:xfrm>
+          <a:prstGeom prst="rect">
+            <a:avLst/>
+          </a:prstGeom>
+        </p:spPr>
+        <p:txBody>
+          <a:bodyPr wrap="none">
+            <a:spAutoFit/>
+          </a:bodyPr>
+          <a:lstStyle/>
+          <a:p>
+            <a:pPr algn="ctr"/>
+            <a:r>
+              <a:rPr lang="sv-SE" dirty="0">
+                <a:latin typeface="Arial" panose="020B0604020202020204" pitchFamily="34" charset="0"/>
+                <a:cs typeface="Arial" panose="020B0604020202020204" pitchFamily="34" charset="0"/>
+              </a:rPr>
+              <a:t>Basic</a:t>
+            </a:r>
+          </a:p>
+          <a:p>
+            <a:pPr algn="ctr"/>
+            <a:r>
+              <a:rPr lang="sv-SE" dirty="0" err="1">
+                <a:latin typeface="Arial" panose="020B0604020202020204" pitchFamily="34" charset="0"/>
+                <a:cs typeface="Arial" panose="020B0604020202020204" pitchFamily="34" charset="0"/>
+              </a:rPr>
+              <a:t>Leader</a:t>
+            </a:r>
+            <a:r>
+              <a:rPr lang="sv-SE" dirty="0">
+                <a:latin typeface="Arial" panose="020B0604020202020204" pitchFamily="34" charset="0"/>
+                <a:cs typeface="Arial" panose="020B0604020202020204" pitchFamily="34" charset="0"/>
+              </a:rPr>
+              <a:t> Bot</a:t>
+            </a:r>
+            <a:endParaRPr lang="en-US" dirty="0"/>
+          </a:p>
+        </p:txBody>
+      </p:sp>
+      <p:sp>
+        <p:nvSpPr>
+          <p:cNvPr id="38" name="Rectangle 37">
+            <a:extLst>
+              <a:ext uri="{FF2B5EF4-FFF2-40B4-BE49-F238E27FC236}">
+                <a16:creationId xmlns:a16="http://schemas.microsoft.com/office/drawing/2014/main" id="{C917C82C-58B7-4AA7-A94D-98D12F824498}"/>
+              </a:ext>
+            </a:extLst>
+          </p:cNvPr>
+          <p:cNvSpPr/>
+          <p:nvPr/>
+        </p:nvSpPr>
+        <p:spPr>
+          <a:xfrm>
+            <a:off x="6362998" y="1159288"/>
+            <a:ext cx="569387" cy="369332"/>
+          </a:xfrm>
+          <a:prstGeom prst="rect">
+            <a:avLst/>
+          </a:prstGeom>
+        </p:spPr>
+        <p:txBody>
+          <a:bodyPr wrap="none">
+            <a:spAutoFit/>
+          </a:bodyPr>
+          <a:lstStyle/>
+          <a:p>
+            <a:r>
+              <a:rPr lang="sv-SE" dirty="0">
+                <a:latin typeface="Arial" panose="020B0604020202020204" pitchFamily="34" charset="0"/>
+                <a:cs typeface="Arial" panose="020B0604020202020204" pitchFamily="34" charset="0"/>
+              </a:rPr>
+              <a:t>€20</a:t>
+            </a:r>
+            <a:endParaRPr lang="en-US" dirty="0"/>
+          </a:p>
+        </p:txBody>
+      </p:sp>
+      <p:sp>
+        <p:nvSpPr>
+          <p:cNvPr id="41" name="Rectangle 40">
+            <a:extLst>
+              <a:ext uri="{FF2B5EF4-FFF2-40B4-BE49-F238E27FC236}">
+                <a16:creationId xmlns:a16="http://schemas.microsoft.com/office/drawing/2014/main" id="{C96D5A3A-401E-4360-A926-9ADE459BBEF2}"/>
+              </a:ext>
+            </a:extLst>
+          </p:cNvPr>
+          <p:cNvSpPr/>
+          <p:nvPr/>
+        </p:nvSpPr>
+        <p:spPr>
+          <a:xfrm>
+            <a:off x="7203903" y="2085562"/>
+            <a:ext cx="1223412" cy="646331"/>
+          </a:xfrm>
+          <a:prstGeom prst="rect">
+            <a:avLst/>
+          </a:prstGeom>
+        </p:spPr>
+        <p:txBody>
+          <a:bodyPr wrap="none">
+            <a:spAutoFit/>
+          </a:bodyPr>
+          <a:lstStyle/>
+          <a:p>
+            <a:pPr algn="ctr"/>
+            <a:r>
+              <a:rPr lang="sv-SE" dirty="0">
+                <a:latin typeface="Arial" panose="020B0604020202020204" pitchFamily="34" charset="0"/>
+                <a:cs typeface="Arial" panose="020B0604020202020204" pitchFamily="34" charset="0"/>
+              </a:rPr>
+              <a:t>Basic</a:t>
+            </a:r>
+          </a:p>
+          <a:p>
+            <a:pPr algn="ctr"/>
+            <a:r>
+              <a:rPr lang="sv-SE" dirty="0" err="1">
+                <a:latin typeface="Arial" panose="020B0604020202020204" pitchFamily="34" charset="0"/>
+                <a:cs typeface="Arial" panose="020B0604020202020204" pitchFamily="34" charset="0"/>
+              </a:rPr>
+              <a:t>Melee</a:t>
+            </a:r>
+            <a:r>
+              <a:rPr lang="sv-SE" dirty="0">
+                <a:latin typeface="Arial" panose="020B0604020202020204" pitchFamily="34" charset="0"/>
+                <a:cs typeface="Arial" panose="020B0604020202020204" pitchFamily="34" charset="0"/>
+              </a:rPr>
+              <a:t> Bot</a:t>
+            </a:r>
+            <a:endParaRPr lang="en-US" dirty="0"/>
+          </a:p>
+        </p:txBody>
+      </p:sp>
+      <p:sp>
+        <p:nvSpPr>
+          <p:cNvPr id="42" name="Rectangle 41">
+            <a:extLst>
+              <a:ext uri="{FF2B5EF4-FFF2-40B4-BE49-F238E27FC236}">
+                <a16:creationId xmlns:a16="http://schemas.microsoft.com/office/drawing/2014/main" id="{2190B5B3-6D2B-4506-B8FE-FD7E6CB3E43D}"/>
+              </a:ext>
+            </a:extLst>
+          </p:cNvPr>
+          <p:cNvSpPr/>
+          <p:nvPr/>
+        </p:nvSpPr>
+        <p:spPr>
+          <a:xfrm>
+            <a:off x="7527388" y="1159288"/>
+            <a:ext cx="569387" cy="369332"/>
+          </a:xfrm>
+          <a:prstGeom prst="rect">
+            <a:avLst/>
+          </a:prstGeom>
+        </p:spPr>
+        <p:txBody>
+          <a:bodyPr wrap="none">
+            <a:spAutoFit/>
+          </a:bodyPr>
+          <a:lstStyle/>
+          <a:p>
+            <a:r>
+              <a:rPr lang="sv-SE" dirty="0">
+                <a:latin typeface="Arial" panose="020B0604020202020204" pitchFamily="34" charset="0"/>
+                <a:cs typeface="Arial" panose="020B0604020202020204" pitchFamily="34" charset="0"/>
+              </a:rPr>
+              <a:t>€15</a:t>
+            </a:r>
+            <a:endParaRPr lang="en-US" dirty="0"/>
+          </a:p>
+        </p:txBody>
+      </p:sp>
+      <p:sp>
+        <p:nvSpPr>
+          <p:cNvPr id="43" name="Oval 42">
+            <a:extLst>
+              <a:ext uri="{FF2B5EF4-FFF2-40B4-BE49-F238E27FC236}">
+                <a16:creationId xmlns:a16="http://schemas.microsoft.com/office/drawing/2014/main" id="{4D266B7E-018C-46ED-8D35-52F9E5B7E141}"/>
+              </a:ext>
+            </a:extLst>
+          </p:cNvPr>
+          <p:cNvSpPr/>
+          <p:nvPr/>
+        </p:nvSpPr>
+        <p:spPr>
+          <a:xfrm>
+            <a:off x="7507636" y="1514589"/>
+            <a:ext cx="608889" cy="595981"/>
+          </a:xfrm>
+          <a:prstGeom prst="ellipse">
+            <a:avLst/>
+          </a:prstGeom>
+          <a:noFill/>
+          <a:ln>
+            <a:solidFill>
+              <a:schemeClr val="tx1"/>
+            </a:solidFill>
+          </a:ln>
+        </p:spPr>
+        <p:style>
+          <a:lnRef idx="2">
+            <a:schemeClr val="accent1">
+              <a:shade val="50000"/>
+            </a:schemeClr>
+          </a:lnRef>
+          <a:fillRef idx="1">
+            <a:schemeClr val="accent1"/>
+          </a:fillRef>
+          <a:effectRef idx="0">
+            <a:schemeClr val="accent1"/>
+          </a:effectRef>
+          <a:fontRef idx="minor">
+            <a:schemeClr val="lt1"/>
+          </a:fontRef>
+        </p:style>
+        <p:txBody>
+          <a:bodyPr rtlCol="0" anchor="ctr"/>
+          <a:lstStyle/>
+          <a:p>
+            <a:pPr algn="ctr"/>
+            <a:endParaRPr lang="en-US"/>
+          </a:p>
+        </p:txBody>
+      </p:sp>
+      <p:sp>
+        <p:nvSpPr>
+          <p:cNvPr id="44" name="Rectangle 43">
+            <a:extLst>
+              <a:ext uri="{FF2B5EF4-FFF2-40B4-BE49-F238E27FC236}">
+                <a16:creationId xmlns:a16="http://schemas.microsoft.com/office/drawing/2014/main" id="{7EE4F98B-E7AC-475C-9644-7DFFA759FB0B}"/>
+              </a:ext>
+            </a:extLst>
+          </p:cNvPr>
+          <p:cNvSpPr/>
+          <p:nvPr/>
+        </p:nvSpPr>
+        <p:spPr>
+          <a:xfrm>
+            <a:off x="8370000" y="2084158"/>
+            <a:ext cx="748923" cy="646331"/>
+          </a:xfrm>
+          <a:prstGeom prst="rect">
+            <a:avLst/>
+          </a:prstGeom>
+        </p:spPr>
+        <p:txBody>
+          <a:bodyPr wrap="none">
+            <a:spAutoFit/>
+          </a:bodyPr>
+          <a:lstStyle/>
+          <a:p>
+            <a:pPr algn="ctr"/>
+            <a:r>
+              <a:rPr lang="sv-SE" dirty="0">
+                <a:latin typeface="Arial" panose="020B0604020202020204" pitchFamily="34" charset="0"/>
+                <a:cs typeface="Arial" panose="020B0604020202020204" pitchFamily="34" charset="0"/>
+              </a:rPr>
+              <a:t>Basic</a:t>
+            </a:r>
+          </a:p>
+          <a:p>
+            <a:pPr algn="ctr"/>
+            <a:r>
+              <a:rPr lang="sv-SE" dirty="0" err="1">
+                <a:latin typeface="Arial" panose="020B0604020202020204" pitchFamily="34" charset="0"/>
+                <a:cs typeface="Arial" panose="020B0604020202020204" pitchFamily="34" charset="0"/>
+              </a:rPr>
+              <a:t>Droid</a:t>
+            </a:r>
+            <a:endParaRPr lang="en-US" dirty="0"/>
+          </a:p>
+        </p:txBody>
+      </p:sp>
+      <p:sp>
+        <p:nvSpPr>
+          <p:cNvPr id="45" name="Rectangle 44">
+            <a:extLst>
+              <a:ext uri="{FF2B5EF4-FFF2-40B4-BE49-F238E27FC236}">
+                <a16:creationId xmlns:a16="http://schemas.microsoft.com/office/drawing/2014/main" id="{3317DF71-E5C0-4D1B-9FF7-14D271D9E7DA}"/>
+              </a:ext>
+            </a:extLst>
+          </p:cNvPr>
+          <p:cNvSpPr/>
+          <p:nvPr/>
+        </p:nvSpPr>
+        <p:spPr>
+          <a:xfrm>
+            <a:off x="8456242" y="1167716"/>
+            <a:ext cx="569387" cy="369332"/>
+          </a:xfrm>
+          <a:prstGeom prst="rect">
+            <a:avLst/>
+          </a:prstGeom>
+        </p:spPr>
+        <p:txBody>
+          <a:bodyPr wrap="none">
+            <a:spAutoFit/>
+          </a:bodyPr>
+          <a:lstStyle/>
+          <a:p>
+            <a:r>
+              <a:rPr lang="sv-SE" dirty="0">
+                <a:latin typeface="Arial" panose="020B0604020202020204" pitchFamily="34" charset="0"/>
+                <a:cs typeface="Arial" panose="020B0604020202020204" pitchFamily="34" charset="0"/>
+              </a:rPr>
+              <a:t>€10</a:t>
+            </a:r>
+            <a:endParaRPr lang="en-US" dirty="0"/>
+          </a:p>
+        </p:txBody>
+      </p:sp>
+      <p:sp>
+        <p:nvSpPr>
+          <p:cNvPr id="47" name="Isosceles Triangle 46">
+            <a:extLst>
+              <a:ext uri="{FF2B5EF4-FFF2-40B4-BE49-F238E27FC236}">
+                <a16:creationId xmlns:a16="http://schemas.microsoft.com/office/drawing/2014/main" id="{365D57FF-0831-4183-8DC8-946B7A8F2BC8}"/>
+              </a:ext>
+            </a:extLst>
+          </p:cNvPr>
+          <p:cNvSpPr/>
+          <p:nvPr/>
+        </p:nvSpPr>
+        <p:spPr>
+          <a:xfrm>
+            <a:off x="8428556" y="1520187"/>
+            <a:ext cx="660938" cy="584783"/>
+          </a:xfrm>
+          <a:prstGeom prst="triangle">
+            <a:avLst/>
+          </a:prstGeom>
+          <a:noFill/>
+          <a:ln>
+            <a:solidFill>
+              <a:schemeClr val="tx1"/>
+            </a:solidFill>
+          </a:ln>
+        </p:spPr>
+        <p:style>
+          <a:lnRef idx="2">
+            <a:schemeClr val="accent1">
+              <a:shade val="50000"/>
+            </a:schemeClr>
+          </a:lnRef>
+          <a:fillRef idx="1">
+            <a:schemeClr val="accent1"/>
+          </a:fillRef>
+          <a:effectRef idx="0">
+            <a:schemeClr val="accent1"/>
+          </a:effectRef>
+          <a:fontRef idx="minor">
+            <a:schemeClr val="lt1"/>
+          </a:fontRef>
+        </p:style>
+        <p:txBody>
+          <a:bodyPr rtlCol="0" anchor="ctr"/>
+          <a:lstStyle/>
+          <a:p>
+            <a:pPr algn="ctr"/>
+            <a:endParaRPr lang="en-US"/>
+          </a:p>
+        </p:txBody>
+      </p:sp>
       <p:sp>
         <p:nvSpPr>
           <p:cNvPr id="48" name="Rectangle 47">
@@ -29861,7 +29847,7 @@
         <p:spPr>
           <a:xfrm>
             <a:off x="9149184" y="5004013"/>
-            <a:ext cx="1518364" cy="369332"/>
+            <a:ext cx="1402948" cy="369332"/>
           </a:xfrm>
           <a:prstGeom prst="rect">
             <a:avLst/>
@@ -29874,11 +29860,18 @@
           <a:lstStyle/>
           <a:p>
             <a:r>
+              <a:rPr lang="sv-SE" dirty="0" err="1">
+                <a:latin typeface="Arial" panose="020B0604020202020204" pitchFamily="34" charset="0"/>
+                <a:cs typeface="Arial" panose="020B0604020202020204" pitchFamily="34" charset="0"/>
+              </a:rPr>
+              <a:t>Melee</a:t>
+            </a:r>
+            <a:r>
               <a:rPr lang="sv-SE" dirty="0">
                 <a:latin typeface="Arial" panose="020B0604020202020204" pitchFamily="34" charset="0"/>
                 <a:cs typeface="Arial" panose="020B0604020202020204" pitchFamily="34" charset="0"/>
               </a:rPr>
-              <a:t>Normal robot</a:t>
+              <a:t> robot</a:t>
             </a:r>
             <a:endParaRPr lang="en-US" dirty="0"/>
           </a:p>
@@ -30095,7 +30088,21 @@
                 <a:latin typeface="Arial" panose="020B0604020202020204" pitchFamily="34" charset="0"/>
                 <a:cs typeface="Arial" panose="020B0604020202020204" pitchFamily="34" charset="0"/>
               </a:rPr>
-              <a:t>Basic Bot</a:t>
+              <a:t>Basic </a:t>
+            </a:r>
+            <a:r>
+              <a:rPr lang="sv-SE" dirty="0" err="1">
+                <a:latin typeface="Arial" panose="020B0604020202020204" pitchFamily="34" charset="0"/>
+                <a:cs typeface="Arial" panose="020B0604020202020204" pitchFamily="34" charset="0"/>
+              </a:rPr>
+              <a:t>Melee</a:t>
+            </a:r>
+            <a:r>
+              <a:rPr lang="sv-SE" dirty="0">
+                <a:latin typeface="Arial" panose="020B0604020202020204" pitchFamily="34" charset="0"/>
+                <a:cs typeface="Arial" panose="020B0604020202020204" pitchFamily="34" charset="0"/>
+              </a:rPr>
+              <a:t> Bot</a:t>
             </a:r>
           </a:p>
           <a:p>
@@ -30766,23 +30773,19 @@
               <a:buChar char="•"/>
             </a:pPr>
             <a:r>
+              <a:rPr lang="sv-SE" dirty="0" err="1">
+                <a:latin typeface="Arial" panose="020B0604020202020204" pitchFamily="34" charset="0"/>
+                <a:cs typeface="Arial" panose="020B0604020202020204" pitchFamily="34" charset="0"/>
+              </a:rPr>
+              <a:t>Sales</a:t>
+            </a:r>
+            <a:r>
               <a:rPr lang="sv-SE" dirty="0">
                 <a:latin typeface="Arial" panose="020B0604020202020204" pitchFamily="34" charset="0"/>
                 <a:cs typeface="Arial" panose="020B0604020202020204" pitchFamily="34" charset="0"/>
               </a:rPr>
-              <a:t>Marketing </a:t>
+              <a:t> pitch</a:t>
             </a:r>
-            <a:r>
-              <a:rPr lang="sv-SE" dirty="0" err="1">
-                <a:latin typeface="Arial" panose="020B0604020202020204" pitchFamily="34" charset="0"/>
-                <a:cs typeface="Arial" panose="020B0604020202020204" pitchFamily="34" charset="0"/>
-              </a:rPr>
-              <a:t>concept</a:t>
-            </a:r>
-            <a:endParaRPr lang="sv-SE" dirty="0">
-              <a:latin typeface="Arial" panose="020B0604020202020204" pitchFamily="34" charset="0"/>
-              <a:cs typeface="Arial" panose="020B0604020202020204" pitchFamily="34" charset="0"/>
-            </a:endParaRPr>
           </a:p>
           <a:p>
             <a:pPr marL="285750" indent="-285750">
@@ -31262,7 +31265,7 @@
         <p:spPr>
           <a:xfrm>
             <a:off x="9359437" y="1209380"/>
-            <a:ext cx="1197764" cy="369332"/>
+            <a:ext cx="1005403" cy="369332"/>
           </a:xfrm>
           <a:prstGeom prst="rect">
             <a:avLst/>
@@ -31282,7 +31285,7 @@
                 <a:latin typeface="Arial" panose="020B0604020202020204" pitchFamily="34" charset="0"/>
                 <a:cs typeface="Arial" panose="020B0604020202020204" pitchFamily="34" charset="0"/>
               </a:rPr>
-              <a:t>Marketing</a:t>
+              <a:t>Pitching</a:t>
             </a:r>
             <a:endParaRPr lang="en-US" dirty="0"/>
           </a:p>
@@ -31637,7 +31640,7 @@
         <p:spPr>
           <a:xfrm>
             <a:off x="11097919" y="2722384"/>
-            <a:ext cx="1288026" cy="369332"/>
+            <a:ext cx="1288026" cy="646331"/>
           </a:xfrm>
           <a:prstGeom prst="rect">
             <a:avLst/>
@@ -31651,6 +31654,16 @@
           <a:p>
             <a:pPr algn="ctr"/>
             <a:r>
+              <a:rPr lang="sv-SE" dirty="0" err="1">
+                <a:solidFill>
+                  <a:schemeClr val="tx1"/>
+                </a:solidFill>
+                <a:latin typeface="Arial" panose="020B0604020202020204" pitchFamily="34" charset="0"/>
+                <a:cs typeface="Arial" panose="020B0604020202020204" pitchFamily="34" charset="0"/>
+              </a:rPr>
+              <a:t>Sales</a:t>
+            </a:r>
+            <a:r>
               <a:rPr lang="sv-SE" dirty="0">
                 <a:solidFill>
                   <a:schemeClr val="tx1"/>
@@ -31658,7 +31671,7 @@
                 <a:latin typeface="Arial" panose="020B0604020202020204" pitchFamily="34" charset="0"/>
                 <a:cs typeface="Arial" panose="020B0604020202020204" pitchFamily="34" charset="0"/>
               </a:rPr>
-              <a:t>Marketing</a:t>
+              <a:t> pitch</a:t>
             </a:r>
             <a:endParaRPr lang="en-US" dirty="0"/>
           </a:p>

</xml_diff>

<commit_message>
Added lean canvas to figure
</commit_message>
<xml_diff>
--- a/project/rumble/etsa02_figures.pptx
+++ b/project/rumble/etsa02_figures.pptx
@@ -18297,7 +18297,7 @@
           <a:p>
             <a:fld id="{CACABD52-BF91-4CCE-9EEC-6A02225A646E}" type="datetimeFigureOut">
               <a:rPr lang="en-US" smtClean="0"/>
-              <a:t>2018-03-08</a:t>
+              <a:t>2018-03-22</a:t>
             </a:fld>
             <a:endParaRPr lang="en-US"/>
           </a:p>
@@ -18495,7 +18495,7 @@
           <a:p>
             <a:fld id="{CACABD52-BF91-4CCE-9EEC-6A02225A646E}" type="datetimeFigureOut">
               <a:rPr lang="en-US" smtClean="0"/>
-              <a:t>2018-03-08</a:t>
+              <a:t>2018-03-22</a:t>
             </a:fld>
             <a:endParaRPr lang="en-US"/>
           </a:p>
@@ -18703,7 +18703,7 @@
           <a:p>
             <a:fld id="{CACABD52-BF91-4CCE-9EEC-6A02225A646E}" type="datetimeFigureOut">
               <a:rPr lang="en-US" smtClean="0"/>
-              <a:t>2018-03-08</a:t>
+              <a:t>2018-03-22</a:t>
             </a:fld>
             <a:endParaRPr lang="en-US"/>
           </a:p>
@@ -18901,7 +18901,7 @@
           <a:p>
             <a:fld id="{CACABD52-BF91-4CCE-9EEC-6A02225A646E}" type="datetimeFigureOut">
               <a:rPr lang="en-US" smtClean="0"/>
-              <a:t>2018-03-08</a:t>
+              <a:t>2018-03-22</a:t>
             </a:fld>
             <a:endParaRPr lang="en-US"/>
           </a:p>
@@ -19176,7 +19176,7 @@
           <a:p>
             <a:fld id="{CACABD52-BF91-4CCE-9EEC-6A02225A646E}" type="datetimeFigureOut">
               <a:rPr lang="en-US" smtClean="0"/>
-              <a:t>2018-03-08</a:t>
+              <a:t>2018-03-22</a:t>
             </a:fld>
             <a:endParaRPr lang="en-US"/>
           </a:p>
@@ -19441,7 +19441,7 @@
           <a:p>
             <a:fld id="{CACABD52-BF91-4CCE-9EEC-6A02225A646E}" type="datetimeFigureOut">
               <a:rPr lang="en-US" smtClean="0"/>
-              <a:t>2018-03-08</a:t>
+              <a:t>2018-03-22</a:t>
             </a:fld>
             <a:endParaRPr lang="en-US"/>
           </a:p>
@@ -19853,7 +19853,7 @@
           <a:p>
             <a:fld id="{CACABD52-BF91-4CCE-9EEC-6A02225A646E}" type="datetimeFigureOut">
               <a:rPr lang="en-US" smtClean="0"/>
-              <a:t>2018-03-08</a:t>
+              <a:t>2018-03-22</a:t>
             </a:fld>
             <a:endParaRPr lang="en-US"/>
           </a:p>
@@ -19994,7 +19994,7 @@
           <a:p>
             <a:fld id="{CACABD52-BF91-4CCE-9EEC-6A02225A646E}" type="datetimeFigureOut">
               <a:rPr lang="en-US" smtClean="0"/>
-              <a:t>2018-03-08</a:t>
+              <a:t>2018-03-22</a:t>
             </a:fld>
             <a:endParaRPr lang="en-US"/>
           </a:p>
@@ -20107,7 +20107,7 @@
           <a:p>
             <a:fld id="{CACABD52-BF91-4CCE-9EEC-6A02225A646E}" type="datetimeFigureOut">
               <a:rPr lang="en-US" smtClean="0"/>
-              <a:t>2018-03-08</a:t>
+              <a:t>2018-03-22</a:t>
             </a:fld>
             <a:endParaRPr lang="en-US"/>
           </a:p>
@@ -20418,7 +20418,7 @@
           <a:p>
             <a:fld id="{CACABD52-BF91-4CCE-9EEC-6A02225A646E}" type="datetimeFigureOut">
               <a:rPr lang="en-US" smtClean="0"/>
-              <a:t>2018-03-08</a:t>
+              <a:t>2018-03-22</a:t>
             </a:fld>
             <a:endParaRPr lang="en-US"/>
           </a:p>
@@ -20706,7 +20706,7 @@
           <a:p>
             <a:fld id="{CACABD52-BF91-4CCE-9EEC-6A02225A646E}" type="datetimeFigureOut">
               <a:rPr lang="en-US" smtClean="0"/>
-              <a:t>2018-03-08</a:t>
+              <a:t>2018-03-22</a:t>
             </a:fld>
             <a:endParaRPr lang="en-US"/>
           </a:p>
@@ -20947,7 +20947,7 @@
           <a:p>
             <a:fld id="{CACABD52-BF91-4CCE-9EEC-6A02225A646E}" type="datetimeFigureOut">
               <a:rPr lang="en-US" smtClean="0"/>
-              <a:t>2018-03-08</a:t>
+              <a:t>2018-03-22</a:t>
             </a:fld>
             <a:endParaRPr lang="en-US"/>
           </a:p>
@@ -30499,7 +30499,13 @@
             </a:extLst>
           </p:cNvPr>
           <p:cNvGraphicFramePr/>
-          <p:nvPr/>
+          <p:nvPr>
+            <p:extLst>
+              <p:ext uri="{D42A27DB-BD31-4B8C-83A1-F6EECF244321}">
+                <p14:modId xmlns:p14="http://schemas.microsoft.com/office/powerpoint/2010/main" val="4031380183"/>
+              </p:ext>
+            </p:extLst>
+          </p:nvPr>
         </p:nvGraphicFramePr>
         <p:xfrm>
           <a:off x="3664157" y="188727"/>
@@ -31544,7 +31550,7 @@
         </p:nvSpPr>
         <p:spPr>
           <a:xfrm>
-            <a:off x="5603116" y="2084434"/>
+            <a:off x="5820699" y="1816918"/>
             <a:ext cx="736099" cy="369332"/>
           </a:xfrm>
           <a:prstGeom prst="rect">
@@ -31582,7 +31588,7 @@
         </p:nvSpPr>
         <p:spPr>
           <a:xfrm>
-            <a:off x="5517708" y="2591849"/>
+            <a:off x="5732715" y="2259568"/>
             <a:ext cx="607923" cy="369332"/>
           </a:xfrm>
           <a:prstGeom prst="rect">
@@ -31620,7 +31626,7 @@
         </p:nvSpPr>
         <p:spPr>
           <a:xfrm>
-            <a:off x="5718531" y="3023587"/>
+            <a:off x="5664839" y="2704041"/>
             <a:ext cx="505267" cy="369332"/>
           </a:xfrm>
           <a:prstGeom prst="rect">
@@ -31699,7 +31705,7 @@
         </p:nvSpPr>
         <p:spPr>
           <a:xfrm>
-            <a:off x="5299732" y="3877068"/>
+            <a:off x="5258351" y="3611462"/>
             <a:ext cx="1032387" cy="816078"/>
           </a:xfrm>
           <a:prstGeom prst="cube">
@@ -31759,7 +31765,7 @@
         </p:nvSpPr>
         <p:spPr>
           <a:xfrm>
-            <a:off x="5517708" y="4706107"/>
+            <a:off x="5476327" y="4440501"/>
             <a:ext cx="441146" cy="369332"/>
           </a:xfrm>
           <a:prstGeom prst="rect">
@@ -31800,7 +31806,7 @@
         </p:nvSpPr>
         <p:spPr>
           <a:xfrm>
-            <a:off x="4644587" y="3969290"/>
+            <a:off x="4603206" y="3703684"/>
             <a:ext cx="398184" cy="565163"/>
           </a:xfrm>
           <a:prstGeom prst="foldedCorner">
@@ -31849,7 +31855,7 @@
         </p:nvSpPr>
         <p:spPr>
           <a:xfrm>
-            <a:off x="4514102" y="4579148"/>
+            <a:off x="4472721" y="4313542"/>
             <a:ext cx="659155" cy="646331"/>
           </a:xfrm>
           <a:prstGeom prst="rect">
@@ -31906,8 +31912,8 @@
         </p:nvCxnSpPr>
         <p:spPr>
           <a:xfrm flipV="1">
-            <a:off x="6453845" y="3969290"/>
-            <a:ext cx="792575" cy="282581"/>
+            <a:off x="6417213" y="3969291"/>
+            <a:ext cx="829207" cy="117554"/>
           </a:xfrm>
           <a:prstGeom prst="straightConnector1">
             <a:avLst/>
@@ -32884,6 +32890,714 @@
           <a:p>
             <a:pPr algn="ctr"/>
             <a:endParaRPr lang="en-US"/>
+          </a:p>
+        </p:txBody>
+      </p:sp>
+      <p:grpSp>
+        <p:nvGrpSpPr>
+          <p:cNvPr id="24" name="Group 23">
+            <a:extLst>
+              <a:ext uri="{FF2B5EF4-FFF2-40B4-BE49-F238E27FC236}">
+                <a16:creationId xmlns:a16="http://schemas.microsoft.com/office/drawing/2014/main" id="{7699AE6D-1948-48BD-9B9A-01A027DE7855}"/>
+              </a:ext>
+            </a:extLst>
+          </p:cNvPr>
+          <p:cNvGrpSpPr/>
+          <p:nvPr/>
+        </p:nvGrpSpPr>
+        <p:grpSpPr>
+          <a:xfrm>
+            <a:off x="10635386" y="1661662"/>
+            <a:ext cx="519683" cy="323886"/>
+            <a:chOff x="4910438" y="543896"/>
+            <a:chExt cx="519683" cy="323886"/>
+          </a:xfrm>
+        </p:grpSpPr>
+        <p:sp>
+          <p:nvSpPr>
+            <p:cNvPr id="7" name="Rectangle 6">
+              <a:extLst>
+                <a:ext uri="{FF2B5EF4-FFF2-40B4-BE49-F238E27FC236}">
+                  <a16:creationId xmlns:a16="http://schemas.microsoft.com/office/drawing/2014/main" id="{189D359D-1AC6-4393-97DC-53FE41DEBDF0}"/>
+                </a:ext>
+              </a:extLst>
+            </p:cNvPr>
+            <p:cNvSpPr/>
+            <p:nvPr/>
+          </p:nvSpPr>
+          <p:spPr>
+            <a:xfrm>
+              <a:off x="4910438" y="543896"/>
+              <a:ext cx="519683" cy="323886"/>
+            </a:xfrm>
+            <a:prstGeom prst="rect">
+              <a:avLst/>
+            </a:prstGeom>
+            <a:noFill/>
+            <a:ln>
+              <a:solidFill>
+                <a:schemeClr val="tx1"/>
+              </a:solidFill>
+            </a:ln>
+          </p:spPr>
+          <p:style>
+            <a:lnRef idx="2">
+              <a:schemeClr val="accent1">
+                <a:shade val="50000"/>
+              </a:schemeClr>
+            </a:lnRef>
+            <a:fillRef idx="1">
+              <a:schemeClr val="accent1"/>
+            </a:fillRef>
+            <a:effectRef idx="0">
+              <a:schemeClr val="accent1"/>
+            </a:effectRef>
+            <a:fontRef idx="minor">
+              <a:schemeClr val="lt1"/>
+            </a:fontRef>
+          </p:style>
+          <p:txBody>
+            <a:bodyPr rtlCol="0" anchor="ctr"/>
+            <a:lstStyle/>
+            <a:p>
+              <a:pPr algn="ctr"/>
+              <a:endParaRPr lang="en-US"/>
+            </a:p>
+          </p:txBody>
+        </p:sp>
+        <p:cxnSp>
+          <p:nvCxnSpPr>
+            <p:cNvPr id="21" name="Straight Connector 20">
+              <a:extLst>
+                <a:ext uri="{FF2B5EF4-FFF2-40B4-BE49-F238E27FC236}">
+                  <a16:creationId xmlns:a16="http://schemas.microsoft.com/office/drawing/2014/main" id="{A026F547-ED59-4BA6-A6F0-5ADA14A10397}"/>
+                </a:ext>
+              </a:extLst>
+            </p:cNvPr>
+            <p:cNvCxnSpPr/>
+            <p:nvPr/>
+          </p:nvCxnSpPr>
+          <p:spPr>
+            <a:xfrm>
+              <a:off x="5031937" y="543896"/>
+              <a:ext cx="0" cy="323886"/>
+            </a:xfrm>
+            <a:prstGeom prst="line">
+              <a:avLst/>
+            </a:prstGeom>
+            <a:ln>
+              <a:solidFill>
+                <a:schemeClr val="tx1"/>
+              </a:solidFill>
+            </a:ln>
+          </p:spPr>
+          <p:style>
+            <a:lnRef idx="1">
+              <a:schemeClr val="accent1"/>
+            </a:lnRef>
+            <a:fillRef idx="0">
+              <a:schemeClr val="accent1"/>
+            </a:fillRef>
+            <a:effectRef idx="0">
+              <a:schemeClr val="accent1"/>
+            </a:effectRef>
+            <a:fontRef idx="minor">
+              <a:schemeClr val="tx1"/>
+            </a:fontRef>
+          </p:style>
+        </p:cxnSp>
+        <p:cxnSp>
+          <p:nvCxnSpPr>
+            <p:cNvPr id="53" name="Straight Connector 52">
+              <a:extLst>
+                <a:ext uri="{FF2B5EF4-FFF2-40B4-BE49-F238E27FC236}">
+                  <a16:creationId xmlns:a16="http://schemas.microsoft.com/office/drawing/2014/main" id="{C8FADA43-96E3-4E47-BC30-249333EE0EF8}"/>
+                </a:ext>
+              </a:extLst>
+            </p:cNvPr>
+            <p:cNvCxnSpPr/>
+            <p:nvPr/>
+          </p:nvCxnSpPr>
+          <p:spPr>
+            <a:xfrm>
+              <a:off x="5285768" y="543896"/>
+              <a:ext cx="0" cy="323886"/>
+            </a:xfrm>
+            <a:prstGeom prst="line">
+              <a:avLst/>
+            </a:prstGeom>
+            <a:ln>
+              <a:solidFill>
+                <a:schemeClr val="tx1"/>
+              </a:solidFill>
+            </a:ln>
+          </p:spPr>
+          <p:style>
+            <a:lnRef idx="1">
+              <a:schemeClr val="accent1"/>
+            </a:lnRef>
+            <a:fillRef idx="0">
+              <a:schemeClr val="accent1"/>
+            </a:fillRef>
+            <a:effectRef idx="0">
+              <a:schemeClr val="accent1"/>
+            </a:effectRef>
+            <a:fontRef idx="minor">
+              <a:schemeClr val="tx1"/>
+            </a:fontRef>
+          </p:style>
+        </p:cxnSp>
+        <p:cxnSp>
+          <p:nvCxnSpPr>
+            <p:cNvPr id="54" name="Straight Connector 53">
+              <a:extLst>
+                <a:ext uri="{FF2B5EF4-FFF2-40B4-BE49-F238E27FC236}">
+                  <a16:creationId xmlns:a16="http://schemas.microsoft.com/office/drawing/2014/main" id="{D4E823AD-D174-4FFC-97EF-E317B5DFE047}"/>
+                </a:ext>
+              </a:extLst>
+            </p:cNvPr>
+            <p:cNvCxnSpPr>
+              <a:cxnSpLocks/>
+            </p:cNvCxnSpPr>
+            <p:nvPr/>
+          </p:nvCxnSpPr>
+          <p:spPr>
+            <a:xfrm>
+              <a:off x="4910438" y="747715"/>
+              <a:ext cx="519683" cy="0"/>
+            </a:xfrm>
+            <a:prstGeom prst="line">
+              <a:avLst/>
+            </a:prstGeom>
+            <a:ln>
+              <a:solidFill>
+                <a:schemeClr val="tx1"/>
+              </a:solidFill>
+            </a:ln>
+          </p:spPr>
+          <p:style>
+            <a:lnRef idx="1">
+              <a:schemeClr val="accent1"/>
+            </a:lnRef>
+            <a:fillRef idx="0">
+              <a:schemeClr val="accent1"/>
+            </a:fillRef>
+            <a:effectRef idx="0">
+              <a:schemeClr val="accent1"/>
+            </a:effectRef>
+            <a:fontRef idx="minor">
+              <a:schemeClr val="tx1"/>
+            </a:fontRef>
+          </p:style>
+        </p:cxnSp>
+      </p:grpSp>
+      <p:grpSp>
+        <p:nvGrpSpPr>
+          <p:cNvPr id="58" name="Group 57">
+            <a:extLst>
+              <a:ext uri="{FF2B5EF4-FFF2-40B4-BE49-F238E27FC236}">
+                <a16:creationId xmlns:a16="http://schemas.microsoft.com/office/drawing/2014/main" id="{E96FD893-A606-443A-AD99-879A29B400AB}"/>
+              </a:ext>
+            </a:extLst>
+          </p:cNvPr>
+          <p:cNvGrpSpPr/>
+          <p:nvPr/>
+        </p:nvGrpSpPr>
+        <p:grpSpPr>
+          <a:xfrm>
+            <a:off x="4470873" y="3253228"/>
+            <a:ext cx="519683" cy="323886"/>
+            <a:chOff x="4910438" y="543896"/>
+            <a:chExt cx="519683" cy="323886"/>
+          </a:xfrm>
+        </p:grpSpPr>
+        <p:sp>
+          <p:nvSpPr>
+            <p:cNvPr id="59" name="Rectangle 58">
+              <a:extLst>
+                <a:ext uri="{FF2B5EF4-FFF2-40B4-BE49-F238E27FC236}">
+                  <a16:creationId xmlns:a16="http://schemas.microsoft.com/office/drawing/2014/main" id="{E4437984-6A03-498C-978F-10F3124A023F}"/>
+                </a:ext>
+              </a:extLst>
+            </p:cNvPr>
+            <p:cNvSpPr/>
+            <p:nvPr/>
+          </p:nvSpPr>
+          <p:spPr>
+            <a:xfrm>
+              <a:off x="4910438" y="543896"/>
+              <a:ext cx="519683" cy="323886"/>
+            </a:xfrm>
+            <a:prstGeom prst="rect">
+              <a:avLst/>
+            </a:prstGeom>
+            <a:noFill/>
+            <a:ln>
+              <a:solidFill>
+                <a:schemeClr val="tx1"/>
+              </a:solidFill>
+            </a:ln>
+          </p:spPr>
+          <p:style>
+            <a:lnRef idx="2">
+              <a:schemeClr val="accent1">
+                <a:shade val="50000"/>
+              </a:schemeClr>
+            </a:lnRef>
+            <a:fillRef idx="1">
+              <a:schemeClr val="accent1"/>
+            </a:fillRef>
+            <a:effectRef idx="0">
+              <a:schemeClr val="accent1"/>
+            </a:effectRef>
+            <a:fontRef idx="minor">
+              <a:schemeClr val="lt1"/>
+            </a:fontRef>
+          </p:style>
+          <p:txBody>
+            <a:bodyPr rtlCol="0" anchor="ctr"/>
+            <a:lstStyle/>
+            <a:p>
+              <a:pPr algn="ctr"/>
+              <a:endParaRPr lang="en-US"/>
+            </a:p>
+          </p:txBody>
+        </p:sp>
+        <p:cxnSp>
+          <p:nvCxnSpPr>
+            <p:cNvPr id="60" name="Straight Connector 59">
+              <a:extLst>
+                <a:ext uri="{FF2B5EF4-FFF2-40B4-BE49-F238E27FC236}">
+                  <a16:creationId xmlns:a16="http://schemas.microsoft.com/office/drawing/2014/main" id="{DA5DBAEE-7702-4380-A965-233EB99E7884}"/>
+                </a:ext>
+              </a:extLst>
+            </p:cNvPr>
+            <p:cNvCxnSpPr/>
+            <p:nvPr/>
+          </p:nvCxnSpPr>
+          <p:spPr>
+            <a:xfrm>
+              <a:off x="5031937" y="543896"/>
+              <a:ext cx="0" cy="323886"/>
+            </a:xfrm>
+            <a:prstGeom prst="line">
+              <a:avLst/>
+            </a:prstGeom>
+            <a:ln>
+              <a:solidFill>
+                <a:schemeClr val="tx1"/>
+              </a:solidFill>
+            </a:ln>
+          </p:spPr>
+          <p:style>
+            <a:lnRef idx="1">
+              <a:schemeClr val="accent1"/>
+            </a:lnRef>
+            <a:fillRef idx="0">
+              <a:schemeClr val="accent1"/>
+            </a:fillRef>
+            <a:effectRef idx="0">
+              <a:schemeClr val="accent1"/>
+            </a:effectRef>
+            <a:fontRef idx="minor">
+              <a:schemeClr val="tx1"/>
+            </a:fontRef>
+          </p:style>
+        </p:cxnSp>
+        <p:cxnSp>
+          <p:nvCxnSpPr>
+            <p:cNvPr id="61" name="Straight Connector 60">
+              <a:extLst>
+                <a:ext uri="{FF2B5EF4-FFF2-40B4-BE49-F238E27FC236}">
+                  <a16:creationId xmlns:a16="http://schemas.microsoft.com/office/drawing/2014/main" id="{D112CE0A-0115-4784-8974-A58C166D681A}"/>
+                </a:ext>
+              </a:extLst>
+            </p:cNvPr>
+            <p:cNvCxnSpPr/>
+            <p:nvPr/>
+          </p:nvCxnSpPr>
+          <p:spPr>
+            <a:xfrm>
+              <a:off x="5285768" y="543896"/>
+              <a:ext cx="0" cy="323886"/>
+            </a:xfrm>
+            <a:prstGeom prst="line">
+              <a:avLst/>
+            </a:prstGeom>
+            <a:ln>
+              <a:solidFill>
+                <a:schemeClr val="tx1"/>
+              </a:solidFill>
+            </a:ln>
+          </p:spPr>
+          <p:style>
+            <a:lnRef idx="1">
+              <a:schemeClr val="accent1"/>
+            </a:lnRef>
+            <a:fillRef idx="0">
+              <a:schemeClr val="accent1"/>
+            </a:fillRef>
+            <a:effectRef idx="0">
+              <a:schemeClr val="accent1"/>
+            </a:effectRef>
+            <a:fontRef idx="minor">
+              <a:schemeClr val="tx1"/>
+            </a:fontRef>
+          </p:style>
+        </p:cxnSp>
+        <p:cxnSp>
+          <p:nvCxnSpPr>
+            <p:cNvPr id="62" name="Straight Connector 61">
+              <a:extLst>
+                <a:ext uri="{FF2B5EF4-FFF2-40B4-BE49-F238E27FC236}">
+                  <a16:creationId xmlns:a16="http://schemas.microsoft.com/office/drawing/2014/main" id="{2CA87DC1-B06E-4C51-BC06-0725BE88BE6D}"/>
+                </a:ext>
+              </a:extLst>
+            </p:cNvPr>
+            <p:cNvCxnSpPr>
+              <a:cxnSpLocks/>
+            </p:cNvCxnSpPr>
+            <p:nvPr/>
+          </p:nvCxnSpPr>
+          <p:spPr>
+            <a:xfrm>
+              <a:off x="4910438" y="747715"/>
+              <a:ext cx="519683" cy="0"/>
+            </a:xfrm>
+            <a:prstGeom prst="line">
+              <a:avLst/>
+            </a:prstGeom>
+            <a:ln>
+              <a:solidFill>
+                <a:schemeClr val="tx1"/>
+              </a:solidFill>
+            </a:ln>
+          </p:spPr>
+          <p:style>
+            <a:lnRef idx="1">
+              <a:schemeClr val="accent1"/>
+            </a:lnRef>
+            <a:fillRef idx="0">
+              <a:schemeClr val="accent1"/>
+            </a:fillRef>
+            <a:effectRef idx="0">
+              <a:schemeClr val="accent1"/>
+            </a:effectRef>
+            <a:fontRef idx="minor">
+              <a:schemeClr val="tx1"/>
+            </a:fontRef>
+          </p:style>
+        </p:cxnSp>
+      </p:grpSp>
+      <p:grpSp>
+        <p:nvGrpSpPr>
+          <p:cNvPr id="63" name="Group 62">
+            <a:extLst>
+              <a:ext uri="{FF2B5EF4-FFF2-40B4-BE49-F238E27FC236}">
+                <a16:creationId xmlns:a16="http://schemas.microsoft.com/office/drawing/2014/main" id="{59EA6294-D0E8-4E50-BA74-E7AD650BDB45}"/>
+              </a:ext>
+            </a:extLst>
+          </p:cNvPr>
+          <p:cNvGrpSpPr/>
+          <p:nvPr/>
+        </p:nvGrpSpPr>
+        <p:grpSpPr>
+          <a:xfrm>
+            <a:off x="5216485" y="5046023"/>
+            <a:ext cx="519683" cy="323886"/>
+            <a:chOff x="4910438" y="543896"/>
+            <a:chExt cx="519683" cy="323886"/>
+          </a:xfrm>
+        </p:grpSpPr>
+        <p:sp>
+          <p:nvSpPr>
+            <p:cNvPr id="64" name="Rectangle 63">
+              <a:extLst>
+                <a:ext uri="{FF2B5EF4-FFF2-40B4-BE49-F238E27FC236}">
+                  <a16:creationId xmlns:a16="http://schemas.microsoft.com/office/drawing/2014/main" id="{B1FB0AC2-6B76-46E3-9133-19318E67B6C4}"/>
+                </a:ext>
+              </a:extLst>
+            </p:cNvPr>
+            <p:cNvSpPr/>
+            <p:nvPr/>
+          </p:nvSpPr>
+          <p:spPr>
+            <a:xfrm>
+              <a:off x="4910438" y="543896"/>
+              <a:ext cx="519683" cy="323886"/>
+            </a:xfrm>
+            <a:prstGeom prst="rect">
+              <a:avLst/>
+            </a:prstGeom>
+            <a:noFill/>
+            <a:ln>
+              <a:solidFill>
+                <a:schemeClr val="tx1"/>
+              </a:solidFill>
+            </a:ln>
+          </p:spPr>
+          <p:style>
+            <a:lnRef idx="2">
+              <a:schemeClr val="accent1">
+                <a:shade val="50000"/>
+              </a:schemeClr>
+            </a:lnRef>
+            <a:fillRef idx="1">
+              <a:schemeClr val="accent1"/>
+            </a:fillRef>
+            <a:effectRef idx="0">
+              <a:schemeClr val="accent1"/>
+            </a:effectRef>
+            <a:fontRef idx="minor">
+              <a:schemeClr val="lt1"/>
+            </a:fontRef>
+          </p:style>
+          <p:txBody>
+            <a:bodyPr rtlCol="0" anchor="ctr"/>
+            <a:lstStyle/>
+            <a:p>
+              <a:pPr algn="ctr"/>
+              <a:endParaRPr lang="en-US"/>
+            </a:p>
+          </p:txBody>
+        </p:sp>
+        <p:cxnSp>
+          <p:nvCxnSpPr>
+            <p:cNvPr id="65" name="Straight Connector 64">
+              <a:extLst>
+                <a:ext uri="{FF2B5EF4-FFF2-40B4-BE49-F238E27FC236}">
+                  <a16:creationId xmlns:a16="http://schemas.microsoft.com/office/drawing/2014/main" id="{AAAD192D-83A3-4547-AC47-61BCCBCCD9AC}"/>
+                </a:ext>
+              </a:extLst>
+            </p:cNvPr>
+            <p:cNvCxnSpPr/>
+            <p:nvPr/>
+          </p:nvCxnSpPr>
+          <p:spPr>
+            <a:xfrm>
+              <a:off x="5031937" y="543896"/>
+              <a:ext cx="0" cy="323886"/>
+            </a:xfrm>
+            <a:prstGeom prst="line">
+              <a:avLst/>
+            </a:prstGeom>
+            <a:ln>
+              <a:solidFill>
+                <a:schemeClr val="tx1"/>
+              </a:solidFill>
+            </a:ln>
+          </p:spPr>
+          <p:style>
+            <a:lnRef idx="1">
+              <a:schemeClr val="accent1"/>
+            </a:lnRef>
+            <a:fillRef idx="0">
+              <a:schemeClr val="accent1"/>
+            </a:fillRef>
+            <a:effectRef idx="0">
+              <a:schemeClr val="accent1"/>
+            </a:effectRef>
+            <a:fontRef idx="minor">
+              <a:schemeClr val="tx1"/>
+            </a:fontRef>
+          </p:style>
+        </p:cxnSp>
+        <p:cxnSp>
+          <p:nvCxnSpPr>
+            <p:cNvPr id="66" name="Straight Connector 65">
+              <a:extLst>
+                <a:ext uri="{FF2B5EF4-FFF2-40B4-BE49-F238E27FC236}">
+                  <a16:creationId xmlns:a16="http://schemas.microsoft.com/office/drawing/2014/main" id="{883D4DAB-A796-49E5-A7EA-C5FB2433FA65}"/>
+                </a:ext>
+              </a:extLst>
+            </p:cNvPr>
+            <p:cNvCxnSpPr/>
+            <p:nvPr/>
+          </p:nvCxnSpPr>
+          <p:spPr>
+            <a:xfrm>
+              <a:off x="5285768" y="543896"/>
+              <a:ext cx="0" cy="323886"/>
+            </a:xfrm>
+            <a:prstGeom prst="line">
+              <a:avLst/>
+            </a:prstGeom>
+            <a:ln>
+              <a:solidFill>
+                <a:schemeClr val="tx1"/>
+              </a:solidFill>
+            </a:ln>
+          </p:spPr>
+          <p:style>
+            <a:lnRef idx="1">
+              <a:schemeClr val="accent1"/>
+            </a:lnRef>
+            <a:fillRef idx="0">
+              <a:schemeClr val="accent1"/>
+            </a:fillRef>
+            <a:effectRef idx="0">
+              <a:schemeClr val="accent1"/>
+            </a:effectRef>
+            <a:fontRef idx="minor">
+              <a:schemeClr val="tx1"/>
+            </a:fontRef>
+          </p:style>
+        </p:cxnSp>
+        <p:cxnSp>
+          <p:nvCxnSpPr>
+            <p:cNvPr id="67" name="Straight Connector 66">
+              <a:extLst>
+                <a:ext uri="{FF2B5EF4-FFF2-40B4-BE49-F238E27FC236}">
+                  <a16:creationId xmlns:a16="http://schemas.microsoft.com/office/drawing/2014/main" id="{FCE4D7DC-CD15-4149-9513-729CE086EA3A}"/>
+                </a:ext>
+              </a:extLst>
+            </p:cNvPr>
+            <p:cNvCxnSpPr>
+              <a:cxnSpLocks/>
+            </p:cNvCxnSpPr>
+            <p:nvPr/>
+          </p:nvCxnSpPr>
+          <p:spPr>
+            <a:xfrm>
+              <a:off x="4910438" y="747715"/>
+              <a:ext cx="519683" cy="0"/>
+            </a:xfrm>
+            <a:prstGeom prst="line">
+              <a:avLst/>
+            </a:prstGeom>
+            <a:ln>
+              <a:solidFill>
+                <a:schemeClr val="tx1"/>
+              </a:solidFill>
+            </a:ln>
+          </p:spPr>
+          <p:style>
+            <a:lnRef idx="1">
+              <a:schemeClr val="accent1"/>
+            </a:lnRef>
+            <a:fillRef idx="0">
+              <a:schemeClr val="accent1"/>
+            </a:fillRef>
+            <a:effectRef idx="0">
+              <a:schemeClr val="accent1"/>
+            </a:effectRef>
+            <a:fontRef idx="minor">
+              <a:schemeClr val="tx1"/>
+            </a:fontRef>
+          </p:style>
+        </p:cxnSp>
+      </p:grpSp>
+      <p:sp>
+        <p:nvSpPr>
+          <p:cNvPr id="26" name="Rectangle 25">
+            <a:extLst>
+              <a:ext uri="{FF2B5EF4-FFF2-40B4-BE49-F238E27FC236}">
+                <a16:creationId xmlns:a16="http://schemas.microsoft.com/office/drawing/2014/main" id="{EDBB5F88-73B2-4586-921F-DF9089D985DE}"/>
+              </a:ext>
+            </a:extLst>
+          </p:cNvPr>
+          <p:cNvSpPr/>
+          <p:nvPr/>
+        </p:nvSpPr>
+        <p:spPr>
+          <a:xfrm>
+            <a:off x="11182973" y="1644810"/>
+            <a:ext cx="966931" cy="369332"/>
+          </a:xfrm>
+          <a:prstGeom prst="rect">
+            <a:avLst/>
+          </a:prstGeom>
+        </p:spPr>
+        <p:txBody>
+          <a:bodyPr wrap="none">
+            <a:spAutoFit/>
+          </a:bodyPr>
+          <a:lstStyle/>
+          <a:p>
+            <a:r>
+              <a:rPr lang="sv-SE" dirty="0">
+                <a:latin typeface="Arial" panose="020B0604020202020204" pitchFamily="34" charset="0"/>
+                <a:cs typeface="Arial" panose="020B0604020202020204" pitchFamily="34" charset="0"/>
+              </a:rPr>
+              <a:t>Canvas</a:t>
+            </a:r>
+            <a:endParaRPr lang="en-US" dirty="0"/>
+          </a:p>
+        </p:txBody>
+      </p:sp>
+      <p:sp>
+        <p:nvSpPr>
+          <p:cNvPr id="70" name="Rectangle 69">
+            <a:extLst>
+              <a:ext uri="{FF2B5EF4-FFF2-40B4-BE49-F238E27FC236}">
+                <a16:creationId xmlns:a16="http://schemas.microsoft.com/office/drawing/2014/main" id="{4E1B358B-33FA-49E9-B22D-48D8ACA82FA7}"/>
+              </a:ext>
+            </a:extLst>
+          </p:cNvPr>
+          <p:cNvSpPr/>
+          <p:nvPr/>
+        </p:nvSpPr>
+        <p:spPr>
+          <a:xfrm>
+            <a:off x="5002692" y="3227406"/>
+            <a:ext cx="966931" cy="369332"/>
+          </a:xfrm>
+          <a:prstGeom prst="rect">
+            <a:avLst/>
+          </a:prstGeom>
+        </p:spPr>
+        <p:txBody>
+          <a:bodyPr wrap="none">
+            <a:spAutoFit/>
+          </a:bodyPr>
+          <a:lstStyle/>
+          <a:p>
+            <a:r>
+              <a:rPr lang="sv-SE" dirty="0">
+                <a:latin typeface="Arial" panose="020B0604020202020204" pitchFamily="34" charset="0"/>
+                <a:cs typeface="Arial" panose="020B0604020202020204" pitchFamily="34" charset="0"/>
+              </a:rPr>
+              <a:t>Canvas</a:t>
+            </a:r>
+            <a:endParaRPr lang="en-US" dirty="0"/>
+          </a:p>
+        </p:txBody>
+      </p:sp>
+      <p:sp>
+        <p:nvSpPr>
+          <p:cNvPr id="71" name="Rectangle 70">
+            <a:extLst>
+              <a:ext uri="{FF2B5EF4-FFF2-40B4-BE49-F238E27FC236}">
+                <a16:creationId xmlns:a16="http://schemas.microsoft.com/office/drawing/2014/main" id="{DE8A8FB8-D2B2-4EA8-984E-DC871D7C1E21}"/>
+              </a:ext>
+            </a:extLst>
+          </p:cNvPr>
+          <p:cNvSpPr/>
+          <p:nvPr/>
+        </p:nvSpPr>
+        <p:spPr>
+          <a:xfrm>
+            <a:off x="5752045" y="5015501"/>
+            <a:ext cx="966931" cy="369332"/>
+          </a:xfrm>
+          <a:prstGeom prst="rect">
+            <a:avLst/>
+          </a:prstGeom>
+        </p:spPr>
+        <p:txBody>
+          <a:bodyPr wrap="none">
+            <a:spAutoFit/>
+          </a:bodyPr>
+          <a:lstStyle/>
+          <a:p>
+            <a:r>
+              <a:rPr lang="sv-SE" dirty="0">
+                <a:latin typeface="Arial" panose="020B0604020202020204" pitchFamily="34" charset="0"/>
+                <a:cs typeface="Arial" panose="020B0604020202020204" pitchFamily="34" charset="0"/>
+              </a:rPr>
+              <a:t>Canvas</a:t>
+            </a:r>
+            <a:endParaRPr lang="en-US" dirty="0"/>
           </a:p>
         </p:txBody>
       </p:sp>

</xml_diff>